<commit_message>
germ theory of disease
</commit_message>
<xml_diff>
--- a/lecture.pptx
+++ b/lecture.pptx
@@ -902,14 +902,14 @@
           </a:ln>
           <a:extLst>
             <a:ext uri="{909E8E84-426E-40dd-AFC4-6F175D3DCCD1}">
-              <a14:hiddenFill xmlns="" xmlns:a14="http://schemas.microsoft.com/office/drawing/2010/main">
+              <a14:hiddenFill xmlns:a14="http://schemas.microsoft.com/office/drawing/2010/main" xmlns="">
                 <a:solidFill>
                   <a:srgbClr val="FFFFFF"/>
                 </a:solidFill>
               </a14:hiddenFill>
             </a:ext>
             <a:ext uri="{FAA26D3D-D897-4be2-8F04-BA451C77F1D7}">
-              <ma14:placeholderFlag xmlns="" xmlns:ma14="http://schemas.microsoft.com/office/mac/drawingml/2011/main" val="1"/>
+              <ma14:placeholderFlag xmlns:ma14="http://schemas.microsoft.com/office/mac/drawingml/2011/main" xmlns="" val="1"/>
             </a:ext>
           </a:extLst>
         </p:spPr>
@@ -928,14 +928,14 @@
           <a:noFill/>
           <a:extLst>
             <a:ext uri="{909E8E84-426E-40dd-AFC4-6F175D3DCCD1}">
-              <a14:hiddenFill xmlns="" xmlns:a14="http://schemas.microsoft.com/office/drawing/2010/main">
+              <a14:hiddenFill xmlns:a14="http://schemas.microsoft.com/office/drawing/2010/main" xmlns="">
                 <a:solidFill>
                   <a:srgbClr val="FFFFFF"/>
                 </a:solidFill>
               </a14:hiddenFill>
             </a:ext>
             <a:ext uri="{91240B29-F687-4f45-9708-019B960494DF}">
-              <a14:hiddenLine xmlns="" xmlns:a14="http://schemas.microsoft.com/office/drawing/2010/main" w="9525">
+              <a14:hiddenLine xmlns:a14="http://schemas.microsoft.com/office/drawing/2010/main" xmlns="" w="9525">
                 <a:solidFill>
                   <a:srgbClr val="000000"/>
                 </a:solidFill>
@@ -1015,14 +1015,14 @@
           </a:ln>
           <a:extLst>
             <a:ext uri="{909E8E84-426E-40dd-AFC4-6F175D3DCCD1}">
-              <a14:hiddenFill xmlns="" xmlns:a14="http://schemas.microsoft.com/office/drawing/2010/main">
+              <a14:hiddenFill xmlns:a14="http://schemas.microsoft.com/office/drawing/2010/main" xmlns="">
                 <a:solidFill>
                   <a:srgbClr val="FFFFFF"/>
                 </a:solidFill>
               </a14:hiddenFill>
             </a:ext>
             <a:ext uri="{FAA26D3D-D897-4be2-8F04-BA451C77F1D7}">
-              <ma14:placeholderFlag xmlns="" xmlns:ma14="http://schemas.microsoft.com/office/mac/drawingml/2011/main" val="1"/>
+              <ma14:placeholderFlag xmlns:ma14="http://schemas.microsoft.com/office/mac/drawingml/2011/main" xmlns="" val="1"/>
             </a:ext>
           </a:extLst>
         </p:spPr>
@@ -1041,14 +1041,14 @@
           <a:noFill/>
           <a:extLst>
             <a:ext uri="{909E8E84-426E-40dd-AFC4-6F175D3DCCD1}">
-              <a14:hiddenFill xmlns="" xmlns:a14="http://schemas.microsoft.com/office/drawing/2010/main">
+              <a14:hiddenFill xmlns:a14="http://schemas.microsoft.com/office/drawing/2010/main" xmlns="">
                 <a:solidFill>
                   <a:srgbClr val="FFFFFF"/>
                 </a:solidFill>
               </a14:hiddenFill>
             </a:ext>
             <a:ext uri="{91240B29-F687-4f45-9708-019B960494DF}">
-              <a14:hiddenLine xmlns="" xmlns:a14="http://schemas.microsoft.com/office/drawing/2010/main" w="9525">
+              <a14:hiddenLine xmlns:a14="http://schemas.microsoft.com/office/drawing/2010/main" xmlns="" w="9525">
                 <a:solidFill>
                   <a:srgbClr val="000000"/>
                 </a:solidFill>
@@ -1067,17 +1067,243 @@
           </a:bodyPr>
           <a:lstStyle/>
           <a:p>
-            <a:pPr>
-              <a:spcBef>
-                <a:spcPct val="0"/>
-              </a:spcBef>
-            </a:pPr>
             <a:r>
-              <a:rPr lang="en-US">
-                <a:latin typeface="BentonSans Book" charset="0"/>
+              <a:rPr lang="en-US" b="0" dirty="0">
+                <a:effectLst/>
               </a:rPr>
-              <a:t>Bulleted Copy</a:t>
+              <a:t>Picture credit: </a:t>
             </a:r>
+            <a:r>
+              <a:rPr lang="en-US" dirty="0">
+                <a:hlinkClick r:id="rId3"/>
+              </a:rPr>
+              <a:t>https://www.npr.org/sections/health-shots/2015/01/12/375663920/the-doctor-who-championed-hand-washing-and-saved-women-s-lives</a:t>
+            </a:r>
+            <a:endParaRPr lang="en-US" b="0" dirty="0">
+              <a:effectLst/>
+            </a:endParaRPr>
+          </a:p>
+          <a:p>
+            <a:pPr lvl="3" rtl="0" fontAlgn="base"/>
+            <a:r>
+              <a:rPr lang="en-US" sz="1800" b="0" i="0" u="none" strike="noStrike" kern="1200" dirty="0">
+                <a:solidFill>
+                  <a:schemeClr val="tx1"/>
+                </a:solidFill>
+                <a:effectLst/>
+                <a:latin typeface="BentonSans Book"/>
+                <a:ea typeface="ＭＳ Ｐゴシック" charset="0"/>
+                <a:cs typeface="+mn-cs"/>
+              </a:rPr>
+              <a:t>- Simple Table from 1847</a:t>
+            </a:r>
+          </a:p>
+          <a:p>
+            <a:pPr lvl="3" rtl="0" fontAlgn="base"/>
+            <a:r>
+              <a:rPr lang="en-US" sz="1800" b="0" i="0" u="none" strike="noStrike" kern="1200" dirty="0">
+                <a:solidFill>
+                  <a:schemeClr val="tx1"/>
+                </a:solidFill>
+                <a:effectLst/>
+                <a:latin typeface="BentonSans Book"/>
+                <a:ea typeface="ＭＳ Ｐゴシック" charset="0"/>
+                <a:cs typeface="+mn-cs"/>
+              </a:rPr>
+              <a:t>- Microscopic germs, invisible to the eye, can make us sick!</a:t>
+            </a:r>
+          </a:p>
+          <a:p>
+            <a:pPr lvl="3" rtl="0" fontAlgn="base"/>
+            <a:r>
+              <a:rPr lang="en-US" sz="1800" b="0" i="0" u="none" strike="noStrike" kern="1200" dirty="0">
+                <a:solidFill>
+                  <a:schemeClr val="tx1"/>
+                </a:solidFill>
+                <a:effectLst/>
+                <a:latin typeface="BentonSans Book"/>
+                <a:ea typeface="ＭＳ Ｐゴシック" charset="0"/>
+                <a:cs typeface="+mn-cs"/>
+              </a:rPr>
+              <a:t>- A doctor who doesn’t wash his hands can spread his disease from one person to another</a:t>
+            </a:r>
+          </a:p>
+          <a:p>
+            <a:pPr lvl="3" rtl="0" fontAlgn="base"/>
+            <a:r>
+              <a:rPr lang="en-US" sz="1800" b="0" i="0" u="none" strike="noStrike" kern="1200" dirty="0">
+                <a:solidFill>
+                  <a:schemeClr val="tx1"/>
+                </a:solidFill>
+                <a:effectLst/>
+                <a:latin typeface="BentonSans Book"/>
+                <a:ea typeface="ＭＳ Ｐゴシック" charset="0"/>
+                <a:cs typeface="+mn-cs"/>
+              </a:rPr>
+              <a:t>- Discovery made with data by Ignaz Semmelweis</a:t>
+            </a:r>
+          </a:p>
+          <a:p>
+            <a:pPr lvl="3" rtl="0" fontAlgn="base"/>
+            <a:r>
+              <a:rPr lang="en-US" sz="1800" b="0" i="0" u="none" strike="noStrike" kern="1200" dirty="0">
+                <a:solidFill>
+                  <a:schemeClr val="tx1"/>
+                </a:solidFill>
+                <a:effectLst/>
+                <a:latin typeface="BentonSans Book"/>
+                <a:ea typeface="ＭＳ Ｐゴシック" charset="0"/>
+                <a:cs typeface="+mn-cs"/>
+              </a:rPr>
+              <a:t>- In his first year, in fact in his first six months, using this data right here, after being turned down from a more prestigious job he discovered the Germ Theory of Disease</a:t>
+            </a:r>
+          </a:p>
+          <a:p>
+            <a:pPr lvl="3" rtl="0" fontAlgn="base"/>
+            <a:r>
+              <a:rPr lang="en-US" sz="1800" b="0" i="0" u="none" strike="noStrike" kern="1200" dirty="0">
+                <a:solidFill>
+                  <a:schemeClr val="tx1"/>
+                </a:solidFill>
+                <a:effectLst/>
+                <a:latin typeface="BentonSans Book"/>
+                <a:ea typeface="ＭＳ Ｐゴシック" charset="0"/>
+                <a:cs typeface="+mn-cs"/>
+              </a:rPr>
+              <a:t>- He noticed that doctors coming from autopsies who then delivered babies had dramatically higher maternal mortality rates due to puerperal fever.</a:t>
+            </a:r>
+          </a:p>
+          <a:p>
+            <a:pPr lvl="3" rtl="0" fontAlgn="base"/>
+            <a:r>
+              <a:rPr lang="en-US" sz="1800" b="0" i="0" u="none" strike="noStrike" kern="1200" dirty="0">
+                <a:solidFill>
+                  <a:schemeClr val="tx1"/>
+                </a:solidFill>
+                <a:effectLst/>
+                <a:latin typeface="BentonSans Book"/>
+                <a:ea typeface="ＭＳ Ｐゴシック" charset="0"/>
+                <a:cs typeface="+mn-cs"/>
+              </a:rPr>
+              <a:t>- After asking doctors to wash their hands before examining pregnant women he documented a reduction in mortality rate from 18% to 2.2% over a year</a:t>
+            </a:r>
+          </a:p>
+          <a:p>
+            <a:pPr lvl="3" rtl="0" fontAlgn="base"/>
+            <a:r>
+              <a:rPr lang="en-US" sz="1800" b="0" i="0" u="none" strike="noStrike" kern="1200" dirty="0">
+                <a:solidFill>
+                  <a:schemeClr val="tx1"/>
+                </a:solidFill>
+                <a:effectLst/>
+                <a:latin typeface="BentonSans Book"/>
+                <a:ea typeface="ＭＳ Ｐゴシック" charset="0"/>
+                <a:cs typeface="+mn-cs"/>
+              </a:rPr>
+              <a:t>- He, originally, was mocked for this. He had no explanation but from the data he knew that when doctors washed their hands it saved lives.</a:t>
+            </a:r>
+          </a:p>
+          <a:p>
+            <a:pPr lvl="3" rtl="0" fontAlgn="base"/>
+            <a:r>
+              <a:rPr lang="en-US" sz="1800" b="0" i="0" u="none" strike="noStrike" kern="1200" dirty="0">
+                <a:solidFill>
+                  <a:schemeClr val="tx1"/>
+                </a:solidFill>
+                <a:effectLst/>
+                <a:latin typeface="BentonSans Book"/>
+                <a:ea typeface="ＭＳ Ｐゴシック" charset="0"/>
+                <a:cs typeface="+mn-cs"/>
+              </a:rPr>
+              <a:t>- He died in an insane asylum at age 47 before his theory was ever accepted.</a:t>
+            </a:r>
+          </a:p>
+          <a:p>
+            <a:pPr lvl="3" rtl="0" fontAlgn="base"/>
+            <a:r>
+              <a:rPr lang="en-US" sz="1800" b="0" i="0" u="none" strike="noStrike" kern="1200" dirty="0">
+                <a:solidFill>
+                  <a:schemeClr val="tx1"/>
+                </a:solidFill>
+                <a:effectLst/>
+                <a:latin typeface="BentonSans Book"/>
+                <a:ea typeface="ＭＳ Ｐゴシック" charset="0"/>
+                <a:cs typeface="+mn-cs"/>
+              </a:rPr>
+              <a:t>- A few years after his death in 1865, Louis Pasteur confirmed germ theory and Joseph Lister used their research to practice and operate with hygienic methods with great success.</a:t>
+            </a:r>
+          </a:p>
+          <a:p>
+            <a:pPr lvl="3" rtl="0" fontAlgn="base"/>
+            <a:r>
+              <a:rPr lang="en-US" sz="1800" b="0" i="0" u="none" strike="noStrike" kern="1200" dirty="0">
+                <a:solidFill>
+                  <a:schemeClr val="tx1"/>
+                </a:solidFill>
+                <a:effectLst/>
+                <a:latin typeface="BentonSans Book"/>
+                <a:ea typeface="ＭＳ Ｐゴシック" charset="0"/>
+                <a:cs typeface="+mn-cs"/>
+              </a:rPr>
+              <a:t>- John Snow also contributed to this replacement of miasma theory (disease spread through bad air, even caused by things like bad breath).</a:t>
+            </a:r>
+          </a:p>
+          <a:p>
+            <a:pPr lvl="4" rtl="0" fontAlgn="base"/>
+            <a:r>
+              <a:rPr lang="en-US" sz="1800" b="0" i="0" u="none" strike="noStrike" kern="1200" dirty="0">
+                <a:solidFill>
+                  <a:schemeClr val="tx1"/>
+                </a:solidFill>
+                <a:effectLst/>
+                <a:latin typeface="BentonSans Book"/>
+                <a:ea typeface="ＭＳ Ｐゴシック" charset="0"/>
+                <a:cs typeface="+mn-cs"/>
+              </a:rPr>
+              <a:t>- Game of Thrones!</a:t>
+            </a:r>
+          </a:p>
+          <a:p>
+            <a:pPr lvl="0"/>
+            <a:r>
+              <a:rPr lang="en-US" sz="2000" b="0" i="0" u="none" strike="noStrike" kern="1200" dirty="0">
+                <a:solidFill>
+                  <a:schemeClr val="tx1"/>
+                </a:solidFill>
+                <a:effectLst/>
+                <a:latin typeface="BentonSans Book"/>
+                <a:ea typeface="ＭＳ Ｐゴシック" charset="0"/>
+                <a:cs typeface="ＭＳ Ｐゴシック" charset="0"/>
+              </a:rPr>
+              <a:t>		- Wrote essay called </a:t>
+            </a:r>
+            <a:r>
+              <a:rPr lang="en-US" sz="1800" b="0" i="1" u="none" strike="noStrike" kern="1200" dirty="0">
+                <a:solidFill>
+                  <a:schemeClr val="tx1"/>
+                </a:solidFill>
+                <a:effectLst/>
+                <a:latin typeface="BentonSans Book"/>
+                <a:ea typeface="ＭＳ Ｐゴシック" charset="0"/>
+                <a:cs typeface="ＭＳ Ｐゴシック" charset="0"/>
+              </a:rPr>
+              <a:t>On the Mode of Communication of Cholera </a:t>
+            </a:r>
+            <a:r>
+              <a:rPr lang="en-US" sz="1800" b="0" i="0" u="none" strike="noStrike" kern="1200" dirty="0">
+                <a:solidFill>
+                  <a:schemeClr val="tx1"/>
+                </a:solidFill>
+                <a:effectLst/>
+                <a:latin typeface="BentonSans Book"/>
+                <a:ea typeface="ＭＳ Ｐゴシック" charset="0"/>
+                <a:cs typeface="ＭＳ Ｐゴシック" charset="0"/>
+              </a:rPr>
+              <a:t>in 1849</a:t>
+            </a:r>
+            <a:endParaRPr lang="en-US" dirty="0">
+              <a:latin typeface="BentonSans Book" charset="0"/>
+            </a:endParaRPr>
           </a:p>
         </p:txBody>
       </p:sp>
@@ -1128,14 +1354,14 @@
           </a:ln>
           <a:extLst>
             <a:ext uri="{909E8E84-426E-40dd-AFC4-6F175D3DCCD1}">
-              <a14:hiddenFill xmlns="" xmlns:a14="http://schemas.microsoft.com/office/drawing/2010/main">
+              <a14:hiddenFill xmlns:a14="http://schemas.microsoft.com/office/drawing/2010/main" xmlns="">
                 <a:solidFill>
                   <a:srgbClr val="FFFFFF"/>
                 </a:solidFill>
               </a14:hiddenFill>
             </a:ext>
             <a:ext uri="{FAA26D3D-D897-4be2-8F04-BA451C77F1D7}">
-              <ma14:placeholderFlag xmlns="" xmlns:ma14="http://schemas.microsoft.com/office/mac/drawingml/2011/main" val="1"/>
+              <ma14:placeholderFlag xmlns:ma14="http://schemas.microsoft.com/office/mac/drawingml/2011/main" xmlns="" val="1"/>
             </a:ext>
           </a:extLst>
         </p:spPr>
@@ -1154,14 +1380,14 @@
           <a:noFill/>
           <a:extLst>
             <a:ext uri="{909E8E84-426E-40dd-AFC4-6F175D3DCCD1}">
-              <a14:hiddenFill xmlns="" xmlns:a14="http://schemas.microsoft.com/office/drawing/2010/main">
+              <a14:hiddenFill xmlns:a14="http://schemas.microsoft.com/office/drawing/2010/main" xmlns="">
                 <a:solidFill>
                   <a:srgbClr val="FFFFFF"/>
                 </a:solidFill>
               </a14:hiddenFill>
             </a:ext>
             <a:ext uri="{91240B29-F687-4f45-9708-019B960494DF}">
-              <a14:hiddenLine xmlns="" xmlns:a14="http://schemas.microsoft.com/office/drawing/2010/main" w="9525">
+              <a14:hiddenLine xmlns:a14="http://schemas.microsoft.com/office/drawing/2010/main" xmlns="" w="9525">
                 <a:solidFill>
                   <a:srgbClr val="000000"/>
                 </a:solidFill>
@@ -1241,14 +1467,14 @@
           </a:ln>
           <a:extLst>
             <a:ext uri="{909E8E84-426E-40dd-AFC4-6F175D3DCCD1}">
-              <a14:hiddenFill xmlns="" xmlns:a14="http://schemas.microsoft.com/office/drawing/2010/main">
+              <a14:hiddenFill xmlns:a14="http://schemas.microsoft.com/office/drawing/2010/main" xmlns="">
                 <a:solidFill>
                   <a:srgbClr val="FFFFFF"/>
                 </a:solidFill>
               </a14:hiddenFill>
             </a:ext>
             <a:ext uri="{FAA26D3D-D897-4be2-8F04-BA451C77F1D7}">
-              <ma14:placeholderFlag xmlns="" xmlns:ma14="http://schemas.microsoft.com/office/mac/drawingml/2011/main" val="1"/>
+              <ma14:placeholderFlag xmlns:ma14="http://schemas.microsoft.com/office/mac/drawingml/2011/main" xmlns="" val="1"/>
             </a:ext>
           </a:extLst>
         </p:spPr>
@@ -1267,14 +1493,14 @@
           <a:noFill/>
           <a:extLst>
             <a:ext uri="{909E8E84-426E-40dd-AFC4-6F175D3DCCD1}">
-              <a14:hiddenFill xmlns="" xmlns:a14="http://schemas.microsoft.com/office/drawing/2010/main">
+              <a14:hiddenFill xmlns:a14="http://schemas.microsoft.com/office/drawing/2010/main" xmlns="">
                 <a:solidFill>
                   <a:srgbClr val="FFFFFF"/>
                 </a:solidFill>
               </a14:hiddenFill>
             </a:ext>
             <a:ext uri="{91240B29-F687-4f45-9708-019B960494DF}">
-              <a14:hiddenLine xmlns="" xmlns:a14="http://schemas.microsoft.com/office/drawing/2010/main" w="9525">
+              <a14:hiddenLine xmlns:a14="http://schemas.microsoft.com/office/drawing/2010/main" xmlns="" w="9525">
                 <a:solidFill>
                   <a:srgbClr val="000000"/>
                 </a:solidFill>
@@ -1354,14 +1580,14 @@
           </a:ln>
           <a:extLst>
             <a:ext uri="{909E8E84-426E-40dd-AFC4-6F175D3DCCD1}">
-              <a14:hiddenFill xmlns="" xmlns:a14="http://schemas.microsoft.com/office/drawing/2010/main">
+              <a14:hiddenFill xmlns:a14="http://schemas.microsoft.com/office/drawing/2010/main" xmlns="">
                 <a:solidFill>
                   <a:srgbClr val="FFFFFF"/>
                 </a:solidFill>
               </a14:hiddenFill>
             </a:ext>
             <a:ext uri="{FAA26D3D-D897-4be2-8F04-BA451C77F1D7}">
-              <ma14:placeholderFlag xmlns="" xmlns:ma14="http://schemas.microsoft.com/office/mac/drawingml/2011/main" val="1"/>
+              <ma14:placeholderFlag xmlns:ma14="http://schemas.microsoft.com/office/mac/drawingml/2011/main" xmlns="" val="1"/>
             </a:ext>
           </a:extLst>
         </p:spPr>
@@ -1380,14 +1606,14 @@
           <a:noFill/>
           <a:extLst>
             <a:ext uri="{909E8E84-426E-40dd-AFC4-6F175D3DCCD1}">
-              <a14:hiddenFill xmlns="" xmlns:a14="http://schemas.microsoft.com/office/drawing/2010/main">
+              <a14:hiddenFill xmlns:a14="http://schemas.microsoft.com/office/drawing/2010/main" xmlns="">
                 <a:solidFill>
                   <a:srgbClr val="FFFFFF"/>
                 </a:solidFill>
               </a14:hiddenFill>
             </a:ext>
             <a:ext uri="{91240B29-F687-4f45-9708-019B960494DF}">
-              <a14:hiddenLine xmlns="" xmlns:a14="http://schemas.microsoft.com/office/drawing/2010/main" w="9525">
+              <a14:hiddenLine xmlns:a14="http://schemas.microsoft.com/office/drawing/2010/main" xmlns="" w="9525">
                 <a:solidFill>
                   <a:srgbClr val="000000"/>
                 </a:solidFill>
@@ -1467,14 +1693,14 @@
           </a:ln>
           <a:extLst>
             <a:ext uri="{909E8E84-426E-40dd-AFC4-6F175D3DCCD1}">
-              <a14:hiddenFill xmlns="" xmlns:a14="http://schemas.microsoft.com/office/drawing/2010/main">
+              <a14:hiddenFill xmlns:a14="http://schemas.microsoft.com/office/drawing/2010/main" xmlns="">
                 <a:solidFill>
                   <a:srgbClr val="FFFFFF"/>
                 </a:solidFill>
               </a14:hiddenFill>
             </a:ext>
             <a:ext uri="{FAA26D3D-D897-4be2-8F04-BA451C77F1D7}">
-              <ma14:placeholderFlag xmlns="" xmlns:ma14="http://schemas.microsoft.com/office/mac/drawingml/2011/main" val="1"/>
+              <ma14:placeholderFlag xmlns:ma14="http://schemas.microsoft.com/office/mac/drawingml/2011/main" xmlns="" val="1"/>
             </a:ext>
           </a:extLst>
         </p:spPr>
@@ -1493,14 +1719,14 @@
           <a:noFill/>
           <a:extLst>
             <a:ext uri="{909E8E84-426E-40dd-AFC4-6F175D3DCCD1}">
-              <a14:hiddenFill xmlns="" xmlns:a14="http://schemas.microsoft.com/office/drawing/2010/main">
+              <a14:hiddenFill xmlns:a14="http://schemas.microsoft.com/office/drawing/2010/main" xmlns="">
                 <a:solidFill>
                   <a:srgbClr val="FFFFFF"/>
                 </a:solidFill>
               </a14:hiddenFill>
             </a:ext>
             <a:ext uri="{91240B29-F687-4f45-9708-019B960494DF}">
-              <a14:hiddenLine xmlns="" xmlns:a14="http://schemas.microsoft.com/office/drawing/2010/main" w="9525">
+              <a14:hiddenLine xmlns:a14="http://schemas.microsoft.com/office/drawing/2010/main" xmlns="" w="9525">
                 <a:solidFill>
                   <a:srgbClr val="000000"/>
                 </a:solidFill>
@@ -1580,14 +1806,14 @@
           </a:ln>
           <a:extLst>
             <a:ext uri="{909E8E84-426E-40dd-AFC4-6F175D3DCCD1}">
-              <a14:hiddenFill xmlns="" xmlns:a14="http://schemas.microsoft.com/office/drawing/2010/main">
+              <a14:hiddenFill xmlns:a14="http://schemas.microsoft.com/office/drawing/2010/main" xmlns="">
                 <a:solidFill>
                   <a:srgbClr val="FFFFFF"/>
                 </a:solidFill>
               </a14:hiddenFill>
             </a:ext>
             <a:ext uri="{FAA26D3D-D897-4be2-8F04-BA451C77F1D7}">
-              <ma14:placeholderFlag xmlns="" xmlns:ma14="http://schemas.microsoft.com/office/mac/drawingml/2011/main" val="1"/>
+              <ma14:placeholderFlag xmlns:ma14="http://schemas.microsoft.com/office/mac/drawingml/2011/main" xmlns="" val="1"/>
             </a:ext>
           </a:extLst>
         </p:spPr>
@@ -1606,14 +1832,14 @@
           <a:noFill/>
           <a:extLst>
             <a:ext uri="{909E8E84-426E-40dd-AFC4-6F175D3DCCD1}">
-              <a14:hiddenFill xmlns="" xmlns:a14="http://schemas.microsoft.com/office/drawing/2010/main">
+              <a14:hiddenFill xmlns:a14="http://schemas.microsoft.com/office/drawing/2010/main" xmlns="">
                 <a:solidFill>
                   <a:srgbClr val="FFFFFF"/>
                 </a:solidFill>
               </a14:hiddenFill>
             </a:ext>
             <a:ext uri="{91240B29-F687-4f45-9708-019B960494DF}">
-              <a14:hiddenLine xmlns="" xmlns:a14="http://schemas.microsoft.com/office/drawing/2010/main" w="9525">
+              <a14:hiddenLine xmlns:a14="http://schemas.microsoft.com/office/drawing/2010/main" xmlns="" w="9525">
                 <a:solidFill>
                   <a:srgbClr val="000000"/>
                 </a:solidFill>
@@ -1693,14 +1919,14 @@
           </a:ln>
           <a:extLst>
             <a:ext uri="{909E8E84-426E-40dd-AFC4-6F175D3DCCD1}">
-              <a14:hiddenFill xmlns="" xmlns:a14="http://schemas.microsoft.com/office/drawing/2010/main">
+              <a14:hiddenFill xmlns:a14="http://schemas.microsoft.com/office/drawing/2010/main" xmlns="">
                 <a:solidFill>
                   <a:srgbClr val="FFFFFF"/>
                 </a:solidFill>
               </a14:hiddenFill>
             </a:ext>
             <a:ext uri="{FAA26D3D-D897-4be2-8F04-BA451C77F1D7}">
-              <ma14:placeholderFlag xmlns="" xmlns:ma14="http://schemas.microsoft.com/office/mac/drawingml/2011/main" val="1"/>
+              <ma14:placeholderFlag xmlns:ma14="http://schemas.microsoft.com/office/mac/drawingml/2011/main" xmlns="" val="1"/>
             </a:ext>
           </a:extLst>
         </p:spPr>
@@ -1719,14 +1945,14 @@
           <a:noFill/>
           <a:extLst>
             <a:ext uri="{909E8E84-426E-40dd-AFC4-6F175D3DCCD1}">
-              <a14:hiddenFill xmlns="" xmlns:a14="http://schemas.microsoft.com/office/drawing/2010/main">
+              <a14:hiddenFill xmlns:a14="http://schemas.microsoft.com/office/drawing/2010/main" xmlns="">
                 <a:solidFill>
                   <a:srgbClr val="FFFFFF"/>
                 </a:solidFill>
               </a14:hiddenFill>
             </a:ext>
             <a:ext uri="{91240B29-F687-4f45-9708-019B960494DF}">
-              <a14:hiddenLine xmlns="" xmlns:a14="http://schemas.microsoft.com/office/drawing/2010/main" w="9525">
+              <a14:hiddenLine xmlns:a14="http://schemas.microsoft.com/office/drawing/2010/main" xmlns="" w="9525">
                 <a:solidFill>
                   <a:srgbClr val="000000"/>
                 </a:solidFill>
@@ -1806,14 +2032,14 @@
           </a:ln>
           <a:extLst>
             <a:ext uri="{909E8E84-426E-40dd-AFC4-6F175D3DCCD1}">
-              <a14:hiddenFill xmlns="" xmlns:a14="http://schemas.microsoft.com/office/drawing/2010/main">
+              <a14:hiddenFill xmlns:a14="http://schemas.microsoft.com/office/drawing/2010/main" xmlns="">
                 <a:solidFill>
                   <a:srgbClr val="FFFFFF"/>
                 </a:solidFill>
               </a14:hiddenFill>
             </a:ext>
             <a:ext uri="{FAA26D3D-D897-4be2-8F04-BA451C77F1D7}">
-              <ma14:placeholderFlag xmlns="" xmlns:ma14="http://schemas.microsoft.com/office/mac/drawingml/2011/main" val="1"/>
+              <ma14:placeholderFlag xmlns:ma14="http://schemas.microsoft.com/office/mac/drawingml/2011/main" xmlns="" val="1"/>
             </a:ext>
           </a:extLst>
         </p:spPr>
@@ -1832,14 +2058,14 @@
           <a:noFill/>
           <a:extLst>
             <a:ext uri="{909E8E84-426E-40dd-AFC4-6F175D3DCCD1}">
-              <a14:hiddenFill xmlns="" xmlns:a14="http://schemas.microsoft.com/office/drawing/2010/main">
+              <a14:hiddenFill xmlns:a14="http://schemas.microsoft.com/office/drawing/2010/main" xmlns="">
                 <a:solidFill>
                   <a:srgbClr val="FFFFFF"/>
                 </a:solidFill>
               </a14:hiddenFill>
             </a:ext>
             <a:ext uri="{91240B29-F687-4f45-9708-019B960494DF}">
-              <a14:hiddenLine xmlns="" xmlns:a14="http://schemas.microsoft.com/office/drawing/2010/main" w="9525">
+              <a14:hiddenLine xmlns:a14="http://schemas.microsoft.com/office/drawing/2010/main" xmlns="" w="9525">
                 <a:solidFill>
                   <a:srgbClr val="000000"/>
                 </a:solidFill>
@@ -1849,7 +2075,7 @@
               </a14:hiddenLine>
             </a:ext>
             <a:ext uri="{FAA26D3D-D897-4be2-8F04-BA451C77F1D7}">
-              <ma14:placeholderFlag xmlns="" xmlns:ma14="http://schemas.microsoft.com/office/mac/drawingml/2011/main" val="1"/>
+              <ma14:placeholderFlag xmlns:ma14="http://schemas.microsoft.com/office/mac/drawingml/2011/main" xmlns="" val="1"/>
             </a:ext>
           </a:extLst>
         </p:spPr>
@@ -1886,14 +2112,14 @@
           <a:noFill/>
           <a:extLst>
             <a:ext uri="{909E8E84-426E-40dd-AFC4-6F175D3DCCD1}">
-              <a14:hiddenFill xmlns="" xmlns:a14="http://schemas.microsoft.com/office/drawing/2010/main">
+              <a14:hiddenFill xmlns:a14="http://schemas.microsoft.com/office/drawing/2010/main" xmlns="">
                 <a:solidFill>
                   <a:srgbClr val="FFFFFF"/>
                 </a:solidFill>
               </a14:hiddenFill>
             </a:ext>
             <a:ext uri="{91240B29-F687-4f45-9708-019B960494DF}">
-              <a14:hiddenLine xmlns="" xmlns:a14="http://schemas.microsoft.com/office/drawing/2010/main" w="9525">
+              <a14:hiddenLine xmlns:a14="http://schemas.microsoft.com/office/drawing/2010/main" xmlns="" w="9525">
                 <a:solidFill>
                   <a:srgbClr val="000000"/>
                 </a:solidFill>
@@ -2132,14 +2358,14 @@
           </a:ln>
           <a:extLst>
             <a:ext uri="{909E8E84-426E-40dd-AFC4-6F175D3DCCD1}">
-              <a14:hiddenFill xmlns="" xmlns:a14="http://schemas.microsoft.com/office/drawing/2010/main">
+              <a14:hiddenFill xmlns:a14="http://schemas.microsoft.com/office/drawing/2010/main" xmlns="">
                 <a:solidFill>
                   <a:srgbClr val="FFFFFF"/>
                 </a:solidFill>
               </a14:hiddenFill>
             </a:ext>
             <a:ext uri="{FAA26D3D-D897-4be2-8F04-BA451C77F1D7}">
-              <ma14:placeholderFlag xmlns="" xmlns:ma14="http://schemas.microsoft.com/office/mac/drawingml/2011/main" val="1"/>
+              <ma14:placeholderFlag xmlns:ma14="http://schemas.microsoft.com/office/mac/drawingml/2011/main" xmlns="" val="1"/>
             </a:ext>
           </a:extLst>
         </p:spPr>
@@ -2158,14 +2384,14 @@
           <a:noFill/>
           <a:extLst>
             <a:ext uri="{909E8E84-426E-40dd-AFC4-6F175D3DCCD1}">
-              <a14:hiddenFill xmlns="" xmlns:a14="http://schemas.microsoft.com/office/drawing/2010/main">
+              <a14:hiddenFill xmlns:a14="http://schemas.microsoft.com/office/drawing/2010/main" xmlns="">
                 <a:solidFill>
                   <a:srgbClr val="FFFFFF"/>
                 </a:solidFill>
               </a14:hiddenFill>
             </a:ext>
             <a:ext uri="{91240B29-F687-4f45-9708-019B960494DF}">
-              <a14:hiddenLine xmlns="" xmlns:a14="http://schemas.microsoft.com/office/drawing/2010/main" w="9525">
+              <a14:hiddenLine xmlns:a14="http://schemas.microsoft.com/office/drawing/2010/main" xmlns="" w="9525">
                 <a:solidFill>
                   <a:srgbClr val="000000"/>
                 </a:solidFill>
@@ -2175,7 +2401,7 @@
               </a14:hiddenLine>
             </a:ext>
             <a:ext uri="{FAA26D3D-D897-4be2-8F04-BA451C77F1D7}">
-              <ma14:placeholderFlag xmlns="" xmlns:ma14="http://schemas.microsoft.com/office/mac/drawingml/2011/main" val="1"/>
+              <ma14:placeholderFlag xmlns:ma14="http://schemas.microsoft.com/office/mac/drawingml/2011/main" xmlns="" val="1"/>
             </a:ext>
           </a:extLst>
         </p:spPr>
@@ -2212,14 +2438,14 @@
           <a:noFill/>
           <a:extLst>
             <a:ext uri="{909E8E84-426E-40dd-AFC4-6F175D3DCCD1}">
-              <a14:hiddenFill xmlns="" xmlns:a14="http://schemas.microsoft.com/office/drawing/2010/main">
+              <a14:hiddenFill xmlns:a14="http://schemas.microsoft.com/office/drawing/2010/main" xmlns="">
                 <a:solidFill>
                   <a:srgbClr val="FFFFFF"/>
                 </a:solidFill>
               </a14:hiddenFill>
             </a:ext>
             <a:ext uri="{91240B29-F687-4f45-9708-019B960494DF}">
-              <a14:hiddenLine xmlns="" xmlns:a14="http://schemas.microsoft.com/office/drawing/2010/main" w="9525">
+              <a14:hiddenLine xmlns:a14="http://schemas.microsoft.com/office/drawing/2010/main" xmlns="" w="9525">
                 <a:solidFill>
                   <a:srgbClr val="000000"/>
                 </a:solidFill>
@@ -2414,14 +2640,14 @@
           <a:noFill/>
           <a:extLst>
             <a:ext uri="{909E8E84-426E-40dd-AFC4-6F175D3DCCD1}">
-              <a14:hiddenFill xmlns="" xmlns:a14="http://schemas.microsoft.com/office/drawing/2010/main">
+              <a14:hiddenFill xmlns:a14="http://schemas.microsoft.com/office/drawing/2010/main" xmlns="">
                 <a:solidFill>
                   <a:srgbClr val="FFFFFF"/>
                 </a:solidFill>
               </a14:hiddenFill>
             </a:ext>
             <a:ext uri="{91240B29-F687-4f45-9708-019B960494DF}">
-              <a14:hiddenLine xmlns="" xmlns:a14="http://schemas.microsoft.com/office/drawing/2010/main" w="9525">
+              <a14:hiddenLine xmlns:a14="http://schemas.microsoft.com/office/drawing/2010/main" xmlns="" w="9525">
                 <a:solidFill>
                   <a:srgbClr val="000000"/>
                 </a:solidFill>
@@ -2622,14 +2848,14 @@
           </a:ln>
           <a:extLst>
             <a:ext uri="{909E8E84-426E-40dd-AFC4-6F175D3DCCD1}">
-              <a14:hiddenFill xmlns="" xmlns:a14="http://schemas.microsoft.com/office/drawing/2010/main">
+              <a14:hiddenFill xmlns:a14="http://schemas.microsoft.com/office/drawing/2010/main" xmlns="">
                 <a:solidFill>
                   <a:srgbClr val="FFFFFF"/>
                 </a:solidFill>
               </a14:hiddenFill>
             </a:ext>
             <a:ext uri="{FAA26D3D-D897-4be2-8F04-BA451C77F1D7}">
-              <ma14:placeholderFlag xmlns="" xmlns:ma14="http://schemas.microsoft.com/office/mac/drawingml/2011/main" val="1"/>
+              <ma14:placeholderFlag xmlns:ma14="http://schemas.microsoft.com/office/mac/drawingml/2011/main" xmlns="" val="1"/>
             </a:ext>
           </a:extLst>
         </p:spPr>
@@ -2648,14 +2874,14 @@
           <a:noFill/>
           <a:extLst>
             <a:ext uri="{909E8E84-426E-40dd-AFC4-6F175D3DCCD1}">
-              <a14:hiddenFill xmlns="" xmlns:a14="http://schemas.microsoft.com/office/drawing/2010/main">
+              <a14:hiddenFill xmlns:a14="http://schemas.microsoft.com/office/drawing/2010/main" xmlns="">
                 <a:solidFill>
                   <a:srgbClr val="FFFFFF"/>
                 </a:solidFill>
               </a14:hiddenFill>
             </a:ext>
             <a:ext uri="{91240B29-F687-4f45-9708-019B960494DF}">
-              <a14:hiddenLine xmlns="" xmlns:a14="http://schemas.microsoft.com/office/drawing/2010/main" w="9525">
+              <a14:hiddenLine xmlns:a14="http://schemas.microsoft.com/office/drawing/2010/main" xmlns="" w="9525">
                 <a:solidFill>
                   <a:srgbClr val="000000"/>
                 </a:solidFill>
@@ -2665,7 +2891,7 @@
               </a14:hiddenLine>
             </a:ext>
             <a:ext uri="{FAA26D3D-D897-4be2-8F04-BA451C77F1D7}">
-              <ma14:placeholderFlag xmlns="" xmlns:ma14="http://schemas.microsoft.com/office/mac/drawingml/2011/main" val="1"/>
+              <ma14:placeholderFlag xmlns:ma14="http://schemas.microsoft.com/office/mac/drawingml/2011/main" xmlns="" val="1"/>
             </a:ext>
           </a:extLst>
         </p:spPr>
@@ -2702,14 +2928,14 @@
           <a:noFill/>
           <a:extLst>
             <a:ext uri="{909E8E84-426E-40dd-AFC4-6F175D3DCCD1}">
-              <a14:hiddenFill xmlns="" xmlns:a14="http://schemas.microsoft.com/office/drawing/2010/main">
+              <a14:hiddenFill xmlns:a14="http://schemas.microsoft.com/office/drawing/2010/main" xmlns="">
                 <a:solidFill>
                   <a:srgbClr val="FFFFFF"/>
                 </a:solidFill>
               </a14:hiddenFill>
             </a:ext>
             <a:ext uri="{91240B29-F687-4f45-9708-019B960494DF}">
-              <a14:hiddenLine xmlns="" xmlns:a14="http://schemas.microsoft.com/office/drawing/2010/main" w="9525">
+              <a14:hiddenLine xmlns:a14="http://schemas.microsoft.com/office/drawing/2010/main" xmlns="" w="9525">
                 <a:solidFill>
                   <a:srgbClr val="000000"/>
                 </a:solidFill>
@@ -2904,14 +3130,14 @@
           <a:noFill/>
           <a:extLst>
             <a:ext uri="{909E8E84-426E-40dd-AFC4-6F175D3DCCD1}">
-              <a14:hiddenFill xmlns="" xmlns:a14="http://schemas.microsoft.com/office/drawing/2010/main">
+              <a14:hiddenFill xmlns:a14="http://schemas.microsoft.com/office/drawing/2010/main" xmlns="">
                 <a:solidFill>
                   <a:srgbClr val="FFFFFF"/>
                 </a:solidFill>
               </a14:hiddenFill>
             </a:ext>
             <a:ext uri="{91240B29-F687-4f45-9708-019B960494DF}">
-              <a14:hiddenLine xmlns="" xmlns:a14="http://schemas.microsoft.com/office/drawing/2010/main" w="9525">
+              <a14:hiddenLine xmlns:a14="http://schemas.microsoft.com/office/drawing/2010/main" xmlns="" w="9525">
                 <a:solidFill>
                   <a:srgbClr val="000000"/>
                 </a:solidFill>
@@ -3112,14 +3338,14 @@
           </a:ln>
           <a:extLst>
             <a:ext uri="{909E8E84-426E-40dd-AFC4-6F175D3DCCD1}">
-              <a14:hiddenFill xmlns="" xmlns:a14="http://schemas.microsoft.com/office/drawing/2010/main">
+              <a14:hiddenFill xmlns:a14="http://schemas.microsoft.com/office/drawing/2010/main" xmlns="">
                 <a:solidFill>
                   <a:srgbClr val="FFFFFF"/>
                 </a:solidFill>
               </a14:hiddenFill>
             </a:ext>
             <a:ext uri="{FAA26D3D-D897-4be2-8F04-BA451C77F1D7}">
-              <ma14:placeholderFlag xmlns="" xmlns:ma14="http://schemas.microsoft.com/office/mac/drawingml/2011/main" val="1"/>
+              <ma14:placeholderFlag xmlns:ma14="http://schemas.microsoft.com/office/mac/drawingml/2011/main" xmlns="" val="1"/>
             </a:ext>
           </a:extLst>
         </p:spPr>
@@ -3138,14 +3364,14 @@
           <a:noFill/>
           <a:extLst>
             <a:ext uri="{909E8E84-426E-40dd-AFC4-6F175D3DCCD1}">
-              <a14:hiddenFill xmlns="" xmlns:a14="http://schemas.microsoft.com/office/drawing/2010/main">
+              <a14:hiddenFill xmlns:a14="http://schemas.microsoft.com/office/drawing/2010/main" xmlns="">
                 <a:solidFill>
                   <a:srgbClr val="FFFFFF"/>
                 </a:solidFill>
               </a14:hiddenFill>
             </a:ext>
             <a:ext uri="{91240B29-F687-4f45-9708-019B960494DF}">
-              <a14:hiddenLine xmlns="" xmlns:a14="http://schemas.microsoft.com/office/drawing/2010/main" w="9525">
+              <a14:hiddenLine xmlns:a14="http://schemas.microsoft.com/office/drawing/2010/main" xmlns="" w="9525">
                 <a:solidFill>
                   <a:srgbClr val="000000"/>
                 </a:solidFill>
@@ -3225,14 +3451,14 @@
           </a:ln>
           <a:extLst>
             <a:ext uri="{909E8E84-426E-40dd-AFC4-6F175D3DCCD1}">
-              <a14:hiddenFill xmlns="" xmlns:a14="http://schemas.microsoft.com/office/drawing/2010/main">
+              <a14:hiddenFill xmlns:a14="http://schemas.microsoft.com/office/drawing/2010/main" xmlns="">
                 <a:solidFill>
                   <a:srgbClr val="FFFFFF"/>
                 </a:solidFill>
               </a14:hiddenFill>
             </a:ext>
             <a:ext uri="{FAA26D3D-D897-4be2-8F04-BA451C77F1D7}">
-              <ma14:placeholderFlag xmlns="" xmlns:ma14="http://schemas.microsoft.com/office/mac/drawingml/2011/main" val="1"/>
+              <ma14:placeholderFlag xmlns:ma14="http://schemas.microsoft.com/office/mac/drawingml/2011/main" xmlns="" val="1"/>
             </a:ext>
           </a:extLst>
         </p:spPr>
@@ -3251,14 +3477,14 @@
           <a:noFill/>
           <a:extLst>
             <a:ext uri="{909E8E84-426E-40dd-AFC4-6F175D3DCCD1}">
-              <a14:hiddenFill xmlns="" xmlns:a14="http://schemas.microsoft.com/office/drawing/2010/main">
+              <a14:hiddenFill xmlns:a14="http://schemas.microsoft.com/office/drawing/2010/main" xmlns="">
                 <a:solidFill>
                   <a:srgbClr val="FFFFFF"/>
                 </a:solidFill>
               </a14:hiddenFill>
             </a:ext>
             <a:ext uri="{91240B29-F687-4f45-9708-019B960494DF}">
-              <a14:hiddenLine xmlns="" xmlns:a14="http://schemas.microsoft.com/office/drawing/2010/main" w="9525">
+              <a14:hiddenLine xmlns:a14="http://schemas.microsoft.com/office/drawing/2010/main" xmlns="" w="9525">
                 <a:solidFill>
                   <a:srgbClr val="000000"/>
                 </a:solidFill>
@@ -3268,7 +3494,7 @@
               </a14:hiddenLine>
             </a:ext>
             <a:ext uri="{FAA26D3D-D897-4be2-8F04-BA451C77F1D7}">
-              <ma14:placeholderFlag xmlns="" xmlns:ma14="http://schemas.microsoft.com/office/mac/drawingml/2011/main" val="1"/>
+              <ma14:placeholderFlag xmlns:ma14="http://schemas.microsoft.com/office/mac/drawingml/2011/main" xmlns="" val="1"/>
             </a:ext>
           </a:extLst>
         </p:spPr>
@@ -3305,14 +3531,14 @@
           <a:noFill/>
           <a:extLst>
             <a:ext uri="{909E8E84-426E-40dd-AFC4-6F175D3DCCD1}">
-              <a14:hiddenFill xmlns="" xmlns:a14="http://schemas.microsoft.com/office/drawing/2010/main">
+              <a14:hiddenFill xmlns:a14="http://schemas.microsoft.com/office/drawing/2010/main" xmlns="">
                 <a:solidFill>
                   <a:srgbClr val="FFFFFF"/>
                 </a:solidFill>
               </a14:hiddenFill>
             </a:ext>
             <a:ext uri="{91240B29-F687-4f45-9708-019B960494DF}">
-              <a14:hiddenLine xmlns="" xmlns:a14="http://schemas.microsoft.com/office/drawing/2010/main" w="9525">
+              <a14:hiddenLine xmlns:a14="http://schemas.microsoft.com/office/drawing/2010/main" xmlns="" w="9525">
                 <a:solidFill>
                   <a:srgbClr val="000000"/>
                 </a:solidFill>
@@ -3507,14 +3733,14 @@
           <a:noFill/>
           <a:extLst>
             <a:ext uri="{909E8E84-426E-40dd-AFC4-6F175D3DCCD1}">
-              <a14:hiddenFill xmlns="" xmlns:a14="http://schemas.microsoft.com/office/drawing/2010/main">
+              <a14:hiddenFill xmlns:a14="http://schemas.microsoft.com/office/drawing/2010/main" xmlns="">
                 <a:solidFill>
                   <a:srgbClr val="FFFFFF"/>
                 </a:solidFill>
               </a14:hiddenFill>
             </a:ext>
             <a:ext uri="{91240B29-F687-4f45-9708-019B960494DF}">
-              <a14:hiddenLine xmlns="" xmlns:a14="http://schemas.microsoft.com/office/drawing/2010/main" w="9525">
+              <a14:hiddenLine xmlns:a14="http://schemas.microsoft.com/office/drawing/2010/main" xmlns="" w="9525">
                 <a:solidFill>
                   <a:srgbClr val="000000"/>
                 </a:solidFill>
@@ -3715,14 +3941,14 @@
           </a:ln>
           <a:extLst>
             <a:ext uri="{909E8E84-426E-40dd-AFC4-6F175D3DCCD1}">
-              <a14:hiddenFill xmlns="" xmlns:a14="http://schemas.microsoft.com/office/drawing/2010/main">
+              <a14:hiddenFill xmlns:a14="http://schemas.microsoft.com/office/drawing/2010/main" xmlns="">
                 <a:solidFill>
                   <a:srgbClr val="FFFFFF"/>
                 </a:solidFill>
               </a14:hiddenFill>
             </a:ext>
             <a:ext uri="{FAA26D3D-D897-4be2-8F04-BA451C77F1D7}">
-              <ma14:placeholderFlag xmlns="" xmlns:ma14="http://schemas.microsoft.com/office/mac/drawingml/2011/main" val="1"/>
+              <ma14:placeholderFlag xmlns:ma14="http://schemas.microsoft.com/office/mac/drawingml/2011/main" xmlns="" val="1"/>
             </a:ext>
           </a:extLst>
         </p:spPr>
@@ -3741,14 +3967,14 @@
           <a:noFill/>
           <a:extLst>
             <a:ext uri="{909E8E84-426E-40dd-AFC4-6F175D3DCCD1}">
-              <a14:hiddenFill xmlns="" xmlns:a14="http://schemas.microsoft.com/office/drawing/2010/main">
+              <a14:hiddenFill xmlns:a14="http://schemas.microsoft.com/office/drawing/2010/main" xmlns="">
                 <a:solidFill>
                   <a:srgbClr val="FFFFFF"/>
                 </a:solidFill>
               </a14:hiddenFill>
             </a:ext>
             <a:ext uri="{91240B29-F687-4f45-9708-019B960494DF}">
-              <a14:hiddenLine xmlns="" xmlns:a14="http://schemas.microsoft.com/office/drawing/2010/main" w="9525">
+              <a14:hiddenLine xmlns:a14="http://schemas.microsoft.com/office/drawing/2010/main" xmlns="" w="9525">
                 <a:solidFill>
                   <a:srgbClr val="000000"/>
                 </a:solidFill>
@@ -3758,7 +3984,7 @@
               </a14:hiddenLine>
             </a:ext>
             <a:ext uri="{FAA26D3D-D897-4be2-8F04-BA451C77F1D7}">
-              <ma14:placeholderFlag xmlns="" xmlns:ma14="http://schemas.microsoft.com/office/mac/drawingml/2011/main" val="1"/>
+              <ma14:placeholderFlag xmlns:ma14="http://schemas.microsoft.com/office/mac/drawingml/2011/main" xmlns="" val="1"/>
             </a:ext>
           </a:extLst>
         </p:spPr>
@@ -3795,14 +4021,14 @@
           <a:noFill/>
           <a:extLst>
             <a:ext uri="{909E8E84-426E-40dd-AFC4-6F175D3DCCD1}">
-              <a14:hiddenFill xmlns="" xmlns:a14="http://schemas.microsoft.com/office/drawing/2010/main">
+              <a14:hiddenFill xmlns:a14="http://schemas.microsoft.com/office/drawing/2010/main" xmlns="">
                 <a:solidFill>
                   <a:srgbClr val="FFFFFF"/>
                 </a:solidFill>
               </a14:hiddenFill>
             </a:ext>
             <a:ext uri="{91240B29-F687-4f45-9708-019B960494DF}">
-              <a14:hiddenLine xmlns="" xmlns:a14="http://schemas.microsoft.com/office/drawing/2010/main" w="9525">
+              <a14:hiddenLine xmlns:a14="http://schemas.microsoft.com/office/drawing/2010/main" xmlns="" w="9525">
                 <a:solidFill>
                   <a:srgbClr val="000000"/>
                 </a:solidFill>
@@ -3997,14 +4223,14 @@
           <a:noFill/>
           <a:extLst>
             <a:ext uri="{909E8E84-426E-40dd-AFC4-6F175D3DCCD1}">
-              <a14:hiddenFill xmlns="" xmlns:a14="http://schemas.microsoft.com/office/drawing/2010/main">
+              <a14:hiddenFill xmlns:a14="http://schemas.microsoft.com/office/drawing/2010/main" xmlns="">
                 <a:solidFill>
                   <a:srgbClr val="FFFFFF"/>
                 </a:solidFill>
               </a14:hiddenFill>
             </a:ext>
             <a:ext uri="{91240B29-F687-4f45-9708-019B960494DF}">
-              <a14:hiddenLine xmlns="" xmlns:a14="http://schemas.microsoft.com/office/drawing/2010/main" w="9525">
+              <a14:hiddenLine xmlns:a14="http://schemas.microsoft.com/office/drawing/2010/main" xmlns="" w="9525">
                 <a:solidFill>
                   <a:srgbClr val="000000"/>
                 </a:solidFill>
@@ -4205,14 +4431,14 @@
           </a:ln>
           <a:extLst>
             <a:ext uri="{909E8E84-426E-40dd-AFC4-6F175D3DCCD1}">
-              <a14:hiddenFill xmlns="" xmlns:a14="http://schemas.microsoft.com/office/drawing/2010/main">
+              <a14:hiddenFill xmlns:a14="http://schemas.microsoft.com/office/drawing/2010/main" xmlns="">
                 <a:solidFill>
                   <a:srgbClr val="FFFFFF"/>
                 </a:solidFill>
               </a14:hiddenFill>
             </a:ext>
             <a:ext uri="{FAA26D3D-D897-4be2-8F04-BA451C77F1D7}">
-              <ma14:placeholderFlag xmlns="" xmlns:ma14="http://schemas.microsoft.com/office/mac/drawingml/2011/main" val="1"/>
+              <ma14:placeholderFlag xmlns:ma14="http://schemas.microsoft.com/office/mac/drawingml/2011/main" xmlns="" val="1"/>
             </a:ext>
           </a:extLst>
         </p:spPr>
@@ -4231,14 +4457,14 @@
           <a:noFill/>
           <a:extLst>
             <a:ext uri="{909E8E84-426E-40dd-AFC4-6F175D3DCCD1}">
-              <a14:hiddenFill xmlns="" xmlns:a14="http://schemas.microsoft.com/office/drawing/2010/main">
+              <a14:hiddenFill xmlns:a14="http://schemas.microsoft.com/office/drawing/2010/main" xmlns="">
                 <a:solidFill>
                   <a:srgbClr val="FFFFFF"/>
                 </a:solidFill>
               </a14:hiddenFill>
             </a:ext>
             <a:ext uri="{91240B29-F687-4f45-9708-019B960494DF}">
-              <a14:hiddenLine xmlns="" xmlns:a14="http://schemas.microsoft.com/office/drawing/2010/main" w="9525">
+              <a14:hiddenLine xmlns:a14="http://schemas.microsoft.com/office/drawing/2010/main" xmlns="" w="9525">
                 <a:solidFill>
                   <a:srgbClr val="000000"/>
                 </a:solidFill>
@@ -4248,7 +4474,7 @@
               </a14:hiddenLine>
             </a:ext>
             <a:ext uri="{FAA26D3D-D897-4be2-8F04-BA451C77F1D7}">
-              <ma14:placeholderFlag xmlns="" xmlns:ma14="http://schemas.microsoft.com/office/mac/drawingml/2011/main" val="1"/>
+              <ma14:placeholderFlag xmlns:ma14="http://schemas.microsoft.com/office/mac/drawingml/2011/main" xmlns="" val="1"/>
             </a:ext>
           </a:extLst>
         </p:spPr>
@@ -4285,14 +4511,14 @@
           <a:noFill/>
           <a:extLst>
             <a:ext uri="{909E8E84-426E-40dd-AFC4-6F175D3DCCD1}">
-              <a14:hiddenFill xmlns="" xmlns:a14="http://schemas.microsoft.com/office/drawing/2010/main">
+              <a14:hiddenFill xmlns:a14="http://schemas.microsoft.com/office/drawing/2010/main" xmlns="">
                 <a:solidFill>
                   <a:srgbClr val="FFFFFF"/>
                 </a:solidFill>
               </a14:hiddenFill>
             </a:ext>
             <a:ext uri="{91240B29-F687-4f45-9708-019B960494DF}">
-              <a14:hiddenLine xmlns="" xmlns:a14="http://schemas.microsoft.com/office/drawing/2010/main" w="9525">
+              <a14:hiddenLine xmlns:a14="http://schemas.microsoft.com/office/drawing/2010/main" xmlns="" w="9525">
                 <a:solidFill>
                   <a:srgbClr val="000000"/>
                 </a:solidFill>
@@ -4487,14 +4713,14 @@
           <a:noFill/>
           <a:extLst>
             <a:ext uri="{909E8E84-426E-40dd-AFC4-6F175D3DCCD1}">
-              <a14:hiddenFill xmlns="" xmlns:a14="http://schemas.microsoft.com/office/drawing/2010/main">
+              <a14:hiddenFill xmlns:a14="http://schemas.microsoft.com/office/drawing/2010/main" xmlns="">
                 <a:solidFill>
                   <a:srgbClr val="FFFFFF"/>
                 </a:solidFill>
               </a14:hiddenFill>
             </a:ext>
             <a:ext uri="{91240B29-F687-4f45-9708-019B960494DF}">
-              <a14:hiddenLine xmlns="" xmlns:a14="http://schemas.microsoft.com/office/drawing/2010/main" w="9525">
+              <a14:hiddenLine xmlns:a14="http://schemas.microsoft.com/office/drawing/2010/main" xmlns="" w="9525">
                 <a:solidFill>
                   <a:srgbClr val="000000"/>
                 </a:solidFill>
@@ -4695,14 +4921,14 @@
           </a:ln>
           <a:extLst>
             <a:ext uri="{909E8E84-426E-40dd-AFC4-6F175D3DCCD1}">
-              <a14:hiddenFill xmlns="" xmlns:a14="http://schemas.microsoft.com/office/drawing/2010/main">
+              <a14:hiddenFill xmlns:a14="http://schemas.microsoft.com/office/drawing/2010/main" xmlns="">
                 <a:solidFill>
                   <a:srgbClr val="FFFFFF"/>
                 </a:solidFill>
               </a14:hiddenFill>
             </a:ext>
             <a:ext uri="{FAA26D3D-D897-4be2-8F04-BA451C77F1D7}">
-              <ma14:placeholderFlag xmlns="" xmlns:ma14="http://schemas.microsoft.com/office/mac/drawingml/2011/main" val="1"/>
+              <ma14:placeholderFlag xmlns:ma14="http://schemas.microsoft.com/office/mac/drawingml/2011/main" xmlns="" val="1"/>
             </a:ext>
           </a:extLst>
         </p:spPr>
@@ -4721,14 +4947,14 @@
           <a:noFill/>
           <a:extLst>
             <a:ext uri="{909E8E84-426E-40dd-AFC4-6F175D3DCCD1}">
-              <a14:hiddenFill xmlns="" xmlns:a14="http://schemas.microsoft.com/office/drawing/2010/main">
+              <a14:hiddenFill xmlns:a14="http://schemas.microsoft.com/office/drawing/2010/main" xmlns="">
                 <a:solidFill>
                   <a:srgbClr val="FFFFFF"/>
                 </a:solidFill>
               </a14:hiddenFill>
             </a:ext>
             <a:ext uri="{91240B29-F687-4f45-9708-019B960494DF}">
-              <a14:hiddenLine xmlns="" xmlns:a14="http://schemas.microsoft.com/office/drawing/2010/main" w="9525">
+              <a14:hiddenLine xmlns:a14="http://schemas.microsoft.com/office/drawing/2010/main" xmlns="" w="9525">
                 <a:solidFill>
                   <a:srgbClr val="000000"/>
                 </a:solidFill>
@@ -4738,7 +4964,7 @@
               </a14:hiddenLine>
             </a:ext>
             <a:ext uri="{FAA26D3D-D897-4be2-8F04-BA451C77F1D7}">
-              <ma14:placeholderFlag xmlns="" xmlns:ma14="http://schemas.microsoft.com/office/mac/drawingml/2011/main" val="1"/>
+              <ma14:placeholderFlag xmlns:ma14="http://schemas.microsoft.com/office/mac/drawingml/2011/main" xmlns="" val="1"/>
             </a:ext>
           </a:extLst>
         </p:spPr>
@@ -4775,14 +5001,14 @@
           <a:noFill/>
           <a:extLst>
             <a:ext uri="{909E8E84-426E-40dd-AFC4-6F175D3DCCD1}">
-              <a14:hiddenFill xmlns="" xmlns:a14="http://schemas.microsoft.com/office/drawing/2010/main">
+              <a14:hiddenFill xmlns:a14="http://schemas.microsoft.com/office/drawing/2010/main" xmlns="">
                 <a:solidFill>
                   <a:srgbClr val="FFFFFF"/>
                 </a:solidFill>
               </a14:hiddenFill>
             </a:ext>
             <a:ext uri="{91240B29-F687-4f45-9708-019B960494DF}">
-              <a14:hiddenLine xmlns="" xmlns:a14="http://schemas.microsoft.com/office/drawing/2010/main" w="9525">
+              <a14:hiddenLine xmlns:a14="http://schemas.microsoft.com/office/drawing/2010/main" xmlns="" w="9525">
                 <a:solidFill>
                   <a:srgbClr val="000000"/>
                 </a:solidFill>
@@ -4977,14 +5203,14 @@
           <a:noFill/>
           <a:extLst>
             <a:ext uri="{909E8E84-426E-40dd-AFC4-6F175D3DCCD1}">
-              <a14:hiddenFill xmlns="" xmlns:a14="http://schemas.microsoft.com/office/drawing/2010/main">
+              <a14:hiddenFill xmlns:a14="http://schemas.microsoft.com/office/drawing/2010/main" xmlns="">
                 <a:solidFill>
                   <a:srgbClr val="FFFFFF"/>
                 </a:solidFill>
               </a14:hiddenFill>
             </a:ext>
             <a:ext uri="{91240B29-F687-4f45-9708-019B960494DF}">
-              <a14:hiddenLine xmlns="" xmlns:a14="http://schemas.microsoft.com/office/drawing/2010/main" w="9525">
+              <a14:hiddenLine xmlns:a14="http://schemas.microsoft.com/office/drawing/2010/main" xmlns="" w="9525">
                 <a:solidFill>
                   <a:srgbClr val="000000"/>
                 </a:solidFill>
@@ -5185,14 +5411,14 @@
           </a:ln>
           <a:extLst>
             <a:ext uri="{909E8E84-426E-40dd-AFC4-6F175D3DCCD1}">
-              <a14:hiddenFill xmlns="" xmlns:a14="http://schemas.microsoft.com/office/drawing/2010/main">
+              <a14:hiddenFill xmlns:a14="http://schemas.microsoft.com/office/drawing/2010/main" xmlns="">
                 <a:solidFill>
                   <a:srgbClr val="FFFFFF"/>
                 </a:solidFill>
               </a14:hiddenFill>
             </a:ext>
             <a:ext uri="{FAA26D3D-D897-4be2-8F04-BA451C77F1D7}">
-              <ma14:placeholderFlag xmlns="" xmlns:ma14="http://schemas.microsoft.com/office/mac/drawingml/2011/main" val="1"/>
+              <ma14:placeholderFlag xmlns:ma14="http://schemas.microsoft.com/office/mac/drawingml/2011/main" xmlns="" val="1"/>
             </a:ext>
           </a:extLst>
         </p:spPr>
@@ -5211,14 +5437,14 @@
           <a:noFill/>
           <a:extLst>
             <a:ext uri="{909E8E84-426E-40dd-AFC4-6F175D3DCCD1}">
-              <a14:hiddenFill xmlns="" xmlns:a14="http://schemas.microsoft.com/office/drawing/2010/main">
+              <a14:hiddenFill xmlns:a14="http://schemas.microsoft.com/office/drawing/2010/main" xmlns="">
                 <a:solidFill>
                   <a:srgbClr val="FFFFFF"/>
                 </a:solidFill>
               </a14:hiddenFill>
             </a:ext>
             <a:ext uri="{91240B29-F687-4f45-9708-019B960494DF}">
-              <a14:hiddenLine xmlns="" xmlns:a14="http://schemas.microsoft.com/office/drawing/2010/main" w="9525">
+              <a14:hiddenLine xmlns:a14="http://schemas.microsoft.com/office/drawing/2010/main" xmlns="" w="9525">
                 <a:solidFill>
                   <a:srgbClr val="000000"/>
                 </a:solidFill>
@@ -5303,14 +5529,14 @@
           </a:ln>
           <a:extLst>
             <a:ext uri="{909E8E84-426E-40dd-AFC4-6F175D3DCCD1}">
-              <a14:hiddenFill xmlns="" xmlns:a14="http://schemas.microsoft.com/office/drawing/2010/main">
+              <a14:hiddenFill xmlns:a14="http://schemas.microsoft.com/office/drawing/2010/main" xmlns="">
                 <a:solidFill>
                   <a:srgbClr val="FFFFFF"/>
                 </a:solidFill>
               </a14:hiddenFill>
             </a:ext>
             <a:ext uri="{FAA26D3D-D897-4be2-8F04-BA451C77F1D7}">
-              <ma14:placeholderFlag xmlns="" xmlns:ma14="http://schemas.microsoft.com/office/mac/drawingml/2011/main" val="1"/>
+              <ma14:placeholderFlag xmlns:ma14="http://schemas.microsoft.com/office/mac/drawingml/2011/main" xmlns="" val="1"/>
             </a:ext>
           </a:extLst>
         </p:spPr>
@@ -5329,14 +5555,14 @@
           <a:noFill/>
           <a:extLst>
             <a:ext uri="{909E8E84-426E-40dd-AFC4-6F175D3DCCD1}">
-              <a14:hiddenFill xmlns="" xmlns:a14="http://schemas.microsoft.com/office/drawing/2010/main">
+              <a14:hiddenFill xmlns:a14="http://schemas.microsoft.com/office/drawing/2010/main" xmlns="">
                 <a:solidFill>
                   <a:srgbClr val="FFFFFF"/>
                 </a:solidFill>
               </a14:hiddenFill>
             </a:ext>
             <a:ext uri="{91240B29-F687-4f45-9708-019B960494DF}">
-              <a14:hiddenLine xmlns="" xmlns:a14="http://schemas.microsoft.com/office/drawing/2010/main" w="9525">
+              <a14:hiddenLine xmlns:a14="http://schemas.microsoft.com/office/drawing/2010/main" xmlns="" w="9525">
                 <a:solidFill>
                   <a:srgbClr val="000000"/>
                 </a:solidFill>
@@ -5421,14 +5647,14 @@
           </a:ln>
           <a:extLst>
             <a:ext uri="{909E8E84-426E-40dd-AFC4-6F175D3DCCD1}">
-              <a14:hiddenFill xmlns="" xmlns:a14="http://schemas.microsoft.com/office/drawing/2010/main">
+              <a14:hiddenFill xmlns:a14="http://schemas.microsoft.com/office/drawing/2010/main" xmlns="">
                 <a:solidFill>
                   <a:srgbClr val="FFFFFF"/>
                 </a:solidFill>
               </a14:hiddenFill>
             </a:ext>
             <a:ext uri="{FAA26D3D-D897-4be2-8F04-BA451C77F1D7}">
-              <ma14:placeholderFlag xmlns="" xmlns:ma14="http://schemas.microsoft.com/office/mac/drawingml/2011/main" val="1"/>
+              <ma14:placeholderFlag xmlns:ma14="http://schemas.microsoft.com/office/mac/drawingml/2011/main" xmlns="" val="1"/>
             </a:ext>
           </a:extLst>
         </p:spPr>
@@ -5447,14 +5673,14 @@
           <a:noFill/>
           <a:extLst>
             <a:ext uri="{909E8E84-426E-40dd-AFC4-6F175D3DCCD1}">
-              <a14:hiddenFill xmlns="" xmlns:a14="http://schemas.microsoft.com/office/drawing/2010/main">
+              <a14:hiddenFill xmlns:a14="http://schemas.microsoft.com/office/drawing/2010/main" xmlns="">
                 <a:solidFill>
                   <a:srgbClr val="FFFFFF"/>
                 </a:solidFill>
               </a14:hiddenFill>
             </a:ext>
             <a:ext uri="{91240B29-F687-4f45-9708-019B960494DF}">
-              <a14:hiddenLine xmlns="" xmlns:a14="http://schemas.microsoft.com/office/drawing/2010/main" w="9525">
+              <a14:hiddenLine xmlns:a14="http://schemas.microsoft.com/office/drawing/2010/main" xmlns="" w="9525">
                 <a:solidFill>
                   <a:srgbClr val="000000"/>
                 </a:solidFill>
@@ -5534,14 +5760,14 @@
           </a:ln>
           <a:extLst>
             <a:ext uri="{909E8E84-426E-40dd-AFC4-6F175D3DCCD1}">
-              <a14:hiddenFill xmlns="" xmlns:a14="http://schemas.microsoft.com/office/drawing/2010/main">
+              <a14:hiddenFill xmlns:a14="http://schemas.microsoft.com/office/drawing/2010/main" xmlns="">
                 <a:solidFill>
                   <a:srgbClr val="FFFFFF"/>
                 </a:solidFill>
               </a14:hiddenFill>
             </a:ext>
             <a:ext uri="{FAA26D3D-D897-4be2-8F04-BA451C77F1D7}">
-              <ma14:placeholderFlag xmlns="" xmlns:ma14="http://schemas.microsoft.com/office/mac/drawingml/2011/main" val="1"/>
+              <ma14:placeholderFlag xmlns:ma14="http://schemas.microsoft.com/office/mac/drawingml/2011/main" xmlns="" val="1"/>
             </a:ext>
           </a:extLst>
         </p:spPr>
@@ -5560,14 +5786,14 @@
           <a:noFill/>
           <a:extLst>
             <a:ext uri="{909E8E84-426E-40dd-AFC4-6F175D3DCCD1}">
-              <a14:hiddenFill xmlns="" xmlns:a14="http://schemas.microsoft.com/office/drawing/2010/main">
+              <a14:hiddenFill xmlns:a14="http://schemas.microsoft.com/office/drawing/2010/main" xmlns="">
                 <a:solidFill>
                   <a:srgbClr val="FFFFFF"/>
                 </a:solidFill>
               </a14:hiddenFill>
             </a:ext>
             <a:ext uri="{91240B29-F687-4f45-9708-019B960494DF}">
-              <a14:hiddenLine xmlns="" xmlns:a14="http://schemas.microsoft.com/office/drawing/2010/main" w="9525">
+              <a14:hiddenLine xmlns:a14="http://schemas.microsoft.com/office/drawing/2010/main" xmlns="" w="9525">
                 <a:solidFill>
                   <a:srgbClr val="000000"/>
                 </a:solidFill>
@@ -5647,14 +5873,14 @@
           </a:ln>
           <a:extLst>
             <a:ext uri="{909E8E84-426E-40dd-AFC4-6F175D3DCCD1}">
-              <a14:hiddenFill xmlns="" xmlns:a14="http://schemas.microsoft.com/office/drawing/2010/main">
+              <a14:hiddenFill xmlns:a14="http://schemas.microsoft.com/office/drawing/2010/main" xmlns="">
                 <a:solidFill>
                   <a:srgbClr val="FFFFFF"/>
                 </a:solidFill>
               </a14:hiddenFill>
             </a:ext>
             <a:ext uri="{FAA26D3D-D897-4be2-8F04-BA451C77F1D7}">
-              <ma14:placeholderFlag xmlns="" xmlns:ma14="http://schemas.microsoft.com/office/mac/drawingml/2011/main" val="1"/>
+              <ma14:placeholderFlag xmlns:ma14="http://schemas.microsoft.com/office/mac/drawingml/2011/main" xmlns="" val="1"/>
             </a:ext>
           </a:extLst>
         </p:spPr>
@@ -5673,14 +5899,14 @@
           <a:noFill/>
           <a:extLst>
             <a:ext uri="{909E8E84-426E-40dd-AFC4-6F175D3DCCD1}">
-              <a14:hiddenFill xmlns="" xmlns:a14="http://schemas.microsoft.com/office/drawing/2010/main">
+              <a14:hiddenFill xmlns:a14="http://schemas.microsoft.com/office/drawing/2010/main" xmlns="">
                 <a:solidFill>
                   <a:srgbClr val="FFFFFF"/>
                 </a:solidFill>
               </a14:hiddenFill>
             </a:ext>
             <a:ext uri="{91240B29-F687-4f45-9708-019B960494DF}">
-              <a14:hiddenLine xmlns="" xmlns:a14="http://schemas.microsoft.com/office/drawing/2010/main" w="9525">
+              <a14:hiddenLine xmlns:a14="http://schemas.microsoft.com/office/drawing/2010/main" xmlns="" w="9525">
                 <a:solidFill>
                   <a:srgbClr val="000000"/>
                 </a:solidFill>
@@ -5760,14 +5986,14 @@
           </a:ln>
           <a:extLst>
             <a:ext uri="{909E8E84-426E-40dd-AFC4-6F175D3DCCD1}">
-              <a14:hiddenFill xmlns="" xmlns:a14="http://schemas.microsoft.com/office/drawing/2010/main">
+              <a14:hiddenFill xmlns:a14="http://schemas.microsoft.com/office/drawing/2010/main" xmlns="">
                 <a:solidFill>
                   <a:srgbClr val="FFFFFF"/>
                 </a:solidFill>
               </a14:hiddenFill>
             </a:ext>
             <a:ext uri="{FAA26D3D-D897-4be2-8F04-BA451C77F1D7}">
-              <ma14:placeholderFlag xmlns="" xmlns:ma14="http://schemas.microsoft.com/office/mac/drawingml/2011/main" val="1"/>
+              <ma14:placeholderFlag xmlns:ma14="http://schemas.microsoft.com/office/mac/drawingml/2011/main" xmlns="" val="1"/>
             </a:ext>
           </a:extLst>
         </p:spPr>
@@ -5786,14 +6012,14 @@
           <a:noFill/>
           <a:extLst>
             <a:ext uri="{909E8E84-426E-40dd-AFC4-6F175D3DCCD1}">
-              <a14:hiddenFill xmlns="" xmlns:a14="http://schemas.microsoft.com/office/drawing/2010/main">
+              <a14:hiddenFill xmlns:a14="http://schemas.microsoft.com/office/drawing/2010/main" xmlns="">
                 <a:solidFill>
                   <a:srgbClr val="FFFFFF"/>
                 </a:solidFill>
               </a14:hiddenFill>
             </a:ext>
             <a:ext uri="{91240B29-F687-4f45-9708-019B960494DF}">
-              <a14:hiddenLine xmlns="" xmlns:a14="http://schemas.microsoft.com/office/drawing/2010/main" w="9525">
+              <a14:hiddenLine xmlns:a14="http://schemas.microsoft.com/office/drawing/2010/main" xmlns="" w="9525">
                 <a:solidFill>
                   <a:srgbClr val="000000"/>
                 </a:solidFill>
@@ -5873,14 +6099,14 @@
           </a:ln>
           <a:extLst>
             <a:ext uri="{909E8E84-426E-40dd-AFC4-6F175D3DCCD1}">
-              <a14:hiddenFill xmlns="" xmlns:a14="http://schemas.microsoft.com/office/drawing/2010/main">
+              <a14:hiddenFill xmlns:a14="http://schemas.microsoft.com/office/drawing/2010/main" xmlns="">
                 <a:solidFill>
                   <a:srgbClr val="FFFFFF"/>
                 </a:solidFill>
               </a14:hiddenFill>
             </a:ext>
             <a:ext uri="{FAA26D3D-D897-4be2-8F04-BA451C77F1D7}">
-              <ma14:placeholderFlag xmlns="" xmlns:ma14="http://schemas.microsoft.com/office/mac/drawingml/2011/main" val="1"/>
+              <ma14:placeholderFlag xmlns:ma14="http://schemas.microsoft.com/office/mac/drawingml/2011/main" xmlns="" val="1"/>
             </a:ext>
           </a:extLst>
         </p:spPr>
@@ -5899,14 +6125,14 @@
           <a:noFill/>
           <a:extLst>
             <a:ext uri="{909E8E84-426E-40dd-AFC4-6F175D3DCCD1}">
-              <a14:hiddenFill xmlns="" xmlns:a14="http://schemas.microsoft.com/office/drawing/2010/main">
+              <a14:hiddenFill xmlns:a14="http://schemas.microsoft.com/office/drawing/2010/main" xmlns="">
                 <a:solidFill>
                   <a:srgbClr val="FFFFFF"/>
                 </a:solidFill>
               </a14:hiddenFill>
             </a:ext>
             <a:ext uri="{91240B29-F687-4f45-9708-019B960494DF}">
-              <a14:hiddenLine xmlns="" xmlns:a14="http://schemas.microsoft.com/office/drawing/2010/main" w="9525">
+              <a14:hiddenLine xmlns:a14="http://schemas.microsoft.com/office/drawing/2010/main" xmlns="" w="9525">
                 <a:solidFill>
                   <a:srgbClr val="000000"/>
                 </a:solidFill>
@@ -5986,14 +6212,14 @@
           </a:ln>
           <a:extLst>
             <a:ext uri="{909E8E84-426E-40dd-AFC4-6F175D3DCCD1}">
-              <a14:hiddenFill xmlns="" xmlns:a14="http://schemas.microsoft.com/office/drawing/2010/main">
+              <a14:hiddenFill xmlns:a14="http://schemas.microsoft.com/office/drawing/2010/main" xmlns="">
                 <a:solidFill>
                   <a:srgbClr val="FFFFFF"/>
                 </a:solidFill>
               </a14:hiddenFill>
             </a:ext>
             <a:ext uri="{FAA26D3D-D897-4be2-8F04-BA451C77F1D7}">
-              <ma14:placeholderFlag xmlns="" xmlns:ma14="http://schemas.microsoft.com/office/mac/drawingml/2011/main" val="1"/>
+              <ma14:placeholderFlag xmlns:ma14="http://schemas.microsoft.com/office/mac/drawingml/2011/main" xmlns="" val="1"/>
             </a:ext>
           </a:extLst>
         </p:spPr>
@@ -6012,14 +6238,14 @@
           <a:noFill/>
           <a:extLst>
             <a:ext uri="{909E8E84-426E-40dd-AFC4-6F175D3DCCD1}">
-              <a14:hiddenFill xmlns="" xmlns:a14="http://schemas.microsoft.com/office/drawing/2010/main">
+              <a14:hiddenFill xmlns:a14="http://schemas.microsoft.com/office/drawing/2010/main" xmlns="">
                 <a:solidFill>
                   <a:srgbClr val="FFFFFF"/>
                 </a:solidFill>
               </a14:hiddenFill>
             </a:ext>
             <a:ext uri="{91240B29-F687-4f45-9708-019B960494DF}">
-              <a14:hiddenLine xmlns="" xmlns:a14="http://schemas.microsoft.com/office/drawing/2010/main" w="9525">
+              <a14:hiddenLine xmlns:a14="http://schemas.microsoft.com/office/drawing/2010/main" xmlns="" w="9525">
                 <a:solidFill>
                   <a:srgbClr val="000000"/>
                 </a:solidFill>
@@ -6099,14 +6325,14 @@
           </a:ln>
           <a:extLst>
             <a:ext uri="{909E8E84-426E-40dd-AFC4-6F175D3DCCD1}">
-              <a14:hiddenFill xmlns="" xmlns:a14="http://schemas.microsoft.com/office/drawing/2010/main">
+              <a14:hiddenFill xmlns:a14="http://schemas.microsoft.com/office/drawing/2010/main" xmlns="">
                 <a:solidFill>
                   <a:srgbClr val="FFFFFF"/>
                 </a:solidFill>
               </a14:hiddenFill>
             </a:ext>
             <a:ext uri="{FAA26D3D-D897-4be2-8F04-BA451C77F1D7}">
-              <ma14:placeholderFlag xmlns="" xmlns:ma14="http://schemas.microsoft.com/office/mac/drawingml/2011/main" val="1"/>
+              <ma14:placeholderFlag xmlns:ma14="http://schemas.microsoft.com/office/mac/drawingml/2011/main" xmlns="" val="1"/>
             </a:ext>
           </a:extLst>
         </p:spPr>
@@ -6125,14 +6351,14 @@
           <a:noFill/>
           <a:extLst>
             <a:ext uri="{909E8E84-426E-40dd-AFC4-6F175D3DCCD1}">
-              <a14:hiddenFill xmlns="" xmlns:a14="http://schemas.microsoft.com/office/drawing/2010/main">
+              <a14:hiddenFill xmlns:a14="http://schemas.microsoft.com/office/drawing/2010/main" xmlns="">
                 <a:solidFill>
                   <a:srgbClr val="FFFFFF"/>
                 </a:solidFill>
               </a14:hiddenFill>
             </a:ext>
             <a:ext uri="{91240B29-F687-4f45-9708-019B960494DF}">
-              <a14:hiddenLine xmlns="" xmlns:a14="http://schemas.microsoft.com/office/drawing/2010/main" w="9525">
+              <a14:hiddenLine xmlns:a14="http://schemas.microsoft.com/office/drawing/2010/main" xmlns="" w="9525">
                 <a:solidFill>
                   <a:srgbClr val="000000"/>
                 </a:solidFill>
@@ -6281,14 +6507,14 @@
           </a:ln>
           <a:extLst>
             <a:ext uri="{909E8E84-426E-40dd-AFC4-6F175D3DCCD1}">
-              <a14:hiddenFill xmlns="" xmlns:a14="http://schemas.microsoft.com/office/drawing/2010/main">
+              <a14:hiddenFill xmlns:a14="http://schemas.microsoft.com/office/drawing/2010/main" xmlns="">
                 <a:solidFill>
                   <a:srgbClr val="FFFFFF"/>
                 </a:solidFill>
               </a14:hiddenFill>
             </a:ext>
             <a:ext uri="{91240B29-F687-4f45-9708-019B960494DF}">
-              <a14:hiddenLine xmlns="" xmlns:a14="http://schemas.microsoft.com/office/drawing/2010/main" w="9525">
+              <a14:hiddenLine xmlns:a14="http://schemas.microsoft.com/office/drawing/2010/main" xmlns="" w="9525">
                 <a:solidFill>
                   <a:srgbClr val="000000"/>
                 </a:solidFill>
@@ -7039,14 +7265,14 @@
           </a:ln>
           <a:extLst>
             <a:ext uri="{909E8E84-426E-40dd-AFC4-6F175D3DCCD1}">
-              <a14:hiddenFill xmlns="" xmlns:a14="http://schemas.microsoft.com/office/drawing/2010/main">
+              <a14:hiddenFill xmlns:a14="http://schemas.microsoft.com/office/drawing/2010/main" xmlns="">
                 <a:solidFill>
                   <a:srgbClr val="FFFFFF"/>
                 </a:solidFill>
               </a14:hiddenFill>
             </a:ext>
             <a:ext uri="{91240B29-F687-4f45-9708-019B960494DF}">
-              <a14:hiddenLine xmlns="" xmlns:a14="http://schemas.microsoft.com/office/drawing/2010/main" w="9525">
+              <a14:hiddenLine xmlns:a14="http://schemas.microsoft.com/office/drawing/2010/main" xmlns="" w="9525">
                 <a:solidFill>
                   <a:srgbClr val="000000"/>
                 </a:solidFill>
@@ -8829,14 +9055,14 @@
           </a:ln>
           <a:extLst>
             <a:ext uri="{909E8E84-426E-40dd-AFC4-6F175D3DCCD1}">
-              <a14:hiddenFill xmlns="" xmlns:a14="http://schemas.microsoft.com/office/drawing/2010/main">
+              <a14:hiddenFill xmlns:a14="http://schemas.microsoft.com/office/drawing/2010/main" xmlns="">
                 <a:solidFill>
                   <a:srgbClr val="FFFFFF"/>
                 </a:solidFill>
               </a14:hiddenFill>
             </a:ext>
             <a:ext uri="{91240B29-F687-4f45-9708-019B960494DF}">
-              <a14:hiddenLine xmlns="" xmlns:a14="http://schemas.microsoft.com/office/drawing/2010/main" w="9525">
+              <a14:hiddenLine xmlns:a14="http://schemas.microsoft.com/office/drawing/2010/main" xmlns="" w="9525">
                 <a:solidFill>
                   <a:srgbClr val="000000"/>
                 </a:solidFill>
@@ -8846,7 +9072,7 @@
               </a14:hiddenLine>
             </a:ext>
             <a:ext uri="{FAA26D3D-D897-4be2-8F04-BA451C77F1D7}">
-              <ma14:placeholderFlag xmlns="" xmlns:ma14="http://schemas.microsoft.com/office/mac/drawingml/2011/main" val="1"/>
+              <ma14:placeholderFlag xmlns:ma14="http://schemas.microsoft.com/office/mac/drawingml/2011/main" xmlns="" val="1"/>
             </a:ext>
           </a:extLst>
         </p:spPr>
@@ -9614,63 +9840,106 @@
             <a:spLocks noGrp="1"/>
           </p:cNvSpPr>
           <p:nvPr>
-            <p:ph idx="14"/>
+            <p:ph idx="13"/>
           </p:nvPr>
         </p:nvSpPr>
-        <p:spPr/>
+        <p:spPr>
+          <a:xfrm>
+            <a:off x="7329803" y="1887752"/>
+            <a:ext cx="6649347" cy="5084469"/>
+          </a:xfrm>
+        </p:spPr>
         <p:txBody>
           <a:bodyPr/>
           <a:lstStyle/>
           <a:p>
             <a:pPr marL="457200" indent="-457200" defTabSz="1306221" fontAlgn="auto">
+              <a:buFont typeface="Arial" panose="020B0604020202020204" pitchFamily="34" charset="0"/>
+              <a:buChar char="•"/>
               <a:defRPr/>
             </a:pPr>
             <a:r>
-              <a:rPr lang="en-US" dirty="0">
-                <a:ea typeface="+mn-ea"/>
-              </a:rPr>
-              <a:t>[First Point]</a:t>
+              <a:rPr lang="en-US" dirty="0"/>
+              <a:t>Took data on surgeries in a simple table</a:t>
             </a:r>
           </a:p>
           <a:p>
             <a:pPr marL="457200" indent="-457200" defTabSz="1306221" fontAlgn="auto">
+              <a:buFont typeface="Arial" panose="020B0604020202020204" pitchFamily="34" charset="0"/>
+              <a:buChar char="•"/>
               <a:defRPr/>
             </a:pPr>
             <a:r>
-              <a:rPr lang="en-US" dirty="0">
-                <a:ea typeface="+mn-ea"/>
-              </a:rPr>
-              <a:t>[Second Point]</a:t>
+              <a:rPr lang="en-US" dirty="0"/>
+              <a:t>Noticed births assisted by doctors had significantly higher mortality rates than those assisted by midwives</a:t>
             </a:r>
           </a:p>
           <a:p>
-            <a:pPr marL="681038" lvl="2" indent="-457200" defTabSz="1306221" fontAlgn="auto">
+            <a:pPr marL="457200" indent="-457200" defTabSz="1306221" fontAlgn="auto">
+              <a:buFont typeface="Arial" panose="020B0604020202020204" pitchFamily="34" charset="0"/>
+              <a:buChar char="•"/>
               <a:defRPr/>
             </a:pPr>
             <a:r>
-              <a:rPr lang="en-US" dirty="0">
-                <a:latin typeface="Merriweather Light"/>
-                <a:ea typeface="+mn-ea"/>
-                <a:cs typeface="Merriweather Light"/>
-              </a:rPr>
-              <a:t>[Sub bullet]</a:t>
+              <a:rPr lang="en-US" dirty="0"/>
+              <a:t>Theorized something invisible to the eye must be transferring from previous surgeries</a:t>
             </a:r>
           </a:p>
           <a:p>
-            <a:pPr marL="681038" lvl="2" indent="-457200" defTabSz="1306221" fontAlgn="auto">
+            <a:pPr marL="457200" indent="-457200" defTabSz="1306221" fontAlgn="auto">
+              <a:buFont typeface="Arial" panose="020B0604020202020204" pitchFamily="34" charset="0"/>
+              <a:buChar char="•"/>
               <a:defRPr/>
             </a:pPr>
             <a:r>
-              <a:rPr lang="en-US" dirty="0">
-                <a:latin typeface="Merriweather Light"/>
-                <a:ea typeface="+mn-ea"/>
-                <a:cs typeface="Merriweather Light"/>
-              </a:rPr>
-              <a:t>[Sub bullet]</a:t>
+              <a:rPr lang="en-US" dirty="0"/>
+              <a:t>Asked doctors to wash their hands before examining pregnant women</a:t>
+            </a:r>
+          </a:p>
+          <a:p>
+            <a:pPr marL="457200" indent="-457200" defTabSz="1306221" fontAlgn="auto">
+              <a:buFont typeface="Arial" panose="020B0604020202020204" pitchFamily="34" charset="0"/>
+              <a:buChar char="•"/>
+              <a:defRPr/>
+            </a:pPr>
+            <a:r>
+              <a:rPr lang="en-US" dirty="0"/>
+              <a:t>Mortality rate decreased from 18% to 2.2%</a:t>
             </a:r>
           </a:p>
         </p:txBody>
       </p:sp>
+      <p:pic>
+        <p:nvPicPr>
+          <p:cNvPr id="6" name="Picture Placeholder 5">
+            <a:extLst>
+              <a:ext uri="{FF2B5EF4-FFF2-40B4-BE49-F238E27FC236}">
+                <a16:creationId xmlns:a16="http://schemas.microsoft.com/office/drawing/2014/main" id="{070D9BDA-892E-4AE2-97F5-F56E3AC1B5E4}"/>
+              </a:ext>
+            </a:extLst>
+          </p:cNvPr>
+          <p:cNvPicPr>
+            <a:picLocks noGrp="1" noChangeAspect="1"/>
+          </p:cNvPicPr>
+          <p:nvPr>
+            <p:ph type="pic" sz="quarter" idx="10"/>
+          </p:nvPr>
+        </p:nvPicPr>
+        <p:blipFill>
+          <a:blip r:embed="rId3">
+            <a:extLst>
+              <a:ext uri="{28A0092B-C50C-407E-A947-70E740481C1C}">
+                <a14:useLocalDpi xmlns:a14="http://schemas.microsoft.com/office/drawing/2010/main" val="0"/>
+              </a:ext>
+            </a:extLst>
+          </a:blip>
+          <a:srcRect l="18766" r="18766"/>
+          <a:stretch>
+            <a:fillRect/>
+          </a:stretch>
+        </p:blipFill>
+        <p:spPr/>
+      </p:pic>
       <p:sp>
         <p:nvSpPr>
           <p:cNvPr id="5" name="Text Placeholder 1"/>
@@ -9684,7 +9953,7 @@
         <p:spPr>
           <a:xfrm>
             <a:off x="710057" y="598699"/>
-            <a:ext cx="13269093" cy="577081"/>
+            <a:ext cx="13269093" cy="1009507"/>
           </a:xfrm>
           <a:prstGeom prst="rect">
             <a:avLst/>
@@ -9695,21 +9964,11 @@
           <a:lstStyle/>
           <a:p>
             <a:pPr defTabSz="1306221" fontAlgn="auto">
-              <a:lnSpc>
-                <a:spcPct val="80000"/>
-              </a:lnSpc>
-              <a:spcAft>
-                <a:spcPts val="0"/>
-              </a:spcAft>
-              <a:buFont typeface="Arial" panose="020B0604020202020204" pitchFamily="34" charset="0"/>
-              <a:buNone/>
               <a:defRPr/>
             </a:pPr>
             <a:r>
-              <a:rPr lang="en-US" dirty="0">
-                <a:ea typeface="+mn-ea"/>
-              </a:rPr>
-              <a:t>[Title/Topic]</a:t>
+              <a:rPr lang="en-US" sz="8000" dirty="0"/>
+              <a:t>Ignaz Semmelweis</a:t>
             </a:r>
           </a:p>
         </p:txBody>
@@ -10204,7 +10463,7 @@
           </a:ln>
           <a:extLst>
             <a:ext uri="{FAA26D3D-D897-4be2-8F04-BA451C77F1D7}">
-              <ma14:placeholderFlag xmlns="" xmlns:ma14="http://schemas.microsoft.com/office/mac/drawingml/2011/main" val="1"/>
+              <ma14:placeholderFlag xmlns:ma14="http://schemas.microsoft.com/office/mac/drawingml/2011/main" xmlns="" val="1"/>
             </a:ext>
           </a:extLst>
         </p:spPr>
@@ -10257,14 +10516,14 @@
           </a:ln>
           <a:extLst>
             <a:ext uri="{909E8E84-426E-40dd-AFC4-6F175D3DCCD1}">
-              <a14:hiddenFill xmlns="" xmlns:a14="http://schemas.microsoft.com/office/drawing/2010/main">
+              <a14:hiddenFill xmlns:a14="http://schemas.microsoft.com/office/drawing/2010/main" xmlns="">
                 <a:solidFill>
                   <a:srgbClr val="FFFFFF"/>
                 </a:solidFill>
               </a14:hiddenFill>
             </a:ext>
             <a:ext uri="{FAA26D3D-D897-4be2-8F04-BA451C77F1D7}">
-              <ma14:placeholderFlag xmlns="" xmlns:ma14="http://schemas.microsoft.com/office/mac/drawingml/2011/main" val="1"/>
+              <ma14:placeholderFlag xmlns:ma14="http://schemas.microsoft.com/office/mac/drawingml/2011/main" xmlns="" val="1"/>
             </a:ext>
           </a:extLst>
         </p:spPr>
@@ -11858,7 +12117,7 @@
           </a:ln>
           <a:extLst>
             <a:ext uri="{909E8E84-426E-40dd-AFC4-6F175D3DCCD1}">
-              <a14:hiddenFill xmlns="" xmlns:a14="http://schemas.microsoft.com/office/drawing/2010/main">
+              <a14:hiddenFill xmlns:a14="http://schemas.microsoft.com/office/drawing/2010/main" xmlns="">
                 <a:solidFill>
                   <a:srgbClr val="FFFFFF"/>
                 </a:solidFill>
@@ -11888,14 +12147,14 @@
           <a:noFill/>
           <a:extLst>
             <a:ext uri="{909E8E84-426E-40dd-AFC4-6F175D3DCCD1}">
-              <a14:hiddenFill xmlns="" xmlns:a14="http://schemas.microsoft.com/office/drawing/2010/main">
+              <a14:hiddenFill xmlns:a14="http://schemas.microsoft.com/office/drawing/2010/main" xmlns="">
                 <a:solidFill>
                   <a:srgbClr val="FFFFFF"/>
                 </a:solidFill>
               </a14:hiddenFill>
             </a:ext>
             <a:ext uri="{91240B29-F687-4f45-9708-019B960494DF}">
-              <a14:hiddenLine xmlns="" xmlns:a14="http://schemas.microsoft.com/office/drawing/2010/main" w="9525">
+              <a14:hiddenLine xmlns:a14="http://schemas.microsoft.com/office/drawing/2010/main" xmlns="" w="9525">
                 <a:solidFill>
                   <a:srgbClr val="000000"/>
                 </a:solidFill>
@@ -12238,14 +12497,14 @@
           <a:noFill/>
           <a:extLst>
             <a:ext uri="{909E8E84-426E-40dd-AFC4-6F175D3DCCD1}">
-              <a14:hiddenFill xmlns="" xmlns:a14="http://schemas.microsoft.com/office/drawing/2010/main">
+              <a14:hiddenFill xmlns:a14="http://schemas.microsoft.com/office/drawing/2010/main" xmlns="">
                 <a:solidFill>
                   <a:srgbClr val="FFFFFF"/>
                 </a:solidFill>
               </a14:hiddenFill>
             </a:ext>
             <a:ext uri="{91240B29-F687-4f45-9708-019B960494DF}">
-              <a14:hiddenLine xmlns="" xmlns:a14="http://schemas.microsoft.com/office/drawing/2010/main" w="9525">
+              <a14:hiddenLine xmlns:a14="http://schemas.microsoft.com/office/drawing/2010/main" xmlns="" w="9525">
                 <a:solidFill>
                   <a:srgbClr val="000000"/>
                 </a:solidFill>
@@ -12290,14 +12549,14 @@
           <a:noFill/>
           <a:extLst>
             <a:ext uri="{909E8E84-426E-40dd-AFC4-6F175D3DCCD1}">
-              <a14:hiddenFill xmlns="" xmlns:a14="http://schemas.microsoft.com/office/drawing/2010/main">
+              <a14:hiddenFill xmlns:a14="http://schemas.microsoft.com/office/drawing/2010/main" xmlns="">
                 <a:solidFill>
                   <a:srgbClr val="FFFFFF"/>
                 </a:solidFill>
               </a14:hiddenFill>
             </a:ext>
             <a:ext uri="{91240B29-F687-4f45-9708-019B960494DF}">
-              <a14:hiddenLine xmlns="" xmlns:a14="http://schemas.microsoft.com/office/drawing/2010/main" w="9525">
+              <a14:hiddenLine xmlns:a14="http://schemas.microsoft.com/office/drawing/2010/main" xmlns="" w="9525">
                 <a:solidFill>
                   <a:srgbClr val="000000"/>
                 </a:solidFill>
@@ -12488,7 +12747,7 @@
           </a:ln>
           <a:extLst>
             <a:ext uri="{909E8E84-426E-40dd-AFC4-6F175D3DCCD1}">
-              <a14:hiddenFill xmlns="" xmlns:a14="http://schemas.microsoft.com/office/drawing/2010/main">
+              <a14:hiddenFill xmlns:a14="http://schemas.microsoft.com/office/drawing/2010/main" xmlns="">
                 <a:solidFill>
                   <a:srgbClr val="FFFFFF"/>
                 </a:solidFill>
@@ -12532,14 +12791,14 @@
           </a:ln>
           <a:extLst>
             <a:ext uri="{909E8E84-426E-40dd-AFC4-6F175D3DCCD1}">
-              <a14:hiddenFill xmlns="" xmlns:a14="http://schemas.microsoft.com/office/drawing/2010/main">
+              <a14:hiddenFill xmlns:a14="http://schemas.microsoft.com/office/drawing/2010/main" xmlns="">
                 <a:solidFill>
                   <a:srgbClr val="FFFFFF"/>
                 </a:solidFill>
               </a14:hiddenFill>
             </a:ext>
             <a:ext uri="{91240B29-F687-4f45-9708-019B960494DF}">
-              <a14:hiddenLine xmlns="" xmlns:a14="http://schemas.microsoft.com/office/drawing/2010/main" w="9525">
+              <a14:hiddenLine xmlns:a14="http://schemas.microsoft.com/office/drawing/2010/main" xmlns="" w="9525">
                 <a:solidFill>
                   <a:srgbClr val="000000"/>
                 </a:solidFill>
@@ -12592,14 +12851,14 @@
           <a:effectLst/>
           <a:extLst>
             <a:ext uri="{909E8E84-426E-40dd-AFC4-6F175D3DCCD1}">
-              <a14:hiddenFill xmlns="" xmlns:a14="http://schemas.microsoft.com/office/drawing/2010/main">
+              <a14:hiddenFill xmlns:a14="http://schemas.microsoft.com/office/drawing/2010/main" xmlns="">
                 <a:solidFill>
                   <a:schemeClr val="accent1"/>
                 </a:solidFill>
               </a14:hiddenFill>
             </a:ext>
             <a:ext uri="{AF507438-7753-43e0-B8FC-AC1667EBCBE1}">
-              <a14:hiddenEffects xmlns="" xmlns:a14="http://schemas.microsoft.com/office/drawing/2010/main">
+              <a14:hiddenEffects xmlns:a14="http://schemas.microsoft.com/office/drawing/2010/main" xmlns="">
                 <a:effectLst>
                   <a:outerShdw dist="35921" dir="2700000" algn="ctr" rotWithShape="0">
                     <a:schemeClr val="bg2"/>
@@ -12858,14 +13117,14 @@
           </a:ln>
           <a:extLst>
             <a:ext uri="{909E8E84-426E-40dd-AFC4-6F175D3DCCD1}">
-              <a14:hiddenFill xmlns="" xmlns:a14="http://schemas.microsoft.com/office/drawing/2010/main">
+              <a14:hiddenFill xmlns:a14="http://schemas.microsoft.com/office/drawing/2010/main" xmlns="">
                 <a:solidFill>
                   <a:srgbClr val="FFFFFF"/>
                 </a:solidFill>
               </a14:hiddenFill>
             </a:ext>
             <a:ext uri="{91240B29-F687-4f45-9708-019B960494DF}">
-              <a14:hiddenLine xmlns="" xmlns:a14="http://schemas.microsoft.com/office/drawing/2010/main" w="9525">
+              <a14:hiddenLine xmlns:a14="http://schemas.microsoft.com/office/drawing/2010/main" xmlns="" w="9525">
                 <a:solidFill>
                   <a:srgbClr val="000000"/>
                 </a:solidFill>
@@ -13148,14 +13407,14 @@
           </a:ln>
           <a:extLst>
             <a:ext uri="{909E8E84-426E-40dd-AFC4-6F175D3DCCD1}">
-              <a14:hiddenFill xmlns="" xmlns:a14="http://schemas.microsoft.com/office/drawing/2010/main">
+              <a14:hiddenFill xmlns:a14="http://schemas.microsoft.com/office/drawing/2010/main" xmlns="">
                 <a:solidFill>
                   <a:srgbClr val="FFFFFF"/>
                 </a:solidFill>
               </a14:hiddenFill>
             </a:ext>
             <a:ext uri="{91240B29-F687-4f45-9708-019B960494DF}">
-              <a14:hiddenLine xmlns="" xmlns:a14="http://schemas.microsoft.com/office/drawing/2010/main" w="9525">
+              <a14:hiddenLine xmlns:a14="http://schemas.microsoft.com/office/drawing/2010/main" xmlns="" w="9525">
                 <a:solidFill>
                   <a:srgbClr val="000000"/>
                 </a:solidFill>
@@ -13358,14 +13617,14 @@
           </a:ln>
           <a:extLst>
             <a:ext uri="{909E8E84-426E-40dd-AFC4-6F175D3DCCD1}">
-              <a14:hiddenFill xmlns="" xmlns:a14="http://schemas.microsoft.com/office/drawing/2010/main">
+              <a14:hiddenFill xmlns:a14="http://schemas.microsoft.com/office/drawing/2010/main" xmlns="">
                 <a:solidFill>
                   <a:srgbClr val="FFFFFF"/>
                 </a:solidFill>
               </a14:hiddenFill>
             </a:ext>
             <a:ext uri="{91240B29-F687-4f45-9708-019B960494DF}">
-              <a14:hiddenLine xmlns="" xmlns:a14="http://schemas.microsoft.com/office/drawing/2010/main" w="9525">
+              <a14:hiddenLine xmlns:a14="http://schemas.microsoft.com/office/drawing/2010/main" xmlns="" w="9525">
                 <a:solidFill>
                   <a:srgbClr val="000000"/>
                 </a:solidFill>
@@ -13412,14 +13671,14 @@
           </a:ln>
           <a:extLst>
             <a:ext uri="{909E8E84-426E-40dd-AFC4-6F175D3DCCD1}">
-              <a14:hiddenFill xmlns="" xmlns:a14="http://schemas.microsoft.com/office/drawing/2010/main">
+              <a14:hiddenFill xmlns:a14="http://schemas.microsoft.com/office/drawing/2010/main" xmlns="">
                 <a:solidFill>
                   <a:srgbClr val="FFFFFF"/>
                 </a:solidFill>
               </a14:hiddenFill>
             </a:ext>
             <a:ext uri="{91240B29-F687-4f45-9708-019B960494DF}">
-              <a14:hiddenLine xmlns="" xmlns:a14="http://schemas.microsoft.com/office/drawing/2010/main" w="9525">
+              <a14:hiddenLine xmlns:a14="http://schemas.microsoft.com/office/drawing/2010/main" xmlns="" w="9525">
                 <a:solidFill>
                   <a:srgbClr val="000000"/>
                 </a:solidFill>
@@ -13466,14 +13725,14 @@
           </a:ln>
           <a:extLst>
             <a:ext uri="{909E8E84-426E-40dd-AFC4-6F175D3DCCD1}">
-              <a14:hiddenFill xmlns="" xmlns:a14="http://schemas.microsoft.com/office/drawing/2010/main">
+              <a14:hiddenFill xmlns:a14="http://schemas.microsoft.com/office/drawing/2010/main" xmlns="">
                 <a:solidFill>
                   <a:srgbClr val="FFFFFF"/>
                 </a:solidFill>
               </a14:hiddenFill>
             </a:ext>
             <a:ext uri="{91240B29-F687-4f45-9708-019B960494DF}">
-              <a14:hiddenLine xmlns="" xmlns:a14="http://schemas.microsoft.com/office/drawing/2010/main" w="9525">
+              <a14:hiddenLine xmlns:a14="http://schemas.microsoft.com/office/drawing/2010/main" xmlns="" w="9525">
                 <a:solidFill>
                   <a:srgbClr val="000000"/>
                 </a:solidFill>
@@ -18596,7 +18855,7 @@
             </a:ln>
             <a:extLst>
               <a:ext uri="{91240B29-F687-4f45-9708-019B960494DF}">
-                <a14:hiddenLine xmlns="" xmlns:a14="http://schemas.microsoft.com/office/drawing/2010/main" w="9525">
+                <a14:hiddenLine xmlns:a14="http://schemas.microsoft.com/office/drawing/2010/main" xmlns="" w="9525">
                   <a:solidFill>
                     <a:srgbClr val="000000"/>
                   </a:solidFill>
@@ -18697,7 +18956,7 @@
             </a:ln>
             <a:extLst>
               <a:ext uri="{91240B29-F687-4f45-9708-019B960494DF}">
-                <a14:hiddenLine xmlns="" xmlns:a14="http://schemas.microsoft.com/office/drawing/2010/main" w="9525">
+                <a14:hiddenLine xmlns:a14="http://schemas.microsoft.com/office/drawing/2010/main" xmlns="" w="9525">
                   <a:solidFill>
                     <a:srgbClr val="000000"/>
                   </a:solidFill>
@@ -18798,7 +19057,7 @@
             </a:ln>
             <a:extLst>
               <a:ext uri="{91240B29-F687-4f45-9708-019B960494DF}">
-                <a14:hiddenLine xmlns="" xmlns:a14="http://schemas.microsoft.com/office/drawing/2010/main" w="9525">
+                <a14:hiddenLine xmlns:a14="http://schemas.microsoft.com/office/drawing/2010/main" xmlns="" w="9525">
                   <a:solidFill>
                     <a:srgbClr val="000000"/>
                   </a:solidFill>
@@ -18899,7 +19158,7 @@
             </a:ln>
             <a:extLst>
               <a:ext uri="{91240B29-F687-4f45-9708-019B960494DF}">
-                <a14:hiddenLine xmlns="" xmlns:a14="http://schemas.microsoft.com/office/drawing/2010/main" w="9525">
+                <a14:hiddenLine xmlns:a14="http://schemas.microsoft.com/office/drawing/2010/main" xmlns="" w="9525">
                   <a:solidFill>
                     <a:srgbClr val="000000"/>
                   </a:solidFill>
@@ -19000,7 +19259,7 @@
             </a:ln>
             <a:extLst>
               <a:ext uri="{91240B29-F687-4f45-9708-019B960494DF}">
-                <a14:hiddenLine xmlns="" xmlns:a14="http://schemas.microsoft.com/office/drawing/2010/main" w="9525">
+                <a14:hiddenLine xmlns:a14="http://schemas.microsoft.com/office/drawing/2010/main" xmlns="" w="9525">
                   <a:solidFill>
                     <a:srgbClr val="000000"/>
                   </a:solidFill>
@@ -22102,7 +22361,7 @@
             </a:ln>
             <a:extLst>
               <a:ext uri="{91240B29-F687-4f45-9708-019B960494DF}">
-                <a14:hiddenLine xmlns="" xmlns:a14="http://schemas.microsoft.com/office/drawing/2010/main" w="9525">
+                <a14:hiddenLine xmlns:a14="http://schemas.microsoft.com/office/drawing/2010/main" xmlns="" w="9525">
                   <a:solidFill>
                     <a:srgbClr val="000000"/>
                   </a:solidFill>
@@ -22838,7 +23097,7 @@
             </a:ln>
             <a:extLst>
               <a:ext uri="{91240B29-F687-4f45-9708-019B960494DF}">
-                <a14:hiddenLine xmlns="" xmlns:a14="http://schemas.microsoft.com/office/drawing/2010/main" w="9525">
+                <a14:hiddenLine xmlns:a14="http://schemas.microsoft.com/office/drawing/2010/main" xmlns="" w="9525">
                   <a:solidFill>
                     <a:srgbClr val="000000"/>
                   </a:solidFill>
@@ -23025,7 +23284,7 @@
             </a:ln>
             <a:extLst>
               <a:ext uri="{91240B29-F687-4f45-9708-019B960494DF}">
-                <a14:hiddenLine xmlns="" xmlns:a14="http://schemas.microsoft.com/office/drawing/2010/main" w="9525">
+                <a14:hiddenLine xmlns:a14="http://schemas.microsoft.com/office/drawing/2010/main" xmlns="" w="9525">
                   <a:solidFill>
                     <a:srgbClr val="000000"/>
                   </a:solidFill>
@@ -24119,7 +24378,7 @@
             </a:ln>
             <a:extLst>
               <a:ext uri="{91240B29-F687-4f45-9708-019B960494DF}">
-                <a14:hiddenLine xmlns="" xmlns:a14="http://schemas.microsoft.com/office/drawing/2010/main" w="9525">
+                <a14:hiddenLine xmlns:a14="http://schemas.microsoft.com/office/drawing/2010/main" xmlns="" w="9525">
                   <a:solidFill>
                     <a:srgbClr val="000000"/>
                   </a:solidFill>
@@ -26764,7 +27023,7 @@
           </a:ln>
           <a:extLst>
             <a:ext uri="{91240B29-F687-4f45-9708-019B960494DF}">
-              <a14:hiddenLine xmlns="" xmlns:a14="http://schemas.microsoft.com/office/drawing/2010/main" w="9525">
+              <a14:hiddenLine xmlns:a14="http://schemas.microsoft.com/office/drawing/2010/main" xmlns="" w="9525">
                 <a:solidFill>
                   <a:srgbClr val="000000"/>
                 </a:solidFill>
@@ -28143,7 +28402,7 @@
           </a:ln>
           <a:extLst>
             <a:ext uri="{91240B29-F687-4f45-9708-019B960494DF}">
-              <a14:hiddenLine xmlns="" xmlns:a14="http://schemas.microsoft.com/office/drawing/2010/main" w="9525">
+              <a14:hiddenLine xmlns:a14="http://schemas.microsoft.com/office/drawing/2010/main" xmlns="" w="9525">
                 <a:solidFill>
                   <a:srgbClr val="000000"/>
                 </a:solidFill>
@@ -28186,14 +28445,14 @@
           </a:ln>
           <a:extLst>
             <a:ext uri="{909E8E84-426E-40dd-AFC4-6F175D3DCCD1}">
-              <a14:hiddenFill xmlns="" xmlns:a14="http://schemas.microsoft.com/office/drawing/2010/main">
+              <a14:hiddenFill xmlns:a14="http://schemas.microsoft.com/office/drawing/2010/main" xmlns="">
                 <a:solidFill>
                   <a:srgbClr val="FFFFFF"/>
                 </a:solidFill>
               </a14:hiddenFill>
             </a:ext>
             <a:ext uri="{91240B29-F687-4f45-9708-019B960494DF}">
-              <a14:hiddenLine xmlns="" xmlns:a14="http://schemas.microsoft.com/office/drawing/2010/main" w="9525">
+              <a14:hiddenLine xmlns:a14="http://schemas.microsoft.com/office/drawing/2010/main" xmlns="" w="9525">
                 <a:solidFill>
                   <a:srgbClr val="000000"/>
                 </a:solidFill>
@@ -28357,14 +28616,14 @@
           </a:ln>
           <a:extLst>
             <a:ext uri="{909E8E84-426E-40dd-AFC4-6F175D3DCCD1}">
-              <a14:hiddenFill xmlns="" xmlns:a14="http://schemas.microsoft.com/office/drawing/2010/main">
+              <a14:hiddenFill xmlns:a14="http://schemas.microsoft.com/office/drawing/2010/main" xmlns="">
                 <a:solidFill>
                   <a:srgbClr val="FFFFFF"/>
                 </a:solidFill>
               </a14:hiddenFill>
             </a:ext>
             <a:ext uri="{91240B29-F687-4f45-9708-019B960494DF}">
-              <a14:hiddenLine xmlns="" xmlns:a14="http://schemas.microsoft.com/office/drawing/2010/main" w="9525">
+              <a14:hiddenLine xmlns:a14="http://schemas.microsoft.com/office/drawing/2010/main" xmlns="" w="9525">
                 <a:solidFill>
                   <a:srgbClr val="000000"/>
                 </a:solidFill>
@@ -28528,14 +28787,14 @@
           </a:ln>
           <a:extLst>
             <a:ext uri="{909E8E84-426E-40dd-AFC4-6F175D3DCCD1}">
-              <a14:hiddenFill xmlns="" xmlns:a14="http://schemas.microsoft.com/office/drawing/2010/main">
+              <a14:hiddenFill xmlns:a14="http://schemas.microsoft.com/office/drawing/2010/main" xmlns="">
                 <a:solidFill>
                   <a:srgbClr val="FFFFFF"/>
                 </a:solidFill>
               </a14:hiddenFill>
             </a:ext>
             <a:ext uri="{91240B29-F687-4f45-9708-019B960494DF}">
-              <a14:hiddenLine xmlns="" xmlns:a14="http://schemas.microsoft.com/office/drawing/2010/main" w="9525">
+              <a14:hiddenLine xmlns:a14="http://schemas.microsoft.com/office/drawing/2010/main" xmlns="" w="9525">
                 <a:solidFill>
                   <a:srgbClr val="000000"/>
                 </a:solidFill>
@@ -28699,14 +28958,14 @@
           </a:ln>
           <a:extLst>
             <a:ext uri="{909E8E84-426E-40dd-AFC4-6F175D3DCCD1}">
-              <a14:hiddenFill xmlns="" xmlns:a14="http://schemas.microsoft.com/office/drawing/2010/main">
+              <a14:hiddenFill xmlns:a14="http://schemas.microsoft.com/office/drawing/2010/main" xmlns="">
                 <a:solidFill>
                   <a:srgbClr val="FFFFFF"/>
                 </a:solidFill>
               </a14:hiddenFill>
             </a:ext>
             <a:ext uri="{91240B29-F687-4f45-9708-019B960494DF}">
-              <a14:hiddenLine xmlns="" xmlns:a14="http://schemas.microsoft.com/office/drawing/2010/main" w="9525">
+              <a14:hiddenLine xmlns:a14="http://schemas.microsoft.com/office/drawing/2010/main" xmlns="" w="9525">
                 <a:solidFill>
                   <a:srgbClr val="000000"/>
                 </a:solidFill>
@@ -28870,14 +29129,14 @@
           </a:ln>
           <a:extLst>
             <a:ext uri="{909E8E84-426E-40dd-AFC4-6F175D3DCCD1}">
-              <a14:hiddenFill xmlns="" xmlns:a14="http://schemas.microsoft.com/office/drawing/2010/main">
+              <a14:hiddenFill xmlns:a14="http://schemas.microsoft.com/office/drawing/2010/main" xmlns="">
                 <a:solidFill>
                   <a:srgbClr val="FFFFFF"/>
                 </a:solidFill>
               </a14:hiddenFill>
             </a:ext>
             <a:ext uri="{91240B29-F687-4f45-9708-019B960494DF}">
-              <a14:hiddenLine xmlns="" xmlns:a14="http://schemas.microsoft.com/office/drawing/2010/main" w="9525">
+              <a14:hiddenLine xmlns:a14="http://schemas.microsoft.com/office/drawing/2010/main" xmlns="" w="9525">
                 <a:solidFill>
                   <a:srgbClr val="000000"/>
                 </a:solidFill>
@@ -29041,14 +29300,14 @@
           </a:ln>
           <a:extLst>
             <a:ext uri="{909E8E84-426E-40dd-AFC4-6F175D3DCCD1}">
-              <a14:hiddenFill xmlns="" xmlns:a14="http://schemas.microsoft.com/office/drawing/2010/main">
+              <a14:hiddenFill xmlns:a14="http://schemas.microsoft.com/office/drawing/2010/main" xmlns="">
                 <a:solidFill>
                   <a:srgbClr val="FFFFFF"/>
                 </a:solidFill>
               </a14:hiddenFill>
             </a:ext>
             <a:ext uri="{91240B29-F687-4f45-9708-019B960494DF}">
-              <a14:hiddenLine xmlns="" xmlns:a14="http://schemas.microsoft.com/office/drawing/2010/main" w="9525">
+              <a14:hiddenLine xmlns:a14="http://schemas.microsoft.com/office/drawing/2010/main" xmlns="" w="9525">
                 <a:solidFill>
                   <a:srgbClr val="000000"/>
                 </a:solidFill>
@@ -31431,7 +31690,7 @@
           </a:ln>
           <a:extLst>
             <a:ext uri="{91240B29-F687-4f45-9708-019B960494DF}">
-              <a14:hiddenLine xmlns="" xmlns:a14="http://schemas.microsoft.com/office/drawing/2010/main" w="9525">
+              <a14:hiddenLine xmlns:a14="http://schemas.microsoft.com/office/drawing/2010/main" xmlns="" w="9525">
                 <a:solidFill>
                   <a:srgbClr val="000000"/>
                 </a:solidFill>
@@ -31889,7 +32148,7 @@
           </a:ln>
           <a:extLst>
             <a:ext uri="{91240B29-F687-4f45-9708-019B960494DF}">
-              <a14:hiddenLine xmlns="" xmlns:a14="http://schemas.microsoft.com/office/drawing/2010/main" w="9525">
+              <a14:hiddenLine xmlns:a14="http://schemas.microsoft.com/office/drawing/2010/main" xmlns="" w="9525">
                 <a:solidFill>
                   <a:srgbClr val="000000"/>
                 </a:solidFill>
@@ -32382,7 +32641,7 @@
             </a:ln>
             <a:extLst>
               <a:ext uri="{91240B29-F687-4f45-9708-019B960494DF}">
-                <a14:hiddenLine xmlns="" xmlns:a14="http://schemas.microsoft.com/office/drawing/2010/main" w="9525">
+                <a14:hiddenLine xmlns:a14="http://schemas.microsoft.com/office/drawing/2010/main" xmlns="" w="9525">
                   <a:solidFill>
                     <a:srgbClr val="000000"/>
                   </a:solidFill>
@@ -33118,7 +33377,7 @@
             </a:ln>
             <a:extLst>
               <a:ext uri="{91240B29-F687-4f45-9708-019B960494DF}">
-                <a14:hiddenLine xmlns="" xmlns:a14="http://schemas.microsoft.com/office/drawing/2010/main" w="9525">
+                <a14:hiddenLine xmlns:a14="http://schemas.microsoft.com/office/drawing/2010/main" xmlns="" w="9525">
                   <a:solidFill>
                     <a:srgbClr val="000000"/>
                   </a:solidFill>
@@ -33305,7 +33564,7 @@
             </a:ln>
             <a:extLst>
               <a:ext uri="{91240B29-F687-4f45-9708-019B960494DF}">
-                <a14:hiddenLine xmlns="" xmlns:a14="http://schemas.microsoft.com/office/drawing/2010/main" w="9525">
+                <a14:hiddenLine xmlns:a14="http://schemas.microsoft.com/office/drawing/2010/main" xmlns="" w="9525">
                   <a:solidFill>
                     <a:srgbClr val="000000"/>
                   </a:solidFill>
@@ -34399,7 +34658,7 @@
             </a:ln>
             <a:extLst>
               <a:ext uri="{91240B29-F687-4f45-9708-019B960494DF}">
-                <a14:hiddenLine xmlns="" xmlns:a14="http://schemas.microsoft.com/office/drawing/2010/main" w="9525">
+                <a14:hiddenLine xmlns:a14="http://schemas.microsoft.com/office/drawing/2010/main" xmlns="" w="9525">
                   <a:solidFill>
                     <a:srgbClr val="000000"/>
                   </a:solidFill>
@@ -35185,7 +35444,7 @@
           </a:ln>
           <a:extLst>
             <a:ext uri="{91240B29-F687-4f45-9708-019B960494DF}">
-              <a14:hiddenLine xmlns="" xmlns:a14="http://schemas.microsoft.com/office/drawing/2010/main" w="9525">
+              <a14:hiddenLine xmlns:a14="http://schemas.microsoft.com/office/drawing/2010/main" xmlns="" w="9525">
                 <a:solidFill>
                   <a:srgbClr val="000000"/>
                 </a:solidFill>
@@ -35228,14 +35487,14 @@
           </a:ln>
           <a:extLst>
             <a:ext uri="{909E8E84-426E-40dd-AFC4-6F175D3DCCD1}">
-              <a14:hiddenFill xmlns="" xmlns:a14="http://schemas.microsoft.com/office/drawing/2010/main">
+              <a14:hiddenFill xmlns:a14="http://schemas.microsoft.com/office/drawing/2010/main" xmlns="">
                 <a:solidFill>
                   <a:srgbClr val="FFFFFF"/>
                 </a:solidFill>
               </a14:hiddenFill>
             </a:ext>
             <a:ext uri="{91240B29-F687-4f45-9708-019B960494DF}">
-              <a14:hiddenLine xmlns="" xmlns:a14="http://schemas.microsoft.com/office/drawing/2010/main" w="9525">
+              <a14:hiddenLine xmlns:a14="http://schemas.microsoft.com/office/drawing/2010/main" xmlns="" w="9525">
                 <a:solidFill>
                   <a:srgbClr val="000000"/>
                 </a:solidFill>
@@ -35399,14 +35658,14 @@
           </a:ln>
           <a:extLst>
             <a:ext uri="{909E8E84-426E-40dd-AFC4-6F175D3DCCD1}">
-              <a14:hiddenFill xmlns="" xmlns:a14="http://schemas.microsoft.com/office/drawing/2010/main">
+              <a14:hiddenFill xmlns:a14="http://schemas.microsoft.com/office/drawing/2010/main" xmlns="">
                 <a:solidFill>
                   <a:srgbClr val="FFFFFF"/>
                 </a:solidFill>
               </a14:hiddenFill>
             </a:ext>
             <a:ext uri="{91240B29-F687-4f45-9708-019B960494DF}">
-              <a14:hiddenLine xmlns="" xmlns:a14="http://schemas.microsoft.com/office/drawing/2010/main" w="9525">
+              <a14:hiddenLine xmlns:a14="http://schemas.microsoft.com/office/drawing/2010/main" xmlns="" w="9525">
                 <a:solidFill>
                   <a:srgbClr val="000000"/>
                 </a:solidFill>
@@ -35704,14 +35963,14 @@
           </a:ln>
           <a:extLst>
             <a:ext uri="{909E8E84-426E-40dd-AFC4-6F175D3DCCD1}">
-              <a14:hiddenFill xmlns="" xmlns:a14="http://schemas.microsoft.com/office/drawing/2010/main">
+              <a14:hiddenFill xmlns:a14="http://schemas.microsoft.com/office/drawing/2010/main" xmlns="">
                 <a:solidFill>
                   <a:srgbClr val="FFFFFF"/>
                 </a:solidFill>
               </a14:hiddenFill>
             </a:ext>
             <a:ext uri="{91240B29-F687-4f45-9708-019B960494DF}">
-              <a14:hiddenLine xmlns="" xmlns:a14="http://schemas.microsoft.com/office/drawing/2010/main" w="9525">
+              <a14:hiddenLine xmlns:a14="http://schemas.microsoft.com/office/drawing/2010/main" xmlns="" w="9525">
                 <a:solidFill>
                   <a:srgbClr val="000000"/>
                 </a:solidFill>
@@ -35758,14 +36017,14 @@
           </a:ln>
           <a:extLst>
             <a:ext uri="{909E8E84-426E-40dd-AFC4-6F175D3DCCD1}">
-              <a14:hiddenFill xmlns="" xmlns:a14="http://schemas.microsoft.com/office/drawing/2010/main">
+              <a14:hiddenFill xmlns:a14="http://schemas.microsoft.com/office/drawing/2010/main" xmlns="">
                 <a:solidFill>
                   <a:srgbClr val="FFFFFF"/>
                 </a:solidFill>
               </a14:hiddenFill>
             </a:ext>
             <a:ext uri="{91240B29-F687-4f45-9708-019B960494DF}">
-              <a14:hiddenLine xmlns="" xmlns:a14="http://schemas.microsoft.com/office/drawing/2010/main" w="9525">
+              <a14:hiddenLine xmlns:a14="http://schemas.microsoft.com/office/drawing/2010/main" xmlns="" w="9525">
                 <a:solidFill>
                   <a:srgbClr val="000000"/>
                 </a:solidFill>
@@ -36287,7 +36546,7 @@
           </a:solidFill>
           <a:extLst>
             <a:ext uri="{91240B29-F687-4f45-9708-019B960494DF}">
-              <a14:hiddenLine xmlns="" xmlns:a14="http://schemas.microsoft.com/office/drawing/2010/main" w="9525">
+              <a14:hiddenLine xmlns:a14="http://schemas.microsoft.com/office/drawing/2010/main" xmlns="" w="9525">
                 <a:solidFill>
                   <a:srgbClr val="000000"/>
                 </a:solidFill>
@@ -36357,7 +36616,7 @@
           </a:solidFill>
           <a:extLst>
             <a:ext uri="{91240B29-F687-4f45-9708-019B960494DF}">
-              <a14:hiddenLine xmlns="" xmlns:a14="http://schemas.microsoft.com/office/drawing/2010/main" w="9525">
+              <a14:hiddenLine xmlns:a14="http://schemas.microsoft.com/office/drawing/2010/main" xmlns="" w="9525">
                 <a:solidFill>
                   <a:srgbClr val="000000"/>
                 </a:solidFill>
@@ -36444,14 +36703,14 @@
           <a:noFill/>
           <a:extLst>
             <a:ext uri="{909E8E84-426E-40dd-AFC4-6F175D3DCCD1}">
-              <a14:hiddenFill xmlns="" xmlns:a14="http://schemas.microsoft.com/office/drawing/2010/main">
+              <a14:hiddenFill xmlns:a14="http://schemas.microsoft.com/office/drawing/2010/main" xmlns="">
                 <a:solidFill>
                   <a:srgbClr val="FFFFFF"/>
                 </a:solidFill>
               </a14:hiddenFill>
             </a:ext>
             <a:ext uri="{91240B29-F687-4f45-9708-019B960494DF}">
-              <a14:hiddenLine xmlns="" xmlns:a14="http://schemas.microsoft.com/office/drawing/2010/main" w="9525">
+              <a14:hiddenLine xmlns:a14="http://schemas.microsoft.com/office/drawing/2010/main" xmlns="" w="9525">
                 <a:solidFill>
                   <a:srgbClr val="000000"/>
                 </a:solidFill>

</xml_diff>

<commit_message>
germ of theory of disease continued
</commit_message>
<xml_diff>
--- a/lecture.pptx
+++ b/lecture.pptx
@@ -5,10 +5,10 @@
     <p:sldMasterId id="2147483875" r:id="rId1"/>
   </p:sldMasterIdLst>
   <p:notesMasterIdLst>
-    <p:notesMasterId r:id="rId36"/>
+    <p:notesMasterId r:id="rId37"/>
   </p:notesMasterIdLst>
   <p:handoutMasterIdLst>
-    <p:handoutMasterId r:id="rId37"/>
+    <p:handoutMasterId r:id="rId38"/>
   </p:handoutMasterIdLst>
   <p:sldIdLst>
     <p:sldId id="256" r:id="rId2"/>
@@ -22,29 +22,30 @@
     <p:sldId id="526" r:id="rId10"/>
     <p:sldId id="318" r:id="rId11"/>
     <p:sldId id="501" r:id="rId12"/>
-    <p:sldId id="525" r:id="rId13"/>
-    <p:sldId id="319" r:id="rId14"/>
-    <p:sldId id="422" r:id="rId15"/>
-    <p:sldId id="423" r:id="rId16"/>
-    <p:sldId id="424" r:id="rId17"/>
-    <p:sldId id="343" r:id="rId18"/>
-    <p:sldId id="523" r:id="rId19"/>
-    <p:sldId id="511" r:id="rId20"/>
-    <p:sldId id="502" r:id="rId21"/>
-    <p:sldId id="503" r:id="rId22"/>
-    <p:sldId id="504" r:id="rId23"/>
-    <p:sldId id="524" r:id="rId24"/>
-    <p:sldId id="513" r:id="rId25"/>
-    <p:sldId id="514" r:id="rId26"/>
-    <p:sldId id="532" r:id="rId27"/>
-    <p:sldId id="533" r:id="rId28"/>
-    <p:sldId id="534" r:id="rId29"/>
-    <p:sldId id="509" r:id="rId30"/>
-    <p:sldId id="510" r:id="rId31"/>
-    <p:sldId id="508" r:id="rId32"/>
-    <p:sldId id="536" r:id="rId33"/>
-    <p:sldId id="537" r:id="rId34"/>
-    <p:sldId id="538" r:id="rId35"/>
+    <p:sldId id="540" r:id="rId13"/>
+    <p:sldId id="525" r:id="rId14"/>
+    <p:sldId id="319" r:id="rId15"/>
+    <p:sldId id="422" r:id="rId16"/>
+    <p:sldId id="423" r:id="rId17"/>
+    <p:sldId id="424" r:id="rId18"/>
+    <p:sldId id="343" r:id="rId19"/>
+    <p:sldId id="523" r:id="rId20"/>
+    <p:sldId id="511" r:id="rId21"/>
+    <p:sldId id="502" r:id="rId22"/>
+    <p:sldId id="503" r:id="rId23"/>
+    <p:sldId id="504" r:id="rId24"/>
+    <p:sldId id="524" r:id="rId25"/>
+    <p:sldId id="513" r:id="rId26"/>
+    <p:sldId id="514" r:id="rId27"/>
+    <p:sldId id="532" r:id="rId28"/>
+    <p:sldId id="533" r:id="rId29"/>
+    <p:sldId id="534" r:id="rId30"/>
+    <p:sldId id="509" r:id="rId31"/>
+    <p:sldId id="510" r:id="rId32"/>
+    <p:sldId id="508" r:id="rId33"/>
+    <p:sldId id="536" r:id="rId34"/>
+    <p:sldId id="537" r:id="rId35"/>
+    <p:sldId id="538" r:id="rId36"/>
   </p:sldIdLst>
   <p:sldSz cx="14630400" cy="8229600"/>
   <p:notesSz cx="6858000" cy="9144000"/>
@@ -1334,6 +1335,350 @@
       </p:grpSpPr>
       <p:sp>
         <p:nvSpPr>
+          <p:cNvPr id="46081" name="Slide Image Placeholder 1"/>
+          <p:cNvSpPr>
+            <a:spLocks noGrp="1" noRot="1" noChangeAspect="1"/>
+          </p:cNvSpPr>
+          <p:nvPr>
+            <p:ph type="sldImg"/>
+          </p:nvPr>
+        </p:nvSpPr>
+        <p:spPr bwMode="auto">
+          <a:noFill/>
+          <a:ln>
+            <a:solidFill>
+              <a:srgbClr val="000000"/>
+            </a:solidFill>
+            <a:miter lim="800000"/>
+            <a:headEnd/>
+            <a:tailEnd/>
+          </a:ln>
+          <a:extLst>
+            <a:ext uri="{909E8E84-426E-40dd-AFC4-6F175D3DCCD1}">
+              <a14:hiddenFill xmlns:a14="http://schemas.microsoft.com/office/drawing/2010/main" xmlns="">
+                <a:solidFill>
+                  <a:srgbClr val="FFFFFF"/>
+                </a:solidFill>
+              </a14:hiddenFill>
+            </a:ext>
+            <a:ext uri="{FAA26D3D-D897-4be2-8F04-BA451C77F1D7}">
+              <ma14:placeholderFlag xmlns:ma14="http://schemas.microsoft.com/office/mac/drawingml/2011/main" xmlns="" val="1"/>
+            </a:ext>
+          </a:extLst>
+        </p:spPr>
+      </p:sp>
+      <p:sp>
+        <p:nvSpPr>
+          <p:cNvPr id="46082" name="Notes Placeholder 2"/>
+          <p:cNvSpPr>
+            <a:spLocks noGrp="1"/>
+          </p:cNvSpPr>
+          <p:nvPr>
+            <p:ph type="body" idx="1"/>
+          </p:nvPr>
+        </p:nvSpPr>
+        <p:spPr bwMode="auto">
+          <a:noFill/>
+          <a:extLst>
+            <a:ext uri="{909E8E84-426E-40dd-AFC4-6F175D3DCCD1}">
+              <a14:hiddenFill xmlns:a14="http://schemas.microsoft.com/office/drawing/2010/main" xmlns="">
+                <a:solidFill>
+                  <a:srgbClr val="FFFFFF"/>
+                </a:solidFill>
+              </a14:hiddenFill>
+            </a:ext>
+            <a:ext uri="{91240B29-F687-4f45-9708-019B960494DF}">
+              <a14:hiddenLine xmlns:a14="http://schemas.microsoft.com/office/drawing/2010/main" xmlns="" w="9525">
+                <a:solidFill>
+                  <a:srgbClr val="000000"/>
+                </a:solidFill>
+                <a:miter lim="800000"/>
+                <a:headEnd/>
+                <a:tailEnd/>
+              </a14:hiddenLine>
+            </a:ext>
+          </a:extLst>
+        </p:spPr>
+        <p:txBody>
+          <a:bodyPr wrap="square" numCol="1" anchor="t" anchorCtr="0" compatLnSpc="1">
+            <a:prstTxWarp prst="textNoShape">
+              <a:avLst/>
+            </a:prstTxWarp>
+          </a:bodyPr>
+          <a:lstStyle/>
+          <a:p>
+            <a:r>
+              <a:rPr lang="en-US" b="0" dirty="0">
+                <a:effectLst/>
+              </a:rPr>
+              <a:t>Picture credit: </a:t>
+            </a:r>
+            <a:r>
+              <a:rPr lang="en-US" dirty="0">
+                <a:hlinkClick r:id="rId3"/>
+              </a:rPr>
+              <a:t>https://www.npr.org/sections/health-shots/2015/01/12/375663920/the-doctor-who-championed-hand-washing-and-saved-women-s-lives</a:t>
+            </a:r>
+            <a:endParaRPr lang="en-US" b="0" dirty="0">
+              <a:effectLst/>
+            </a:endParaRPr>
+          </a:p>
+          <a:p>
+            <a:pPr lvl="3" rtl="0" fontAlgn="base"/>
+            <a:r>
+              <a:rPr lang="en-US" sz="1800" b="0" i="0" u="none" strike="noStrike" kern="1200" dirty="0">
+                <a:solidFill>
+                  <a:schemeClr val="tx1"/>
+                </a:solidFill>
+                <a:effectLst/>
+                <a:latin typeface="BentonSans Book"/>
+                <a:ea typeface="ＭＳ Ｐゴシック" charset="0"/>
+                <a:cs typeface="+mn-cs"/>
+              </a:rPr>
+              <a:t>- Simple Table from 1847</a:t>
+            </a:r>
+          </a:p>
+          <a:p>
+            <a:pPr lvl="3" rtl="0" fontAlgn="base"/>
+            <a:r>
+              <a:rPr lang="en-US" sz="1800" b="0" i="0" u="none" strike="noStrike" kern="1200" dirty="0">
+                <a:solidFill>
+                  <a:schemeClr val="tx1"/>
+                </a:solidFill>
+                <a:effectLst/>
+                <a:latin typeface="BentonSans Book"/>
+                <a:ea typeface="ＭＳ Ｐゴシック" charset="0"/>
+                <a:cs typeface="+mn-cs"/>
+              </a:rPr>
+              <a:t>- Microscopic germs, invisible to the eye, can make us sick!</a:t>
+            </a:r>
+          </a:p>
+          <a:p>
+            <a:pPr lvl="3" rtl="0" fontAlgn="base"/>
+            <a:r>
+              <a:rPr lang="en-US" sz="1800" b="0" i="0" u="none" strike="noStrike" kern="1200" dirty="0">
+                <a:solidFill>
+                  <a:schemeClr val="tx1"/>
+                </a:solidFill>
+                <a:effectLst/>
+                <a:latin typeface="BentonSans Book"/>
+                <a:ea typeface="ＭＳ Ｐゴシック" charset="0"/>
+                <a:cs typeface="+mn-cs"/>
+              </a:rPr>
+              <a:t>- A doctor who doesn’t wash his hands can spread his disease from one person to another</a:t>
+            </a:r>
+          </a:p>
+          <a:p>
+            <a:pPr lvl="3" rtl="0" fontAlgn="base"/>
+            <a:r>
+              <a:rPr lang="en-US" sz="1800" b="0" i="0" u="none" strike="noStrike" kern="1200" dirty="0">
+                <a:solidFill>
+                  <a:schemeClr val="tx1"/>
+                </a:solidFill>
+                <a:effectLst/>
+                <a:latin typeface="BentonSans Book"/>
+                <a:ea typeface="ＭＳ Ｐゴシック" charset="0"/>
+                <a:cs typeface="+mn-cs"/>
+              </a:rPr>
+              <a:t>- Discovery made with data by Ignaz Semmelweis</a:t>
+            </a:r>
+          </a:p>
+          <a:p>
+            <a:pPr lvl="3" rtl="0" fontAlgn="base"/>
+            <a:r>
+              <a:rPr lang="en-US" sz="1800" b="0" i="0" u="none" strike="noStrike" kern="1200" dirty="0">
+                <a:solidFill>
+                  <a:schemeClr val="tx1"/>
+                </a:solidFill>
+                <a:effectLst/>
+                <a:latin typeface="BentonSans Book"/>
+                <a:ea typeface="ＭＳ Ｐゴシック" charset="0"/>
+                <a:cs typeface="+mn-cs"/>
+              </a:rPr>
+              <a:t>- In his first year, in fact in his first six months, using this data right here, after being turned down from a more prestigious job he discovered the Germ Theory of Disease</a:t>
+            </a:r>
+          </a:p>
+          <a:p>
+            <a:pPr lvl="3" rtl="0" fontAlgn="base"/>
+            <a:r>
+              <a:rPr lang="en-US" sz="1800" b="0" i="0" u="none" strike="noStrike" kern="1200" dirty="0">
+                <a:solidFill>
+                  <a:schemeClr val="tx1"/>
+                </a:solidFill>
+                <a:effectLst/>
+                <a:latin typeface="BentonSans Book"/>
+                <a:ea typeface="ＭＳ Ｐゴシック" charset="0"/>
+                <a:cs typeface="+mn-cs"/>
+              </a:rPr>
+              <a:t>- He noticed that doctors coming from autopsies who then delivered babies had dramatically higher maternal mortality rates due to puerperal fever.</a:t>
+            </a:r>
+          </a:p>
+          <a:p>
+            <a:pPr lvl="3" rtl="0" fontAlgn="base"/>
+            <a:r>
+              <a:rPr lang="en-US" sz="1800" b="0" i="0" u="none" strike="noStrike" kern="1200" dirty="0">
+                <a:solidFill>
+                  <a:schemeClr val="tx1"/>
+                </a:solidFill>
+                <a:effectLst/>
+                <a:latin typeface="BentonSans Book"/>
+                <a:ea typeface="ＭＳ Ｐゴシック" charset="0"/>
+                <a:cs typeface="+mn-cs"/>
+              </a:rPr>
+              <a:t>- After asking doctors to wash their hands before examining pregnant women he documented a reduction in mortality rate from 18% to 2.2% over a year</a:t>
+            </a:r>
+          </a:p>
+          <a:p>
+            <a:pPr lvl="3" rtl="0" fontAlgn="base"/>
+            <a:r>
+              <a:rPr lang="en-US" sz="1800" b="0" i="0" u="none" strike="noStrike" kern="1200" dirty="0">
+                <a:solidFill>
+                  <a:schemeClr val="tx1"/>
+                </a:solidFill>
+                <a:effectLst/>
+                <a:latin typeface="BentonSans Book"/>
+                <a:ea typeface="ＭＳ Ｐゴシック" charset="0"/>
+                <a:cs typeface="+mn-cs"/>
+              </a:rPr>
+              <a:t>- He, originally, was mocked for this. He had no explanation but from the data he knew that when doctors washed their hands it saved lives.</a:t>
+            </a:r>
+          </a:p>
+          <a:p>
+            <a:pPr lvl="3" rtl="0" fontAlgn="base"/>
+            <a:r>
+              <a:rPr lang="en-US" sz="1800" b="0" i="0" u="none" strike="noStrike" kern="1200" dirty="0">
+                <a:solidFill>
+                  <a:schemeClr val="tx1"/>
+                </a:solidFill>
+                <a:effectLst/>
+                <a:latin typeface="BentonSans Book"/>
+                <a:ea typeface="ＭＳ Ｐゴシック" charset="0"/>
+                <a:cs typeface="+mn-cs"/>
+              </a:rPr>
+              <a:t>- He died in an insane asylum at age 47 before his theory was ever accepted.</a:t>
+            </a:r>
+          </a:p>
+          <a:p>
+            <a:pPr lvl="3" rtl="0" fontAlgn="base"/>
+            <a:r>
+              <a:rPr lang="en-US" sz="1800" b="0" i="0" u="none" strike="noStrike" kern="1200" dirty="0">
+                <a:solidFill>
+                  <a:schemeClr val="tx1"/>
+                </a:solidFill>
+                <a:effectLst/>
+                <a:latin typeface="BentonSans Book"/>
+                <a:ea typeface="ＭＳ Ｐゴシック" charset="0"/>
+                <a:cs typeface="+mn-cs"/>
+              </a:rPr>
+              <a:t>- A few years after his death in 1865, Louis Pasteur confirmed germ theory and Joseph Lister used their research to practice and operate with hygienic methods with great success.</a:t>
+            </a:r>
+          </a:p>
+          <a:p>
+            <a:pPr lvl="3" rtl="0" fontAlgn="base"/>
+            <a:r>
+              <a:rPr lang="en-US" sz="1800" b="0" i="0" u="none" strike="noStrike" kern="1200" dirty="0">
+                <a:solidFill>
+                  <a:schemeClr val="tx1"/>
+                </a:solidFill>
+                <a:effectLst/>
+                <a:latin typeface="BentonSans Book"/>
+                <a:ea typeface="ＭＳ Ｐゴシック" charset="0"/>
+                <a:cs typeface="+mn-cs"/>
+              </a:rPr>
+              <a:t>- John Snow also contributed to this replacement of miasma theory (disease spread through bad air, even caused by things like bad breath).</a:t>
+            </a:r>
+          </a:p>
+          <a:p>
+            <a:pPr lvl="4" rtl="0" fontAlgn="base"/>
+            <a:r>
+              <a:rPr lang="en-US" sz="1800" b="0" i="0" u="none" strike="noStrike" kern="1200" dirty="0">
+                <a:solidFill>
+                  <a:schemeClr val="tx1"/>
+                </a:solidFill>
+                <a:effectLst/>
+                <a:latin typeface="BentonSans Book"/>
+                <a:ea typeface="ＭＳ Ｐゴシック" charset="0"/>
+                <a:cs typeface="+mn-cs"/>
+              </a:rPr>
+              <a:t>- Game of Thrones!</a:t>
+            </a:r>
+          </a:p>
+          <a:p>
+            <a:pPr lvl="0"/>
+            <a:r>
+              <a:rPr lang="en-US" sz="2000" b="0" i="0" u="none" strike="noStrike" kern="1200" dirty="0">
+                <a:solidFill>
+                  <a:schemeClr val="tx1"/>
+                </a:solidFill>
+                <a:effectLst/>
+                <a:latin typeface="BentonSans Book"/>
+                <a:ea typeface="ＭＳ Ｐゴシック" charset="0"/>
+                <a:cs typeface="ＭＳ Ｐゴシック" charset="0"/>
+              </a:rPr>
+              <a:t>		- Wrote essay called </a:t>
+            </a:r>
+            <a:r>
+              <a:rPr lang="en-US" sz="1800" b="0" i="1" u="none" strike="noStrike" kern="1200" dirty="0">
+                <a:solidFill>
+                  <a:schemeClr val="tx1"/>
+                </a:solidFill>
+                <a:effectLst/>
+                <a:latin typeface="BentonSans Book"/>
+                <a:ea typeface="ＭＳ Ｐゴシック" charset="0"/>
+                <a:cs typeface="ＭＳ Ｐゴシック" charset="0"/>
+              </a:rPr>
+              <a:t>On the Mode of Communication of Cholera </a:t>
+            </a:r>
+            <a:r>
+              <a:rPr lang="en-US" sz="1800" b="0" i="0" u="none" strike="noStrike" kern="1200" dirty="0">
+                <a:solidFill>
+                  <a:schemeClr val="tx1"/>
+                </a:solidFill>
+                <a:effectLst/>
+                <a:latin typeface="BentonSans Book"/>
+                <a:ea typeface="ＭＳ Ｐゴシック" charset="0"/>
+                <a:cs typeface="ＭＳ Ｐゴシック" charset="0"/>
+              </a:rPr>
+              <a:t>in 1849</a:t>
+            </a:r>
+            <a:endParaRPr lang="en-US" dirty="0">
+              <a:latin typeface="BentonSans Book" charset="0"/>
+            </a:endParaRPr>
+          </a:p>
+        </p:txBody>
+      </p:sp>
+    </p:spTree>
+    <p:extLst>
+      <p:ext uri="{BB962C8B-B14F-4D97-AF65-F5344CB8AC3E}">
+        <p14:creationId xmlns:p14="http://schemas.microsoft.com/office/powerpoint/2010/main" val="509396539"/>
+      </p:ext>
+    </p:extLst>
+  </p:cSld>
+  <p:clrMapOvr>
+    <a:masterClrMapping/>
+  </p:clrMapOvr>
+</p:notes>
+</file>
+
+<file path=ppt/notesSlides/notesSlide12.xml><?xml version="1.0" encoding="utf-8"?>
+<p:notes xmlns:a="http://schemas.openxmlformats.org/drawingml/2006/main" xmlns:r="http://schemas.openxmlformats.org/officeDocument/2006/relationships" xmlns:p="http://schemas.openxmlformats.org/presentationml/2006/main">
+  <p:cSld>
+    <p:spTree>
+      <p:nvGrpSpPr>
+        <p:cNvPr id="1" name=""/>
+        <p:cNvGrpSpPr/>
+        <p:nvPr/>
+      </p:nvGrpSpPr>
+      <p:grpSpPr>
+        <a:xfrm>
+          <a:off x="0" y="0"/>
+          <a:ext cx="0" cy="0"/>
+          <a:chOff x="0" y="0"/>
+          <a:chExt cx="0" cy="0"/>
+        </a:xfrm>
+      </p:grpSpPr>
+      <p:sp>
+        <p:nvSpPr>
           <p:cNvPr id="47105" name="Slide Image Placeholder 1"/>
           <p:cNvSpPr>
             <a:spLocks noGrp="1" noRot="1" noChangeAspect="1"/>
@@ -1428,7 +1773,7 @@
 </p:notes>
 </file>
 
-<file path=ppt/notesSlides/notesSlide12.xml><?xml version="1.0" encoding="utf-8"?>
+<file path=ppt/notesSlides/notesSlide13.xml><?xml version="1.0" encoding="utf-8"?>
 <p:notes xmlns:a="http://schemas.openxmlformats.org/drawingml/2006/main" xmlns:r="http://schemas.openxmlformats.org/officeDocument/2006/relationships" xmlns:p="http://schemas.openxmlformats.org/presentationml/2006/main">
   <p:cSld>
     <p:spTree>
@@ -1541,7 +1886,7 @@
 </p:notes>
 </file>
 
-<file path=ppt/notesSlides/notesSlide13.xml><?xml version="1.0" encoding="utf-8"?>
+<file path=ppt/notesSlides/notesSlide14.xml><?xml version="1.0" encoding="utf-8"?>
 <p:notes xmlns:a="http://schemas.openxmlformats.org/drawingml/2006/main" xmlns:r="http://schemas.openxmlformats.org/officeDocument/2006/relationships" xmlns:p="http://schemas.openxmlformats.org/presentationml/2006/main">
   <p:cSld>
     <p:spTree>
@@ -1654,7 +1999,7 @@
 </p:notes>
 </file>
 
-<file path=ppt/notesSlides/notesSlide14.xml><?xml version="1.0" encoding="utf-8"?>
+<file path=ppt/notesSlides/notesSlide15.xml><?xml version="1.0" encoding="utf-8"?>
 <p:notes xmlns:a="http://schemas.openxmlformats.org/drawingml/2006/main" xmlns:r="http://schemas.openxmlformats.org/officeDocument/2006/relationships" xmlns:p="http://schemas.openxmlformats.org/presentationml/2006/main">
   <p:cSld>
     <p:spTree>
@@ -1767,7 +2112,7 @@
 </p:notes>
 </file>
 
-<file path=ppt/notesSlides/notesSlide15.xml><?xml version="1.0" encoding="utf-8"?>
+<file path=ppt/notesSlides/notesSlide16.xml><?xml version="1.0" encoding="utf-8"?>
 <p:notes xmlns:a="http://schemas.openxmlformats.org/drawingml/2006/main" xmlns:r="http://schemas.openxmlformats.org/officeDocument/2006/relationships" xmlns:p="http://schemas.openxmlformats.org/presentationml/2006/main">
   <p:cSld>
     <p:spTree>
@@ -1880,7 +2225,7 @@
 </p:notes>
 </file>
 
-<file path=ppt/notesSlides/notesSlide16.xml><?xml version="1.0" encoding="utf-8"?>
+<file path=ppt/notesSlides/notesSlide17.xml><?xml version="1.0" encoding="utf-8"?>
 <p:notes xmlns:a="http://schemas.openxmlformats.org/drawingml/2006/main" xmlns:r="http://schemas.openxmlformats.org/officeDocument/2006/relationships" xmlns:p="http://schemas.openxmlformats.org/presentationml/2006/main">
   <p:cSld>
     <p:spTree>
@@ -1993,7 +2338,7 @@
 </p:notes>
 </file>
 
-<file path=ppt/notesSlides/notesSlide17.xml><?xml version="1.0" encoding="utf-8"?>
+<file path=ppt/notesSlides/notesSlide18.xml><?xml version="1.0" encoding="utf-8"?>
 <p:notes xmlns:a="http://schemas.openxmlformats.org/drawingml/2006/main" xmlns:r="http://schemas.openxmlformats.org/officeDocument/2006/relationships" xmlns:p="http://schemas.openxmlformats.org/presentationml/2006/main">
   <p:cSld>
     <p:spTree>
@@ -2319,7 +2664,7 @@
 </p:notes>
 </file>
 
-<file path=ppt/notesSlides/notesSlide18.xml><?xml version="1.0" encoding="utf-8"?>
+<file path=ppt/notesSlides/notesSlide19.xml><?xml version="1.0" encoding="utf-8"?>
 <p:notes xmlns:a="http://schemas.openxmlformats.org/drawingml/2006/main" xmlns:r="http://schemas.openxmlformats.org/officeDocument/2006/relationships" xmlns:p="http://schemas.openxmlformats.org/presentationml/2006/main">
   <p:cSld>
     <p:spTree>
@@ -2809,7 +3154,120 @@
 </p:notes>
 </file>
 
-<file path=ppt/notesSlides/notesSlide19.xml><?xml version="1.0" encoding="utf-8"?>
+<file path=ppt/notesSlides/notesSlide2.xml><?xml version="1.0" encoding="utf-8"?>
+<p:notes xmlns:a="http://schemas.openxmlformats.org/drawingml/2006/main" xmlns:r="http://schemas.openxmlformats.org/officeDocument/2006/relationships" xmlns:p="http://schemas.openxmlformats.org/presentationml/2006/main">
+  <p:cSld>
+    <p:spTree>
+      <p:nvGrpSpPr>
+        <p:cNvPr id="1" name=""/>
+        <p:cNvGrpSpPr/>
+        <p:nvPr/>
+      </p:nvGrpSpPr>
+      <p:grpSpPr>
+        <a:xfrm>
+          <a:off x="0" y="0"/>
+          <a:ext cx="0" cy="0"/>
+          <a:chOff x="0" y="0"/>
+          <a:chExt cx="0" cy="0"/>
+        </a:xfrm>
+      </p:grpSpPr>
+      <p:sp>
+        <p:nvSpPr>
+          <p:cNvPr id="37889" name="Slide Image Placeholder 1"/>
+          <p:cNvSpPr>
+            <a:spLocks noGrp="1" noRot="1" noChangeAspect="1"/>
+          </p:cNvSpPr>
+          <p:nvPr>
+            <p:ph type="sldImg"/>
+          </p:nvPr>
+        </p:nvSpPr>
+        <p:spPr bwMode="auto">
+          <a:noFill/>
+          <a:ln>
+            <a:solidFill>
+              <a:srgbClr val="000000"/>
+            </a:solidFill>
+            <a:miter lim="800000"/>
+            <a:headEnd/>
+            <a:tailEnd/>
+          </a:ln>
+          <a:extLst>
+            <a:ext uri="{909E8E84-426E-40dd-AFC4-6F175D3DCCD1}">
+              <a14:hiddenFill xmlns:a14="http://schemas.microsoft.com/office/drawing/2010/main" xmlns="">
+                <a:solidFill>
+                  <a:srgbClr val="FFFFFF"/>
+                </a:solidFill>
+              </a14:hiddenFill>
+            </a:ext>
+            <a:ext uri="{FAA26D3D-D897-4be2-8F04-BA451C77F1D7}">
+              <ma14:placeholderFlag xmlns:ma14="http://schemas.microsoft.com/office/mac/drawingml/2011/main" xmlns="" val="1"/>
+            </a:ext>
+          </a:extLst>
+        </p:spPr>
+      </p:sp>
+      <p:sp>
+        <p:nvSpPr>
+          <p:cNvPr id="37890" name="Notes Placeholder 2"/>
+          <p:cNvSpPr>
+            <a:spLocks noGrp="1"/>
+          </p:cNvSpPr>
+          <p:nvPr>
+            <p:ph type="body" idx="1"/>
+          </p:nvPr>
+        </p:nvSpPr>
+        <p:spPr bwMode="auto">
+          <a:noFill/>
+          <a:extLst>
+            <a:ext uri="{909E8E84-426E-40dd-AFC4-6F175D3DCCD1}">
+              <a14:hiddenFill xmlns:a14="http://schemas.microsoft.com/office/drawing/2010/main" xmlns="">
+                <a:solidFill>
+                  <a:srgbClr val="FFFFFF"/>
+                </a:solidFill>
+              </a14:hiddenFill>
+            </a:ext>
+            <a:ext uri="{91240B29-F687-4f45-9708-019B960494DF}">
+              <a14:hiddenLine xmlns:a14="http://schemas.microsoft.com/office/drawing/2010/main" xmlns="" w="9525">
+                <a:solidFill>
+                  <a:srgbClr val="000000"/>
+                </a:solidFill>
+                <a:miter lim="800000"/>
+                <a:headEnd/>
+                <a:tailEnd/>
+              </a14:hiddenLine>
+            </a:ext>
+          </a:extLst>
+        </p:spPr>
+        <p:txBody>
+          <a:bodyPr wrap="square" numCol="1" anchor="t" anchorCtr="0" compatLnSpc="1">
+            <a:prstTxWarp prst="textNoShape">
+              <a:avLst/>
+            </a:prstTxWarp>
+          </a:bodyPr>
+          <a:lstStyle/>
+          <a:p>
+            <a:pPr>
+              <a:spcBef>
+                <a:spcPct val="0"/>
+              </a:spcBef>
+            </a:pPr>
+            <a:r>
+              <a:rPr lang="en-US">
+                <a:latin typeface="BentonSans Book" charset="0"/>
+              </a:rPr>
+              <a:t>Table of Contents</a:t>
+            </a:r>
+          </a:p>
+        </p:txBody>
+      </p:sp>
+    </p:spTree>
+  </p:cSld>
+  <p:clrMapOvr>
+    <a:masterClrMapping/>
+  </p:clrMapOvr>
+</p:notes>
+</file>
+
+<file path=ppt/notesSlides/notesSlide20.xml><?xml version="1.0" encoding="utf-8"?>
 <p:notes xmlns:a="http://schemas.openxmlformats.org/drawingml/2006/main" xmlns:r="http://schemas.openxmlformats.org/officeDocument/2006/relationships" xmlns:p="http://schemas.openxmlformats.org/presentationml/2006/main">
   <p:cSld>
     <p:spTree>
@@ -3299,120 +3757,7 @@
 </p:notes>
 </file>
 
-<file path=ppt/notesSlides/notesSlide2.xml><?xml version="1.0" encoding="utf-8"?>
-<p:notes xmlns:a="http://schemas.openxmlformats.org/drawingml/2006/main" xmlns:r="http://schemas.openxmlformats.org/officeDocument/2006/relationships" xmlns:p="http://schemas.openxmlformats.org/presentationml/2006/main">
-  <p:cSld>
-    <p:spTree>
-      <p:nvGrpSpPr>
-        <p:cNvPr id="1" name=""/>
-        <p:cNvGrpSpPr/>
-        <p:nvPr/>
-      </p:nvGrpSpPr>
-      <p:grpSpPr>
-        <a:xfrm>
-          <a:off x="0" y="0"/>
-          <a:ext cx="0" cy="0"/>
-          <a:chOff x="0" y="0"/>
-          <a:chExt cx="0" cy="0"/>
-        </a:xfrm>
-      </p:grpSpPr>
-      <p:sp>
-        <p:nvSpPr>
-          <p:cNvPr id="37889" name="Slide Image Placeholder 1"/>
-          <p:cNvSpPr>
-            <a:spLocks noGrp="1" noRot="1" noChangeAspect="1"/>
-          </p:cNvSpPr>
-          <p:nvPr>
-            <p:ph type="sldImg"/>
-          </p:nvPr>
-        </p:nvSpPr>
-        <p:spPr bwMode="auto">
-          <a:noFill/>
-          <a:ln>
-            <a:solidFill>
-              <a:srgbClr val="000000"/>
-            </a:solidFill>
-            <a:miter lim="800000"/>
-            <a:headEnd/>
-            <a:tailEnd/>
-          </a:ln>
-          <a:extLst>
-            <a:ext uri="{909E8E84-426E-40dd-AFC4-6F175D3DCCD1}">
-              <a14:hiddenFill xmlns:a14="http://schemas.microsoft.com/office/drawing/2010/main" xmlns="">
-                <a:solidFill>
-                  <a:srgbClr val="FFFFFF"/>
-                </a:solidFill>
-              </a14:hiddenFill>
-            </a:ext>
-            <a:ext uri="{FAA26D3D-D897-4be2-8F04-BA451C77F1D7}">
-              <ma14:placeholderFlag xmlns:ma14="http://schemas.microsoft.com/office/mac/drawingml/2011/main" xmlns="" val="1"/>
-            </a:ext>
-          </a:extLst>
-        </p:spPr>
-      </p:sp>
-      <p:sp>
-        <p:nvSpPr>
-          <p:cNvPr id="37890" name="Notes Placeholder 2"/>
-          <p:cNvSpPr>
-            <a:spLocks noGrp="1"/>
-          </p:cNvSpPr>
-          <p:nvPr>
-            <p:ph type="body" idx="1"/>
-          </p:nvPr>
-        </p:nvSpPr>
-        <p:spPr bwMode="auto">
-          <a:noFill/>
-          <a:extLst>
-            <a:ext uri="{909E8E84-426E-40dd-AFC4-6F175D3DCCD1}">
-              <a14:hiddenFill xmlns:a14="http://schemas.microsoft.com/office/drawing/2010/main" xmlns="">
-                <a:solidFill>
-                  <a:srgbClr val="FFFFFF"/>
-                </a:solidFill>
-              </a14:hiddenFill>
-            </a:ext>
-            <a:ext uri="{91240B29-F687-4f45-9708-019B960494DF}">
-              <a14:hiddenLine xmlns:a14="http://schemas.microsoft.com/office/drawing/2010/main" xmlns="" w="9525">
-                <a:solidFill>
-                  <a:srgbClr val="000000"/>
-                </a:solidFill>
-                <a:miter lim="800000"/>
-                <a:headEnd/>
-                <a:tailEnd/>
-              </a14:hiddenLine>
-            </a:ext>
-          </a:extLst>
-        </p:spPr>
-        <p:txBody>
-          <a:bodyPr wrap="square" numCol="1" anchor="t" anchorCtr="0" compatLnSpc="1">
-            <a:prstTxWarp prst="textNoShape">
-              <a:avLst/>
-            </a:prstTxWarp>
-          </a:bodyPr>
-          <a:lstStyle/>
-          <a:p>
-            <a:pPr>
-              <a:spcBef>
-                <a:spcPct val="0"/>
-              </a:spcBef>
-            </a:pPr>
-            <a:r>
-              <a:rPr lang="en-US">
-                <a:latin typeface="BentonSans Book" charset="0"/>
-              </a:rPr>
-              <a:t>Table of Contents</a:t>
-            </a:r>
-          </a:p>
-        </p:txBody>
-      </p:sp>
-    </p:spTree>
-  </p:cSld>
-  <p:clrMapOvr>
-    <a:masterClrMapping/>
-  </p:clrMapOvr>
-</p:notes>
-</file>
-
-<file path=ppt/notesSlides/notesSlide20.xml><?xml version="1.0" encoding="utf-8"?>
+<file path=ppt/notesSlides/notesSlide21.xml><?xml version="1.0" encoding="utf-8"?>
 <p:notes xmlns:a="http://schemas.openxmlformats.org/drawingml/2006/main" xmlns:r="http://schemas.openxmlformats.org/officeDocument/2006/relationships" xmlns:p="http://schemas.openxmlformats.org/presentationml/2006/main">
   <p:cSld>
     <p:spTree>
@@ -3902,7 +4247,7 @@
 </p:notes>
 </file>
 
-<file path=ppt/notesSlides/notesSlide21.xml><?xml version="1.0" encoding="utf-8"?>
+<file path=ppt/notesSlides/notesSlide22.xml><?xml version="1.0" encoding="utf-8"?>
 <p:notes xmlns:a="http://schemas.openxmlformats.org/drawingml/2006/main" xmlns:r="http://schemas.openxmlformats.org/officeDocument/2006/relationships" xmlns:p="http://schemas.openxmlformats.org/presentationml/2006/main">
   <p:cSld>
     <p:spTree>
@@ -4392,7 +4737,7 @@
 </p:notes>
 </file>
 
-<file path=ppt/notesSlides/notesSlide22.xml><?xml version="1.0" encoding="utf-8"?>
+<file path=ppt/notesSlides/notesSlide23.xml><?xml version="1.0" encoding="utf-8"?>
 <p:notes xmlns:a="http://schemas.openxmlformats.org/drawingml/2006/main" xmlns:r="http://schemas.openxmlformats.org/officeDocument/2006/relationships" xmlns:p="http://schemas.openxmlformats.org/presentationml/2006/main">
   <p:cSld>
     <p:spTree>
@@ -4882,7 +5227,7 @@
 </p:notes>
 </file>
 
-<file path=ppt/notesSlides/notesSlide23.xml><?xml version="1.0" encoding="utf-8"?>
+<file path=ppt/notesSlides/notesSlide24.xml><?xml version="1.0" encoding="utf-8"?>
 <p:notes xmlns:a="http://schemas.openxmlformats.org/drawingml/2006/main" xmlns:r="http://schemas.openxmlformats.org/officeDocument/2006/relationships" xmlns:p="http://schemas.openxmlformats.org/presentationml/2006/main">
   <p:cSld>
     <p:spTree>
@@ -5372,7 +5717,7 @@
 </p:notes>
 </file>
 
-<file path=ppt/notesSlides/notesSlide24.xml><?xml version="1.0" encoding="utf-8"?>
+<file path=ppt/notesSlides/notesSlide25.xml><?xml version="1.0" encoding="utf-8"?>
 <p:notes xmlns:a="http://schemas.openxmlformats.org/drawingml/2006/main" xmlns:r="http://schemas.openxmlformats.org/officeDocument/2006/relationships" xmlns:p="http://schemas.openxmlformats.org/presentationml/2006/main">
   <p:cSld>
     <p:spTree>
@@ -5490,7 +5835,7 @@
 </p:notes>
 </file>
 
-<file path=ppt/notesSlides/notesSlide25.xml><?xml version="1.0" encoding="utf-8"?>
+<file path=ppt/notesSlides/notesSlide26.xml><?xml version="1.0" encoding="utf-8"?>
 <p:notes xmlns:a="http://schemas.openxmlformats.org/drawingml/2006/main" xmlns:r="http://schemas.openxmlformats.org/officeDocument/2006/relationships" xmlns:p="http://schemas.openxmlformats.org/presentationml/2006/main">
   <p:cSld>
     <p:spTree>
@@ -9871,7 +10216,7 @@
             </a:pPr>
             <a:r>
               <a:rPr lang="en-US" dirty="0"/>
-              <a:t>Noticed births assisted by doctors had significantly higher mortality rates than those assisted by midwives</a:t>
+              <a:t>Births assisted by doctors had higher mortality rates than those assisted by midwives</a:t>
             </a:r>
           </a:p>
           <a:p>
@@ -9982,6 +10327,292 @@
 </file>
 
 <file path=ppt/slides/slide12.xml><?xml version="1.0" encoding="utf-8"?>
+<p:sld xmlns:a="http://schemas.openxmlformats.org/drawingml/2006/main" xmlns:r="http://schemas.openxmlformats.org/officeDocument/2006/relationships" xmlns:p="http://schemas.openxmlformats.org/presentationml/2006/main">
+  <p:cSld>
+    <p:spTree>
+      <p:nvGrpSpPr>
+        <p:cNvPr id="1" name=""/>
+        <p:cNvGrpSpPr/>
+        <p:nvPr/>
+      </p:nvGrpSpPr>
+      <p:grpSpPr>
+        <a:xfrm>
+          <a:off x="0" y="0"/>
+          <a:ext cx="0" cy="0"/>
+          <a:chOff x="0" y="0"/>
+          <a:chExt cx="0" cy="0"/>
+        </a:xfrm>
+      </p:grpSpPr>
+      <p:sp>
+        <p:nvSpPr>
+          <p:cNvPr id="4" name="Content Placeholder 3"/>
+          <p:cNvSpPr>
+            <a:spLocks noGrp="1"/>
+          </p:cNvSpPr>
+          <p:nvPr>
+            <p:ph idx="13"/>
+          </p:nvPr>
+        </p:nvSpPr>
+        <p:spPr>
+          <a:xfrm>
+            <a:off x="7329803" y="1887752"/>
+            <a:ext cx="6649347" cy="5084469"/>
+          </a:xfrm>
+        </p:spPr>
+        <p:txBody>
+          <a:bodyPr/>
+          <a:lstStyle/>
+          <a:p>
+            <a:pPr marL="457200" indent="-457200" defTabSz="1306221" fontAlgn="auto">
+              <a:buFont typeface="Arial" panose="020B0604020202020204" pitchFamily="34" charset="0"/>
+              <a:buChar char="•"/>
+              <a:defRPr/>
+            </a:pPr>
+            <a:r>
+              <a:rPr lang="en-US" dirty="0"/>
+              <a:t>Germ Theory of Disease</a:t>
+            </a:r>
+          </a:p>
+          <a:p>
+            <a:pPr marL="457200" indent="-457200" defTabSz="1306221" fontAlgn="auto">
+              <a:buFont typeface="Arial" panose="020B0604020202020204" pitchFamily="34" charset="0"/>
+              <a:buChar char="•"/>
+              <a:defRPr/>
+            </a:pPr>
+            <a:r>
+              <a:rPr lang="en-US" dirty="0"/>
+              <a:t>Replaced Miasma theory</a:t>
+            </a:r>
+          </a:p>
+          <a:p>
+            <a:pPr marL="457200" indent="-457200" defTabSz="1306221" fontAlgn="auto">
+              <a:buFont typeface="Arial" panose="020B0604020202020204" pitchFamily="34" charset="0"/>
+              <a:buChar char="•"/>
+              <a:defRPr/>
+            </a:pPr>
+            <a:r>
+              <a:rPr lang="en-US" dirty="0"/>
+              <a:t>Saved </a:t>
+            </a:r>
+            <a:r>
+              <a:rPr lang="en-US" b="1" dirty="0"/>
+              <a:t>many</a:t>
+            </a:r>
+            <a:r>
+              <a:rPr lang="en-US" i="1" dirty="0"/>
+              <a:t> </a:t>
+            </a:r>
+            <a:r>
+              <a:rPr lang="en-US" dirty="0"/>
+              <a:t>lives</a:t>
+            </a:r>
+          </a:p>
+          <a:p>
+            <a:pPr marL="457200" indent="-457200" defTabSz="1306221" fontAlgn="auto">
+              <a:buFont typeface="Arial" panose="020B0604020202020204" pitchFamily="34" charset="0"/>
+              <a:buChar char="•"/>
+              <a:defRPr/>
+            </a:pPr>
+            <a:r>
+              <a:rPr lang="en-US" dirty="0"/>
+              <a:t>Community did not accept it</a:t>
+            </a:r>
+          </a:p>
+          <a:p>
+            <a:pPr marL="457200" indent="-457200" defTabSz="1306221" fontAlgn="auto">
+              <a:buFont typeface="Arial" panose="020B0604020202020204" pitchFamily="34" charset="0"/>
+              <a:buChar char="•"/>
+              <a:defRPr/>
+            </a:pPr>
+            <a:r>
+              <a:rPr lang="en-US" dirty="0"/>
+              <a:t>Died in an insane asylum</a:t>
+            </a:r>
+          </a:p>
+          <a:p>
+            <a:pPr marL="457200" indent="-457200" defTabSz="1306221" fontAlgn="auto">
+              <a:buFont typeface="Arial" panose="020B0604020202020204" pitchFamily="34" charset="0"/>
+              <a:buChar char="•"/>
+              <a:defRPr/>
+            </a:pPr>
+            <a:r>
+              <a:rPr lang="en-US" dirty="0"/>
+              <a:t>Jo</a:t>
+            </a:r>
+            <a:r>
+              <a:rPr lang="en-US" strike="sngStrike" dirty="0"/>
+              <a:t>h</a:t>
+            </a:r>
+            <a:r>
+              <a:rPr lang="en-US" dirty="0"/>
+              <a:t>n Snow!</a:t>
+            </a:r>
+          </a:p>
+          <a:p>
+            <a:pPr marL="796925" lvl="1" indent="-457200" defTabSz="1306221" fontAlgn="auto">
+              <a:buFont typeface="Arial" panose="020B0604020202020204" pitchFamily="34" charset="0"/>
+              <a:buChar char="•"/>
+              <a:defRPr/>
+            </a:pPr>
+            <a:r>
+              <a:rPr lang="en-US" dirty="0"/>
+              <a:t>With research from Louis Pasteur, Joseph Lister and others confirmed the theory</a:t>
+            </a:r>
+          </a:p>
+          <a:p>
+            <a:pPr marL="796925" lvl="1" indent="-457200" defTabSz="1306221" fontAlgn="auto">
+              <a:buFont typeface="Arial" panose="020B0604020202020204" pitchFamily="34" charset="0"/>
+              <a:buChar char="•"/>
+              <a:defRPr/>
+            </a:pPr>
+            <a:r>
+              <a:rPr lang="en-US" dirty="0"/>
+              <a:t>Wrote persuasive essay called </a:t>
+            </a:r>
+            <a:r>
+              <a:rPr lang="en-US" i="1" dirty="0"/>
+              <a:t>On the Mode of Communication of Cholera</a:t>
+            </a:r>
+            <a:r>
+              <a:rPr lang="en-US" dirty="0"/>
+              <a:t> (1849)</a:t>
+            </a:r>
+          </a:p>
+          <a:p>
+            <a:pPr marL="796925" lvl="1" indent="-457200" defTabSz="1306221" fontAlgn="auto">
+              <a:buFont typeface="Arial" panose="020B0604020202020204" pitchFamily="34" charset="0"/>
+              <a:buChar char="•"/>
+              <a:defRPr/>
+            </a:pPr>
+            <a:endParaRPr lang="en-US" dirty="0"/>
+          </a:p>
+        </p:txBody>
+      </p:sp>
+      <p:pic>
+        <p:nvPicPr>
+          <p:cNvPr id="6" name="Picture Placeholder 5">
+            <a:extLst>
+              <a:ext uri="{FF2B5EF4-FFF2-40B4-BE49-F238E27FC236}">
+                <a16:creationId xmlns:a16="http://schemas.microsoft.com/office/drawing/2014/main" id="{070D9BDA-892E-4AE2-97F5-F56E3AC1B5E4}"/>
+              </a:ext>
+            </a:extLst>
+          </p:cNvPr>
+          <p:cNvPicPr>
+            <a:picLocks noGrp="1" noChangeAspect="1"/>
+          </p:cNvPicPr>
+          <p:nvPr>
+            <p:ph type="pic" sz="quarter" idx="10"/>
+          </p:nvPr>
+        </p:nvPicPr>
+        <p:blipFill>
+          <a:blip r:embed="rId3">
+            <a:extLst>
+              <a:ext uri="{28A0092B-C50C-407E-A947-70E740481C1C}">
+                <a14:useLocalDpi xmlns:a14="http://schemas.microsoft.com/office/drawing/2010/main" val="0"/>
+              </a:ext>
+            </a:extLst>
+          </a:blip>
+          <a:srcRect l="18766" r="18766"/>
+          <a:stretch>
+            <a:fillRect/>
+          </a:stretch>
+        </p:blipFill>
+        <p:spPr/>
+      </p:pic>
+      <p:sp>
+        <p:nvSpPr>
+          <p:cNvPr id="5" name="Text Placeholder 1"/>
+          <p:cNvSpPr>
+            <a:spLocks noGrp="1"/>
+          </p:cNvSpPr>
+          <p:nvPr>
+            <p:ph type="body" sz="quarter" idx="12"/>
+          </p:nvPr>
+        </p:nvSpPr>
+        <p:spPr>
+          <a:xfrm>
+            <a:off x="710057" y="598699"/>
+            <a:ext cx="13269093" cy="1009507"/>
+          </a:xfrm>
+          <a:prstGeom prst="rect">
+            <a:avLst/>
+          </a:prstGeom>
+        </p:spPr>
+        <p:txBody>
+          <a:bodyPr/>
+          <a:lstStyle/>
+          <a:p>
+            <a:pPr defTabSz="1306221" fontAlgn="auto">
+              <a:defRPr/>
+            </a:pPr>
+            <a:r>
+              <a:rPr lang="en-US" sz="8000" dirty="0"/>
+              <a:t>Ignaz Semmelweis (continued)</a:t>
+            </a:r>
+          </a:p>
+        </p:txBody>
+      </p:sp>
+      <p:pic>
+        <p:nvPicPr>
+          <p:cNvPr id="1030" name="Picture 6">
+            <a:extLst>
+              <a:ext uri="{FF2B5EF4-FFF2-40B4-BE49-F238E27FC236}">
+                <a16:creationId xmlns:a16="http://schemas.microsoft.com/office/drawing/2014/main" id="{364361C8-B591-4D47-BCFE-E8B0AB54CE54}"/>
+              </a:ext>
+            </a:extLst>
+          </p:cNvPr>
+          <p:cNvPicPr>
+            <a:picLocks noChangeAspect="1" noChangeArrowheads="1"/>
+          </p:cNvPicPr>
+          <p:nvPr/>
+        </p:nvPicPr>
+        <p:blipFill>
+          <a:blip r:embed="rId4">
+            <a:extLst>
+              <a:ext uri="{28A0092B-C50C-407E-A947-70E740481C1C}">
+                <a14:useLocalDpi xmlns:a14="http://schemas.microsoft.com/office/drawing/2010/main" val="0"/>
+              </a:ext>
+            </a:extLst>
+          </a:blip>
+          <a:srcRect/>
+          <a:stretch>
+            <a:fillRect/>
+          </a:stretch>
+        </p:blipFill>
+        <p:spPr bwMode="auto">
+          <a:xfrm>
+            <a:off x="1083612" y="1869073"/>
+            <a:ext cx="5395241" cy="5395241"/>
+          </a:xfrm>
+          <a:prstGeom prst="rect">
+            <a:avLst/>
+          </a:prstGeom>
+          <a:noFill/>
+          <a:extLst>
+            <a:ext uri="{909E8E84-426E-40DD-AFC4-6F175D3DCCD1}">
+              <a14:hiddenFill xmlns:a14="http://schemas.microsoft.com/office/drawing/2010/main">
+                <a:solidFill>
+                  <a:srgbClr val="FFFFFF"/>
+                </a:solidFill>
+              </a14:hiddenFill>
+            </a:ext>
+          </a:extLst>
+        </p:spPr>
+      </p:pic>
+    </p:spTree>
+    <p:extLst>
+      <p:ext uri="{BB962C8B-B14F-4D97-AF65-F5344CB8AC3E}">
+        <p14:creationId xmlns:p14="http://schemas.microsoft.com/office/powerpoint/2010/main" val="797736528"/>
+      </p:ext>
+    </p:extLst>
+  </p:cSld>
+  <p:clrMapOvr>
+    <a:masterClrMapping/>
+  </p:clrMapOvr>
+</p:sld>
+</file>
+
+<file path=ppt/slides/slide13.xml><?xml version="1.0" encoding="utf-8"?>
 <p:sld xmlns:a="http://schemas.openxmlformats.org/drawingml/2006/main" xmlns:r="http://schemas.openxmlformats.org/officeDocument/2006/relationships" xmlns:p="http://schemas.openxmlformats.org/presentationml/2006/main">
   <p:cSld>
     <p:spTree>
@@ -10161,7 +10792,7 @@
 </p:sld>
 </file>
 
-<file path=ppt/slides/slide13.xml><?xml version="1.0" encoding="utf-8"?>
+<file path=ppt/slides/slide14.xml><?xml version="1.0" encoding="utf-8"?>
 <p:sld xmlns:a="http://schemas.openxmlformats.org/drawingml/2006/main" xmlns:r="http://schemas.openxmlformats.org/officeDocument/2006/relationships" xmlns:p="http://schemas.openxmlformats.org/presentationml/2006/main">
   <p:cSld>
     <p:spTree>
@@ -10255,7 +10886,7 @@
 </p:sld>
 </file>
 
-<file path=ppt/slides/slide14.xml><?xml version="1.0" encoding="utf-8"?>
+<file path=ppt/slides/slide15.xml><?xml version="1.0" encoding="utf-8"?>
 <p:sld xmlns:a="http://schemas.openxmlformats.org/drawingml/2006/main" xmlns:r="http://schemas.openxmlformats.org/officeDocument/2006/relationships" xmlns:p="http://schemas.openxmlformats.org/presentationml/2006/main">
   <p:cSld>
     <p:spTree>
@@ -10356,7 +10987,7 @@
 </p:sld>
 </file>
 
-<file path=ppt/slides/slide15.xml><?xml version="1.0" encoding="utf-8"?>
+<file path=ppt/slides/slide16.xml><?xml version="1.0" encoding="utf-8"?>
 <p:sld xmlns:a="http://schemas.openxmlformats.org/drawingml/2006/main" xmlns:r="http://schemas.openxmlformats.org/officeDocument/2006/relationships" xmlns:p="http://schemas.openxmlformats.org/presentationml/2006/main">
   <p:cSld>
     <p:spTree>
@@ -10428,7 +11059,7 @@
 </p:sld>
 </file>
 
-<file path=ppt/slides/slide16.xml><?xml version="1.0" encoding="utf-8"?>
+<file path=ppt/slides/slide17.xml><?xml version="1.0" encoding="utf-8"?>
 <p:sld xmlns:a="http://schemas.openxmlformats.org/drawingml/2006/main" xmlns:r="http://schemas.openxmlformats.org/officeDocument/2006/relationships" xmlns:p="http://schemas.openxmlformats.org/presentationml/2006/main">
   <p:cSld>
     <p:spTree>
@@ -10476,7 +11107,7 @@
 </p:sld>
 </file>
 
-<file path=ppt/slides/slide17.xml><?xml version="1.0" encoding="utf-8"?>
+<file path=ppt/slides/slide18.xml><?xml version="1.0" encoding="utf-8"?>
 <p:sld xmlns:a="http://schemas.openxmlformats.org/drawingml/2006/main" xmlns:r="http://schemas.openxmlformats.org/officeDocument/2006/relationships" xmlns:p="http://schemas.openxmlformats.org/presentationml/2006/main">
   <p:cSld>
     <p:spTree>
@@ -10565,7 +11196,7 @@
 </p:sld>
 </file>
 
-<file path=ppt/slides/slide18.xml><?xml version="1.0" encoding="utf-8"?>
+<file path=ppt/slides/slide19.xml><?xml version="1.0" encoding="utf-8"?>
 <p:sld xmlns:a="http://schemas.openxmlformats.org/drawingml/2006/main" xmlns:r="http://schemas.openxmlformats.org/officeDocument/2006/relationships" xmlns:p="http://schemas.openxmlformats.org/presentationml/2006/main">
   <p:cSld>
     <p:spTree>
@@ -10622,7 +11253,114 @@
 </p:sld>
 </file>
 
-<file path=ppt/slides/slide19.xml><?xml version="1.0" encoding="utf-8"?>
+<file path=ppt/slides/slide2.xml><?xml version="1.0" encoding="utf-8"?>
+<p:sld xmlns:a="http://schemas.openxmlformats.org/drawingml/2006/main" xmlns:r="http://schemas.openxmlformats.org/officeDocument/2006/relationships" xmlns:p="http://schemas.openxmlformats.org/presentationml/2006/main">
+  <p:cSld>
+    <p:spTree>
+      <p:nvGrpSpPr>
+        <p:cNvPr id="1" name=""/>
+        <p:cNvGrpSpPr/>
+        <p:nvPr/>
+      </p:nvGrpSpPr>
+      <p:grpSpPr>
+        <a:xfrm>
+          <a:off x="0" y="0"/>
+          <a:ext cx="0" cy="0"/>
+          <a:chOff x="0" y="0"/>
+          <a:chExt cx="0" cy="0"/>
+        </a:xfrm>
+      </p:grpSpPr>
+      <p:sp>
+        <p:nvSpPr>
+          <p:cNvPr id="2" name="Content Placeholder 1"/>
+          <p:cNvSpPr>
+            <a:spLocks noGrp="1"/>
+          </p:cNvSpPr>
+          <p:nvPr>
+            <p:ph idx="14"/>
+          </p:nvPr>
+        </p:nvSpPr>
+        <p:spPr>
+          <a:xfrm>
+            <a:off x="704476" y="1893515"/>
+            <a:ext cx="13273820" cy="815608"/>
+          </a:xfrm>
+        </p:spPr>
+        <p:txBody>
+          <a:bodyPr/>
+          <a:lstStyle/>
+          <a:p>
+            <a:pPr marL="457200" indent="-457200" defTabSz="1306221" fontAlgn="auto">
+              <a:defRPr/>
+            </a:pPr>
+            <a:r>
+              <a:rPr lang="en-US" sz="2400" dirty="0">
+                <a:ea typeface="+mn-ea"/>
+              </a:rPr>
+              <a:t>Anime, spicy food, Japan, David, Tableau</a:t>
+            </a:r>
+          </a:p>
+          <a:p>
+            <a:pPr marL="457200" indent="-457200" defTabSz="1306221" fontAlgn="auto">
+              <a:defRPr/>
+            </a:pPr>
+            <a:endParaRPr lang="en-US" sz="2400" dirty="0">
+              <a:ea typeface="+mn-ea"/>
+            </a:endParaRPr>
+          </a:p>
+        </p:txBody>
+      </p:sp>
+      <p:sp>
+        <p:nvSpPr>
+          <p:cNvPr id="3" name="Text Placeholder 2"/>
+          <p:cNvSpPr>
+            <a:spLocks noGrp="1"/>
+          </p:cNvSpPr>
+          <p:nvPr>
+            <p:ph type="body" sz="quarter" idx="12"/>
+          </p:nvPr>
+        </p:nvSpPr>
+        <p:spPr>
+          <a:prstGeom prst="rect">
+            <a:avLst/>
+          </a:prstGeom>
+        </p:spPr>
+        <p:txBody>
+          <a:bodyPr/>
+          <a:lstStyle/>
+          <a:p>
+            <a:pPr defTabSz="1306221" fontAlgn="auto">
+              <a:spcAft>
+                <a:spcPts val="0"/>
+              </a:spcAft>
+              <a:defRPr/>
+            </a:pPr>
+            <a:r>
+              <a:rPr lang="en-US">
+                <a:ea typeface="+mn-ea"/>
+              </a:rPr>
+              <a:t>About Me</a:t>
+            </a:r>
+            <a:endParaRPr lang="en-US" dirty="0">
+              <a:ea typeface="+mn-ea"/>
+            </a:endParaRPr>
+          </a:p>
+        </p:txBody>
+      </p:sp>
+    </p:spTree>
+    <p:extLst>
+      <p:ext uri="{BB962C8B-B14F-4D97-AF65-F5344CB8AC3E}">
+        <p14:creationId xmlns:p14="http://schemas.microsoft.com/office/powerpoint/2010/main" val="609250667"/>
+      </p:ext>
+    </p:extLst>
+  </p:cSld>
+  <p:clrMapOvr>
+    <a:masterClrMapping/>
+  </p:clrMapOvr>
+</p:sld>
+</file>
+
+<file path=ppt/slides/slide20.xml><?xml version="1.0" encoding="utf-8"?>
 <p:sld xmlns:a="http://schemas.openxmlformats.org/drawingml/2006/main" xmlns:r="http://schemas.openxmlformats.org/officeDocument/2006/relationships" xmlns:p="http://schemas.openxmlformats.org/presentationml/2006/main">
   <p:cSld>
     <p:spTree>
@@ -10830,114 +11568,7 @@
 </p:sld>
 </file>
 
-<file path=ppt/slides/slide2.xml><?xml version="1.0" encoding="utf-8"?>
-<p:sld xmlns:a="http://schemas.openxmlformats.org/drawingml/2006/main" xmlns:r="http://schemas.openxmlformats.org/officeDocument/2006/relationships" xmlns:p="http://schemas.openxmlformats.org/presentationml/2006/main">
-  <p:cSld>
-    <p:spTree>
-      <p:nvGrpSpPr>
-        <p:cNvPr id="1" name=""/>
-        <p:cNvGrpSpPr/>
-        <p:nvPr/>
-      </p:nvGrpSpPr>
-      <p:grpSpPr>
-        <a:xfrm>
-          <a:off x="0" y="0"/>
-          <a:ext cx="0" cy="0"/>
-          <a:chOff x="0" y="0"/>
-          <a:chExt cx="0" cy="0"/>
-        </a:xfrm>
-      </p:grpSpPr>
-      <p:sp>
-        <p:nvSpPr>
-          <p:cNvPr id="2" name="Content Placeholder 1"/>
-          <p:cNvSpPr>
-            <a:spLocks noGrp="1"/>
-          </p:cNvSpPr>
-          <p:nvPr>
-            <p:ph idx="14"/>
-          </p:nvPr>
-        </p:nvSpPr>
-        <p:spPr>
-          <a:xfrm>
-            <a:off x="704476" y="1893515"/>
-            <a:ext cx="13273820" cy="815608"/>
-          </a:xfrm>
-        </p:spPr>
-        <p:txBody>
-          <a:bodyPr/>
-          <a:lstStyle/>
-          <a:p>
-            <a:pPr marL="457200" indent="-457200" defTabSz="1306221" fontAlgn="auto">
-              <a:defRPr/>
-            </a:pPr>
-            <a:r>
-              <a:rPr lang="en-US" sz="2400" dirty="0">
-                <a:ea typeface="+mn-ea"/>
-              </a:rPr>
-              <a:t>Anime, spicy food, Japan, David, Tableau</a:t>
-            </a:r>
-          </a:p>
-          <a:p>
-            <a:pPr marL="457200" indent="-457200" defTabSz="1306221" fontAlgn="auto">
-              <a:defRPr/>
-            </a:pPr>
-            <a:endParaRPr lang="en-US" sz="2400" dirty="0">
-              <a:ea typeface="+mn-ea"/>
-            </a:endParaRPr>
-          </a:p>
-        </p:txBody>
-      </p:sp>
-      <p:sp>
-        <p:nvSpPr>
-          <p:cNvPr id="3" name="Text Placeholder 2"/>
-          <p:cNvSpPr>
-            <a:spLocks noGrp="1"/>
-          </p:cNvSpPr>
-          <p:nvPr>
-            <p:ph type="body" sz="quarter" idx="12"/>
-          </p:nvPr>
-        </p:nvSpPr>
-        <p:spPr>
-          <a:prstGeom prst="rect">
-            <a:avLst/>
-          </a:prstGeom>
-        </p:spPr>
-        <p:txBody>
-          <a:bodyPr/>
-          <a:lstStyle/>
-          <a:p>
-            <a:pPr defTabSz="1306221" fontAlgn="auto">
-              <a:spcAft>
-                <a:spcPts val="0"/>
-              </a:spcAft>
-              <a:defRPr/>
-            </a:pPr>
-            <a:r>
-              <a:rPr lang="en-US">
-                <a:ea typeface="+mn-ea"/>
-              </a:rPr>
-              <a:t>About Me</a:t>
-            </a:r>
-            <a:endParaRPr lang="en-US" dirty="0">
-              <a:ea typeface="+mn-ea"/>
-            </a:endParaRPr>
-          </a:p>
-        </p:txBody>
-      </p:sp>
-    </p:spTree>
-    <p:extLst>
-      <p:ext uri="{BB962C8B-B14F-4D97-AF65-F5344CB8AC3E}">
-        <p14:creationId xmlns:p14="http://schemas.microsoft.com/office/powerpoint/2010/main" val="609250667"/>
-      </p:ext>
-    </p:extLst>
-  </p:cSld>
-  <p:clrMapOvr>
-    <a:masterClrMapping/>
-  </p:clrMapOvr>
-</p:sld>
-</file>
-
-<file path=ppt/slides/slide20.xml><?xml version="1.0" encoding="utf-8"?>
+<file path=ppt/slides/slide21.xml><?xml version="1.0" encoding="utf-8"?>
 <p:sld xmlns:a="http://schemas.openxmlformats.org/drawingml/2006/main" xmlns:r="http://schemas.openxmlformats.org/officeDocument/2006/relationships" xmlns:p="http://schemas.openxmlformats.org/presentationml/2006/main">
   <p:cSld>
     <p:spTree>
@@ -12224,7 +12855,7 @@
 </p:sld>
 </file>
 
-<file path=ppt/slides/slide21.xml><?xml version="1.0" encoding="utf-8"?>
+<file path=ppt/slides/slide22.xml><?xml version="1.0" encoding="utf-8"?>
 <p:sld xmlns:a="http://schemas.openxmlformats.org/drawingml/2006/main" xmlns:r="http://schemas.openxmlformats.org/officeDocument/2006/relationships" xmlns:p="http://schemas.openxmlformats.org/presentationml/2006/main">
   <p:cSld>
     <p:spTree>
@@ -12459,7 +13090,7 @@
 </p:sld>
 </file>
 
-<file path=ppt/slides/slide22.xml><?xml version="1.0" encoding="utf-8"?>
+<file path=ppt/slides/slide23.xml><?xml version="1.0" encoding="utf-8"?>
 <p:sld xmlns:a="http://schemas.openxmlformats.org/drawingml/2006/main" xmlns:r="http://schemas.openxmlformats.org/officeDocument/2006/relationships" xmlns:p="http://schemas.openxmlformats.org/presentationml/2006/main">
   <p:cSld>
     <p:spTree>
@@ -13029,7 +13660,7 @@
 </p:sld>
 </file>
 
-<file path=ppt/slides/slide23.xml><?xml version="1.0" encoding="utf-8"?>
+<file path=ppt/slides/slide24.xml><?xml version="1.0" encoding="utf-8"?>
 <p:sld xmlns:a="http://schemas.openxmlformats.org/drawingml/2006/main" xmlns:r="http://schemas.openxmlformats.org/officeDocument/2006/relationships" xmlns:p="http://schemas.openxmlformats.org/presentationml/2006/main">
   <p:cSld>
     <p:spTree>
@@ -13453,7 +14084,7 @@
 </p:sld>
 </file>
 
-<file path=ppt/slides/slide24.xml><?xml version="1.0" encoding="utf-8"?>
+<file path=ppt/slides/slide25.xml><?xml version="1.0" encoding="utf-8"?>
 <p:sld xmlns:a="http://schemas.openxmlformats.org/drawingml/2006/main" xmlns:r="http://schemas.openxmlformats.org/officeDocument/2006/relationships" xmlns:p="http://schemas.openxmlformats.org/presentationml/2006/main">
   <p:cSld>
     <p:spTree>
@@ -14286,7 +14917,7 @@
 </p:sld>
 </file>
 
-<file path=ppt/slides/slide25.xml><?xml version="1.0" encoding="utf-8"?>
+<file path=ppt/slides/slide26.xml><?xml version="1.0" encoding="utf-8"?>
 <p:sld xmlns:a="http://schemas.openxmlformats.org/drawingml/2006/main" xmlns:r="http://schemas.openxmlformats.org/officeDocument/2006/relationships" xmlns:p="http://schemas.openxmlformats.org/presentationml/2006/main">
   <p:cSld>
     <p:spTree>
@@ -35815,7 +36446,7 @@
 </p:sld>
 </file>
 
-<file path=ppt/slides/slide26.xml><?xml version="1.0" encoding="utf-8"?>
+<file path=ppt/slides/slide27.xml><?xml version="1.0" encoding="utf-8"?>
 <p:sld xmlns:a="http://schemas.openxmlformats.org/drawingml/2006/main" xmlns:r="http://schemas.openxmlformats.org/officeDocument/2006/relationships" xmlns:p="http://schemas.openxmlformats.org/presentationml/2006/main">
   <p:cSld>
     <p:spTree>
@@ -36255,7 +36886,7 @@
 </p:sld>
 </file>
 
-<file path=ppt/slides/slide27.xml><?xml version="1.0" encoding="utf-8"?>
+<file path=ppt/slides/slide28.xml><?xml version="1.0" encoding="utf-8"?>
 <p:sld xmlns:a="http://schemas.openxmlformats.org/drawingml/2006/main" xmlns:r="http://schemas.openxmlformats.org/officeDocument/2006/relationships" xmlns:p="http://schemas.openxmlformats.org/presentationml/2006/main">
   <p:cSld>
     <p:spTree>
@@ -36351,7 +36982,7 @@
 </p:sld>
 </file>
 
-<file path=ppt/slides/slide28.xml><?xml version="1.0" encoding="utf-8"?>
+<file path=ppt/slides/slide29.xml><?xml version="1.0" encoding="utf-8"?>
 <p:sld xmlns:a="http://schemas.openxmlformats.org/drawingml/2006/main" xmlns:r="http://schemas.openxmlformats.org/officeDocument/2006/relationships" xmlns:p="http://schemas.openxmlformats.org/presentationml/2006/main">
   <p:cSld>
     <p:spTree>
@@ -36785,7 +37416,259 @@
 </p:sld>
 </file>
 
-<file path=ppt/slides/slide29.xml><?xml version="1.0" encoding="utf-8"?>
+<file path=ppt/slides/slide3.xml><?xml version="1.0" encoding="utf-8"?>
+<p:sld xmlns:a="http://schemas.openxmlformats.org/drawingml/2006/main" xmlns:r="http://schemas.openxmlformats.org/officeDocument/2006/relationships" xmlns:p="http://schemas.openxmlformats.org/presentationml/2006/main">
+  <p:cSld>
+    <p:spTree>
+      <p:nvGrpSpPr>
+        <p:cNvPr id="1" name=""/>
+        <p:cNvGrpSpPr/>
+        <p:nvPr/>
+      </p:nvGrpSpPr>
+      <p:grpSpPr>
+        <a:xfrm>
+          <a:off x="0" y="0"/>
+          <a:ext cx="0" cy="0"/>
+          <a:chOff x="0" y="0"/>
+          <a:chExt cx="0" cy="0"/>
+        </a:xfrm>
+      </p:grpSpPr>
+      <p:sp>
+        <p:nvSpPr>
+          <p:cNvPr id="8" name="Text Placeholder 7"/>
+          <p:cNvSpPr>
+            <a:spLocks noGrp="1"/>
+          </p:cNvSpPr>
+          <p:nvPr>
+            <p:ph type="body" sz="quarter" idx="11"/>
+          </p:nvPr>
+        </p:nvSpPr>
+        <p:spPr>
+          <a:xfrm>
+            <a:off x="725488" y="1812925"/>
+            <a:ext cx="5337175" cy="3951288"/>
+          </a:xfrm>
+        </p:spPr>
+        <p:txBody>
+          <a:bodyPr anchor="t"/>
+          <a:lstStyle/>
+          <a:p>
+            <a:pPr defTabSz="1306221" fontAlgn="auto">
+              <a:spcAft>
+                <a:spcPts val="0"/>
+              </a:spcAft>
+              <a:defRPr/>
+            </a:pPr>
+            <a:r>
+              <a:rPr lang="en-US" dirty="0">
+                <a:ea typeface="+mn-ea"/>
+              </a:rPr>
+              <a:t>[Topic One]</a:t>
+            </a:r>
+          </a:p>
+          <a:p>
+            <a:pPr defTabSz="1306221" fontAlgn="auto">
+              <a:spcAft>
+                <a:spcPts val="0"/>
+              </a:spcAft>
+              <a:defRPr/>
+            </a:pPr>
+            <a:r>
+              <a:rPr lang="en-US" dirty="0">
+                <a:ea typeface="+mn-ea"/>
+              </a:rPr>
+              <a:t>[Topic Two]</a:t>
+            </a:r>
+          </a:p>
+          <a:p>
+            <a:pPr defTabSz="1306221" fontAlgn="auto">
+              <a:spcAft>
+                <a:spcPts val="0"/>
+              </a:spcAft>
+              <a:defRPr/>
+            </a:pPr>
+            <a:r>
+              <a:rPr lang="en-US" dirty="0">
+                <a:ea typeface="+mn-ea"/>
+              </a:rPr>
+              <a:t>[Topic Three]</a:t>
+            </a:r>
+          </a:p>
+          <a:p>
+            <a:pPr defTabSz="1306221" fontAlgn="auto">
+              <a:spcAft>
+                <a:spcPts val="0"/>
+              </a:spcAft>
+              <a:defRPr/>
+            </a:pPr>
+            <a:r>
+              <a:rPr lang="en-US" dirty="0">
+                <a:ea typeface="+mn-ea"/>
+              </a:rPr>
+              <a:t>[Topic Four]</a:t>
+            </a:r>
+          </a:p>
+          <a:p>
+            <a:pPr defTabSz="1306221" fontAlgn="auto">
+              <a:spcAft>
+                <a:spcPts val="0"/>
+              </a:spcAft>
+              <a:defRPr/>
+            </a:pPr>
+            <a:r>
+              <a:rPr lang="en-US" dirty="0">
+                <a:ea typeface="+mn-ea"/>
+              </a:rPr>
+              <a:t>[Topic Five]</a:t>
+            </a:r>
+          </a:p>
+          <a:p>
+            <a:pPr defTabSz="1306221" fontAlgn="auto">
+              <a:spcAft>
+                <a:spcPts val="0"/>
+              </a:spcAft>
+              <a:defRPr/>
+            </a:pPr>
+            <a:r>
+              <a:rPr lang="en-US" dirty="0">
+                <a:ea typeface="+mn-ea"/>
+              </a:rPr>
+              <a:t>[Topic Six]</a:t>
+            </a:r>
+          </a:p>
+        </p:txBody>
+      </p:sp>
+      <p:sp>
+        <p:nvSpPr>
+          <p:cNvPr id="9" name="Text Placeholder 8"/>
+          <p:cNvSpPr>
+            <a:spLocks noGrp="1"/>
+          </p:cNvSpPr>
+          <p:nvPr>
+            <p:ph type="body" sz="quarter" idx="12"/>
+          </p:nvPr>
+        </p:nvSpPr>
+        <p:spPr>
+          <a:xfrm>
+            <a:off x="8545513" y="1812925"/>
+            <a:ext cx="5414962" cy="3951288"/>
+          </a:xfrm>
+        </p:spPr>
+        <p:txBody>
+          <a:bodyPr anchor="t"/>
+          <a:lstStyle/>
+          <a:p>
+            <a:pPr>
+              <a:defRPr/>
+            </a:pPr>
+            <a:r>
+              <a:rPr lang="en-US" dirty="0">
+                <a:ea typeface="+mn-ea"/>
+              </a:rPr>
+              <a:t>Slide [#]</a:t>
+            </a:r>
+          </a:p>
+          <a:p>
+            <a:pPr>
+              <a:defRPr/>
+            </a:pPr>
+            <a:r>
+              <a:rPr lang="en-US" dirty="0">
+                <a:ea typeface="+mn-ea"/>
+              </a:rPr>
+              <a:t>Slide [#]</a:t>
+            </a:r>
+          </a:p>
+          <a:p>
+            <a:pPr>
+              <a:defRPr/>
+            </a:pPr>
+            <a:r>
+              <a:rPr lang="en-US" dirty="0">
+                <a:ea typeface="+mn-ea"/>
+              </a:rPr>
+              <a:t>Slide [#]</a:t>
+            </a:r>
+          </a:p>
+          <a:p>
+            <a:pPr>
+              <a:defRPr/>
+            </a:pPr>
+            <a:r>
+              <a:rPr lang="en-US" dirty="0">
+                <a:ea typeface="+mn-ea"/>
+              </a:rPr>
+              <a:t>Slide [#]</a:t>
+            </a:r>
+          </a:p>
+          <a:p>
+            <a:pPr>
+              <a:defRPr/>
+            </a:pPr>
+            <a:r>
+              <a:rPr lang="en-US" dirty="0">
+                <a:ea typeface="+mn-ea"/>
+              </a:rPr>
+              <a:t>Slide [#]</a:t>
+            </a:r>
+          </a:p>
+          <a:p>
+            <a:pPr>
+              <a:defRPr/>
+            </a:pPr>
+            <a:r>
+              <a:rPr lang="en-US" dirty="0">
+                <a:ea typeface="+mn-ea"/>
+              </a:rPr>
+              <a:t>Slide [#]</a:t>
+            </a:r>
+          </a:p>
+        </p:txBody>
+      </p:sp>
+      <p:sp>
+        <p:nvSpPr>
+          <p:cNvPr id="2" name="Text Placeholder 1"/>
+          <p:cNvSpPr>
+            <a:spLocks noGrp="1"/>
+          </p:cNvSpPr>
+          <p:nvPr>
+            <p:ph type="body" sz="quarter" idx="13"/>
+          </p:nvPr>
+        </p:nvSpPr>
+        <p:spPr>
+          <a:xfrm>
+            <a:off x="712788" y="600075"/>
+            <a:ext cx="13244512" cy="635000"/>
+          </a:xfrm>
+        </p:spPr>
+        <p:txBody>
+          <a:bodyPr/>
+          <a:lstStyle/>
+          <a:p>
+            <a:pPr defTabSz="1306221" fontAlgn="auto">
+              <a:spcAft>
+                <a:spcPts val="0"/>
+              </a:spcAft>
+              <a:defRPr/>
+            </a:pPr>
+            <a:r>
+              <a:rPr lang="en-US" dirty="0">
+                <a:ea typeface="+mn-ea"/>
+              </a:rPr>
+              <a:t>Table of Contents/Agenda</a:t>
+            </a:r>
+          </a:p>
+        </p:txBody>
+      </p:sp>
+    </p:spTree>
+  </p:cSld>
+  <p:clrMapOvr>
+    <a:masterClrMapping/>
+  </p:clrMapOvr>
+</p:sld>
+</file>
+
+<file path=ppt/slides/slide30.xml><?xml version="1.0" encoding="utf-8"?>
 <p:sld xmlns:a="http://schemas.openxmlformats.org/drawingml/2006/main" xmlns:r="http://schemas.openxmlformats.org/officeDocument/2006/relationships" xmlns:p="http://schemas.openxmlformats.org/presentationml/2006/main">
   <p:cSld>
     <p:spTree>
@@ -38745,259 +39628,7 @@
 </p:sld>
 </file>
 
-<file path=ppt/slides/slide3.xml><?xml version="1.0" encoding="utf-8"?>
-<p:sld xmlns:a="http://schemas.openxmlformats.org/drawingml/2006/main" xmlns:r="http://schemas.openxmlformats.org/officeDocument/2006/relationships" xmlns:p="http://schemas.openxmlformats.org/presentationml/2006/main">
-  <p:cSld>
-    <p:spTree>
-      <p:nvGrpSpPr>
-        <p:cNvPr id="1" name=""/>
-        <p:cNvGrpSpPr/>
-        <p:nvPr/>
-      </p:nvGrpSpPr>
-      <p:grpSpPr>
-        <a:xfrm>
-          <a:off x="0" y="0"/>
-          <a:ext cx="0" cy="0"/>
-          <a:chOff x="0" y="0"/>
-          <a:chExt cx="0" cy="0"/>
-        </a:xfrm>
-      </p:grpSpPr>
-      <p:sp>
-        <p:nvSpPr>
-          <p:cNvPr id="8" name="Text Placeholder 7"/>
-          <p:cNvSpPr>
-            <a:spLocks noGrp="1"/>
-          </p:cNvSpPr>
-          <p:nvPr>
-            <p:ph type="body" sz="quarter" idx="11"/>
-          </p:nvPr>
-        </p:nvSpPr>
-        <p:spPr>
-          <a:xfrm>
-            <a:off x="725488" y="1812925"/>
-            <a:ext cx="5337175" cy="3951288"/>
-          </a:xfrm>
-        </p:spPr>
-        <p:txBody>
-          <a:bodyPr anchor="t"/>
-          <a:lstStyle/>
-          <a:p>
-            <a:pPr defTabSz="1306221" fontAlgn="auto">
-              <a:spcAft>
-                <a:spcPts val="0"/>
-              </a:spcAft>
-              <a:defRPr/>
-            </a:pPr>
-            <a:r>
-              <a:rPr lang="en-US" dirty="0">
-                <a:ea typeface="+mn-ea"/>
-              </a:rPr>
-              <a:t>[Topic One]</a:t>
-            </a:r>
-          </a:p>
-          <a:p>
-            <a:pPr defTabSz="1306221" fontAlgn="auto">
-              <a:spcAft>
-                <a:spcPts val="0"/>
-              </a:spcAft>
-              <a:defRPr/>
-            </a:pPr>
-            <a:r>
-              <a:rPr lang="en-US" dirty="0">
-                <a:ea typeface="+mn-ea"/>
-              </a:rPr>
-              <a:t>[Topic Two]</a:t>
-            </a:r>
-          </a:p>
-          <a:p>
-            <a:pPr defTabSz="1306221" fontAlgn="auto">
-              <a:spcAft>
-                <a:spcPts val="0"/>
-              </a:spcAft>
-              <a:defRPr/>
-            </a:pPr>
-            <a:r>
-              <a:rPr lang="en-US" dirty="0">
-                <a:ea typeface="+mn-ea"/>
-              </a:rPr>
-              <a:t>[Topic Three]</a:t>
-            </a:r>
-          </a:p>
-          <a:p>
-            <a:pPr defTabSz="1306221" fontAlgn="auto">
-              <a:spcAft>
-                <a:spcPts val="0"/>
-              </a:spcAft>
-              <a:defRPr/>
-            </a:pPr>
-            <a:r>
-              <a:rPr lang="en-US" dirty="0">
-                <a:ea typeface="+mn-ea"/>
-              </a:rPr>
-              <a:t>[Topic Four]</a:t>
-            </a:r>
-          </a:p>
-          <a:p>
-            <a:pPr defTabSz="1306221" fontAlgn="auto">
-              <a:spcAft>
-                <a:spcPts val="0"/>
-              </a:spcAft>
-              <a:defRPr/>
-            </a:pPr>
-            <a:r>
-              <a:rPr lang="en-US" dirty="0">
-                <a:ea typeface="+mn-ea"/>
-              </a:rPr>
-              <a:t>[Topic Five]</a:t>
-            </a:r>
-          </a:p>
-          <a:p>
-            <a:pPr defTabSz="1306221" fontAlgn="auto">
-              <a:spcAft>
-                <a:spcPts val="0"/>
-              </a:spcAft>
-              <a:defRPr/>
-            </a:pPr>
-            <a:r>
-              <a:rPr lang="en-US" dirty="0">
-                <a:ea typeface="+mn-ea"/>
-              </a:rPr>
-              <a:t>[Topic Six]</a:t>
-            </a:r>
-          </a:p>
-        </p:txBody>
-      </p:sp>
-      <p:sp>
-        <p:nvSpPr>
-          <p:cNvPr id="9" name="Text Placeholder 8"/>
-          <p:cNvSpPr>
-            <a:spLocks noGrp="1"/>
-          </p:cNvSpPr>
-          <p:nvPr>
-            <p:ph type="body" sz="quarter" idx="12"/>
-          </p:nvPr>
-        </p:nvSpPr>
-        <p:spPr>
-          <a:xfrm>
-            <a:off x="8545513" y="1812925"/>
-            <a:ext cx="5414962" cy="3951288"/>
-          </a:xfrm>
-        </p:spPr>
-        <p:txBody>
-          <a:bodyPr anchor="t"/>
-          <a:lstStyle/>
-          <a:p>
-            <a:pPr>
-              <a:defRPr/>
-            </a:pPr>
-            <a:r>
-              <a:rPr lang="en-US" dirty="0">
-                <a:ea typeface="+mn-ea"/>
-              </a:rPr>
-              <a:t>Slide [#]</a:t>
-            </a:r>
-          </a:p>
-          <a:p>
-            <a:pPr>
-              <a:defRPr/>
-            </a:pPr>
-            <a:r>
-              <a:rPr lang="en-US" dirty="0">
-                <a:ea typeface="+mn-ea"/>
-              </a:rPr>
-              <a:t>Slide [#]</a:t>
-            </a:r>
-          </a:p>
-          <a:p>
-            <a:pPr>
-              <a:defRPr/>
-            </a:pPr>
-            <a:r>
-              <a:rPr lang="en-US" dirty="0">
-                <a:ea typeface="+mn-ea"/>
-              </a:rPr>
-              <a:t>Slide [#]</a:t>
-            </a:r>
-          </a:p>
-          <a:p>
-            <a:pPr>
-              <a:defRPr/>
-            </a:pPr>
-            <a:r>
-              <a:rPr lang="en-US" dirty="0">
-                <a:ea typeface="+mn-ea"/>
-              </a:rPr>
-              <a:t>Slide [#]</a:t>
-            </a:r>
-          </a:p>
-          <a:p>
-            <a:pPr>
-              <a:defRPr/>
-            </a:pPr>
-            <a:r>
-              <a:rPr lang="en-US" dirty="0">
-                <a:ea typeface="+mn-ea"/>
-              </a:rPr>
-              <a:t>Slide [#]</a:t>
-            </a:r>
-          </a:p>
-          <a:p>
-            <a:pPr>
-              <a:defRPr/>
-            </a:pPr>
-            <a:r>
-              <a:rPr lang="en-US" dirty="0">
-                <a:ea typeface="+mn-ea"/>
-              </a:rPr>
-              <a:t>Slide [#]</a:t>
-            </a:r>
-          </a:p>
-        </p:txBody>
-      </p:sp>
-      <p:sp>
-        <p:nvSpPr>
-          <p:cNvPr id="2" name="Text Placeholder 1"/>
-          <p:cNvSpPr>
-            <a:spLocks noGrp="1"/>
-          </p:cNvSpPr>
-          <p:nvPr>
-            <p:ph type="body" sz="quarter" idx="13"/>
-          </p:nvPr>
-        </p:nvSpPr>
-        <p:spPr>
-          <a:xfrm>
-            <a:off x="712788" y="600075"/>
-            <a:ext cx="13244512" cy="635000"/>
-          </a:xfrm>
-        </p:spPr>
-        <p:txBody>
-          <a:bodyPr/>
-          <a:lstStyle/>
-          <a:p>
-            <a:pPr defTabSz="1306221" fontAlgn="auto">
-              <a:spcAft>
-                <a:spcPts val="0"/>
-              </a:spcAft>
-              <a:defRPr/>
-            </a:pPr>
-            <a:r>
-              <a:rPr lang="en-US" dirty="0">
-                <a:ea typeface="+mn-ea"/>
-              </a:rPr>
-              <a:t>Table of Contents/Agenda</a:t>
-            </a:r>
-          </a:p>
-        </p:txBody>
-      </p:sp>
-    </p:spTree>
-  </p:cSld>
-  <p:clrMapOvr>
-    <a:masterClrMapping/>
-  </p:clrMapOvr>
-</p:sld>
-</file>
-
-<file path=ppt/slides/slide30.xml><?xml version="1.0" encoding="utf-8"?>
+<file path=ppt/slides/slide31.xml><?xml version="1.0" encoding="utf-8"?>
 <p:sld xmlns:a="http://schemas.openxmlformats.org/drawingml/2006/main" xmlns:r="http://schemas.openxmlformats.org/officeDocument/2006/relationships" xmlns:p="http://schemas.openxmlformats.org/presentationml/2006/main">
   <p:cSld>
     <p:spTree>
@@ -41111,7 +41742,7 @@
 </p:sld>
 </file>
 
-<file path=ppt/slides/slide31.xml><?xml version="1.0" encoding="utf-8"?>
+<file path=ppt/slides/slide32.xml><?xml version="1.0" encoding="utf-8"?>
 <p:sld xmlns:a="http://schemas.openxmlformats.org/drawingml/2006/main" xmlns:r="http://schemas.openxmlformats.org/officeDocument/2006/relationships" xmlns:p="http://schemas.openxmlformats.org/presentationml/2006/main">
   <p:cSld>
     <p:spTree>
@@ -42695,7 +43326,7 @@
 </p:sld>
 </file>
 
-<file path=ppt/slides/slide32.xml><?xml version="1.0" encoding="utf-8"?>
+<file path=ppt/slides/slide33.xml><?xml version="1.0" encoding="utf-8"?>
 <p:sld xmlns:a="http://schemas.openxmlformats.org/drawingml/2006/main" xmlns:r="http://schemas.openxmlformats.org/officeDocument/2006/relationships" xmlns:p="http://schemas.openxmlformats.org/presentationml/2006/main">
   <p:cSld>
     <p:spTree>
@@ -42794,7 +43425,7 @@
 </p:sld>
 </file>
 
-<file path=ppt/slides/slide33.xml><?xml version="1.0" encoding="utf-8"?>
+<file path=ppt/slides/slide34.xml><?xml version="1.0" encoding="utf-8"?>
 <p:sld xmlns:a="http://schemas.openxmlformats.org/drawingml/2006/main" xmlns:r="http://schemas.openxmlformats.org/officeDocument/2006/relationships" xmlns:p="http://schemas.openxmlformats.org/presentationml/2006/main">
   <p:cSld>
     <p:spTree>
@@ -42900,7 +43531,7 @@
 </p:sld>
 </file>
 
-<file path=ppt/slides/slide34.xml><?xml version="1.0" encoding="utf-8"?>
+<file path=ppt/slides/slide35.xml><?xml version="1.0" encoding="utf-8"?>
 <p:sld xmlns:a="http://schemas.openxmlformats.org/drawingml/2006/main" xmlns:r="http://schemas.openxmlformats.org/officeDocument/2006/relationships" xmlns:p="http://schemas.openxmlformats.org/presentationml/2006/main">
   <p:cSld>
     <p:spTree>

</xml_diff>

<commit_message>
added twb for germ theory
</commit_message>
<xml_diff>
--- a/lecture.pptx
+++ b/lecture.pptx
@@ -1080,12 +1080,33 @@
               </a:rPr>
               <a:t>https://www.npr.org/sections/health-shots/2015/01/12/375663920/the-doctor-who-championed-hand-washing-and-saved-women-s-lives</a:t>
             </a:r>
+            <a:endParaRPr lang="en-US" dirty="0"/>
+          </a:p>
+          <a:p>
+            <a:r>
+              <a:rPr lang="en-US" b="0" dirty="0">
+                <a:effectLst/>
+              </a:rPr>
+              <a:t>Table credit: </a:t>
+            </a:r>
+            <a:r>
+              <a:rPr lang="en-US" dirty="0">
+                <a:hlinkClick r:id="rId4"/>
+              </a:rPr>
+              <a:t>https://en.wikipedia.org/wiki/Ignaz_Semmelweis</a:t>
+            </a:r>
+            <a:endParaRPr lang="en-US" dirty="0"/>
+          </a:p>
+          <a:p>
             <a:endParaRPr lang="en-US" b="0" dirty="0">
               <a:effectLst/>
             </a:endParaRPr>
           </a:p>
           <a:p>
-            <a:pPr lvl="3" rtl="0" fontAlgn="base"/>
+            <a:pPr marL="2244725" lvl="3" indent="-285750" rtl="0" fontAlgn="base">
+              <a:buFontTx/>
+              <a:buChar char="-"/>
+            </a:pPr>
             <a:r>
               <a:rPr lang="en-US" sz="1800" b="0" i="0" u="none" strike="noStrike" kern="1200" dirty="0">
                 <a:solidFill>
@@ -1096,7 +1117,79 @@
                 <a:ea typeface="ＭＳ Ｐゴシック" charset="0"/>
                 <a:cs typeface="+mn-cs"/>
               </a:rPr>
-              <a:t>- Simple Table from 1847</a:t>
+              <a:t>Hungarian physician</a:t>
+            </a:r>
+          </a:p>
+          <a:p>
+            <a:pPr marL="2244725" lvl="3" indent="-285750" rtl="0" fontAlgn="base">
+              <a:buFontTx/>
+              <a:buChar char="-"/>
+            </a:pPr>
+            <a:r>
+              <a:rPr lang="en-US" sz="1800" b="0" i="0" u="none" strike="noStrike" kern="1200" dirty="0">
+                <a:solidFill>
+                  <a:schemeClr val="tx1"/>
+                </a:solidFill>
+                <a:effectLst/>
+                <a:latin typeface="BentonSans Book"/>
+                <a:ea typeface="ＭＳ Ｐゴシック" charset="0"/>
+                <a:cs typeface="+mn-cs"/>
+              </a:rPr>
+              <a:t>Pioneer of antiseptic </a:t>
+            </a:r>
+            <a:r>
+              <a:rPr lang="en-US" sz="1800" b="0" i="0" u="none" strike="noStrike" kern="1200" dirty="0" err="1">
+                <a:solidFill>
+                  <a:schemeClr val="tx1"/>
+                </a:solidFill>
+                <a:effectLst/>
+                <a:latin typeface="BentonSans Book"/>
+                <a:ea typeface="ＭＳ Ｐゴシック" charset="0"/>
+                <a:cs typeface="+mn-cs"/>
+              </a:rPr>
+              <a:t>prcedures</a:t>
+            </a:r>
+            <a:endParaRPr lang="en-US" sz="1800" b="0" i="0" u="none" strike="noStrike" kern="1200" dirty="0">
+              <a:solidFill>
+                <a:schemeClr val="tx1"/>
+              </a:solidFill>
+              <a:effectLst/>
+              <a:latin typeface="BentonSans Book"/>
+              <a:ea typeface="ＭＳ Ｐゴシック" charset="0"/>
+              <a:cs typeface="+mn-cs"/>
+            </a:endParaRPr>
+          </a:p>
+          <a:p>
+            <a:pPr marL="2244725" lvl="3" indent="-285750" rtl="0" fontAlgn="base">
+              <a:buFontTx/>
+              <a:buChar char="-"/>
+            </a:pPr>
+            <a:r>
+              <a:rPr lang="en-US" sz="1800" b="0" i="0" u="none" strike="noStrike" kern="1200" dirty="0">
+                <a:solidFill>
+                  <a:schemeClr val="tx1"/>
+                </a:solidFill>
+                <a:effectLst/>
+                <a:latin typeface="BentonSans Book"/>
+                <a:ea typeface="ＭＳ Ｐゴシック" charset="0"/>
+                <a:cs typeface="+mn-cs"/>
+              </a:rPr>
+              <a:t>Wash hands with chlorinated lime water</a:t>
+            </a:r>
+          </a:p>
+          <a:p>
+            <a:pPr lvl="3" rtl="0" fontAlgn="base"/>
+            <a:r>
+              <a:rPr lang="en-US" sz="1800" b="0" i="0" u="none" strike="noStrike" kern="1200" dirty="0">
+                <a:solidFill>
+                  <a:schemeClr val="tx1"/>
+                </a:solidFill>
+                <a:effectLst/>
+                <a:latin typeface="BentonSans Book"/>
+                <a:ea typeface="ＭＳ Ｐゴシック" charset="0"/>
+                <a:cs typeface="+mn-cs"/>
+              </a:rPr>
+              <a:t> Simple Table from 1847</a:t>
             </a:r>
           </a:p>
           <a:p>
@@ -10026,8 +10119,17 @@
               <a:rPr lang="en-US" dirty="0">
                 <a:ea typeface="+mn-ea"/>
               </a:rPr>
-              <a:t>[High-level content]</a:t>
+              <a:t>Why </a:t>
             </a:r>
+            <a:r>
+              <a:rPr lang="en-US">
+                <a:ea typeface="+mn-ea"/>
+              </a:rPr>
+              <a:t>does data matter?</a:t>
+            </a:r>
+            <a:endParaRPr lang="en-US" dirty="0">
+              <a:ea typeface="+mn-ea"/>
+            </a:endParaRPr>
           </a:p>
           <a:p>
             <a:pPr defTabSz="1306221" fontAlgn="auto">
@@ -10318,6 +10420,53 @@
           </a:p>
         </p:txBody>
       </p:sp>
+      <p:pic>
+        <p:nvPicPr>
+          <p:cNvPr id="2050" name="Picture 2">
+            <a:extLst>
+              <a:ext uri="{FF2B5EF4-FFF2-40B4-BE49-F238E27FC236}">
+                <a16:creationId xmlns:a16="http://schemas.microsoft.com/office/drawing/2014/main" id="{A312213D-0257-498F-944A-21D5B13C4F29}"/>
+              </a:ext>
+            </a:extLst>
+          </p:cNvPr>
+          <p:cNvPicPr>
+            <a:picLocks noChangeAspect="1" noChangeArrowheads="1"/>
+          </p:cNvPicPr>
+          <p:nvPr/>
+        </p:nvPicPr>
+        <p:blipFill>
+          <a:blip r:embed="rId4">
+            <a:extLst>
+              <a:ext uri="{28A0092B-C50C-407E-A947-70E740481C1C}">
+                <a14:useLocalDpi xmlns:a14="http://schemas.microsoft.com/office/drawing/2010/main" val="0"/>
+              </a:ext>
+            </a:extLst>
+          </a:blip>
+          <a:srcRect/>
+          <a:stretch>
+            <a:fillRect/>
+          </a:stretch>
+        </p:blipFill>
+        <p:spPr bwMode="auto">
+          <a:xfrm>
+            <a:off x="423488" y="2925215"/>
+            <a:ext cx="6581775" cy="3295650"/>
+          </a:xfrm>
+          <a:prstGeom prst="rect">
+            <a:avLst/>
+          </a:prstGeom>
+          <a:noFill/>
+          <a:extLst>
+            <a:ext uri="{909E8E84-426E-40DD-AFC4-6F175D3DCCD1}">
+              <a14:hiddenFill xmlns:a14="http://schemas.microsoft.com/office/drawing/2010/main">
+                <a:solidFill>
+                  <a:srgbClr val="FFFFFF"/>
+                </a:solidFill>
+              </a14:hiddenFill>
+            </a:ext>
+          </a:extLst>
+        </p:spPr>
+      </p:pic>
     </p:spTree>
   </p:cSld>
   <p:clrMapOvr>
@@ -10426,7 +10575,7 @@
             </a:pPr>
             <a:r>
               <a:rPr lang="en-US" dirty="0"/>
-              <a:t>Died in an insane asylum</a:t>
+              <a:t>Semmelweis died in an insane asylum</a:t>
             </a:r>
           </a:p>
           <a:p>

</xml_diff>

<commit_message>
added test comparison slide
</commit_message>
<xml_diff>
--- a/lecture.pptx
+++ b/lecture.pptx
@@ -5,10 +5,10 @@
     <p:sldMasterId id="2147483875" r:id="rId1"/>
   </p:sldMasterIdLst>
   <p:notesMasterIdLst>
-    <p:notesMasterId r:id="rId38"/>
+    <p:notesMasterId r:id="rId39"/>
   </p:notesMasterIdLst>
   <p:handoutMasterIdLst>
-    <p:handoutMasterId r:id="rId39"/>
+    <p:handoutMasterId r:id="rId40"/>
   </p:handoutMasterIdLst>
   <p:sldIdLst>
     <p:sldId id="256" r:id="rId2"/>
@@ -24,29 +24,30 @@
     <p:sldId id="501" r:id="rId12"/>
     <p:sldId id="540" r:id="rId13"/>
     <p:sldId id="541" r:id="rId14"/>
-    <p:sldId id="525" r:id="rId15"/>
-    <p:sldId id="319" r:id="rId16"/>
-    <p:sldId id="422" r:id="rId17"/>
-    <p:sldId id="423" r:id="rId18"/>
-    <p:sldId id="424" r:id="rId19"/>
-    <p:sldId id="343" r:id="rId20"/>
-    <p:sldId id="523" r:id="rId21"/>
-    <p:sldId id="511" r:id="rId22"/>
-    <p:sldId id="502" r:id="rId23"/>
-    <p:sldId id="503" r:id="rId24"/>
-    <p:sldId id="504" r:id="rId25"/>
-    <p:sldId id="524" r:id="rId26"/>
-    <p:sldId id="513" r:id="rId27"/>
-    <p:sldId id="514" r:id="rId28"/>
-    <p:sldId id="532" r:id="rId29"/>
-    <p:sldId id="533" r:id="rId30"/>
-    <p:sldId id="534" r:id="rId31"/>
-    <p:sldId id="509" r:id="rId32"/>
-    <p:sldId id="510" r:id="rId33"/>
-    <p:sldId id="508" r:id="rId34"/>
-    <p:sldId id="536" r:id="rId35"/>
-    <p:sldId id="537" r:id="rId36"/>
-    <p:sldId id="538" r:id="rId37"/>
+    <p:sldId id="542" r:id="rId15"/>
+    <p:sldId id="525" r:id="rId16"/>
+    <p:sldId id="319" r:id="rId17"/>
+    <p:sldId id="422" r:id="rId18"/>
+    <p:sldId id="423" r:id="rId19"/>
+    <p:sldId id="424" r:id="rId20"/>
+    <p:sldId id="343" r:id="rId21"/>
+    <p:sldId id="523" r:id="rId22"/>
+    <p:sldId id="511" r:id="rId23"/>
+    <p:sldId id="502" r:id="rId24"/>
+    <p:sldId id="503" r:id="rId25"/>
+    <p:sldId id="504" r:id="rId26"/>
+    <p:sldId id="524" r:id="rId27"/>
+    <p:sldId id="513" r:id="rId28"/>
+    <p:sldId id="514" r:id="rId29"/>
+    <p:sldId id="532" r:id="rId30"/>
+    <p:sldId id="533" r:id="rId31"/>
+    <p:sldId id="534" r:id="rId32"/>
+    <p:sldId id="509" r:id="rId33"/>
+    <p:sldId id="510" r:id="rId34"/>
+    <p:sldId id="508" r:id="rId35"/>
+    <p:sldId id="536" r:id="rId36"/>
+    <p:sldId id="537" r:id="rId37"/>
+    <p:sldId id="538" r:id="rId38"/>
   </p:sldIdLst>
   <p:sldSz cx="14630400" cy="8229600"/>
   <p:notesSz cx="6858000" cy="9144000"/>
@@ -2003,6 +2004,124 @@
       </p:grpSpPr>
       <p:sp>
         <p:nvSpPr>
+          <p:cNvPr id="49153" name="Slide Image Placeholder 1"/>
+          <p:cNvSpPr>
+            <a:spLocks noGrp="1" noRot="1" noChangeAspect="1"/>
+          </p:cNvSpPr>
+          <p:nvPr>
+            <p:ph type="sldImg"/>
+          </p:nvPr>
+        </p:nvSpPr>
+        <p:spPr bwMode="auto">
+          <a:noFill/>
+          <a:ln>
+            <a:solidFill>
+              <a:srgbClr val="000000"/>
+            </a:solidFill>
+            <a:miter lim="800000"/>
+            <a:headEnd/>
+            <a:tailEnd/>
+          </a:ln>
+          <a:extLst>
+            <a:ext uri="{909E8E84-426E-40dd-AFC4-6F175D3DCCD1}">
+              <a14:hiddenFill xmlns:a14="http://schemas.microsoft.com/office/drawing/2010/main" xmlns="">
+                <a:solidFill>
+                  <a:srgbClr val="FFFFFF"/>
+                </a:solidFill>
+              </a14:hiddenFill>
+            </a:ext>
+            <a:ext uri="{FAA26D3D-D897-4be2-8F04-BA451C77F1D7}">
+              <ma14:placeholderFlag xmlns:ma14="http://schemas.microsoft.com/office/mac/drawingml/2011/main" xmlns="" val="1"/>
+            </a:ext>
+          </a:extLst>
+        </p:spPr>
+      </p:sp>
+      <p:sp>
+        <p:nvSpPr>
+          <p:cNvPr id="49154" name="Notes Placeholder 2"/>
+          <p:cNvSpPr>
+            <a:spLocks noGrp="1"/>
+          </p:cNvSpPr>
+          <p:nvPr>
+            <p:ph type="body" idx="1"/>
+          </p:nvPr>
+        </p:nvSpPr>
+        <p:spPr bwMode="auto">
+          <a:noFill/>
+          <a:extLst>
+            <a:ext uri="{909E8E84-426E-40dd-AFC4-6F175D3DCCD1}">
+              <a14:hiddenFill xmlns:a14="http://schemas.microsoft.com/office/drawing/2010/main" xmlns="">
+                <a:solidFill>
+                  <a:srgbClr val="FFFFFF"/>
+                </a:solidFill>
+              </a14:hiddenFill>
+            </a:ext>
+            <a:ext uri="{91240B29-F687-4f45-9708-019B960494DF}">
+              <a14:hiddenLine xmlns:a14="http://schemas.microsoft.com/office/drawing/2010/main" xmlns="" w="9525">
+                <a:solidFill>
+                  <a:srgbClr val="000000"/>
+                </a:solidFill>
+                <a:miter lim="800000"/>
+                <a:headEnd/>
+                <a:tailEnd/>
+              </a14:hiddenLine>
+            </a:ext>
+          </a:extLst>
+        </p:spPr>
+        <p:txBody>
+          <a:bodyPr wrap="square" numCol="1" anchor="t" anchorCtr="0" compatLnSpc="1">
+            <a:prstTxWarp prst="textNoShape">
+              <a:avLst/>
+            </a:prstTxWarp>
+          </a:bodyPr>
+          <a:lstStyle/>
+          <a:p>
+            <a:pPr>
+              <a:spcBef>
+                <a:spcPct val="0"/>
+              </a:spcBef>
+            </a:pPr>
+            <a:r>
+              <a:rPr lang="en-US">
+                <a:latin typeface="BentonSans Book" charset="0"/>
+              </a:rPr>
+              <a:t>Image &amp; Copy</a:t>
+            </a:r>
+          </a:p>
+        </p:txBody>
+      </p:sp>
+    </p:spTree>
+    <p:extLst>
+      <p:ext uri="{BB962C8B-B14F-4D97-AF65-F5344CB8AC3E}">
+        <p14:creationId xmlns:p14="http://schemas.microsoft.com/office/powerpoint/2010/main" val="4277145548"/>
+      </p:ext>
+    </p:extLst>
+  </p:cSld>
+  <p:clrMapOvr>
+    <a:masterClrMapping/>
+  </p:clrMapOvr>
+</p:notes>
+</file>
+
+<file path=ppt/notesSlides/notesSlide14.xml><?xml version="1.0" encoding="utf-8"?>
+<p:notes xmlns:a="http://schemas.openxmlformats.org/drawingml/2006/main" xmlns:r="http://schemas.openxmlformats.org/officeDocument/2006/relationships" xmlns:p="http://schemas.openxmlformats.org/presentationml/2006/main">
+  <p:cSld>
+    <p:spTree>
+      <p:nvGrpSpPr>
+        <p:cNvPr id="1" name=""/>
+        <p:cNvGrpSpPr/>
+        <p:nvPr/>
+      </p:nvGrpSpPr>
+      <p:grpSpPr>
+        <a:xfrm>
+          <a:off x="0" y="0"/>
+          <a:ext cx="0" cy="0"/>
+          <a:chOff x="0" y="0"/>
+          <a:chExt cx="0" cy="0"/>
+        </a:xfrm>
+      </p:grpSpPr>
+      <p:sp>
+        <p:nvSpPr>
           <p:cNvPr id="47105" name="Slide Image Placeholder 1"/>
           <p:cNvSpPr>
             <a:spLocks noGrp="1" noRot="1" noChangeAspect="1"/>
@@ -2097,7 +2216,7 @@
 </p:notes>
 </file>
 
-<file path=ppt/notesSlides/notesSlide14.xml><?xml version="1.0" encoding="utf-8"?>
+<file path=ppt/notesSlides/notesSlide15.xml><?xml version="1.0" encoding="utf-8"?>
 <p:notes xmlns:a="http://schemas.openxmlformats.org/drawingml/2006/main" xmlns:r="http://schemas.openxmlformats.org/officeDocument/2006/relationships" xmlns:p="http://schemas.openxmlformats.org/presentationml/2006/main">
   <p:cSld>
     <p:spTree>
@@ -2210,7 +2329,7 @@
 </p:notes>
 </file>
 
-<file path=ppt/notesSlides/notesSlide15.xml><?xml version="1.0" encoding="utf-8"?>
+<file path=ppt/notesSlides/notesSlide16.xml><?xml version="1.0" encoding="utf-8"?>
 <p:notes xmlns:a="http://schemas.openxmlformats.org/drawingml/2006/main" xmlns:r="http://schemas.openxmlformats.org/officeDocument/2006/relationships" xmlns:p="http://schemas.openxmlformats.org/presentationml/2006/main">
   <p:cSld>
     <p:spTree>
@@ -2323,7 +2442,7 @@
 </p:notes>
 </file>
 
-<file path=ppt/notesSlides/notesSlide16.xml><?xml version="1.0" encoding="utf-8"?>
+<file path=ppt/notesSlides/notesSlide17.xml><?xml version="1.0" encoding="utf-8"?>
 <p:notes xmlns:a="http://schemas.openxmlformats.org/drawingml/2006/main" xmlns:r="http://schemas.openxmlformats.org/officeDocument/2006/relationships" xmlns:p="http://schemas.openxmlformats.org/presentationml/2006/main">
   <p:cSld>
     <p:spTree>
@@ -2436,7 +2555,7 @@
 </p:notes>
 </file>
 
-<file path=ppt/notesSlides/notesSlide17.xml><?xml version="1.0" encoding="utf-8"?>
+<file path=ppt/notesSlides/notesSlide18.xml><?xml version="1.0" encoding="utf-8"?>
 <p:notes xmlns:a="http://schemas.openxmlformats.org/drawingml/2006/main" xmlns:r="http://schemas.openxmlformats.org/officeDocument/2006/relationships" xmlns:p="http://schemas.openxmlformats.org/presentationml/2006/main">
   <p:cSld>
     <p:spTree>
@@ -2549,7 +2668,7 @@
 </p:notes>
 </file>
 
-<file path=ppt/notesSlides/notesSlide18.xml><?xml version="1.0" encoding="utf-8"?>
+<file path=ppt/notesSlides/notesSlide19.xml><?xml version="1.0" encoding="utf-8"?>
 <p:notes xmlns:a="http://schemas.openxmlformats.org/drawingml/2006/main" xmlns:r="http://schemas.openxmlformats.org/officeDocument/2006/relationships" xmlns:p="http://schemas.openxmlformats.org/presentationml/2006/main">
   <p:cSld>
     <p:spTree>
@@ -2662,7 +2781,120 @@
 </p:notes>
 </file>
 
-<file path=ppt/notesSlides/notesSlide19.xml><?xml version="1.0" encoding="utf-8"?>
+<file path=ppt/notesSlides/notesSlide2.xml><?xml version="1.0" encoding="utf-8"?>
+<p:notes xmlns:a="http://schemas.openxmlformats.org/drawingml/2006/main" xmlns:r="http://schemas.openxmlformats.org/officeDocument/2006/relationships" xmlns:p="http://schemas.openxmlformats.org/presentationml/2006/main">
+  <p:cSld>
+    <p:spTree>
+      <p:nvGrpSpPr>
+        <p:cNvPr id="1" name=""/>
+        <p:cNvGrpSpPr/>
+        <p:nvPr/>
+      </p:nvGrpSpPr>
+      <p:grpSpPr>
+        <a:xfrm>
+          <a:off x="0" y="0"/>
+          <a:ext cx="0" cy="0"/>
+          <a:chOff x="0" y="0"/>
+          <a:chExt cx="0" cy="0"/>
+        </a:xfrm>
+      </p:grpSpPr>
+      <p:sp>
+        <p:nvSpPr>
+          <p:cNvPr id="37889" name="Slide Image Placeholder 1"/>
+          <p:cNvSpPr>
+            <a:spLocks noGrp="1" noRot="1" noChangeAspect="1"/>
+          </p:cNvSpPr>
+          <p:nvPr>
+            <p:ph type="sldImg"/>
+          </p:nvPr>
+        </p:nvSpPr>
+        <p:spPr bwMode="auto">
+          <a:noFill/>
+          <a:ln>
+            <a:solidFill>
+              <a:srgbClr val="000000"/>
+            </a:solidFill>
+            <a:miter lim="800000"/>
+            <a:headEnd/>
+            <a:tailEnd/>
+          </a:ln>
+          <a:extLst>
+            <a:ext uri="{909E8E84-426E-40dd-AFC4-6F175D3DCCD1}">
+              <a14:hiddenFill xmlns:a14="http://schemas.microsoft.com/office/drawing/2010/main" xmlns="">
+                <a:solidFill>
+                  <a:srgbClr val="FFFFFF"/>
+                </a:solidFill>
+              </a14:hiddenFill>
+            </a:ext>
+            <a:ext uri="{FAA26D3D-D897-4be2-8F04-BA451C77F1D7}">
+              <ma14:placeholderFlag xmlns:ma14="http://schemas.microsoft.com/office/mac/drawingml/2011/main" xmlns="" val="1"/>
+            </a:ext>
+          </a:extLst>
+        </p:spPr>
+      </p:sp>
+      <p:sp>
+        <p:nvSpPr>
+          <p:cNvPr id="37890" name="Notes Placeholder 2"/>
+          <p:cNvSpPr>
+            <a:spLocks noGrp="1"/>
+          </p:cNvSpPr>
+          <p:nvPr>
+            <p:ph type="body" idx="1"/>
+          </p:nvPr>
+        </p:nvSpPr>
+        <p:spPr bwMode="auto">
+          <a:noFill/>
+          <a:extLst>
+            <a:ext uri="{909E8E84-426E-40dd-AFC4-6F175D3DCCD1}">
+              <a14:hiddenFill xmlns:a14="http://schemas.microsoft.com/office/drawing/2010/main" xmlns="">
+                <a:solidFill>
+                  <a:srgbClr val="FFFFFF"/>
+                </a:solidFill>
+              </a14:hiddenFill>
+            </a:ext>
+            <a:ext uri="{91240B29-F687-4f45-9708-019B960494DF}">
+              <a14:hiddenLine xmlns:a14="http://schemas.microsoft.com/office/drawing/2010/main" xmlns="" w="9525">
+                <a:solidFill>
+                  <a:srgbClr val="000000"/>
+                </a:solidFill>
+                <a:miter lim="800000"/>
+                <a:headEnd/>
+                <a:tailEnd/>
+              </a14:hiddenLine>
+            </a:ext>
+          </a:extLst>
+        </p:spPr>
+        <p:txBody>
+          <a:bodyPr wrap="square" numCol="1" anchor="t" anchorCtr="0" compatLnSpc="1">
+            <a:prstTxWarp prst="textNoShape">
+              <a:avLst/>
+            </a:prstTxWarp>
+          </a:bodyPr>
+          <a:lstStyle/>
+          <a:p>
+            <a:pPr>
+              <a:spcBef>
+                <a:spcPct val="0"/>
+              </a:spcBef>
+            </a:pPr>
+            <a:r>
+              <a:rPr lang="en-US">
+                <a:latin typeface="BentonSans Book" charset="0"/>
+              </a:rPr>
+              <a:t>Table of Contents</a:t>
+            </a:r>
+          </a:p>
+        </p:txBody>
+      </p:sp>
+    </p:spTree>
+  </p:cSld>
+  <p:clrMapOvr>
+    <a:masterClrMapping/>
+  </p:clrMapOvr>
+</p:notes>
+</file>
+
+<file path=ppt/notesSlides/notesSlide20.xml><?xml version="1.0" encoding="utf-8"?>
 <p:notes xmlns:a="http://schemas.openxmlformats.org/drawingml/2006/main" xmlns:r="http://schemas.openxmlformats.org/officeDocument/2006/relationships" xmlns:p="http://schemas.openxmlformats.org/presentationml/2006/main">
   <p:cSld>
     <p:spTree>
@@ -2988,120 +3220,7 @@
 </p:notes>
 </file>
 
-<file path=ppt/notesSlides/notesSlide2.xml><?xml version="1.0" encoding="utf-8"?>
-<p:notes xmlns:a="http://schemas.openxmlformats.org/drawingml/2006/main" xmlns:r="http://schemas.openxmlformats.org/officeDocument/2006/relationships" xmlns:p="http://schemas.openxmlformats.org/presentationml/2006/main">
-  <p:cSld>
-    <p:spTree>
-      <p:nvGrpSpPr>
-        <p:cNvPr id="1" name=""/>
-        <p:cNvGrpSpPr/>
-        <p:nvPr/>
-      </p:nvGrpSpPr>
-      <p:grpSpPr>
-        <a:xfrm>
-          <a:off x="0" y="0"/>
-          <a:ext cx="0" cy="0"/>
-          <a:chOff x="0" y="0"/>
-          <a:chExt cx="0" cy="0"/>
-        </a:xfrm>
-      </p:grpSpPr>
-      <p:sp>
-        <p:nvSpPr>
-          <p:cNvPr id="37889" name="Slide Image Placeholder 1"/>
-          <p:cNvSpPr>
-            <a:spLocks noGrp="1" noRot="1" noChangeAspect="1"/>
-          </p:cNvSpPr>
-          <p:nvPr>
-            <p:ph type="sldImg"/>
-          </p:nvPr>
-        </p:nvSpPr>
-        <p:spPr bwMode="auto">
-          <a:noFill/>
-          <a:ln>
-            <a:solidFill>
-              <a:srgbClr val="000000"/>
-            </a:solidFill>
-            <a:miter lim="800000"/>
-            <a:headEnd/>
-            <a:tailEnd/>
-          </a:ln>
-          <a:extLst>
-            <a:ext uri="{909E8E84-426E-40dd-AFC4-6F175D3DCCD1}">
-              <a14:hiddenFill xmlns:a14="http://schemas.microsoft.com/office/drawing/2010/main" xmlns="">
-                <a:solidFill>
-                  <a:srgbClr val="FFFFFF"/>
-                </a:solidFill>
-              </a14:hiddenFill>
-            </a:ext>
-            <a:ext uri="{FAA26D3D-D897-4be2-8F04-BA451C77F1D7}">
-              <ma14:placeholderFlag xmlns:ma14="http://schemas.microsoft.com/office/mac/drawingml/2011/main" xmlns="" val="1"/>
-            </a:ext>
-          </a:extLst>
-        </p:spPr>
-      </p:sp>
-      <p:sp>
-        <p:nvSpPr>
-          <p:cNvPr id="37890" name="Notes Placeholder 2"/>
-          <p:cNvSpPr>
-            <a:spLocks noGrp="1"/>
-          </p:cNvSpPr>
-          <p:nvPr>
-            <p:ph type="body" idx="1"/>
-          </p:nvPr>
-        </p:nvSpPr>
-        <p:spPr bwMode="auto">
-          <a:noFill/>
-          <a:extLst>
-            <a:ext uri="{909E8E84-426E-40dd-AFC4-6F175D3DCCD1}">
-              <a14:hiddenFill xmlns:a14="http://schemas.microsoft.com/office/drawing/2010/main" xmlns="">
-                <a:solidFill>
-                  <a:srgbClr val="FFFFFF"/>
-                </a:solidFill>
-              </a14:hiddenFill>
-            </a:ext>
-            <a:ext uri="{91240B29-F687-4f45-9708-019B960494DF}">
-              <a14:hiddenLine xmlns:a14="http://schemas.microsoft.com/office/drawing/2010/main" xmlns="" w="9525">
-                <a:solidFill>
-                  <a:srgbClr val="000000"/>
-                </a:solidFill>
-                <a:miter lim="800000"/>
-                <a:headEnd/>
-                <a:tailEnd/>
-              </a14:hiddenLine>
-            </a:ext>
-          </a:extLst>
-        </p:spPr>
-        <p:txBody>
-          <a:bodyPr wrap="square" numCol="1" anchor="t" anchorCtr="0" compatLnSpc="1">
-            <a:prstTxWarp prst="textNoShape">
-              <a:avLst/>
-            </a:prstTxWarp>
-          </a:bodyPr>
-          <a:lstStyle/>
-          <a:p>
-            <a:pPr>
-              <a:spcBef>
-                <a:spcPct val="0"/>
-              </a:spcBef>
-            </a:pPr>
-            <a:r>
-              <a:rPr lang="en-US">
-                <a:latin typeface="BentonSans Book" charset="0"/>
-              </a:rPr>
-              <a:t>Table of Contents</a:t>
-            </a:r>
-          </a:p>
-        </p:txBody>
-      </p:sp>
-    </p:spTree>
-  </p:cSld>
-  <p:clrMapOvr>
-    <a:masterClrMapping/>
-  </p:clrMapOvr>
-</p:notes>
-</file>
-
-<file path=ppt/notesSlides/notesSlide20.xml><?xml version="1.0" encoding="utf-8"?>
+<file path=ppt/notesSlides/notesSlide21.xml><?xml version="1.0" encoding="utf-8"?>
 <p:notes xmlns:a="http://schemas.openxmlformats.org/drawingml/2006/main" xmlns:r="http://schemas.openxmlformats.org/officeDocument/2006/relationships" xmlns:p="http://schemas.openxmlformats.org/presentationml/2006/main">
   <p:cSld>
     <p:spTree>
@@ -3591,7 +3710,7 @@
 </p:notes>
 </file>
 
-<file path=ppt/notesSlides/notesSlide21.xml><?xml version="1.0" encoding="utf-8"?>
+<file path=ppt/notesSlides/notesSlide22.xml><?xml version="1.0" encoding="utf-8"?>
 <p:notes xmlns:a="http://schemas.openxmlformats.org/drawingml/2006/main" xmlns:r="http://schemas.openxmlformats.org/officeDocument/2006/relationships" xmlns:p="http://schemas.openxmlformats.org/presentationml/2006/main">
   <p:cSld>
     <p:spTree>
@@ -4081,7 +4200,7 @@
 </p:notes>
 </file>
 
-<file path=ppt/notesSlides/notesSlide22.xml><?xml version="1.0" encoding="utf-8"?>
+<file path=ppt/notesSlides/notesSlide23.xml><?xml version="1.0" encoding="utf-8"?>
 <p:notes xmlns:a="http://schemas.openxmlformats.org/drawingml/2006/main" xmlns:r="http://schemas.openxmlformats.org/officeDocument/2006/relationships" xmlns:p="http://schemas.openxmlformats.org/presentationml/2006/main">
   <p:cSld>
     <p:spTree>
@@ -4571,7 +4690,7 @@
 </p:notes>
 </file>
 
-<file path=ppt/notesSlides/notesSlide23.xml><?xml version="1.0" encoding="utf-8"?>
+<file path=ppt/notesSlides/notesSlide24.xml><?xml version="1.0" encoding="utf-8"?>
 <p:notes xmlns:a="http://schemas.openxmlformats.org/drawingml/2006/main" xmlns:r="http://schemas.openxmlformats.org/officeDocument/2006/relationships" xmlns:p="http://schemas.openxmlformats.org/presentationml/2006/main">
   <p:cSld>
     <p:spTree>
@@ -5061,7 +5180,7 @@
 </p:notes>
 </file>
 
-<file path=ppt/notesSlides/notesSlide24.xml><?xml version="1.0" encoding="utf-8"?>
+<file path=ppt/notesSlides/notesSlide25.xml><?xml version="1.0" encoding="utf-8"?>
 <p:notes xmlns:a="http://schemas.openxmlformats.org/drawingml/2006/main" xmlns:r="http://schemas.openxmlformats.org/officeDocument/2006/relationships" xmlns:p="http://schemas.openxmlformats.org/presentationml/2006/main">
   <p:cSld>
     <p:spTree>
@@ -5551,7 +5670,7 @@
 </p:notes>
 </file>
 
-<file path=ppt/notesSlides/notesSlide25.xml><?xml version="1.0" encoding="utf-8"?>
+<file path=ppt/notesSlides/notesSlide26.xml><?xml version="1.0" encoding="utf-8"?>
 <p:notes xmlns:a="http://schemas.openxmlformats.org/drawingml/2006/main" xmlns:r="http://schemas.openxmlformats.org/officeDocument/2006/relationships" xmlns:p="http://schemas.openxmlformats.org/presentationml/2006/main">
   <p:cSld>
     <p:spTree>
@@ -6041,7 +6160,7 @@
 </p:notes>
 </file>
 
-<file path=ppt/notesSlides/notesSlide26.xml><?xml version="1.0" encoding="utf-8"?>
+<file path=ppt/notesSlides/notesSlide27.xml><?xml version="1.0" encoding="utf-8"?>
 <p:notes xmlns:a="http://schemas.openxmlformats.org/drawingml/2006/main" xmlns:r="http://schemas.openxmlformats.org/officeDocument/2006/relationships" xmlns:p="http://schemas.openxmlformats.org/presentationml/2006/main">
   <p:cSld>
     <p:spTree>
@@ -6159,7 +6278,7 @@
 </p:notes>
 </file>
 
-<file path=ppt/notesSlides/notesSlide27.xml><?xml version="1.0" encoding="utf-8"?>
+<file path=ppt/notesSlides/notesSlide28.xml><?xml version="1.0" encoding="utf-8"?>
 <p:notes xmlns:a="http://schemas.openxmlformats.org/drawingml/2006/main" xmlns:r="http://schemas.openxmlformats.org/officeDocument/2006/relationships" xmlns:p="http://schemas.openxmlformats.org/presentationml/2006/main">
   <p:cSld>
     <p:spTree>
@@ -11130,21 +11249,8 @@
             </a:pPr>
             <a:r>
               <a:rPr lang="en-US" dirty="0"/>
-              <a:t>Letter == </a:t>
+              <a:t>Letter == correct answer; number == incorrect</a:t>
             </a:r>
-            <a:r>
-              <a:rPr lang="en-US"/>
-              <a:t>correct answer; </a:t>
-            </a:r>
-            <a:r>
-              <a:rPr lang="en-US" dirty="0"/>
-              <a:t>number </a:t>
-            </a:r>
-            <a:r>
-              <a:rPr lang="en-US"/>
-              <a:t>== incorrect</a:t>
-            </a:r>
-            <a:endParaRPr lang="en-US" dirty="0"/>
           </a:p>
           <a:p>
             <a:pPr marL="796925" lvl="1" indent="-457200" defTabSz="1306221" fontAlgn="auto">
@@ -11268,6 +11374,256 @@
 </file>
 
 <file path=ppt/slides/slide14.xml><?xml version="1.0" encoding="utf-8"?>
+<p:sld xmlns:a="http://schemas.openxmlformats.org/drawingml/2006/main" xmlns:r="http://schemas.openxmlformats.org/officeDocument/2006/relationships" xmlns:p="http://schemas.openxmlformats.org/presentationml/2006/main">
+  <p:cSld>
+    <p:spTree>
+      <p:nvGrpSpPr>
+        <p:cNvPr id="1" name=""/>
+        <p:cNvGrpSpPr/>
+        <p:nvPr/>
+      </p:nvGrpSpPr>
+      <p:grpSpPr>
+        <a:xfrm>
+          <a:off x="0" y="0"/>
+          <a:ext cx="0" cy="0"/>
+          <a:chOff x="0" y="0"/>
+          <a:chExt cx="0" cy="0"/>
+        </a:xfrm>
+      </p:grpSpPr>
+      <p:sp>
+        <p:nvSpPr>
+          <p:cNvPr id="4" name="Content Placeholder 3"/>
+          <p:cNvSpPr>
+            <a:spLocks noGrp="1"/>
+          </p:cNvSpPr>
+          <p:nvPr>
+            <p:ph idx="13"/>
+          </p:nvPr>
+        </p:nvSpPr>
+        <p:spPr/>
+        <p:txBody>
+          <a:bodyPr/>
+          <a:lstStyle/>
+          <a:p>
+            <a:pPr defTabSz="1306221" fontAlgn="auto">
+              <a:spcAft>
+                <a:spcPts val="0"/>
+              </a:spcAft>
+              <a:defRPr/>
+            </a:pPr>
+            <a:endParaRPr lang="en-US" dirty="0">
+              <a:ea typeface="+mn-ea"/>
+            </a:endParaRPr>
+          </a:p>
+        </p:txBody>
+      </p:sp>
+      <p:sp>
+        <p:nvSpPr>
+          <p:cNvPr id="3" name="Text Placeholder 2"/>
+          <p:cNvSpPr>
+            <a:spLocks noGrp="1"/>
+          </p:cNvSpPr>
+          <p:nvPr>
+            <p:ph type="body" sz="quarter" idx="12"/>
+          </p:nvPr>
+        </p:nvSpPr>
+        <p:spPr>
+          <a:prstGeom prst="rect">
+            <a:avLst/>
+          </a:prstGeom>
+        </p:spPr>
+        <p:txBody>
+          <a:bodyPr/>
+          <a:lstStyle/>
+          <a:p>
+            <a:pPr defTabSz="1306221" fontAlgn="auto">
+              <a:spcAft>
+                <a:spcPts val="0"/>
+              </a:spcAft>
+              <a:defRPr/>
+            </a:pPr>
+            <a:r>
+              <a:rPr lang="en-US" dirty="0">
+                <a:ea typeface="+mn-ea"/>
+              </a:rPr>
+              <a:t>What’s Different Here?</a:t>
+            </a:r>
+          </a:p>
+        </p:txBody>
+      </p:sp>
+      <p:sp>
+        <p:nvSpPr>
+          <p:cNvPr id="7" name="Picture Placeholder 6">
+            <a:extLst>
+              <a:ext uri="{FF2B5EF4-FFF2-40B4-BE49-F238E27FC236}">
+                <a16:creationId xmlns:a16="http://schemas.microsoft.com/office/drawing/2014/main" id="{AECBC1B0-DF9D-4949-BD86-32ED8DFB5DDD}"/>
+              </a:ext>
+            </a:extLst>
+          </p:cNvPr>
+          <p:cNvSpPr>
+            <a:spLocks noGrp="1"/>
+          </p:cNvSpPr>
+          <p:nvPr>
+            <p:ph type="pic" sz="quarter" idx="10"/>
+          </p:nvPr>
+        </p:nvSpPr>
+        <p:spPr/>
+      </p:sp>
+      <p:pic>
+        <p:nvPicPr>
+          <p:cNvPr id="4106" name="Picture 10" descr="https://cdn-images-1.medium.com/max/1600/0*LUE_Wa0aJ2kTNhfW.">
+            <a:extLst>
+              <a:ext uri="{FF2B5EF4-FFF2-40B4-BE49-F238E27FC236}">
+                <a16:creationId xmlns:a16="http://schemas.microsoft.com/office/drawing/2014/main" id="{57161E5D-C2A1-4481-BF8B-36BA82856C83}"/>
+              </a:ext>
+            </a:extLst>
+          </p:cNvPr>
+          <p:cNvPicPr>
+            <a:picLocks noChangeAspect="1" noChangeArrowheads="1"/>
+          </p:cNvPicPr>
+          <p:nvPr/>
+        </p:nvPicPr>
+        <p:blipFill>
+          <a:blip r:embed="rId3" cstate="email">
+            <a:extLst>
+              <a:ext uri="{28A0092B-C50C-407E-A947-70E740481C1C}">
+                <a14:useLocalDpi xmlns:a14="http://schemas.microsoft.com/office/drawing/2010/main" val="0"/>
+              </a:ext>
+            </a:extLst>
+          </a:blip>
+          <a:srcRect/>
+          <a:stretch>
+            <a:fillRect/>
+          </a:stretch>
+        </p:blipFill>
+        <p:spPr bwMode="auto">
+          <a:xfrm>
+            <a:off x="704476" y="1692542"/>
+            <a:ext cx="5711748" cy="5388481"/>
+          </a:xfrm>
+          <a:prstGeom prst="rect">
+            <a:avLst/>
+          </a:prstGeom>
+          <a:noFill/>
+          <a:extLst>
+            <a:ext uri="{909E8E84-426E-40DD-AFC4-6F175D3DCCD1}">
+              <a14:hiddenFill xmlns:a14="http://schemas.microsoft.com/office/drawing/2010/main">
+                <a:solidFill>
+                  <a:srgbClr val="FFFFFF"/>
+                </a:solidFill>
+              </a14:hiddenFill>
+            </a:ext>
+          </a:extLst>
+        </p:spPr>
+      </p:pic>
+      <p:pic>
+        <p:nvPicPr>
+          <p:cNvPr id="4108" name="Picture 12" descr="https://cdn-images-1.medium.com/max/1600/0*C1dsWj4KkCoQpBBe.">
+            <a:extLst>
+              <a:ext uri="{FF2B5EF4-FFF2-40B4-BE49-F238E27FC236}">
+                <a16:creationId xmlns:a16="http://schemas.microsoft.com/office/drawing/2014/main" id="{8AAAEEB3-CD20-46DD-B856-079A6D5C1E14}"/>
+              </a:ext>
+            </a:extLst>
+          </p:cNvPr>
+          <p:cNvPicPr>
+            <a:picLocks noChangeAspect="1" noChangeArrowheads="1"/>
+          </p:cNvPicPr>
+          <p:nvPr/>
+        </p:nvPicPr>
+        <p:blipFill>
+          <a:blip r:embed="rId4" cstate="email">
+            <a:extLst>
+              <a:ext uri="{28A0092B-C50C-407E-A947-70E740481C1C}">
+                <a14:useLocalDpi xmlns:a14="http://schemas.microsoft.com/office/drawing/2010/main" val="0"/>
+              </a:ext>
+            </a:extLst>
+          </a:blip>
+          <a:srcRect/>
+          <a:stretch>
+            <a:fillRect/>
+          </a:stretch>
+        </p:blipFill>
+        <p:spPr bwMode="auto">
+          <a:xfrm>
+            <a:off x="6905146" y="2055107"/>
+            <a:ext cx="7073915" cy="5035866"/>
+          </a:xfrm>
+          <a:prstGeom prst="rect">
+            <a:avLst/>
+          </a:prstGeom>
+          <a:noFill/>
+          <a:extLst>
+            <a:ext uri="{909E8E84-426E-40DD-AFC4-6F175D3DCCD1}">
+              <a14:hiddenFill xmlns:a14="http://schemas.microsoft.com/office/drawing/2010/main">
+                <a:solidFill>
+                  <a:srgbClr val="FFFFFF"/>
+                </a:solidFill>
+              </a14:hiddenFill>
+            </a:ext>
+          </a:extLst>
+        </p:spPr>
+      </p:pic>
+      <p:pic>
+        <p:nvPicPr>
+          <p:cNvPr id="19" name="Picture 14" descr="https://cdn-images-1.medium.com/max/1600/0*kDLKkN3Wy9U3EZ6R.">
+            <a:extLst>
+              <a:ext uri="{FF2B5EF4-FFF2-40B4-BE49-F238E27FC236}">
+                <a16:creationId xmlns:a16="http://schemas.microsoft.com/office/drawing/2014/main" id="{6633C1A3-C36B-43FB-9E2A-39058D9A265C}"/>
+              </a:ext>
+            </a:extLst>
+          </p:cNvPr>
+          <p:cNvPicPr>
+            <a:picLocks noChangeAspect="1" noChangeArrowheads="1"/>
+          </p:cNvPicPr>
+          <p:nvPr/>
+        </p:nvPicPr>
+        <p:blipFill>
+          <a:blip r:embed="rId5" cstate="email">
+            <a:extLst>
+              <a:ext uri="{28A0092B-C50C-407E-A947-70E740481C1C}">
+                <a14:useLocalDpi xmlns:a14="http://schemas.microsoft.com/office/drawing/2010/main" val="0"/>
+              </a:ext>
+            </a:extLst>
+          </a:blip>
+          <a:srcRect/>
+          <a:stretch>
+            <a:fillRect/>
+          </a:stretch>
+        </p:blipFill>
+        <p:spPr bwMode="auto">
+          <a:xfrm>
+            <a:off x="651250" y="1869074"/>
+            <a:ext cx="5842933" cy="4977775"/>
+          </a:xfrm>
+          <a:prstGeom prst="rect">
+            <a:avLst/>
+          </a:prstGeom>
+          <a:noFill/>
+          <a:extLst>
+            <a:ext uri="{909E8E84-426E-40DD-AFC4-6F175D3DCCD1}">
+              <a14:hiddenFill xmlns:a14="http://schemas.microsoft.com/office/drawing/2010/main">
+                <a:solidFill>
+                  <a:srgbClr val="FFFFFF"/>
+                </a:solidFill>
+              </a14:hiddenFill>
+            </a:ext>
+          </a:extLst>
+        </p:spPr>
+      </p:pic>
+    </p:spTree>
+    <p:extLst>
+      <p:ext uri="{BB962C8B-B14F-4D97-AF65-F5344CB8AC3E}">
+        <p14:creationId xmlns:p14="http://schemas.microsoft.com/office/powerpoint/2010/main" val="4218308422"/>
+      </p:ext>
+    </p:extLst>
+  </p:cSld>
+  <p:clrMapOvr>
+    <a:masterClrMapping/>
+  </p:clrMapOvr>
+</p:sld>
+</file>
+
+<file path=ppt/slides/slide15.xml><?xml version="1.0" encoding="utf-8"?>
 <p:sld xmlns:a="http://schemas.openxmlformats.org/drawingml/2006/main" xmlns:r="http://schemas.openxmlformats.org/officeDocument/2006/relationships" xmlns:p="http://schemas.openxmlformats.org/presentationml/2006/main">
   <p:cSld>
     <p:spTree>
@@ -11447,7 +11803,7 @@
 </p:sld>
 </file>
 
-<file path=ppt/slides/slide15.xml><?xml version="1.0" encoding="utf-8"?>
+<file path=ppt/slides/slide16.xml><?xml version="1.0" encoding="utf-8"?>
 <p:sld xmlns:a="http://schemas.openxmlformats.org/drawingml/2006/main" xmlns:r="http://schemas.openxmlformats.org/officeDocument/2006/relationships" xmlns:p="http://schemas.openxmlformats.org/presentationml/2006/main">
   <p:cSld>
     <p:spTree>
@@ -11541,7 +11897,7 @@
 </p:sld>
 </file>
 
-<file path=ppt/slides/slide16.xml><?xml version="1.0" encoding="utf-8"?>
+<file path=ppt/slides/slide17.xml><?xml version="1.0" encoding="utf-8"?>
 <p:sld xmlns:a="http://schemas.openxmlformats.org/drawingml/2006/main" xmlns:r="http://schemas.openxmlformats.org/officeDocument/2006/relationships" xmlns:p="http://schemas.openxmlformats.org/presentationml/2006/main">
   <p:cSld>
     <p:spTree>
@@ -11642,7 +11998,7 @@
 </p:sld>
 </file>
 
-<file path=ppt/slides/slide17.xml><?xml version="1.0" encoding="utf-8"?>
+<file path=ppt/slides/slide18.xml><?xml version="1.0" encoding="utf-8"?>
 <p:sld xmlns:a="http://schemas.openxmlformats.org/drawingml/2006/main" xmlns:r="http://schemas.openxmlformats.org/officeDocument/2006/relationships" xmlns:p="http://schemas.openxmlformats.org/presentationml/2006/main">
   <p:cSld>
     <p:spTree>
@@ -11714,7 +12070,7 @@
 </p:sld>
 </file>
 
-<file path=ppt/slides/slide18.xml><?xml version="1.0" encoding="utf-8"?>
+<file path=ppt/slides/slide19.xml><?xml version="1.0" encoding="utf-8"?>
 <p:sld xmlns:a="http://schemas.openxmlformats.org/drawingml/2006/main" xmlns:r="http://schemas.openxmlformats.org/officeDocument/2006/relationships" xmlns:p="http://schemas.openxmlformats.org/presentationml/2006/main">
   <p:cSld>
     <p:spTree>
@@ -11754,95 +12110,6 @@
           </a:extLst>
         </p:spPr>
       </p:sp>
-    </p:spTree>
-  </p:cSld>
-  <p:clrMapOvr>
-    <a:masterClrMapping/>
-  </p:clrMapOvr>
-</p:sld>
-</file>
-
-<file path=ppt/slides/slide19.xml><?xml version="1.0" encoding="utf-8"?>
-<p:sld xmlns:a="http://schemas.openxmlformats.org/drawingml/2006/main" xmlns:r="http://schemas.openxmlformats.org/officeDocument/2006/relationships" xmlns:p="http://schemas.openxmlformats.org/presentationml/2006/main">
-  <p:cSld>
-    <p:spTree>
-      <p:nvGrpSpPr>
-        <p:cNvPr id="1" name=""/>
-        <p:cNvGrpSpPr/>
-        <p:nvPr/>
-      </p:nvGrpSpPr>
-      <p:grpSpPr>
-        <a:xfrm>
-          <a:off x="0" y="0"/>
-          <a:ext cx="0" cy="0"/>
-          <a:chOff x="0" y="0"/>
-          <a:chExt cx="0" cy="0"/>
-        </a:xfrm>
-      </p:grpSpPr>
-      <p:sp>
-        <p:nvSpPr>
-          <p:cNvPr id="20481" name="Picture Placeholder 1"/>
-          <p:cNvSpPr>
-            <a:spLocks noGrp="1"/>
-          </p:cNvSpPr>
-          <p:nvPr>
-            <p:ph type="pic" sz="quarter" idx="10"/>
-          </p:nvPr>
-        </p:nvSpPr>
-        <p:spPr bwMode="auto">
-          <a:xfrm>
-            <a:off x="0" y="0"/>
-            <a:ext cx="14630400" cy="8229600"/>
-          </a:xfrm>
-          <a:noFill/>
-          <a:ln>
-            <a:miter lim="800000"/>
-            <a:headEnd/>
-            <a:tailEnd/>
-          </a:ln>
-          <a:extLst>
-            <a:ext uri="{909E8E84-426E-40dd-AFC4-6F175D3DCCD1}">
-              <a14:hiddenFill xmlns:a14="http://schemas.microsoft.com/office/drawing/2010/main" xmlns="">
-                <a:solidFill>
-                  <a:srgbClr val="FFFFFF"/>
-                </a:solidFill>
-              </a14:hiddenFill>
-            </a:ext>
-            <a:ext uri="{FAA26D3D-D897-4be2-8F04-BA451C77F1D7}">
-              <ma14:placeholderFlag xmlns:ma14="http://schemas.microsoft.com/office/mac/drawingml/2011/main" xmlns="" val="1"/>
-            </a:ext>
-          </a:extLst>
-        </p:spPr>
-      </p:sp>
-      <p:pic>
-        <p:nvPicPr>
-          <p:cNvPr id="6" name="Picture 5" descr="Bottom_Viz_August-09.png"/>
-          <p:cNvPicPr>
-            <a:picLocks noChangeAspect="1"/>
-          </p:cNvPicPr>
-          <p:nvPr/>
-        </p:nvPicPr>
-        <p:blipFill rotWithShape="1">
-          <a:blip r:embed="rId3" cstate="email">
-            <a:extLst>
-              <a:ext uri="{28A0092B-C50C-407E-A947-70E740481C1C}">
-                <a14:useLocalDpi xmlns:a14="http://schemas.microsoft.com/office/drawing/2010/main" val="0"/>
-              </a:ext>
-            </a:extLst>
-          </a:blip>
-          <a:srcRect l="1098" b="58330"/>
-          <a:stretch/>
-        </p:blipFill>
-        <p:spPr>
-          <a:xfrm flipH="1">
-            <a:off x="0" y="6910529"/>
-            <a:ext cx="14630400" cy="1319071"/>
-          </a:xfrm>
-          <a:prstGeom prst="rect">
-            <a:avLst/>
-          </a:prstGeom>
-        </p:spPr>
-      </p:pic>
     </p:spTree>
   </p:cSld>
   <p:clrMapOvr>
@@ -11977,6 +12244,95 @@
       </p:grpSpPr>
       <p:sp>
         <p:nvSpPr>
+          <p:cNvPr id="20481" name="Picture Placeholder 1"/>
+          <p:cNvSpPr>
+            <a:spLocks noGrp="1"/>
+          </p:cNvSpPr>
+          <p:nvPr>
+            <p:ph type="pic" sz="quarter" idx="10"/>
+          </p:nvPr>
+        </p:nvSpPr>
+        <p:spPr bwMode="auto">
+          <a:xfrm>
+            <a:off x="0" y="0"/>
+            <a:ext cx="14630400" cy="8229600"/>
+          </a:xfrm>
+          <a:noFill/>
+          <a:ln>
+            <a:miter lim="800000"/>
+            <a:headEnd/>
+            <a:tailEnd/>
+          </a:ln>
+          <a:extLst>
+            <a:ext uri="{909E8E84-426E-40dd-AFC4-6F175D3DCCD1}">
+              <a14:hiddenFill xmlns:a14="http://schemas.microsoft.com/office/drawing/2010/main" xmlns="">
+                <a:solidFill>
+                  <a:srgbClr val="FFFFFF"/>
+                </a:solidFill>
+              </a14:hiddenFill>
+            </a:ext>
+            <a:ext uri="{FAA26D3D-D897-4be2-8F04-BA451C77F1D7}">
+              <ma14:placeholderFlag xmlns:ma14="http://schemas.microsoft.com/office/mac/drawingml/2011/main" xmlns="" val="1"/>
+            </a:ext>
+          </a:extLst>
+        </p:spPr>
+      </p:sp>
+      <p:pic>
+        <p:nvPicPr>
+          <p:cNvPr id="6" name="Picture 5" descr="Bottom_Viz_August-09.png"/>
+          <p:cNvPicPr>
+            <a:picLocks noChangeAspect="1"/>
+          </p:cNvPicPr>
+          <p:nvPr/>
+        </p:nvPicPr>
+        <p:blipFill rotWithShape="1">
+          <a:blip r:embed="rId3" cstate="email">
+            <a:extLst>
+              <a:ext uri="{28A0092B-C50C-407E-A947-70E740481C1C}">
+                <a14:useLocalDpi xmlns:a14="http://schemas.microsoft.com/office/drawing/2010/main" val="0"/>
+              </a:ext>
+            </a:extLst>
+          </a:blip>
+          <a:srcRect l="1098" b="58330"/>
+          <a:stretch/>
+        </p:blipFill>
+        <p:spPr>
+          <a:xfrm flipH="1">
+            <a:off x="0" y="6910529"/>
+            <a:ext cx="14630400" cy="1319071"/>
+          </a:xfrm>
+          <a:prstGeom prst="rect">
+            <a:avLst/>
+          </a:prstGeom>
+        </p:spPr>
+      </p:pic>
+    </p:spTree>
+  </p:cSld>
+  <p:clrMapOvr>
+    <a:masterClrMapping/>
+  </p:clrMapOvr>
+</p:sld>
+</file>
+
+<file path=ppt/slides/slide21.xml><?xml version="1.0" encoding="utf-8"?>
+<p:sld xmlns:a="http://schemas.openxmlformats.org/drawingml/2006/main" xmlns:r="http://schemas.openxmlformats.org/officeDocument/2006/relationships" xmlns:p="http://schemas.openxmlformats.org/presentationml/2006/main">
+  <p:cSld>
+    <p:spTree>
+      <p:nvGrpSpPr>
+        <p:cNvPr id="1" name=""/>
+        <p:cNvGrpSpPr/>
+        <p:nvPr/>
+      </p:nvGrpSpPr>
+      <p:grpSpPr>
+        <a:xfrm>
+          <a:off x="0" y="0"/>
+          <a:ext cx="0" cy="0"/>
+          <a:chOff x="0" y="0"/>
+          <a:chExt cx="0" cy="0"/>
+        </a:xfrm>
+      </p:grpSpPr>
+      <p:sp>
+        <p:nvSpPr>
           <p:cNvPr id="21505" name="Title 1"/>
           <p:cNvSpPr>
             <a:spLocks noGrp="1"/>
@@ -12015,7 +12371,7 @@
 </p:sld>
 </file>
 
-<file path=ppt/slides/slide21.xml><?xml version="1.0" encoding="utf-8"?>
+<file path=ppt/slides/slide22.xml><?xml version="1.0" encoding="utf-8"?>
 <p:sld xmlns:a="http://schemas.openxmlformats.org/drawingml/2006/main" xmlns:r="http://schemas.openxmlformats.org/officeDocument/2006/relationships" xmlns:p="http://schemas.openxmlformats.org/presentationml/2006/main">
   <p:cSld>
     <p:spTree>
@@ -12223,7 +12579,7 @@
 </p:sld>
 </file>
 
-<file path=ppt/slides/slide22.xml><?xml version="1.0" encoding="utf-8"?>
+<file path=ppt/slides/slide23.xml><?xml version="1.0" encoding="utf-8"?>
 <p:sld xmlns:a="http://schemas.openxmlformats.org/drawingml/2006/main" xmlns:r="http://schemas.openxmlformats.org/officeDocument/2006/relationships" xmlns:p="http://schemas.openxmlformats.org/presentationml/2006/main">
   <p:cSld>
     <p:spTree>
@@ -13510,7 +13866,7 @@
 </p:sld>
 </file>
 
-<file path=ppt/slides/slide23.xml><?xml version="1.0" encoding="utf-8"?>
+<file path=ppt/slides/slide24.xml><?xml version="1.0" encoding="utf-8"?>
 <p:sld xmlns:a="http://schemas.openxmlformats.org/drawingml/2006/main" xmlns:r="http://schemas.openxmlformats.org/officeDocument/2006/relationships" xmlns:p="http://schemas.openxmlformats.org/presentationml/2006/main">
   <p:cSld>
     <p:spTree>
@@ -13745,7 +14101,7 @@
 </p:sld>
 </file>
 
-<file path=ppt/slides/slide24.xml><?xml version="1.0" encoding="utf-8"?>
+<file path=ppt/slides/slide25.xml><?xml version="1.0" encoding="utf-8"?>
 <p:sld xmlns:a="http://schemas.openxmlformats.org/drawingml/2006/main" xmlns:r="http://schemas.openxmlformats.org/officeDocument/2006/relationships" xmlns:p="http://schemas.openxmlformats.org/presentationml/2006/main">
   <p:cSld>
     <p:spTree>
@@ -14315,7 +14671,7 @@
 </p:sld>
 </file>
 
-<file path=ppt/slides/slide25.xml><?xml version="1.0" encoding="utf-8"?>
+<file path=ppt/slides/slide26.xml><?xml version="1.0" encoding="utf-8"?>
 <p:sld xmlns:a="http://schemas.openxmlformats.org/drawingml/2006/main" xmlns:r="http://schemas.openxmlformats.org/officeDocument/2006/relationships" xmlns:p="http://schemas.openxmlformats.org/presentationml/2006/main">
   <p:cSld>
     <p:spTree>
@@ -14739,7 +15095,7 @@
 </p:sld>
 </file>
 
-<file path=ppt/slides/slide26.xml><?xml version="1.0" encoding="utf-8"?>
+<file path=ppt/slides/slide27.xml><?xml version="1.0" encoding="utf-8"?>
 <p:sld xmlns:a="http://schemas.openxmlformats.org/drawingml/2006/main" xmlns:r="http://schemas.openxmlformats.org/officeDocument/2006/relationships" xmlns:p="http://schemas.openxmlformats.org/presentationml/2006/main">
   <p:cSld>
     <p:spTree>
@@ -15572,7 +15928,7 @@
 </p:sld>
 </file>
 
-<file path=ppt/slides/slide27.xml><?xml version="1.0" encoding="utf-8"?>
+<file path=ppt/slides/slide28.xml><?xml version="1.0" encoding="utf-8"?>
 <p:sld xmlns:a="http://schemas.openxmlformats.org/drawingml/2006/main" xmlns:r="http://schemas.openxmlformats.org/officeDocument/2006/relationships" xmlns:p="http://schemas.openxmlformats.org/presentationml/2006/main">
   <p:cSld>
     <p:spTree>
@@ -37101,7 +37457,7 @@
 </p:sld>
 </file>
 
-<file path=ppt/slides/slide28.xml><?xml version="1.0" encoding="utf-8"?>
+<file path=ppt/slides/slide29.xml><?xml version="1.0" encoding="utf-8"?>
 <p:sld xmlns:a="http://schemas.openxmlformats.org/drawingml/2006/main" xmlns:r="http://schemas.openxmlformats.org/officeDocument/2006/relationships" xmlns:p="http://schemas.openxmlformats.org/presentationml/2006/main">
   <p:cSld>
     <p:spTree>
@@ -37532,102 +37888,6 @@
     <p:extLst>
       <p:ext uri="{BB962C8B-B14F-4D97-AF65-F5344CB8AC3E}">
         <p14:creationId xmlns:p14="http://schemas.microsoft.com/office/powerpoint/2010/main" val="4226113712"/>
-      </p:ext>
-    </p:extLst>
-  </p:cSld>
-  <p:clrMapOvr>
-    <a:masterClrMapping/>
-  </p:clrMapOvr>
-</p:sld>
-</file>
-
-<file path=ppt/slides/slide29.xml><?xml version="1.0" encoding="utf-8"?>
-<p:sld xmlns:a="http://schemas.openxmlformats.org/drawingml/2006/main" xmlns:r="http://schemas.openxmlformats.org/officeDocument/2006/relationships" xmlns:p="http://schemas.openxmlformats.org/presentationml/2006/main">
-  <p:cSld>
-    <p:spTree>
-      <p:nvGrpSpPr>
-        <p:cNvPr id="1" name=""/>
-        <p:cNvGrpSpPr/>
-        <p:nvPr/>
-      </p:nvGrpSpPr>
-      <p:grpSpPr>
-        <a:xfrm>
-          <a:off x="0" y="0"/>
-          <a:ext cx="0" cy="0"/>
-          <a:chOff x="0" y="0"/>
-          <a:chExt cx="0" cy="0"/>
-        </a:xfrm>
-      </p:grpSpPr>
-      <p:pic>
-        <p:nvPicPr>
-          <p:cNvPr id="3" name="Picture 2" descr="T10_3devices.png"/>
-          <p:cNvPicPr>
-            <a:picLocks noChangeAspect="1"/>
-          </p:cNvPicPr>
-          <p:nvPr/>
-        </p:nvPicPr>
-        <p:blipFill>
-          <a:blip r:embed="rId2">
-            <a:extLst>
-              <a:ext uri="{28A0092B-C50C-407E-A947-70E740481C1C}">
-                <a14:useLocalDpi xmlns:a14="http://schemas.microsoft.com/office/drawing/2010/main" val="0"/>
-              </a:ext>
-            </a:extLst>
-          </a:blip>
-          <a:stretch>
-            <a:fillRect/>
-          </a:stretch>
-        </p:blipFill>
-        <p:spPr>
-          <a:xfrm>
-            <a:off x="1281885" y="866429"/>
-            <a:ext cx="12030075" cy="6419850"/>
-          </a:xfrm>
-          <a:prstGeom prst="rect">
-            <a:avLst/>
-          </a:prstGeom>
-        </p:spPr>
-      </p:pic>
-      <p:sp>
-        <p:nvSpPr>
-          <p:cNvPr id="2" name="Text Placeholder 1"/>
-          <p:cNvSpPr>
-            <a:spLocks noGrp="1"/>
-          </p:cNvSpPr>
-          <p:nvPr>
-            <p:ph type="body" sz="quarter" idx="12"/>
-          </p:nvPr>
-        </p:nvSpPr>
-        <p:spPr>
-          <a:prstGeom prst="rect">
-            <a:avLst/>
-          </a:prstGeom>
-        </p:spPr>
-        <p:txBody>
-          <a:bodyPr/>
-          <a:lstStyle/>
-          <a:p>
-            <a:pPr defTabSz="1306221" fontAlgn="auto">
-              <a:spcAft>
-                <a:spcPts val="0"/>
-              </a:spcAft>
-              <a:buFont typeface="Arial" panose="020B0604020202020204" pitchFamily="34" charset="0"/>
-              <a:buNone/>
-              <a:defRPr/>
-            </a:pPr>
-            <a:r>
-              <a:rPr lang="en-US" dirty="0">
-                <a:ea typeface="+mn-ea"/>
-              </a:rPr>
-              <a:t>All Devices</a:t>
-            </a:r>
-          </a:p>
-        </p:txBody>
-      </p:sp>
-    </p:spTree>
-    <p:extLst>
-      <p:ext uri="{BB962C8B-B14F-4D97-AF65-F5344CB8AC3E}">
-        <p14:creationId xmlns:p14="http://schemas.microsoft.com/office/powerpoint/2010/main" val="1429312328"/>
       </p:ext>
     </p:extLst>
   </p:cSld>
@@ -37908,6 +38168,102 @@
       </p:grpSpPr>
       <p:pic>
         <p:nvPicPr>
+          <p:cNvPr id="3" name="Picture 2" descr="T10_3devices.png"/>
+          <p:cNvPicPr>
+            <a:picLocks noChangeAspect="1"/>
+          </p:cNvPicPr>
+          <p:nvPr/>
+        </p:nvPicPr>
+        <p:blipFill>
+          <a:blip r:embed="rId2">
+            <a:extLst>
+              <a:ext uri="{28A0092B-C50C-407E-A947-70E740481C1C}">
+                <a14:useLocalDpi xmlns:a14="http://schemas.microsoft.com/office/drawing/2010/main" val="0"/>
+              </a:ext>
+            </a:extLst>
+          </a:blip>
+          <a:stretch>
+            <a:fillRect/>
+          </a:stretch>
+        </p:blipFill>
+        <p:spPr>
+          <a:xfrm>
+            <a:off x="1281885" y="866429"/>
+            <a:ext cx="12030075" cy="6419850"/>
+          </a:xfrm>
+          <a:prstGeom prst="rect">
+            <a:avLst/>
+          </a:prstGeom>
+        </p:spPr>
+      </p:pic>
+      <p:sp>
+        <p:nvSpPr>
+          <p:cNvPr id="2" name="Text Placeholder 1"/>
+          <p:cNvSpPr>
+            <a:spLocks noGrp="1"/>
+          </p:cNvSpPr>
+          <p:nvPr>
+            <p:ph type="body" sz="quarter" idx="12"/>
+          </p:nvPr>
+        </p:nvSpPr>
+        <p:spPr>
+          <a:prstGeom prst="rect">
+            <a:avLst/>
+          </a:prstGeom>
+        </p:spPr>
+        <p:txBody>
+          <a:bodyPr/>
+          <a:lstStyle/>
+          <a:p>
+            <a:pPr defTabSz="1306221" fontAlgn="auto">
+              <a:spcAft>
+                <a:spcPts val="0"/>
+              </a:spcAft>
+              <a:buFont typeface="Arial" panose="020B0604020202020204" pitchFamily="34" charset="0"/>
+              <a:buNone/>
+              <a:defRPr/>
+            </a:pPr>
+            <a:r>
+              <a:rPr lang="en-US" dirty="0">
+                <a:ea typeface="+mn-ea"/>
+              </a:rPr>
+              <a:t>All Devices</a:t>
+            </a:r>
+          </a:p>
+        </p:txBody>
+      </p:sp>
+    </p:spTree>
+    <p:extLst>
+      <p:ext uri="{BB962C8B-B14F-4D97-AF65-F5344CB8AC3E}">
+        <p14:creationId xmlns:p14="http://schemas.microsoft.com/office/powerpoint/2010/main" val="1429312328"/>
+      </p:ext>
+    </p:extLst>
+  </p:cSld>
+  <p:clrMapOvr>
+    <a:masterClrMapping/>
+  </p:clrMapOvr>
+</p:sld>
+</file>
+
+<file path=ppt/slides/slide31.xml><?xml version="1.0" encoding="utf-8"?>
+<p:sld xmlns:a="http://schemas.openxmlformats.org/drawingml/2006/main" xmlns:r="http://schemas.openxmlformats.org/officeDocument/2006/relationships" xmlns:p="http://schemas.openxmlformats.org/presentationml/2006/main">
+  <p:cSld>
+    <p:spTree>
+      <p:nvGrpSpPr>
+        <p:cNvPr id="1" name=""/>
+        <p:cNvGrpSpPr/>
+        <p:nvPr/>
+      </p:nvGrpSpPr>
+      <p:grpSpPr>
+        <a:xfrm>
+          <a:off x="0" y="0"/>
+          <a:ext cx="0" cy="0"/>
+          <a:chOff x="0" y="0"/>
+          <a:chExt cx="0" cy="0"/>
+        </a:xfrm>
+      </p:grpSpPr>
+      <p:pic>
+        <p:nvPicPr>
           <p:cNvPr id="5" name="Picture 4" descr="FJ8A1987_2-b.jpg"/>
           <p:cNvPicPr>
             <a:picLocks noChangeAspect="1"/>
@@ -38323,7 +38679,7 @@
 </p:sld>
 </file>
 
-<file path=ppt/slides/slide31.xml><?xml version="1.0" encoding="utf-8"?>
+<file path=ppt/slides/slide32.xml><?xml version="1.0" encoding="utf-8"?>
 <p:sld xmlns:a="http://schemas.openxmlformats.org/drawingml/2006/main" xmlns:r="http://schemas.openxmlformats.org/officeDocument/2006/relationships" xmlns:p="http://schemas.openxmlformats.org/presentationml/2006/main">
   <p:cSld>
     <p:spTree>
@@ -40283,7 +40639,7 @@
 </p:sld>
 </file>
 
-<file path=ppt/slides/slide32.xml><?xml version="1.0" encoding="utf-8"?>
+<file path=ppt/slides/slide33.xml><?xml version="1.0" encoding="utf-8"?>
 <p:sld xmlns:a="http://schemas.openxmlformats.org/drawingml/2006/main" xmlns:r="http://schemas.openxmlformats.org/officeDocument/2006/relationships" xmlns:p="http://schemas.openxmlformats.org/presentationml/2006/main">
   <p:cSld>
     <p:spTree>
@@ -42397,7 +42753,7 @@
 </p:sld>
 </file>
 
-<file path=ppt/slides/slide33.xml><?xml version="1.0" encoding="utf-8"?>
+<file path=ppt/slides/slide34.xml><?xml version="1.0" encoding="utf-8"?>
 <p:sld xmlns:a="http://schemas.openxmlformats.org/drawingml/2006/main" xmlns:r="http://schemas.openxmlformats.org/officeDocument/2006/relationships" xmlns:p="http://schemas.openxmlformats.org/presentationml/2006/main">
   <p:cSld>
     <p:spTree>
@@ -43981,7 +44337,7 @@
 </p:sld>
 </file>
 
-<file path=ppt/slides/slide34.xml><?xml version="1.0" encoding="utf-8"?>
+<file path=ppt/slides/slide35.xml><?xml version="1.0" encoding="utf-8"?>
 <p:sld xmlns:a="http://schemas.openxmlformats.org/drawingml/2006/main" xmlns:r="http://schemas.openxmlformats.org/officeDocument/2006/relationships" xmlns:p="http://schemas.openxmlformats.org/presentationml/2006/main">
   <p:cSld>
     <p:spTree>
@@ -44080,7 +44436,7 @@
 </p:sld>
 </file>
 
-<file path=ppt/slides/slide35.xml><?xml version="1.0" encoding="utf-8"?>
+<file path=ppt/slides/slide36.xml><?xml version="1.0" encoding="utf-8"?>
 <p:sld xmlns:a="http://schemas.openxmlformats.org/drawingml/2006/main" xmlns:r="http://schemas.openxmlformats.org/officeDocument/2006/relationships" xmlns:p="http://schemas.openxmlformats.org/presentationml/2006/main">
   <p:cSld>
     <p:spTree>
@@ -44186,7 +44542,7 @@
 </p:sld>
 </file>
 
-<file path=ppt/slides/slide36.xml><?xml version="1.0" encoding="utf-8"?>
+<file path=ppt/slides/slide37.xml><?xml version="1.0" encoding="utf-8"?>
 <p:sld xmlns:a="http://schemas.openxmlformats.org/drawingml/2006/main" xmlns:r="http://schemas.openxmlformats.org/officeDocument/2006/relationships" xmlns:p="http://schemas.openxmlformats.org/presentationml/2006/main">
   <p:cSld>
     <p:spTree>

</xml_diff>

<commit_message>
updated intro and added agenda
</commit_message>
<xml_diff>
--- a/lecture.pptx
+++ b/lecture.pptx
@@ -323,7 +323,7 @@
               <a:pPr>
                 <a:defRPr/>
               </a:pPr>
-              <a:t>5/26/2019</a:t>
+              <a:t>5/27/2019</a:t>
             </a:fld>
             <a:endParaRPr lang="en-US" dirty="0"/>
           </a:p>
@@ -547,7 +547,7 @@
               <a:pPr>
                 <a:defRPr/>
               </a:pPr>
-              <a:t>5/26/2019</a:t>
+              <a:t>5/27/2019</a:t>
             </a:fld>
             <a:endParaRPr lang="en-US" dirty="0"/>
           </a:p>
@@ -914,14 +914,14 @@
           </a:ln>
           <a:extLst>
             <a:ext uri="{909E8E84-426E-40dd-AFC4-6F175D3DCCD1}">
-              <a14:hiddenFill xmlns="" xmlns:a14="http://schemas.microsoft.com/office/drawing/2010/main">
+              <a14:hiddenFill xmlns:a14="http://schemas.microsoft.com/office/drawing/2010/main" xmlns="">
                 <a:solidFill>
                   <a:srgbClr val="FFFFFF"/>
                 </a:solidFill>
               </a14:hiddenFill>
             </a:ext>
             <a:ext uri="{FAA26D3D-D897-4be2-8F04-BA451C77F1D7}">
-              <ma14:placeholderFlag xmlns="" xmlns:ma14="http://schemas.microsoft.com/office/mac/drawingml/2011/main" val="1"/>
+              <ma14:placeholderFlag xmlns:ma14="http://schemas.microsoft.com/office/mac/drawingml/2011/main" xmlns="" val="1"/>
             </a:ext>
           </a:extLst>
         </p:spPr>
@@ -940,14 +940,14 @@
           <a:noFill/>
           <a:extLst>
             <a:ext uri="{909E8E84-426E-40dd-AFC4-6F175D3DCCD1}">
-              <a14:hiddenFill xmlns="" xmlns:a14="http://schemas.microsoft.com/office/drawing/2010/main">
+              <a14:hiddenFill xmlns:a14="http://schemas.microsoft.com/office/drawing/2010/main" xmlns="">
                 <a:solidFill>
                   <a:srgbClr val="FFFFFF"/>
                 </a:solidFill>
               </a14:hiddenFill>
             </a:ext>
             <a:ext uri="{91240B29-F687-4f45-9708-019B960494DF}">
-              <a14:hiddenLine xmlns="" xmlns:a14="http://schemas.microsoft.com/office/drawing/2010/main" w="9525">
+              <a14:hiddenLine xmlns:a14="http://schemas.microsoft.com/office/drawing/2010/main" xmlns="" w="9525">
                 <a:solidFill>
                   <a:srgbClr val="000000"/>
                 </a:solidFill>
@@ -1027,14 +1027,14 @@
           </a:ln>
           <a:extLst>
             <a:ext uri="{909E8E84-426E-40dd-AFC4-6F175D3DCCD1}">
-              <a14:hiddenFill xmlns="" xmlns:a14="http://schemas.microsoft.com/office/drawing/2010/main">
+              <a14:hiddenFill xmlns:a14="http://schemas.microsoft.com/office/drawing/2010/main" xmlns="">
                 <a:solidFill>
                   <a:srgbClr val="FFFFFF"/>
                 </a:solidFill>
               </a14:hiddenFill>
             </a:ext>
             <a:ext uri="{FAA26D3D-D897-4be2-8F04-BA451C77F1D7}">
-              <ma14:placeholderFlag xmlns="" xmlns:ma14="http://schemas.microsoft.com/office/mac/drawingml/2011/main" val="1"/>
+              <ma14:placeholderFlag xmlns:ma14="http://schemas.microsoft.com/office/mac/drawingml/2011/main" xmlns="" val="1"/>
             </a:ext>
           </a:extLst>
         </p:spPr>
@@ -1053,14 +1053,14 @@
           <a:noFill/>
           <a:extLst>
             <a:ext uri="{909E8E84-426E-40dd-AFC4-6F175D3DCCD1}">
-              <a14:hiddenFill xmlns="" xmlns:a14="http://schemas.microsoft.com/office/drawing/2010/main">
+              <a14:hiddenFill xmlns:a14="http://schemas.microsoft.com/office/drawing/2010/main" xmlns="">
                 <a:solidFill>
                   <a:srgbClr val="FFFFFF"/>
                 </a:solidFill>
               </a14:hiddenFill>
             </a:ext>
             <a:ext uri="{91240B29-F687-4f45-9708-019B960494DF}">
-              <a14:hiddenLine xmlns="" xmlns:a14="http://schemas.microsoft.com/office/drawing/2010/main" w="9525">
+              <a14:hiddenLine xmlns:a14="http://schemas.microsoft.com/office/drawing/2010/main" xmlns="" w="9525">
                 <a:solidFill>
                   <a:srgbClr val="000000"/>
                 </a:solidFill>
@@ -1140,14 +1140,14 @@
           </a:ln>
           <a:extLst>
             <a:ext uri="{909E8E84-426E-40dd-AFC4-6F175D3DCCD1}">
-              <a14:hiddenFill xmlns="" xmlns:a14="http://schemas.microsoft.com/office/drawing/2010/main">
+              <a14:hiddenFill xmlns:a14="http://schemas.microsoft.com/office/drawing/2010/main" xmlns="">
                 <a:solidFill>
                   <a:srgbClr val="FFFFFF"/>
                 </a:solidFill>
               </a14:hiddenFill>
             </a:ext>
             <a:ext uri="{FAA26D3D-D897-4be2-8F04-BA451C77F1D7}">
-              <ma14:placeholderFlag xmlns="" xmlns:ma14="http://schemas.microsoft.com/office/mac/drawingml/2011/main" val="1"/>
+              <ma14:placeholderFlag xmlns:ma14="http://schemas.microsoft.com/office/mac/drawingml/2011/main" xmlns="" val="1"/>
             </a:ext>
           </a:extLst>
         </p:spPr>
@@ -1166,14 +1166,14 @@
           <a:noFill/>
           <a:extLst>
             <a:ext uri="{909E8E84-426E-40dd-AFC4-6F175D3DCCD1}">
-              <a14:hiddenFill xmlns="" xmlns:a14="http://schemas.microsoft.com/office/drawing/2010/main">
+              <a14:hiddenFill xmlns:a14="http://schemas.microsoft.com/office/drawing/2010/main" xmlns="">
                 <a:solidFill>
                   <a:srgbClr val="FFFFFF"/>
                 </a:solidFill>
               </a14:hiddenFill>
             </a:ext>
             <a:ext uri="{91240B29-F687-4f45-9708-019B960494DF}">
-              <a14:hiddenLine xmlns="" xmlns:a14="http://schemas.microsoft.com/office/drawing/2010/main" w="9525">
+              <a14:hiddenLine xmlns:a14="http://schemas.microsoft.com/office/drawing/2010/main" xmlns="" w="9525">
                 <a:solidFill>
                   <a:srgbClr val="000000"/>
                 </a:solidFill>
@@ -1253,14 +1253,14 @@
           </a:ln>
           <a:extLst>
             <a:ext uri="{909E8E84-426E-40dd-AFC4-6F175D3DCCD1}">
-              <a14:hiddenFill xmlns="" xmlns:a14="http://schemas.microsoft.com/office/drawing/2010/main">
+              <a14:hiddenFill xmlns:a14="http://schemas.microsoft.com/office/drawing/2010/main" xmlns="">
                 <a:solidFill>
                   <a:srgbClr val="FFFFFF"/>
                 </a:solidFill>
               </a14:hiddenFill>
             </a:ext>
             <a:ext uri="{FAA26D3D-D897-4be2-8F04-BA451C77F1D7}">
-              <ma14:placeholderFlag xmlns="" xmlns:ma14="http://schemas.microsoft.com/office/mac/drawingml/2011/main" val="1"/>
+              <ma14:placeholderFlag xmlns:ma14="http://schemas.microsoft.com/office/mac/drawingml/2011/main" xmlns="" val="1"/>
             </a:ext>
           </a:extLst>
         </p:spPr>
@@ -1279,14 +1279,14 @@
           <a:noFill/>
           <a:extLst>
             <a:ext uri="{909E8E84-426E-40dd-AFC4-6F175D3DCCD1}">
-              <a14:hiddenFill xmlns="" xmlns:a14="http://schemas.microsoft.com/office/drawing/2010/main">
+              <a14:hiddenFill xmlns:a14="http://schemas.microsoft.com/office/drawing/2010/main" xmlns="">
                 <a:solidFill>
                   <a:srgbClr val="FFFFFF"/>
                 </a:solidFill>
               </a14:hiddenFill>
             </a:ext>
             <a:ext uri="{91240B29-F687-4f45-9708-019B960494DF}">
-              <a14:hiddenLine xmlns="" xmlns:a14="http://schemas.microsoft.com/office/drawing/2010/main" w="9525">
+              <a14:hiddenLine xmlns:a14="http://schemas.microsoft.com/office/drawing/2010/main" xmlns="" w="9525">
                 <a:solidFill>
                   <a:srgbClr val="000000"/>
                 </a:solidFill>
@@ -1366,14 +1366,14 @@
           </a:ln>
           <a:extLst>
             <a:ext uri="{909E8E84-426E-40dd-AFC4-6F175D3DCCD1}">
-              <a14:hiddenFill xmlns="" xmlns:a14="http://schemas.microsoft.com/office/drawing/2010/main">
+              <a14:hiddenFill xmlns:a14="http://schemas.microsoft.com/office/drawing/2010/main" xmlns="">
                 <a:solidFill>
                   <a:srgbClr val="FFFFFF"/>
                 </a:solidFill>
               </a14:hiddenFill>
             </a:ext>
             <a:ext uri="{FAA26D3D-D897-4be2-8F04-BA451C77F1D7}">
-              <ma14:placeholderFlag xmlns="" xmlns:ma14="http://schemas.microsoft.com/office/mac/drawingml/2011/main" val="1"/>
+              <ma14:placeholderFlag xmlns:ma14="http://schemas.microsoft.com/office/mac/drawingml/2011/main" xmlns="" val="1"/>
             </a:ext>
           </a:extLst>
         </p:spPr>
@@ -1392,14 +1392,14 @@
           <a:noFill/>
           <a:extLst>
             <a:ext uri="{909E8E84-426E-40dd-AFC4-6F175D3DCCD1}">
-              <a14:hiddenFill xmlns="" xmlns:a14="http://schemas.microsoft.com/office/drawing/2010/main">
+              <a14:hiddenFill xmlns:a14="http://schemas.microsoft.com/office/drawing/2010/main" xmlns="">
                 <a:solidFill>
                   <a:srgbClr val="FFFFFF"/>
                 </a:solidFill>
               </a14:hiddenFill>
             </a:ext>
             <a:ext uri="{91240B29-F687-4f45-9708-019B960494DF}">
-              <a14:hiddenLine xmlns="" xmlns:a14="http://schemas.microsoft.com/office/drawing/2010/main" w="9525">
+              <a14:hiddenLine xmlns:a14="http://schemas.microsoft.com/office/drawing/2010/main" xmlns="" w="9525">
                 <a:solidFill>
                   <a:srgbClr val="000000"/>
                 </a:solidFill>
@@ -1479,14 +1479,14 @@
           </a:ln>
           <a:extLst>
             <a:ext uri="{909E8E84-426E-40dd-AFC4-6F175D3DCCD1}">
-              <a14:hiddenFill xmlns="" xmlns:a14="http://schemas.microsoft.com/office/drawing/2010/main">
+              <a14:hiddenFill xmlns:a14="http://schemas.microsoft.com/office/drawing/2010/main" xmlns="">
                 <a:solidFill>
                   <a:srgbClr val="FFFFFF"/>
                 </a:solidFill>
               </a14:hiddenFill>
             </a:ext>
             <a:ext uri="{FAA26D3D-D897-4be2-8F04-BA451C77F1D7}">
-              <ma14:placeholderFlag xmlns="" xmlns:ma14="http://schemas.microsoft.com/office/mac/drawingml/2011/main" val="1"/>
+              <ma14:placeholderFlag xmlns:ma14="http://schemas.microsoft.com/office/mac/drawingml/2011/main" xmlns="" val="1"/>
             </a:ext>
           </a:extLst>
         </p:spPr>
@@ -1505,14 +1505,14 @@
           <a:noFill/>
           <a:extLst>
             <a:ext uri="{909E8E84-426E-40dd-AFC4-6F175D3DCCD1}">
-              <a14:hiddenFill xmlns="" xmlns:a14="http://schemas.microsoft.com/office/drawing/2010/main">
+              <a14:hiddenFill xmlns:a14="http://schemas.microsoft.com/office/drawing/2010/main" xmlns="">
                 <a:solidFill>
                   <a:srgbClr val="FFFFFF"/>
                 </a:solidFill>
               </a14:hiddenFill>
             </a:ext>
             <a:ext uri="{91240B29-F687-4f45-9708-019B960494DF}">
-              <a14:hiddenLine xmlns="" xmlns:a14="http://schemas.microsoft.com/office/drawing/2010/main" w="9525">
+              <a14:hiddenLine xmlns:a14="http://schemas.microsoft.com/office/drawing/2010/main" xmlns="" w="9525">
                 <a:solidFill>
                   <a:srgbClr val="000000"/>
                 </a:solidFill>
@@ -1911,14 +1911,14 @@
           </a:ln>
           <a:extLst>
             <a:ext uri="{909E8E84-426E-40dd-AFC4-6F175D3DCCD1}">
-              <a14:hiddenFill xmlns="" xmlns:a14="http://schemas.microsoft.com/office/drawing/2010/main">
+              <a14:hiddenFill xmlns:a14="http://schemas.microsoft.com/office/drawing/2010/main" xmlns="">
                 <a:solidFill>
                   <a:srgbClr val="FFFFFF"/>
                 </a:solidFill>
               </a14:hiddenFill>
             </a:ext>
             <a:ext uri="{FAA26D3D-D897-4be2-8F04-BA451C77F1D7}">
-              <ma14:placeholderFlag xmlns="" xmlns:ma14="http://schemas.microsoft.com/office/mac/drawingml/2011/main" val="1"/>
+              <ma14:placeholderFlag xmlns:ma14="http://schemas.microsoft.com/office/mac/drawingml/2011/main" xmlns="" val="1"/>
             </a:ext>
           </a:extLst>
         </p:spPr>
@@ -1937,14 +1937,14 @@
           <a:noFill/>
           <a:extLst>
             <a:ext uri="{909E8E84-426E-40dd-AFC4-6F175D3DCCD1}">
-              <a14:hiddenFill xmlns="" xmlns:a14="http://schemas.microsoft.com/office/drawing/2010/main">
+              <a14:hiddenFill xmlns:a14="http://schemas.microsoft.com/office/drawing/2010/main" xmlns="">
                 <a:solidFill>
                   <a:srgbClr val="FFFFFF"/>
                 </a:solidFill>
               </a14:hiddenFill>
             </a:ext>
             <a:ext uri="{91240B29-F687-4f45-9708-019B960494DF}">
-              <a14:hiddenLine xmlns="" xmlns:a14="http://schemas.microsoft.com/office/drawing/2010/main" w="9525">
+              <a14:hiddenLine xmlns:a14="http://schemas.microsoft.com/office/drawing/2010/main" xmlns="" w="9525">
                 <a:solidFill>
                   <a:srgbClr val="000000"/>
                 </a:solidFill>
@@ -2255,14 +2255,14 @@
           </a:ln>
           <a:extLst>
             <a:ext uri="{909E8E84-426E-40dd-AFC4-6F175D3DCCD1}">
-              <a14:hiddenFill xmlns="" xmlns:a14="http://schemas.microsoft.com/office/drawing/2010/main">
+              <a14:hiddenFill xmlns:a14="http://schemas.microsoft.com/office/drawing/2010/main" xmlns="">
                 <a:solidFill>
                   <a:srgbClr val="FFFFFF"/>
                 </a:solidFill>
               </a14:hiddenFill>
             </a:ext>
             <a:ext uri="{FAA26D3D-D897-4be2-8F04-BA451C77F1D7}">
-              <ma14:placeholderFlag xmlns="" xmlns:ma14="http://schemas.microsoft.com/office/mac/drawingml/2011/main" val="1"/>
+              <ma14:placeholderFlag xmlns:ma14="http://schemas.microsoft.com/office/mac/drawingml/2011/main" xmlns="" val="1"/>
             </a:ext>
           </a:extLst>
         </p:spPr>
@@ -2281,14 +2281,14 @@
           <a:noFill/>
           <a:extLst>
             <a:ext uri="{909E8E84-426E-40dd-AFC4-6F175D3DCCD1}">
-              <a14:hiddenFill xmlns="" xmlns:a14="http://schemas.microsoft.com/office/drawing/2010/main">
+              <a14:hiddenFill xmlns:a14="http://schemas.microsoft.com/office/drawing/2010/main" xmlns="">
                 <a:solidFill>
                   <a:srgbClr val="FFFFFF"/>
                 </a:solidFill>
               </a14:hiddenFill>
             </a:ext>
             <a:ext uri="{91240B29-F687-4f45-9708-019B960494DF}">
-              <a14:hiddenLine xmlns="" xmlns:a14="http://schemas.microsoft.com/office/drawing/2010/main" w="9525">
+              <a14:hiddenLine xmlns:a14="http://schemas.microsoft.com/office/drawing/2010/main" xmlns="" w="9525">
                 <a:solidFill>
                   <a:srgbClr val="000000"/>
                 </a:solidFill>
@@ -2445,14 +2445,14 @@
           </a:ln>
           <a:extLst>
             <a:ext uri="{909E8E84-426E-40dd-AFC4-6F175D3DCCD1}">
-              <a14:hiddenFill xmlns="" xmlns:a14="http://schemas.microsoft.com/office/drawing/2010/main">
+              <a14:hiddenFill xmlns:a14="http://schemas.microsoft.com/office/drawing/2010/main" xmlns="">
                 <a:solidFill>
                   <a:srgbClr val="FFFFFF"/>
                 </a:solidFill>
               </a14:hiddenFill>
             </a:ext>
             <a:ext uri="{FAA26D3D-D897-4be2-8F04-BA451C77F1D7}">
-              <ma14:placeholderFlag xmlns="" xmlns:ma14="http://schemas.microsoft.com/office/mac/drawingml/2011/main" val="1"/>
+              <ma14:placeholderFlag xmlns:ma14="http://schemas.microsoft.com/office/mac/drawingml/2011/main" xmlns="" val="1"/>
             </a:ext>
           </a:extLst>
         </p:spPr>
@@ -2471,14 +2471,14 @@
           <a:noFill/>
           <a:extLst>
             <a:ext uri="{909E8E84-426E-40dd-AFC4-6F175D3DCCD1}">
-              <a14:hiddenFill xmlns="" xmlns:a14="http://schemas.microsoft.com/office/drawing/2010/main">
+              <a14:hiddenFill xmlns:a14="http://schemas.microsoft.com/office/drawing/2010/main" xmlns="">
                 <a:solidFill>
                   <a:srgbClr val="FFFFFF"/>
                 </a:solidFill>
               </a14:hiddenFill>
             </a:ext>
             <a:ext uri="{91240B29-F687-4f45-9708-019B960494DF}">
-              <a14:hiddenLine xmlns="" xmlns:a14="http://schemas.microsoft.com/office/drawing/2010/main" w="9525">
+              <a14:hiddenLine xmlns:a14="http://schemas.microsoft.com/office/drawing/2010/main" xmlns="" w="9525">
                 <a:solidFill>
                   <a:srgbClr val="000000"/>
                 </a:solidFill>
@@ -2563,14 +2563,14 @@
           </a:ln>
           <a:extLst>
             <a:ext uri="{909E8E84-426E-40dd-AFC4-6F175D3DCCD1}">
-              <a14:hiddenFill xmlns="" xmlns:a14="http://schemas.microsoft.com/office/drawing/2010/main">
+              <a14:hiddenFill xmlns:a14="http://schemas.microsoft.com/office/drawing/2010/main" xmlns="">
                 <a:solidFill>
                   <a:srgbClr val="FFFFFF"/>
                 </a:solidFill>
               </a14:hiddenFill>
             </a:ext>
             <a:ext uri="{FAA26D3D-D897-4be2-8F04-BA451C77F1D7}">
-              <ma14:placeholderFlag xmlns="" xmlns:ma14="http://schemas.microsoft.com/office/mac/drawingml/2011/main" val="1"/>
+              <ma14:placeholderFlag xmlns:ma14="http://schemas.microsoft.com/office/mac/drawingml/2011/main" xmlns="" val="1"/>
             </a:ext>
           </a:extLst>
         </p:spPr>
@@ -2589,14 +2589,14 @@
           <a:noFill/>
           <a:extLst>
             <a:ext uri="{909E8E84-426E-40dd-AFC4-6F175D3DCCD1}">
-              <a14:hiddenFill xmlns="" xmlns:a14="http://schemas.microsoft.com/office/drawing/2010/main">
+              <a14:hiddenFill xmlns:a14="http://schemas.microsoft.com/office/drawing/2010/main" xmlns="">
                 <a:solidFill>
                   <a:srgbClr val="FFFFFF"/>
                 </a:solidFill>
               </a14:hiddenFill>
             </a:ext>
             <a:ext uri="{91240B29-F687-4f45-9708-019B960494DF}">
-              <a14:hiddenLine xmlns="" xmlns:a14="http://schemas.microsoft.com/office/drawing/2010/main" w="9525">
+              <a14:hiddenLine xmlns:a14="http://schemas.microsoft.com/office/drawing/2010/main" xmlns="" w="9525">
                 <a:solidFill>
                   <a:srgbClr val="000000"/>
                 </a:solidFill>
@@ -2684,14 +2684,14 @@
           </a:ln>
           <a:extLst>
             <a:ext uri="{909E8E84-426E-40dd-AFC4-6F175D3DCCD1}">
-              <a14:hiddenFill xmlns="" xmlns:a14="http://schemas.microsoft.com/office/drawing/2010/main">
+              <a14:hiddenFill xmlns:a14="http://schemas.microsoft.com/office/drawing/2010/main" xmlns="">
                 <a:solidFill>
                   <a:srgbClr val="FFFFFF"/>
                 </a:solidFill>
               </a14:hiddenFill>
             </a:ext>
             <a:ext uri="{FAA26D3D-D897-4be2-8F04-BA451C77F1D7}">
-              <ma14:placeholderFlag xmlns="" xmlns:ma14="http://schemas.microsoft.com/office/mac/drawingml/2011/main" val="1"/>
+              <ma14:placeholderFlag xmlns:ma14="http://schemas.microsoft.com/office/mac/drawingml/2011/main" xmlns="" val="1"/>
             </a:ext>
           </a:extLst>
         </p:spPr>
@@ -2710,14 +2710,14 @@
           <a:noFill/>
           <a:extLst>
             <a:ext uri="{909E8E84-426E-40dd-AFC4-6F175D3DCCD1}">
-              <a14:hiddenFill xmlns="" xmlns:a14="http://schemas.microsoft.com/office/drawing/2010/main">
+              <a14:hiddenFill xmlns:a14="http://schemas.microsoft.com/office/drawing/2010/main" xmlns="">
                 <a:solidFill>
                   <a:srgbClr val="FFFFFF"/>
                 </a:solidFill>
               </a14:hiddenFill>
             </a:ext>
             <a:ext uri="{91240B29-F687-4f45-9708-019B960494DF}">
-              <a14:hiddenLine xmlns="" xmlns:a14="http://schemas.microsoft.com/office/drawing/2010/main" w="9525">
+              <a14:hiddenLine xmlns:a14="http://schemas.microsoft.com/office/drawing/2010/main" xmlns="" w="9525">
                 <a:solidFill>
                   <a:srgbClr val="000000"/>
                 </a:solidFill>
@@ -2805,14 +2805,14 @@
           </a:ln>
           <a:extLst>
             <a:ext uri="{909E8E84-426E-40dd-AFC4-6F175D3DCCD1}">
-              <a14:hiddenFill xmlns="" xmlns:a14="http://schemas.microsoft.com/office/drawing/2010/main">
+              <a14:hiddenFill xmlns:a14="http://schemas.microsoft.com/office/drawing/2010/main" xmlns="">
                 <a:solidFill>
                   <a:srgbClr val="FFFFFF"/>
                 </a:solidFill>
               </a14:hiddenFill>
             </a:ext>
             <a:ext uri="{FAA26D3D-D897-4be2-8F04-BA451C77F1D7}">
-              <ma14:placeholderFlag xmlns="" xmlns:ma14="http://schemas.microsoft.com/office/mac/drawingml/2011/main" val="1"/>
+              <ma14:placeholderFlag xmlns:ma14="http://schemas.microsoft.com/office/mac/drawingml/2011/main" xmlns="" val="1"/>
             </a:ext>
           </a:extLst>
         </p:spPr>
@@ -2831,14 +2831,14 @@
           <a:noFill/>
           <a:extLst>
             <a:ext uri="{909E8E84-426E-40dd-AFC4-6F175D3DCCD1}">
-              <a14:hiddenFill xmlns="" xmlns:a14="http://schemas.microsoft.com/office/drawing/2010/main">
+              <a14:hiddenFill xmlns:a14="http://schemas.microsoft.com/office/drawing/2010/main" xmlns="">
                 <a:solidFill>
                   <a:srgbClr val="FFFFFF"/>
                 </a:solidFill>
               </a14:hiddenFill>
             </a:ext>
             <a:ext uri="{91240B29-F687-4f45-9708-019B960494DF}">
-              <a14:hiddenLine xmlns="" xmlns:a14="http://schemas.microsoft.com/office/drawing/2010/main" w="9525">
+              <a14:hiddenLine xmlns:a14="http://schemas.microsoft.com/office/drawing/2010/main" xmlns="" w="9525">
                 <a:solidFill>
                   <a:srgbClr val="000000"/>
                 </a:solidFill>
@@ -2926,14 +2926,14 @@
           </a:ln>
           <a:extLst>
             <a:ext uri="{909E8E84-426E-40dd-AFC4-6F175D3DCCD1}">
-              <a14:hiddenFill xmlns="" xmlns:a14="http://schemas.microsoft.com/office/drawing/2010/main">
+              <a14:hiddenFill xmlns:a14="http://schemas.microsoft.com/office/drawing/2010/main" xmlns="">
                 <a:solidFill>
                   <a:srgbClr val="FFFFFF"/>
                 </a:solidFill>
               </a14:hiddenFill>
             </a:ext>
             <a:ext uri="{FAA26D3D-D897-4be2-8F04-BA451C77F1D7}">
-              <ma14:placeholderFlag xmlns="" xmlns:ma14="http://schemas.microsoft.com/office/mac/drawingml/2011/main" val="1"/>
+              <ma14:placeholderFlag xmlns:ma14="http://schemas.microsoft.com/office/mac/drawingml/2011/main" xmlns="" val="1"/>
             </a:ext>
           </a:extLst>
         </p:spPr>
@@ -2952,14 +2952,14 @@
           <a:noFill/>
           <a:extLst>
             <a:ext uri="{909E8E84-426E-40dd-AFC4-6F175D3DCCD1}">
-              <a14:hiddenFill xmlns="" xmlns:a14="http://schemas.microsoft.com/office/drawing/2010/main">
+              <a14:hiddenFill xmlns:a14="http://schemas.microsoft.com/office/drawing/2010/main" xmlns="">
                 <a:solidFill>
                   <a:srgbClr val="FFFFFF"/>
                 </a:solidFill>
               </a14:hiddenFill>
             </a:ext>
             <a:ext uri="{91240B29-F687-4f45-9708-019B960494DF}">
-              <a14:hiddenLine xmlns="" xmlns:a14="http://schemas.microsoft.com/office/drawing/2010/main" w="9525">
+              <a14:hiddenLine xmlns:a14="http://schemas.microsoft.com/office/drawing/2010/main" xmlns="" w="9525">
                 <a:solidFill>
                   <a:srgbClr val="000000"/>
                 </a:solidFill>
@@ -3047,14 +3047,14 @@
           </a:ln>
           <a:extLst>
             <a:ext uri="{909E8E84-426E-40dd-AFC4-6F175D3DCCD1}">
-              <a14:hiddenFill xmlns="" xmlns:a14="http://schemas.microsoft.com/office/drawing/2010/main">
+              <a14:hiddenFill xmlns:a14="http://schemas.microsoft.com/office/drawing/2010/main" xmlns="">
                 <a:solidFill>
                   <a:srgbClr val="FFFFFF"/>
                 </a:solidFill>
               </a14:hiddenFill>
             </a:ext>
             <a:ext uri="{FAA26D3D-D897-4be2-8F04-BA451C77F1D7}">
-              <ma14:placeholderFlag xmlns="" xmlns:ma14="http://schemas.microsoft.com/office/mac/drawingml/2011/main" val="1"/>
+              <ma14:placeholderFlag xmlns:ma14="http://schemas.microsoft.com/office/mac/drawingml/2011/main" xmlns="" val="1"/>
             </a:ext>
           </a:extLst>
         </p:spPr>
@@ -3073,14 +3073,14 @@
           <a:noFill/>
           <a:extLst>
             <a:ext uri="{909E8E84-426E-40dd-AFC4-6F175D3DCCD1}">
-              <a14:hiddenFill xmlns="" xmlns:a14="http://schemas.microsoft.com/office/drawing/2010/main">
+              <a14:hiddenFill xmlns:a14="http://schemas.microsoft.com/office/drawing/2010/main" xmlns="">
                 <a:solidFill>
                   <a:srgbClr val="FFFFFF"/>
                 </a:solidFill>
               </a14:hiddenFill>
             </a:ext>
             <a:ext uri="{91240B29-F687-4f45-9708-019B960494DF}">
-              <a14:hiddenLine xmlns="" xmlns:a14="http://schemas.microsoft.com/office/drawing/2010/main" w="9525">
+              <a14:hiddenLine xmlns:a14="http://schemas.microsoft.com/office/drawing/2010/main" xmlns="" w="9525">
                 <a:solidFill>
                   <a:srgbClr val="000000"/>
                 </a:solidFill>
@@ -3168,14 +3168,14 @@
           </a:ln>
           <a:extLst>
             <a:ext uri="{909E8E84-426E-40dd-AFC4-6F175D3DCCD1}">
-              <a14:hiddenFill xmlns="" xmlns:a14="http://schemas.microsoft.com/office/drawing/2010/main">
+              <a14:hiddenFill xmlns:a14="http://schemas.microsoft.com/office/drawing/2010/main" xmlns="">
                 <a:solidFill>
                   <a:srgbClr val="FFFFFF"/>
                 </a:solidFill>
               </a14:hiddenFill>
             </a:ext>
             <a:ext uri="{FAA26D3D-D897-4be2-8F04-BA451C77F1D7}">
-              <ma14:placeholderFlag xmlns="" xmlns:ma14="http://schemas.microsoft.com/office/mac/drawingml/2011/main" val="1"/>
+              <ma14:placeholderFlag xmlns:ma14="http://schemas.microsoft.com/office/mac/drawingml/2011/main" xmlns="" val="1"/>
             </a:ext>
           </a:extLst>
         </p:spPr>
@@ -3194,14 +3194,14 @@
           <a:noFill/>
           <a:extLst>
             <a:ext uri="{909E8E84-426E-40dd-AFC4-6F175D3DCCD1}">
-              <a14:hiddenFill xmlns="" xmlns:a14="http://schemas.microsoft.com/office/drawing/2010/main">
+              <a14:hiddenFill xmlns:a14="http://schemas.microsoft.com/office/drawing/2010/main" xmlns="">
                 <a:solidFill>
                   <a:srgbClr val="FFFFFF"/>
                 </a:solidFill>
               </a14:hiddenFill>
             </a:ext>
             <a:ext uri="{91240B29-F687-4f45-9708-019B960494DF}">
-              <a14:hiddenLine xmlns="" xmlns:a14="http://schemas.microsoft.com/office/drawing/2010/main" w="9525">
+              <a14:hiddenLine xmlns:a14="http://schemas.microsoft.com/office/drawing/2010/main" xmlns="" w="9525">
                 <a:solidFill>
                   <a:srgbClr val="000000"/>
                 </a:solidFill>
@@ -3398,14 +3398,14 @@
           </a:ln>
           <a:extLst>
             <a:ext uri="{909E8E84-426E-40dd-AFC4-6F175D3DCCD1}">
-              <a14:hiddenFill xmlns="" xmlns:a14="http://schemas.microsoft.com/office/drawing/2010/main">
+              <a14:hiddenFill xmlns:a14="http://schemas.microsoft.com/office/drawing/2010/main" xmlns="">
                 <a:solidFill>
                   <a:srgbClr val="FFFFFF"/>
                 </a:solidFill>
               </a14:hiddenFill>
             </a:ext>
             <a:ext uri="{FAA26D3D-D897-4be2-8F04-BA451C77F1D7}">
-              <ma14:placeholderFlag xmlns="" xmlns:ma14="http://schemas.microsoft.com/office/mac/drawingml/2011/main" val="1"/>
+              <ma14:placeholderFlag xmlns:ma14="http://schemas.microsoft.com/office/mac/drawingml/2011/main" xmlns="" val="1"/>
             </a:ext>
           </a:extLst>
         </p:spPr>
@@ -3424,14 +3424,14 @@
           <a:noFill/>
           <a:extLst>
             <a:ext uri="{909E8E84-426E-40dd-AFC4-6F175D3DCCD1}">
-              <a14:hiddenFill xmlns="" xmlns:a14="http://schemas.microsoft.com/office/drawing/2010/main">
+              <a14:hiddenFill xmlns:a14="http://schemas.microsoft.com/office/drawing/2010/main" xmlns="">
                 <a:solidFill>
                   <a:srgbClr val="FFFFFF"/>
                 </a:solidFill>
               </a14:hiddenFill>
             </a:ext>
             <a:ext uri="{91240B29-F687-4f45-9708-019B960494DF}">
-              <a14:hiddenLine xmlns="" xmlns:a14="http://schemas.microsoft.com/office/drawing/2010/main" w="9525">
+              <a14:hiddenLine xmlns:a14="http://schemas.microsoft.com/office/drawing/2010/main" xmlns="" w="9525">
                 <a:solidFill>
                   <a:srgbClr val="000000"/>
                 </a:solidFill>
@@ -3516,14 +3516,14 @@
           </a:ln>
           <a:extLst>
             <a:ext uri="{909E8E84-426E-40dd-AFC4-6F175D3DCCD1}">
-              <a14:hiddenFill xmlns="" xmlns:a14="http://schemas.microsoft.com/office/drawing/2010/main">
+              <a14:hiddenFill xmlns:a14="http://schemas.microsoft.com/office/drawing/2010/main" xmlns="">
                 <a:solidFill>
                   <a:srgbClr val="FFFFFF"/>
                 </a:solidFill>
               </a14:hiddenFill>
             </a:ext>
             <a:ext uri="{FAA26D3D-D897-4be2-8F04-BA451C77F1D7}">
-              <ma14:placeholderFlag xmlns="" xmlns:ma14="http://schemas.microsoft.com/office/mac/drawingml/2011/main" val="1"/>
+              <ma14:placeholderFlag xmlns:ma14="http://schemas.microsoft.com/office/mac/drawingml/2011/main" xmlns="" val="1"/>
             </a:ext>
           </a:extLst>
         </p:spPr>
@@ -3542,14 +3542,14 @@
           <a:noFill/>
           <a:extLst>
             <a:ext uri="{909E8E84-426E-40dd-AFC4-6F175D3DCCD1}">
-              <a14:hiddenFill xmlns="" xmlns:a14="http://schemas.microsoft.com/office/drawing/2010/main">
+              <a14:hiddenFill xmlns:a14="http://schemas.microsoft.com/office/drawing/2010/main" xmlns="">
                 <a:solidFill>
                   <a:srgbClr val="FFFFFF"/>
                 </a:solidFill>
               </a14:hiddenFill>
             </a:ext>
             <a:ext uri="{91240B29-F687-4f45-9708-019B960494DF}">
-              <a14:hiddenLine xmlns="" xmlns:a14="http://schemas.microsoft.com/office/drawing/2010/main" w="9525">
+              <a14:hiddenLine xmlns:a14="http://schemas.microsoft.com/office/drawing/2010/main" xmlns="" w="9525">
                 <a:solidFill>
                   <a:srgbClr val="000000"/>
                 </a:solidFill>
@@ -3629,14 +3629,14 @@
           </a:ln>
           <a:extLst>
             <a:ext uri="{909E8E84-426E-40dd-AFC4-6F175D3DCCD1}">
-              <a14:hiddenFill xmlns="" xmlns:a14="http://schemas.microsoft.com/office/drawing/2010/main">
+              <a14:hiddenFill xmlns:a14="http://schemas.microsoft.com/office/drawing/2010/main" xmlns="">
                 <a:solidFill>
                   <a:srgbClr val="FFFFFF"/>
                 </a:solidFill>
               </a14:hiddenFill>
             </a:ext>
             <a:ext uri="{FAA26D3D-D897-4be2-8F04-BA451C77F1D7}">
-              <ma14:placeholderFlag xmlns="" xmlns:ma14="http://schemas.microsoft.com/office/mac/drawingml/2011/main" val="1"/>
+              <ma14:placeholderFlag xmlns:ma14="http://schemas.microsoft.com/office/mac/drawingml/2011/main" xmlns="" val="1"/>
             </a:ext>
           </a:extLst>
         </p:spPr>
@@ -3655,14 +3655,14 @@
           <a:noFill/>
           <a:extLst>
             <a:ext uri="{909E8E84-426E-40dd-AFC4-6F175D3DCCD1}">
-              <a14:hiddenFill xmlns="" xmlns:a14="http://schemas.microsoft.com/office/drawing/2010/main">
+              <a14:hiddenFill xmlns:a14="http://schemas.microsoft.com/office/drawing/2010/main" xmlns="">
                 <a:solidFill>
                   <a:srgbClr val="FFFFFF"/>
                 </a:solidFill>
               </a14:hiddenFill>
             </a:ext>
             <a:ext uri="{91240B29-F687-4f45-9708-019B960494DF}">
-              <a14:hiddenLine xmlns="" xmlns:a14="http://schemas.microsoft.com/office/drawing/2010/main" w="9525">
+              <a14:hiddenLine xmlns:a14="http://schemas.microsoft.com/office/drawing/2010/main" xmlns="" w="9525">
                 <a:solidFill>
                   <a:srgbClr val="000000"/>
                 </a:solidFill>
@@ -3742,14 +3742,14 @@
           </a:ln>
           <a:extLst>
             <a:ext uri="{909E8E84-426E-40dd-AFC4-6F175D3DCCD1}">
-              <a14:hiddenFill xmlns="" xmlns:a14="http://schemas.microsoft.com/office/drawing/2010/main">
+              <a14:hiddenFill xmlns:a14="http://schemas.microsoft.com/office/drawing/2010/main" xmlns="">
                 <a:solidFill>
                   <a:srgbClr val="FFFFFF"/>
                 </a:solidFill>
               </a14:hiddenFill>
             </a:ext>
             <a:ext uri="{FAA26D3D-D897-4be2-8F04-BA451C77F1D7}">
-              <ma14:placeholderFlag xmlns="" xmlns:ma14="http://schemas.microsoft.com/office/mac/drawingml/2011/main" val="1"/>
+              <ma14:placeholderFlag xmlns:ma14="http://schemas.microsoft.com/office/mac/drawingml/2011/main" xmlns="" val="1"/>
             </a:ext>
           </a:extLst>
         </p:spPr>
@@ -3768,14 +3768,14 @@
           <a:noFill/>
           <a:extLst>
             <a:ext uri="{909E8E84-426E-40dd-AFC4-6F175D3DCCD1}">
-              <a14:hiddenFill xmlns="" xmlns:a14="http://schemas.microsoft.com/office/drawing/2010/main">
+              <a14:hiddenFill xmlns:a14="http://schemas.microsoft.com/office/drawing/2010/main" xmlns="">
                 <a:solidFill>
                   <a:srgbClr val="FFFFFF"/>
                 </a:solidFill>
               </a14:hiddenFill>
             </a:ext>
             <a:ext uri="{91240B29-F687-4f45-9708-019B960494DF}">
-              <a14:hiddenLine xmlns="" xmlns:a14="http://schemas.microsoft.com/office/drawing/2010/main" w="9525">
+              <a14:hiddenLine xmlns:a14="http://schemas.microsoft.com/office/drawing/2010/main" xmlns="" w="9525">
                 <a:solidFill>
                   <a:srgbClr val="000000"/>
                 </a:solidFill>
@@ -3855,14 +3855,14 @@
           </a:ln>
           <a:extLst>
             <a:ext uri="{909E8E84-426E-40dd-AFC4-6F175D3DCCD1}">
-              <a14:hiddenFill xmlns="" xmlns:a14="http://schemas.microsoft.com/office/drawing/2010/main">
+              <a14:hiddenFill xmlns:a14="http://schemas.microsoft.com/office/drawing/2010/main" xmlns="">
                 <a:solidFill>
                   <a:srgbClr val="FFFFFF"/>
                 </a:solidFill>
               </a14:hiddenFill>
             </a:ext>
             <a:ext uri="{FAA26D3D-D897-4be2-8F04-BA451C77F1D7}">
-              <ma14:placeholderFlag xmlns="" xmlns:ma14="http://schemas.microsoft.com/office/mac/drawingml/2011/main" val="1"/>
+              <ma14:placeholderFlag xmlns:ma14="http://schemas.microsoft.com/office/mac/drawingml/2011/main" xmlns="" val="1"/>
             </a:ext>
           </a:extLst>
         </p:spPr>
@@ -3881,14 +3881,14 @@
           <a:noFill/>
           <a:extLst>
             <a:ext uri="{909E8E84-426E-40dd-AFC4-6F175D3DCCD1}">
-              <a14:hiddenFill xmlns="" xmlns:a14="http://schemas.microsoft.com/office/drawing/2010/main">
+              <a14:hiddenFill xmlns:a14="http://schemas.microsoft.com/office/drawing/2010/main" xmlns="">
                 <a:solidFill>
                   <a:srgbClr val="FFFFFF"/>
                 </a:solidFill>
               </a14:hiddenFill>
             </a:ext>
             <a:ext uri="{91240B29-F687-4f45-9708-019B960494DF}">
-              <a14:hiddenLine xmlns="" xmlns:a14="http://schemas.microsoft.com/office/drawing/2010/main" w="9525">
+              <a14:hiddenLine xmlns:a14="http://schemas.microsoft.com/office/drawing/2010/main" xmlns="" w="9525">
                 <a:solidFill>
                   <a:srgbClr val="000000"/>
                 </a:solidFill>
@@ -3968,14 +3968,14 @@
           </a:ln>
           <a:extLst>
             <a:ext uri="{909E8E84-426E-40dd-AFC4-6F175D3DCCD1}">
-              <a14:hiddenFill xmlns="" xmlns:a14="http://schemas.microsoft.com/office/drawing/2010/main">
+              <a14:hiddenFill xmlns:a14="http://schemas.microsoft.com/office/drawing/2010/main" xmlns="">
                 <a:solidFill>
                   <a:srgbClr val="FFFFFF"/>
                 </a:solidFill>
               </a14:hiddenFill>
             </a:ext>
             <a:ext uri="{FAA26D3D-D897-4be2-8F04-BA451C77F1D7}">
-              <ma14:placeholderFlag xmlns="" xmlns:ma14="http://schemas.microsoft.com/office/mac/drawingml/2011/main" val="1"/>
+              <ma14:placeholderFlag xmlns:ma14="http://schemas.microsoft.com/office/mac/drawingml/2011/main" xmlns="" val="1"/>
             </a:ext>
           </a:extLst>
         </p:spPr>
@@ -3994,14 +3994,14 @@
           <a:noFill/>
           <a:extLst>
             <a:ext uri="{909E8E84-426E-40dd-AFC4-6F175D3DCCD1}">
-              <a14:hiddenFill xmlns="" xmlns:a14="http://schemas.microsoft.com/office/drawing/2010/main">
+              <a14:hiddenFill xmlns:a14="http://schemas.microsoft.com/office/drawing/2010/main" xmlns="">
                 <a:solidFill>
                   <a:srgbClr val="FFFFFF"/>
                 </a:solidFill>
               </a14:hiddenFill>
             </a:ext>
             <a:ext uri="{91240B29-F687-4f45-9708-019B960494DF}">
-              <a14:hiddenLine xmlns="" xmlns:a14="http://schemas.microsoft.com/office/drawing/2010/main" w="9525">
+              <a14:hiddenLine xmlns:a14="http://schemas.microsoft.com/office/drawing/2010/main" xmlns="" w="9525">
                 <a:solidFill>
                   <a:srgbClr val="000000"/>
                 </a:solidFill>
@@ -4011,7 +4011,7 @@
               </a14:hiddenLine>
             </a:ext>
             <a:ext uri="{FAA26D3D-D897-4be2-8F04-BA451C77F1D7}">
-              <ma14:placeholderFlag xmlns="" xmlns:ma14="http://schemas.microsoft.com/office/mac/drawingml/2011/main" val="1"/>
+              <ma14:placeholderFlag xmlns:ma14="http://schemas.microsoft.com/office/mac/drawingml/2011/main" xmlns="" val="1"/>
             </a:ext>
           </a:extLst>
         </p:spPr>
@@ -4048,14 +4048,14 @@
           <a:noFill/>
           <a:extLst>
             <a:ext uri="{909E8E84-426E-40dd-AFC4-6F175D3DCCD1}">
-              <a14:hiddenFill xmlns="" xmlns:a14="http://schemas.microsoft.com/office/drawing/2010/main">
+              <a14:hiddenFill xmlns:a14="http://schemas.microsoft.com/office/drawing/2010/main" xmlns="">
                 <a:solidFill>
                   <a:srgbClr val="FFFFFF"/>
                 </a:solidFill>
               </a14:hiddenFill>
             </a:ext>
             <a:ext uri="{91240B29-F687-4f45-9708-019B960494DF}">
-              <a14:hiddenLine xmlns="" xmlns:a14="http://schemas.microsoft.com/office/drawing/2010/main" w="9525">
+              <a14:hiddenLine xmlns:a14="http://schemas.microsoft.com/office/drawing/2010/main" xmlns="" w="9525">
                 <a:solidFill>
                   <a:srgbClr val="000000"/>
                 </a:solidFill>
@@ -4201,7 +4201,7 @@
                   <a:spcPct val="0"/>
                 </a:spcAft>
               </a:pPr>
-              <a:t>5/26/2019</a:t>
+              <a:t>5/27/2019</a:t>
             </a:fld>
             <a:endParaRPr lang="en-US" sz="1200">
               <a:latin typeface="BentonSans Book" charset="0"/>
@@ -4294,14 +4294,14 @@
           </a:ln>
           <a:extLst>
             <a:ext uri="{909E8E84-426E-40dd-AFC4-6F175D3DCCD1}">
-              <a14:hiddenFill xmlns="" xmlns:a14="http://schemas.microsoft.com/office/drawing/2010/main">
+              <a14:hiddenFill xmlns:a14="http://schemas.microsoft.com/office/drawing/2010/main" xmlns="">
                 <a:solidFill>
                   <a:srgbClr val="FFFFFF"/>
                 </a:solidFill>
               </a14:hiddenFill>
             </a:ext>
             <a:ext uri="{FAA26D3D-D897-4be2-8F04-BA451C77F1D7}">
-              <ma14:placeholderFlag xmlns="" xmlns:ma14="http://schemas.microsoft.com/office/mac/drawingml/2011/main" val="1"/>
+              <ma14:placeholderFlag xmlns:ma14="http://schemas.microsoft.com/office/mac/drawingml/2011/main" xmlns="" val="1"/>
             </a:ext>
           </a:extLst>
         </p:spPr>
@@ -4320,14 +4320,14 @@
           <a:noFill/>
           <a:extLst>
             <a:ext uri="{909E8E84-426E-40dd-AFC4-6F175D3DCCD1}">
-              <a14:hiddenFill xmlns="" xmlns:a14="http://schemas.microsoft.com/office/drawing/2010/main">
+              <a14:hiddenFill xmlns:a14="http://schemas.microsoft.com/office/drawing/2010/main" xmlns="">
                 <a:solidFill>
                   <a:srgbClr val="FFFFFF"/>
                 </a:solidFill>
               </a14:hiddenFill>
             </a:ext>
             <a:ext uri="{91240B29-F687-4f45-9708-019B960494DF}">
-              <a14:hiddenLine xmlns="" xmlns:a14="http://schemas.microsoft.com/office/drawing/2010/main" w="9525">
+              <a14:hiddenLine xmlns:a14="http://schemas.microsoft.com/office/drawing/2010/main" xmlns="" w="9525">
                 <a:solidFill>
                   <a:srgbClr val="000000"/>
                 </a:solidFill>
@@ -4337,7 +4337,7 @@
               </a14:hiddenLine>
             </a:ext>
             <a:ext uri="{FAA26D3D-D897-4be2-8F04-BA451C77F1D7}">
-              <ma14:placeholderFlag xmlns="" xmlns:ma14="http://schemas.microsoft.com/office/mac/drawingml/2011/main" val="1"/>
+              <ma14:placeholderFlag xmlns:ma14="http://schemas.microsoft.com/office/mac/drawingml/2011/main" xmlns="" val="1"/>
             </a:ext>
           </a:extLst>
         </p:spPr>
@@ -4374,14 +4374,14 @@
           <a:noFill/>
           <a:extLst>
             <a:ext uri="{909E8E84-426E-40dd-AFC4-6F175D3DCCD1}">
-              <a14:hiddenFill xmlns="" xmlns:a14="http://schemas.microsoft.com/office/drawing/2010/main">
+              <a14:hiddenFill xmlns:a14="http://schemas.microsoft.com/office/drawing/2010/main" xmlns="">
                 <a:solidFill>
                   <a:srgbClr val="FFFFFF"/>
                 </a:solidFill>
               </a14:hiddenFill>
             </a:ext>
             <a:ext uri="{91240B29-F687-4f45-9708-019B960494DF}">
-              <a14:hiddenLine xmlns="" xmlns:a14="http://schemas.microsoft.com/office/drawing/2010/main" w="9525">
+              <a14:hiddenLine xmlns:a14="http://schemas.microsoft.com/office/drawing/2010/main" xmlns="" w="9525">
                 <a:solidFill>
                   <a:srgbClr val="000000"/>
                 </a:solidFill>
@@ -4576,14 +4576,14 @@
           <a:noFill/>
           <a:extLst>
             <a:ext uri="{909E8E84-426E-40dd-AFC4-6F175D3DCCD1}">
-              <a14:hiddenFill xmlns="" xmlns:a14="http://schemas.microsoft.com/office/drawing/2010/main">
+              <a14:hiddenFill xmlns:a14="http://schemas.microsoft.com/office/drawing/2010/main" xmlns="">
                 <a:solidFill>
                   <a:srgbClr val="FFFFFF"/>
                 </a:solidFill>
               </a14:hiddenFill>
             </a:ext>
             <a:ext uri="{91240B29-F687-4f45-9708-019B960494DF}">
-              <a14:hiddenLine xmlns="" xmlns:a14="http://schemas.microsoft.com/office/drawing/2010/main" w="9525">
+              <a14:hiddenLine xmlns:a14="http://schemas.microsoft.com/office/drawing/2010/main" xmlns="" w="9525">
                 <a:solidFill>
                   <a:srgbClr val="000000"/>
                 </a:solidFill>
@@ -4729,7 +4729,7 @@
                   <a:spcPct val="0"/>
                 </a:spcAft>
               </a:pPr>
-              <a:t>5/26/2019</a:t>
+              <a:t>5/27/2019</a:t>
             </a:fld>
             <a:endParaRPr lang="en-US" sz="1200">
               <a:latin typeface="BentonSans Book" charset="0"/>
@@ -4784,14 +4784,14 @@
           </a:ln>
           <a:extLst>
             <a:ext uri="{909E8E84-426E-40dd-AFC4-6F175D3DCCD1}">
-              <a14:hiddenFill xmlns="" xmlns:a14="http://schemas.microsoft.com/office/drawing/2010/main">
+              <a14:hiddenFill xmlns:a14="http://schemas.microsoft.com/office/drawing/2010/main" xmlns="">
                 <a:solidFill>
                   <a:srgbClr val="FFFFFF"/>
                 </a:solidFill>
               </a14:hiddenFill>
             </a:ext>
             <a:ext uri="{FAA26D3D-D897-4be2-8F04-BA451C77F1D7}">
-              <ma14:placeholderFlag xmlns="" xmlns:ma14="http://schemas.microsoft.com/office/mac/drawingml/2011/main" val="1"/>
+              <ma14:placeholderFlag xmlns:ma14="http://schemas.microsoft.com/office/mac/drawingml/2011/main" xmlns="" val="1"/>
             </a:ext>
           </a:extLst>
         </p:spPr>
@@ -4810,14 +4810,14 @@
           <a:noFill/>
           <a:extLst>
             <a:ext uri="{909E8E84-426E-40dd-AFC4-6F175D3DCCD1}">
-              <a14:hiddenFill xmlns="" xmlns:a14="http://schemas.microsoft.com/office/drawing/2010/main">
+              <a14:hiddenFill xmlns:a14="http://schemas.microsoft.com/office/drawing/2010/main" xmlns="">
                 <a:solidFill>
                   <a:srgbClr val="FFFFFF"/>
                 </a:solidFill>
               </a14:hiddenFill>
             </a:ext>
             <a:ext uri="{91240B29-F687-4f45-9708-019B960494DF}">
-              <a14:hiddenLine xmlns="" xmlns:a14="http://schemas.microsoft.com/office/drawing/2010/main" w="9525">
+              <a14:hiddenLine xmlns:a14="http://schemas.microsoft.com/office/drawing/2010/main" xmlns="" w="9525">
                 <a:solidFill>
                   <a:srgbClr val="000000"/>
                 </a:solidFill>
@@ -4900,14 +4900,14 @@
           </a:ln>
           <a:extLst>
             <a:ext uri="{909E8E84-426E-40dd-AFC4-6F175D3DCCD1}">
-              <a14:hiddenFill xmlns="" xmlns:a14="http://schemas.microsoft.com/office/drawing/2010/main">
+              <a14:hiddenFill xmlns:a14="http://schemas.microsoft.com/office/drawing/2010/main" xmlns="">
                 <a:solidFill>
                   <a:srgbClr val="FFFFFF"/>
                 </a:solidFill>
               </a14:hiddenFill>
             </a:ext>
             <a:ext uri="{FAA26D3D-D897-4be2-8F04-BA451C77F1D7}">
-              <ma14:placeholderFlag xmlns="" xmlns:ma14="http://schemas.microsoft.com/office/mac/drawingml/2011/main" val="1"/>
+              <ma14:placeholderFlag xmlns:ma14="http://schemas.microsoft.com/office/mac/drawingml/2011/main" xmlns="" val="1"/>
             </a:ext>
           </a:extLst>
         </p:spPr>
@@ -4926,14 +4926,14 @@
           <a:noFill/>
           <a:extLst>
             <a:ext uri="{909E8E84-426E-40dd-AFC4-6F175D3DCCD1}">
-              <a14:hiddenFill xmlns="" xmlns:a14="http://schemas.microsoft.com/office/drawing/2010/main">
+              <a14:hiddenFill xmlns:a14="http://schemas.microsoft.com/office/drawing/2010/main" xmlns="">
                 <a:solidFill>
                   <a:srgbClr val="FFFFFF"/>
                 </a:solidFill>
               </a14:hiddenFill>
             </a:ext>
             <a:ext uri="{91240B29-F687-4f45-9708-019B960494DF}">
-              <a14:hiddenLine xmlns="" xmlns:a14="http://schemas.microsoft.com/office/drawing/2010/main" w="9525">
+              <a14:hiddenLine xmlns:a14="http://schemas.microsoft.com/office/drawing/2010/main" xmlns="" w="9525">
                 <a:solidFill>
                   <a:srgbClr val="000000"/>
                 </a:solidFill>
@@ -4943,7 +4943,7 @@
               </a14:hiddenLine>
             </a:ext>
             <a:ext uri="{FAA26D3D-D897-4be2-8F04-BA451C77F1D7}">
-              <ma14:placeholderFlag xmlns="" xmlns:ma14="http://schemas.microsoft.com/office/mac/drawingml/2011/main" val="1"/>
+              <ma14:placeholderFlag xmlns:ma14="http://schemas.microsoft.com/office/mac/drawingml/2011/main" xmlns="" val="1"/>
             </a:ext>
           </a:extLst>
         </p:spPr>
@@ -4980,14 +4980,14 @@
           <a:noFill/>
           <a:extLst>
             <a:ext uri="{909E8E84-426E-40dd-AFC4-6F175D3DCCD1}">
-              <a14:hiddenFill xmlns="" xmlns:a14="http://schemas.microsoft.com/office/drawing/2010/main">
+              <a14:hiddenFill xmlns:a14="http://schemas.microsoft.com/office/drawing/2010/main" xmlns="">
                 <a:solidFill>
                   <a:srgbClr val="FFFFFF"/>
                 </a:solidFill>
               </a14:hiddenFill>
             </a:ext>
             <a:ext uri="{91240B29-F687-4f45-9708-019B960494DF}">
-              <a14:hiddenLine xmlns="" xmlns:a14="http://schemas.microsoft.com/office/drawing/2010/main" w="9525">
+              <a14:hiddenLine xmlns:a14="http://schemas.microsoft.com/office/drawing/2010/main" xmlns="" w="9525">
                 <a:solidFill>
                   <a:srgbClr val="000000"/>
                 </a:solidFill>
@@ -5182,14 +5182,14 @@
           <a:noFill/>
           <a:extLst>
             <a:ext uri="{909E8E84-426E-40dd-AFC4-6F175D3DCCD1}">
-              <a14:hiddenFill xmlns="" xmlns:a14="http://schemas.microsoft.com/office/drawing/2010/main">
+              <a14:hiddenFill xmlns:a14="http://schemas.microsoft.com/office/drawing/2010/main" xmlns="">
                 <a:solidFill>
                   <a:srgbClr val="FFFFFF"/>
                 </a:solidFill>
               </a14:hiddenFill>
             </a:ext>
             <a:ext uri="{91240B29-F687-4f45-9708-019B960494DF}">
-              <a14:hiddenLine xmlns="" xmlns:a14="http://schemas.microsoft.com/office/drawing/2010/main" w="9525">
+              <a14:hiddenLine xmlns:a14="http://schemas.microsoft.com/office/drawing/2010/main" xmlns="" w="9525">
                 <a:solidFill>
                   <a:srgbClr val="000000"/>
                 </a:solidFill>
@@ -5335,7 +5335,7 @@
                   <a:spcPct val="0"/>
                 </a:spcAft>
               </a:pPr>
-              <a:t>5/26/2019</a:t>
+              <a:t>5/27/2019</a:t>
             </a:fld>
             <a:endParaRPr lang="en-US" sz="1200">
               <a:latin typeface="BentonSans Book" charset="0"/>
@@ -5390,14 +5390,14 @@
           </a:ln>
           <a:extLst>
             <a:ext uri="{909E8E84-426E-40dd-AFC4-6F175D3DCCD1}">
-              <a14:hiddenFill xmlns="" xmlns:a14="http://schemas.microsoft.com/office/drawing/2010/main">
+              <a14:hiddenFill xmlns:a14="http://schemas.microsoft.com/office/drawing/2010/main" xmlns="">
                 <a:solidFill>
                   <a:srgbClr val="FFFFFF"/>
                 </a:solidFill>
               </a14:hiddenFill>
             </a:ext>
             <a:ext uri="{FAA26D3D-D897-4be2-8F04-BA451C77F1D7}">
-              <ma14:placeholderFlag xmlns="" xmlns:ma14="http://schemas.microsoft.com/office/mac/drawingml/2011/main" val="1"/>
+              <ma14:placeholderFlag xmlns:ma14="http://schemas.microsoft.com/office/mac/drawingml/2011/main" xmlns="" val="1"/>
             </a:ext>
           </a:extLst>
         </p:spPr>
@@ -5416,14 +5416,14 @@
           <a:noFill/>
           <a:extLst>
             <a:ext uri="{909E8E84-426E-40dd-AFC4-6F175D3DCCD1}">
-              <a14:hiddenFill xmlns="" xmlns:a14="http://schemas.microsoft.com/office/drawing/2010/main">
+              <a14:hiddenFill xmlns:a14="http://schemas.microsoft.com/office/drawing/2010/main" xmlns="">
                 <a:solidFill>
                   <a:srgbClr val="FFFFFF"/>
                 </a:solidFill>
               </a14:hiddenFill>
             </a:ext>
             <a:ext uri="{91240B29-F687-4f45-9708-019B960494DF}">
-              <a14:hiddenLine xmlns="" xmlns:a14="http://schemas.microsoft.com/office/drawing/2010/main" w="9525">
+              <a14:hiddenLine xmlns:a14="http://schemas.microsoft.com/office/drawing/2010/main" xmlns="" w="9525">
                 <a:solidFill>
                   <a:srgbClr val="000000"/>
                 </a:solidFill>
@@ -5433,7 +5433,7 @@
               </a14:hiddenLine>
             </a:ext>
             <a:ext uri="{FAA26D3D-D897-4be2-8F04-BA451C77F1D7}">
-              <ma14:placeholderFlag xmlns="" xmlns:ma14="http://schemas.microsoft.com/office/mac/drawingml/2011/main" val="1"/>
+              <ma14:placeholderFlag xmlns:ma14="http://schemas.microsoft.com/office/mac/drawingml/2011/main" xmlns="" val="1"/>
             </a:ext>
           </a:extLst>
         </p:spPr>
@@ -5470,14 +5470,14 @@
           <a:noFill/>
           <a:extLst>
             <a:ext uri="{909E8E84-426E-40dd-AFC4-6F175D3DCCD1}">
-              <a14:hiddenFill xmlns="" xmlns:a14="http://schemas.microsoft.com/office/drawing/2010/main">
+              <a14:hiddenFill xmlns:a14="http://schemas.microsoft.com/office/drawing/2010/main" xmlns="">
                 <a:solidFill>
                   <a:srgbClr val="FFFFFF"/>
                 </a:solidFill>
               </a14:hiddenFill>
             </a:ext>
             <a:ext uri="{91240B29-F687-4f45-9708-019B960494DF}">
-              <a14:hiddenLine xmlns="" xmlns:a14="http://schemas.microsoft.com/office/drawing/2010/main" w="9525">
+              <a14:hiddenLine xmlns:a14="http://schemas.microsoft.com/office/drawing/2010/main" xmlns="" w="9525">
                 <a:solidFill>
                   <a:srgbClr val="000000"/>
                 </a:solidFill>
@@ -5672,14 +5672,14 @@
           <a:noFill/>
           <a:extLst>
             <a:ext uri="{909E8E84-426E-40dd-AFC4-6F175D3DCCD1}">
-              <a14:hiddenFill xmlns="" xmlns:a14="http://schemas.microsoft.com/office/drawing/2010/main">
+              <a14:hiddenFill xmlns:a14="http://schemas.microsoft.com/office/drawing/2010/main" xmlns="">
                 <a:solidFill>
                   <a:srgbClr val="FFFFFF"/>
                 </a:solidFill>
               </a14:hiddenFill>
             </a:ext>
             <a:ext uri="{91240B29-F687-4f45-9708-019B960494DF}">
-              <a14:hiddenLine xmlns="" xmlns:a14="http://schemas.microsoft.com/office/drawing/2010/main" w="9525">
+              <a14:hiddenLine xmlns:a14="http://schemas.microsoft.com/office/drawing/2010/main" xmlns="" w="9525">
                 <a:solidFill>
                   <a:srgbClr val="000000"/>
                 </a:solidFill>
@@ -5825,7 +5825,7 @@
                   <a:spcPct val="0"/>
                 </a:spcAft>
               </a:pPr>
-              <a:t>5/26/2019</a:t>
+              <a:t>5/27/2019</a:t>
             </a:fld>
             <a:endParaRPr lang="en-US" sz="1200">
               <a:latin typeface="BentonSans Book" charset="0"/>
@@ -5880,14 +5880,14 @@
           </a:ln>
           <a:extLst>
             <a:ext uri="{909E8E84-426E-40dd-AFC4-6F175D3DCCD1}">
-              <a14:hiddenFill xmlns="" xmlns:a14="http://schemas.microsoft.com/office/drawing/2010/main">
+              <a14:hiddenFill xmlns:a14="http://schemas.microsoft.com/office/drawing/2010/main" xmlns="">
                 <a:solidFill>
                   <a:srgbClr val="FFFFFF"/>
                 </a:solidFill>
               </a14:hiddenFill>
             </a:ext>
             <a:ext uri="{FAA26D3D-D897-4be2-8F04-BA451C77F1D7}">
-              <ma14:placeholderFlag xmlns="" xmlns:ma14="http://schemas.microsoft.com/office/mac/drawingml/2011/main" val="1"/>
+              <ma14:placeholderFlag xmlns:ma14="http://schemas.microsoft.com/office/mac/drawingml/2011/main" xmlns="" val="1"/>
             </a:ext>
           </a:extLst>
         </p:spPr>
@@ -5906,14 +5906,14 @@
           <a:noFill/>
           <a:extLst>
             <a:ext uri="{909E8E84-426E-40dd-AFC4-6F175D3DCCD1}">
-              <a14:hiddenFill xmlns="" xmlns:a14="http://schemas.microsoft.com/office/drawing/2010/main">
+              <a14:hiddenFill xmlns:a14="http://schemas.microsoft.com/office/drawing/2010/main" xmlns="">
                 <a:solidFill>
                   <a:srgbClr val="FFFFFF"/>
                 </a:solidFill>
               </a14:hiddenFill>
             </a:ext>
             <a:ext uri="{91240B29-F687-4f45-9708-019B960494DF}">
-              <a14:hiddenLine xmlns="" xmlns:a14="http://schemas.microsoft.com/office/drawing/2010/main" w="9525">
+              <a14:hiddenLine xmlns:a14="http://schemas.microsoft.com/office/drawing/2010/main" xmlns="" w="9525">
                 <a:solidFill>
                   <a:srgbClr val="000000"/>
                 </a:solidFill>
@@ -5923,7 +5923,7 @@
               </a14:hiddenLine>
             </a:ext>
             <a:ext uri="{FAA26D3D-D897-4be2-8F04-BA451C77F1D7}">
-              <ma14:placeholderFlag xmlns="" xmlns:ma14="http://schemas.microsoft.com/office/mac/drawingml/2011/main" val="1"/>
+              <ma14:placeholderFlag xmlns:ma14="http://schemas.microsoft.com/office/mac/drawingml/2011/main" xmlns="" val="1"/>
             </a:ext>
           </a:extLst>
         </p:spPr>
@@ -5960,14 +5960,14 @@
           <a:noFill/>
           <a:extLst>
             <a:ext uri="{909E8E84-426E-40dd-AFC4-6F175D3DCCD1}">
-              <a14:hiddenFill xmlns="" xmlns:a14="http://schemas.microsoft.com/office/drawing/2010/main">
+              <a14:hiddenFill xmlns:a14="http://schemas.microsoft.com/office/drawing/2010/main" xmlns="">
                 <a:solidFill>
                   <a:srgbClr val="FFFFFF"/>
                 </a:solidFill>
               </a14:hiddenFill>
             </a:ext>
             <a:ext uri="{91240B29-F687-4f45-9708-019B960494DF}">
-              <a14:hiddenLine xmlns="" xmlns:a14="http://schemas.microsoft.com/office/drawing/2010/main" w="9525">
+              <a14:hiddenLine xmlns:a14="http://schemas.microsoft.com/office/drawing/2010/main" xmlns="" w="9525">
                 <a:solidFill>
                   <a:srgbClr val="000000"/>
                 </a:solidFill>
@@ -6162,14 +6162,14 @@
           <a:noFill/>
           <a:extLst>
             <a:ext uri="{909E8E84-426E-40dd-AFC4-6F175D3DCCD1}">
-              <a14:hiddenFill xmlns="" xmlns:a14="http://schemas.microsoft.com/office/drawing/2010/main">
+              <a14:hiddenFill xmlns:a14="http://schemas.microsoft.com/office/drawing/2010/main" xmlns="">
                 <a:solidFill>
                   <a:srgbClr val="FFFFFF"/>
                 </a:solidFill>
               </a14:hiddenFill>
             </a:ext>
             <a:ext uri="{91240B29-F687-4f45-9708-019B960494DF}">
-              <a14:hiddenLine xmlns="" xmlns:a14="http://schemas.microsoft.com/office/drawing/2010/main" w="9525">
+              <a14:hiddenLine xmlns:a14="http://schemas.microsoft.com/office/drawing/2010/main" xmlns="" w="9525">
                 <a:solidFill>
                   <a:srgbClr val="000000"/>
                 </a:solidFill>
@@ -6315,7 +6315,7 @@
                   <a:spcPct val="0"/>
                 </a:spcAft>
               </a:pPr>
-              <a:t>5/26/2019</a:t>
+              <a:t>5/27/2019</a:t>
             </a:fld>
             <a:endParaRPr lang="en-US" sz="1200">
               <a:latin typeface="BentonSans Book" charset="0"/>
@@ -6370,14 +6370,14 @@
           </a:ln>
           <a:extLst>
             <a:ext uri="{909E8E84-426E-40dd-AFC4-6F175D3DCCD1}">
-              <a14:hiddenFill xmlns="" xmlns:a14="http://schemas.microsoft.com/office/drawing/2010/main">
+              <a14:hiddenFill xmlns:a14="http://schemas.microsoft.com/office/drawing/2010/main" xmlns="">
                 <a:solidFill>
                   <a:srgbClr val="FFFFFF"/>
                 </a:solidFill>
               </a14:hiddenFill>
             </a:ext>
             <a:ext uri="{FAA26D3D-D897-4be2-8F04-BA451C77F1D7}">
-              <ma14:placeholderFlag xmlns="" xmlns:ma14="http://schemas.microsoft.com/office/mac/drawingml/2011/main" val="1"/>
+              <ma14:placeholderFlag xmlns:ma14="http://schemas.microsoft.com/office/mac/drawingml/2011/main" xmlns="" val="1"/>
             </a:ext>
           </a:extLst>
         </p:spPr>
@@ -6396,14 +6396,14 @@
           <a:noFill/>
           <a:extLst>
             <a:ext uri="{909E8E84-426E-40dd-AFC4-6F175D3DCCD1}">
-              <a14:hiddenFill xmlns="" xmlns:a14="http://schemas.microsoft.com/office/drawing/2010/main">
+              <a14:hiddenFill xmlns:a14="http://schemas.microsoft.com/office/drawing/2010/main" xmlns="">
                 <a:solidFill>
                   <a:srgbClr val="FFFFFF"/>
                 </a:solidFill>
               </a14:hiddenFill>
             </a:ext>
             <a:ext uri="{91240B29-F687-4f45-9708-019B960494DF}">
-              <a14:hiddenLine xmlns="" xmlns:a14="http://schemas.microsoft.com/office/drawing/2010/main" w="9525">
+              <a14:hiddenLine xmlns:a14="http://schemas.microsoft.com/office/drawing/2010/main" xmlns="" w="9525">
                 <a:solidFill>
                   <a:srgbClr val="000000"/>
                 </a:solidFill>
@@ -6413,7 +6413,7 @@
               </a14:hiddenLine>
             </a:ext>
             <a:ext uri="{FAA26D3D-D897-4be2-8F04-BA451C77F1D7}">
-              <ma14:placeholderFlag xmlns="" xmlns:ma14="http://schemas.microsoft.com/office/mac/drawingml/2011/main" val="1"/>
+              <ma14:placeholderFlag xmlns:ma14="http://schemas.microsoft.com/office/mac/drawingml/2011/main" xmlns="" val="1"/>
             </a:ext>
           </a:extLst>
         </p:spPr>
@@ -6450,14 +6450,14 @@
           <a:noFill/>
           <a:extLst>
             <a:ext uri="{909E8E84-426E-40dd-AFC4-6F175D3DCCD1}">
-              <a14:hiddenFill xmlns="" xmlns:a14="http://schemas.microsoft.com/office/drawing/2010/main">
+              <a14:hiddenFill xmlns:a14="http://schemas.microsoft.com/office/drawing/2010/main" xmlns="">
                 <a:solidFill>
                   <a:srgbClr val="FFFFFF"/>
                 </a:solidFill>
               </a14:hiddenFill>
             </a:ext>
             <a:ext uri="{91240B29-F687-4f45-9708-019B960494DF}">
-              <a14:hiddenLine xmlns="" xmlns:a14="http://schemas.microsoft.com/office/drawing/2010/main" w="9525">
+              <a14:hiddenLine xmlns:a14="http://schemas.microsoft.com/office/drawing/2010/main" xmlns="" w="9525">
                 <a:solidFill>
                   <a:srgbClr val="000000"/>
                 </a:solidFill>
@@ -6652,14 +6652,14 @@
           <a:noFill/>
           <a:extLst>
             <a:ext uri="{909E8E84-426E-40dd-AFC4-6F175D3DCCD1}">
-              <a14:hiddenFill xmlns="" xmlns:a14="http://schemas.microsoft.com/office/drawing/2010/main">
+              <a14:hiddenFill xmlns:a14="http://schemas.microsoft.com/office/drawing/2010/main" xmlns="">
                 <a:solidFill>
                   <a:srgbClr val="FFFFFF"/>
                 </a:solidFill>
               </a14:hiddenFill>
             </a:ext>
             <a:ext uri="{91240B29-F687-4f45-9708-019B960494DF}">
-              <a14:hiddenLine xmlns="" xmlns:a14="http://schemas.microsoft.com/office/drawing/2010/main" w="9525">
+              <a14:hiddenLine xmlns:a14="http://schemas.microsoft.com/office/drawing/2010/main" xmlns="" w="9525">
                 <a:solidFill>
                   <a:srgbClr val="000000"/>
                 </a:solidFill>
@@ -6805,7 +6805,7 @@
                   <a:spcPct val="0"/>
                 </a:spcAft>
               </a:pPr>
-              <a:t>5/26/2019</a:t>
+              <a:t>5/27/2019</a:t>
             </a:fld>
             <a:endParaRPr lang="en-US" sz="1200">
               <a:latin typeface="BentonSans Book" charset="0"/>
@@ -6860,14 +6860,14 @@
           </a:ln>
           <a:extLst>
             <a:ext uri="{909E8E84-426E-40dd-AFC4-6F175D3DCCD1}">
-              <a14:hiddenFill xmlns="" xmlns:a14="http://schemas.microsoft.com/office/drawing/2010/main">
+              <a14:hiddenFill xmlns:a14="http://schemas.microsoft.com/office/drawing/2010/main" xmlns="">
                 <a:solidFill>
                   <a:srgbClr val="FFFFFF"/>
                 </a:solidFill>
               </a14:hiddenFill>
             </a:ext>
             <a:ext uri="{FAA26D3D-D897-4be2-8F04-BA451C77F1D7}">
-              <ma14:placeholderFlag xmlns="" xmlns:ma14="http://schemas.microsoft.com/office/mac/drawingml/2011/main" val="1"/>
+              <ma14:placeholderFlag xmlns:ma14="http://schemas.microsoft.com/office/mac/drawingml/2011/main" xmlns="" val="1"/>
             </a:ext>
           </a:extLst>
         </p:spPr>
@@ -6886,14 +6886,14 @@
           <a:noFill/>
           <a:extLst>
             <a:ext uri="{909E8E84-426E-40dd-AFC4-6F175D3DCCD1}">
-              <a14:hiddenFill xmlns="" xmlns:a14="http://schemas.microsoft.com/office/drawing/2010/main">
+              <a14:hiddenFill xmlns:a14="http://schemas.microsoft.com/office/drawing/2010/main" xmlns="">
                 <a:solidFill>
                   <a:srgbClr val="FFFFFF"/>
                 </a:solidFill>
               </a14:hiddenFill>
             </a:ext>
             <a:ext uri="{91240B29-F687-4f45-9708-019B960494DF}">
-              <a14:hiddenLine xmlns="" xmlns:a14="http://schemas.microsoft.com/office/drawing/2010/main" w="9525">
+              <a14:hiddenLine xmlns:a14="http://schemas.microsoft.com/office/drawing/2010/main" xmlns="" w="9525">
                 <a:solidFill>
                   <a:srgbClr val="000000"/>
                 </a:solidFill>
@@ -6903,7 +6903,7 @@
               </a14:hiddenLine>
             </a:ext>
             <a:ext uri="{FAA26D3D-D897-4be2-8F04-BA451C77F1D7}">
-              <ma14:placeholderFlag xmlns="" xmlns:ma14="http://schemas.microsoft.com/office/mac/drawingml/2011/main" val="1"/>
+              <ma14:placeholderFlag xmlns:ma14="http://schemas.microsoft.com/office/mac/drawingml/2011/main" xmlns="" val="1"/>
             </a:ext>
           </a:extLst>
         </p:spPr>
@@ -6940,14 +6940,14 @@
           <a:noFill/>
           <a:extLst>
             <a:ext uri="{909E8E84-426E-40dd-AFC4-6F175D3DCCD1}">
-              <a14:hiddenFill xmlns="" xmlns:a14="http://schemas.microsoft.com/office/drawing/2010/main">
+              <a14:hiddenFill xmlns:a14="http://schemas.microsoft.com/office/drawing/2010/main" xmlns="">
                 <a:solidFill>
                   <a:srgbClr val="FFFFFF"/>
                 </a:solidFill>
               </a14:hiddenFill>
             </a:ext>
             <a:ext uri="{91240B29-F687-4f45-9708-019B960494DF}">
-              <a14:hiddenLine xmlns="" xmlns:a14="http://schemas.microsoft.com/office/drawing/2010/main" w="9525">
+              <a14:hiddenLine xmlns:a14="http://schemas.microsoft.com/office/drawing/2010/main" xmlns="" w="9525">
                 <a:solidFill>
                   <a:srgbClr val="000000"/>
                 </a:solidFill>
@@ -7142,14 +7142,14 @@
           <a:noFill/>
           <a:extLst>
             <a:ext uri="{909E8E84-426E-40dd-AFC4-6F175D3DCCD1}">
-              <a14:hiddenFill xmlns="" xmlns:a14="http://schemas.microsoft.com/office/drawing/2010/main">
+              <a14:hiddenFill xmlns:a14="http://schemas.microsoft.com/office/drawing/2010/main" xmlns="">
                 <a:solidFill>
                   <a:srgbClr val="FFFFFF"/>
                 </a:solidFill>
               </a14:hiddenFill>
             </a:ext>
             <a:ext uri="{91240B29-F687-4f45-9708-019B960494DF}">
-              <a14:hiddenLine xmlns="" xmlns:a14="http://schemas.microsoft.com/office/drawing/2010/main" w="9525">
+              <a14:hiddenLine xmlns:a14="http://schemas.microsoft.com/office/drawing/2010/main" xmlns="" w="9525">
                 <a:solidFill>
                   <a:srgbClr val="000000"/>
                 </a:solidFill>
@@ -7295,7 +7295,7 @@
                   <a:spcPct val="0"/>
                 </a:spcAft>
               </a:pPr>
-              <a:t>5/26/2019</a:t>
+              <a:t>5/27/2019</a:t>
             </a:fld>
             <a:endParaRPr lang="en-US" sz="1200">
               <a:latin typeface="BentonSans Book" charset="0"/>
@@ -7350,14 +7350,14 @@
           </a:ln>
           <a:extLst>
             <a:ext uri="{909E8E84-426E-40dd-AFC4-6F175D3DCCD1}">
-              <a14:hiddenFill xmlns="" xmlns:a14="http://schemas.microsoft.com/office/drawing/2010/main">
+              <a14:hiddenFill xmlns:a14="http://schemas.microsoft.com/office/drawing/2010/main" xmlns="">
                 <a:solidFill>
                   <a:srgbClr val="FFFFFF"/>
                 </a:solidFill>
               </a14:hiddenFill>
             </a:ext>
             <a:ext uri="{FAA26D3D-D897-4be2-8F04-BA451C77F1D7}">
-              <ma14:placeholderFlag xmlns="" xmlns:ma14="http://schemas.microsoft.com/office/mac/drawingml/2011/main" val="1"/>
+              <ma14:placeholderFlag xmlns:ma14="http://schemas.microsoft.com/office/mac/drawingml/2011/main" xmlns="" val="1"/>
             </a:ext>
           </a:extLst>
         </p:spPr>
@@ -7376,14 +7376,14 @@
           <a:noFill/>
           <a:extLst>
             <a:ext uri="{909E8E84-426E-40dd-AFC4-6F175D3DCCD1}">
-              <a14:hiddenFill xmlns="" xmlns:a14="http://schemas.microsoft.com/office/drawing/2010/main">
+              <a14:hiddenFill xmlns:a14="http://schemas.microsoft.com/office/drawing/2010/main" xmlns="">
                 <a:solidFill>
                   <a:srgbClr val="FFFFFF"/>
                 </a:solidFill>
               </a14:hiddenFill>
             </a:ext>
             <a:ext uri="{91240B29-F687-4f45-9708-019B960494DF}">
-              <a14:hiddenLine xmlns="" xmlns:a14="http://schemas.microsoft.com/office/drawing/2010/main" w="9525">
+              <a14:hiddenLine xmlns:a14="http://schemas.microsoft.com/office/drawing/2010/main" xmlns="" w="9525">
                 <a:solidFill>
                   <a:srgbClr val="000000"/>
                 </a:solidFill>
@@ -7468,14 +7468,14 @@
           </a:ln>
           <a:extLst>
             <a:ext uri="{909E8E84-426E-40dd-AFC4-6F175D3DCCD1}">
-              <a14:hiddenFill xmlns="" xmlns:a14="http://schemas.microsoft.com/office/drawing/2010/main">
+              <a14:hiddenFill xmlns:a14="http://schemas.microsoft.com/office/drawing/2010/main" xmlns="">
                 <a:solidFill>
                   <a:srgbClr val="FFFFFF"/>
                 </a:solidFill>
               </a14:hiddenFill>
             </a:ext>
             <a:ext uri="{FAA26D3D-D897-4be2-8F04-BA451C77F1D7}">
-              <ma14:placeholderFlag xmlns="" xmlns:ma14="http://schemas.microsoft.com/office/mac/drawingml/2011/main" val="1"/>
+              <ma14:placeholderFlag xmlns:ma14="http://schemas.microsoft.com/office/mac/drawingml/2011/main" xmlns="" val="1"/>
             </a:ext>
           </a:extLst>
         </p:spPr>
@@ -7494,14 +7494,14 @@
           <a:noFill/>
           <a:extLst>
             <a:ext uri="{909E8E84-426E-40dd-AFC4-6F175D3DCCD1}">
-              <a14:hiddenFill xmlns="" xmlns:a14="http://schemas.microsoft.com/office/drawing/2010/main">
+              <a14:hiddenFill xmlns:a14="http://schemas.microsoft.com/office/drawing/2010/main" xmlns="">
                 <a:solidFill>
                   <a:srgbClr val="FFFFFF"/>
                 </a:solidFill>
               </a14:hiddenFill>
             </a:ext>
             <a:ext uri="{91240B29-F687-4f45-9708-019B960494DF}">
-              <a14:hiddenLine xmlns="" xmlns:a14="http://schemas.microsoft.com/office/drawing/2010/main" w="9525">
+              <a14:hiddenLine xmlns:a14="http://schemas.microsoft.com/office/drawing/2010/main" xmlns="" w="9525">
                 <a:solidFill>
                   <a:srgbClr val="000000"/>
                 </a:solidFill>
@@ -7586,14 +7586,14 @@
           </a:ln>
           <a:extLst>
             <a:ext uri="{909E8E84-426E-40dd-AFC4-6F175D3DCCD1}">
-              <a14:hiddenFill xmlns="" xmlns:a14="http://schemas.microsoft.com/office/drawing/2010/main">
+              <a14:hiddenFill xmlns:a14="http://schemas.microsoft.com/office/drawing/2010/main" xmlns="">
                 <a:solidFill>
                   <a:srgbClr val="FFFFFF"/>
                 </a:solidFill>
               </a14:hiddenFill>
             </a:ext>
             <a:ext uri="{FAA26D3D-D897-4be2-8F04-BA451C77F1D7}">
-              <ma14:placeholderFlag xmlns="" xmlns:ma14="http://schemas.microsoft.com/office/mac/drawingml/2011/main" val="1"/>
+              <ma14:placeholderFlag xmlns:ma14="http://schemas.microsoft.com/office/mac/drawingml/2011/main" xmlns="" val="1"/>
             </a:ext>
           </a:extLst>
         </p:spPr>
@@ -7612,14 +7612,14 @@
           <a:noFill/>
           <a:extLst>
             <a:ext uri="{909E8E84-426E-40dd-AFC4-6F175D3DCCD1}">
-              <a14:hiddenFill xmlns="" xmlns:a14="http://schemas.microsoft.com/office/drawing/2010/main">
+              <a14:hiddenFill xmlns:a14="http://schemas.microsoft.com/office/drawing/2010/main" xmlns="">
                 <a:solidFill>
                   <a:srgbClr val="FFFFFF"/>
                 </a:solidFill>
               </a14:hiddenFill>
             </a:ext>
             <a:ext uri="{91240B29-F687-4f45-9708-019B960494DF}">
-              <a14:hiddenLine xmlns="" xmlns:a14="http://schemas.microsoft.com/office/drawing/2010/main" w="9525">
+              <a14:hiddenLine xmlns:a14="http://schemas.microsoft.com/office/drawing/2010/main" xmlns="" w="9525">
                 <a:solidFill>
                   <a:srgbClr val="000000"/>
                 </a:solidFill>
@@ -7707,14 +7707,14 @@
           </a:ln>
           <a:extLst>
             <a:ext uri="{909E8E84-426E-40dd-AFC4-6F175D3DCCD1}">
-              <a14:hiddenFill xmlns="" xmlns:a14="http://schemas.microsoft.com/office/drawing/2010/main">
+              <a14:hiddenFill xmlns:a14="http://schemas.microsoft.com/office/drawing/2010/main" xmlns="">
                 <a:solidFill>
                   <a:srgbClr val="FFFFFF"/>
                 </a:solidFill>
               </a14:hiddenFill>
             </a:ext>
             <a:ext uri="{FAA26D3D-D897-4be2-8F04-BA451C77F1D7}">
-              <ma14:placeholderFlag xmlns="" xmlns:ma14="http://schemas.microsoft.com/office/mac/drawingml/2011/main" val="1"/>
+              <ma14:placeholderFlag xmlns:ma14="http://schemas.microsoft.com/office/mac/drawingml/2011/main" xmlns="" val="1"/>
             </a:ext>
           </a:extLst>
         </p:spPr>
@@ -7733,14 +7733,14 @@
           <a:noFill/>
           <a:extLst>
             <a:ext uri="{909E8E84-426E-40dd-AFC4-6F175D3DCCD1}">
-              <a14:hiddenFill xmlns="" xmlns:a14="http://schemas.microsoft.com/office/drawing/2010/main">
+              <a14:hiddenFill xmlns:a14="http://schemas.microsoft.com/office/drawing/2010/main" xmlns="">
                 <a:solidFill>
                   <a:srgbClr val="FFFFFF"/>
                 </a:solidFill>
               </a14:hiddenFill>
             </a:ext>
             <a:ext uri="{91240B29-F687-4f45-9708-019B960494DF}">
-              <a14:hiddenLine xmlns="" xmlns:a14="http://schemas.microsoft.com/office/drawing/2010/main" w="9525">
+              <a14:hiddenLine xmlns:a14="http://schemas.microsoft.com/office/drawing/2010/main" xmlns="" w="9525">
                 <a:solidFill>
                   <a:srgbClr val="000000"/>
                 </a:solidFill>
@@ -7820,14 +7820,14 @@
           </a:ln>
           <a:extLst>
             <a:ext uri="{909E8E84-426E-40dd-AFC4-6F175D3DCCD1}">
-              <a14:hiddenFill xmlns="" xmlns:a14="http://schemas.microsoft.com/office/drawing/2010/main">
+              <a14:hiddenFill xmlns:a14="http://schemas.microsoft.com/office/drawing/2010/main" xmlns="">
                 <a:solidFill>
                   <a:srgbClr val="FFFFFF"/>
                 </a:solidFill>
               </a14:hiddenFill>
             </a:ext>
             <a:ext uri="{FAA26D3D-D897-4be2-8F04-BA451C77F1D7}">
-              <ma14:placeholderFlag xmlns="" xmlns:ma14="http://schemas.microsoft.com/office/mac/drawingml/2011/main" val="1"/>
+              <ma14:placeholderFlag xmlns:ma14="http://schemas.microsoft.com/office/mac/drawingml/2011/main" xmlns="" val="1"/>
             </a:ext>
           </a:extLst>
         </p:spPr>
@@ -7846,14 +7846,14 @@
           <a:noFill/>
           <a:extLst>
             <a:ext uri="{909E8E84-426E-40dd-AFC4-6F175D3DCCD1}">
-              <a14:hiddenFill xmlns="" xmlns:a14="http://schemas.microsoft.com/office/drawing/2010/main">
+              <a14:hiddenFill xmlns:a14="http://schemas.microsoft.com/office/drawing/2010/main" xmlns="">
                 <a:solidFill>
                   <a:srgbClr val="FFFFFF"/>
                 </a:solidFill>
               </a14:hiddenFill>
             </a:ext>
             <a:ext uri="{91240B29-F687-4f45-9708-019B960494DF}">
-              <a14:hiddenLine xmlns="" xmlns:a14="http://schemas.microsoft.com/office/drawing/2010/main" w="9525">
+              <a14:hiddenLine xmlns:a14="http://schemas.microsoft.com/office/drawing/2010/main" xmlns="" w="9525">
                 <a:solidFill>
                   <a:srgbClr val="000000"/>
                 </a:solidFill>
@@ -7933,14 +7933,14 @@
           </a:ln>
           <a:extLst>
             <a:ext uri="{909E8E84-426E-40dd-AFC4-6F175D3DCCD1}">
-              <a14:hiddenFill xmlns="" xmlns:a14="http://schemas.microsoft.com/office/drawing/2010/main">
+              <a14:hiddenFill xmlns:a14="http://schemas.microsoft.com/office/drawing/2010/main" xmlns="">
                 <a:solidFill>
                   <a:srgbClr val="FFFFFF"/>
                 </a:solidFill>
               </a14:hiddenFill>
             </a:ext>
             <a:ext uri="{FAA26D3D-D897-4be2-8F04-BA451C77F1D7}">
-              <ma14:placeholderFlag xmlns="" xmlns:ma14="http://schemas.microsoft.com/office/mac/drawingml/2011/main" val="1"/>
+              <ma14:placeholderFlag xmlns:ma14="http://schemas.microsoft.com/office/mac/drawingml/2011/main" xmlns="" val="1"/>
             </a:ext>
           </a:extLst>
         </p:spPr>
@@ -7959,14 +7959,14 @@
           <a:noFill/>
           <a:extLst>
             <a:ext uri="{909E8E84-426E-40dd-AFC4-6F175D3DCCD1}">
-              <a14:hiddenFill xmlns="" xmlns:a14="http://schemas.microsoft.com/office/drawing/2010/main">
+              <a14:hiddenFill xmlns:a14="http://schemas.microsoft.com/office/drawing/2010/main" xmlns="">
                 <a:solidFill>
                   <a:srgbClr val="FFFFFF"/>
                 </a:solidFill>
               </a14:hiddenFill>
             </a:ext>
             <a:ext uri="{91240B29-F687-4f45-9708-019B960494DF}">
-              <a14:hiddenLine xmlns="" xmlns:a14="http://schemas.microsoft.com/office/drawing/2010/main" w="9525">
+              <a14:hiddenLine xmlns:a14="http://schemas.microsoft.com/office/drawing/2010/main" xmlns="" w="9525">
                 <a:solidFill>
                   <a:srgbClr val="000000"/>
                 </a:solidFill>
@@ -8046,14 +8046,14 @@
           </a:ln>
           <a:extLst>
             <a:ext uri="{909E8E84-426E-40dd-AFC4-6F175D3DCCD1}">
-              <a14:hiddenFill xmlns="" xmlns:a14="http://schemas.microsoft.com/office/drawing/2010/main">
+              <a14:hiddenFill xmlns:a14="http://schemas.microsoft.com/office/drawing/2010/main" xmlns="">
                 <a:solidFill>
                   <a:srgbClr val="FFFFFF"/>
                 </a:solidFill>
               </a14:hiddenFill>
             </a:ext>
             <a:ext uri="{FAA26D3D-D897-4be2-8F04-BA451C77F1D7}">
-              <ma14:placeholderFlag xmlns="" xmlns:ma14="http://schemas.microsoft.com/office/mac/drawingml/2011/main" val="1"/>
+              <ma14:placeholderFlag xmlns:ma14="http://schemas.microsoft.com/office/mac/drawingml/2011/main" xmlns="" val="1"/>
             </a:ext>
           </a:extLst>
         </p:spPr>
@@ -8072,14 +8072,14 @@
           <a:noFill/>
           <a:extLst>
             <a:ext uri="{909E8E84-426E-40dd-AFC4-6F175D3DCCD1}">
-              <a14:hiddenFill xmlns="" xmlns:a14="http://schemas.microsoft.com/office/drawing/2010/main">
+              <a14:hiddenFill xmlns:a14="http://schemas.microsoft.com/office/drawing/2010/main" xmlns="">
                 <a:solidFill>
                   <a:srgbClr val="FFFFFF"/>
                 </a:solidFill>
               </a14:hiddenFill>
             </a:ext>
             <a:ext uri="{91240B29-F687-4f45-9708-019B960494DF}">
-              <a14:hiddenLine xmlns="" xmlns:a14="http://schemas.microsoft.com/office/drawing/2010/main" w="9525">
+              <a14:hiddenLine xmlns:a14="http://schemas.microsoft.com/office/drawing/2010/main" xmlns="" w="9525">
                 <a:solidFill>
                   <a:srgbClr val="000000"/>
                 </a:solidFill>
@@ -8159,14 +8159,14 @@
           </a:ln>
           <a:extLst>
             <a:ext uri="{909E8E84-426E-40dd-AFC4-6F175D3DCCD1}">
-              <a14:hiddenFill xmlns="" xmlns:a14="http://schemas.microsoft.com/office/drawing/2010/main">
+              <a14:hiddenFill xmlns:a14="http://schemas.microsoft.com/office/drawing/2010/main" xmlns="">
                 <a:solidFill>
                   <a:srgbClr val="FFFFFF"/>
                 </a:solidFill>
               </a14:hiddenFill>
             </a:ext>
             <a:ext uri="{FAA26D3D-D897-4be2-8F04-BA451C77F1D7}">
-              <ma14:placeholderFlag xmlns="" xmlns:ma14="http://schemas.microsoft.com/office/mac/drawingml/2011/main" val="1"/>
+              <ma14:placeholderFlag xmlns:ma14="http://schemas.microsoft.com/office/mac/drawingml/2011/main" xmlns="" val="1"/>
             </a:ext>
           </a:extLst>
         </p:spPr>
@@ -8185,14 +8185,14 @@
           <a:noFill/>
           <a:extLst>
             <a:ext uri="{909E8E84-426E-40dd-AFC4-6F175D3DCCD1}">
-              <a14:hiddenFill xmlns="" xmlns:a14="http://schemas.microsoft.com/office/drawing/2010/main">
+              <a14:hiddenFill xmlns:a14="http://schemas.microsoft.com/office/drawing/2010/main" xmlns="">
                 <a:solidFill>
                   <a:srgbClr val="FFFFFF"/>
                 </a:solidFill>
               </a14:hiddenFill>
             </a:ext>
             <a:ext uri="{91240B29-F687-4f45-9708-019B960494DF}">
-              <a14:hiddenLine xmlns="" xmlns:a14="http://schemas.microsoft.com/office/drawing/2010/main" w="9525">
+              <a14:hiddenLine xmlns:a14="http://schemas.microsoft.com/office/drawing/2010/main" xmlns="" w="9525">
                 <a:solidFill>
                   <a:srgbClr val="000000"/>
                 </a:solidFill>
@@ -8341,14 +8341,14 @@
           </a:ln>
           <a:extLst>
             <a:ext uri="{909E8E84-426E-40dd-AFC4-6F175D3DCCD1}">
-              <a14:hiddenFill xmlns="" xmlns:a14="http://schemas.microsoft.com/office/drawing/2010/main">
+              <a14:hiddenFill xmlns:a14="http://schemas.microsoft.com/office/drawing/2010/main" xmlns="">
                 <a:solidFill>
                   <a:srgbClr val="FFFFFF"/>
                 </a:solidFill>
               </a14:hiddenFill>
             </a:ext>
             <a:ext uri="{91240B29-F687-4f45-9708-019B960494DF}">
-              <a14:hiddenLine xmlns="" xmlns:a14="http://schemas.microsoft.com/office/drawing/2010/main" w="9525">
+              <a14:hiddenLine xmlns:a14="http://schemas.microsoft.com/office/drawing/2010/main" xmlns="" w="9525">
                 <a:solidFill>
                   <a:srgbClr val="000000"/>
                 </a:solidFill>
@@ -9099,14 +9099,14 @@
           </a:ln>
           <a:extLst>
             <a:ext uri="{909E8E84-426E-40dd-AFC4-6F175D3DCCD1}">
-              <a14:hiddenFill xmlns="" xmlns:a14="http://schemas.microsoft.com/office/drawing/2010/main">
+              <a14:hiddenFill xmlns:a14="http://schemas.microsoft.com/office/drawing/2010/main" xmlns="">
                 <a:solidFill>
                   <a:srgbClr val="FFFFFF"/>
                 </a:solidFill>
               </a14:hiddenFill>
             </a:ext>
             <a:ext uri="{91240B29-F687-4f45-9708-019B960494DF}">
-              <a14:hiddenLine xmlns="" xmlns:a14="http://schemas.microsoft.com/office/drawing/2010/main" w="9525">
+              <a14:hiddenLine xmlns:a14="http://schemas.microsoft.com/office/drawing/2010/main" xmlns="" w="9525">
                 <a:solidFill>
                   <a:srgbClr val="000000"/>
                 </a:solidFill>
@@ -10889,14 +10889,14 @@
           </a:ln>
           <a:extLst>
             <a:ext uri="{909E8E84-426E-40dd-AFC4-6F175D3DCCD1}">
-              <a14:hiddenFill xmlns="" xmlns:a14="http://schemas.microsoft.com/office/drawing/2010/main">
+              <a14:hiddenFill xmlns:a14="http://schemas.microsoft.com/office/drawing/2010/main" xmlns="">
                 <a:solidFill>
                   <a:srgbClr val="FFFFFF"/>
                 </a:solidFill>
               </a14:hiddenFill>
             </a:ext>
             <a:ext uri="{91240B29-F687-4f45-9708-019B960494DF}">
-              <a14:hiddenLine xmlns="" xmlns:a14="http://schemas.microsoft.com/office/drawing/2010/main" w="9525">
+              <a14:hiddenLine xmlns:a14="http://schemas.microsoft.com/office/drawing/2010/main" xmlns="" w="9525">
                 <a:solidFill>
                   <a:srgbClr val="000000"/>
                 </a:solidFill>
@@ -10906,7 +10906,7 @@
               </a14:hiddenLine>
             </a:ext>
             <a:ext uri="{FAA26D3D-D897-4be2-8F04-BA451C77F1D7}">
-              <ma14:placeholderFlag xmlns="" xmlns:ma14="http://schemas.microsoft.com/office/mac/drawingml/2011/main" val="1"/>
+              <ma14:placeholderFlag xmlns:ma14="http://schemas.microsoft.com/office/mac/drawingml/2011/main" xmlns="" val="1"/>
             </a:ext>
           </a:extLst>
         </p:spPr>
@@ -11468,6 +11468,18 @@
   <p:clrMapOvr>
     <a:masterClrMapping/>
   </p:clrMapOvr>
+  <mc:AlternateContent xmlns:mc="http://schemas.openxmlformats.org/markup-compatibility/2006">
+    <mc:Choice xmlns:p15="http://schemas.microsoft.com/office/powerpoint/2012/main" Requires="p15">
+      <p:transition xmlns:p14="http://schemas.microsoft.com/office/powerpoint/2010/main" spd="slow" p14:dur="2000">
+        <p15:prstTrans prst="drape"/>
+      </p:transition>
+    </mc:Choice>
+    <mc:Fallback>
+      <p:transition spd="slow">
+        <p:fade/>
+      </p:transition>
+    </mc:Fallback>
+  </mc:AlternateContent>
 </p:sld>
 </file>
 
@@ -11501,7 +11513,7 @@
         <p:spPr>
           <a:xfrm>
             <a:off x="704850" y="1811338"/>
-            <a:ext cx="13274675" cy="635000"/>
+            <a:ext cx="13274675" cy="567848"/>
           </a:xfrm>
         </p:spPr>
         <p:txBody>
@@ -11515,8 +11527,20 @@
                 </a:solidFill>
                 <a:latin typeface="BentonSans Book" charset="0"/>
               </a:rPr>
-              <a:t>[Topic One]</a:t>
+              <a:t>Dat</a:t>
             </a:r>
+            <a:r>
+              <a:rPr lang="en-US">
+                <a:latin typeface="BentonSans Book" charset="0"/>
+              </a:rPr>
+              <a:t>a Growth</a:t>
+            </a:r>
+            <a:endParaRPr lang="en-US" dirty="0">
+              <a:solidFill>
+                <a:srgbClr val="4C4C4C"/>
+              </a:solidFill>
+              <a:latin typeface="BentonSans Book" charset="0"/>
+            </a:endParaRPr>
           </a:p>
         </p:txBody>
       </p:sp>
@@ -13924,6 +13948,9 @@
   <p:clrMapOvr>
     <a:masterClrMapping/>
   </p:clrMapOvr>
+  <p:transition spd="slow">
+    <p:push dir="u"/>
+  </p:transition>
 </p:sld>
 </file>
 
@@ -16785,14 +16812,14 @@
           </a:ln>
           <a:extLst>
             <a:ext uri="{909E8E84-426E-40dd-AFC4-6F175D3DCCD1}">
-              <a14:hiddenFill xmlns="" xmlns:a14="http://schemas.microsoft.com/office/drawing/2010/main">
+              <a14:hiddenFill xmlns:a14="http://schemas.microsoft.com/office/drawing/2010/main" xmlns="">
                 <a:solidFill>
                   <a:srgbClr val="FFFFFF"/>
                 </a:solidFill>
               </a14:hiddenFill>
             </a:ext>
             <a:ext uri="{FAA26D3D-D897-4be2-8F04-BA451C77F1D7}">
-              <ma14:placeholderFlag xmlns="" xmlns:ma14="http://schemas.microsoft.com/office/mac/drawingml/2011/main" val="1"/>
+              <ma14:placeholderFlag xmlns:ma14="http://schemas.microsoft.com/office/mac/drawingml/2011/main" xmlns="" val="1"/>
             </a:ext>
           </a:extLst>
         </p:spPr>
@@ -16892,6 +16919,9 @@
   <p:clrMapOvr>
     <a:masterClrMapping/>
   </p:clrMapOvr>
+  <p:transition spd="slow">
+    <p:cover/>
+  </p:transition>
 </p:sld>
 </file>
 
@@ -18340,7 +18370,7 @@
           </a:ln>
           <a:extLst>
             <a:ext uri="{909E8E84-426E-40dd-AFC4-6F175D3DCCD1}">
-              <a14:hiddenFill xmlns="" xmlns:a14="http://schemas.microsoft.com/office/drawing/2010/main">
+              <a14:hiddenFill xmlns:a14="http://schemas.microsoft.com/office/drawing/2010/main" xmlns="">
                 <a:solidFill>
                   <a:srgbClr val="FFFFFF"/>
                 </a:solidFill>
@@ -18370,14 +18400,14 @@
           <a:noFill/>
           <a:extLst>
             <a:ext uri="{909E8E84-426E-40dd-AFC4-6F175D3DCCD1}">
-              <a14:hiddenFill xmlns="" xmlns:a14="http://schemas.microsoft.com/office/drawing/2010/main">
+              <a14:hiddenFill xmlns:a14="http://schemas.microsoft.com/office/drawing/2010/main" xmlns="">
                 <a:solidFill>
                   <a:srgbClr val="FFFFFF"/>
                 </a:solidFill>
               </a14:hiddenFill>
             </a:ext>
             <a:ext uri="{91240B29-F687-4f45-9708-019B960494DF}">
-              <a14:hiddenLine xmlns="" xmlns:a14="http://schemas.microsoft.com/office/drawing/2010/main" w="9525">
+              <a14:hiddenLine xmlns:a14="http://schemas.microsoft.com/office/drawing/2010/main" xmlns="" w="9525">
                 <a:solidFill>
                   <a:srgbClr val="000000"/>
                 </a:solidFill>
@@ -18720,14 +18750,14 @@
           <a:noFill/>
           <a:extLst>
             <a:ext uri="{909E8E84-426E-40dd-AFC4-6F175D3DCCD1}">
-              <a14:hiddenFill xmlns="" xmlns:a14="http://schemas.microsoft.com/office/drawing/2010/main">
+              <a14:hiddenFill xmlns:a14="http://schemas.microsoft.com/office/drawing/2010/main" xmlns="">
                 <a:solidFill>
                   <a:srgbClr val="FFFFFF"/>
                 </a:solidFill>
               </a14:hiddenFill>
             </a:ext>
             <a:ext uri="{91240B29-F687-4f45-9708-019B960494DF}">
-              <a14:hiddenLine xmlns="" xmlns:a14="http://schemas.microsoft.com/office/drawing/2010/main" w="9525">
+              <a14:hiddenLine xmlns:a14="http://schemas.microsoft.com/office/drawing/2010/main" xmlns="" w="9525">
                 <a:solidFill>
                   <a:srgbClr val="000000"/>
                 </a:solidFill>
@@ -18772,14 +18802,14 @@
           <a:noFill/>
           <a:extLst>
             <a:ext uri="{909E8E84-426E-40dd-AFC4-6F175D3DCCD1}">
-              <a14:hiddenFill xmlns="" xmlns:a14="http://schemas.microsoft.com/office/drawing/2010/main">
+              <a14:hiddenFill xmlns:a14="http://schemas.microsoft.com/office/drawing/2010/main" xmlns="">
                 <a:solidFill>
                   <a:srgbClr val="FFFFFF"/>
                 </a:solidFill>
               </a14:hiddenFill>
             </a:ext>
             <a:ext uri="{91240B29-F687-4f45-9708-019B960494DF}">
-              <a14:hiddenLine xmlns="" xmlns:a14="http://schemas.microsoft.com/office/drawing/2010/main" w="9525">
+              <a14:hiddenLine xmlns:a14="http://schemas.microsoft.com/office/drawing/2010/main" xmlns="" w="9525">
                 <a:solidFill>
                   <a:srgbClr val="000000"/>
                 </a:solidFill>
@@ -18970,7 +19000,7 @@
           </a:ln>
           <a:extLst>
             <a:ext uri="{909E8E84-426E-40dd-AFC4-6F175D3DCCD1}">
-              <a14:hiddenFill xmlns="" xmlns:a14="http://schemas.microsoft.com/office/drawing/2010/main">
+              <a14:hiddenFill xmlns:a14="http://schemas.microsoft.com/office/drawing/2010/main" xmlns="">
                 <a:solidFill>
                   <a:srgbClr val="FFFFFF"/>
                 </a:solidFill>
@@ -19014,14 +19044,14 @@
           </a:ln>
           <a:extLst>
             <a:ext uri="{909E8E84-426E-40dd-AFC4-6F175D3DCCD1}">
-              <a14:hiddenFill xmlns="" xmlns:a14="http://schemas.microsoft.com/office/drawing/2010/main">
+              <a14:hiddenFill xmlns:a14="http://schemas.microsoft.com/office/drawing/2010/main" xmlns="">
                 <a:solidFill>
                   <a:srgbClr val="FFFFFF"/>
                 </a:solidFill>
               </a14:hiddenFill>
             </a:ext>
             <a:ext uri="{91240B29-F687-4f45-9708-019B960494DF}">
-              <a14:hiddenLine xmlns="" xmlns:a14="http://schemas.microsoft.com/office/drawing/2010/main" w="9525">
+              <a14:hiddenLine xmlns:a14="http://schemas.microsoft.com/office/drawing/2010/main" xmlns="" w="9525">
                 <a:solidFill>
                   <a:srgbClr val="000000"/>
                 </a:solidFill>
@@ -19074,14 +19104,14 @@
           <a:effectLst/>
           <a:extLst>
             <a:ext uri="{909E8E84-426E-40dd-AFC4-6F175D3DCCD1}">
-              <a14:hiddenFill xmlns="" xmlns:a14="http://schemas.microsoft.com/office/drawing/2010/main">
+              <a14:hiddenFill xmlns:a14="http://schemas.microsoft.com/office/drawing/2010/main" xmlns="">
                 <a:solidFill>
                   <a:schemeClr val="accent1"/>
                 </a:solidFill>
               </a14:hiddenFill>
             </a:ext>
             <a:ext uri="{AF507438-7753-43e0-B8FC-AC1667EBCBE1}">
-              <a14:hiddenEffects xmlns="" xmlns:a14="http://schemas.microsoft.com/office/drawing/2010/main">
+              <a14:hiddenEffects xmlns:a14="http://schemas.microsoft.com/office/drawing/2010/main" xmlns="">
                 <a:effectLst>
                   <a:outerShdw dist="35921" dir="2700000" algn="ctr" rotWithShape="0">
                     <a:schemeClr val="bg2"/>
@@ -19340,14 +19370,14 @@
           </a:ln>
           <a:extLst>
             <a:ext uri="{909E8E84-426E-40dd-AFC4-6F175D3DCCD1}">
-              <a14:hiddenFill xmlns="" xmlns:a14="http://schemas.microsoft.com/office/drawing/2010/main">
+              <a14:hiddenFill xmlns:a14="http://schemas.microsoft.com/office/drawing/2010/main" xmlns="">
                 <a:solidFill>
                   <a:srgbClr val="FFFFFF"/>
                 </a:solidFill>
               </a14:hiddenFill>
             </a:ext>
             <a:ext uri="{91240B29-F687-4f45-9708-019B960494DF}">
-              <a14:hiddenLine xmlns="" xmlns:a14="http://schemas.microsoft.com/office/drawing/2010/main" w="9525">
+              <a14:hiddenLine xmlns:a14="http://schemas.microsoft.com/office/drawing/2010/main" xmlns="" w="9525">
                 <a:solidFill>
                   <a:srgbClr val="000000"/>
                 </a:solidFill>
@@ -19630,14 +19660,14 @@
           </a:ln>
           <a:extLst>
             <a:ext uri="{909E8E84-426E-40dd-AFC4-6F175D3DCCD1}">
-              <a14:hiddenFill xmlns="" xmlns:a14="http://schemas.microsoft.com/office/drawing/2010/main">
+              <a14:hiddenFill xmlns:a14="http://schemas.microsoft.com/office/drawing/2010/main" xmlns="">
                 <a:solidFill>
                   <a:srgbClr val="FFFFFF"/>
                 </a:solidFill>
               </a14:hiddenFill>
             </a:ext>
             <a:ext uri="{91240B29-F687-4f45-9708-019B960494DF}">
-              <a14:hiddenLine xmlns="" xmlns:a14="http://schemas.microsoft.com/office/drawing/2010/main" w="9525">
+              <a14:hiddenLine xmlns:a14="http://schemas.microsoft.com/office/drawing/2010/main" xmlns="" w="9525">
                 <a:solidFill>
                   <a:srgbClr val="000000"/>
                 </a:solidFill>
@@ -19840,14 +19870,14 @@
           </a:ln>
           <a:extLst>
             <a:ext uri="{909E8E84-426E-40dd-AFC4-6F175D3DCCD1}">
-              <a14:hiddenFill xmlns="" xmlns:a14="http://schemas.microsoft.com/office/drawing/2010/main">
+              <a14:hiddenFill xmlns:a14="http://schemas.microsoft.com/office/drawing/2010/main" xmlns="">
                 <a:solidFill>
                   <a:srgbClr val="FFFFFF"/>
                 </a:solidFill>
               </a14:hiddenFill>
             </a:ext>
             <a:ext uri="{91240B29-F687-4f45-9708-019B960494DF}">
-              <a14:hiddenLine xmlns="" xmlns:a14="http://schemas.microsoft.com/office/drawing/2010/main" w="9525">
+              <a14:hiddenLine xmlns:a14="http://schemas.microsoft.com/office/drawing/2010/main" xmlns="" w="9525">
                 <a:solidFill>
                   <a:srgbClr val="000000"/>
                 </a:solidFill>
@@ -19894,14 +19924,14 @@
           </a:ln>
           <a:extLst>
             <a:ext uri="{909E8E84-426E-40dd-AFC4-6F175D3DCCD1}">
-              <a14:hiddenFill xmlns="" xmlns:a14="http://schemas.microsoft.com/office/drawing/2010/main">
+              <a14:hiddenFill xmlns:a14="http://schemas.microsoft.com/office/drawing/2010/main" xmlns="">
                 <a:solidFill>
                   <a:srgbClr val="FFFFFF"/>
                 </a:solidFill>
               </a14:hiddenFill>
             </a:ext>
             <a:ext uri="{91240B29-F687-4f45-9708-019B960494DF}">
-              <a14:hiddenLine xmlns="" xmlns:a14="http://schemas.microsoft.com/office/drawing/2010/main" w="9525">
+              <a14:hiddenLine xmlns:a14="http://schemas.microsoft.com/office/drawing/2010/main" xmlns="" w="9525">
                 <a:solidFill>
                   <a:srgbClr val="000000"/>
                 </a:solidFill>
@@ -19948,14 +19978,14 @@
           </a:ln>
           <a:extLst>
             <a:ext uri="{909E8E84-426E-40dd-AFC4-6F175D3DCCD1}">
-              <a14:hiddenFill xmlns="" xmlns:a14="http://schemas.microsoft.com/office/drawing/2010/main">
+              <a14:hiddenFill xmlns:a14="http://schemas.microsoft.com/office/drawing/2010/main" xmlns="">
                 <a:solidFill>
                   <a:srgbClr val="FFFFFF"/>
                 </a:solidFill>
               </a14:hiddenFill>
             </a:ext>
             <a:ext uri="{91240B29-F687-4f45-9708-019B960494DF}">
-              <a14:hiddenLine xmlns="" xmlns:a14="http://schemas.microsoft.com/office/drawing/2010/main" w="9525">
+              <a14:hiddenLine xmlns:a14="http://schemas.microsoft.com/office/drawing/2010/main" xmlns="" w="9525">
                 <a:solidFill>
                   <a:srgbClr val="000000"/>
                 </a:solidFill>
@@ -25078,7 +25108,7 @@
             </a:ln>
             <a:extLst>
               <a:ext uri="{91240B29-F687-4f45-9708-019B960494DF}">
-                <a14:hiddenLine xmlns="" xmlns:a14="http://schemas.microsoft.com/office/drawing/2010/main" w="9525">
+                <a14:hiddenLine xmlns:a14="http://schemas.microsoft.com/office/drawing/2010/main" xmlns="" w="9525">
                   <a:solidFill>
                     <a:srgbClr val="000000"/>
                   </a:solidFill>
@@ -25179,7 +25209,7 @@
             </a:ln>
             <a:extLst>
               <a:ext uri="{91240B29-F687-4f45-9708-019B960494DF}">
-                <a14:hiddenLine xmlns="" xmlns:a14="http://schemas.microsoft.com/office/drawing/2010/main" w="9525">
+                <a14:hiddenLine xmlns:a14="http://schemas.microsoft.com/office/drawing/2010/main" xmlns="" w="9525">
                   <a:solidFill>
                     <a:srgbClr val="000000"/>
                   </a:solidFill>
@@ -25280,7 +25310,7 @@
             </a:ln>
             <a:extLst>
               <a:ext uri="{91240B29-F687-4f45-9708-019B960494DF}">
-                <a14:hiddenLine xmlns="" xmlns:a14="http://schemas.microsoft.com/office/drawing/2010/main" w="9525">
+                <a14:hiddenLine xmlns:a14="http://schemas.microsoft.com/office/drawing/2010/main" xmlns="" w="9525">
                   <a:solidFill>
                     <a:srgbClr val="000000"/>
                   </a:solidFill>
@@ -25381,7 +25411,7 @@
             </a:ln>
             <a:extLst>
               <a:ext uri="{91240B29-F687-4f45-9708-019B960494DF}">
-                <a14:hiddenLine xmlns="" xmlns:a14="http://schemas.microsoft.com/office/drawing/2010/main" w="9525">
+                <a14:hiddenLine xmlns:a14="http://schemas.microsoft.com/office/drawing/2010/main" xmlns="" w="9525">
                   <a:solidFill>
                     <a:srgbClr val="000000"/>
                   </a:solidFill>
@@ -25482,7 +25512,7 @@
             </a:ln>
             <a:extLst>
               <a:ext uri="{91240B29-F687-4f45-9708-019B960494DF}">
-                <a14:hiddenLine xmlns="" xmlns:a14="http://schemas.microsoft.com/office/drawing/2010/main" w="9525">
+                <a14:hiddenLine xmlns:a14="http://schemas.microsoft.com/office/drawing/2010/main" xmlns="" w="9525">
                   <a:solidFill>
                     <a:srgbClr val="000000"/>
                   </a:solidFill>
@@ -28584,7 +28614,7 @@
             </a:ln>
             <a:extLst>
               <a:ext uri="{91240B29-F687-4f45-9708-019B960494DF}">
-                <a14:hiddenLine xmlns="" xmlns:a14="http://schemas.microsoft.com/office/drawing/2010/main" w="9525">
+                <a14:hiddenLine xmlns:a14="http://schemas.microsoft.com/office/drawing/2010/main" xmlns="" w="9525">
                   <a:solidFill>
                     <a:srgbClr val="000000"/>
                   </a:solidFill>
@@ -29320,7 +29350,7 @@
             </a:ln>
             <a:extLst>
               <a:ext uri="{91240B29-F687-4f45-9708-019B960494DF}">
-                <a14:hiddenLine xmlns="" xmlns:a14="http://schemas.microsoft.com/office/drawing/2010/main" w="9525">
+                <a14:hiddenLine xmlns:a14="http://schemas.microsoft.com/office/drawing/2010/main" xmlns="" w="9525">
                   <a:solidFill>
                     <a:srgbClr val="000000"/>
                   </a:solidFill>
@@ -29507,7 +29537,7 @@
             </a:ln>
             <a:extLst>
               <a:ext uri="{91240B29-F687-4f45-9708-019B960494DF}">
-                <a14:hiddenLine xmlns="" xmlns:a14="http://schemas.microsoft.com/office/drawing/2010/main" w="9525">
+                <a14:hiddenLine xmlns:a14="http://schemas.microsoft.com/office/drawing/2010/main" xmlns="" w="9525">
                   <a:solidFill>
                     <a:srgbClr val="000000"/>
                   </a:solidFill>
@@ -30601,7 +30631,7 @@
             </a:ln>
             <a:extLst>
               <a:ext uri="{91240B29-F687-4f45-9708-019B960494DF}">
-                <a14:hiddenLine xmlns="" xmlns:a14="http://schemas.microsoft.com/office/drawing/2010/main" w="9525">
+                <a14:hiddenLine xmlns:a14="http://schemas.microsoft.com/office/drawing/2010/main" xmlns="" w="9525">
                   <a:solidFill>
                     <a:srgbClr val="000000"/>
                   </a:solidFill>
@@ -33246,7 +33276,7 @@
           </a:ln>
           <a:extLst>
             <a:ext uri="{91240B29-F687-4f45-9708-019B960494DF}">
-              <a14:hiddenLine xmlns="" xmlns:a14="http://schemas.microsoft.com/office/drawing/2010/main" w="9525">
+              <a14:hiddenLine xmlns:a14="http://schemas.microsoft.com/office/drawing/2010/main" xmlns="" w="9525">
                 <a:solidFill>
                   <a:srgbClr val="000000"/>
                 </a:solidFill>
@@ -34625,7 +34655,7 @@
           </a:ln>
           <a:extLst>
             <a:ext uri="{91240B29-F687-4f45-9708-019B960494DF}">
-              <a14:hiddenLine xmlns="" xmlns:a14="http://schemas.microsoft.com/office/drawing/2010/main" w="9525">
+              <a14:hiddenLine xmlns:a14="http://schemas.microsoft.com/office/drawing/2010/main" xmlns="" w="9525">
                 <a:solidFill>
                   <a:srgbClr val="000000"/>
                 </a:solidFill>
@@ -34668,14 +34698,14 @@
           </a:ln>
           <a:extLst>
             <a:ext uri="{909E8E84-426E-40dd-AFC4-6F175D3DCCD1}">
-              <a14:hiddenFill xmlns="" xmlns:a14="http://schemas.microsoft.com/office/drawing/2010/main">
+              <a14:hiddenFill xmlns:a14="http://schemas.microsoft.com/office/drawing/2010/main" xmlns="">
                 <a:solidFill>
                   <a:srgbClr val="FFFFFF"/>
                 </a:solidFill>
               </a14:hiddenFill>
             </a:ext>
             <a:ext uri="{91240B29-F687-4f45-9708-019B960494DF}">
-              <a14:hiddenLine xmlns="" xmlns:a14="http://schemas.microsoft.com/office/drawing/2010/main" w="9525">
+              <a14:hiddenLine xmlns:a14="http://schemas.microsoft.com/office/drawing/2010/main" xmlns="" w="9525">
                 <a:solidFill>
                   <a:srgbClr val="000000"/>
                 </a:solidFill>
@@ -34839,14 +34869,14 @@
           </a:ln>
           <a:extLst>
             <a:ext uri="{909E8E84-426E-40dd-AFC4-6F175D3DCCD1}">
-              <a14:hiddenFill xmlns="" xmlns:a14="http://schemas.microsoft.com/office/drawing/2010/main">
+              <a14:hiddenFill xmlns:a14="http://schemas.microsoft.com/office/drawing/2010/main" xmlns="">
                 <a:solidFill>
                   <a:srgbClr val="FFFFFF"/>
                 </a:solidFill>
               </a14:hiddenFill>
             </a:ext>
             <a:ext uri="{91240B29-F687-4f45-9708-019B960494DF}">
-              <a14:hiddenLine xmlns="" xmlns:a14="http://schemas.microsoft.com/office/drawing/2010/main" w="9525">
+              <a14:hiddenLine xmlns:a14="http://schemas.microsoft.com/office/drawing/2010/main" xmlns="" w="9525">
                 <a:solidFill>
                   <a:srgbClr val="000000"/>
                 </a:solidFill>
@@ -35010,14 +35040,14 @@
           </a:ln>
           <a:extLst>
             <a:ext uri="{909E8E84-426E-40dd-AFC4-6F175D3DCCD1}">
-              <a14:hiddenFill xmlns="" xmlns:a14="http://schemas.microsoft.com/office/drawing/2010/main">
+              <a14:hiddenFill xmlns:a14="http://schemas.microsoft.com/office/drawing/2010/main" xmlns="">
                 <a:solidFill>
                   <a:srgbClr val="FFFFFF"/>
                 </a:solidFill>
               </a14:hiddenFill>
             </a:ext>
             <a:ext uri="{91240B29-F687-4f45-9708-019B960494DF}">
-              <a14:hiddenLine xmlns="" xmlns:a14="http://schemas.microsoft.com/office/drawing/2010/main" w="9525">
+              <a14:hiddenLine xmlns:a14="http://schemas.microsoft.com/office/drawing/2010/main" xmlns="" w="9525">
                 <a:solidFill>
                   <a:srgbClr val="000000"/>
                 </a:solidFill>
@@ -35181,14 +35211,14 @@
           </a:ln>
           <a:extLst>
             <a:ext uri="{909E8E84-426E-40dd-AFC4-6F175D3DCCD1}">
-              <a14:hiddenFill xmlns="" xmlns:a14="http://schemas.microsoft.com/office/drawing/2010/main">
+              <a14:hiddenFill xmlns:a14="http://schemas.microsoft.com/office/drawing/2010/main" xmlns="">
                 <a:solidFill>
                   <a:srgbClr val="FFFFFF"/>
                 </a:solidFill>
               </a14:hiddenFill>
             </a:ext>
             <a:ext uri="{91240B29-F687-4f45-9708-019B960494DF}">
-              <a14:hiddenLine xmlns="" xmlns:a14="http://schemas.microsoft.com/office/drawing/2010/main" w="9525">
+              <a14:hiddenLine xmlns:a14="http://schemas.microsoft.com/office/drawing/2010/main" xmlns="" w="9525">
                 <a:solidFill>
                   <a:srgbClr val="000000"/>
                 </a:solidFill>
@@ -35352,14 +35382,14 @@
           </a:ln>
           <a:extLst>
             <a:ext uri="{909E8E84-426E-40dd-AFC4-6F175D3DCCD1}">
-              <a14:hiddenFill xmlns="" xmlns:a14="http://schemas.microsoft.com/office/drawing/2010/main">
+              <a14:hiddenFill xmlns:a14="http://schemas.microsoft.com/office/drawing/2010/main" xmlns="">
                 <a:solidFill>
                   <a:srgbClr val="FFFFFF"/>
                 </a:solidFill>
               </a14:hiddenFill>
             </a:ext>
             <a:ext uri="{91240B29-F687-4f45-9708-019B960494DF}">
-              <a14:hiddenLine xmlns="" xmlns:a14="http://schemas.microsoft.com/office/drawing/2010/main" w="9525">
+              <a14:hiddenLine xmlns:a14="http://schemas.microsoft.com/office/drawing/2010/main" xmlns="" w="9525">
                 <a:solidFill>
                   <a:srgbClr val="000000"/>
                 </a:solidFill>
@@ -35523,14 +35553,14 @@
           </a:ln>
           <a:extLst>
             <a:ext uri="{909E8E84-426E-40dd-AFC4-6F175D3DCCD1}">
-              <a14:hiddenFill xmlns="" xmlns:a14="http://schemas.microsoft.com/office/drawing/2010/main">
+              <a14:hiddenFill xmlns:a14="http://schemas.microsoft.com/office/drawing/2010/main" xmlns="">
                 <a:solidFill>
                   <a:srgbClr val="FFFFFF"/>
                 </a:solidFill>
               </a14:hiddenFill>
             </a:ext>
             <a:ext uri="{91240B29-F687-4f45-9708-019B960494DF}">
-              <a14:hiddenLine xmlns="" xmlns:a14="http://schemas.microsoft.com/office/drawing/2010/main" w="9525">
+              <a14:hiddenLine xmlns:a14="http://schemas.microsoft.com/office/drawing/2010/main" xmlns="" w="9525">
                 <a:solidFill>
                   <a:srgbClr val="000000"/>
                 </a:solidFill>
@@ -37913,7 +37943,7 @@
           </a:ln>
           <a:extLst>
             <a:ext uri="{91240B29-F687-4f45-9708-019B960494DF}">
-              <a14:hiddenLine xmlns="" xmlns:a14="http://schemas.microsoft.com/office/drawing/2010/main" w="9525">
+              <a14:hiddenLine xmlns:a14="http://schemas.microsoft.com/office/drawing/2010/main" xmlns="" w="9525">
                 <a:solidFill>
                   <a:srgbClr val="000000"/>
                 </a:solidFill>
@@ -38371,7 +38401,7 @@
           </a:ln>
           <a:extLst>
             <a:ext uri="{91240B29-F687-4f45-9708-019B960494DF}">
-              <a14:hiddenLine xmlns="" xmlns:a14="http://schemas.microsoft.com/office/drawing/2010/main" w="9525">
+              <a14:hiddenLine xmlns:a14="http://schemas.microsoft.com/office/drawing/2010/main" xmlns="" w="9525">
                 <a:solidFill>
                   <a:srgbClr val="000000"/>
                 </a:solidFill>
@@ -38864,7 +38894,7 @@
             </a:ln>
             <a:extLst>
               <a:ext uri="{91240B29-F687-4f45-9708-019B960494DF}">
-                <a14:hiddenLine xmlns="" xmlns:a14="http://schemas.microsoft.com/office/drawing/2010/main" w="9525">
+                <a14:hiddenLine xmlns:a14="http://schemas.microsoft.com/office/drawing/2010/main" xmlns="" w="9525">
                   <a:solidFill>
                     <a:srgbClr val="000000"/>
                   </a:solidFill>
@@ -39600,7 +39630,7 @@
             </a:ln>
             <a:extLst>
               <a:ext uri="{91240B29-F687-4f45-9708-019B960494DF}">
-                <a14:hiddenLine xmlns="" xmlns:a14="http://schemas.microsoft.com/office/drawing/2010/main" w="9525">
+                <a14:hiddenLine xmlns:a14="http://schemas.microsoft.com/office/drawing/2010/main" xmlns="" w="9525">
                   <a:solidFill>
                     <a:srgbClr val="000000"/>
                   </a:solidFill>
@@ -39787,7 +39817,7 @@
             </a:ln>
             <a:extLst>
               <a:ext uri="{91240B29-F687-4f45-9708-019B960494DF}">
-                <a14:hiddenLine xmlns="" xmlns:a14="http://schemas.microsoft.com/office/drawing/2010/main" w="9525">
+                <a14:hiddenLine xmlns:a14="http://schemas.microsoft.com/office/drawing/2010/main" xmlns="" w="9525">
                   <a:solidFill>
                     <a:srgbClr val="000000"/>
                   </a:solidFill>
@@ -40881,7 +40911,7 @@
             </a:ln>
             <a:extLst>
               <a:ext uri="{91240B29-F687-4f45-9708-019B960494DF}">
-                <a14:hiddenLine xmlns="" xmlns:a14="http://schemas.microsoft.com/office/drawing/2010/main" w="9525">
+                <a14:hiddenLine xmlns:a14="http://schemas.microsoft.com/office/drawing/2010/main" xmlns="" w="9525">
                   <a:solidFill>
                     <a:srgbClr val="000000"/>
                   </a:solidFill>
@@ -41667,7 +41697,7 @@
           </a:ln>
           <a:extLst>
             <a:ext uri="{91240B29-F687-4f45-9708-019B960494DF}">
-              <a14:hiddenLine xmlns="" xmlns:a14="http://schemas.microsoft.com/office/drawing/2010/main" w="9525">
+              <a14:hiddenLine xmlns:a14="http://schemas.microsoft.com/office/drawing/2010/main" xmlns="" w="9525">
                 <a:solidFill>
                   <a:srgbClr val="000000"/>
                 </a:solidFill>
@@ -41710,14 +41740,14 @@
           </a:ln>
           <a:extLst>
             <a:ext uri="{909E8E84-426E-40dd-AFC4-6F175D3DCCD1}">
-              <a14:hiddenFill xmlns="" xmlns:a14="http://schemas.microsoft.com/office/drawing/2010/main">
+              <a14:hiddenFill xmlns:a14="http://schemas.microsoft.com/office/drawing/2010/main" xmlns="">
                 <a:solidFill>
                   <a:srgbClr val="FFFFFF"/>
                 </a:solidFill>
               </a14:hiddenFill>
             </a:ext>
             <a:ext uri="{91240B29-F687-4f45-9708-019B960494DF}">
-              <a14:hiddenLine xmlns="" xmlns:a14="http://schemas.microsoft.com/office/drawing/2010/main" w="9525">
+              <a14:hiddenLine xmlns:a14="http://schemas.microsoft.com/office/drawing/2010/main" xmlns="" w="9525">
                 <a:solidFill>
                   <a:srgbClr val="000000"/>
                 </a:solidFill>
@@ -41881,14 +41911,14 @@
           </a:ln>
           <a:extLst>
             <a:ext uri="{909E8E84-426E-40dd-AFC4-6F175D3DCCD1}">
-              <a14:hiddenFill xmlns="" xmlns:a14="http://schemas.microsoft.com/office/drawing/2010/main">
+              <a14:hiddenFill xmlns:a14="http://schemas.microsoft.com/office/drawing/2010/main" xmlns="">
                 <a:solidFill>
                   <a:srgbClr val="FFFFFF"/>
                 </a:solidFill>
               </a14:hiddenFill>
             </a:ext>
             <a:ext uri="{91240B29-F687-4f45-9708-019B960494DF}">
-              <a14:hiddenLine xmlns="" xmlns:a14="http://schemas.microsoft.com/office/drawing/2010/main" w="9525">
+              <a14:hiddenLine xmlns:a14="http://schemas.microsoft.com/office/drawing/2010/main" xmlns="" w="9525">
                 <a:solidFill>
                   <a:srgbClr val="000000"/>
                 </a:solidFill>
@@ -42186,14 +42216,14 @@
           </a:ln>
           <a:extLst>
             <a:ext uri="{909E8E84-426E-40dd-AFC4-6F175D3DCCD1}">
-              <a14:hiddenFill xmlns="" xmlns:a14="http://schemas.microsoft.com/office/drawing/2010/main">
+              <a14:hiddenFill xmlns:a14="http://schemas.microsoft.com/office/drawing/2010/main" xmlns="">
                 <a:solidFill>
                   <a:srgbClr val="FFFFFF"/>
                 </a:solidFill>
               </a14:hiddenFill>
             </a:ext>
             <a:ext uri="{91240B29-F687-4f45-9708-019B960494DF}">
-              <a14:hiddenLine xmlns="" xmlns:a14="http://schemas.microsoft.com/office/drawing/2010/main" w="9525">
+              <a14:hiddenLine xmlns:a14="http://schemas.microsoft.com/office/drawing/2010/main" xmlns="" w="9525">
                 <a:solidFill>
                   <a:srgbClr val="000000"/>
                 </a:solidFill>
@@ -42240,14 +42270,14 @@
           </a:ln>
           <a:extLst>
             <a:ext uri="{909E8E84-426E-40dd-AFC4-6F175D3DCCD1}">
-              <a14:hiddenFill xmlns="" xmlns:a14="http://schemas.microsoft.com/office/drawing/2010/main">
+              <a14:hiddenFill xmlns:a14="http://schemas.microsoft.com/office/drawing/2010/main" xmlns="">
                 <a:solidFill>
                   <a:srgbClr val="FFFFFF"/>
                 </a:solidFill>
               </a14:hiddenFill>
             </a:ext>
             <a:ext uri="{91240B29-F687-4f45-9708-019B960494DF}">
-              <a14:hiddenLine xmlns="" xmlns:a14="http://schemas.microsoft.com/office/drawing/2010/main" w="9525">
+              <a14:hiddenLine xmlns:a14="http://schemas.microsoft.com/office/drawing/2010/main" xmlns="" w="9525">
                 <a:solidFill>
                   <a:srgbClr val="000000"/>
                 </a:solidFill>
@@ -42632,7 +42662,7 @@
           </a:ln>
           <a:extLst>
             <a:ext uri="{FAA26D3D-D897-4be2-8F04-BA451C77F1D7}">
-              <ma14:placeholderFlag xmlns="" xmlns:ma14="http://schemas.microsoft.com/office/mac/drawingml/2011/main" val="1"/>
+              <ma14:placeholderFlag xmlns:ma14="http://schemas.microsoft.com/office/mac/drawingml/2011/main" xmlns="" val="1"/>
             </a:ext>
           </a:extLst>
         </p:spPr>
@@ -42642,6 +42672,9 @@
   <p:clrMapOvr>
     <a:masterClrMapping/>
   </p:clrMapOvr>
+  <p:transition spd="slow">
+    <p:cover/>
+  </p:transition>
 </p:sld>
 </file>
 
@@ -42840,7 +42873,7 @@
           </a:solidFill>
           <a:extLst>
             <a:ext uri="{91240B29-F687-4f45-9708-019B960494DF}">
-              <a14:hiddenLine xmlns="" xmlns:a14="http://schemas.microsoft.com/office/drawing/2010/main" w="9525">
+              <a14:hiddenLine xmlns:a14="http://schemas.microsoft.com/office/drawing/2010/main" xmlns="" w="9525">
                 <a:solidFill>
                   <a:srgbClr val="000000"/>
                 </a:solidFill>
@@ -42910,7 +42943,7 @@
           </a:solidFill>
           <a:extLst>
             <a:ext uri="{91240B29-F687-4f45-9708-019B960494DF}">
-              <a14:hiddenLine xmlns="" xmlns:a14="http://schemas.microsoft.com/office/drawing/2010/main" w="9525">
+              <a14:hiddenLine xmlns:a14="http://schemas.microsoft.com/office/drawing/2010/main" xmlns="" w="9525">
                 <a:solidFill>
                   <a:srgbClr val="000000"/>
                 </a:solidFill>
@@ -42997,14 +43030,14 @@
           <a:noFill/>
           <a:extLst>
             <a:ext uri="{909E8E84-426E-40dd-AFC4-6F175D3DCCD1}">
-              <a14:hiddenFill xmlns="" xmlns:a14="http://schemas.microsoft.com/office/drawing/2010/main">
+              <a14:hiddenFill xmlns:a14="http://schemas.microsoft.com/office/drawing/2010/main" xmlns="">
                 <a:solidFill>
                   <a:srgbClr val="FFFFFF"/>
                 </a:solidFill>
               </a14:hiddenFill>
             </a:ext>
             <a:ext uri="{91240B29-F687-4f45-9708-019B960494DF}">
-              <a14:hiddenLine xmlns="" xmlns:a14="http://schemas.microsoft.com/office/drawing/2010/main" w="9525">
+              <a14:hiddenLine xmlns:a14="http://schemas.microsoft.com/office/drawing/2010/main" xmlns="" w="9525">
                 <a:solidFill>
                   <a:srgbClr val="000000"/>
                 </a:solidFill>
@@ -49096,6 +49129,9 @@
   <p:clrMapOvr>
     <a:masterClrMapping/>
   </p:clrMapOvr>
+  <p:transition spd="slow">
+    <p:cover/>
+  </p:transition>
 </p:sld>
 </file>
 
@@ -49118,10 +49154,10 @@
       </p:grpSpPr>
       <p:pic>
         <p:nvPicPr>
-          <p:cNvPr id="4" name="Picture Placeholder 3">
+          <p:cNvPr id="6" name="Picture Placeholder 5">
             <a:extLst>
               <a:ext uri="{FF2B5EF4-FFF2-40B4-BE49-F238E27FC236}">
-                <a16:creationId xmlns:a16="http://schemas.microsoft.com/office/drawing/2014/main" id="{948C6700-8C57-46E3-8650-751EF66AABB6}"/>
+                <a16:creationId xmlns:a16="http://schemas.microsoft.com/office/drawing/2014/main" id="{F7F89766-138E-4143-9B57-976D4CA07254}"/>
               </a:ext>
             </a:extLst>
           </p:cNvPr>
@@ -49140,17 +49176,12 @@
               </a:ext>
             </a:extLst>
           </a:blip>
-          <a:srcRect t="12500" b="12500"/>
+          <a:srcRect t="7813" b="7813"/>
           <a:stretch>
             <a:fillRect/>
           </a:stretch>
         </p:blipFill>
-        <p:spPr>
-          <a:xfrm>
-            <a:off x="0" y="0"/>
-            <a:ext cx="14630400" cy="8229600"/>
-          </a:xfrm>
-        </p:spPr>
+        <p:spPr/>
       </p:pic>
     </p:spTree>
     <p:extLst>
@@ -49162,6 +49193,9 @@
   <p:clrMapOvr>
     <a:masterClrMapping/>
   </p:clrMapOvr>
+  <p:transition spd="slow">
+    <p:cover/>
+  </p:transition>
 </p:sld>
 </file>
 
@@ -49187,6 +49221,9 @@
   <p:clrMapOvr>
     <a:masterClrMapping/>
   </p:clrMapOvr>
+  <p:transition spd="slow">
+    <p:cover/>
+  </p:transition>
 </p:sld>
 </file>
 
@@ -49296,6 +49333,9 @@
   <p:clrMapOvr>
     <a:masterClrMapping/>
   </p:clrMapOvr>
+  <p:transition spd="slow">
+    <p:cover/>
+  </p:transition>
 </p:sld>
 </file>
 
@@ -49329,7 +49369,7 @@
         <p:spPr>
           <a:xfrm>
             <a:off x="725488" y="1812925"/>
-            <a:ext cx="5337175" cy="3951288"/>
+            <a:ext cx="5337175" cy="1872179"/>
           </a:xfrm>
         </p:spPr>
         <p:txBody>
@@ -49346,7 +49386,7 @@
               <a:rPr lang="en-US" dirty="0">
                 <a:ea typeface="+mn-ea"/>
               </a:rPr>
-              <a:t>[Topic One]</a:t>
+              <a:t>Data Growth</a:t>
             </a:r>
           </a:p>
           <a:p>
@@ -49360,7 +49400,7 @@
               <a:rPr lang="en-US" dirty="0">
                 <a:ea typeface="+mn-ea"/>
               </a:rPr>
-              <a:t>[Topic Two]</a:t>
+              <a:t>Why Does Data Matter?</a:t>
             </a:r>
           </a:p>
           <a:p>
@@ -49374,49 +49414,7 @@
               <a:rPr lang="en-US" dirty="0">
                 <a:ea typeface="+mn-ea"/>
               </a:rPr>
-              <a:t>[Topic Three]</a:t>
-            </a:r>
-          </a:p>
-          <a:p>
-            <a:pPr defTabSz="1306221" fontAlgn="auto">
-              <a:spcAft>
-                <a:spcPts val="0"/>
-              </a:spcAft>
-              <a:defRPr/>
-            </a:pPr>
-            <a:r>
-              <a:rPr lang="en-US" dirty="0">
-                <a:ea typeface="+mn-ea"/>
-              </a:rPr>
-              <a:t>[Topic Four]</a:t>
-            </a:r>
-          </a:p>
-          <a:p>
-            <a:pPr defTabSz="1306221" fontAlgn="auto">
-              <a:spcAft>
-                <a:spcPts val="0"/>
-              </a:spcAft>
-              <a:defRPr/>
-            </a:pPr>
-            <a:r>
-              <a:rPr lang="en-US" dirty="0">
-                <a:ea typeface="+mn-ea"/>
-              </a:rPr>
-              <a:t>[Topic Five]</a:t>
-            </a:r>
-          </a:p>
-          <a:p>
-            <a:pPr defTabSz="1306221" fontAlgn="auto">
-              <a:spcAft>
-                <a:spcPts val="0"/>
-              </a:spcAft>
-              <a:defRPr/>
-            </a:pPr>
-            <a:r>
-              <a:rPr lang="en-US" dirty="0">
-                <a:ea typeface="+mn-ea"/>
-              </a:rPr>
-              <a:t>[Topic Six]</a:t>
+              <a:t>Tableau</a:t>
             </a:r>
           </a:p>
         </p:txBody>

</xml_diff>

<commit_message>
updated workbook to use calculated field; added instructions on creating viz to slidedeck
</commit_message>
<xml_diff>
--- a/lecture.pptx
+++ b/lecture.pptx
@@ -5,10 +5,10 @@
     <p:sldMasterId id="2147483875" r:id="rId1"/>
   </p:sldMasterIdLst>
   <p:notesMasterIdLst>
-    <p:notesMasterId r:id="rId35"/>
+    <p:notesMasterId r:id="rId36"/>
   </p:notesMasterIdLst>
   <p:handoutMasterIdLst>
-    <p:handoutMasterId r:id="rId36"/>
+    <p:handoutMasterId r:id="rId37"/>
   </p:handoutMasterIdLst>
   <p:sldIdLst>
     <p:sldId id="256" r:id="rId2"/>
@@ -41,9 +41,10 @@
     <p:sldId id="541" r:id="rId29"/>
     <p:sldId id="542" r:id="rId30"/>
     <p:sldId id="531" r:id="rId31"/>
-    <p:sldId id="567" r:id="rId32"/>
-    <p:sldId id="568" r:id="rId33"/>
-    <p:sldId id="566" r:id="rId34"/>
+    <p:sldId id="569" r:id="rId32"/>
+    <p:sldId id="567" r:id="rId33"/>
+    <p:sldId id="568" r:id="rId34"/>
+    <p:sldId id="566" r:id="rId35"/>
   </p:sldIdLst>
   <p:sldSz cx="14630400" cy="8229600"/>
   <p:notesSz cx="6858000" cy="9144000"/>
@@ -3969,11 +3970,247 @@
               </a:spcBef>
             </a:pPr>
             <a:r>
-              <a:rPr lang="en-US">
+              <a:rPr lang="en-US" b="1" dirty="0">
                 <a:latin typeface="BentonSans Book" charset="0"/>
               </a:rPr>
-              <a:t>Section Header</a:t>
-            </a:r>
+              <a:t>Germ Theory of Disease (two clinics)</a:t>
+            </a:r>
+          </a:p>
+          <a:p>
+            <a:pPr marL="342900" indent="-342900">
+              <a:spcBef>
+                <a:spcPct val="0"/>
+              </a:spcBef>
+              <a:buFont typeface="+mj-lt"/>
+              <a:buAutoNum type="arabicPeriod"/>
+            </a:pPr>
+            <a:r>
+              <a:rPr lang="en-US" dirty="0">
+                <a:latin typeface="BentonSans Book" charset="0"/>
+              </a:rPr>
+              <a:t>Start empty</a:t>
+            </a:r>
+          </a:p>
+          <a:p>
+            <a:pPr marL="342900" indent="-342900">
+              <a:spcBef>
+                <a:spcPct val="0"/>
+              </a:spcBef>
+              <a:buFont typeface="+mj-lt"/>
+              <a:buAutoNum type="arabicPeriod"/>
+            </a:pPr>
+            <a:r>
+              <a:rPr lang="en-US" dirty="0">
+                <a:latin typeface="BentonSans Book" charset="0"/>
+              </a:rPr>
+              <a:t>Drag “Clinic” to Columns</a:t>
+            </a:r>
+          </a:p>
+          <a:p>
+            <a:pPr marL="342900" indent="-342900">
+              <a:spcBef>
+                <a:spcPct val="0"/>
+              </a:spcBef>
+              <a:buFont typeface="+mj-lt"/>
+              <a:buAutoNum type="arabicPeriod"/>
+            </a:pPr>
+            <a:r>
+              <a:rPr lang="en-US" dirty="0">
+                <a:latin typeface="BentonSans Book" charset="0"/>
+              </a:rPr>
+              <a:t>Drag “Mortality Rate” to Rows</a:t>
+            </a:r>
+          </a:p>
+          <a:p>
+            <a:pPr marL="342900" indent="-342900">
+              <a:spcBef>
+                <a:spcPct val="0"/>
+              </a:spcBef>
+              <a:buFont typeface="+mj-lt"/>
+              <a:buAutoNum type="arabicPeriod"/>
+            </a:pPr>
+            <a:r>
+              <a:rPr lang="en-US" dirty="0">
+                <a:latin typeface="BentonSans Book" charset="0"/>
+              </a:rPr>
+              <a:t>Right click “Mortality Rate” &gt; Measure &gt; Average</a:t>
+            </a:r>
+          </a:p>
+          <a:p>
+            <a:pPr marL="342900" indent="-342900">
+              <a:spcBef>
+                <a:spcPct val="0"/>
+              </a:spcBef>
+              <a:buFont typeface="+mj-lt"/>
+              <a:buAutoNum type="arabicPeriod"/>
+            </a:pPr>
+            <a:r>
+              <a:rPr lang="en-US" dirty="0">
+                <a:latin typeface="BentonSans Book" charset="0"/>
+              </a:rPr>
+              <a:t>“Year” to “Columns”</a:t>
+            </a:r>
+          </a:p>
+          <a:p>
+            <a:pPr marL="342900" indent="-342900">
+              <a:spcBef>
+                <a:spcPct val="0"/>
+              </a:spcBef>
+              <a:buFont typeface="+mj-lt"/>
+              <a:buAutoNum type="arabicPeriod"/>
+            </a:pPr>
+            <a:r>
+              <a:rPr lang="en-US" dirty="0">
+                <a:latin typeface="BentonSans Book" charset="0"/>
+              </a:rPr>
+              <a:t>“Clinic” to “Color”</a:t>
+            </a:r>
+          </a:p>
+          <a:p>
+            <a:pPr marL="342900" indent="-342900">
+              <a:spcBef>
+                <a:spcPct val="0"/>
+              </a:spcBef>
+              <a:buFont typeface="+mj-lt"/>
+              <a:buAutoNum type="arabicPeriod"/>
+            </a:pPr>
+            <a:r>
+              <a:rPr lang="en-US" dirty="0">
+                <a:latin typeface="BentonSans Book" charset="0"/>
+              </a:rPr>
+              <a:t>“Births” to “Tooltip”</a:t>
+            </a:r>
+          </a:p>
+          <a:p>
+            <a:pPr marL="342900" indent="-342900">
+              <a:spcBef>
+                <a:spcPct val="0"/>
+              </a:spcBef>
+              <a:buFont typeface="+mj-lt"/>
+              <a:buAutoNum type="arabicPeriod"/>
+            </a:pPr>
+            <a:r>
+              <a:rPr lang="en-US" dirty="0">
+                <a:latin typeface="BentonSans Book" charset="0"/>
+              </a:rPr>
+              <a:t>“Deaths” to “Tooltip”</a:t>
+            </a:r>
+          </a:p>
+          <a:p>
+            <a:pPr marL="342900" indent="-342900">
+              <a:spcBef>
+                <a:spcPct val="0"/>
+              </a:spcBef>
+              <a:buFont typeface="+mj-lt"/>
+              <a:buAutoNum type="arabicPeriod"/>
+            </a:pPr>
+            <a:r>
+              <a:rPr lang="en-US" dirty="0">
+                <a:latin typeface="BentonSans Book" charset="0"/>
+              </a:rPr>
+              <a:t>Open “Tooltip”</a:t>
+            </a:r>
+          </a:p>
+          <a:p>
+            <a:pPr marL="342900" indent="-342900">
+              <a:spcBef>
+                <a:spcPct val="0"/>
+              </a:spcBef>
+              <a:buFont typeface="+mj-lt"/>
+              <a:buAutoNum type="arabicPeriod"/>
+            </a:pPr>
+            <a:r>
+              <a:rPr lang="en-US" dirty="0">
+                <a:latin typeface="BentonSans Book" charset="0"/>
+              </a:rPr>
+              <a:t>Add custom message</a:t>
+            </a:r>
+          </a:p>
+          <a:p>
+            <a:pPr marL="342900" indent="-342900">
+              <a:spcBef>
+                <a:spcPct val="0"/>
+              </a:spcBef>
+              <a:buFont typeface="+mj-lt"/>
+              <a:buAutoNum type="arabicPeriod"/>
+            </a:pPr>
+            <a:endParaRPr lang="en-US" dirty="0">
+              <a:latin typeface="BentonSans Book" charset="0"/>
+            </a:endParaRPr>
+          </a:p>
+          <a:p>
+            <a:pPr marL="0" indent="0">
+              <a:spcBef>
+                <a:spcPct val="0"/>
+              </a:spcBef>
+              <a:buFont typeface="+mj-lt"/>
+              <a:buNone/>
+            </a:pPr>
+            <a:endParaRPr lang="en-US" dirty="0">
+              <a:latin typeface="BentonSans Book" charset="0"/>
+            </a:endParaRPr>
+          </a:p>
+          <a:p>
+            <a:pPr>
+              <a:spcBef>
+                <a:spcPct val="0"/>
+              </a:spcBef>
+            </a:pPr>
+            <a:r>
+              <a:rPr lang="en-US" dirty="0">
+                <a:latin typeface="BentonSans Book" charset="0"/>
+              </a:rPr>
+              <a:t>Germ Theory of Disease</a:t>
+            </a:r>
+          </a:p>
+          <a:p>
+            <a:pPr>
+              <a:spcBef>
+                <a:spcPct val="0"/>
+              </a:spcBef>
+            </a:pPr>
+            <a:r>
+              <a:rPr lang="en-US" dirty="0">
+                <a:latin typeface="BentonSans Book" charset="0"/>
+              </a:rPr>
+              <a:t>Technology Adoption Over Time</a:t>
+            </a:r>
+          </a:p>
+          <a:p>
+            <a:pPr>
+              <a:spcBef>
+                <a:spcPct val="0"/>
+              </a:spcBef>
+            </a:pPr>
+            <a:r>
+              <a:rPr lang="en-US" dirty="0">
+                <a:latin typeface="BentonSans Book" charset="0"/>
+              </a:rPr>
+              <a:t>Anime</a:t>
+            </a:r>
+          </a:p>
+          <a:p>
+            <a:pPr>
+              <a:spcBef>
+                <a:spcPct val="0"/>
+              </a:spcBef>
+            </a:pPr>
+            <a:r>
+              <a:rPr lang="en-US" dirty="0">
+                <a:latin typeface="BentonSans Book" charset="0"/>
+              </a:rPr>
+              <a:t>Tableau Public</a:t>
+            </a:r>
+          </a:p>
+          <a:p>
+            <a:pPr>
+              <a:spcBef>
+                <a:spcPct val="0"/>
+              </a:spcBef>
+            </a:pPr>
+            <a:endParaRPr lang="en-US" dirty="0">
+              <a:latin typeface="BentonSans Book" charset="0"/>
+            </a:endParaRPr>
           </a:p>
         </p:txBody>
       </p:sp>
@@ -4036,7 +4273,7 @@
     </p:spTree>
     <p:extLst>
       <p:ext uri="{BB962C8B-B14F-4D97-AF65-F5344CB8AC3E}">
-        <p14:creationId xmlns:p14="http://schemas.microsoft.com/office/powerpoint/2010/main" val="3559071881"/>
+        <p14:creationId xmlns:p14="http://schemas.microsoft.com/office/powerpoint/2010/main" val="164648985"/>
       </p:ext>
     </p:extLst>
   </p:cSld>
@@ -4218,6 +4455,67 @@
     </p:spTree>
     <p:extLst>
       <p:ext uri="{BB962C8B-B14F-4D97-AF65-F5344CB8AC3E}">
+        <p14:creationId xmlns:p14="http://schemas.microsoft.com/office/powerpoint/2010/main" val="3559071881"/>
+      </p:ext>
+    </p:extLst>
+  </p:cSld>
+  <p:clrMapOvr>
+    <a:masterClrMapping/>
+  </p:clrMapOvr>
+</p:notes>
+</file>
+
+<file path=ppt/notesSlides/notesSlide31.xml><?xml version="1.0" encoding="utf-8"?>
+<p:notes xmlns:a="http://schemas.openxmlformats.org/drawingml/2006/main" xmlns:r="http://schemas.openxmlformats.org/officeDocument/2006/relationships" xmlns:p="http://schemas.openxmlformats.org/presentationml/2006/main">
+  <p:cSld>
+    <p:spTree>
+      <p:nvGrpSpPr>
+        <p:cNvPr id="1" name=""/>
+        <p:cNvGrpSpPr/>
+        <p:nvPr/>
+      </p:nvGrpSpPr>
+      <p:grpSpPr>
+        <a:xfrm>
+          <a:off x="0" y="0"/>
+          <a:ext cx="0" cy="0"/>
+          <a:chOff x="0" y="0"/>
+          <a:chExt cx="0" cy="0"/>
+        </a:xfrm>
+      </p:grpSpPr>
+      <p:sp>
+        <p:nvSpPr>
+          <p:cNvPr id="2" name="Slide Image Placeholder 1"/>
+          <p:cNvSpPr>
+            <a:spLocks noGrp="1" noRot="1" noChangeAspect="1"/>
+          </p:cNvSpPr>
+          <p:nvPr>
+            <p:ph type="sldImg"/>
+          </p:nvPr>
+        </p:nvSpPr>
+        <p:spPr/>
+      </p:sp>
+      <p:sp>
+        <p:nvSpPr>
+          <p:cNvPr id="3" name="Notes Placeholder 2"/>
+          <p:cNvSpPr>
+            <a:spLocks noGrp="1"/>
+          </p:cNvSpPr>
+          <p:nvPr>
+            <p:ph type="body" idx="1"/>
+          </p:nvPr>
+        </p:nvSpPr>
+        <p:spPr/>
+        <p:txBody>
+          <a:bodyPr/>
+          <a:lstStyle/>
+          <a:p>
+            <a:endParaRPr lang="en-US" dirty="0"/>
+          </a:p>
+        </p:txBody>
+      </p:sp>
+    </p:spTree>
+    <p:extLst>
+      <p:ext uri="{BB962C8B-B14F-4D97-AF65-F5344CB8AC3E}">
         <p14:creationId xmlns:p14="http://schemas.microsoft.com/office/powerpoint/2010/main" val="2764254563"/>
       </p:ext>
     </p:extLst>
@@ -4228,7 +4526,7 @@
 </p:notes>
 </file>
 
-<file path=ppt/notesSlides/notesSlide31.xml><?xml version="1.0" encoding="utf-8"?>
+<file path=ppt/notesSlides/notesSlide32.xml><?xml version="1.0" encoding="utf-8"?>
 <p:notes xmlns:a="http://schemas.openxmlformats.org/drawingml/2006/main" xmlns:r="http://schemas.openxmlformats.org/officeDocument/2006/relationships" xmlns:p="http://schemas.openxmlformats.org/presentationml/2006/main">
   <p:cSld>
     <p:spTree>
@@ -4442,12 +4740,6 @@
                 <a:spcPct val="0"/>
               </a:spcBef>
             </a:pPr>
-            <a:r>
-              <a:rPr lang="en-US" dirty="0">
-                <a:hlinkClick r:id="rId3"/>
-              </a:rPr>
-              <a:t>https://mangarock.com/manga/mrs-serie-154427</a:t>
-            </a:r>
             <a:endParaRPr lang="en-US" dirty="0">
               <a:latin typeface="BentonSans Book" charset="0"/>
             </a:endParaRPr>
@@ -15828,13 +16120,898 @@
           <a:lstStyle/>
           <a:p>
             <a:pPr marL="457200" indent="-457200" defTabSz="1306221" fontAlgn="auto">
+              <a:buFont typeface="+mj-lt"/>
+              <a:buAutoNum type="arabicPeriod"/>
               <a:defRPr/>
             </a:pPr>
+            <a:r>
+              <a:rPr lang="en-US" sz="2400" dirty="0">
+                <a:ea typeface="+mn-ea"/>
+              </a:rPr>
+              <a:t>Open “</a:t>
+            </a:r>
             <a:r>
               <a:rPr lang="en-US" sz="2400" dirty="0">
                 <a:ea typeface="+mn-ea"/>
                 <a:hlinkClick r:id="rId3"/>
               </a:rPr>
+              <a:t>Template/Germ Theory of Disease (two clinics)</a:t>
+            </a:r>
+            <a:r>
+              <a:rPr lang="en-US" sz="2400" dirty="0">
+                <a:ea typeface="+mn-ea"/>
+              </a:rPr>
+              <a:t>”</a:t>
+            </a:r>
+          </a:p>
+          <a:p>
+            <a:pPr marL="457200" indent="-457200" defTabSz="1306221" fontAlgn="auto">
+              <a:buFont typeface="+mj-lt"/>
+              <a:buAutoNum type="arabicPeriod"/>
+              <a:defRPr/>
+            </a:pPr>
+            <a:r>
+              <a:rPr lang="en-US" sz="2400" dirty="0">
+                <a:ea typeface="+mn-ea"/>
+              </a:rPr>
+              <a:t>Drag “Clinic” to Columns</a:t>
+            </a:r>
+          </a:p>
+          <a:p>
+            <a:pPr marL="457200" indent="-457200" defTabSz="1306221" fontAlgn="auto">
+              <a:buFont typeface="+mj-lt"/>
+              <a:buAutoNum type="arabicPeriod"/>
+              <a:defRPr/>
+            </a:pPr>
+            <a:r>
+              <a:rPr lang="en-US" sz="2400" dirty="0">
+                <a:ea typeface="+mn-ea"/>
+              </a:rPr>
+              <a:t>Drag “Mortality Rate” to Rows</a:t>
+            </a:r>
+          </a:p>
+          <a:p>
+            <a:pPr marL="457200" indent="-457200" defTabSz="1306221" fontAlgn="auto">
+              <a:buFont typeface="+mj-lt"/>
+              <a:buAutoNum type="arabicPeriod"/>
+              <a:defRPr/>
+            </a:pPr>
+            <a:r>
+              <a:rPr lang="en-US" sz="2400" dirty="0">
+                <a:ea typeface="+mn-ea"/>
+              </a:rPr>
+              <a:t>Right click “Mortality Rate” &gt; Measure &gt; Average</a:t>
+            </a:r>
+          </a:p>
+          <a:p>
+            <a:pPr marL="457200" indent="-457200" defTabSz="1306221" fontAlgn="auto">
+              <a:buFont typeface="+mj-lt"/>
+              <a:buAutoNum type="arabicPeriod"/>
+              <a:defRPr/>
+            </a:pPr>
+            <a:r>
+              <a:rPr lang="en-US" sz="2400" dirty="0">
+                <a:ea typeface="+mn-ea"/>
+              </a:rPr>
+              <a:t>“Year” to “Columns”</a:t>
+            </a:r>
+          </a:p>
+          <a:p>
+            <a:pPr marL="457200" indent="-457200" defTabSz="1306221" fontAlgn="auto">
+              <a:buFont typeface="+mj-lt"/>
+              <a:buAutoNum type="arabicPeriod"/>
+              <a:defRPr/>
+            </a:pPr>
+            <a:r>
+              <a:rPr lang="en-US" sz="2400" dirty="0">
+                <a:ea typeface="+mn-ea"/>
+              </a:rPr>
+              <a:t>“Clinic” to “Color”</a:t>
+            </a:r>
+          </a:p>
+          <a:p>
+            <a:pPr marL="457200" indent="-457200" defTabSz="1306221" fontAlgn="auto">
+              <a:buFont typeface="+mj-lt"/>
+              <a:buAutoNum type="arabicPeriod"/>
+              <a:defRPr/>
+            </a:pPr>
+            <a:r>
+              <a:rPr lang="en-US" sz="2400" dirty="0">
+                <a:ea typeface="+mn-ea"/>
+              </a:rPr>
+              <a:t>“Births” to “Tooltip”</a:t>
+            </a:r>
+          </a:p>
+          <a:p>
+            <a:pPr marL="457200" indent="-457200" defTabSz="1306221" fontAlgn="auto">
+              <a:buFont typeface="+mj-lt"/>
+              <a:buAutoNum type="arabicPeriod"/>
+              <a:defRPr/>
+            </a:pPr>
+            <a:r>
+              <a:rPr lang="en-US" sz="2400" dirty="0">
+                <a:ea typeface="+mn-ea"/>
+              </a:rPr>
+              <a:t>“Deaths” to “Tooltip”</a:t>
+            </a:r>
+          </a:p>
+          <a:p>
+            <a:pPr marL="457200" indent="-457200" defTabSz="1306221" fontAlgn="auto">
+              <a:buFont typeface="+mj-lt"/>
+              <a:buAutoNum type="arabicPeriod"/>
+              <a:defRPr/>
+            </a:pPr>
+            <a:r>
+              <a:rPr lang="en-US" sz="2400" dirty="0">
+                <a:ea typeface="+mn-ea"/>
+              </a:rPr>
+              <a:t>Open “Tooltip”</a:t>
+            </a:r>
+          </a:p>
+          <a:p>
+            <a:pPr marL="457200" indent="-457200" defTabSz="1306221" fontAlgn="auto">
+              <a:buFont typeface="+mj-lt"/>
+              <a:buAutoNum type="arabicPeriod"/>
+              <a:defRPr/>
+            </a:pPr>
+            <a:r>
+              <a:rPr lang="en-US" sz="2400" dirty="0">
+                <a:ea typeface="+mn-ea"/>
+              </a:rPr>
+              <a:t>Add </a:t>
+            </a:r>
+            <a:r>
+              <a:rPr lang="en-US" sz="2400">
+                <a:ea typeface="+mn-ea"/>
+              </a:rPr>
+              <a:t>custom Tooltip </a:t>
+            </a:r>
+            <a:r>
+              <a:rPr lang="en-US" sz="2400" dirty="0">
+                <a:ea typeface="+mn-ea"/>
+              </a:rPr>
+              <a:t>message</a:t>
+            </a:r>
+          </a:p>
+        </p:txBody>
+      </p:sp>
+      <p:sp>
+        <p:nvSpPr>
+          <p:cNvPr id="3" name="Text Placeholder 2"/>
+          <p:cNvSpPr>
+            <a:spLocks noGrp="1"/>
+          </p:cNvSpPr>
+          <p:nvPr>
+            <p:ph type="body" sz="quarter" idx="12"/>
+          </p:nvPr>
+        </p:nvSpPr>
+        <p:spPr>
+          <a:prstGeom prst="rect">
+            <a:avLst/>
+          </a:prstGeom>
+        </p:spPr>
+        <p:txBody>
+          <a:bodyPr/>
+          <a:lstStyle/>
+          <a:p>
+            <a:pPr>
+              <a:spcBef>
+                <a:spcPct val="0"/>
+              </a:spcBef>
+            </a:pPr>
+            <a:r>
+              <a:rPr lang="en-US" b="1" dirty="0">
+                <a:latin typeface="BentonSans Book" charset="0"/>
+              </a:rPr>
+              <a:t>Germ Theory of Disease (two clinics)</a:t>
+            </a:r>
+          </a:p>
+        </p:txBody>
+      </p:sp>
+    </p:spTree>
+    <p:extLst>
+      <p:ext uri="{BB962C8B-B14F-4D97-AF65-F5344CB8AC3E}">
+        <p14:creationId xmlns:p14="http://schemas.microsoft.com/office/powerpoint/2010/main" val="987329999"/>
+      </p:ext>
+    </p:extLst>
+  </p:cSld>
+  <p:clrMapOvr>
+    <a:masterClrMapping/>
+  </p:clrMapOvr>
+  <p:transition spd="slow">
+    <p:cover/>
+  </p:transition>
+  <p:timing>
+    <p:tnLst>
+      <p:par>
+        <p:cTn id="1" dur="indefinite" restart="never" nodeType="tmRoot">
+          <p:childTnLst>
+            <p:seq concurrent="1" nextAc="seek">
+              <p:cTn id="2" dur="indefinite" nodeType="mainSeq">
+                <p:childTnLst>
+                  <p:par>
+                    <p:cTn id="3" fill="hold">
+                      <p:stCondLst>
+                        <p:cond delay="indefinite"/>
+                      </p:stCondLst>
+                      <p:childTnLst>
+                        <p:par>
+                          <p:cTn id="4" fill="hold">
+                            <p:stCondLst>
+                              <p:cond delay="0"/>
+                            </p:stCondLst>
+                            <p:childTnLst>
+                              <p:par>
+                                <p:cTn id="5" presetID="10" presetClass="entr" presetSubtype="0" fill="hold" grpId="0" nodeType="clickEffect">
+                                  <p:stCondLst>
+                                    <p:cond delay="0"/>
+                                  </p:stCondLst>
+                                  <p:childTnLst>
+                                    <p:set>
+                                      <p:cBhvr>
+                                        <p:cTn id="6" dur="1" fill="hold">
+                                          <p:stCondLst>
+                                            <p:cond delay="0"/>
+                                          </p:stCondLst>
+                                        </p:cTn>
+                                        <p:tgtEl>
+                                          <p:spTgt spid="2">
+                                            <p:txEl>
+                                              <p:pRg st="0" end="0"/>
+                                            </p:txEl>
+                                          </p:spTgt>
+                                        </p:tgtEl>
+                                        <p:attrNameLst>
+                                          <p:attrName>style.visibility</p:attrName>
+                                        </p:attrNameLst>
+                                      </p:cBhvr>
+                                      <p:to>
+                                        <p:strVal val="visible"/>
+                                      </p:to>
+                                    </p:set>
+                                    <p:animEffect transition="in" filter="fade">
+                                      <p:cBhvr>
+                                        <p:cTn id="7" dur="500"/>
+                                        <p:tgtEl>
+                                          <p:spTgt spid="2">
+                                            <p:txEl>
+                                              <p:pRg st="0" end="0"/>
+                                            </p:txEl>
+                                          </p:spTgt>
+                                        </p:tgtEl>
+                                      </p:cBhvr>
+                                    </p:animEffect>
+                                  </p:childTnLst>
+                                </p:cTn>
+                              </p:par>
+                            </p:childTnLst>
+                          </p:cTn>
+                        </p:par>
+                      </p:childTnLst>
+                    </p:cTn>
+                  </p:par>
+                  <p:par>
+                    <p:cTn id="8" fill="hold">
+                      <p:stCondLst>
+                        <p:cond delay="indefinite"/>
+                      </p:stCondLst>
+                      <p:childTnLst>
+                        <p:par>
+                          <p:cTn id="9" fill="hold">
+                            <p:stCondLst>
+                              <p:cond delay="0"/>
+                            </p:stCondLst>
+                            <p:childTnLst>
+                              <p:par>
+                                <p:cTn id="10" presetID="10" presetClass="entr" presetSubtype="0" fill="hold" grpId="0" nodeType="clickEffect">
+                                  <p:stCondLst>
+                                    <p:cond delay="0"/>
+                                  </p:stCondLst>
+                                  <p:childTnLst>
+                                    <p:set>
+                                      <p:cBhvr>
+                                        <p:cTn id="11" dur="1" fill="hold">
+                                          <p:stCondLst>
+                                            <p:cond delay="0"/>
+                                          </p:stCondLst>
+                                        </p:cTn>
+                                        <p:tgtEl>
+                                          <p:spTgt spid="2">
+                                            <p:txEl>
+                                              <p:pRg st="1" end="1"/>
+                                            </p:txEl>
+                                          </p:spTgt>
+                                        </p:tgtEl>
+                                        <p:attrNameLst>
+                                          <p:attrName>style.visibility</p:attrName>
+                                        </p:attrNameLst>
+                                      </p:cBhvr>
+                                      <p:to>
+                                        <p:strVal val="visible"/>
+                                      </p:to>
+                                    </p:set>
+                                    <p:animEffect transition="in" filter="fade">
+                                      <p:cBhvr>
+                                        <p:cTn id="12" dur="500"/>
+                                        <p:tgtEl>
+                                          <p:spTgt spid="2">
+                                            <p:txEl>
+                                              <p:pRg st="1" end="1"/>
+                                            </p:txEl>
+                                          </p:spTgt>
+                                        </p:tgtEl>
+                                      </p:cBhvr>
+                                    </p:animEffect>
+                                  </p:childTnLst>
+                                </p:cTn>
+                              </p:par>
+                            </p:childTnLst>
+                          </p:cTn>
+                        </p:par>
+                      </p:childTnLst>
+                    </p:cTn>
+                  </p:par>
+                  <p:par>
+                    <p:cTn id="13" fill="hold">
+                      <p:stCondLst>
+                        <p:cond delay="indefinite"/>
+                      </p:stCondLst>
+                      <p:childTnLst>
+                        <p:par>
+                          <p:cTn id="14" fill="hold">
+                            <p:stCondLst>
+                              <p:cond delay="0"/>
+                            </p:stCondLst>
+                            <p:childTnLst>
+                              <p:par>
+                                <p:cTn id="15" presetID="10" presetClass="entr" presetSubtype="0" fill="hold" grpId="0" nodeType="clickEffect">
+                                  <p:stCondLst>
+                                    <p:cond delay="0"/>
+                                  </p:stCondLst>
+                                  <p:childTnLst>
+                                    <p:set>
+                                      <p:cBhvr>
+                                        <p:cTn id="16" dur="1" fill="hold">
+                                          <p:stCondLst>
+                                            <p:cond delay="0"/>
+                                          </p:stCondLst>
+                                        </p:cTn>
+                                        <p:tgtEl>
+                                          <p:spTgt spid="2">
+                                            <p:txEl>
+                                              <p:pRg st="2" end="2"/>
+                                            </p:txEl>
+                                          </p:spTgt>
+                                        </p:tgtEl>
+                                        <p:attrNameLst>
+                                          <p:attrName>style.visibility</p:attrName>
+                                        </p:attrNameLst>
+                                      </p:cBhvr>
+                                      <p:to>
+                                        <p:strVal val="visible"/>
+                                      </p:to>
+                                    </p:set>
+                                    <p:animEffect transition="in" filter="fade">
+                                      <p:cBhvr>
+                                        <p:cTn id="17" dur="500"/>
+                                        <p:tgtEl>
+                                          <p:spTgt spid="2">
+                                            <p:txEl>
+                                              <p:pRg st="2" end="2"/>
+                                            </p:txEl>
+                                          </p:spTgt>
+                                        </p:tgtEl>
+                                      </p:cBhvr>
+                                    </p:animEffect>
+                                  </p:childTnLst>
+                                </p:cTn>
+                              </p:par>
+                            </p:childTnLst>
+                          </p:cTn>
+                        </p:par>
+                      </p:childTnLst>
+                    </p:cTn>
+                  </p:par>
+                  <p:par>
+                    <p:cTn id="18" fill="hold">
+                      <p:stCondLst>
+                        <p:cond delay="indefinite"/>
+                      </p:stCondLst>
+                      <p:childTnLst>
+                        <p:par>
+                          <p:cTn id="19" fill="hold">
+                            <p:stCondLst>
+                              <p:cond delay="0"/>
+                            </p:stCondLst>
+                            <p:childTnLst>
+                              <p:par>
+                                <p:cTn id="20" presetID="10" presetClass="entr" presetSubtype="0" fill="hold" grpId="0" nodeType="clickEffect">
+                                  <p:stCondLst>
+                                    <p:cond delay="0"/>
+                                  </p:stCondLst>
+                                  <p:childTnLst>
+                                    <p:set>
+                                      <p:cBhvr>
+                                        <p:cTn id="21" dur="1" fill="hold">
+                                          <p:stCondLst>
+                                            <p:cond delay="0"/>
+                                          </p:stCondLst>
+                                        </p:cTn>
+                                        <p:tgtEl>
+                                          <p:spTgt spid="2">
+                                            <p:txEl>
+                                              <p:pRg st="3" end="3"/>
+                                            </p:txEl>
+                                          </p:spTgt>
+                                        </p:tgtEl>
+                                        <p:attrNameLst>
+                                          <p:attrName>style.visibility</p:attrName>
+                                        </p:attrNameLst>
+                                      </p:cBhvr>
+                                      <p:to>
+                                        <p:strVal val="visible"/>
+                                      </p:to>
+                                    </p:set>
+                                    <p:animEffect transition="in" filter="fade">
+                                      <p:cBhvr>
+                                        <p:cTn id="22" dur="500"/>
+                                        <p:tgtEl>
+                                          <p:spTgt spid="2">
+                                            <p:txEl>
+                                              <p:pRg st="3" end="3"/>
+                                            </p:txEl>
+                                          </p:spTgt>
+                                        </p:tgtEl>
+                                      </p:cBhvr>
+                                    </p:animEffect>
+                                  </p:childTnLst>
+                                </p:cTn>
+                              </p:par>
+                            </p:childTnLst>
+                          </p:cTn>
+                        </p:par>
+                      </p:childTnLst>
+                    </p:cTn>
+                  </p:par>
+                  <p:par>
+                    <p:cTn id="23" fill="hold">
+                      <p:stCondLst>
+                        <p:cond delay="indefinite"/>
+                      </p:stCondLst>
+                      <p:childTnLst>
+                        <p:par>
+                          <p:cTn id="24" fill="hold">
+                            <p:stCondLst>
+                              <p:cond delay="0"/>
+                            </p:stCondLst>
+                            <p:childTnLst>
+                              <p:par>
+                                <p:cTn id="25" presetID="10" presetClass="entr" presetSubtype="0" fill="hold" grpId="0" nodeType="clickEffect">
+                                  <p:stCondLst>
+                                    <p:cond delay="0"/>
+                                  </p:stCondLst>
+                                  <p:childTnLst>
+                                    <p:set>
+                                      <p:cBhvr>
+                                        <p:cTn id="26" dur="1" fill="hold">
+                                          <p:stCondLst>
+                                            <p:cond delay="0"/>
+                                          </p:stCondLst>
+                                        </p:cTn>
+                                        <p:tgtEl>
+                                          <p:spTgt spid="2">
+                                            <p:txEl>
+                                              <p:pRg st="4" end="4"/>
+                                            </p:txEl>
+                                          </p:spTgt>
+                                        </p:tgtEl>
+                                        <p:attrNameLst>
+                                          <p:attrName>style.visibility</p:attrName>
+                                        </p:attrNameLst>
+                                      </p:cBhvr>
+                                      <p:to>
+                                        <p:strVal val="visible"/>
+                                      </p:to>
+                                    </p:set>
+                                    <p:animEffect transition="in" filter="fade">
+                                      <p:cBhvr>
+                                        <p:cTn id="27" dur="500"/>
+                                        <p:tgtEl>
+                                          <p:spTgt spid="2">
+                                            <p:txEl>
+                                              <p:pRg st="4" end="4"/>
+                                            </p:txEl>
+                                          </p:spTgt>
+                                        </p:tgtEl>
+                                      </p:cBhvr>
+                                    </p:animEffect>
+                                  </p:childTnLst>
+                                </p:cTn>
+                              </p:par>
+                            </p:childTnLst>
+                          </p:cTn>
+                        </p:par>
+                      </p:childTnLst>
+                    </p:cTn>
+                  </p:par>
+                  <p:par>
+                    <p:cTn id="28" fill="hold">
+                      <p:stCondLst>
+                        <p:cond delay="indefinite"/>
+                      </p:stCondLst>
+                      <p:childTnLst>
+                        <p:par>
+                          <p:cTn id="29" fill="hold">
+                            <p:stCondLst>
+                              <p:cond delay="0"/>
+                            </p:stCondLst>
+                            <p:childTnLst>
+                              <p:par>
+                                <p:cTn id="30" presetID="10" presetClass="entr" presetSubtype="0" fill="hold" grpId="0" nodeType="clickEffect">
+                                  <p:stCondLst>
+                                    <p:cond delay="0"/>
+                                  </p:stCondLst>
+                                  <p:childTnLst>
+                                    <p:set>
+                                      <p:cBhvr>
+                                        <p:cTn id="31" dur="1" fill="hold">
+                                          <p:stCondLst>
+                                            <p:cond delay="0"/>
+                                          </p:stCondLst>
+                                        </p:cTn>
+                                        <p:tgtEl>
+                                          <p:spTgt spid="2">
+                                            <p:txEl>
+                                              <p:pRg st="5" end="5"/>
+                                            </p:txEl>
+                                          </p:spTgt>
+                                        </p:tgtEl>
+                                        <p:attrNameLst>
+                                          <p:attrName>style.visibility</p:attrName>
+                                        </p:attrNameLst>
+                                      </p:cBhvr>
+                                      <p:to>
+                                        <p:strVal val="visible"/>
+                                      </p:to>
+                                    </p:set>
+                                    <p:animEffect transition="in" filter="fade">
+                                      <p:cBhvr>
+                                        <p:cTn id="32" dur="500"/>
+                                        <p:tgtEl>
+                                          <p:spTgt spid="2">
+                                            <p:txEl>
+                                              <p:pRg st="5" end="5"/>
+                                            </p:txEl>
+                                          </p:spTgt>
+                                        </p:tgtEl>
+                                      </p:cBhvr>
+                                    </p:animEffect>
+                                  </p:childTnLst>
+                                </p:cTn>
+                              </p:par>
+                            </p:childTnLst>
+                          </p:cTn>
+                        </p:par>
+                      </p:childTnLst>
+                    </p:cTn>
+                  </p:par>
+                  <p:par>
+                    <p:cTn id="33" fill="hold">
+                      <p:stCondLst>
+                        <p:cond delay="indefinite"/>
+                      </p:stCondLst>
+                      <p:childTnLst>
+                        <p:par>
+                          <p:cTn id="34" fill="hold">
+                            <p:stCondLst>
+                              <p:cond delay="0"/>
+                            </p:stCondLst>
+                            <p:childTnLst>
+                              <p:par>
+                                <p:cTn id="35" presetID="10" presetClass="entr" presetSubtype="0" fill="hold" grpId="0" nodeType="clickEffect">
+                                  <p:stCondLst>
+                                    <p:cond delay="0"/>
+                                  </p:stCondLst>
+                                  <p:childTnLst>
+                                    <p:set>
+                                      <p:cBhvr>
+                                        <p:cTn id="36" dur="1" fill="hold">
+                                          <p:stCondLst>
+                                            <p:cond delay="0"/>
+                                          </p:stCondLst>
+                                        </p:cTn>
+                                        <p:tgtEl>
+                                          <p:spTgt spid="2">
+                                            <p:txEl>
+                                              <p:pRg st="6" end="6"/>
+                                            </p:txEl>
+                                          </p:spTgt>
+                                        </p:tgtEl>
+                                        <p:attrNameLst>
+                                          <p:attrName>style.visibility</p:attrName>
+                                        </p:attrNameLst>
+                                      </p:cBhvr>
+                                      <p:to>
+                                        <p:strVal val="visible"/>
+                                      </p:to>
+                                    </p:set>
+                                    <p:animEffect transition="in" filter="fade">
+                                      <p:cBhvr>
+                                        <p:cTn id="37" dur="500"/>
+                                        <p:tgtEl>
+                                          <p:spTgt spid="2">
+                                            <p:txEl>
+                                              <p:pRg st="6" end="6"/>
+                                            </p:txEl>
+                                          </p:spTgt>
+                                        </p:tgtEl>
+                                      </p:cBhvr>
+                                    </p:animEffect>
+                                  </p:childTnLst>
+                                </p:cTn>
+                              </p:par>
+                            </p:childTnLst>
+                          </p:cTn>
+                        </p:par>
+                      </p:childTnLst>
+                    </p:cTn>
+                  </p:par>
+                  <p:par>
+                    <p:cTn id="38" fill="hold">
+                      <p:stCondLst>
+                        <p:cond delay="indefinite"/>
+                      </p:stCondLst>
+                      <p:childTnLst>
+                        <p:par>
+                          <p:cTn id="39" fill="hold">
+                            <p:stCondLst>
+                              <p:cond delay="0"/>
+                            </p:stCondLst>
+                            <p:childTnLst>
+                              <p:par>
+                                <p:cTn id="40" presetID="10" presetClass="entr" presetSubtype="0" fill="hold" grpId="0" nodeType="clickEffect">
+                                  <p:stCondLst>
+                                    <p:cond delay="0"/>
+                                  </p:stCondLst>
+                                  <p:childTnLst>
+                                    <p:set>
+                                      <p:cBhvr>
+                                        <p:cTn id="41" dur="1" fill="hold">
+                                          <p:stCondLst>
+                                            <p:cond delay="0"/>
+                                          </p:stCondLst>
+                                        </p:cTn>
+                                        <p:tgtEl>
+                                          <p:spTgt spid="2">
+                                            <p:txEl>
+                                              <p:pRg st="7" end="7"/>
+                                            </p:txEl>
+                                          </p:spTgt>
+                                        </p:tgtEl>
+                                        <p:attrNameLst>
+                                          <p:attrName>style.visibility</p:attrName>
+                                        </p:attrNameLst>
+                                      </p:cBhvr>
+                                      <p:to>
+                                        <p:strVal val="visible"/>
+                                      </p:to>
+                                    </p:set>
+                                    <p:animEffect transition="in" filter="fade">
+                                      <p:cBhvr>
+                                        <p:cTn id="42" dur="500"/>
+                                        <p:tgtEl>
+                                          <p:spTgt spid="2">
+                                            <p:txEl>
+                                              <p:pRg st="7" end="7"/>
+                                            </p:txEl>
+                                          </p:spTgt>
+                                        </p:tgtEl>
+                                      </p:cBhvr>
+                                    </p:animEffect>
+                                  </p:childTnLst>
+                                </p:cTn>
+                              </p:par>
+                            </p:childTnLst>
+                          </p:cTn>
+                        </p:par>
+                      </p:childTnLst>
+                    </p:cTn>
+                  </p:par>
+                  <p:par>
+                    <p:cTn id="43" fill="hold">
+                      <p:stCondLst>
+                        <p:cond delay="indefinite"/>
+                      </p:stCondLst>
+                      <p:childTnLst>
+                        <p:par>
+                          <p:cTn id="44" fill="hold">
+                            <p:stCondLst>
+                              <p:cond delay="0"/>
+                            </p:stCondLst>
+                            <p:childTnLst>
+                              <p:par>
+                                <p:cTn id="45" presetID="10" presetClass="entr" presetSubtype="0" fill="hold" grpId="0" nodeType="clickEffect">
+                                  <p:stCondLst>
+                                    <p:cond delay="0"/>
+                                  </p:stCondLst>
+                                  <p:childTnLst>
+                                    <p:set>
+                                      <p:cBhvr>
+                                        <p:cTn id="46" dur="1" fill="hold">
+                                          <p:stCondLst>
+                                            <p:cond delay="0"/>
+                                          </p:stCondLst>
+                                        </p:cTn>
+                                        <p:tgtEl>
+                                          <p:spTgt spid="2">
+                                            <p:txEl>
+                                              <p:pRg st="8" end="8"/>
+                                            </p:txEl>
+                                          </p:spTgt>
+                                        </p:tgtEl>
+                                        <p:attrNameLst>
+                                          <p:attrName>style.visibility</p:attrName>
+                                        </p:attrNameLst>
+                                      </p:cBhvr>
+                                      <p:to>
+                                        <p:strVal val="visible"/>
+                                      </p:to>
+                                    </p:set>
+                                    <p:animEffect transition="in" filter="fade">
+                                      <p:cBhvr>
+                                        <p:cTn id="47" dur="500"/>
+                                        <p:tgtEl>
+                                          <p:spTgt spid="2">
+                                            <p:txEl>
+                                              <p:pRg st="8" end="8"/>
+                                            </p:txEl>
+                                          </p:spTgt>
+                                        </p:tgtEl>
+                                      </p:cBhvr>
+                                    </p:animEffect>
+                                  </p:childTnLst>
+                                </p:cTn>
+                              </p:par>
+                            </p:childTnLst>
+                          </p:cTn>
+                        </p:par>
+                      </p:childTnLst>
+                    </p:cTn>
+                  </p:par>
+                  <p:par>
+                    <p:cTn id="48" fill="hold">
+                      <p:stCondLst>
+                        <p:cond delay="indefinite"/>
+                      </p:stCondLst>
+                      <p:childTnLst>
+                        <p:par>
+                          <p:cTn id="49" fill="hold">
+                            <p:stCondLst>
+                              <p:cond delay="0"/>
+                            </p:stCondLst>
+                            <p:childTnLst>
+                              <p:par>
+                                <p:cTn id="50" presetID="10" presetClass="entr" presetSubtype="0" fill="hold" grpId="0" nodeType="clickEffect">
+                                  <p:stCondLst>
+                                    <p:cond delay="0"/>
+                                  </p:stCondLst>
+                                  <p:childTnLst>
+                                    <p:set>
+                                      <p:cBhvr>
+                                        <p:cTn id="51" dur="1" fill="hold">
+                                          <p:stCondLst>
+                                            <p:cond delay="0"/>
+                                          </p:stCondLst>
+                                        </p:cTn>
+                                        <p:tgtEl>
+                                          <p:spTgt spid="2">
+                                            <p:txEl>
+                                              <p:pRg st="9" end="9"/>
+                                            </p:txEl>
+                                          </p:spTgt>
+                                        </p:tgtEl>
+                                        <p:attrNameLst>
+                                          <p:attrName>style.visibility</p:attrName>
+                                        </p:attrNameLst>
+                                      </p:cBhvr>
+                                      <p:to>
+                                        <p:strVal val="visible"/>
+                                      </p:to>
+                                    </p:set>
+                                    <p:animEffect transition="in" filter="fade">
+                                      <p:cBhvr>
+                                        <p:cTn id="52" dur="500"/>
+                                        <p:tgtEl>
+                                          <p:spTgt spid="2">
+                                            <p:txEl>
+                                              <p:pRg st="9" end="9"/>
+                                            </p:txEl>
+                                          </p:spTgt>
+                                        </p:tgtEl>
+                                      </p:cBhvr>
+                                    </p:animEffect>
+                                  </p:childTnLst>
+                                </p:cTn>
+                              </p:par>
+                            </p:childTnLst>
+                          </p:cTn>
+                        </p:par>
+                      </p:childTnLst>
+                    </p:cTn>
+                  </p:par>
+                </p:childTnLst>
+              </p:cTn>
+              <p:prevCondLst>
+                <p:cond evt="onPrev" delay="0">
+                  <p:tgtEl>
+                    <p:sldTgt/>
+                  </p:tgtEl>
+                </p:cond>
+              </p:prevCondLst>
+              <p:nextCondLst>
+                <p:cond evt="onNext" delay="0">
+                  <p:tgtEl>
+                    <p:sldTgt/>
+                  </p:tgtEl>
+                </p:cond>
+              </p:nextCondLst>
+            </p:seq>
+          </p:childTnLst>
+        </p:cTn>
+      </p:par>
+    </p:tnLst>
+    <p:bldLst>
+      <p:bldP spid="2" grpId="0" uiExpand="1" build="p"/>
+    </p:bldLst>
+  </p:timing>
+</p:sld>
+</file>
+
+<file path=ppt/slides/slide32.xml><?xml version="1.0" encoding="utf-8"?>
+<p:sld xmlns:a="http://schemas.openxmlformats.org/drawingml/2006/main" xmlns:r="http://schemas.openxmlformats.org/officeDocument/2006/relationships" xmlns:p="http://schemas.openxmlformats.org/presentationml/2006/main">
+  <p:cSld>
+    <p:spTree>
+      <p:nvGrpSpPr>
+        <p:cNvPr id="1" name=""/>
+        <p:cNvGrpSpPr/>
+        <p:nvPr/>
+      </p:nvGrpSpPr>
+      <p:grpSpPr>
+        <a:xfrm>
+          <a:off x="0" y="0"/>
+          <a:ext cx="0" cy="0"/>
+          <a:chOff x="0" y="0"/>
+          <a:chExt cx="0" cy="0"/>
+        </a:xfrm>
+      </p:grpSpPr>
+      <p:sp>
+        <p:nvSpPr>
+          <p:cNvPr id="2" name="Content Placeholder 1"/>
+          <p:cNvSpPr>
+            <a:spLocks noGrp="1"/>
+          </p:cNvSpPr>
+          <p:nvPr>
+            <p:ph idx="14"/>
+          </p:nvPr>
+        </p:nvSpPr>
+        <p:spPr>
+          <a:xfrm>
+            <a:off x="704476" y="1893515"/>
+            <a:ext cx="13273820" cy="4385816"/>
+          </a:xfrm>
+        </p:spPr>
+        <p:txBody>
+          <a:bodyPr/>
+          <a:lstStyle/>
+          <a:p>
+            <a:pPr marL="457200" indent="-457200" defTabSz="1306221" fontAlgn="auto">
+              <a:defRPr/>
+            </a:pPr>
+            <a:r>
+              <a:rPr lang="en-US" sz="2400" dirty="0">
+                <a:ea typeface="+mn-ea"/>
+                <a:hlinkClick r:id="rId3"/>
+              </a:rPr>
               <a:t>Community Forums</a:t>
             </a:r>
             <a:r>
@@ -15902,17 +17079,8 @@
               <a:rPr lang="en-US" sz="2400" dirty="0">
                 <a:ea typeface="+mn-ea"/>
               </a:rPr>
-              <a:t> (Google for </a:t>
-            </a:r>
-            <a:r>
-              <a:rPr lang="en-US" sz="2400">
-                <a:ea typeface="+mn-ea"/>
-              </a:rPr>
-              <a:t>additional resources on “Tableau Dashboard Design”)</a:t>
-            </a:r>
-            <a:endParaRPr lang="en-US" sz="2400" dirty="0">
-              <a:ea typeface="+mn-ea"/>
-            </a:endParaRPr>
+              <a:t> (Google for additional resources on “Tableau Dashboard Design”)</a:t>
+            </a:r>
           </a:p>
           <a:p>
             <a:pPr marL="457200" indent="-457200" defTabSz="1306221" fontAlgn="auto">
@@ -15923,7 +17091,7 @@
                 <a:ea typeface="+mn-ea"/>
                 <a:hlinkClick r:id="rId8"/>
               </a:rPr>
-              <a:t>Using Web Data Connector</a:t>
+              <a:t>Using the Web Data Connector</a:t>
             </a:r>
             <a:endParaRPr lang="en-US" sz="2400" dirty="0">
               <a:ea typeface="+mn-ea"/>
@@ -16638,7 +17806,7 @@
 </p:sld>
 </file>
 
-<file path=ppt/slides/slide32.xml><?xml version="1.0" encoding="utf-8"?>
+<file path=ppt/slides/slide33.xml><?xml version="1.0" encoding="utf-8"?>
 <p:sld xmlns:a="http://schemas.openxmlformats.org/drawingml/2006/main" xmlns:r="http://schemas.openxmlformats.org/officeDocument/2006/relationships" xmlns:p="http://schemas.openxmlformats.org/presentationml/2006/main">
   <p:cSld>
     <p:spTree>
@@ -17712,7 +18880,7 @@
 </p:sld>
 </file>
 
-<file path=ppt/slides/slide33.xml><?xml version="1.0" encoding="utf-8"?>
+<file path=ppt/slides/slide34.xml><?xml version="1.0" encoding="utf-8"?>
 <p:sld xmlns:a="http://schemas.openxmlformats.org/drawingml/2006/main" xmlns:r="http://schemas.openxmlformats.org/officeDocument/2006/relationships" xmlns:p="http://schemas.openxmlformats.org/presentationml/2006/main">
   <p:cSld>
     <p:spTree>

</xml_diff>

<commit_message>
added remaining instructions for germ theory of disease; correct viz
</commit_message>
<xml_diff>
--- a/lecture.pptx
+++ b/lecture.pptx
@@ -5,10 +5,10 @@
     <p:sldMasterId id="2147483875" r:id="rId1"/>
   </p:sldMasterIdLst>
   <p:notesMasterIdLst>
-    <p:notesMasterId r:id="rId36"/>
+    <p:notesMasterId r:id="rId38"/>
   </p:notesMasterIdLst>
   <p:handoutMasterIdLst>
-    <p:handoutMasterId r:id="rId37"/>
+    <p:handoutMasterId r:id="rId39"/>
   </p:handoutMasterIdLst>
   <p:sldIdLst>
     <p:sldId id="256" r:id="rId2"/>
@@ -42,9 +42,11 @@
     <p:sldId id="542" r:id="rId30"/>
     <p:sldId id="531" r:id="rId31"/>
     <p:sldId id="569" r:id="rId32"/>
-    <p:sldId id="567" r:id="rId33"/>
-    <p:sldId id="568" r:id="rId34"/>
-    <p:sldId id="566" r:id="rId35"/>
+    <p:sldId id="570" r:id="rId33"/>
+    <p:sldId id="571" r:id="rId34"/>
+    <p:sldId id="567" r:id="rId35"/>
+    <p:sldId id="568" r:id="rId36"/>
+    <p:sldId id="566" r:id="rId37"/>
   </p:sldIdLst>
   <p:sldSz cx="14630400" cy="8229600"/>
   <p:notesSz cx="6858000" cy="9144000"/>
@@ -4455,7 +4457,7 @@
     </p:spTree>
     <p:extLst>
       <p:ext uri="{BB962C8B-B14F-4D97-AF65-F5344CB8AC3E}">
-        <p14:creationId xmlns:p14="http://schemas.microsoft.com/office/powerpoint/2010/main" val="3559071881"/>
+        <p14:creationId xmlns:p14="http://schemas.microsoft.com/office/powerpoint/2010/main" val="989393269"/>
       </p:ext>
     </p:extLst>
   </p:cSld>
@@ -4516,6 +4518,128 @@
     </p:spTree>
     <p:extLst>
       <p:ext uri="{BB962C8B-B14F-4D97-AF65-F5344CB8AC3E}">
+        <p14:creationId xmlns:p14="http://schemas.microsoft.com/office/powerpoint/2010/main" val="3296685925"/>
+      </p:ext>
+    </p:extLst>
+  </p:cSld>
+  <p:clrMapOvr>
+    <a:masterClrMapping/>
+  </p:clrMapOvr>
+</p:notes>
+</file>
+
+<file path=ppt/notesSlides/notesSlide32.xml><?xml version="1.0" encoding="utf-8"?>
+<p:notes xmlns:a="http://schemas.openxmlformats.org/drawingml/2006/main" xmlns:r="http://schemas.openxmlformats.org/officeDocument/2006/relationships" xmlns:p="http://schemas.openxmlformats.org/presentationml/2006/main">
+  <p:cSld>
+    <p:spTree>
+      <p:nvGrpSpPr>
+        <p:cNvPr id="1" name=""/>
+        <p:cNvGrpSpPr/>
+        <p:nvPr/>
+      </p:nvGrpSpPr>
+      <p:grpSpPr>
+        <a:xfrm>
+          <a:off x="0" y="0"/>
+          <a:ext cx="0" cy="0"/>
+          <a:chOff x="0" y="0"/>
+          <a:chExt cx="0" cy="0"/>
+        </a:xfrm>
+      </p:grpSpPr>
+      <p:sp>
+        <p:nvSpPr>
+          <p:cNvPr id="2" name="Slide Image Placeholder 1"/>
+          <p:cNvSpPr>
+            <a:spLocks noGrp="1" noRot="1" noChangeAspect="1"/>
+          </p:cNvSpPr>
+          <p:nvPr>
+            <p:ph type="sldImg"/>
+          </p:nvPr>
+        </p:nvSpPr>
+        <p:spPr/>
+      </p:sp>
+      <p:sp>
+        <p:nvSpPr>
+          <p:cNvPr id="3" name="Notes Placeholder 2"/>
+          <p:cNvSpPr>
+            <a:spLocks noGrp="1"/>
+          </p:cNvSpPr>
+          <p:nvPr>
+            <p:ph type="body" idx="1"/>
+          </p:nvPr>
+        </p:nvSpPr>
+        <p:spPr/>
+        <p:txBody>
+          <a:bodyPr/>
+          <a:lstStyle/>
+          <a:p>
+            <a:endParaRPr lang="en-US" dirty="0"/>
+          </a:p>
+        </p:txBody>
+      </p:sp>
+    </p:spTree>
+    <p:extLst>
+      <p:ext uri="{BB962C8B-B14F-4D97-AF65-F5344CB8AC3E}">
+        <p14:creationId xmlns:p14="http://schemas.microsoft.com/office/powerpoint/2010/main" val="3559071881"/>
+      </p:ext>
+    </p:extLst>
+  </p:cSld>
+  <p:clrMapOvr>
+    <a:masterClrMapping/>
+  </p:clrMapOvr>
+</p:notes>
+</file>
+
+<file path=ppt/notesSlides/notesSlide33.xml><?xml version="1.0" encoding="utf-8"?>
+<p:notes xmlns:a="http://schemas.openxmlformats.org/drawingml/2006/main" xmlns:r="http://schemas.openxmlformats.org/officeDocument/2006/relationships" xmlns:p="http://schemas.openxmlformats.org/presentationml/2006/main">
+  <p:cSld>
+    <p:spTree>
+      <p:nvGrpSpPr>
+        <p:cNvPr id="1" name=""/>
+        <p:cNvGrpSpPr/>
+        <p:nvPr/>
+      </p:nvGrpSpPr>
+      <p:grpSpPr>
+        <a:xfrm>
+          <a:off x="0" y="0"/>
+          <a:ext cx="0" cy="0"/>
+          <a:chOff x="0" y="0"/>
+          <a:chExt cx="0" cy="0"/>
+        </a:xfrm>
+      </p:grpSpPr>
+      <p:sp>
+        <p:nvSpPr>
+          <p:cNvPr id="2" name="Slide Image Placeholder 1"/>
+          <p:cNvSpPr>
+            <a:spLocks noGrp="1" noRot="1" noChangeAspect="1"/>
+          </p:cNvSpPr>
+          <p:nvPr>
+            <p:ph type="sldImg"/>
+          </p:nvPr>
+        </p:nvSpPr>
+        <p:spPr/>
+      </p:sp>
+      <p:sp>
+        <p:nvSpPr>
+          <p:cNvPr id="3" name="Notes Placeholder 2"/>
+          <p:cNvSpPr>
+            <a:spLocks noGrp="1"/>
+          </p:cNvSpPr>
+          <p:nvPr>
+            <p:ph type="body" idx="1"/>
+          </p:nvPr>
+        </p:nvSpPr>
+        <p:spPr/>
+        <p:txBody>
+          <a:bodyPr/>
+          <a:lstStyle/>
+          <a:p>
+            <a:endParaRPr lang="en-US" dirty="0"/>
+          </a:p>
+        </p:txBody>
+      </p:sp>
+    </p:spTree>
+    <p:extLst>
+      <p:ext uri="{BB962C8B-B14F-4D97-AF65-F5344CB8AC3E}">
         <p14:creationId xmlns:p14="http://schemas.microsoft.com/office/powerpoint/2010/main" val="2764254563"/>
       </p:ext>
     </p:extLst>
@@ -4526,7 +4650,7 @@
 </p:notes>
 </file>
 
-<file path=ppt/notesSlides/notesSlide32.xml><?xml version="1.0" encoding="utf-8"?>
+<file path=ppt/notesSlides/notesSlide34.xml><?xml version="1.0" encoding="utf-8"?>
 <p:notes xmlns:a="http://schemas.openxmlformats.org/drawingml/2006/main" xmlns:r="http://schemas.openxmlformats.org/officeDocument/2006/relationships" xmlns:p="http://schemas.openxmlformats.org/presentationml/2006/main">
   <p:cSld>
     <p:spTree>
@@ -16128,7 +16252,7 @@
               <a:rPr lang="en-US" sz="2400" dirty="0">
                 <a:ea typeface="+mn-ea"/>
               </a:rPr>
-              <a:t>Open “</a:t>
+              <a:t>Open </a:t>
             </a:r>
             <a:r>
               <a:rPr lang="en-US" sz="2400" dirty="0">
@@ -16137,12 +16261,9 @@
               </a:rPr>
               <a:t>Template/Germ Theory of Disease (two clinics)</a:t>
             </a:r>
-            <a:r>
-              <a:rPr lang="en-US" sz="2400" dirty="0">
-                <a:ea typeface="+mn-ea"/>
-              </a:rPr>
-              <a:t>”</a:t>
-            </a:r>
+            <a:endParaRPr lang="en-US" sz="2400" dirty="0">
+              <a:ea typeface="+mn-ea"/>
+            </a:endParaRPr>
           </a:p>
           <a:p>
             <a:pPr marL="457200" indent="-457200" defTabSz="1306221" fontAlgn="auto">
@@ -16258,19 +16379,7 @@
               <a:rPr lang="en-US" sz="2400" dirty="0">
                 <a:ea typeface="+mn-ea"/>
               </a:rPr>
-              <a:t>Add </a:t>
-            </a:r>
-            <a:r>
-              <a:rPr lang="en-US" sz="2400">
-                <a:ea typeface="+mn-ea"/>
-              </a:rPr>
-              <a:t>custom Tooltip </a:t>
-            </a:r>
-            <a:r>
-              <a:rPr lang="en-US" sz="2400" dirty="0">
-                <a:ea typeface="+mn-ea"/>
-              </a:rPr>
-              <a:t>message</a:t>
+              <a:t>Add custom Tooltip message</a:t>
             </a:r>
           </a:p>
         </p:txBody>
@@ -16997,6 +17106,2062 @@
         <p:spPr>
           <a:xfrm>
             <a:off x="704476" y="1893515"/>
+            <a:ext cx="13273820" cy="5724644"/>
+          </a:xfrm>
+        </p:spPr>
+        <p:txBody>
+          <a:bodyPr/>
+          <a:lstStyle/>
+          <a:p>
+            <a:pPr marL="457200" indent="-457200" defTabSz="1306221" fontAlgn="auto">
+              <a:buFont typeface="+mj-lt"/>
+              <a:buAutoNum type="arabicPeriod"/>
+              <a:defRPr/>
+            </a:pPr>
+            <a:r>
+              <a:rPr lang="en-US" sz="2400" dirty="0">
+                <a:ea typeface="+mn-ea"/>
+              </a:rPr>
+              <a:t>Open </a:t>
+            </a:r>
+            <a:r>
+              <a:rPr lang="en-US" sz="2400" dirty="0">
+                <a:ea typeface="+mn-ea"/>
+                <a:hlinkClick r:id="rId3"/>
+              </a:rPr>
+              <a:t>Template/Germ Theory of Disease</a:t>
+            </a:r>
+            <a:endParaRPr lang="en-US" sz="2400" dirty="0">
+              <a:ea typeface="+mn-ea"/>
+            </a:endParaRPr>
+          </a:p>
+          <a:p>
+            <a:pPr marL="457200" indent="-457200" defTabSz="1306221" fontAlgn="auto">
+              <a:buFont typeface="+mj-lt"/>
+              <a:buAutoNum type="arabicPeriod"/>
+              <a:defRPr/>
+            </a:pPr>
+            <a:r>
+              <a:rPr lang="en-US" sz="2400" dirty="0">
+                <a:ea typeface="+mn-ea"/>
+              </a:rPr>
+              <a:t>Right click the empty area in “Measures” &gt; “Create Calculated Field…”</a:t>
+            </a:r>
+          </a:p>
+          <a:p>
+            <a:pPr marL="457200" indent="-457200" defTabSz="1306221" fontAlgn="auto">
+              <a:buFont typeface="+mj-lt"/>
+              <a:buAutoNum type="arabicPeriod"/>
+              <a:defRPr/>
+            </a:pPr>
+            <a:r>
+              <a:rPr lang="en-US" sz="2400" dirty="0">
+                <a:ea typeface="+mn-ea"/>
+              </a:rPr>
+              <a:t>Name the Calculated Field “Mortality Rate (%)”</a:t>
+            </a:r>
+          </a:p>
+          <a:p>
+            <a:pPr marL="457200" indent="-457200" defTabSz="1306221" fontAlgn="auto">
+              <a:buFont typeface="+mj-lt"/>
+              <a:buAutoNum type="arabicPeriod"/>
+              <a:defRPr/>
+            </a:pPr>
+            <a:r>
+              <a:rPr lang="en-US" sz="2400" dirty="0">
+                <a:ea typeface="+mn-ea"/>
+              </a:rPr>
+              <a:t>Type “[Deaths] / [Births] * 100” as the contents of the Calculated Field</a:t>
+            </a:r>
+          </a:p>
+          <a:p>
+            <a:pPr marL="457200" indent="-457200" defTabSz="1306221" fontAlgn="auto">
+              <a:buFont typeface="+mj-lt"/>
+              <a:buAutoNum type="arabicPeriod"/>
+              <a:defRPr/>
+            </a:pPr>
+            <a:r>
+              <a:rPr lang="en-US" sz="2400" dirty="0">
+                <a:ea typeface="+mn-ea"/>
+              </a:rPr>
+              <a:t>Double click your new Calculated Field “</a:t>
+            </a:r>
+            <a:r>
+              <a:rPr lang="en-US" sz="2400" dirty="0"/>
+              <a:t>Mortality Rate (%)</a:t>
+            </a:r>
+            <a:r>
+              <a:rPr lang="en-US" sz="2400" dirty="0">
+                <a:ea typeface="+mn-ea"/>
+              </a:rPr>
+              <a:t>”</a:t>
+            </a:r>
+          </a:p>
+          <a:p>
+            <a:pPr marL="457200" indent="-457200" defTabSz="1306221" fontAlgn="auto">
+              <a:buFont typeface="+mj-lt"/>
+              <a:buAutoNum type="arabicPeriod"/>
+              <a:defRPr/>
+            </a:pPr>
+            <a:r>
+              <a:rPr lang="en-US" sz="2400" dirty="0">
+                <a:ea typeface="+mn-ea"/>
+              </a:rPr>
+              <a:t>Right click “SUM(Rate (%))” &gt; “Measure” &gt; “Average”</a:t>
+            </a:r>
+          </a:p>
+          <a:p>
+            <a:pPr marL="457200" indent="-457200" defTabSz="1306221" fontAlgn="auto">
+              <a:buFont typeface="+mj-lt"/>
+              <a:buAutoNum type="arabicPeriod"/>
+              <a:defRPr/>
+            </a:pPr>
+            <a:r>
+              <a:rPr lang="en-US" sz="2400" dirty="0">
+                <a:ea typeface="+mn-ea"/>
+              </a:rPr>
+              <a:t>Double click “Date”</a:t>
+            </a:r>
+          </a:p>
+          <a:p>
+            <a:pPr marL="457200" indent="-457200" defTabSz="1306221" fontAlgn="auto">
+              <a:buFont typeface="+mj-lt"/>
+              <a:buAutoNum type="arabicPeriod"/>
+              <a:defRPr/>
+            </a:pPr>
+            <a:r>
+              <a:rPr lang="en-US" sz="2400" dirty="0">
+                <a:ea typeface="+mn-ea"/>
+              </a:rPr>
+              <a:t>Switch view to “Entire View”</a:t>
+            </a:r>
+          </a:p>
+          <a:p>
+            <a:pPr marL="457200" indent="-457200" defTabSz="1306221" fontAlgn="auto">
+              <a:buFont typeface="+mj-lt"/>
+              <a:buAutoNum type="arabicPeriod"/>
+              <a:defRPr/>
+            </a:pPr>
+            <a:r>
+              <a:rPr lang="en-US" sz="2400" dirty="0">
+                <a:ea typeface="+mn-ea"/>
+              </a:rPr>
+              <a:t>Right click “YEAR(Date)”</a:t>
+            </a:r>
+          </a:p>
+          <a:p>
+            <a:pPr marL="457200" indent="-457200" defTabSz="1306221" fontAlgn="auto">
+              <a:buFont typeface="+mj-lt"/>
+              <a:buAutoNum type="arabicPeriod"/>
+              <a:defRPr/>
+            </a:pPr>
+            <a:r>
+              <a:rPr lang="en-US" sz="2400" dirty="0">
+                <a:ea typeface="+mn-ea"/>
+              </a:rPr>
+              <a:t>Select “Exact Date”</a:t>
+            </a:r>
+          </a:p>
+          <a:p>
+            <a:pPr marL="457200" indent="-457200" defTabSz="1306221" fontAlgn="auto">
+              <a:buFont typeface="+mj-lt"/>
+              <a:buAutoNum type="arabicPeriod"/>
+              <a:defRPr/>
+            </a:pPr>
+            <a:r>
+              <a:rPr lang="en-US" sz="2400" dirty="0">
+                <a:ea typeface="+mn-ea"/>
+              </a:rPr>
+              <a:t>(notice there is a null row for December 1841)</a:t>
+            </a:r>
+          </a:p>
+          <a:p>
+            <a:pPr marL="457200" indent="-457200" defTabSz="1306221" fontAlgn="auto">
+              <a:buFont typeface="+mj-lt"/>
+              <a:buAutoNum type="arabicPeriod"/>
+              <a:defRPr/>
+            </a:pPr>
+            <a:r>
+              <a:rPr lang="en-US" sz="2400" dirty="0">
+                <a:ea typeface="+mn-ea"/>
+              </a:rPr>
+              <a:t>Click “1 null” &gt; “Filter data” from the bottom right</a:t>
+            </a:r>
+          </a:p>
+          <a:p>
+            <a:pPr marL="457200" indent="-457200" defTabSz="1306221" fontAlgn="auto">
+              <a:buFont typeface="+mj-lt"/>
+              <a:buAutoNum type="arabicPeriod"/>
+              <a:defRPr/>
+            </a:pPr>
+            <a:endParaRPr lang="en-US" sz="2400" dirty="0">
+              <a:ea typeface="+mn-ea"/>
+            </a:endParaRPr>
+          </a:p>
+        </p:txBody>
+      </p:sp>
+      <p:sp>
+        <p:nvSpPr>
+          <p:cNvPr id="3" name="Text Placeholder 2"/>
+          <p:cNvSpPr>
+            <a:spLocks noGrp="1"/>
+          </p:cNvSpPr>
+          <p:nvPr>
+            <p:ph type="body" sz="quarter" idx="12"/>
+          </p:nvPr>
+        </p:nvSpPr>
+        <p:spPr>
+          <a:prstGeom prst="rect">
+            <a:avLst/>
+          </a:prstGeom>
+        </p:spPr>
+        <p:txBody>
+          <a:bodyPr/>
+          <a:lstStyle/>
+          <a:p>
+            <a:pPr>
+              <a:spcBef>
+                <a:spcPct val="0"/>
+              </a:spcBef>
+            </a:pPr>
+            <a:r>
+              <a:rPr lang="en-US" b="1" dirty="0">
+                <a:latin typeface="BentonSans Book" charset="0"/>
+              </a:rPr>
+              <a:t>Germ Theory of Disease</a:t>
+            </a:r>
+          </a:p>
+        </p:txBody>
+      </p:sp>
+    </p:spTree>
+    <p:extLst>
+      <p:ext uri="{BB962C8B-B14F-4D97-AF65-F5344CB8AC3E}">
+        <p14:creationId xmlns:p14="http://schemas.microsoft.com/office/powerpoint/2010/main" val="1256773149"/>
+      </p:ext>
+    </p:extLst>
+  </p:cSld>
+  <p:clrMapOvr>
+    <a:masterClrMapping/>
+  </p:clrMapOvr>
+  <p:transition spd="slow">
+    <p:cover/>
+  </p:transition>
+  <p:timing>
+    <p:tnLst>
+      <p:par>
+        <p:cTn id="1" dur="indefinite" restart="never" nodeType="tmRoot">
+          <p:childTnLst>
+            <p:seq concurrent="1" nextAc="seek">
+              <p:cTn id="2" dur="indefinite" nodeType="mainSeq">
+                <p:childTnLst>
+                  <p:par>
+                    <p:cTn id="3" fill="hold">
+                      <p:stCondLst>
+                        <p:cond delay="indefinite"/>
+                      </p:stCondLst>
+                      <p:childTnLst>
+                        <p:par>
+                          <p:cTn id="4" fill="hold">
+                            <p:stCondLst>
+                              <p:cond delay="0"/>
+                            </p:stCondLst>
+                            <p:childTnLst>
+                              <p:par>
+                                <p:cTn id="5" presetID="10" presetClass="entr" presetSubtype="0" fill="hold" grpId="0" nodeType="clickEffect">
+                                  <p:stCondLst>
+                                    <p:cond delay="0"/>
+                                  </p:stCondLst>
+                                  <p:childTnLst>
+                                    <p:set>
+                                      <p:cBhvr>
+                                        <p:cTn id="6" dur="1" fill="hold">
+                                          <p:stCondLst>
+                                            <p:cond delay="0"/>
+                                          </p:stCondLst>
+                                        </p:cTn>
+                                        <p:tgtEl>
+                                          <p:spTgt spid="2">
+                                            <p:txEl>
+                                              <p:pRg st="0" end="0"/>
+                                            </p:txEl>
+                                          </p:spTgt>
+                                        </p:tgtEl>
+                                        <p:attrNameLst>
+                                          <p:attrName>style.visibility</p:attrName>
+                                        </p:attrNameLst>
+                                      </p:cBhvr>
+                                      <p:to>
+                                        <p:strVal val="visible"/>
+                                      </p:to>
+                                    </p:set>
+                                    <p:animEffect transition="in" filter="fade">
+                                      <p:cBhvr>
+                                        <p:cTn id="7" dur="500"/>
+                                        <p:tgtEl>
+                                          <p:spTgt spid="2">
+                                            <p:txEl>
+                                              <p:pRg st="0" end="0"/>
+                                            </p:txEl>
+                                          </p:spTgt>
+                                        </p:tgtEl>
+                                      </p:cBhvr>
+                                    </p:animEffect>
+                                  </p:childTnLst>
+                                </p:cTn>
+                              </p:par>
+                            </p:childTnLst>
+                          </p:cTn>
+                        </p:par>
+                      </p:childTnLst>
+                    </p:cTn>
+                  </p:par>
+                  <p:par>
+                    <p:cTn id="8" fill="hold">
+                      <p:stCondLst>
+                        <p:cond delay="indefinite"/>
+                      </p:stCondLst>
+                      <p:childTnLst>
+                        <p:par>
+                          <p:cTn id="9" fill="hold">
+                            <p:stCondLst>
+                              <p:cond delay="0"/>
+                            </p:stCondLst>
+                            <p:childTnLst>
+                              <p:par>
+                                <p:cTn id="10" presetID="10" presetClass="entr" presetSubtype="0" fill="hold" grpId="0" nodeType="clickEffect">
+                                  <p:stCondLst>
+                                    <p:cond delay="0"/>
+                                  </p:stCondLst>
+                                  <p:childTnLst>
+                                    <p:set>
+                                      <p:cBhvr>
+                                        <p:cTn id="11" dur="1" fill="hold">
+                                          <p:stCondLst>
+                                            <p:cond delay="0"/>
+                                          </p:stCondLst>
+                                        </p:cTn>
+                                        <p:tgtEl>
+                                          <p:spTgt spid="2">
+                                            <p:txEl>
+                                              <p:pRg st="1" end="1"/>
+                                            </p:txEl>
+                                          </p:spTgt>
+                                        </p:tgtEl>
+                                        <p:attrNameLst>
+                                          <p:attrName>style.visibility</p:attrName>
+                                        </p:attrNameLst>
+                                      </p:cBhvr>
+                                      <p:to>
+                                        <p:strVal val="visible"/>
+                                      </p:to>
+                                    </p:set>
+                                    <p:animEffect transition="in" filter="fade">
+                                      <p:cBhvr>
+                                        <p:cTn id="12" dur="500"/>
+                                        <p:tgtEl>
+                                          <p:spTgt spid="2">
+                                            <p:txEl>
+                                              <p:pRg st="1" end="1"/>
+                                            </p:txEl>
+                                          </p:spTgt>
+                                        </p:tgtEl>
+                                      </p:cBhvr>
+                                    </p:animEffect>
+                                  </p:childTnLst>
+                                </p:cTn>
+                              </p:par>
+                            </p:childTnLst>
+                          </p:cTn>
+                        </p:par>
+                      </p:childTnLst>
+                    </p:cTn>
+                  </p:par>
+                  <p:par>
+                    <p:cTn id="13" fill="hold">
+                      <p:stCondLst>
+                        <p:cond delay="indefinite"/>
+                      </p:stCondLst>
+                      <p:childTnLst>
+                        <p:par>
+                          <p:cTn id="14" fill="hold">
+                            <p:stCondLst>
+                              <p:cond delay="0"/>
+                            </p:stCondLst>
+                            <p:childTnLst>
+                              <p:par>
+                                <p:cTn id="15" presetID="10" presetClass="entr" presetSubtype="0" fill="hold" grpId="0" nodeType="clickEffect">
+                                  <p:stCondLst>
+                                    <p:cond delay="0"/>
+                                  </p:stCondLst>
+                                  <p:childTnLst>
+                                    <p:set>
+                                      <p:cBhvr>
+                                        <p:cTn id="16" dur="1" fill="hold">
+                                          <p:stCondLst>
+                                            <p:cond delay="0"/>
+                                          </p:stCondLst>
+                                        </p:cTn>
+                                        <p:tgtEl>
+                                          <p:spTgt spid="2">
+                                            <p:txEl>
+                                              <p:pRg st="2" end="2"/>
+                                            </p:txEl>
+                                          </p:spTgt>
+                                        </p:tgtEl>
+                                        <p:attrNameLst>
+                                          <p:attrName>style.visibility</p:attrName>
+                                        </p:attrNameLst>
+                                      </p:cBhvr>
+                                      <p:to>
+                                        <p:strVal val="visible"/>
+                                      </p:to>
+                                    </p:set>
+                                    <p:animEffect transition="in" filter="fade">
+                                      <p:cBhvr>
+                                        <p:cTn id="17" dur="500"/>
+                                        <p:tgtEl>
+                                          <p:spTgt spid="2">
+                                            <p:txEl>
+                                              <p:pRg st="2" end="2"/>
+                                            </p:txEl>
+                                          </p:spTgt>
+                                        </p:tgtEl>
+                                      </p:cBhvr>
+                                    </p:animEffect>
+                                  </p:childTnLst>
+                                </p:cTn>
+                              </p:par>
+                            </p:childTnLst>
+                          </p:cTn>
+                        </p:par>
+                      </p:childTnLst>
+                    </p:cTn>
+                  </p:par>
+                  <p:par>
+                    <p:cTn id="18" fill="hold">
+                      <p:stCondLst>
+                        <p:cond delay="indefinite"/>
+                      </p:stCondLst>
+                      <p:childTnLst>
+                        <p:par>
+                          <p:cTn id="19" fill="hold">
+                            <p:stCondLst>
+                              <p:cond delay="0"/>
+                            </p:stCondLst>
+                            <p:childTnLst>
+                              <p:par>
+                                <p:cTn id="20" presetID="10" presetClass="entr" presetSubtype="0" fill="hold" grpId="0" nodeType="clickEffect">
+                                  <p:stCondLst>
+                                    <p:cond delay="0"/>
+                                  </p:stCondLst>
+                                  <p:childTnLst>
+                                    <p:set>
+                                      <p:cBhvr>
+                                        <p:cTn id="21" dur="1" fill="hold">
+                                          <p:stCondLst>
+                                            <p:cond delay="0"/>
+                                          </p:stCondLst>
+                                        </p:cTn>
+                                        <p:tgtEl>
+                                          <p:spTgt spid="2">
+                                            <p:txEl>
+                                              <p:pRg st="3" end="3"/>
+                                            </p:txEl>
+                                          </p:spTgt>
+                                        </p:tgtEl>
+                                        <p:attrNameLst>
+                                          <p:attrName>style.visibility</p:attrName>
+                                        </p:attrNameLst>
+                                      </p:cBhvr>
+                                      <p:to>
+                                        <p:strVal val="visible"/>
+                                      </p:to>
+                                    </p:set>
+                                    <p:animEffect transition="in" filter="fade">
+                                      <p:cBhvr>
+                                        <p:cTn id="22" dur="500"/>
+                                        <p:tgtEl>
+                                          <p:spTgt spid="2">
+                                            <p:txEl>
+                                              <p:pRg st="3" end="3"/>
+                                            </p:txEl>
+                                          </p:spTgt>
+                                        </p:tgtEl>
+                                      </p:cBhvr>
+                                    </p:animEffect>
+                                  </p:childTnLst>
+                                </p:cTn>
+                              </p:par>
+                            </p:childTnLst>
+                          </p:cTn>
+                        </p:par>
+                      </p:childTnLst>
+                    </p:cTn>
+                  </p:par>
+                  <p:par>
+                    <p:cTn id="23" fill="hold">
+                      <p:stCondLst>
+                        <p:cond delay="indefinite"/>
+                      </p:stCondLst>
+                      <p:childTnLst>
+                        <p:par>
+                          <p:cTn id="24" fill="hold">
+                            <p:stCondLst>
+                              <p:cond delay="0"/>
+                            </p:stCondLst>
+                            <p:childTnLst>
+                              <p:par>
+                                <p:cTn id="25" presetID="10" presetClass="entr" presetSubtype="0" fill="hold" grpId="0" nodeType="clickEffect">
+                                  <p:stCondLst>
+                                    <p:cond delay="0"/>
+                                  </p:stCondLst>
+                                  <p:childTnLst>
+                                    <p:set>
+                                      <p:cBhvr>
+                                        <p:cTn id="26" dur="1" fill="hold">
+                                          <p:stCondLst>
+                                            <p:cond delay="0"/>
+                                          </p:stCondLst>
+                                        </p:cTn>
+                                        <p:tgtEl>
+                                          <p:spTgt spid="2">
+                                            <p:txEl>
+                                              <p:pRg st="4" end="4"/>
+                                            </p:txEl>
+                                          </p:spTgt>
+                                        </p:tgtEl>
+                                        <p:attrNameLst>
+                                          <p:attrName>style.visibility</p:attrName>
+                                        </p:attrNameLst>
+                                      </p:cBhvr>
+                                      <p:to>
+                                        <p:strVal val="visible"/>
+                                      </p:to>
+                                    </p:set>
+                                    <p:animEffect transition="in" filter="fade">
+                                      <p:cBhvr>
+                                        <p:cTn id="27" dur="500"/>
+                                        <p:tgtEl>
+                                          <p:spTgt spid="2">
+                                            <p:txEl>
+                                              <p:pRg st="4" end="4"/>
+                                            </p:txEl>
+                                          </p:spTgt>
+                                        </p:tgtEl>
+                                      </p:cBhvr>
+                                    </p:animEffect>
+                                  </p:childTnLst>
+                                </p:cTn>
+                              </p:par>
+                            </p:childTnLst>
+                          </p:cTn>
+                        </p:par>
+                      </p:childTnLst>
+                    </p:cTn>
+                  </p:par>
+                  <p:par>
+                    <p:cTn id="28" fill="hold">
+                      <p:stCondLst>
+                        <p:cond delay="indefinite"/>
+                      </p:stCondLst>
+                      <p:childTnLst>
+                        <p:par>
+                          <p:cTn id="29" fill="hold">
+                            <p:stCondLst>
+                              <p:cond delay="0"/>
+                            </p:stCondLst>
+                            <p:childTnLst>
+                              <p:par>
+                                <p:cTn id="30" presetID="10" presetClass="entr" presetSubtype="0" fill="hold" grpId="0" nodeType="clickEffect">
+                                  <p:stCondLst>
+                                    <p:cond delay="0"/>
+                                  </p:stCondLst>
+                                  <p:childTnLst>
+                                    <p:set>
+                                      <p:cBhvr>
+                                        <p:cTn id="31" dur="1" fill="hold">
+                                          <p:stCondLst>
+                                            <p:cond delay="0"/>
+                                          </p:stCondLst>
+                                        </p:cTn>
+                                        <p:tgtEl>
+                                          <p:spTgt spid="2">
+                                            <p:txEl>
+                                              <p:pRg st="5" end="5"/>
+                                            </p:txEl>
+                                          </p:spTgt>
+                                        </p:tgtEl>
+                                        <p:attrNameLst>
+                                          <p:attrName>style.visibility</p:attrName>
+                                        </p:attrNameLst>
+                                      </p:cBhvr>
+                                      <p:to>
+                                        <p:strVal val="visible"/>
+                                      </p:to>
+                                    </p:set>
+                                    <p:animEffect transition="in" filter="fade">
+                                      <p:cBhvr>
+                                        <p:cTn id="32" dur="500"/>
+                                        <p:tgtEl>
+                                          <p:spTgt spid="2">
+                                            <p:txEl>
+                                              <p:pRg st="5" end="5"/>
+                                            </p:txEl>
+                                          </p:spTgt>
+                                        </p:tgtEl>
+                                      </p:cBhvr>
+                                    </p:animEffect>
+                                  </p:childTnLst>
+                                </p:cTn>
+                              </p:par>
+                            </p:childTnLst>
+                          </p:cTn>
+                        </p:par>
+                      </p:childTnLst>
+                    </p:cTn>
+                  </p:par>
+                  <p:par>
+                    <p:cTn id="33" fill="hold">
+                      <p:stCondLst>
+                        <p:cond delay="indefinite"/>
+                      </p:stCondLst>
+                      <p:childTnLst>
+                        <p:par>
+                          <p:cTn id="34" fill="hold">
+                            <p:stCondLst>
+                              <p:cond delay="0"/>
+                            </p:stCondLst>
+                            <p:childTnLst>
+                              <p:par>
+                                <p:cTn id="35" presetID="10" presetClass="entr" presetSubtype="0" fill="hold" grpId="0" nodeType="clickEffect">
+                                  <p:stCondLst>
+                                    <p:cond delay="0"/>
+                                  </p:stCondLst>
+                                  <p:childTnLst>
+                                    <p:set>
+                                      <p:cBhvr>
+                                        <p:cTn id="36" dur="1" fill="hold">
+                                          <p:stCondLst>
+                                            <p:cond delay="0"/>
+                                          </p:stCondLst>
+                                        </p:cTn>
+                                        <p:tgtEl>
+                                          <p:spTgt spid="2">
+                                            <p:txEl>
+                                              <p:pRg st="6" end="6"/>
+                                            </p:txEl>
+                                          </p:spTgt>
+                                        </p:tgtEl>
+                                        <p:attrNameLst>
+                                          <p:attrName>style.visibility</p:attrName>
+                                        </p:attrNameLst>
+                                      </p:cBhvr>
+                                      <p:to>
+                                        <p:strVal val="visible"/>
+                                      </p:to>
+                                    </p:set>
+                                    <p:animEffect transition="in" filter="fade">
+                                      <p:cBhvr>
+                                        <p:cTn id="37" dur="500"/>
+                                        <p:tgtEl>
+                                          <p:spTgt spid="2">
+                                            <p:txEl>
+                                              <p:pRg st="6" end="6"/>
+                                            </p:txEl>
+                                          </p:spTgt>
+                                        </p:tgtEl>
+                                      </p:cBhvr>
+                                    </p:animEffect>
+                                  </p:childTnLst>
+                                </p:cTn>
+                              </p:par>
+                            </p:childTnLst>
+                          </p:cTn>
+                        </p:par>
+                      </p:childTnLst>
+                    </p:cTn>
+                  </p:par>
+                  <p:par>
+                    <p:cTn id="38" fill="hold">
+                      <p:stCondLst>
+                        <p:cond delay="indefinite"/>
+                      </p:stCondLst>
+                      <p:childTnLst>
+                        <p:par>
+                          <p:cTn id="39" fill="hold">
+                            <p:stCondLst>
+                              <p:cond delay="0"/>
+                            </p:stCondLst>
+                            <p:childTnLst>
+                              <p:par>
+                                <p:cTn id="40" presetID="10" presetClass="entr" presetSubtype="0" fill="hold" grpId="0" nodeType="clickEffect">
+                                  <p:stCondLst>
+                                    <p:cond delay="0"/>
+                                  </p:stCondLst>
+                                  <p:childTnLst>
+                                    <p:set>
+                                      <p:cBhvr>
+                                        <p:cTn id="41" dur="1" fill="hold">
+                                          <p:stCondLst>
+                                            <p:cond delay="0"/>
+                                          </p:stCondLst>
+                                        </p:cTn>
+                                        <p:tgtEl>
+                                          <p:spTgt spid="2">
+                                            <p:txEl>
+                                              <p:pRg st="7" end="7"/>
+                                            </p:txEl>
+                                          </p:spTgt>
+                                        </p:tgtEl>
+                                        <p:attrNameLst>
+                                          <p:attrName>style.visibility</p:attrName>
+                                        </p:attrNameLst>
+                                      </p:cBhvr>
+                                      <p:to>
+                                        <p:strVal val="visible"/>
+                                      </p:to>
+                                    </p:set>
+                                    <p:animEffect transition="in" filter="fade">
+                                      <p:cBhvr>
+                                        <p:cTn id="42" dur="500"/>
+                                        <p:tgtEl>
+                                          <p:spTgt spid="2">
+                                            <p:txEl>
+                                              <p:pRg st="7" end="7"/>
+                                            </p:txEl>
+                                          </p:spTgt>
+                                        </p:tgtEl>
+                                      </p:cBhvr>
+                                    </p:animEffect>
+                                  </p:childTnLst>
+                                </p:cTn>
+                              </p:par>
+                            </p:childTnLst>
+                          </p:cTn>
+                        </p:par>
+                      </p:childTnLst>
+                    </p:cTn>
+                  </p:par>
+                  <p:par>
+                    <p:cTn id="43" fill="hold">
+                      <p:stCondLst>
+                        <p:cond delay="indefinite"/>
+                      </p:stCondLst>
+                      <p:childTnLst>
+                        <p:par>
+                          <p:cTn id="44" fill="hold">
+                            <p:stCondLst>
+                              <p:cond delay="0"/>
+                            </p:stCondLst>
+                            <p:childTnLst>
+                              <p:par>
+                                <p:cTn id="45" presetID="10" presetClass="entr" presetSubtype="0" fill="hold" grpId="0" nodeType="clickEffect">
+                                  <p:stCondLst>
+                                    <p:cond delay="0"/>
+                                  </p:stCondLst>
+                                  <p:childTnLst>
+                                    <p:set>
+                                      <p:cBhvr>
+                                        <p:cTn id="46" dur="1" fill="hold">
+                                          <p:stCondLst>
+                                            <p:cond delay="0"/>
+                                          </p:stCondLst>
+                                        </p:cTn>
+                                        <p:tgtEl>
+                                          <p:spTgt spid="2">
+                                            <p:txEl>
+                                              <p:pRg st="8" end="8"/>
+                                            </p:txEl>
+                                          </p:spTgt>
+                                        </p:tgtEl>
+                                        <p:attrNameLst>
+                                          <p:attrName>style.visibility</p:attrName>
+                                        </p:attrNameLst>
+                                      </p:cBhvr>
+                                      <p:to>
+                                        <p:strVal val="visible"/>
+                                      </p:to>
+                                    </p:set>
+                                    <p:animEffect transition="in" filter="fade">
+                                      <p:cBhvr>
+                                        <p:cTn id="47" dur="500"/>
+                                        <p:tgtEl>
+                                          <p:spTgt spid="2">
+                                            <p:txEl>
+                                              <p:pRg st="8" end="8"/>
+                                            </p:txEl>
+                                          </p:spTgt>
+                                        </p:tgtEl>
+                                      </p:cBhvr>
+                                    </p:animEffect>
+                                  </p:childTnLst>
+                                </p:cTn>
+                              </p:par>
+                            </p:childTnLst>
+                          </p:cTn>
+                        </p:par>
+                      </p:childTnLst>
+                    </p:cTn>
+                  </p:par>
+                  <p:par>
+                    <p:cTn id="48" fill="hold">
+                      <p:stCondLst>
+                        <p:cond delay="indefinite"/>
+                      </p:stCondLst>
+                      <p:childTnLst>
+                        <p:par>
+                          <p:cTn id="49" fill="hold">
+                            <p:stCondLst>
+                              <p:cond delay="0"/>
+                            </p:stCondLst>
+                            <p:childTnLst>
+                              <p:par>
+                                <p:cTn id="50" presetID="10" presetClass="entr" presetSubtype="0" fill="hold" grpId="0" nodeType="clickEffect">
+                                  <p:stCondLst>
+                                    <p:cond delay="0"/>
+                                  </p:stCondLst>
+                                  <p:childTnLst>
+                                    <p:set>
+                                      <p:cBhvr>
+                                        <p:cTn id="51" dur="1" fill="hold">
+                                          <p:stCondLst>
+                                            <p:cond delay="0"/>
+                                          </p:stCondLst>
+                                        </p:cTn>
+                                        <p:tgtEl>
+                                          <p:spTgt spid="2">
+                                            <p:txEl>
+                                              <p:pRg st="9" end="9"/>
+                                            </p:txEl>
+                                          </p:spTgt>
+                                        </p:tgtEl>
+                                        <p:attrNameLst>
+                                          <p:attrName>style.visibility</p:attrName>
+                                        </p:attrNameLst>
+                                      </p:cBhvr>
+                                      <p:to>
+                                        <p:strVal val="visible"/>
+                                      </p:to>
+                                    </p:set>
+                                    <p:animEffect transition="in" filter="fade">
+                                      <p:cBhvr>
+                                        <p:cTn id="52" dur="500"/>
+                                        <p:tgtEl>
+                                          <p:spTgt spid="2">
+                                            <p:txEl>
+                                              <p:pRg st="9" end="9"/>
+                                            </p:txEl>
+                                          </p:spTgt>
+                                        </p:tgtEl>
+                                      </p:cBhvr>
+                                    </p:animEffect>
+                                  </p:childTnLst>
+                                </p:cTn>
+                              </p:par>
+                            </p:childTnLst>
+                          </p:cTn>
+                        </p:par>
+                      </p:childTnLst>
+                    </p:cTn>
+                  </p:par>
+                  <p:par>
+                    <p:cTn id="53" fill="hold">
+                      <p:stCondLst>
+                        <p:cond delay="indefinite"/>
+                      </p:stCondLst>
+                      <p:childTnLst>
+                        <p:par>
+                          <p:cTn id="54" fill="hold">
+                            <p:stCondLst>
+                              <p:cond delay="0"/>
+                            </p:stCondLst>
+                            <p:childTnLst>
+                              <p:par>
+                                <p:cTn id="55" presetID="10" presetClass="entr" presetSubtype="0" fill="hold" grpId="0" nodeType="clickEffect">
+                                  <p:stCondLst>
+                                    <p:cond delay="0"/>
+                                  </p:stCondLst>
+                                  <p:childTnLst>
+                                    <p:set>
+                                      <p:cBhvr>
+                                        <p:cTn id="56" dur="1" fill="hold">
+                                          <p:stCondLst>
+                                            <p:cond delay="0"/>
+                                          </p:stCondLst>
+                                        </p:cTn>
+                                        <p:tgtEl>
+                                          <p:spTgt spid="2">
+                                            <p:txEl>
+                                              <p:pRg st="10" end="10"/>
+                                            </p:txEl>
+                                          </p:spTgt>
+                                        </p:tgtEl>
+                                        <p:attrNameLst>
+                                          <p:attrName>style.visibility</p:attrName>
+                                        </p:attrNameLst>
+                                      </p:cBhvr>
+                                      <p:to>
+                                        <p:strVal val="visible"/>
+                                      </p:to>
+                                    </p:set>
+                                    <p:animEffect transition="in" filter="fade">
+                                      <p:cBhvr>
+                                        <p:cTn id="57" dur="500"/>
+                                        <p:tgtEl>
+                                          <p:spTgt spid="2">
+                                            <p:txEl>
+                                              <p:pRg st="10" end="10"/>
+                                            </p:txEl>
+                                          </p:spTgt>
+                                        </p:tgtEl>
+                                      </p:cBhvr>
+                                    </p:animEffect>
+                                  </p:childTnLst>
+                                </p:cTn>
+                              </p:par>
+                            </p:childTnLst>
+                          </p:cTn>
+                        </p:par>
+                      </p:childTnLst>
+                    </p:cTn>
+                  </p:par>
+                  <p:par>
+                    <p:cTn id="58" fill="hold">
+                      <p:stCondLst>
+                        <p:cond delay="indefinite"/>
+                      </p:stCondLst>
+                      <p:childTnLst>
+                        <p:par>
+                          <p:cTn id="59" fill="hold">
+                            <p:stCondLst>
+                              <p:cond delay="0"/>
+                            </p:stCondLst>
+                            <p:childTnLst>
+                              <p:par>
+                                <p:cTn id="60" presetID="10" presetClass="entr" presetSubtype="0" fill="hold" grpId="0" nodeType="clickEffect">
+                                  <p:stCondLst>
+                                    <p:cond delay="0"/>
+                                  </p:stCondLst>
+                                  <p:childTnLst>
+                                    <p:set>
+                                      <p:cBhvr>
+                                        <p:cTn id="61" dur="1" fill="hold">
+                                          <p:stCondLst>
+                                            <p:cond delay="0"/>
+                                          </p:stCondLst>
+                                        </p:cTn>
+                                        <p:tgtEl>
+                                          <p:spTgt spid="2">
+                                            <p:txEl>
+                                              <p:pRg st="11" end="11"/>
+                                            </p:txEl>
+                                          </p:spTgt>
+                                        </p:tgtEl>
+                                        <p:attrNameLst>
+                                          <p:attrName>style.visibility</p:attrName>
+                                        </p:attrNameLst>
+                                      </p:cBhvr>
+                                      <p:to>
+                                        <p:strVal val="visible"/>
+                                      </p:to>
+                                    </p:set>
+                                    <p:animEffect transition="in" filter="fade">
+                                      <p:cBhvr>
+                                        <p:cTn id="62" dur="500"/>
+                                        <p:tgtEl>
+                                          <p:spTgt spid="2">
+                                            <p:txEl>
+                                              <p:pRg st="11" end="11"/>
+                                            </p:txEl>
+                                          </p:spTgt>
+                                        </p:tgtEl>
+                                      </p:cBhvr>
+                                    </p:animEffect>
+                                  </p:childTnLst>
+                                </p:cTn>
+                              </p:par>
+                            </p:childTnLst>
+                          </p:cTn>
+                        </p:par>
+                      </p:childTnLst>
+                    </p:cTn>
+                  </p:par>
+                </p:childTnLst>
+              </p:cTn>
+              <p:prevCondLst>
+                <p:cond evt="onPrev" delay="0">
+                  <p:tgtEl>
+                    <p:sldTgt/>
+                  </p:tgtEl>
+                </p:cond>
+              </p:prevCondLst>
+              <p:nextCondLst>
+                <p:cond evt="onNext" delay="0">
+                  <p:tgtEl>
+                    <p:sldTgt/>
+                  </p:tgtEl>
+                </p:cond>
+              </p:nextCondLst>
+            </p:seq>
+          </p:childTnLst>
+        </p:cTn>
+      </p:par>
+    </p:tnLst>
+    <p:bldLst>
+      <p:bldP spid="2" grpId="0" uiExpand="1" build="p"/>
+    </p:bldLst>
+  </p:timing>
+</p:sld>
+</file>
+
+<file path=ppt/slides/slide33.xml><?xml version="1.0" encoding="utf-8"?>
+<p:sld xmlns:a="http://schemas.openxmlformats.org/drawingml/2006/main" xmlns:r="http://schemas.openxmlformats.org/officeDocument/2006/relationships" xmlns:p="http://schemas.openxmlformats.org/presentationml/2006/main">
+  <p:cSld>
+    <p:spTree>
+      <p:nvGrpSpPr>
+        <p:cNvPr id="1" name=""/>
+        <p:cNvGrpSpPr/>
+        <p:nvPr/>
+      </p:nvGrpSpPr>
+      <p:grpSpPr>
+        <a:xfrm>
+          <a:off x="0" y="0"/>
+          <a:ext cx="0" cy="0"/>
+          <a:chOff x="0" y="0"/>
+          <a:chExt cx="0" cy="0"/>
+        </a:xfrm>
+      </p:grpSpPr>
+      <p:sp>
+        <p:nvSpPr>
+          <p:cNvPr id="2" name="Content Placeholder 1"/>
+          <p:cNvSpPr>
+            <a:spLocks noGrp="1"/>
+          </p:cNvSpPr>
+          <p:nvPr>
+            <p:ph idx="14"/>
+          </p:nvPr>
+        </p:nvSpPr>
+        <p:spPr>
+          <a:xfrm>
+            <a:off x="704476" y="1893515"/>
+            <a:ext cx="13273820" cy="5724644"/>
+          </a:xfrm>
+        </p:spPr>
+        <p:txBody>
+          <a:bodyPr/>
+          <a:lstStyle/>
+          <a:p>
+            <a:pPr marL="457200" indent="-457200" defTabSz="1306221" fontAlgn="auto">
+              <a:buFont typeface="+mj-lt"/>
+              <a:buAutoNum type="arabicPeriod"/>
+              <a:defRPr/>
+            </a:pPr>
+            <a:r>
+              <a:rPr lang="en-US" sz="2400" dirty="0">
+                <a:ea typeface="+mn-ea"/>
+              </a:rPr>
+              <a:t>Select “Show Me” from the top right</a:t>
+            </a:r>
+          </a:p>
+          <a:p>
+            <a:pPr marL="457200" indent="-457200" defTabSz="1306221" fontAlgn="auto">
+              <a:buFont typeface="+mj-lt"/>
+              <a:buAutoNum type="arabicPeriod"/>
+              <a:defRPr/>
+            </a:pPr>
+            <a:r>
+              <a:rPr lang="en-US" sz="2400" dirty="0">
+                <a:ea typeface="+mn-ea"/>
+              </a:rPr>
+              <a:t>Select “area chart”</a:t>
+            </a:r>
+          </a:p>
+          <a:p>
+            <a:pPr marL="457200" indent="-457200" defTabSz="1306221" fontAlgn="auto">
+              <a:buFont typeface="+mj-lt"/>
+              <a:buAutoNum type="arabicPeriod"/>
+              <a:defRPr/>
+            </a:pPr>
+            <a:r>
+              <a:rPr lang="en-US" sz="2400" dirty="0">
+                <a:ea typeface="+mn-ea"/>
+              </a:rPr>
+              <a:t>(notice the date was automatically switched to “YEAR(Date)”)</a:t>
+            </a:r>
+          </a:p>
+          <a:p>
+            <a:pPr marL="457200" indent="-457200" defTabSz="1306221" fontAlgn="auto">
+              <a:buFont typeface="+mj-lt"/>
+              <a:buAutoNum type="arabicPeriod"/>
+              <a:defRPr/>
+            </a:pPr>
+            <a:r>
+              <a:rPr lang="en-US" sz="2400" dirty="0">
+                <a:ea typeface="+mn-ea"/>
+              </a:rPr>
+              <a:t>Click the “+” on the left side of the “YEAR(Date)” pill twice to get it to “MONTH(Date)” again</a:t>
+            </a:r>
+          </a:p>
+          <a:p>
+            <a:pPr marL="457200" indent="-457200" defTabSz="1306221" fontAlgn="auto">
+              <a:buFont typeface="+mj-lt"/>
+              <a:buAutoNum type="arabicPeriod"/>
+              <a:defRPr/>
+            </a:pPr>
+            <a:r>
+              <a:rPr lang="en-US" sz="2400" dirty="0">
+                <a:ea typeface="+mn-ea"/>
+              </a:rPr>
+              <a:t>(NOTE: alternatively instead of steps 1-4 we could change the mark type to “Area”)</a:t>
+            </a:r>
+          </a:p>
+          <a:p>
+            <a:pPr marL="457200" indent="-457200" defTabSz="1306221" fontAlgn="auto">
+              <a:buFont typeface="+mj-lt"/>
+              <a:buAutoNum type="arabicPeriod"/>
+              <a:defRPr/>
+            </a:pPr>
+            <a:r>
+              <a:rPr lang="en-US" sz="2400" dirty="0">
+                <a:ea typeface="+mn-ea"/>
+              </a:rPr>
+              <a:t>Double click the sheet tab (“Sheet 1”) and rename to “Mortality Rate over Time”</a:t>
+            </a:r>
+          </a:p>
+          <a:p>
+            <a:pPr marL="457200" indent="-457200" defTabSz="1306221" fontAlgn="auto">
+              <a:buFont typeface="+mj-lt"/>
+              <a:buAutoNum type="arabicPeriod"/>
+              <a:defRPr/>
+            </a:pPr>
+            <a:r>
+              <a:rPr lang="en-US" sz="2400" dirty="0">
+                <a:ea typeface="+mn-ea"/>
+              </a:rPr>
+              <a:t>Right click “Mortality Rate over Time” and select “Duplicate”</a:t>
+            </a:r>
+          </a:p>
+          <a:p>
+            <a:pPr marL="457200" indent="-457200" defTabSz="1306221" fontAlgn="auto">
+              <a:buFont typeface="+mj-lt"/>
+              <a:buAutoNum type="arabicPeriod"/>
+              <a:defRPr/>
+            </a:pPr>
+            <a:r>
+              <a:rPr lang="en-US" sz="2400" dirty="0">
+                <a:ea typeface="+mn-ea"/>
+              </a:rPr>
+              <a:t>Right click “MONTH(Date)” and select “Month”</a:t>
+            </a:r>
+          </a:p>
+          <a:p>
+            <a:pPr marL="457200" indent="-457200" defTabSz="1306221" fontAlgn="auto">
+              <a:buFont typeface="+mj-lt"/>
+              <a:buAutoNum type="arabicPeriod"/>
+              <a:defRPr/>
+            </a:pPr>
+            <a:r>
+              <a:rPr lang="en-US" sz="2400" dirty="0">
+                <a:ea typeface="+mn-ea"/>
+              </a:rPr>
+              <a:t>Go to the “Analytics” pane</a:t>
+            </a:r>
+          </a:p>
+          <a:p>
+            <a:pPr marL="457200" indent="-457200" defTabSz="1306221" fontAlgn="auto">
+              <a:buFont typeface="+mj-lt"/>
+              <a:buAutoNum type="arabicPeriod"/>
+              <a:defRPr/>
+            </a:pPr>
+            <a:r>
+              <a:rPr lang="en-US" sz="2400" dirty="0">
+                <a:ea typeface="+mn-ea"/>
+              </a:rPr>
+              <a:t>Drag out a “Trend Line” onto “Polynomial”</a:t>
+            </a:r>
+          </a:p>
+          <a:p>
+            <a:pPr marL="457200" indent="-457200" defTabSz="1306221" fontAlgn="auto">
+              <a:buFont typeface="+mj-lt"/>
+              <a:buAutoNum type="arabicPeriod"/>
+              <a:defRPr/>
+            </a:pPr>
+            <a:r>
+              <a:rPr lang="en-US" sz="2400" dirty="0">
+                <a:ea typeface="+mn-ea"/>
+              </a:rPr>
+              <a:t>Drag “Date” to “Color”</a:t>
+            </a:r>
+          </a:p>
+          <a:p>
+            <a:pPr marL="457200" indent="-457200" defTabSz="1306221" fontAlgn="auto">
+              <a:buFont typeface="+mj-lt"/>
+              <a:buAutoNum type="arabicPeriod"/>
+              <a:defRPr/>
+            </a:pPr>
+            <a:r>
+              <a:rPr lang="en-US" sz="2400" dirty="0">
+                <a:ea typeface="+mn-ea"/>
+              </a:rPr>
+              <a:t>Rename the sheet</a:t>
+            </a:r>
+          </a:p>
+          <a:p>
+            <a:pPr marL="457200" indent="-457200" defTabSz="1306221" fontAlgn="auto">
+              <a:buFont typeface="+mj-lt"/>
+              <a:buAutoNum type="arabicPeriod"/>
+              <a:defRPr/>
+            </a:pPr>
+            <a:endParaRPr lang="en-US" sz="2400" dirty="0">
+              <a:ea typeface="+mn-ea"/>
+            </a:endParaRPr>
+          </a:p>
+        </p:txBody>
+      </p:sp>
+      <p:sp>
+        <p:nvSpPr>
+          <p:cNvPr id="3" name="Text Placeholder 2"/>
+          <p:cNvSpPr>
+            <a:spLocks noGrp="1"/>
+          </p:cNvSpPr>
+          <p:nvPr>
+            <p:ph type="body" sz="quarter" idx="12"/>
+          </p:nvPr>
+        </p:nvSpPr>
+        <p:spPr>
+          <a:prstGeom prst="rect">
+            <a:avLst/>
+          </a:prstGeom>
+        </p:spPr>
+        <p:txBody>
+          <a:bodyPr/>
+          <a:lstStyle/>
+          <a:p>
+            <a:pPr>
+              <a:spcBef>
+                <a:spcPct val="0"/>
+              </a:spcBef>
+            </a:pPr>
+            <a:r>
+              <a:rPr lang="en-US" b="1" dirty="0">
+                <a:latin typeface="BentonSans Book" charset="0"/>
+              </a:rPr>
+              <a:t>Germ Theory of Disease (continued)</a:t>
+            </a:r>
+          </a:p>
+        </p:txBody>
+      </p:sp>
+    </p:spTree>
+    <p:extLst>
+      <p:ext uri="{BB962C8B-B14F-4D97-AF65-F5344CB8AC3E}">
+        <p14:creationId xmlns:p14="http://schemas.microsoft.com/office/powerpoint/2010/main" val="1829227786"/>
+      </p:ext>
+    </p:extLst>
+  </p:cSld>
+  <p:clrMapOvr>
+    <a:masterClrMapping/>
+  </p:clrMapOvr>
+  <p:transition spd="slow">
+    <p:cover/>
+  </p:transition>
+  <p:timing>
+    <p:tnLst>
+      <p:par>
+        <p:cTn id="1" dur="indefinite" restart="never" nodeType="tmRoot">
+          <p:childTnLst>
+            <p:seq concurrent="1" nextAc="seek">
+              <p:cTn id="2" dur="indefinite" nodeType="mainSeq">
+                <p:childTnLst>
+                  <p:par>
+                    <p:cTn id="3" fill="hold">
+                      <p:stCondLst>
+                        <p:cond delay="indefinite"/>
+                      </p:stCondLst>
+                      <p:childTnLst>
+                        <p:par>
+                          <p:cTn id="4" fill="hold">
+                            <p:stCondLst>
+                              <p:cond delay="0"/>
+                            </p:stCondLst>
+                            <p:childTnLst>
+                              <p:par>
+                                <p:cTn id="5" presetID="10" presetClass="entr" presetSubtype="0" fill="hold" grpId="0" nodeType="clickEffect">
+                                  <p:stCondLst>
+                                    <p:cond delay="0"/>
+                                  </p:stCondLst>
+                                  <p:childTnLst>
+                                    <p:set>
+                                      <p:cBhvr>
+                                        <p:cTn id="6" dur="1" fill="hold">
+                                          <p:stCondLst>
+                                            <p:cond delay="0"/>
+                                          </p:stCondLst>
+                                        </p:cTn>
+                                        <p:tgtEl>
+                                          <p:spTgt spid="2">
+                                            <p:txEl>
+                                              <p:pRg st="0" end="0"/>
+                                            </p:txEl>
+                                          </p:spTgt>
+                                        </p:tgtEl>
+                                        <p:attrNameLst>
+                                          <p:attrName>style.visibility</p:attrName>
+                                        </p:attrNameLst>
+                                      </p:cBhvr>
+                                      <p:to>
+                                        <p:strVal val="visible"/>
+                                      </p:to>
+                                    </p:set>
+                                    <p:animEffect transition="in" filter="fade">
+                                      <p:cBhvr>
+                                        <p:cTn id="7" dur="500"/>
+                                        <p:tgtEl>
+                                          <p:spTgt spid="2">
+                                            <p:txEl>
+                                              <p:pRg st="0" end="0"/>
+                                            </p:txEl>
+                                          </p:spTgt>
+                                        </p:tgtEl>
+                                      </p:cBhvr>
+                                    </p:animEffect>
+                                  </p:childTnLst>
+                                </p:cTn>
+                              </p:par>
+                            </p:childTnLst>
+                          </p:cTn>
+                        </p:par>
+                      </p:childTnLst>
+                    </p:cTn>
+                  </p:par>
+                  <p:par>
+                    <p:cTn id="8" fill="hold">
+                      <p:stCondLst>
+                        <p:cond delay="indefinite"/>
+                      </p:stCondLst>
+                      <p:childTnLst>
+                        <p:par>
+                          <p:cTn id="9" fill="hold">
+                            <p:stCondLst>
+                              <p:cond delay="0"/>
+                            </p:stCondLst>
+                            <p:childTnLst>
+                              <p:par>
+                                <p:cTn id="10" presetID="10" presetClass="entr" presetSubtype="0" fill="hold" grpId="0" nodeType="clickEffect">
+                                  <p:stCondLst>
+                                    <p:cond delay="0"/>
+                                  </p:stCondLst>
+                                  <p:childTnLst>
+                                    <p:set>
+                                      <p:cBhvr>
+                                        <p:cTn id="11" dur="1" fill="hold">
+                                          <p:stCondLst>
+                                            <p:cond delay="0"/>
+                                          </p:stCondLst>
+                                        </p:cTn>
+                                        <p:tgtEl>
+                                          <p:spTgt spid="2">
+                                            <p:txEl>
+                                              <p:pRg st="1" end="1"/>
+                                            </p:txEl>
+                                          </p:spTgt>
+                                        </p:tgtEl>
+                                        <p:attrNameLst>
+                                          <p:attrName>style.visibility</p:attrName>
+                                        </p:attrNameLst>
+                                      </p:cBhvr>
+                                      <p:to>
+                                        <p:strVal val="visible"/>
+                                      </p:to>
+                                    </p:set>
+                                    <p:animEffect transition="in" filter="fade">
+                                      <p:cBhvr>
+                                        <p:cTn id="12" dur="500"/>
+                                        <p:tgtEl>
+                                          <p:spTgt spid="2">
+                                            <p:txEl>
+                                              <p:pRg st="1" end="1"/>
+                                            </p:txEl>
+                                          </p:spTgt>
+                                        </p:tgtEl>
+                                      </p:cBhvr>
+                                    </p:animEffect>
+                                  </p:childTnLst>
+                                </p:cTn>
+                              </p:par>
+                            </p:childTnLst>
+                          </p:cTn>
+                        </p:par>
+                      </p:childTnLst>
+                    </p:cTn>
+                  </p:par>
+                  <p:par>
+                    <p:cTn id="13" fill="hold">
+                      <p:stCondLst>
+                        <p:cond delay="indefinite"/>
+                      </p:stCondLst>
+                      <p:childTnLst>
+                        <p:par>
+                          <p:cTn id="14" fill="hold">
+                            <p:stCondLst>
+                              <p:cond delay="0"/>
+                            </p:stCondLst>
+                            <p:childTnLst>
+                              <p:par>
+                                <p:cTn id="15" presetID="10" presetClass="entr" presetSubtype="0" fill="hold" grpId="0" nodeType="clickEffect">
+                                  <p:stCondLst>
+                                    <p:cond delay="0"/>
+                                  </p:stCondLst>
+                                  <p:childTnLst>
+                                    <p:set>
+                                      <p:cBhvr>
+                                        <p:cTn id="16" dur="1" fill="hold">
+                                          <p:stCondLst>
+                                            <p:cond delay="0"/>
+                                          </p:stCondLst>
+                                        </p:cTn>
+                                        <p:tgtEl>
+                                          <p:spTgt spid="2">
+                                            <p:txEl>
+                                              <p:pRg st="2" end="2"/>
+                                            </p:txEl>
+                                          </p:spTgt>
+                                        </p:tgtEl>
+                                        <p:attrNameLst>
+                                          <p:attrName>style.visibility</p:attrName>
+                                        </p:attrNameLst>
+                                      </p:cBhvr>
+                                      <p:to>
+                                        <p:strVal val="visible"/>
+                                      </p:to>
+                                    </p:set>
+                                    <p:animEffect transition="in" filter="fade">
+                                      <p:cBhvr>
+                                        <p:cTn id="17" dur="500"/>
+                                        <p:tgtEl>
+                                          <p:spTgt spid="2">
+                                            <p:txEl>
+                                              <p:pRg st="2" end="2"/>
+                                            </p:txEl>
+                                          </p:spTgt>
+                                        </p:tgtEl>
+                                      </p:cBhvr>
+                                    </p:animEffect>
+                                  </p:childTnLst>
+                                </p:cTn>
+                              </p:par>
+                            </p:childTnLst>
+                          </p:cTn>
+                        </p:par>
+                      </p:childTnLst>
+                    </p:cTn>
+                  </p:par>
+                  <p:par>
+                    <p:cTn id="18" fill="hold">
+                      <p:stCondLst>
+                        <p:cond delay="indefinite"/>
+                      </p:stCondLst>
+                      <p:childTnLst>
+                        <p:par>
+                          <p:cTn id="19" fill="hold">
+                            <p:stCondLst>
+                              <p:cond delay="0"/>
+                            </p:stCondLst>
+                            <p:childTnLst>
+                              <p:par>
+                                <p:cTn id="20" presetID="10" presetClass="entr" presetSubtype="0" fill="hold" grpId="0" nodeType="clickEffect">
+                                  <p:stCondLst>
+                                    <p:cond delay="0"/>
+                                  </p:stCondLst>
+                                  <p:childTnLst>
+                                    <p:set>
+                                      <p:cBhvr>
+                                        <p:cTn id="21" dur="1" fill="hold">
+                                          <p:stCondLst>
+                                            <p:cond delay="0"/>
+                                          </p:stCondLst>
+                                        </p:cTn>
+                                        <p:tgtEl>
+                                          <p:spTgt spid="2">
+                                            <p:txEl>
+                                              <p:pRg st="3" end="3"/>
+                                            </p:txEl>
+                                          </p:spTgt>
+                                        </p:tgtEl>
+                                        <p:attrNameLst>
+                                          <p:attrName>style.visibility</p:attrName>
+                                        </p:attrNameLst>
+                                      </p:cBhvr>
+                                      <p:to>
+                                        <p:strVal val="visible"/>
+                                      </p:to>
+                                    </p:set>
+                                    <p:animEffect transition="in" filter="fade">
+                                      <p:cBhvr>
+                                        <p:cTn id="22" dur="500"/>
+                                        <p:tgtEl>
+                                          <p:spTgt spid="2">
+                                            <p:txEl>
+                                              <p:pRg st="3" end="3"/>
+                                            </p:txEl>
+                                          </p:spTgt>
+                                        </p:tgtEl>
+                                      </p:cBhvr>
+                                    </p:animEffect>
+                                  </p:childTnLst>
+                                </p:cTn>
+                              </p:par>
+                            </p:childTnLst>
+                          </p:cTn>
+                        </p:par>
+                      </p:childTnLst>
+                    </p:cTn>
+                  </p:par>
+                  <p:par>
+                    <p:cTn id="23" fill="hold">
+                      <p:stCondLst>
+                        <p:cond delay="indefinite"/>
+                      </p:stCondLst>
+                      <p:childTnLst>
+                        <p:par>
+                          <p:cTn id="24" fill="hold">
+                            <p:stCondLst>
+                              <p:cond delay="0"/>
+                            </p:stCondLst>
+                            <p:childTnLst>
+                              <p:par>
+                                <p:cTn id="25" presetID="10" presetClass="entr" presetSubtype="0" fill="hold" grpId="0" nodeType="clickEffect">
+                                  <p:stCondLst>
+                                    <p:cond delay="0"/>
+                                  </p:stCondLst>
+                                  <p:childTnLst>
+                                    <p:set>
+                                      <p:cBhvr>
+                                        <p:cTn id="26" dur="1" fill="hold">
+                                          <p:stCondLst>
+                                            <p:cond delay="0"/>
+                                          </p:stCondLst>
+                                        </p:cTn>
+                                        <p:tgtEl>
+                                          <p:spTgt spid="2">
+                                            <p:txEl>
+                                              <p:pRg st="4" end="4"/>
+                                            </p:txEl>
+                                          </p:spTgt>
+                                        </p:tgtEl>
+                                        <p:attrNameLst>
+                                          <p:attrName>style.visibility</p:attrName>
+                                        </p:attrNameLst>
+                                      </p:cBhvr>
+                                      <p:to>
+                                        <p:strVal val="visible"/>
+                                      </p:to>
+                                    </p:set>
+                                    <p:animEffect transition="in" filter="fade">
+                                      <p:cBhvr>
+                                        <p:cTn id="27" dur="500"/>
+                                        <p:tgtEl>
+                                          <p:spTgt spid="2">
+                                            <p:txEl>
+                                              <p:pRg st="4" end="4"/>
+                                            </p:txEl>
+                                          </p:spTgt>
+                                        </p:tgtEl>
+                                      </p:cBhvr>
+                                    </p:animEffect>
+                                  </p:childTnLst>
+                                </p:cTn>
+                              </p:par>
+                            </p:childTnLst>
+                          </p:cTn>
+                        </p:par>
+                      </p:childTnLst>
+                    </p:cTn>
+                  </p:par>
+                  <p:par>
+                    <p:cTn id="28" fill="hold">
+                      <p:stCondLst>
+                        <p:cond delay="indefinite"/>
+                      </p:stCondLst>
+                      <p:childTnLst>
+                        <p:par>
+                          <p:cTn id="29" fill="hold">
+                            <p:stCondLst>
+                              <p:cond delay="0"/>
+                            </p:stCondLst>
+                            <p:childTnLst>
+                              <p:par>
+                                <p:cTn id="30" presetID="10" presetClass="entr" presetSubtype="0" fill="hold" grpId="0" nodeType="clickEffect">
+                                  <p:stCondLst>
+                                    <p:cond delay="0"/>
+                                  </p:stCondLst>
+                                  <p:childTnLst>
+                                    <p:set>
+                                      <p:cBhvr>
+                                        <p:cTn id="31" dur="1" fill="hold">
+                                          <p:stCondLst>
+                                            <p:cond delay="0"/>
+                                          </p:stCondLst>
+                                        </p:cTn>
+                                        <p:tgtEl>
+                                          <p:spTgt spid="2">
+                                            <p:txEl>
+                                              <p:pRg st="5" end="5"/>
+                                            </p:txEl>
+                                          </p:spTgt>
+                                        </p:tgtEl>
+                                        <p:attrNameLst>
+                                          <p:attrName>style.visibility</p:attrName>
+                                        </p:attrNameLst>
+                                      </p:cBhvr>
+                                      <p:to>
+                                        <p:strVal val="visible"/>
+                                      </p:to>
+                                    </p:set>
+                                    <p:animEffect transition="in" filter="fade">
+                                      <p:cBhvr>
+                                        <p:cTn id="32" dur="500"/>
+                                        <p:tgtEl>
+                                          <p:spTgt spid="2">
+                                            <p:txEl>
+                                              <p:pRg st="5" end="5"/>
+                                            </p:txEl>
+                                          </p:spTgt>
+                                        </p:tgtEl>
+                                      </p:cBhvr>
+                                    </p:animEffect>
+                                  </p:childTnLst>
+                                </p:cTn>
+                              </p:par>
+                            </p:childTnLst>
+                          </p:cTn>
+                        </p:par>
+                      </p:childTnLst>
+                    </p:cTn>
+                  </p:par>
+                  <p:par>
+                    <p:cTn id="33" fill="hold">
+                      <p:stCondLst>
+                        <p:cond delay="indefinite"/>
+                      </p:stCondLst>
+                      <p:childTnLst>
+                        <p:par>
+                          <p:cTn id="34" fill="hold">
+                            <p:stCondLst>
+                              <p:cond delay="0"/>
+                            </p:stCondLst>
+                            <p:childTnLst>
+                              <p:par>
+                                <p:cTn id="35" presetID="10" presetClass="entr" presetSubtype="0" fill="hold" grpId="0" nodeType="clickEffect">
+                                  <p:stCondLst>
+                                    <p:cond delay="0"/>
+                                  </p:stCondLst>
+                                  <p:childTnLst>
+                                    <p:set>
+                                      <p:cBhvr>
+                                        <p:cTn id="36" dur="1" fill="hold">
+                                          <p:stCondLst>
+                                            <p:cond delay="0"/>
+                                          </p:stCondLst>
+                                        </p:cTn>
+                                        <p:tgtEl>
+                                          <p:spTgt spid="2">
+                                            <p:txEl>
+                                              <p:pRg st="6" end="6"/>
+                                            </p:txEl>
+                                          </p:spTgt>
+                                        </p:tgtEl>
+                                        <p:attrNameLst>
+                                          <p:attrName>style.visibility</p:attrName>
+                                        </p:attrNameLst>
+                                      </p:cBhvr>
+                                      <p:to>
+                                        <p:strVal val="visible"/>
+                                      </p:to>
+                                    </p:set>
+                                    <p:animEffect transition="in" filter="fade">
+                                      <p:cBhvr>
+                                        <p:cTn id="37" dur="500"/>
+                                        <p:tgtEl>
+                                          <p:spTgt spid="2">
+                                            <p:txEl>
+                                              <p:pRg st="6" end="6"/>
+                                            </p:txEl>
+                                          </p:spTgt>
+                                        </p:tgtEl>
+                                      </p:cBhvr>
+                                    </p:animEffect>
+                                  </p:childTnLst>
+                                </p:cTn>
+                              </p:par>
+                            </p:childTnLst>
+                          </p:cTn>
+                        </p:par>
+                      </p:childTnLst>
+                    </p:cTn>
+                  </p:par>
+                  <p:par>
+                    <p:cTn id="38" fill="hold">
+                      <p:stCondLst>
+                        <p:cond delay="indefinite"/>
+                      </p:stCondLst>
+                      <p:childTnLst>
+                        <p:par>
+                          <p:cTn id="39" fill="hold">
+                            <p:stCondLst>
+                              <p:cond delay="0"/>
+                            </p:stCondLst>
+                            <p:childTnLst>
+                              <p:par>
+                                <p:cTn id="40" presetID="10" presetClass="entr" presetSubtype="0" fill="hold" grpId="0" nodeType="clickEffect">
+                                  <p:stCondLst>
+                                    <p:cond delay="0"/>
+                                  </p:stCondLst>
+                                  <p:childTnLst>
+                                    <p:set>
+                                      <p:cBhvr>
+                                        <p:cTn id="41" dur="1" fill="hold">
+                                          <p:stCondLst>
+                                            <p:cond delay="0"/>
+                                          </p:stCondLst>
+                                        </p:cTn>
+                                        <p:tgtEl>
+                                          <p:spTgt spid="2">
+                                            <p:txEl>
+                                              <p:pRg st="7" end="7"/>
+                                            </p:txEl>
+                                          </p:spTgt>
+                                        </p:tgtEl>
+                                        <p:attrNameLst>
+                                          <p:attrName>style.visibility</p:attrName>
+                                        </p:attrNameLst>
+                                      </p:cBhvr>
+                                      <p:to>
+                                        <p:strVal val="visible"/>
+                                      </p:to>
+                                    </p:set>
+                                    <p:animEffect transition="in" filter="fade">
+                                      <p:cBhvr>
+                                        <p:cTn id="42" dur="500"/>
+                                        <p:tgtEl>
+                                          <p:spTgt spid="2">
+                                            <p:txEl>
+                                              <p:pRg st="7" end="7"/>
+                                            </p:txEl>
+                                          </p:spTgt>
+                                        </p:tgtEl>
+                                      </p:cBhvr>
+                                    </p:animEffect>
+                                  </p:childTnLst>
+                                </p:cTn>
+                              </p:par>
+                            </p:childTnLst>
+                          </p:cTn>
+                        </p:par>
+                      </p:childTnLst>
+                    </p:cTn>
+                  </p:par>
+                  <p:par>
+                    <p:cTn id="43" fill="hold">
+                      <p:stCondLst>
+                        <p:cond delay="indefinite"/>
+                      </p:stCondLst>
+                      <p:childTnLst>
+                        <p:par>
+                          <p:cTn id="44" fill="hold">
+                            <p:stCondLst>
+                              <p:cond delay="0"/>
+                            </p:stCondLst>
+                            <p:childTnLst>
+                              <p:par>
+                                <p:cTn id="45" presetID="10" presetClass="entr" presetSubtype="0" fill="hold" grpId="0" nodeType="clickEffect">
+                                  <p:stCondLst>
+                                    <p:cond delay="0"/>
+                                  </p:stCondLst>
+                                  <p:childTnLst>
+                                    <p:set>
+                                      <p:cBhvr>
+                                        <p:cTn id="46" dur="1" fill="hold">
+                                          <p:stCondLst>
+                                            <p:cond delay="0"/>
+                                          </p:stCondLst>
+                                        </p:cTn>
+                                        <p:tgtEl>
+                                          <p:spTgt spid="2">
+                                            <p:txEl>
+                                              <p:pRg st="8" end="8"/>
+                                            </p:txEl>
+                                          </p:spTgt>
+                                        </p:tgtEl>
+                                        <p:attrNameLst>
+                                          <p:attrName>style.visibility</p:attrName>
+                                        </p:attrNameLst>
+                                      </p:cBhvr>
+                                      <p:to>
+                                        <p:strVal val="visible"/>
+                                      </p:to>
+                                    </p:set>
+                                    <p:animEffect transition="in" filter="fade">
+                                      <p:cBhvr>
+                                        <p:cTn id="47" dur="500"/>
+                                        <p:tgtEl>
+                                          <p:spTgt spid="2">
+                                            <p:txEl>
+                                              <p:pRg st="8" end="8"/>
+                                            </p:txEl>
+                                          </p:spTgt>
+                                        </p:tgtEl>
+                                      </p:cBhvr>
+                                    </p:animEffect>
+                                  </p:childTnLst>
+                                </p:cTn>
+                              </p:par>
+                            </p:childTnLst>
+                          </p:cTn>
+                        </p:par>
+                      </p:childTnLst>
+                    </p:cTn>
+                  </p:par>
+                  <p:par>
+                    <p:cTn id="48" fill="hold">
+                      <p:stCondLst>
+                        <p:cond delay="indefinite"/>
+                      </p:stCondLst>
+                      <p:childTnLst>
+                        <p:par>
+                          <p:cTn id="49" fill="hold">
+                            <p:stCondLst>
+                              <p:cond delay="0"/>
+                            </p:stCondLst>
+                            <p:childTnLst>
+                              <p:par>
+                                <p:cTn id="50" presetID="10" presetClass="entr" presetSubtype="0" fill="hold" grpId="0" nodeType="clickEffect">
+                                  <p:stCondLst>
+                                    <p:cond delay="0"/>
+                                  </p:stCondLst>
+                                  <p:childTnLst>
+                                    <p:set>
+                                      <p:cBhvr>
+                                        <p:cTn id="51" dur="1" fill="hold">
+                                          <p:stCondLst>
+                                            <p:cond delay="0"/>
+                                          </p:stCondLst>
+                                        </p:cTn>
+                                        <p:tgtEl>
+                                          <p:spTgt spid="2">
+                                            <p:txEl>
+                                              <p:pRg st="9" end="9"/>
+                                            </p:txEl>
+                                          </p:spTgt>
+                                        </p:tgtEl>
+                                        <p:attrNameLst>
+                                          <p:attrName>style.visibility</p:attrName>
+                                        </p:attrNameLst>
+                                      </p:cBhvr>
+                                      <p:to>
+                                        <p:strVal val="visible"/>
+                                      </p:to>
+                                    </p:set>
+                                    <p:animEffect transition="in" filter="fade">
+                                      <p:cBhvr>
+                                        <p:cTn id="52" dur="500"/>
+                                        <p:tgtEl>
+                                          <p:spTgt spid="2">
+                                            <p:txEl>
+                                              <p:pRg st="9" end="9"/>
+                                            </p:txEl>
+                                          </p:spTgt>
+                                        </p:tgtEl>
+                                      </p:cBhvr>
+                                    </p:animEffect>
+                                  </p:childTnLst>
+                                </p:cTn>
+                              </p:par>
+                            </p:childTnLst>
+                          </p:cTn>
+                        </p:par>
+                      </p:childTnLst>
+                    </p:cTn>
+                  </p:par>
+                  <p:par>
+                    <p:cTn id="53" fill="hold">
+                      <p:stCondLst>
+                        <p:cond delay="indefinite"/>
+                      </p:stCondLst>
+                      <p:childTnLst>
+                        <p:par>
+                          <p:cTn id="54" fill="hold">
+                            <p:stCondLst>
+                              <p:cond delay="0"/>
+                            </p:stCondLst>
+                            <p:childTnLst>
+                              <p:par>
+                                <p:cTn id="55" presetID="10" presetClass="entr" presetSubtype="0" fill="hold" grpId="0" nodeType="clickEffect">
+                                  <p:stCondLst>
+                                    <p:cond delay="0"/>
+                                  </p:stCondLst>
+                                  <p:childTnLst>
+                                    <p:set>
+                                      <p:cBhvr>
+                                        <p:cTn id="56" dur="1" fill="hold">
+                                          <p:stCondLst>
+                                            <p:cond delay="0"/>
+                                          </p:stCondLst>
+                                        </p:cTn>
+                                        <p:tgtEl>
+                                          <p:spTgt spid="2">
+                                            <p:txEl>
+                                              <p:pRg st="10" end="10"/>
+                                            </p:txEl>
+                                          </p:spTgt>
+                                        </p:tgtEl>
+                                        <p:attrNameLst>
+                                          <p:attrName>style.visibility</p:attrName>
+                                        </p:attrNameLst>
+                                      </p:cBhvr>
+                                      <p:to>
+                                        <p:strVal val="visible"/>
+                                      </p:to>
+                                    </p:set>
+                                    <p:animEffect transition="in" filter="fade">
+                                      <p:cBhvr>
+                                        <p:cTn id="57" dur="500"/>
+                                        <p:tgtEl>
+                                          <p:spTgt spid="2">
+                                            <p:txEl>
+                                              <p:pRg st="10" end="10"/>
+                                            </p:txEl>
+                                          </p:spTgt>
+                                        </p:tgtEl>
+                                      </p:cBhvr>
+                                    </p:animEffect>
+                                  </p:childTnLst>
+                                </p:cTn>
+                              </p:par>
+                            </p:childTnLst>
+                          </p:cTn>
+                        </p:par>
+                      </p:childTnLst>
+                    </p:cTn>
+                  </p:par>
+                  <p:par>
+                    <p:cTn id="58" fill="hold">
+                      <p:stCondLst>
+                        <p:cond delay="indefinite"/>
+                      </p:stCondLst>
+                      <p:childTnLst>
+                        <p:par>
+                          <p:cTn id="59" fill="hold">
+                            <p:stCondLst>
+                              <p:cond delay="0"/>
+                            </p:stCondLst>
+                            <p:childTnLst>
+                              <p:par>
+                                <p:cTn id="60" presetID="10" presetClass="entr" presetSubtype="0" fill="hold" grpId="0" nodeType="clickEffect">
+                                  <p:stCondLst>
+                                    <p:cond delay="0"/>
+                                  </p:stCondLst>
+                                  <p:childTnLst>
+                                    <p:set>
+                                      <p:cBhvr>
+                                        <p:cTn id="61" dur="1" fill="hold">
+                                          <p:stCondLst>
+                                            <p:cond delay="0"/>
+                                          </p:stCondLst>
+                                        </p:cTn>
+                                        <p:tgtEl>
+                                          <p:spTgt spid="2">
+                                            <p:txEl>
+                                              <p:pRg st="11" end="11"/>
+                                            </p:txEl>
+                                          </p:spTgt>
+                                        </p:tgtEl>
+                                        <p:attrNameLst>
+                                          <p:attrName>style.visibility</p:attrName>
+                                        </p:attrNameLst>
+                                      </p:cBhvr>
+                                      <p:to>
+                                        <p:strVal val="visible"/>
+                                      </p:to>
+                                    </p:set>
+                                    <p:animEffect transition="in" filter="fade">
+                                      <p:cBhvr>
+                                        <p:cTn id="62" dur="500"/>
+                                        <p:tgtEl>
+                                          <p:spTgt spid="2">
+                                            <p:txEl>
+                                              <p:pRg st="11" end="11"/>
+                                            </p:txEl>
+                                          </p:spTgt>
+                                        </p:tgtEl>
+                                      </p:cBhvr>
+                                    </p:animEffect>
+                                  </p:childTnLst>
+                                </p:cTn>
+                              </p:par>
+                            </p:childTnLst>
+                          </p:cTn>
+                        </p:par>
+                      </p:childTnLst>
+                    </p:cTn>
+                  </p:par>
+                </p:childTnLst>
+              </p:cTn>
+              <p:prevCondLst>
+                <p:cond evt="onPrev" delay="0">
+                  <p:tgtEl>
+                    <p:sldTgt/>
+                  </p:tgtEl>
+                </p:cond>
+              </p:prevCondLst>
+              <p:nextCondLst>
+                <p:cond evt="onNext" delay="0">
+                  <p:tgtEl>
+                    <p:sldTgt/>
+                  </p:tgtEl>
+                </p:cond>
+              </p:nextCondLst>
+            </p:seq>
+          </p:childTnLst>
+        </p:cTn>
+      </p:par>
+    </p:tnLst>
+    <p:bldLst>
+      <p:bldP spid="2" grpId="0" uiExpand="1" build="p"/>
+    </p:bldLst>
+  </p:timing>
+</p:sld>
+</file>
+
+<file path=ppt/slides/slide34.xml><?xml version="1.0" encoding="utf-8"?>
+<p:sld xmlns:a="http://schemas.openxmlformats.org/drawingml/2006/main" xmlns:r="http://schemas.openxmlformats.org/officeDocument/2006/relationships" xmlns:p="http://schemas.openxmlformats.org/presentationml/2006/main">
+  <p:cSld>
+    <p:spTree>
+      <p:nvGrpSpPr>
+        <p:cNvPr id="1" name=""/>
+        <p:cNvGrpSpPr/>
+        <p:nvPr/>
+      </p:nvGrpSpPr>
+      <p:grpSpPr>
+        <a:xfrm>
+          <a:off x="0" y="0"/>
+          <a:ext cx="0" cy="0"/>
+          <a:chOff x="0" y="0"/>
+          <a:chExt cx="0" cy="0"/>
+        </a:xfrm>
+      </p:grpSpPr>
+      <p:sp>
+        <p:nvSpPr>
+          <p:cNvPr id="2" name="Content Placeholder 1"/>
+          <p:cNvSpPr>
+            <a:spLocks noGrp="1"/>
+          </p:cNvSpPr>
+          <p:nvPr>
+            <p:ph idx="14"/>
+          </p:nvPr>
+        </p:nvSpPr>
+        <p:spPr>
+          <a:xfrm>
+            <a:off x="704476" y="1893515"/>
             <a:ext cx="13273820" cy="4385816"/>
           </a:xfrm>
         </p:spPr>
@@ -17806,7 +19971,7 @@
 </p:sld>
 </file>
 
-<file path=ppt/slides/slide33.xml><?xml version="1.0" encoding="utf-8"?>
+<file path=ppt/slides/slide35.xml><?xml version="1.0" encoding="utf-8"?>
 <p:sld xmlns:a="http://schemas.openxmlformats.org/drawingml/2006/main" xmlns:r="http://schemas.openxmlformats.org/officeDocument/2006/relationships" xmlns:p="http://schemas.openxmlformats.org/presentationml/2006/main">
   <p:cSld>
     <p:spTree>
@@ -18880,7 +21045,7 @@
 </p:sld>
 </file>
 
-<file path=ppt/slides/slide34.xml><?xml version="1.0" encoding="utf-8"?>
+<file path=ppt/slides/slide36.xml><?xml version="1.0" encoding="utf-8"?>
 <p:sld xmlns:a="http://schemas.openxmlformats.org/drawingml/2006/main" xmlns:r="http://schemas.openxmlformats.org/officeDocument/2006/relationships" xmlns:p="http://schemas.openxmlformats.org/presentationml/2006/main">
   <p:cSld>
     <p:spTree>

</xml_diff>

<commit_message>
added dashboard instructions to the germ theory viz
</commit_message>
<xml_diff>
--- a/lecture.pptx
+++ b/lecture.pptx
@@ -5,10 +5,10 @@
     <p:sldMasterId id="2147483875" r:id="rId1"/>
   </p:sldMasterIdLst>
   <p:notesMasterIdLst>
-    <p:notesMasterId r:id="rId38"/>
+    <p:notesMasterId r:id="rId41"/>
   </p:notesMasterIdLst>
   <p:handoutMasterIdLst>
-    <p:handoutMasterId r:id="rId39"/>
+    <p:handoutMasterId r:id="rId42"/>
   </p:handoutMasterIdLst>
   <p:sldIdLst>
     <p:sldId id="256" r:id="rId2"/>
@@ -44,9 +44,12 @@
     <p:sldId id="569" r:id="rId32"/>
     <p:sldId id="570" r:id="rId33"/>
     <p:sldId id="571" r:id="rId34"/>
-    <p:sldId id="567" r:id="rId35"/>
-    <p:sldId id="568" r:id="rId36"/>
-    <p:sldId id="566" r:id="rId37"/>
+    <p:sldId id="572" r:id="rId35"/>
+    <p:sldId id="574" r:id="rId36"/>
+    <p:sldId id="573" r:id="rId37"/>
+    <p:sldId id="567" r:id="rId38"/>
+    <p:sldId id="568" r:id="rId39"/>
+    <p:sldId id="566" r:id="rId40"/>
   </p:sldIdLst>
   <p:sldSz cx="14630400" cy="8229600"/>
   <p:notesSz cx="6858000" cy="9144000"/>
@@ -3972,182 +3975,11 @@
               </a:spcBef>
             </a:pPr>
             <a:r>
-              <a:rPr lang="en-US" b="1" dirty="0">
+              <a:rPr lang="en-US" b="0" dirty="0">
                 <a:latin typeface="BentonSans Book" charset="0"/>
               </a:rPr>
               <a:t>Germ Theory of Disease (two clinics)</a:t>
             </a:r>
-          </a:p>
-          <a:p>
-            <a:pPr marL="342900" indent="-342900">
-              <a:spcBef>
-                <a:spcPct val="0"/>
-              </a:spcBef>
-              <a:buFont typeface="+mj-lt"/>
-              <a:buAutoNum type="arabicPeriod"/>
-            </a:pPr>
-            <a:r>
-              <a:rPr lang="en-US" dirty="0">
-                <a:latin typeface="BentonSans Book" charset="0"/>
-              </a:rPr>
-              <a:t>Start empty</a:t>
-            </a:r>
-          </a:p>
-          <a:p>
-            <a:pPr marL="342900" indent="-342900">
-              <a:spcBef>
-                <a:spcPct val="0"/>
-              </a:spcBef>
-              <a:buFont typeface="+mj-lt"/>
-              <a:buAutoNum type="arabicPeriod"/>
-            </a:pPr>
-            <a:r>
-              <a:rPr lang="en-US" dirty="0">
-                <a:latin typeface="BentonSans Book" charset="0"/>
-              </a:rPr>
-              <a:t>Drag “Clinic” to Columns</a:t>
-            </a:r>
-          </a:p>
-          <a:p>
-            <a:pPr marL="342900" indent="-342900">
-              <a:spcBef>
-                <a:spcPct val="0"/>
-              </a:spcBef>
-              <a:buFont typeface="+mj-lt"/>
-              <a:buAutoNum type="arabicPeriod"/>
-            </a:pPr>
-            <a:r>
-              <a:rPr lang="en-US" dirty="0">
-                <a:latin typeface="BentonSans Book" charset="0"/>
-              </a:rPr>
-              <a:t>Drag “Mortality Rate” to Rows</a:t>
-            </a:r>
-          </a:p>
-          <a:p>
-            <a:pPr marL="342900" indent="-342900">
-              <a:spcBef>
-                <a:spcPct val="0"/>
-              </a:spcBef>
-              <a:buFont typeface="+mj-lt"/>
-              <a:buAutoNum type="arabicPeriod"/>
-            </a:pPr>
-            <a:r>
-              <a:rPr lang="en-US" dirty="0">
-                <a:latin typeface="BentonSans Book" charset="0"/>
-              </a:rPr>
-              <a:t>Right click “Mortality Rate” &gt; Measure &gt; Average</a:t>
-            </a:r>
-          </a:p>
-          <a:p>
-            <a:pPr marL="342900" indent="-342900">
-              <a:spcBef>
-                <a:spcPct val="0"/>
-              </a:spcBef>
-              <a:buFont typeface="+mj-lt"/>
-              <a:buAutoNum type="arabicPeriod"/>
-            </a:pPr>
-            <a:r>
-              <a:rPr lang="en-US" dirty="0">
-                <a:latin typeface="BentonSans Book" charset="0"/>
-              </a:rPr>
-              <a:t>“Year” to “Columns”</a:t>
-            </a:r>
-          </a:p>
-          <a:p>
-            <a:pPr marL="342900" indent="-342900">
-              <a:spcBef>
-                <a:spcPct val="0"/>
-              </a:spcBef>
-              <a:buFont typeface="+mj-lt"/>
-              <a:buAutoNum type="arabicPeriod"/>
-            </a:pPr>
-            <a:r>
-              <a:rPr lang="en-US" dirty="0">
-                <a:latin typeface="BentonSans Book" charset="0"/>
-              </a:rPr>
-              <a:t>“Clinic” to “Color”</a:t>
-            </a:r>
-          </a:p>
-          <a:p>
-            <a:pPr marL="342900" indent="-342900">
-              <a:spcBef>
-                <a:spcPct val="0"/>
-              </a:spcBef>
-              <a:buFont typeface="+mj-lt"/>
-              <a:buAutoNum type="arabicPeriod"/>
-            </a:pPr>
-            <a:r>
-              <a:rPr lang="en-US" dirty="0">
-                <a:latin typeface="BentonSans Book" charset="0"/>
-              </a:rPr>
-              <a:t>“Births” to “Tooltip”</a:t>
-            </a:r>
-          </a:p>
-          <a:p>
-            <a:pPr marL="342900" indent="-342900">
-              <a:spcBef>
-                <a:spcPct val="0"/>
-              </a:spcBef>
-              <a:buFont typeface="+mj-lt"/>
-              <a:buAutoNum type="arabicPeriod"/>
-            </a:pPr>
-            <a:r>
-              <a:rPr lang="en-US" dirty="0">
-                <a:latin typeface="BentonSans Book" charset="0"/>
-              </a:rPr>
-              <a:t>“Deaths” to “Tooltip”</a:t>
-            </a:r>
-          </a:p>
-          <a:p>
-            <a:pPr marL="342900" indent="-342900">
-              <a:spcBef>
-                <a:spcPct val="0"/>
-              </a:spcBef>
-              <a:buFont typeface="+mj-lt"/>
-              <a:buAutoNum type="arabicPeriod"/>
-            </a:pPr>
-            <a:r>
-              <a:rPr lang="en-US" dirty="0">
-                <a:latin typeface="BentonSans Book" charset="0"/>
-              </a:rPr>
-              <a:t>Open “Tooltip”</a:t>
-            </a:r>
-          </a:p>
-          <a:p>
-            <a:pPr marL="342900" indent="-342900">
-              <a:spcBef>
-                <a:spcPct val="0"/>
-              </a:spcBef>
-              <a:buFont typeface="+mj-lt"/>
-              <a:buAutoNum type="arabicPeriod"/>
-            </a:pPr>
-            <a:r>
-              <a:rPr lang="en-US" dirty="0">
-                <a:latin typeface="BentonSans Book" charset="0"/>
-              </a:rPr>
-              <a:t>Add custom message</a:t>
-            </a:r>
-          </a:p>
-          <a:p>
-            <a:pPr marL="342900" indent="-342900">
-              <a:spcBef>
-                <a:spcPct val="0"/>
-              </a:spcBef>
-              <a:buFont typeface="+mj-lt"/>
-              <a:buAutoNum type="arabicPeriod"/>
-            </a:pPr>
-            <a:endParaRPr lang="en-US" dirty="0">
-              <a:latin typeface="BentonSans Book" charset="0"/>
-            </a:endParaRPr>
-          </a:p>
-          <a:p>
-            <a:pPr marL="0" indent="0">
-              <a:spcBef>
-                <a:spcPct val="0"/>
-              </a:spcBef>
-              <a:buFont typeface="+mj-lt"/>
-              <a:buNone/>
-            </a:pPr>
             <a:endParaRPr lang="en-US" dirty="0">
               <a:latin typeface="BentonSans Book" charset="0"/>
             </a:endParaRPr>
@@ -4511,7 +4343,10 @@
           <a:bodyPr/>
           <a:lstStyle/>
           <a:p>
-            <a:endParaRPr lang="en-US" dirty="0"/>
+            <a:r>
+              <a:rPr lang="en-US" dirty="0"/>
+              <a:t>Can add stuff to pages if desired (date or deaths might be interesting)</a:t>
+            </a:r>
           </a:p>
         </p:txBody>
       </p:sp>
@@ -4579,7 +4414,7 @@
     </p:spTree>
     <p:extLst>
       <p:ext uri="{BB962C8B-B14F-4D97-AF65-F5344CB8AC3E}">
-        <p14:creationId xmlns:p14="http://schemas.microsoft.com/office/powerpoint/2010/main" val="3559071881"/>
+        <p14:creationId xmlns:p14="http://schemas.microsoft.com/office/powerpoint/2010/main" val="3350560249"/>
       </p:ext>
     </p:extLst>
   </p:cSld>
@@ -4640,6 +4475,189 @@
     </p:spTree>
     <p:extLst>
       <p:ext uri="{BB962C8B-B14F-4D97-AF65-F5344CB8AC3E}">
+        <p14:creationId xmlns:p14="http://schemas.microsoft.com/office/powerpoint/2010/main" val="4070323610"/>
+      </p:ext>
+    </p:extLst>
+  </p:cSld>
+  <p:clrMapOvr>
+    <a:masterClrMapping/>
+  </p:clrMapOvr>
+</p:notes>
+</file>
+
+<file path=ppt/notesSlides/notesSlide34.xml><?xml version="1.0" encoding="utf-8"?>
+<p:notes xmlns:a="http://schemas.openxmlformats.org/drawingml/2006/main" xmlns:r="http://schemas.openxmlformats.org/officeDocument/2006/relationships" xmlns:p="http://schemas.openxmlformats.org/presentationml/2006/main">
+  <p:cSld>
+    <p:spTree>
+      <p:nvGrpSpPr>
+        <p:cNvPr id="1" name=""/>
+        <p:cNvGrpSpPr/>
+        <p:nvPr/>
+      </p:nvGrpSpPr>
+      <p:grpSpPr>
+        <a:xfrm>
+          <a:off x="0" y="0"/>
+          <a:ext cx="0" cy="0"/>
+          <a:chOff x="0" y="0"/>
+          <a:chExt cx="0" cy="0"/>
+        </a:xfrm>
+      </p:grpSpPr>
+      <p:sp>
+        <p:nvSpPr>
+          <p:cNvPr id="2" name="Slide Image Placeholder 1"/>
+          <p:cNvSpPr>
+            <a:spLocks noGrp="1" noRot="1" noChangeAspect="1"/>
+          </p:cNvSpPr>
+          <p:nvPr>
+            <p:ph type="sldImg"/>
+          </p:nvPr>
+        </p:nvSpPr>
+        <p:spPr/>
+      </p:sp>
+      <p:sp>
+        <p:nvSpPr>
+          <p:cNvPr id="3" name="Notes Placeholder 2"/>
+          <p:cNvSpPr>
+            <a:spLocks noGrp="1"/>
+          </p:cNvSpPr>
+          <p:nvPr>
+            <p:ph type="body" idx="1"/>
+          </p:nvPr>
+        </p:nvSpPr>
+        <p:spPr/>
+        <p:txBody>
+          <a:bodyPr/>
+          <a:lstStyle/>
+          <a:p>
+            <a:endParaRPr lang="en-US" dirty="0"/>
+          </a:p>
+        </p:txBody>
+      </p:sp>
+    </p:spTree>
+    <p:extLst>
+      <p:ext uri="{BB962C8B-B14F-4D97-AF65-F5344CB8AC3E}">
+        <p14:creationId xmlns:p14="http://schemas.microsoft.com/office/powerpoint/2010/main" val="1700628346"/>
+      </p:ext>
+    </p:extLst>
+  </p:cSld>
+  <p:clrMapOvr>
+    <a:masterClrMapping/>
+  </p:clrMapOvr>
+</p:notes>
+</file>
+
+<file path=ppt/notesSlides/notesSlide35.xml><?xml version="1.0" encoding="utf-8"?>
+<p:notes xmlns:a="http://schemas.openxmlformats.org/drawingml/2006/main" xmlns:r="http://schemas.openxmlformats.org/officeDocument/2006/relationships" xmlns:p="http://schemas.openxmlformats.org/presentationml/2006/main">
+  <p:cSld>
+    <p:spTree>
+      <p:nvGrpSpPr>
+        <p:cNvPr id="1" name=""/>
+        <p:cNvGrpSpPr/>
+        <p:nvPr/>
+      </p:nvGrpSpPr>
+      <p:grpSpPr>
+        <a:xfrm>
+          <a:off x="0" y="0"/>
+          <a:ext cx="0" cy="0"/>
+          <a:chOff x="0" y="0"/>
+          <a:chExt cx="0" cy="0"/>
+        </a:xfrm>
+      </p:grpSpPr>
+      <p:sp>
+        <p:nvSpPr>
+          <p:cNvPr id="2" name="Slide Image Placeholder 1"/>
+          <p:cNvSpPr>
+            <a:spLocks noGrp="1" noRot="1" noChangeAspect="1"/>
+          </p:cNvSpPr>
+          <p:nvPr>
+            <p:ph type="sldImg"/>
+          </p:nvPr>
+        </p:nvSpPr>
+        <p:spPr/>
+      </p:sp>
+      <p:sp>
+        <p:nvSpPr>
+          <p:cNvPr id="3" name="Notes Placeholder 2"/>
+          <p:cNvSpPr>
+            <a:spLocks noGrp="1"/>
+          </p:cNvSpPr>
+          <p:nvPr>
+            <p:ph type="body" idx="1"/>
+          </p:nvPr>
+        </p:nvSpPr>
+        <p:spPr/>
+        <p:txBody>
+          <a:bodyPr/>
+          <a:lstStyle/>
+          <a:p>
+            <a:endParaRPr lang="en-US" dirty="0"/>
+          </a:p>
+        </p:txBody>
+      </p:sp>
+    </p:spTree>
+    <p:extLst>
+      <p:ext uri="{BB962C8B-B14F-4D97-AF65-F5344CB8AC3E}">
+        <p14:creationId xmlns:p14="http://schemas.microsoft.com/office/powerpoint/2010/main" val="3559071881"/>
+      </p:ext>
+    </p:extLst>
+  </p:cSld>
+  <p:clrMapOvr>
+    <a:masterClrMapping/>
+  </p:clrMapOvr>
+</p:notes>
+</file>
+
+<file path=ppt/notesSlides/notesSlide36.xml><?xml version="1.0" encoding="utf-8"?>
+<p:notes xmlns:a="http://schemas.openxmlformats.org/drawingml/2006/main" xmlns:r="http://schemas.openxmlformats.org/officeDocument/2006/relationships" xmlns:p="http://schemas.openxmlformats.org/presentationml/2006/main">
+  <p:cSld>
+    <p:spTree>
+      <p:nvGrpSpPr>
+        <p:cNvPr id="1" name=""/>
+        <p:cNvGrpSpPr/>
+        <p:nvPr/>
+      </p:nvGrpSpPr>
+      <p:grpSpPr>
+        <a:xfrm>
+          <a:off x="0" y="0"/>
+          <a:ext cx="0" cy="0"/>
+          <a:chOff x="0" y="0"/>
+          <a:chExt cx="0" cy="0"/>
+        </a:xfrm>
+      </p:grpSpPr>
+      <p:sp>
+        <p:nvSpPr>
+          <p:cNvPr id="2" name="Slide Image Placeholder 1"/>
+          <p:cNvSpPr>
+            <a:spLocks noGrp="1" noRot="1" noChangeAspect="1"/>
+          </p:cNvSpPr>
+          <p:nvPr>
+            <p:ph type="sldImg"/>
+          </p:nvPr>
+        </p:nvSpPr>
+        <p:spPr/>
+      </p:sp>
+      <p:sp>
+        <p:nvSpPr>
+          <p:cNvPr id="3" name="Notes Placeholder 2"/>
+          <p:cNvSpPr>
+            <a:spLocks noGrp="1"/>
+          </p:cNvSpPr>
+          <p:nvPr>
+            <p:ph type="body" idx="1"/>
+          </p:nvPr>
+        </p:nvSpPr>
+        <p:spPr/>
+        <p:txBody>
+          <a:bodyPr/>
+          <a:lstStyle/>
+          <a:p>
+            <a:endParaRPr lang="en-US" dirty="0"/>
+          </a:p>
+        </p:txBody>
+      </p:sp>
+    </p:spTree>
+    <p:extLst>
+      <p:ext uri="{BB962C8B-B14F-4D97-AF65-F5344CB8AC3E}">
         <p14:creationId xmlns:p14="http://schemas.microsoft.com/office/powerpoint/2010/main" val="2764254563"/>
       </p:ext>
     </p:extLst>
@@ -4650,7 +4668,7 @@
 </p:notes>
 </file>
 
-<file path=ppt/notesSlides/notesSlide34.xml><?xml version="1.0" encoding="utf-8"?>
+<file path=ppt/notesSlides/notesSlide37.xml><?xml version="1.0" encoding="utf-8"?>
 <p:notes xmlns:a="http://schemas.openxmlformats.org/drawingml/2006/main" xmlns:r="http://schemas.openxmlformats.org/officeDocument/2006/relationships" xmlns:p="http://schemas.openxmlformats.org/presentationml/2006/main">
   <p:cSld>
     <p:spTree>
@@ -17328,7 +17346,7 @@
               <a:rPr lang="en-US" b="1" dirty="0">
                 <a:latin typeface="BentonSans Book" charset="0"/>
               </a:rPr>
-              <a:t>Germ Theory of Disease</a:t>
+              <a:t>Germ Theory of Disease – Basic Viz</a:t>
             </a:r>
           </a:p>
         </p:txBody>
@@ -18346,7 +18364,7 @@
               <a:rPr lang="en-US" b="1" dirty="0">
                 <a:latin typeface="BentonSans Book" charset="0"/>
               </a:rPr>
-              <a:t>Germ Theory of Disease (continued)</a:t>
+              <a:t>Germ Theory of Disease – Simple Viz</a:t>
             </a:r>
           </a:p>
         </p:txBody>
@@ -19162,6 +19180,1345 @@
         <p:spPr>
           <a:xfrm>
             <a:off x="704476" y="1893515"/>
+            <a:ext cx="13273820" cy="5601533"/>
+          </a:xfrm>
+        </p:spPr>
+        <p:txBody>
+          <a:bodyPr/>
+          <a:lstStyle/>
+          <a:p>
+            <a:pPr marL="457200" indent="-457200" defTabSz="1306221" fontAlgn="auto">
+              <a:buFont typeface="+mj-lt"/>
+              <a:buAutoNum type="arabicPeriod"/>
+              <a:defRPr/>
+            </a:pPr>
+            <a:r>
+              <a:rPr lang="en-US" sz="2400" dirty="0">
+                <a:ea typeface="+mn-ea"/>
+              </a:rPr>
+              <a:t>Duplicate “Mortality Rate over Time”</a:t>
+            </a:r>
+          </a:p>
+          <a:p>
+            <a:pPr marL="457200" indent="-457200" defTabSz="1306221" fontAlgn="auto">
+              <a:buFont typeface="+mj-lt"/>
+              <a:buAutoNum type="arabicPeriod"/>
+              <a:defRPr/>
+            </a:pPr>
+            <a:r>
+              <a:rPr lang="en-US" sz="2400" dirty="0">
+                <a:ea typeface="+mn-ea"/>
+              </a:rPr>
+              <a:t>Drag “Date” to “Pages”</a:t>
+            </a:r>
+          </a:p>
+          <a:p>
+            <a:pPr marL="457200" indent="-457200" defTabSz="1306221" fontAlgn="auto">
+              <a:buFont typeface="+mj-lt"/>
+              <a:buAutoNum type="arabicPeriod"/>
+              <a:defRPr/>
+            </a:pPr>
+            <a:r>
+              <a:rPr lang="en-US" sz="2400" dirty="0">
+                <a:ea typeface="+mn-ea"/>
+              </a:rPr>
+              <a:t>Right click “Date” pill and select “Month (May 2015)”</a:t>
+            </a:r>
+          </a:p>
+          <a:p>
+            <a:pPr marL="457200" indent="-457200" defTabSz="1306221" fontAlgn="auto">
+              <a:buFont typeface="+mj-lt"/>
+              <a:buAutoNum type="arabicPeriod"/>
+              <a:defRPr/>
+            </a:pPr>
+            <a:r>
+              <a:rPr lang="en-US" sz="2400" dirty="0">
+                <a:ea typeface="+mn-ea"/>
+              </a:rPr>
+              <a:t>Switch the “Marks” type to “Bar”</a:t>
+            </a:r>
+          </a:p>
+          <a:p>
+            <a:pPr marL="457200" indent="-457200" defTabSz="1306221" fontAlgn="auto">
+              <a:buFont typeface="+mj-lt"/>
+              <a:buAutoNum type="arabicPeriod"/>
+              <a:defRPr/>
+            </a:pPr>
+            <a:r>
+              <a:rPr lang="en-US" sz="2400" dirty="0">
+                <a:ea typeface="+mn-ea"/>
+              </a:rPr>
+              <a:t>Try clicking the “Play” button in the Pages card</a:t>
+            </a:r>
+          </a:p>
+          <a:p>
+            <a:pPr marL="457200" indent="-457200" defTabSz="1306221" fontAlgn="auto">
+              <a:buFont typeface="+mj-lt"/>
+              <a:buAutoNum type="arabicPeriod"/>
+              <a:defRPr/>
+            </a:pPr>
+            <a:r>
+              <a:rPr lang="en-US" sz="2400" dirty="0">
+                <a:ea typeface="+mn-ea"/>
+              </a:rPr>
+              <a:t>Check “Show history” in the Pages card</a:t>
+            </a:r>
+          </a:p>
+          <a:p>
+            <a:pPr marL="739775" lvl="1" indent="-457200" defTabSz="1306221" fontAlgn="auto">
+              <a:buFont typeface="+mj-lt"/>
+              <a:buAutoNum type="arabicPeriod"/>
+              <a:defRPr/>
+            </a:pPr>
+            <a:r>
+              <a:rPr lang="en-US" sz="2000" dirty="0">
+                <a:ea typeface="+mn-ea"/>
+              </a:rPr>
+              <a:t>Select the dropdown and choose “All”</a:t>
+            </a:r>
+          </a:p>
+          <a:p>
+            <a:pPr marL="457200" indent="-457200" defTabSz="1306221" fontAlgn="auto">
+              <a:buFont typeface="+mj-lt"/>
+              <a:buAutoNum type="arabicPeriod"/>
+              <a:defRPr/>
+            </a:pPr>
+            <a:r>
+              <a:rPr lang="en-US" sz="2400" dirty="0">
+                <a:ea typeface="+mn-ea"/>
+              </a:rPr>
+              <a:t>Try playing it again</a:t>
+            </a:r>
+          </a:p>
+          <a:p>
+            <a:pPr marL="457200" indent="-457200" defTabSz="1306221" fontAlgn="auto">
+              <a:buFont typeface="+mj-lt"/>
+              <a:buAutoNum type="arabicPeriod"/>
+              <a:defRPr/>
+            </a:pPr>
+            <a:r>
+              <a:rPr lang="en-US" sz="2400" dirty="0">
+                <a:ea typeface="+mn-ea"/>
+              </a:rPr>
+              <a:t>Rename the sheet “Mortality Rate through Time”</a:t>
+            </a:r>
+          </a:p>
+          <a:p>
+            <a:pPr marL="457200" indent="-457200" defTabSz="1306221" fontAlgn="auto">
+              <a:buFont typeface="+mj-lt"/>
+              <a:buAutoNum type="arabicPeriod"/>
+              <a:defRPr/>
+            </a:pPr>
+            <a:r>
+              <a:rPr lang="en-US" sz="2400" dirty="0">
+                <a:ea typeface="+mn-ea"/>
+              </a:rPr>
+              <a:t>Duplicate “Mortality Rate through Time”</a:t>
+            </a:r>
+          </a:p>
+          <a:p>
+            <a:pPr marL="457200" indent="-457200" defTabSz="1306221" fontAlgn="auto">
+              <a:buFont typeface="+mj-lt"/>
+              <a:buAutoNum type="arabicPeriod"/>
+              <a:defRPr/>
+            </a:pPr>
+            <a:r>
+              <a:rPr lang="en-US" sz="2400" dirty="0">
+                <a:ea typeface="+mn-ea"/>
+              </a:rPr>
+              <a:t>Replace the Pages “Date” with “Mortality Rate (%)” (drag it on top of the existing pill)</a:t>
+            </a:r>
+          </a:p>
+          <a:p>
+            <a:pPr marL="739775" lvl="1" indent="-457200" defTabSz="1306221" fontAlgn="auto">
+              <a:buFont typeface="+mj-lt"/>
+              <a:buAutoNum type="arabicPeriod"/>
+              <a:defRPr/>
+            </a:pPr>
+            <a:endParaRPr lang="en-US" sz="2000" dirty="0">
+              <a:ea typeface="+mn-ea"/>
+            </a:endParaRPr>
+          </a:p>
+          <a:p>
+            <a:pPr marL="457200" indent="-457200" defTabSz="1306221" fontAlgn="auto">
+              <a:buFont typeface="+mj-lt"/>
+              <a:buAutoNum type="arabicPeriod"/>
+              <a:defRPr/>
+            </a:pPr>
+            <a:endParaRPr lang="en-US" sz="2400" dirty="0">
+              <a:ea typeface="+mn-ea"/>
+            </a:endParaRPr>
+          </a:p>
+        </p:txBody>
+      </p:sp>
+      <p:sp>
+        <p:nvSpPr>
+          <p:cNvPr id="3" name="Text Placeholder 2"/>
+          <p:cNvSpPr>
+            <a:spLocks noGrp="1"/>
+          </p:cNvSpPr>
+          <p:nvPr>
+            <p:ph type="body" sz="quarter" idx="12"/>
+          </p:nvPr>
+        </p:nvSpPr>
+        <p:spPr>
+          <a:prstGeom prst="rect">
+            <a:avLst/>
+          </a:prstGeom>
+        </p:spPr>
+        <p:txBody>
+          <a:bodyPr/>
+          <a:lstStyle/>
+          <a:p>
+            <a:pPr>
+              <a:spcBef>
+                <a:spcPct val="0"/>
+              </a:spcBef>
+            </a:pPr>
+            <a:r>
+              <a:rPr lang="en-US" b="1" dirty="0">
+                <a:latin typeface="BentonSans Book" charset="0"/>
+              </a:rPr>
+              <a:t>Germ Theory of Disease – (slightly) Advanced Viz</a:t>
+            </a:r>
+          </a:p>
+        </p:txBody>
+      </p:sp>
+    </p:spTree>
+    <p:extLst>
+      <p:ext uri="{BB962C8B-B14F-4D97-AF65-F5344CB8AC3E}">
+        <p14:creationId xmlns:p14="http://schemas.microsoft.com/office/powerpoint/2010/main" val="181456720"/>
+      </p:ext>
+    </p:extLst>
+  </p:cSld>
+  <p:clrMapOvr>
+    <a:masterClrMapping/>
+  </p:clrMapOvr>
+  <p:transition spd="slow">
+    <p:cover/>
+  </p:transition>
+  <p:timing>
+    <p:tnLst>
+      <p:par>
+        <p:cTn id="1" dur="indefinite" restart="never" nodeType="tmRoot">
+          <p:childTnLst>
+            <p:seq concurrent="1" nextAc="seek">
+              <p:cTn id="2" dur="indefinite" nodeType="mainSeq">
+                <p:childTnLst>
+                  <p:par>
+                    <p:cTn id="3" fill="hold">
+                      <p:stCondLst>
+                        <p:cond delay="indefinite"/>
+                      </p:stCondLst>
+                      <p:childTnLst>
+                        <p:par>
+                          <p:cTn id="4" fill="hold">
+                            <p:stCondLst>
+                              <p:cond delay="0"/>
+                            </p:stCondLst>
+                            <p:childTnLst>
+                              <p:par>
+                                <p:cTn id="5" presetID="10" presetClass="entr" presetSubtype="0" fill="hold" grpId="0" nodeType="clickEffect">
+                                  <p:stCondLst>
+                                    <p:cond delay="0"/>
+                                  </p:stCondLst>
+                                  <p:childTnLst>
+                                    <p:set>
+                                      <p:cBhvr>
+                                        <p:cTn id="6" dur="1" fill="hold">
+                                          <p:stCondLst>
+                                            <p:cond delay="0"/>
+                                          </p:stCondLst>
+                                        </p:cTn>
+                                        <p:tgtEl>
+                                          <p:spTgt spid="2">
+                                            <p:txEl>
+                                              <p:pRg st="0" end="0"/>
+                                            </p:txEl>
+                                          </p:spTgt>
+                                        </p:tgtEl>
+                                        <p:attrNameLst>
+                                          <p:attrName>style.visibility</p:attrName>
+                                        </p:attrNameLst>
+                                      </p:cBhvr>
+                                      <p:to>
+                                        <p:strVal val="visible"/>
+                                      </p:to>
+                                    </p:set>
+                                    <p:animEffect transition="in" filter="fade">
+                                      <p:cBhvr>
+                                        <p:cTn id="7" dur="500"/>
+                                        <p:tgtEl>
+                                          <p:spTgt spid="2">
+                                            <p:txEl>
+                                              <p:pRg st="0" end="0"/>
+                                            </p:txEl>
+                                          </p:spTgt>
+                                        </p:tgtEl>
+                                      </p:cBhvr>
+                                    </p:animEffect>
+                                  </p:childTnLst>
+                                </p:cTn>
+                              </p:par>
+                            </p:childTnLst>
+                          </p:cTn>
+                        </p:par>
+                      </p:childTnLst>
+                    </p:cTn>
+                  </p:par>
+                  <p:par>
+                    <p:cTn id="8" fill="hold">
+                      <p:stCondLst>
+                        <p:cond delay="indefinite"/>
+                      </p:stCondLst>
+                      <p:childTnLst>
+                        <p:par>
+                          <p:cTn id="9" fill="hold">
+                            <p:stCondLst>
+                              <p:cond delay="0"/>
+                            </p:stCondLst>
+                            <p:childTnLst>
+                              <p:par>
+                                <p:cTn id="10" presetID="10" presetClass="entr" presetSubtype="0" fill="hold" grpId="0" nodeType="clickEffect">
+                                  <p:stCondLst>
+                                    <p:cond delay="0"/>
+                                  </p:stCondLst>
+                                  <p:childTnLst>
+                                    <p:set>
+                                      <p:cBhvr>
+                                        <p:cTn id="11" dur="1" fill="hold">
+                                          <p:stCondLst>
+                                            <p:cond delay="0"/>
+                                          </p:stCondLst>
+                                        </p:cTn>
+                                        <p:tgtEl>
+                                          <p:spTgt spid="2">
+                                            <p:txEl>
+                                              <p:pRg st="1" end="1"/>
+                                            </p:txEl>
+                                          </p:spTgt>
+                                        </p:tgtEl>
+                                        <p:attrNameLst>
+                                          <p:attrName>style.visibility</p:attrName>
+                                        </p:attrNameLst>
+                                      </p:cBhvr>
+                                      <p:to>
+                                        <p:strVal val="visible"/>
+                                      </p:to>
+                                    </p:set>
+                                    <p:animEffect transition="in" filter="fade">
+                                      <p:cBhvr>
+                                        <p:cTn id="12" dur="500"/>
+                                        <p:tgtEl>
+                                          <p:spTgt spid="2">
+                                            <p:txEl>
+                                              <p:pRg st="1" end="1"/>
+                                            </p:txEl>
+                                          </p:spTgt>
+                                        </p:tgtEl>
+                                      </p:cBhvr>
+                                    </p:animEffect>
+                                  </p:childTnLst>
+                                </p:cTn>
+                              </p:par>
+                            </p:childTnLst>
+                          </p:cTn>
+                        </p:par>
+                      </p:childTnLst>
+                    </p:cTn>
+                  </p:par>
+                  <p:par>
+                    <p:cTn id="13" fill="hold">
+                      <p:stCondLst>
+                        <p:cond delay="indefinite"/>
+                      </p:stCondLst>
+                      <p:childTnLst>
+                        <p:par>
+                          <p:cTn id="14" fill="hold">
+                            <p:stCondLst>
+                              <p:cond delay="0"/>
+                            </p:stCondLst>
+                            <p:childTnLst>
+                              <p:par>
+                                <p:cTn id="15" presetID="10" presetClass="entr" presetSubtype="0" fill="hold" grpId="0" nodeType="clickEffect">
+                                  <p:stCondLst>
+                                    <p:cond delay="0"/>
+                                  </p:stCondLst>
+                                  <p:childTnLst>
+                                    <p:set>
+                                      <p:cBhvr>
+                                        <p:cTn id="16" dur="1" fill="hold">
+                                          <p:stCondLst>
+                                            <p:cond delay="0"/>
+                                          </p:stCondLst>
+                                        </p:cTn>
+                                        <p:tgtEl>
+                                          <p:spTgt spid="2">
+                                            <p:txEl>
+                                              <p:pRg st="2" end="2"/>
+                                            </p:txEl>
+                                          </p:spTgt>
+                                        </p:tgtEl>
+                                        <p:attrNameLst>
+                                          <p:attrName>style.visibility</p:attrName>
+                                        </p:attrNameLst>
+                                      </p:cBhvr>
+                                      <p:to>
+                                        <p:strVal val="visible"/>
+                                      </p:to>
+                                    </p:set>
+                                    <p:animEffect transition="in" filter="fade">
+                                      <p:cBhvr>
+                                        <p:cTn id="17" dur="500"/>
+                                        <p:tgtEl>
+                                          <p:spTgt spid="2">
+                                            <p:txEl>
+                                              <p:pRg st="2" end="2"/>
+                                            </p:txEl>
+                                          </p:spTgt>
+                                        </p:tgtEl>
+                                      </p:cBhvr>
+                                    </p:animEffect>
+                                  </p:childTnLst>
+                                </p:cTn>
+                              </p:par>
+                            </p:childTnLst>
+                          </p:cTn>
+                        </p:par>
+                      </p:childTnLst>
+                    </p:cTn>
+                  </p:par>
+                  <p:par>
+                    <p:cTn id="18" fill="hold">
+                      <p:stCondLst>
+                        <p:cond delay="indefinite"/>
+                      </p:stCondLst>
+                      <p:childTnLst>
+                        <p:par>
+                          <p:cTn id="19" fill="hold">
+                            <p:stCondLst>
+                              <p:cond delay="0"/>
+                            </p:stCondLst>
+                            <p:childTnLst>
+                              <p:par>
+                                <p:cTn id="20" presetID="10" presetClass="entr" presetSubtype="0" fill="hold" grpId="0" nodeType="clickEffect">
+                                  <p:stCondLst>
+                                    <p:cond delay="0"/>
+                                  </p:stCondLst>
+                                  <p:childTnLst>
+                                    <p:set>
+                                      <p:cBhvr>
+                                        <p:cTn id="21" dur="1" fill="hold">
+                                          <p:stCondLst>
+                                            <p:cond delay="0"/>
+                                          </p:stCondLst>
+                                        </p:cTn>
+                                        <p:tgtEl>
+                                          <p:spTgt spid="2">
+                                            <p:txEl>
+                                              <p:pRg st="3" end="3"/>
+                                            </p:txEl>
+                                          </p:spTgt>
+                                        </p:tgtEl>
+                                        <p:attrNameLst>
+                                          <p:attrName>style.visibility</p:attrName>
+                                        </p:attrNameLst>
+                                      </p:cBhvr>
+                                      <p:to>
+                                        <p:strVal val="visible"/>
+                                      </p:to>
+                                    </p:set>
+                                    <p:animEffect transition="in" filter="fade">
+                                      <p:cBhvr>
+                                        <p:cTn id="22" dur="500"/>
+                                        <p:tgtEl>
+                                          <p:spTgt spid="2">
+                                            <p:txEl>
+                                              <p:pRg st="3" end="3"/>
+                                            </p:txEl>
+                                          </p:spTgt>
+                                        </p:tgtEl>
+                                      </p:cBhvr>
+                                    </p:animEffect>
+                                  </p:childTnLst>
+                                </p:cTn>
+                              </p:par>
+                            </p:childTnLst>
+                          </p:cTn>
+                        </p:par>
+                      </p:childTnLst>
+                    </p:cTn>
+                  </p:par>
+                  <p:par>
+                    <p:cTn id="23" fill="hold">
+                      <p:stCondLst>
+                        <p:cond delay="indefinite"/>
+                      </p:stCondLst>
+                      <p:childTnLst>
+                        <p:par>
+                          <p:cTn id="24" fill="hold">
+                            <p:stCondLst>
+                              <p:cond delay="0"/>
+                            </p:stCondLst>
+                            <p:childTnLst>
+                              <p:par>
+                                <p:cTn id="25" presetID="10" presetClass="entr" presetSubtype="0" fill="hold" grpId="0" nodeType="clickEffect">
+                                  <p:stCondLst>
+                                    <p:cond delay="0"/>
+                                  </p:stCondLst>
+                                  <p:childTnLst>
+                                    <p:set>
+                                      <p:cBhvr>
+                                        <p:cTn id="26" dur="1" fill="hold">
+                                          <p:stCondLst>
+                                            <p:cond delay="0"/>
+                                          </p:stCondLst>
+                                        </p:cTn>
+                                        <p:tgtEl>
+                                          <p:spTgt spid="2">
+                                            <p:txEl>
+                                              <p:pRg st="4" end="4"/>
+                                            </p:txEl>
+                                          </p:spTgt>
+                                        </p:tgtEl>
+                                        <p:attrNameLst>
+                                          <p:attrName>style.visibility</p:attrName>
+                                        </p:attrNameLst>
+                                      </p:cBhvr>
+                                      <p:to>
+                                        <p:strVal val="visible"/>
+                                      </p:to>
+                                    </p:set>
+                                    <p:animEffect transition="in" filter="fade">
+                                      <p:cBhvr>
+                                        <p:cTn id="27" dur="500"/>
+                                        <p:tgtEl>
+                                          <p:spTgt spid="2">
+                                            <p:txEl>
+                                              <p:pRg st="4" end="4"/>
+                                            </p:txEl>
+                                          </p:spTgt>
+                                        </p:tgtEl>
+                                      </p:cBhvr>
+                                    </p:animEffect>
+                                  </p:childTnLst>
+                                </p:cTn>
+                              </p:par>
+                            </p:childTnLst>
+                          </p:cTn>
+                        </p:par>
+                      </p:childTnLst>
+                    </p:cTn>
+                  </p:par>
+                  <p:par>
+                    <p:cTn id="28" fill="hold">
+                      <p:stCondLst>
+                        <p:cond delay="indefinite"/>
+                      </p:stCondLst>
+                      <p:childTnLst>
+                        <p:par>
+                          <p:cTn id="29" fill="hold">
+                            <p:stCondLst>
+                              <p:cond delay="0"/>
+                            </p:stCondLst>
+                            <p:childTnLst>
+                              <p:par>
+                                <p:cTn id="30" presetID="10" presetClass="entr" presetSubtype="0" fill="hold" grpId="0" nodeType="clickEffect">
+                                  <p:stCondLst>
+                                    <p:cond delay="0"/>
+                                  </p:stCondLst>
+                                  <p:childTnLst>
+                                    <p:set>
+                                      <p:cBhvr>
+                                        <p:cTn id="31" dur="1" fill="hold">
+                                          <p:stCondLst>
+                                            <p:cond delay="0"/>
+                                          </p:stCondLst>
+                                        </p:cTn>
+                                        <p:tgtEl>
+                                          <p:spTgt spid="2">
+                                            <p:txEl>
+                                              <p:pRg st="5" end="5"/>
+                                            </p:txEl>
+                                          </p:spTgt>
+                                        </p:tgtEl>
+                                        <p:attrNameLst>
+                                          <p:attrName>style.visibility</p:attrName>
+                                        </p:attrNameLst>
+                                      </p:cBhvr>
+                                      <p:to>
+                                        <p:strVal val="visible"/>
+                                      </p:to>
+                                    </p:set>
+                                    <p:animEffect transition="in" filter="fade">
+                                      <p:cBhvr>
+                                        <p:cTn id="32" dur="500"/>
+                                        <p:tgtEl>
+                                          <p:spTgt spid="2">
+                                            <p:txEl>
+                                              <p:pRg st="5" end="5"/>
+                                            </p:txEl>
+                                          </p:spTgt>
+                                        </p:tgtEl>
+                                      </p:cBhvr>
+                                    </p:animEffect>
+                                  </p:childTnLst>
+                                </p:cTn>
+                              </p:par>
+                              <p:par>
+                                <p:cTn id="33" presetID="10" presetClass="entr" presetSubtype="0" fill="hold" grpId="0" nodeType="withEffect">
+                                  <p:stCondLst>
+                                    <p:cond delay="0"/>
+                                  </p:stCondLst>
+                                  <p:childTnLst>
+                                    <p:set>
+                                      <p:cBhvr>
+                                        <p:cTn id="34" dur="1" fill="hold">
+                                          <p:stCondLst>
+                                            <p:cond delay="0"/>
+                                          </p:stCondLst>
+                                        </p:cTn>
+                                        <p:tgtEl>
+                                          <p:spTgt spid="2">
+                                            <p:txEl>
+                                              <p:pRg st="6" end="6"/>
+                                            </p:txEl>
+                                          </p:spTgt>
+                                        </p:tgtEl>
+                                        <p:attrNameLst>
+                                          <p:attrName>style.visibility</p:attrName>
+                                        </p:attrNameLst>
+                                      </p:cBhvr>
+                                      <p:to>
+                                        <p:strVal val="visible"/>
+                                      </p:to>
+                                    </p:set>
+                                    <p:animEffect transition="in" filter="fade">
+                                      <p:cBhvr>
+                                        <p:cTn id="35" dur="500"/>
+                                        <p:tgtEl>
+                                          <p:spTgt spid="2">
+                                            <p:txEl>
+                                              <p:pRg st="6" end="6"/>
+                                            </p:txEl>
+                                          </p:spTgt>
+                                        </p:tgtEl>
+                                      </p:cBhvr>
+                                    </p:animEffect>
+                                  </p:childTnLst>
+                                </p:cTn>
+                              </p:par>
+                            </p:childTnLst>
+                          </p:cTn>
+                        </p:par>
+                      </p:childTnLst>
+                    </p:cTn>
+                  </p:par>
+                  <p:par>
+                    <p:cTn id="36" fill="hold">
+                      <p:stCondLst>
+                        <p:cond delay="indefinite"/>
+                      </p:stCondLst>
+                      <p:childTnLst>
+                        <p:par>
+                          <p:cTn id="37" fill="hold">
+                            <p:stCondLst>
+                              <p:cond delay="0"/>
+                            </p:stCondLst>
+                            <p:childTnLst>
+                              <p:par>
+                                <p:cTn id="38" presetID="10" presetClass="entr" presetSubtype="0" fill="hold" grpId="0" nodeType="clickEffect">
+                                  <p:stCondLst>
+                                    <p:cond delay="0"/>
+                                  </p:stCondLst>
+                                  <p:childTnLst>
+                                    <p:set>
+                                      <p:cBhvr>
+                                        <p:cTn id="39" dur="1" fill="hold">
+                                          <p:stCondLst>
+                                            <p:cond delay="0"/>
+                                          </p:stCondLst>
+                                        </p:cTn>
+                                        <p:tgtEl>
+                                          <p:spTgt spid="2">
+                                            <p:txEl>
+                                              <p:pRg st="7" end="7"/>
+                                            </p:txEl>
+                                          </p:spTgt>
+                                        </p:tgtEl>
+                                        <p:attrNameLst>
+                                          <p:attrName>style.visibility</p:attrName>
+                                        </p:attrNameLst>
+                                      </p:cBhvr>
+                                      <p:to>
+                                        <p:strVal val="visible"/>
+                                      </p:to>
+                                    </p:set>
+                                    <p:animEffect transition="in" filter="fade">
+                                      <p:cBhvr>
+                                        <p:cTn id="40" dur="500"/>
+                                        <p:tgtEl>
+                                          <p:spTgt spid="2">
+                                            <p:txEl>
+                                              <p:pRg st="7" end="7"/>
+                                            </p:txEl>
+                                          </p:spTgt>
+                                        </p:tgtEl>
+                                      </p:cBhvr>
+                                    </p:animEffect>
+                                  </p:childTnLst>
+                                </p:cTn>
+                              </p:par>
+                            </p:childTnLst>
+                          </p:cTn>
+                        </p:par>
+                      </p:childTnLst>
+                    </p:cTn>
+                  </p:par>
+                  <p:par>
+                    <p:cTn id="41" fill="hold">
+                      <p:stCondLst>
+                        <p:cond delay="indefinite"/>
+                      </p:stCondLst>
+                      <p:childTnLst>
+                        <p:par>
+                          <p:cTn id="42" fill="hold">
+                            <p:stCondLst>
+                              <p:cond delay="0"/>
+                            </p:stCondLst>
+                            <p:childTnLst>
+                              <p:par>
+                                <p:cTn id="43" presetID="10" presetClass="entr" presetSubtype="0" fill="hold" grpId="0" nodeType="clickEffect">
+                                  <p:stCondLst>
+                                    <p:cond delay="0"/>
+                                  </p:stCondLst>
+                                  <p:childTnLst>
+                                    <p:set>
+                                      <p:cBhvr>
+                                        <p:cTn id="44" dur="1" fill="hold">
+                                          <p:stCondLst>
+                                            <p:cond delay="0"/>
+                                          </p:stCondLst>
+                                        </p:cTn>
+                                        <p:tgtEl>
+                                          <p:spTgt spid="2">
+                                            <p:txEl>
+                                              <p:pRg st="8" end="8"/>
+                                            </p:txEl>
+                                          </p:spTgt>
+                                        </p:tgtEl>
+                                        <p:attrNameLst>
+                                          <p:attrName>style.visibility</p:attrName>
+                                        </p:attrNameLst>
+                                      </p:cBhvr>
+                                      <p:to>
+                                        <p:strVal val="visible"/>
+                                      </p:to>
+                                    </p:set>
+                                    <p:animEffect transition="in" filter="fade">
+                                      <p:cBhvr>
+                                        <p:cTn id="45" dur="500"/>
+                                        <p:tgtEl>
+                                          <p:spTgt spid="2">
+                                            <p:txEl>
+                                              <p:pRg st="8" end="8"/>
+                                            </p:txEl>
+                                          </p:spTgt>
+                                        </p:tgtEl>
+                                      </p:cBhvr>
+                                    </p:animEffect>
+                                  </p:childTnLst>
+                                </p:cTn>
+                              </p:par>
+                            </p:childTnLst>
+                          </p:cTn>
+                        </p:par>
+                      </p:childTnLst>
+                    </p:cTn>
+                  </p:par>
+                  <p:par>
+                    <p:cTn id="46" fill="hold">
+                      <p:stCondLst>
+                        <p:cond delay="indefinite"/>
+                      </p:stCondLst>
+                      <p:childTnLst>
+                        <p:par>
+                          <p:cTn id="47" fill="hold">
+                            <p:stCondLst>
+                              <p:cond delay="0"/>
+                            </p:stCondLst>
+                            <p:childTnLst>
+                              <p:par>
+                                <p:cTn id="48" presetID="10" presetClass="entr" presetSubtype="0" fill="hold" grpId="0" nodeType="clickEffect">
+                                  <p:stCondLst>
+                                    <p:cond delay="0"/>
+                                  </p:stCondLst>
+                                  <p:childTnLst>
+                                    <p:set>
+                                      <p:cBhvr>
+                                        <p:cTn id="49" dur="1" fill="hold">
+                                          <p:stCondLst>
+                                            <p:cond delay="0"/>
+                                          </p:stCondLst>
+                                        </p:cTn>
+                                        <p:tgtEl>
+                                          <p:spTgt spid="2">
+                                            <p:txEl>
+                                              <p:pRg st="9" end="9"/>
+                                            </p:txEl>
+                                          </p:spTgt>
+                                        </p:tgtEl>
+                                        <p:attrNameLst>
+                                          <p:attrName>style.visibility</p:attrName>
+                                        </p:attrNameLst>
+                                      </p:cBhvr>
+                                      <p:to>
+                                        <p:strVal val="visible"/>
+                                      </p:to>
+                                    </p:set>
+                                    <p:animEffect transition="in" filter="fade">
+                                      <p:cBhvr>
+                                        <p:cTn id="50" dur="500"/>
+                                        <p:tgtEl>
+                                          <p:spTgt spid="2">
+                                            <p:txEl>
+                                              <p:pRg st="9" end="9"/>
+                                            </p:txEl>
+                                          </p:spTgt>
+                                        </p:tgtEl>
+                                      </p:cBhvr>
+                                    </p:animEffect>
+                                  </p:childTnLst>
+                                </p:cTn>
+                              </p:par>
+                            </p:childTnLst>
+                          </p:cTn>
+                        </p:par>
+                      </p:childTnLst>
+                    </p:cTn>
+                  </p:par>
+                  <p:par>
+                    <p:cTn id="51" fill="hold">
+                      <p:stCondLst>
+                        <p:cond delay="indefinite"/>
+                      </p:stCondLst>
+                      <p:childTnLst>
+                        <p:par>
+                          <p:cTn id="52" fill="hold">
+                            <p:stCondLst>
+                              <p:cond delay="0"/>
+                            </p:stCondLst>
+                            <p:childTnLst>
+                              <p:par>
+                                <p:cTn id="53" presetID="10" presetClass="entr" presetSubtype="0" fill="hold" grpId="0" nodeType="clickEffect">
+                                  <p:stCondLst>
+                                    <p:cond delay="0"/>
+                                  </p:stCondLst>
+                                  <p:childTnLst>
+                                    <p:set>
+                                      <p:cBhvr>
+                                        <p:cTn id="54" dur="1" fill="hold">
+                                          <p:stCondLst>
+                                            <p:cond delay="0"/>
+                                          </p:stCondLst>
+                                        </p:cTn>
+                                        <p:tgtEl>
+                                          <p:spTgt spid="2">
+                                            <p:txEl>
+                                              <p:pRg st="10" end="10"/>
+                                            </p:txEl>
+                                          </p:spTgt>
+                                        </p:tgtEl>
+                                        <p:attrNameLst>
+                                          <p:attrName>style.visibility</p:attrName>
+                                        </p:attrNameLst>
+                                      </p:cBhvr>
+                                      <p:to>
+                                        <p:strVal val="visible"/>
+                                      </p:to>
+                                    </p:set>
+                                    <p:animEffect transition="in" filter="fade">
+                                      <p:cBhvr>
+                                        <p:cTn id="55" dur="500"/>
+                                        <p:tgtEl>
+                                          <p:spTgt spid="2">
+                                            <p:txEl>
+                                              <p:pRg st="10" end="10"/>
+                                            </p:txEl>
+                                          </p:spTgt>
+                                        </p:tgtEl>
+                                      </p:cBhvr>
+                                    </p:animEffect>
+                                  </p:childTnLst>
+                                </p:cTn>
+                              </p:par>
+                            </p:childTnLst>
+                          </p:cTn>
+                        </p:par>
+                      </p:childTnLst>
+                    </p:cTn>
+                  </p:par>
+                </p:childTnLst>
+              </p:cTn>
+              <p:prevCondLst>
+                <p:cond evt="onPrev" delay="0">
+                  <p:tgtEl>
+                    <p:sldTgt/>
+                  </p:tgtEl>
+                </p:cond>
+              </p:prevCondLst>
+              <p:nextCondLst>
+                <p:cond evt="onNext" delay="0">
+                  <p:tgtEl>
+                    <p:sldTgt/>
+                  </p:tgtEl>
+                </p:cond>
+              </p:nextCondLst>
+            </p:seq>
+          </p:childTnLst>
+        </p:cTn>
+      </p:par>
+    </p:tnLst>
+    <p:bldLst>
+      <p:bldP spid="2" grpId="0" uiExpand="1" build="p"/>
+    </p:bldLst>
+  </p:timing>
+</p:sld>
+</file>
+
+<file path=ppt/slides/slide35.xml><?xml version="1.0" encoding="utf-8"?>
+<p:sld xmlns:a="http://schemas.openxmlformats.org/drawingml/2006/main" xmlns:r="http://schemas.openxmlformats.org/officeDocument/2006/relationships" xmlns:p="http://schemas.openxmlformats.org/presentationml/2006/main">
+  <p:cSld>
+    <p:spTree>
+      <p:nvGrpSpPr>
+        <p:cNvPr id="1" name=""/>
+        <p:cNvGrpSpPr/>
+        <p:nvPr/>
+      </p:nvGrpSpPr>
+      <p:grpSpPr>
+        <a:xfrm>
+          <a:off x="0" y="0"/>
+          <a:ext cx="0" cy="0"/>
+          <a:chOff x="0" y="0"/>
+          <a:chExt cx="0" cy="0"/>
+        </a:xfrm>
+      </p:grpSpPr>
+      <p:sp>
+        <p:nvSpPr>
+          <p:cNvPr id="2" name="Content Placeholder 1"/>
+          <p:cNvSpPr>
+            <a:spLocks noGrp="1"/>
+          </p:cNvSpPr>
+          <p:nvPr>
+            <p:ph idx="14"/>
+          </p:nvPr>
+        </p:nvSpPr>
+        <p:spPr>
+          <a:xfrm>
+            <a:off x="704476" y="1893515"/>
+            <a:ext cx="13273820" cy="3939540"/>
+          </a:xfrm>
+        </p:spPr>
+        <p:txBody>
+          <a:bodyPr/>
+          <a:lstStyle/>
+          <a:p>
+            <a:pPr marL="457200" indent="-457200" defTabSz="1306221" fontAlgn="auto">
+              <a:buFont typeface="+mj-lt"/>
+              <a:buAutoNum type="arabicPeriod"/>
+              <a:defRPr/>
+            </a:pPr>
+            <a:r>
+              <a:rPr lang="en-US" sz="2400" dirty="0"/>
+              <a:t>Create a new dashboard (the grid icon to the right of the tabs)</a:t>
+            </a:r>
+          </a:p>
+          <a:p>
+            <a:pPr marL="457200" indent="-457200" defTabSz="1306221" fontAlgn="auto">
+              <a:buFont typeface="+mj-lt"/>
+              <a:buAutoNum type="arabicPeriod"/>
+              <a:defRPr/>
+            </a:pPr>
+            <a:r>
+              <a:rPr lang="en-US" sz="2400" dirty="0"/>
+              <a:t>Switch “Size” to “Automatic”</a:t>
+            </a:r>
+          </a:p>
+          <a:p>
+            <a:pPr marL="457200" indent="-457200" defTabSz="1306221" fontAlgn="auto">
+              <a:buFont typeface="+mj-lt"/>
+              <a:buAutoNum type="arabicPeriod"/>
+              <a:defRPr/>
+            </a:pPr>
+            <a:r>
+              <a:rPr lang="en-US" sz="2400" dirty="0"/>
+              <a:t>Drag out “Mortality Rate over Time”</a:t>
+            </a:r>
+          </a:p>
+          <a:p>
+            <a:pPr marL="457200" indent="-457200" defTabSz="1306221" fontAlgn="auto">
+              <a:buFont typeface="+mj-lt"/>
+              <a:buAutoNum type="arabicPeriod"/>
+              <a:defRPr/>
+            </a:pPr>
+            <a:r>
+              <a:rPr lang="en-US" sz="2400" dirty="0"/>
+              <a:t>Drag out “Mortality By Month” (below “Mortality Rate over Time)</a:t>
+            </a:r>
+          </a:p>
+          <a:p>
+            <a:pPr marL="457200" indent="-457200" defTabSz="1306221" fontAlgn="auto">
+              <a:buFont typeface="+mj-lt"/>
+              <a:buAutoNum type="arabicPeriod"/>
+              <a:defRPr/>
+            </a:pPr>
+            <a:r>
+              <a:rPr lang="en-US" sz="2400" dirty="0"/>
+              <a:t>Select “Mortality By Month” and click the “Use as Filter” button</a:t>
+            </a:r>
+          </a:p>
+          <a:p>
+            <a:pPr marL="457200" indent="-457200" defTabSz="1306221" fontAlgn="auto">
+              <a:buFont typeface="+mj-lt"/>
+              <a:buAutoNum type="arabicPeriod"/>
+              <a:defRPr/>
+            </a:pPr>
+            <a:r>
+              <a:rPr lang="en-US" sz="2400" dirty="0"/>
+              <a:t>Try clicking a mark in the “Mortality By Month” sheet</a:t>
+            </a:r>
+          </a:p>
+          <a:p>
+            <a:pPr marL="457200" indent="-457200" defTabSz="1306221" fontAlgn="auto">
+              <a:buFont typeface="+mj-lt"/>
+              <a:buAutoNum type="arabicPeriod"/>
+              <a:defRPr/>
+            </a:pPr>
+            <a:r>
+              <a:rPr lang="en-US" sz="2400" dirty="0"/>
+              <a:t>Rename the dashboard (I called it “Mortality Rate Dashboard”)</a:t>
+            </a:r>
+          </a:p>
+          <a:p>
+            <a:pPr marL="457200" indent="-457200" defTabSz="1306221" fontAlgn="auto">
+              <a:buFont typeface="+mj-lt"/>
+              <a:buAutoNum type="arabicPeriod"/>
+              <a:defRPr/>
+            </a:pPr>
+            <a:endParaRPr lang="en-US" sz="2400" dirty="0"/>
+          </a:p>
+          <a:p>
+            <a:pPr marL="457200" indent="-457200" defTabSz="1306221" fontAlgn="auto">
+              <a:buFont typeface="+mj-lt"/>
+              <a:buAutoNum type="arabicPeriod"/>
+              <a:defRPr/>
+            </a:pPr>
+            <a:endParaRPr lang="en-US" sz="2400" dirty="0"/>
+          </a:p>
+        </p:txBody>
+      </p:sp>
+      <p:sp>
+        <p:nvSpPr>
+          <p:cNvPr id="3" name="Text Placeholder 2"/>
+          <p:cNvSpPr>
+            <a:spLocks noGrp="1"/>
+          </p:cNvSpPr>
+          <p:nvPr>
+            <p:ph type="body" sz="quarter" idx="12"/>
+          </p:nvPr>
+        </p:nvSpPr>
+        <p:spPr>
+          <a:prstGeom prst="rect">
+            <a:avLst/>
+          </a:prstGeom>
+        </p:spPr>
+        <p:txBody>
+          <a:bodyPr/>
+          <a:lstStyle/>
+          <a:p>
+            <a:pPr>
+              <a:spcBef>
+                <a:spcPct val="0"/>
+              </a:spcBef>
+            </a:pPr>
+            <a:r>
+              <a:rPr lang="en-US" b="1" dirty="0">
+                <a:latin typeface="BentonSans Book" charset="0"/>
+              </a:rPr>
+              <a:t>Germ Theory of Disease – Dashboard</a:t>
+            </a:r>
+          </a:p>
+        </p:txBody>
+      </p:sp>
+    </p:spTree>
+    <p:extLst>
+      <p:ext uri="{BB962C8B-B14F-4D97-AF65-F5344CB8AC3E}">
+        <p14:creationId xmlns:p14="http://schemas.microsoft.com/office/powerpoint/2010/main" val="3475227266"/>
+      </p:ext>
+    </p:extLst>
+  </p:cSld>
+  <p:clrMapOvr>
+    <a:masterClrMapping/>
+  </p:clrMapOvr>
+  <p:transition spd="slow">
+    <p:cover/>
+  </p:transition>
+</p:sld>
+</file>
+
+<file path=ppt/slides/slide36.xml><?xml version="1.0" encoding="utf-8"?>
+<p:sld xmlns:a="http://schemas.openxmlformats.org/drawingml/2006/main" xmlns:r="http://schemas.openxmlformats.org/officeDocument/2006/relationships" xmlns:p="http://schemas.openxmlformats.org/presentationml/2006/main">
+  <p:cSld>
+    <p:spTree>
+      <p:nvGrpSpPr>
+        <p:cNvPr id="1" name=""/>
+        <p:cNvGrpSpPr/>
+        <p:nvPr/>
+      </p:nvGrpSpPr>
+      <p:grpSpPr>
+        <a:xfrm>
+          <a:off x="0" y="0"/>
+          <a:ext cx="0" cy="0"/>
+          <a:chOff x="0" y="0"/>
+          <a:chExt cx="0" cy="0"/>
+        </a:xfrm>
+      </p:grpSpPr>
+      <p:sp>
+        <p:nvSpPr>
+          <p:cNvPr id="2" name="Content Placeholder 1"/>
+          <p:cNvSpPr>
+            <a:spLocks noGrp="1"/>
+          </p:cNvSpPr>
+          <p:nvPr>
+            <p:ph idx="14"/>
+          </p:nvPr>
+        </p:nvSpPr>
+        <p:spPr>
+          <a:xfrm>
+            <a:off x="704476" y="1893515"/>
+            <a:ext cx="13273820" cy="5278368"/>
+          </a:xfrm>
+        </p:spPr>
+        <p:txBody>
+          <a:bodyPr/>
+          <a:lstStyle/>
+          <a:p>
+            <a:pPr marL="457200" indent="-457200" defTabSz="1306221" fontAlgn="auto">
+              <a:buFont typeface="+mj-lt"/>
+              <a:buAutoNum type="arabicPeriod"/>
+              <a:defRPr/>
+            </a:pPr>
+            <a:r>
+              <a:rPr lang="en-US" sz="2400" dirty="0"/>
+              <a:t>Create a new dashboard (the grid icon to the right of the tabs)</a:t>
+            </a:r>
+          </a:p>
+          <a:p>
+            <a:pPr marL="457200" indent="-457200" defTabSz="1306221" fontAlgn="auto">
+              <a:buFont typeface="+mj-lt"/>
+              <a:buAutoNum type="arabicPeriod"/>
+              <a:defRPr/>
+            </a:pPr>
+            <a:r>
+              <a:rPr lang="en-US" sz="2400" dirty="0"/>
+              <a:t>Switch “Size” to “Automatic”</a:t>
+            </a:r>
+          </a:p>
+          <a:p>
+            <a:pPr marL="457200" indent="-457200" defTabSz="1306221" fontAlgn="auto">
+              <a:buFont typeface="+mj-lt"/>
+              <a:buAutoNum type="arabicPeriod"/>
+              <a:defRPr/>
+            </a:pPr>
+            <a:r>
+              <a:rPr lang="en-US" sz="2400" dirty="0"/>
+              <a:t>Drag out a “Vertical” Object</a:t>
+            </a:r>
+          </a:p>
+          <a:p>
+            <a:pPr marL="457200" indent="-457200" defTabSz="1306221" fontAlgn="auto">
+              <a:buFont typeface="+mj-lt"/>
+              <a:buAutoNum type="arabicPeriod"/>
+              <a:defRPr/>
+            </a:pPr>
+            <a:r>
+              <a:rPr lang="en-US" sz="2400" dirty="0"/>
+              <a:t>Drag a “Text” Object into the “Vertical” Object and enter “Try the page controls!”</a:t>
+            </a:r>
+          </a:p>
+          <a:p>
+            <a:pPr marL="457200" indent="-457200" defTabSz="1306221" fontAlgn="auto">
+              <a:buFont typeface="+mj-lt"/>
+              <a:buAutoNum type="arabicPeriod"/>
+              <a:defRPr/>
+            </a:pPr>
+            <a:r>
+              <a:rPr lang="en-US" sz="2400" dirty="0"/>
+              <a:t>Drag out a “Horizontal” Object into the “Vertical” Object, below the “Text” Object</a:t>
+            </a:r>
+          </a:p>
+          <a:p>
+            <a:pPr marL="457200" indent="-457200" defTabSz="1306221" fontAlgn="auto">
+              <a:buFont typeface="+mj-lt"/>
+              <a:buAutoNum type="arabicPeriod"/>
+              <a:defRPr/>
+            </a:pPr>
+            <a:r>
+              <a:rPr lang="en-US" sz="2400" dirty="0"/>
+              <a:t>Drop “Mortality Rate Through Time” in</a:t>
+            </a:r>
+          </a:p>
+          <a:p>
+            <a:pPr marL="457200" indent="-457200" defTabSz="1306221" fontAlgn="auto">
+              <a:buFont typeface="+mj-lt"/>
+              <a:buAutoNum type="arabicPeriod"/>
+              <a:defRPr/>
+            </a:pPr>
+            <a:r>
+              <a:rPr lang="en-US" sz="2400" dirty="0"/>
+              <a:t>Drop “Mortality Rate Through Time (2)” in (on the right)</a:t>
+            </a:r>
+          </a:p>
+          <a:p>
+            <a:pPr marL="457200" indent="-457200" defTabSz="1306221" fontAlgn="auto">
+              <a:buFont typeface="+mj-lt"/>
+              <a:buAutoNum type="arabicPeriod"/>
+              <a:defRPr/>
+            </a:pPr>
+            <a:r>
+              <a:rPr lang="en-US" sz="2400" dirty="0"/>
+              <a:t>Name the dashboard (</a:t>
+            </a:r>
+            <a:r>
+              <a:rPr lang="en-US" sz="2400"/>
+              <a:t>I called it “Mortality Rate Through Time Dashboard”)</a:t>
+            </a:r>
+            <a:endParaRPr lang="en-US" sz="2400" dirty="0"/>
+          </a:p>
+          <a:p>
+            <a:pPr marL="457200" indent="-457200" defTabSz="1306221" fontAlgn="auto">
+              <a:buFont typeface="+mj-lt"/>
+              <a:buAutoNum type="arabicPeriod"/>
+              <a:defRPr/>
+            </a:pPr>
+            <a:r>
+              <a:rPr lang="en-US" sz="2400" dirty="0"/>
+              <a:t>Can you get the page controls to be </a:t>
+            </a:r>
+            <a:r>
+              <a:rPr lang="en-US" sz="2400" dirty="0" err="1"/>
+              <a:t>inlined</a:t>
+            </a:r>
+            <a:r>
+              <a:rPr lang="en-US" sz="2400" dirty="0"/>
+              <a:t> above each sheet?</a:t>
+            </a:r>
+          </a:p>
+          <a:p>
+            <a:pPr marL="457200" indent="-457200" defTabSz="1306221" fontAlgn="auto">
+              <a:buFont typeface="+mj-lt"/>
+              <a:buAutoNum type="arabicPeriod"/>
+              <a:defRPr/>
+            </a:pPr>
+            <a:endParaRPr lang="en-US" sz="2400" dirty="0"/>
+          </a:p>
+          <a:p>
+            <a:pPr marL="457200" indent="-457200" defTabSz="1306221" fontAlgn="auto">
+              <a:buFont typeface="+mj-lt"/>
+              <a:buAutoNum type="arabicPeriod"/>
+              <a:defRPr/>
+            </a:pPr>
+            <a:endParaRPr lang="en-US" sz="2400" dirty="0"/>
+          </a:p>
+          <a:p>
+            <a:pPr marL="457200" indent="-457200" defTabSz="1306221" fontAlgn="auto">
+              <a:buFont typeface="+mj-lt"/>
+              <a:buAutoNum type="arabicPeriod"/>
+              <a:defRPr/>
+            </a:pPr>
+            <a:endParaRPr lang="en-US" sz="2400" dirty="0"/>
+          </a:p>
+        </p:txBody>
+      </p:sp>
+      <p:sp>
+        <p:nvSpPr>
+          <p:cNvPr id="3" name="Text Placeholder 2"/>
+          <p:cNvSpPr>
+            <a:spLocks noGrp="1"/>
+          </p:cNvSpPr>
+          <p:nvPr>
+            <p:ph type="body" sz="quarter" idx="12"/>
+          </p:nvPr>
+        </p:nvSpPr>
+        <p:spPr>
+          <a:prstGeom prst="rect">
+            <a:avLst/>
+          </a:prstGeom>
+        </p:spPr>
+        <p:txBody>
+          <a:bodyPr/>
+          <a:lstStyle/>
+          <a:p>
+            <a:pPr>
+              <a:spcBef>
+                <a:spcPct val="0"/>
+              </a:spcBef>
+            </a:pPr>
+            <a:r>
+              <a:rPr lang="en-US" b="1" dirty="0">
+                <a:latin typeface="BentonSans Book" charset="0"/>
+              </a:rPr>
+              <a:t>Germ Theory of Disease – Dashboard 2</a:t>
+            </a:r>
+          </a:p>
+        </p:txBody>
+      </p:sp>
+    </p:spTree>
+    <p:extLst>
+      <p:ext uri="{BB962C8B-B14F-4D97-AF65-F5344CB8AC3E}">
+        <p14:creationId xmlns:p14="http://schemas.microsoft.com/office/powerpoint/2010/main" val="155402121"/>
+      </p:ext>
+    </p:extLst>
+  </p:cSld>
+  <p:clrMapOvr>
+    <a:masterClrMapping/>
+  </p:clrMapOvr>
+  <p:transition spd="slow">
+    <p:cover/>
+  </p:transition>
+</p:sld>
+</file>
+
+<file path=ppt/slides/slide37.xml><?xml version="1.0" encoding="utf-8"?>
+<p:sld xmlns:a="http://schemas.openxmlformats.org/drawingml/2006/main" xmlns:r="http://schemas.openxmlformats.org/officeDocument/2006/relationships" xmlns:p="http://schemas.openxmlformats.org/presentationml/2006/main">
+  <p:cSld>
+    <p:spTree>
+      <p:nvGrpSpPr>
+        <p:cNvPr id="1" name=""/>
+        <p:cNvGrpSpPr/>
+        <p:nvPr/>
+      </p:nvGrpSpPr>
+      <p:grpSpPr>
+        <a:xfrm>
+          <a:off x="0" y="0"/>
+          <a:ext cx="0" cy="0"/>
+          <a:chOff x="0" y="0"/>
+          <a:chExt cx="0" cy="0"/>
+        </a:xfrm>
+      </p:grpSpPr>
+      <p:sp>
+        <p:nvSpPr>
+          <p:cNvPr id="2" name="Content Placeholder 1"/>
+          <p:cNvSpPr>
+            <a:spLocks noGrp="1"/>
+          </p:cNvSpPr>
+          <p:nvPr>
+            <p:ph idx="14"/>
+          </p:nvPr>
+        </p:nvSpPr>
+        <p:spPr>
+          <a:xfrm>
+            <a:off x="704476" y="1893515"/>
             <a:ext cx="13273820" cy="4385816"/>
           </a:xfrm>
         </p:spPr>
@@ -19971,7 +21328,7 @@
 </p:sld>
 </file>
 
-<file path=ppt/slides/slide35.xml><?xml version="1.0" encoding="utf-8"?>
+<file path=ppt/slides/slide38.xml><?xml version="1.0" encoding="utf-8"?>
 <p:sld xmlns:a="http://schemas.openxmlformats.org/drawingml/2006/main" xmlns:r="http://schemas.openxmlformats.org/officeDocument/2006/relationships" xmlns:p="http://schemas.openxmlformats.org/presentationml/2006/main">
   <p:cSld>
     <p:spTree>
@@ -21045,7 +22402,7 @@
 </p:sld>
 </file>
 
-<file path=ppt/slides/slide36.xml><?xml version="1.0" encoding="utf-8"?>
+<file path=ppt/slides/slide39.xml><?xml version="1.0" encoding="utf-8"?>
 <p:sld xmlns:a="http://schemas.openxmlformats.org/drawingml/2006/main" xmlns:r="http://schemas.openxmlformats.org/officeDocument/2006/relationships" xmlns:p="http://schemas.openxmlformats.org/presentationml/2006/main">
   <p:cSld>
     <p:spTree>
@@ -21578,7 +22935,7 @@
               <a:rPr lang="en-US" dirty="0">
                 <a:ea typeface="+mn-ea"/>
               </a:rPr>
-              <a:t>Tableau</a:t>
+              <a:t>Interactive Tableau Tutorial</a:t>
             </a:r>
           </a:p>
           <a:p>

</xml_diff>

<commit_message>
added more workbook creation slides and title cards
</commit_message>
<xml_diff>
--- a/lecture.pptx
+++ b/lecture.pptx
@@ -5,10 +5,10 @@
     <p:sldMasterId id="2147483875" r:id="rId1"/>
   </p:sldMasterIdLst>
   <p:notesMasterIdLst>
-    <p:notesMasterId r:id="rId41"/>
+    <p:notesMasterId r:id="rId44"/>
   </p:notesMasterIdLst>
   <p:handoutMasterIdLst>
-    <p:handoutMasterId r:id="rId42"/>
+    <p:handoutMasterId r:id="rId45"/>
   </p:handoutMasterIdLst>
   <p:sldIdLst>
     <p:sldId id="256" r:id="rId2"/>
@@ -42,14 +42,17 @@
     <p:sldId id="542" r:id="rId30"/>
     <p:sldId id="568" r:id="rId31"/>
     <p:sldId id="531" r:id="rId32"/>
-    <p:sldId id="569" r:id="rId33"/>
-    <p:sldId id="570" r:id="rId34"/>
-    <p:sldId id="571" r:id="rId35"/>
-    <p:sldId id="572" r:id="rId36"/>
-    <p:sldId id="574" r:id="rId37"/>
-    <p:sldId id="573" r:id="rId38"/>
-    <p:sldId id="567" r:id="rId39"/>
-    <p:sldId id="566" r:id="rId40"/>
+    <p:sldId id="575" r:id="rId33"/>
+    <p:sldId id="569" r:id="rId34"/>
+    <p:sldId id="570" r:id="rId35"/>
+    <p:sldId id="571" r:id="rId36"/>
+    <p:sldId id="572" r:id="rId37"/>
+    <p:sldId id="574" r:id="rId38"/>
+    <p:sldId id="573" r:id="rId39"/>
+    <p:sldId id="578" r:id="rId40"/>
+    <p:sldId id="576" r:id="rId41"/>
+    <p:sldId id="567" r:id="rId42"/>
+    <p:sldId id="566" r:id="rId43"/>
   </p:sldIdLst>
   <p:sldSz cx="14630400" cy="8229600"/>
   <p:notesSz cx="6858000" cy="9144000"/>
@@ -4030,6 +4033,34 @@
           </a:bodyPr>
           <a:lstStyle/>
           <a:p>
+            <a:pPr marL="0" marR="0" lvl="0" indent="0" algn="l" defTabSz="1304925" rtl="0" eaLnBrk="1" fontAlgn="base" latinLnBrk="0" hangingPunct="1">
+              <a:lnSpc>
+                <a:spcPct val="100000"/>
+              </a:lnSpc>
+              <a:spcBef>
+                <a:spcPct val="0"/>
+              </a:spcBef>
+              <a:spcAft>
+                <a:spcPct val="0"/>
+              </a:spcAft>
+              <a:buClrTx/>
+              <a:buSzTx/>
+              <a:buFontTx/>
+              <a:buNone/>
+              <a:tabLst/>
+              <a:defRPr/>
+            </a:pPr>
+            <a:r>
+              <a:rPr lang="en-US" dirty="0">
+                <a:latin typeface="BentonSans Book" charset="0"/>
+              </a:rPr>
+              <a:t>Technology Adoption Over Time</a:t>
+            </a:r>
+            <a:endParaRPr lang="en-US" b="0" dirty="0">
+              <a:latin typeface="BentonSans Book" charset="0"/>
+            </a:endParaRPr>
+          </a:p>
+          <a:p>
             <a:pPr>
               <a:spcBef>
                 <a:spcPct val="0"/>
@@ -4059,6 +4090,31 @@
             </a:r>
           </a:p>
           <a:p>
+            <a:pPr marL="0" marR="0" lvl="0" indent="0" algn="l" defTabSz="1304925" rtl="0" eaLnBrk="1" fontAlgn="base" latinLnBrk="0" hangingPunct="1">
+              <a:lnSpc>
+                <a:spcPct val="100000"/>
+              </a:lnSpc>
+              <a:spcBef>
+                <a:spcPct val="0"/>
+              </a:spcBef>
+              <a:spcAft>
+                <a:spcPct val="0"/>
+              </a:spcAft>
+              <a:buClrTx/>
+              <a:buSzTx/>
+              <a:buFontTx/>
+              <a:buNone/>
+              <a:tabLst/>
+              <a:defRPr/>
+            </a:pPr>
+            <a:r>
+              <a:rPr lang="en-US" dirty="0">
+                <a:latin typeface="BentonSans Book" charset="0"/>
+              </a:rPr>
+              <a:t>Tableau Public</a:t>
+            </a:r>
+          </a:p>
+          <a:p>
             <a:pPr>
               <a:spcBef>
                 <a:spcPct val="0"/>
@@ -4068,44 +4124,8 @@
               <a:rPr lang="en-US" dirty="0">
                 <a:latin typeface="BentonSans Book" charset="0"/>
               </a:rPr>
-              <a:t>Technology Adoption Over Time</a:t>
-            </a:r>
-          </a:p>
-          <a:p>
-            <a:pPr>
-              <a:spcBef>
-                <a:spcPct val="0"/>
-              </a:spcBef>
-            </a:pPr>
-            <a:r>
-              <a:rPr lang="en-US" dirty="0">
-                <a:latin typeface="BentonSans Book" charset="0"/>
-              </a:rPr>
               <a:t>Anime</a:t>
             </a:r>
-          </a:p>
-          <a:p>
-            <a:pPr>
-              <a:spcBef>
-                <a:spcPct val="0"/>
-              </a:spcBef>
-            </a:pPr>
-            <a:r>
-              <a:rPr lang="en-US" dirty="0">
-                <a:latin typeface="BentonSans Book" charset="0"/>
-              </a:rPr>
-              <a:t>Tableau Public</a:t>
-            </a:r>
-          </a:p>
-          <a:p>
-            <a:pPr>
-              <a:spcBef>
-                <a:spcPct val="0"/>
-              </a:spcBef>
-            </a:pPr>
-            <a:endParaRPr lang="en-US" dirty="0">
-              <a:latin typeface="BentonSans Book" charset="0"/>
-            </a:endParaRPr>
           </a:p>
         </p:txBody>
       </p:sp>
@@ -4257,7 +4277,7 @@
       </p:grpSpPr>
       <p:sp>
         <p:nvSpPr>
-          <p:cNvPr id="2" name="Slide Image Placeholder 1"/>
+          <p:cNvPr id="38913" name="Slide Image Placeholder 1"/>
           <p:cNvSpPr>
             <a:spLocks noGrp="1" noRot="1" noChangeAspect="1"/>
           </p:cNvSpPr>
@@ -4265,11 +4285,33 @@
             <p:ph type="sldImg"/>
           </p:nvPr>
         </p:nvSpPr>
-        <p:spPr/>
+        <p:spPr bwMode="auto">
+          <a:noFill/>
+          <a:ln>
+            <a:solidFill>
+              <a:srgbClr val="000000"/>
+            </a:solidFill>
+            <a:miter lim="800000"/>
+            <a:headEnd/>
+            <a:tailEnd/>
+          </a:ln>
+          <a:extLst>
+            <a:ext uri="{909E8E84-426E-40dd-AFC4-6F175D3DCCD1}">
+              <a14:hiddenFill xmlns:a14="http://schemas.microsoft.com/office/drawing/2010/main" xmlns="">
+                <a:solidFill>
+                  <a:srgbClr val="FFFFFF"/>
+                </a:solidFill>
+              </a14:hiddenFill>
+            </a:ext>
+            <a:ext uri="{FAA26D3D-D897-4be2-8F04-BA451C77F1D7}">
+              <ma14:placeholderFlag xmlns:ma14="http://schemas.microsoft.com/office/mac/drawingml/2011/main" xmlns="" val="1"/>
+            </a:ext>
+          </a:extLst>
+        </p:spPr>
       </p:sp>
       <p:sp>
         <p:nvSpPr>
-          <p:cNvPr id="3" name="Notes Placeholder 2"/>
+          <p:cNvPr id="38914" name="Notes Placeholder 2"/>
           <p:cNvSpPr>
             <a:spLocks noGrp="1"/>
           </p:cNvSpPr>
@@ -4277,19 +4319,57 @@
             <p:ph type="body" idx="1"/>
           </p:nvPr>
         </p:nvSpPr>
-        <p:spPr/>
+        <p:spPr bwMode="auto">
+          <a:noFill/>
+          <a:extLst>
+            <a:ext uri="{909E8E84-426E-40dd-AFC4-6F175D3DCCD1}">
+              <a14:hiddenFill xmlns:a14="http://schemas.microsoft.com/office/drawing/2010/main" xmlns="">
+                <a:solidFill>
+                  <a:srgbClr val="FFFFFF"/>
+                </a:solidFill>
+              </a14:hiddenFill>
+            </a:ext>
+            <a:ext uri="{91240B29-F687-4f45-9708-019B960494DF}">
+              <a14:hiddenLine xmlns:a14="http://schemas.microsoft.com/office/drawing/2010/main" xmlns="" w="9525">
+                <a:solidFill>
+                  <a:srgbClr val="000000"/>
+                </a:solidFill>
+                <a:miter lim="800000"/>
+                <a:headEnd/>
+                <a:tailEnd/>
+              </a14:hiddenLine>
+            </a:ext>
+          </a:extLst>
+        </p:spPr>
         <p:txBody>
-          <a:bodyPr/>
+          <a:bodyPr wrap="square" numCol="1" anchor="t" anchorCtr="0" compatLnSpc="1">
+            <a:prstTxWarp prst="textNoShape">
+              <a:avLst/>
+            </a:prstTxWarp>
+          </a:bodyPr>
           <a:lstStyle/>
           <a:p>
-            <a:endParaRPr lang="en-US" dirty="0"/>
+            <a:pPr>
+              <a:spcBef>
+                <a:spcPct val="0"/>
+              </a:spcBef>
+            </a:pPr>
+            <a:r>
+              <a:rPr lang="en-US" b="0" dirty="0">
+                <a:latin typeface="BentonSans Book" charset="0"/>
+              </a:rPr>
+              <a:t>https://github.com/spencer-shadley/data-lecture/blob/master/workbooks%20and%20datasources/Completed%20Workbooks/Technology%20Adoption%20Over%20Time.twbx </a:t>
+            </a:r>
+            <a:endParaRPr lang="en-US" dirty="0">
+              <a:latin typeface="BentonSans Book" charset="0"/>
+            </a:endParaRPr>
           </a:p>
         </p:txBody>
       </p:sp>
     </p:spTree>
     <p:extLst>
       <p:ext uri="{BB962C8B-B14F-4D97-AF65-F5344CB8AC3E}">
-        <p14:creationId xmlns:p14="http://schemas.microsoft.com/office/powerpoint/2010/main" val="164648985"/>
+        <p14:creationId xmlns:p14="http://schemas.microsoft.com/office/powerpoint/2010/main" val="2445145428"/>
       </p:ext>
     </p:extLst>
   </p:cSld>
@@ -4350,7 +4430,7 @@
     </p:spTree>
     <p:extLst>
       <p:ext uri="{BB962C8B-B14F-4D97-AF65-F5344CB8AC3E}">
-        <p14:creationId xmlns:p14="http://schemas.microsoft.com/office/powerpoint/2010/main" val="989393269"/>
+        <p14:creationId xmlns:p14="http://schemas.microsoft.com/office/powerpoint/2010/main" val="164648985"/>
       </p:ext>
     </p:extLst>
   </p:cSld>
@@ -4404,17 +4484,14 @@
           <a:bodyPr/>
           <a:lstStyle/>
           <a:p>
-            <a:r>
-              <a:rPr lang="en-US" dirty="0"/>
-              <a:t>Can add stuff to pages if desired (date or deaths might be interesting)</a:t>
-            </a:r>
+            <a:endParaRPr lang="en-US" dirty="0"/>
           </a:p>
         </p:txBody>
       </p:sp>
     </p:spTree>
     <p:extLst>
       <p:ext uri="{BB962C8B-B14F-4D97-AF65-F5344CB8AC3E}">
-        <p14:creationId xmlns:p14="http://schemas.microsoft.com/office/powerpoint/2010/main" val="3296685925"/>
+        <p14:creationId xmlns:p14="http://schemas.microsoft.com/office/powerpoint/2010/main" val="989393269"/>
       </p:ext>
     </p:extLst>
   </p:cSld>
@@ -4468,14 +4545,17 @@
           <a:bodyPr/>
           <a:lstStyle/>
           <a:p>
-            <a:endParaRPr lang="en-US" dirty="0"/>
+            <a:r>
+              <a:rPr lang="en-US" dirty="0"/>
+              <a:t>Can add stuff to pages if desired (date or deaths might be interesting)</a:t>
+            </a:r>
           </a:p>
         </p:txBody>
       </p:sp>
     </p:spTree>
     <p:extLst>
       <p:ext uri="{BB962C8B-B14F-4D97-AF65-F5344CB8AC3E}">
-        <p14:creationId xmlns:p14="http://schemas.microsoft.com/office/powerpoint/2010/main" val="3350560249"/>
+        <p14:creationId xmlns:p14="http://schemas.microsoft.com/office/powerpoint/2010/main" val="3296685925"/>
       </p:ext>
     </p:extLst>
   </p:cSld>
@@ -4536,7 +4616,7 @@
     </p:spTree>
     <p:extLst>
       <p:ext uri="{BB962C8B-B14F-4D97-AF65-F5344CB8AC3E}">
-        <p14:creationId xmlns:p14="http://schemas.microsoft.com/office/powerpoint/2010/main" val="4070323610"/>
+        <p14:creationId xmlns:p14="http://schemas.microsoft.com/office/powerpoint/2010/main" val="3350560249"/>
       </p:ext>
     </p:extLst>
   </p:cSld>
@@ -4597,7 +4677,7 @@
     </p:spTree>
     <p:extLst>
       <p:ext uri="{BB962C8B-B14F-4D97-AF65-F5344CB8AC3E}">
-        <p14:creationId xmlns:p14="http://schemas.microsoft.com/office/powerpoint/2010/main" val="1700628346"/>
+        <p14:creationId xmlns:p14="http://schemas.microsoft.com/office/powerpoint/2010/main" val="4070323610"/>
       </p:ext>
     </p:extLst>
   </p:cSld>
@@ -4658,7 +4738,7 @@
     </p:spTree>
     <p:extLst>
       <p:ext uri="{BB962C8B-B14F-4D97-AF65-F5344CB8AC3E}">
-        <p14:creationId xmlns:p14="http://schemas.microsoft.com/office/powerpoint/2010/main" val="3559071881"/>
+        <p14:creationId xmlns:p14="http://schemas.microsoft.com/office/powerpoint/2010/main" val="1700628346"/>
       </p:ext>
     </p:extLst>
   </p:cSld>
@@ -4687,7 +4767,7 @@
       </p:grpSpPr>
       <p:sp>
         <p:nvSpPr>
-          <p:cNvPr id="36865" name="Slide Image Placeholder 1"/>
+          <p:cNvPr id="38913" name="Slide Image Placeholder 1"/>
           <p:cNvSpPr>
             <a:spLocks noGrp="1" noRot="1" noChangeAspect="1"/>
           </p:cNvSpPr>
@@ -4721,7 +4801,7 @@
       </p:sp>
       <p:sp>
         <p:nvSpPr>
-          <p:cNvPr id="36866" name="Notes Placeholder 2"/>
+          <p:cNvPr id="38914" name="Notes Placeholder 2"/>
           <p:cNvSpPr>
             <a:spLocks noGrp="1"/>
           </p:cNvSpPr>
@@ -4766,17 +4846,254 @@
             </a:pPr>
             <a:r>
               <a:rPr lang="en-US" dirty="0">
-                <a:latin typeface="BentonSans Book" charset="0"/>
-              </a:rPr>
-              <a:t>Title Slide</a:t>
-            </a:r>
+                <a:hlinkClick r:id="rId3"/>
+              </a:rPr>
+              <a:t>https://public.tableau.com/en-us/s/gallery</a:t>
+            </a:r>
+            <a:endParaRPr lang="en-US" dirty="0">
+              <a:hlinkClick r:id="rId4"/>
+            </a:endParaRPr>
+          </a:p>
+          <a:p>
+            <a:pPr>
+              <a:spcBef>
+                <a:spcPct val="0"/>
+              </a:spcBef>
+            </a:pPr>
+            <a:r>
+              <a:rPr lang="en-US" dirty="0">
+                <a:hlinkClick r:id="rId4"/>
+              </a:rPr>
+              <a:t>https://public.tableau.com/profile/spencer.shadley#!/vizhome/Anime/UndiscoveredAnime</a:t>
+            </a:r>
+            <a:endParaRPr lang="en-US" dirty="0">
+              <a:latin typeface="BentonSans Book" charset="0"/>
+            </a:endParaRPr>
           </a:p>
         </p:txBody>
       </p:sp>
     </p:spTree>
     <p:extLst>
       <p:ext uri="{BB962C8B-B14F-4D97-AF65-F5344CB8AC3E}">
-        <p14:creationId xmlns:p14="http://schemas.microsoft.com/office/powerpoint/2010/main" val="3693581521"/>
+        <p14:creationId xmlns:p14="http://schemas.microsoft.com/office/powerpoint/2010/main" val="1289791595"/>
+      </p:ext>
+    </p:extLst>
+  </p:cSld>
+  <p:clrMapOvr>
+    <a:masterClrMapping/>
+  </p:clrMapOvr>
+</p:notes>
+</file>
+
+<file path=ppt/notesSlides/notesSlide38.xml><?xml version="1.0" encoding="utf-8"?>
+<p:notes xmlns:a="http://schemas.openxmlformats.org/drawingml/2006/main" xmlns:r="http://schemas.openxmlformats.org/officeDocument/2006/relationships" xmlns:p="http://schemas.openxmlformats.org/presentationml/2006/main">
+  <p:cSld>
+    <p:spTree>
+      <p:nvGrpSpPr>
+        <p:cNvPr id="1" name=""/>
+        <p:cNvGrpSpPr/>
+        <p:nvPr/>
+      </p:nvGrpSpPr>
+      <p:grpSpPr>
+        <a:xfrm>
+          <a:off x="0" y="0"/>
+          <a:ext cx="0" cy="0"/>
+          <a:chOff x="0" y="0"/>
+          <a:chExt cx="0" cy="0"/>
+        </a:xfrm>
+      </p:grpSpPr>
+      <p:sp>
+        <p:nvSpPr>
+          <p:cNvPr id="38913" name="Slide Image Placeholder 1"/>
+          <p:cNvSpPr>
+            <a:spLocks noGrp="1" noRot="1" noChangeAspect="1"/>
+          </p:cNvSpPr>
+          <p:nvPr>
+            <p:ph type="sldImg"/>
+          </p:nvPr>
+        </p:nvSpPr>
+        <p:spPr bwMode="auto">
+          <a:noFill/>
+          <a:ln>
+            <a:solidFill>
+              <a:srgbClr val="000000"/>
+            </a:solidFill>
+            <a:miter lim="800000"/>
+            <a:headEnd/>
+            <a:tailEnd/>
+          </a:ln>
+          <a:extLst>
+            <a:ext uri="{909E8E84-426E-40dd-AFC4-6F175D3DCCD1}">
+              <a14:hiddenFill xmlns:a14="http://schemas.microsoft.com/office/drawing/2010/main" xmlns="">
+                <a:solidFill>
+                  <a:srgbClr val="FFFFFF"/>
+                </a:solidFill>
+              </a14:hiddenFill>
+            </a:ext>
+            <a:ext uri="{FAA26D3D-D897-4be2-8F04-BA451C77F1D7}">
+              <ma14:placeholderFlag xmlns:ma14="http://schemas.microsoft.com/office/mac/drawingml/2011/main" xmlns="" val="1"/>
+            </a:ext>
+          </a:extLst>
+        </p:spPr>
+      </p:sp>
+      <p:sp>
+        <p:nvSpPr>
+          <p:cNvPr id="38914" name="Notes Placeholder 2"/>
+          <p:cNvSpPr>
+            <a:spLocks noGrp="1"/>
+          </p:cNvSpPr>
+          <p:nvPr>
+            <p:ph type="body" idx="1"/>
+          </p:nvPr>
+        </p:nvSpPr>
+        <p:spPr bwMode="auto">
+          <a:noFill/>
+          <a:extLst>
+            <a:ext uri="{909E8E84-426E-40dd-AFC4-6F175D3DCCD1}">
+              <a14:hiddenFill xmlns:a14="http://schemas.microsoft.com/office/drawing/2010/main" xmlns="">
+                <a:solidFill>
+                  <a:srgbClr val="FFFFFF"/>
+                </a:solidFill>
+              </a14:hiddenFill>
+            </a:ext>
+            <a:ext uri="{91240B29-F687-4f45-9708-019B960494DF}">
+              <a14:hiddenLine xmlns:a14="http://schemas.microsoft.com/office/drawing/2010/main" xmlns="" w="9525">
+                <a:solidFill>
+                  <a:srgbClr val="000000"/>
+                </a:solidFill>
+                <a:miter lim="800000"/>
+                <a:headEnd/>
+                <a:tailEnd/>
+              </a14:hiddenLine>
+            </a:ext>
+          </a:extLst>
+        </p:spPr>
+        <p:txBody>
+          <a:bodyPr wrap="square" numCol="1" anchor="t" anchorCtr="0" compatLnSpc="1">
+            <a:prstTxWarp prst="textNoShape">
+              <a:avLst/>
+            </a:prstTxWarp>
+          </a:bodyPr>
+          <a:lstStyle/>
+          <a:p>
+            <a:pPr>
+              <a:spcBef>
+                <a:spcPct val="0"/>
+              </a:spcBef>
+            </a:pPr>
+            <a:r>
+              <a:rPr lang="en-US" dirty="0">
+                <a:hlinkClick r:id="rId3"/>
+              </a:rPr>
+              <a:t>Tableau Public Anime Viz: https://public.tableau.com/profile/spencer.shadley#!/vizhome/Anime/UndiscoveredAnime</a:t>
+            </a:r>
+            <a:endParaRPr lang="en-US" dirty="0"/>
+          </a:p>
+          <a:p>
+            <a:pPr>
+              <a:spcBef>
+                <a:spcPct val="0"/>
+              </a:spcBef>
+            </a:pPr>
+            <a:r>
+              <a:rPr lang="en-US" dirty="0">
+                <a:latin typeface="BentonSans Book" charset="0"/>
+              </a:rPr>
+              <a:t>Anime Template </a:t>
+            </a:r>
+            <a:r>
+              <a:rPr lang="en-US" dirty="0" err="1">
+                <a:latin typeface="BentonSans Book" charset="0"/>
+              </a:rPr>
+              <a:t>twb</a:t>
+            </a:r>
+            <a:r>
+              <a:rPr lang="en-US" dirty="0">
+                <a:latin typeface="BentonSans Book" charset="0"/>
+              </a:rPr>
+              <a:t>: https://github.com/spencer-shadley/data-lecture/blob/master/workbooks%20and%20datasources/Template%20Workbooks/Anime.twbx</a:t>
+            </a:r>
+          </a:p>
+          <a:p>
+            <a:pPr>
+              <a:spcBef>
+                <a:spcPct val="0"/>
+              </a:spcBef>
+            </a:pPr>
+            <a:r>
+              <a:rPr lang="en-US" dirty="0">
+                <a:latin typeface="BentonSans Book" charset="0"/>
+              </a:rPr>
+              <a:t>Anime Complete Workbook (same as on public): https://github.com/spencer-shadley/data-lecture/blob/master/workbooks%20and%20datasources/Completed%20Workbooks/Anime.twbx</a:t>
+            </a:r>
+          </a:p>
+        </p:txBody>
+      </p:sp>
+    </p:spTree>
+    <p:extLst>
+      <p:ext uri="{BB962C8B-B14F-4D97-AF65-F5344CB8AC3E}">
+        <p14:creationId xmlns:p14="http://schemas.microsoft.com/office/powerpoint/2010/main" val="1151791318"/>
+      </p:ext>
+    </p:extLst>
+  </p:cSld>
+  <p:clrMapOvr>
+    <a:masterClrMapping/>
+  </p:clrMapOvr>
+</p:notes>
+</file>
+
+<file path=ppt/notesSlides/notesSlide39.xml><?xml version="1.0" encoding="utf-8"?>
+<p:notes xmlns:a="http://schemas.openxmlformats.org/drawingml/2006/main" xmlns:r="http://schemas.openxmlformats.org/officeDocument/2006/relationships" xmlns:p="http://schemas.openxmlformats.org/presentationml/2006/main">
+  <p:cSld>
+    <p:spTree>
+      <p:nvGrpSpPr>
+        <p:cNvPr id="1" name=""/>
+        <p:cNvGrpSpPr/>
+        <p:nvPr/>
+      </p:nvGrpSpPr>
+      <p:grpSpPr>
+        <a:xfrm>
+          <a:off x="0" y="0"/>
+          <a:ext cx="0" cy="0"/>
+          <a:chOff x="0" y="0"/>
+          <a:chExt cx="0" cy="0"/>
+        </a:xfrm>
+      </p:grpSpPr>
+      <p:sp>
+        <p:nvSpPr>
+          <p:cNvPr id="2" name="Slide Image Placeholder 1"/>
+          <p:cNvSpPr>
+            <a:spLocks noGrp="1" noRot="1" noChangeAspect="1"/>
+          </p:cNvSpPr>
+          <p:nvPr>
+            <p:ph type="sldImg"/>
+          </p:nvPr>
+        </p:nvSpPr>
+        <p:spPr/>
+      </p:sp>
+      <p:sp>
+        <p:nvSpPr>
+          <p:cNvPr id="3" name="Notes Placeholder 2"/>
+          <p:cNvSpPr>
+            <a:spLocks noGrp="1"/>
+          </p:cNvSpPr>
+          <p:nvPr>
+            <p:ph type="body" idx="1"/>
+          </p:nvPr>
+        </p:nvSpPr>
+        <p:spPr/>
+        <p:txBody>
+          <a:bodyPr/>
+          <a:lstStyle/>
+          <a:p>
+            <a:endParaRPr lang="en-US" dirty="0"/>
+          </a:p>
+        </p:txBody>
+      </p:sp>
+    </p:spTree>
+    <p:extLst>
+      <p:ext uri="{BB962C8B-B14F-4D97-AF65-F5344CB8AC3E}">
+        <p14:creationId xmlns:p14="http://schemas.microsoft.com/office/powerpoint/2010/main" val="3559071881"/>
       </p:ext>
     </p:extLst>
   </p:cSld>
@@ -4892,6 +5209,124 @@
     <p:extLst>
       <p:ext uri="{BB962C8B-B14F-4D97-AF65-F5344CB8AC3E}">
         <p14:creationId xmlns:p14="http://schemas.microsoft.com/office/powerpoint/2010/main" val="3777176415"/>
+      </p:ext>
+    </p:extLst>
+  </p:cSld>
+  <p:clrMapOvr>
+    <a:masterClrMapping/>
+  </p:clrMapOvr>
+</p:notes>
+</file>
+
+<file path=ppt/notesSlides/notesSlide40.xml><?xml version="1.0" encoding="utf-8"?>
+<p:notes xmlns:a="http://schemas.openxmlformats.org/drawingml/2006/main" xmlns:r="http://schemas.openxmlformats.org/officeDocument/2006/relationships" xmlns:p="http://schemas.openxmlformats.org/presentationml/2006/main">
+  <p:cSld>
+    <p:spTree>
+      <p:nvGrpSpPr>
+        <p:cNvPr id="1" name=""/>
+        <p:cNvGrpSpPr/>
+        <p:nvPr/>
+      </p:nvGrpSpPr>
+      <p:grpSpPr>
+        <a:xfrm>
+          <a:off x="0" y="0"/>
+          <a:ext cx="0" cy="0"/>
+          <a:chOff x="0" y="0"/>
+          <a:chExt cx="0" cy="0"/>
+        </a:xfrm>
+      </p:grpSpPr>
+      <p:sp>
+        <p:nvSpPr>
+          <p:cNvPr id="36865" name="Slide Image Placeholder 1"/>
+          <p:cNvSpPr>
+            <a:spLocks noGrp="1" noRot="1" noChangeAspect="1"/>
+          </p:cNvSpPr>
+          <p:nvPr>
+            <p:ph type="sldImg"/>
+          </p:nvPr>
+        </p:nvSpPr>
+        <p:spPr bwMode="auto">
+          <a:noFill/>
+          <a:ln>
+            <a:solidFill>
+              <a:srgbClr val="000000"/>
+            </a:solidFill>
+            <a:miter lim="800000"/>
+            <a:headEnd/>
+            <a:tailEnd/>
+          </a:ln>
+          <a:extLst>
+            <a:ext uri="{909E8E84-426E-40dd-AFC4-6F175D3DCCD1}">
+              <a14:hiddenFill xmlns:a14="http://schemas.microsoft.com/office/drawing/2010/main" xmlns="">
+                <a:solidFill>
+                  <a:srgbClr val="FFFFFF"/>
+                </a:solidFill>
+              </a14:hiddenFill>
+            </a:ext>
+            <a:ext uri="{FAA26D3D-D897-4be2-8F04-BA451C77F1D7}">
+              <ma14:placeholderFlag xmlns:ma14="http://schemas.microsoft.com/office/mac/drawingml/2011/main" xmlns="" val="1"/>
+            </a:ext>
+          </a:extLst>
+        </p:spPr>
+      </p:sp>
+      <p:sp>
+        <p:nvSpPr>
+          <p:cNvPr id="36866" name="Notes Placeholder 2"/>
+          <p:cNvSpPr>
+            <a:spLocks noGrp="1"/>
+          </p:cNvSpPr>
+          <p:nvPr>
+            <p:ph type="body" idx="1"/>
+          </p:nvPr>
+        </p:nvSpPr>
+        <p:spPr bwMode="auto">
+          <a:noFill/>
+          <a:extLst>
+            <a:ext uri="{909E8E84-426E-40dd-AFC4-6F175D3DCCD1}">
+              <a14:hiddenFill xmlns:a14="http://schemas.microsoft.com/office/drawing/2010/main" xmlns="">
+                <a:solidFill>
+                  <a:srgbClr val="FFFFFF"/>
+                </a:solidFill>
+              </a14:hiddenFill>
+            </a:ext>
+            <a:ext uri="{91240B29-F687-4f45-9708-019B960494DF}">
+              <a14:hiddenLine xmlns:a14="http://schemas.microsoft.com/office/drawing/2010/main" xmlns="" w="9525">
+                <a:solidFill>
+                  <a:srgbClr val="000000"/>
+                </a:solidFill>
+                <a:miter lim="800000"/>
+                <a:headEnd/>
+                <a:tailEnd/>
+              </a14:hiddenLine>
+            </a:ext>
+          </a:extLst>
+        </p:spPr>
+        <p:txBody>
+          <a:bodyPr wrap="square" numCol="1" anchor="t" anchorCtr="0" compatLnSpc="1">
+            <a:prstTxWarp prst="textNoShape">
+              <a:avLst/>
+            </a:prstTxWarp>
+          </a:bodyPr>
+          <a:lstStyle/>
+          <a:p>
+            <a:pPr>
+              <a:spcBef>
+                <a:spcPct val="0"/>
+              </a:spcBef>
+            </a:pPr>
+            <a:r>
+              <a:rPr lang="en-US" dirty="0">
+                <a:latin typeface="BentonSans Book" charset="0"/>
+              </a:rPr>
+              <a:t>Title Slide</a:t>
+            </a:r>
+          </a:p>
+        </p:txBody>
+      </p:sp>
+    </p:spTree>
+    <p:extLst>
+      <p:ext uri="{BB962C8B-B14F-4D97-AF65-F5344CB8AC3E}">
+        <p14:creationId xmlns:p14="http://schemas.microsoft.com/office/powerpoint/2010/main" val="3693581521"/>
       </p:ext>
     </p:extLst>
   </p:cSld>
@@ -17317,6 +17752,83 @@
       </p:grpSpPr>
       <p:sp>
         <p:nvSpPr>
+          <p:cNvPr id="7169" name="Title 1"/>
+          <p:cNvSpPr>
+            <a:spLocks noGrp="1"/>
+          </p:cNvSpPr>
+          <p:nvPr>
+            <p:ph type="title" idx="4294967295"/>
+          </p:nvPr>
+        </p:nvSpPr>
+        <p:spPr>
+          <a:xfrm>
+            <a:off x="704850" y="1811338"/>
+            <a:ext cx="13274675" cy="577081"/>
+          </a:xfrm>
+        </p:spPr>
+        <p:txBody>
+          <a:bodyPr/>
+          <a:lstStyle/>
+          <a:p>
+            <a:r>
+              <a:rPr lang="en-US" dirty="0">
+                <a:solidFill>
+                  <a:srgbClr val="4C4C4C"/>
+                </a:solidFill>
+                <a:latin typeface="BentonSans Book" charset="0"/>
+              </a:rPr>
+              <a:t>Technology Adoptio</a:t>
+            </a:r>
+            <a:r>
+              <a:rPr lang="en-US" dirty="0">
+                <a:latin typeface="BentonSans Book" charset="0"/>
+              </a:rPr>
+              <a:t>n Over Time</a:t>
+            </a:r>
+            <a:endParaRPr lang="en-US" dirty="0">
+              <a:solidFill>
+                <a:srgbClr val="4C4C4C"/>
+              </a:solidFill>
+              <a:latin typeface="BentonSans Book" charset="0"/>
+            </a:endParaRPr>
+          </a:p>
+        </p:txBody>
+      </p:sp>
+    </p:spTree>
+    <p:extLst>
+      <p:ext uri="{BB962C8B-B14F-4D97-AF65-F5344CB8AC3E}">
+        <p14:creationId xmlns:p14="http://schemas.microsoft.com/office/powerpoint/2010/main" val="920218192"/>
+      </p:ext>
+    </p:extLst>
+  </p:cSld>
+  <p:clrMapOvr>
+    <a:masterClrMapping/>
+  </p:clrMapOvr>
+  <p:transition spd="slow">
+    <p:push dir="u"/>
+  </p:transition>
+</p:sld>
+</file>
+
+<file path=ppt/slides/slide33.xml><?xml version="1.0" encoding="utf-8"?>
+<p:sld xmlns:a="http://schemas.openxmlformats.org/drawingml/2006/main" xmlns:r="http://schemas.openxmlformats.org/officeDocument/2006/relationships" xmlns:p="http://schemas.openxmlformats.org/presentationml/2006/main">
+  <p:cSld>
+    <p:spTree>
+      <p:nvGrpSpPr>
+        <p:cNvPr id="1" name=""/>
+        <p:cNvGrpSpPr/>
+        <p:nvPr/>
+      </p:nvGrpSpPr>
+      <p:grpSpPr>
+        <a:xfrm>
+          <a:off x="0" y="0"/>
+          <a:ext cx="0" cy="0"/>
+          <a:chOff x="0" y="0"/>
+          <a:chExt cx="0" cy="0"/>
+        </a:xfrm>
+      </p:grpSpPr>
+      <p:sp>
+        <p:nvSpPr>
           <p:cNvPr id="2" name="Content Placeholder 1"/>
           <p:cNvSpPr>
             <a:spLocks noGrp="1"/>
@@ -18168,1044 +18680,6 @@
 </p:sld>
 </file>
 
-<file path=ppt/slides/slide33.xml><?xml version="1.0" encoding="utf-8"?>
-<p:sld xmlns:a="http://schemas.openxmlformats.org/drawingml/2006/main" xmlns:r="http://schemas.openxmlformats.org/officeDocument/2006/relationships" xmlns:p="http://schemas.openxmlformats.org/presentationml/2006/main">
-  <p:cSld>
-    <p:spTree>
-      <p:nvGrpSpPr>
-        <p:cNvPr id="1" name=""/>
-        <p:cNvGrpSpPr/>
-        <p:nvPr/>
-      </p:nvGrpSpPr>
-      <p:grpSpPr>
-        <a:xfrm>
-          <a:off x="0" y="0"/>
-          <a:ext cx="0" cy="0"/>
-          <a:chOff x="0" y="0"/>
-          <a:chExt cx="0" cy="0"/>
-        </a:xfrm>
-      </p:grpSpPr>
-      <p:sp>
-        <p:nvSpPr>
-          <p:cNvPr id="2" name="Content Placeholder 1"/>
-          <p:cNvSpPr>
-            <a:spLocks noGrp="1"/>
-          </p:cNvSpPr>
-          <p:nvPr>
-            <p:ph idx="14"/>
-          </p:nvPr>
-        </p:nvSpPr>
-        <p:spPr>
-          <a:xfrm>
-            <a:off x="704476" y="1893515"/>
-            <a:ext cx="13273820" cy="5724644"/>
-          </a:xfrm>
-        </p:spPr>
-        <p:txBody>
-          <a:bodyPr/>
-          <a:lstStyle/>
-          <a:p>
-            <a:pPr marL="457200" indent="-457200" defTabSz="1306221" fontAlgn="auto">
-              <a:buFont typeface="+mj-lt"/>
-              <a:buAutoNum type="arabicPeriod"/>
-              <a:defRPr/>
-            </a:pPr>
-            <a:r>
-              <a:rPr lang="en-US" sz="2400" dirty="0">
-                <a:ea typeface="+mn-ea"/>
-              </a:rPr>
-              <a:t>Open </a:t>
-            </a:r>
-            <a:r>
-              <a:rPr lang="en-US" sz="2400" dirty="0">
-                <a:ea typeface="+mn-ea"/>
-                <a:hlinkClick r:id="rId3"/>
-              </a:rPr>
-              <a:t>Template/Germ Theory of Disease</a:t>
-            </a:r>
-            <a:endParaRPr lang="en-US" sz="2400" dirty="0">
-              <a:ea typeface="+mn-ea"/>
-            </a:endParaRPr>
-          </a:p>
-          <a:p>
-            <a:pPr marL="457200" indent="-457200" defTabSz="1306221" fontAlgn="auto">
-              <a:buFont typeface="+mj-lt"/>
-              <a:buAutoNum type="arabicPeriod"/>
-              <a:defRPr/>
-            </a:pPr>
-            <a:r>
-              <a:rPr lang="en-US" sz="2400" dirty="0">
-                <a:ea typeface="+mn-ea"/>
-              </a:rPr>
-              <a:t>Right click the empty area in “Measures” &gt; “Create Calculated Field…”</a:t>
-            </a:r>
-          </a:p>
-          <a:p>
-            <a:pPr marL="457200" indent="-457200" defTabSz="1306221" fontAlgn="auto">
-              <a:buFont typeface="+mj-lt"/>
-              <a:buAutoNum type="arabicPeriod"/>
-              <a:defRPr/>
-            </a:pPr>
-            <a:r>
-              <a:rPr lang="en-US" sz="2400" dirty="0">
-                <a:ea typeface="+mn-ea"/>
-              </a:rPr>
-              <a:t>Name the Calculated Field “Mortality Rate (%)”</a:t>
-            </a:r>
-          </a:p>
-          <a:p>
-            <a:pPr marL="457200" indent="-457200" defTabSz="1306221" fontAlgn="auto">
-              <a:buFont typeface="+mj-lt"/>
-              <a:buAutoNum type="arabicPeriod"/>
-              <a:defRPr/>
-            </a:pPr>
-            <a:r>
-              <a:rPr lang="en-US" sz="2400" dirty="0">
-                <a:ea typeface="+mn-ea"/>
-              </a:rPr>
-              <a:t>Type “[Deaths] / [Births] * 100” as the contents of the Calculated Field</a:t>
-            </a:r>
-          </a:p>
-          <a:p>
-            <a:pPr marL="457200" indent="-457200" defTabSz="1306221" fontAlgn="auto">
-              <a:buFont typeface="+mj-lt"/>
-              <a:buAutoNum type="arabicPeriod"/>
-              <a:defRPr/>
-            </a:pPr>
-            <a:r>
-              <a:rPr lang="en-US" sz="2400" dirty="0">
-                <a:ea typeface="+mn-ea"/>
-              </a:rPr>
-              <a:t>Double click your new Calculated Field “</a:t>
-            </a:r>
-            <a:r>
-              <a:rPr lang="en-US" sz="2400" dirty="0"/>
-              <a:t>Mortality Rate (%)</a:t>
-            </a:r>
-            <a:r>
-              <a:rPr lang="en-US" sz="2400" dirty="0">
-                <a:ea typeface="+mn-ea"/>
-              </a:rPr>
-              <a:t>”</a:t>
-            </a:r>
-          </a:p>
-          <a:p>
-            <a:pPr marL="457200" indent="-457200" defTabSz="1306221" fontAlgn="auto">
-              <a:buFont typeface="+mj-lt"/>
-              <a:buAutoNum type="arabicPeriod"/>
-              <a:defRPr/>
-            </a:pPr>
-            <a:r>
-              <a:rPr lang="en-US" sz="2400" dirty="0">
-                <a:ea typeface="+mn-ea"/>
-              </a:rPr>
-              <a:t>Right click “SUM(Rate (%))” &gt; “Measure” &gt; “Average”</a:t>
-            </a:r>
-          </a:p>
-          <a:p>
-            <a:pPr marL="457200" indent="-457200" defTabSz="1306221" fontAlgn="auto">
-              <a:buFont typeface="+mj-lt"/>
-              <a:buAutoNum type="arabicPeriod"/>
-              <a:defRPr/>
-            </a:pPr>
-            <a:r>
-              <a:rPr lang="en-US" sz="2400" dirty="0">
-                <a:ea typeface="+mn-ea"/>
-              </a:rPr>
-              <a:t>Double click “Date”</a:t>
-            </a:r>
-          </a:p>
-          <a:p>
-            <a:pPr marL="457200" indent="-457200" defTabSz="1306221" fontAlgn="auto">
-              <a:buFont typeface="+mj-lt"/>
-              <a:buAutoNum type="arabicPeriod"/>
-              <a:defRPr/>
-            </a:pPr>
-            <a:r>
-              <a:rPr lang="en-US" sz="2400" dirty="0">
-                <a:ea typeface="+mn-ea"/>
-              </a:rPr>
-              <a:t>Switch view to “Entire View”</a:t>
-            </a:r>
-          </a:p>
-          <a:p>
-            <a:pPr marL="457200" indent="-457200" defTabSz="1306221" fontAlgn="auto">
-              <a:buFont typeface="+mj-lt"/>
-              <a:buAutoNum type="arabicPeriod"/>
-              <a:defRPr/>
-            </a:pPr>
-            <a:r>
-              <a:rPr lang="en-US" sz="2400" dirty="0">
-                <a:ea typeface="+mn-ea"/>
-              </a:rPr>
-              <a:t>Right click “YEAR(Date)”</a:t>
-            </a:r>
-          </a:p>
-          <a:p>
-            <a:pPr marL="457200" indent="-457200" defTabSz="1306221" fontAlgn="auto">
-              <a:buFont typeface="+mj-lt"/>
-              <a:buAutoNum type="arabicPeriod"/>
-              <a:defRPr/>
-            </a:pPr>
-            <a:r>
-              <a:rPr lang="en-US" sz="2400" dirty="0">
-                <a:ea typeface="+mn-ea"/>
-              </a:rPr>
-              <a:t>Select “Exact Date”</a:t>
-            </a:r>
-          </a:p>
-          <a:p>
-            <a:pPr marL="457200" indent="-457200" defTabSz="1306221" fontAlgn="auto">
-              <a:buFont typeface="+mj-lt"/>
-              <a:buAutoNum type="arabicPeriod"/>
-              <a:defRPr/>
-            </a:pPr>
-            <a:r>
-              <a:rPr lang="en-US" sz="2400" dirty="0">
-                <a:ea typeface="+mn-ea"/>
-              </a:rPr>
-              <a:t>(notice there is a null row for December 1841)</a:t>
-            </a:r>
-          </a:p>
-          <a:p>
-            <a:pPr marL="457200" indent="-457200" defTabSz="1306221" fontAlgn="auto">
-              <a:buFont typeface="+mj-lt"/>
-              <a:buAutoNum type="arabicPeriod"/>
-              <a:defRPr/>
-            </a:pPr>
-            <a:r>
-              <a:rPr lang="en-US" sz="2400" dirty="0">
-                <a:ea typeface="+mn-ea"/>
-              </a:rPr>
-              <a:t>Click “1 null” &gt; “Filter data” from the bottom right</a:t>
-            </a:r>
-          </a:p>
-          <a:p>
-            <a:pPr marL="457200" indent="-457200" defTabSz="1306221" fontAlgn="auto">
-              <a:buFont typeface="+mj-lt"/>
-              <a:buAutoNum type="arabicPeriod"/>
-              <a:defRPr/>
-            </a:pPr>
-            <a:endParaRPr lang="en-US" sz="2400" dirty="0">
-              <a:ea typeface="+mn-ea"/>
-            </a:endParaRPr>
-          </a:p>
-        </p:txBody>
-      </p:sp>
-      <p:sp>
-        <p:nvSpPr>
-          <p:cNvPr id="3" name="Text Placeholder 2"/>
-          <p:cNvSpPr>
-            <a:spLocks noGrp="1"/>
-          </p:cNvSpPr>
-          <p:nvPr>
-            <p:ph type="body" sz="quarter" idx="12"/>
-          </p:nvPr>
-        </p:nvSpPr>
-        <p:spPr>
-          <a:prstGeom prst="rect">
-            <a:avLst/>
-          </a:prstGeom>
-        </p:spPr>
-        <p:txBody>
-          <a:bodyPr/>
-          <a:lstStyle/>
-          <a:p>
-            <a:pPr>
-              <a:spcBef>
-                <a:spcPct val="0"/>
-              </a:spcBef>
-            </a:pPr>
-            <a:r>
-              <a:rPr lang="en-US" b="1" dirty="0">
-                <a:latin typeface="BentonSans Book" charset="0"/>
-              </a:rPr>
-              <a:t>Germ Theory of Disease – Basic Viz</a:t>
-            </a:r>
-          </a:p>
-        </p:txBody>
-      </p:sp>
-    </p:spTree>
-    <p:extLst>
-      <p:ext uri="{BB962C8B-B14F-4D97-AF65-F5344CB8AC3E}">
-        <p14:creationId xmlns:p14="http://schemas.microsoft.com/office/powerpoint/2010/main" val="1256773149"/>
-      </p:ext>
-    </p:extLst>
-  </p:cSld>
-  <p:clrMapOvr>
-    <a:masterClrMapping/>
-  </p:clrMapOvr>
-  <p:transition spd="slow">
-    <p:cover/>
-  </p:transition>
-  <p:timing>
-    <p:tnLst>
-      <p:par>
-        <p:cTn id="1" dur="indefinite" restart="never" nodeType="tmRoot">
-          <p:childTnLst>
-            <p:seq concurrent="1" nextAc="seek">
-              <p:cTn id="2" dur="indefinite" nodeType="mainSeq">
-                <p:childTnLst>
-                  <p:par>
-                    <p:cTn id="3" fill="hold">
-                      <p:stCondLst>
-                        <p:cond delay="indefinite"/>
-                      </p:stCondLst>
-                      <p:childTnLst>
-                        <p:par>
-                          <p:cTn id="4" fill="hold">
-                            <p:stCondLst>
-                              <p:cond delay="0"/>
-                            </p:stCondLst>
-                            <p:childTnLst>
-                              <p:par>
-                                <p:cTn id="5" presetID="10" presetClass="entr" presetSubtype="0" fill="hold" grpId="0" nodeType="clickEffect">
-                                  <p:stCondLst>
-                                    <p:cond delay="0"/>
-                                  </p:stCondLst>
-                                  <p:childTnLst>
-                                    <p:set>
-                                      <p:cBhvr>
-                                        <p:cTn id="6" dur="1" fill="hold">
-                                          <p:stCondLst>
-                                            <p:cond delay="0"/>
-                                          </p:stCondLst>
-                                        </p:cTn>
-                                        <p:tgtEl>
-                                          <p:spTgt spid="2">
-                                            <p:txEl>
-                                              <p:pRg st="0" end="0"/>
-                                            </p:txEl>
-                                          </p:spTgt>
-                                        </p:tgtEl>
-                                        <p:attrNameLst>
-                                          <p:attrName>style.visibility</p:attrName>
-                                        </p:attrNameLst>
-                                      </p:cBhvr>
-                                      <p:to>
-                                        <p:strVal val="visible"/>
-                                      </p:to>
-                                    </p:set>
-                                    <p:animEffect transition="in" filter="fade">
-                                      <p:cBhvr>
-                                        <p:cTn id="7" dur="500"/>
-                                        <p:tgtEl>
-                                          <p:spTgt spid="2">
-                                            <p:txEl>
-                                              <p:pRg st="0" end="0"/>
-                                            </p:txEl>
-                                          </p:spTgt>
-                                        </p:tgtEl>
-                                      </p:cBhvr>
-                                    </p:animEffect>
-                                  </p:childTnLst>
-                                </p:cTn>
-                              </p:par>
-                            </p:childTnLst>
-                          </p:cTn>
-                        </p:par>
-                      </p:childTnLst>
-                    </p:cTn>
-                  </p:par>
-                  <p:par>
-                    <p:cTn id="8" fill="hold">
-                      <p:stCondLst>
-                        <p:cond delay="indefinite"/>
-                      </p:stCondLst>
-                      <p:childTnLst>
-                        <p:par>
-                          <p:cTn id="9" fill="hold">
-                            <p:stCondLst>
-                              <p:cond delay="0"/>
-                            </p:stCondLst>
-                            <p:childTnLst>
-                              <p:par>
-                                <p:cTn id="10" presetID="10" presetClass="entr" presetSubtype="0" fill="hold" grpId="0" nodeType="clickEffect">
-                                  <p:stCondLst>
-                                    <p:cond delay="0"/>
-                                  </p:stCondLst>
-                                  <p:childTnLst>
-                                    <p:set>
-                                      <p:cBhvr>
-                                        <p:cTn id="11" dur="1" fill="hold">
-                                          <p:stCondLst>
-                                            <p:cond delay="0"/>
-                                          </p:stCondLst>
-                                        </p:cTn>
-                                        <p:tgtEl>
-                                          <p:spTgt spid="2">
-                                            <p:txEl>
-                                              <p:pRg st="1" end="1"/>
-                                            </p:txEl>
-                                          </p:spTgt>
-                                        </p:tgtEl>
-                                        <p:attrNameLst>
-                                          <p:attrName>style.visibility</p:attrName>
-                                        </p:attrNameLst>
-                                      </p:cBhvr>
-                                      <p:to>
-                                        <p:strVal val="visible"/>
-                                      </p:to>
-                                    </p:set>
-                                    <p:animEffect transition="in" filter="fade">
-                                      <p:cBhvr>
-                                        <p:cTn id="12" dur="500"/>
-                                        <p:tgtEl>
-                                          <p:spTgt spid="2">
-                                            <p:txEl>
-                                              <p:pRg st="1" end="1"/>
-                                            </p:txEl>
-                                          </p:spTgt>
-                                        </p:tgtEl>
-                                      </p:cBhvr>
-                                    </p:animEffect>
-                                  </p:childTnLst>
-                                </p:cTn>
-                              </p:par>
-                            </p:childTnLst>
-                          </p:cTn>
-                        </p:par>
-                      </p:childTnLst>
-                    </p:cTn>
-                  </p:par>
-                  <p:par>
-                    <p:cTn id="13" fill="hold">
-                      <p:stCondLst>
-                        <p:cond delay="indefinite"/>
-                      </p:stCondLst>
-                      <p:childTnLst>
-                        <p:par>
-                          <p:cTn id="14" fill="hold">
-                            <p:stCondLst>
-                              <p:cond delay="0"/>
-                            </p:stCondLst>
-                            <p:childTnLst>
-                              <p:par>
-                                <p:cTn id="15" presetID="10" presetClass="entr" presetSubtype="0" fill="hold" grpId="0" nodeType="clickEffect">
-                                  <p:stCondLst>
-                                    <p:cond delay="0"/>
-                                  </p:stCondLst>
-                                  <p:childTnLst>
-                                    <p:set>
-                                      <p:cBhvr>
-                                        <p:cTn id="16" dur="1" fill="hold">
-                                          <p:stCondLst>
-                                            <p:cond delay="0"/>
-                                          </p:stCondLst>
-                                        </p:cTn>
-                                        <p:tgtEl>
-                                          <p:spTgt spid="2">
-                                            <p:txEl>
-                                              <p:pRg st="2" end="2"/>
-                                            </p:txEl>
-                                          </p:spTgt>
-                                        </p:tgtEl>
-                                        <p:attrNameLst>
-                                          <p:attrName>style.visibility</p:attrName>
-                                        </p:attrNameLst>
-                                      </p:cBhvr>
-                                      <p:to>
-                                        <p:strVal val="visible"/>
-                                      </p:to>
-                                    </p:set>
-                                    <p:animEffect transition="in" filter="fade">
-                                      <p:cBhvr>
-                                        <p:cTn id="17" dur="500"/>
-                                        <p:tgtEl>
-                                          <p:spTgt spid="2">
-                                            <p:txEl>
-                                              <p:pRg st="2" end="2"/>
-                                            </p:txEl>
-                                          </p:spTgt>
-                                        </p:tgtEl>
-                                      </p:cBhvr>
-                                    </p:animEffect>
-                                  </p:childTnLst>
-                                </p:cTn>
-                              </p:par>
-                            </p:childTnLst>
-                          </p:cTn>
-                        </p:par>
-                      </p:childTnLst>
-                    </p:cTn>
-                  </p:par>
-                  <p:par>
-                    <p:cTn id="18" fill="hold">
-                      <p:stCondLst>
-                        <p:cond delay="indefinite"/>
-                      </p:stCondLst>
-                      <p:childTnLst>
-                        <p:par>
-                          <p:cTn id="19" fill="hold">
-                            <p:stCondLst>
-                              <p:cond delay="0"/>
-                            </p:stCondLst>
-                            <p:childTnLst>
-                              <p:par>
-                                <p:cTn id="20" presetID="10" presetClass="entr" presetSubtype="0" fill="hold" grpId="0" nodeType="clickEffect">
-                                  <p:stCondLst>
-                                    <p:cond delay="0"/>
-                                  </p:stCondLst>
-                                  <p:childTnLst>
-                                    <p:set>
-                                      <p:cBhvr>
-                                        <p:cTn id="21" dur="1" fill="hold">
-                                          <p:stCondLst>
-                                            <p:cond delay="0"/>
-                                          </p:stCondLst>
-                                        </p:cTn>
-                                        <p:tgtEl>
-                                          <p:spTgt spid="2">
-                                            <p:txEl>
-                                              <p:pRg st="3" end="3"/>
-                                            </p:txEl>
-                                          </p:spTgt>
-                                        </p:tgtEl>
-                                        <p:attrNameLst>
-                                          <p:attrName>style.visibility</p:attrName>
-                                        </p:attrNameLst>
-                                      </p:cBhvr>
-                                      <p:to>
-                                        <p:strVal val="visible"/>
-                                      </p:to>
-                                    </p:set>
-                                    <p:animEffect transition="in" filter="fade">
-                                      <p:cBhvr>
-                                        <p:cTn id="22" dur="500"/>
-                                        <p:tgtEl>
-                                          <p:spTgt spid="2">
-                                            <p:txEl>
-                                              <p:pRg st="3" end="3"/>
-                                            </p:txEl>
-                                          </p:spTgt>
-                                        </p:tgtEl>
-                                      </p:cBhvr>
-                                    </p:animEffect>
-                                  </p:childTnLst>
-                                </p:cTn>
-                              </p:par>
-                            </p:childTnLst>
-                          </p:cTn>
-                        </p:par>
-                      </p:childTnLst>
-                    </p:cTn>
-                  </p:par>
-                  <p:par>
-                    <p:cTn id="23" fill="hold">
-                      <p:stCondLst>
-                        <p:cond delay="indefinite"/>
-                      </p:stCondLst>
-                      <p:childTnLst>
-                        <p:par>
-                          <p:cTn id="24" fill="hold">
-                            <p:stCondLst>
-                              <p:cond delay="0"/>
-                            </p:stCondLst>
-                            <p:childTnLst>
-                              <p:par>
-                                <p:cTn id="25" presetID="10" presetClass="entr" presetSubtype="0" fill="hold" grpId="0" nodeType="clickEffect">
-                                  <p:stCondLst>
-                                    <p:cond delay="0"/>
-                                  </p:stCondLst>
-                                  <p:childTnLst>
-                                    <p:set>
-                                      <p:cBhvr>
-                                        <p:cTn id="26" dur="1" fill="hold">
-                                          <p:stCondLst>
-                                            <p:cond delay="0"/>
-                                          </p:stCondLst>
-                                        </p:cTn>
-                                        <p:tgtEl>
-                                          <p:spTgt spid="2">
-                                            <p:txEl>
-                                              <p:pRg st="4" end="4"/>
-                                            </p:txEl>
-                                          </p:spTgt>
-                                        </p:tgtEl>
-                                        <p:attrNameLst>
-                                          <p:attrName>style.visibility</p:attrName>
-                                        </p:attrNameLst>
-                                      </p:cBhvr>
-                                      <p:to>
-                                        <p:strVal val="visible"/>
-                                      </p:to>
-                                    </p:set>
-                                    <p:animEffect transition="in" filter="fade">
-                                      <p:cBhvr>
-                                        <p:cTn id="27" dur="500"/>
-                                        <p:tgtEl>
-                                          <p:spTgt spid="2">
-                                            <p:txEl>
-                                              <p:pRg st="4" end="4"/>
-                                            </p:txEl>
-                                          </p:spTgt>
-                                        </p:tgtEl>
-                                      </p:cBhvr>
-                                    </p:animEffect>
-                                  </p:childTnLst>
-                                </p:cTn>
-                              </p:par>
-                            </p:childTnLst>
-                          </p:cTn>
-                        </p:par>
-                      </p:childTnLst>
-                    </p:cTn>
-                  </p:par>
-                  <p:par>
-                    <p:cTn id="28" fill="hold">
-                      <p:stCondLst>
-                        <p:cond delay="indefinite"/>
-                      </p:stCondLst>
-                      <p:childTnLst>
-                        <p:par>
-                          <p:cTn id="29" fill="hold">
-                            <p:stCondLst>
-                              <p:cond delay="0"/>
-                            </p:stCondLst>
-                            <p:childTnLst>
-                              <p:par>
-                                <p:cTn id="30" presetID="10" presetClass="entr" presetSubtype="0" fill="hold" grpId="0" nodeType="clickEffect">
-                                  <p:stCondLst>
-                                    <p:cond delay="0"/>
-                                  </p:stCondLst>
-                                  <p:childTnLst>
-                                    <p:set>
-                                      <p:cBhvr>
-                                        <p:cTn id="31" dur="1" fill="hold">
-                                          <p:stCondLst>
-                                            <p:cond delay="0"/>
-                                          </p:stCondLst>
-                                        </p:cTn>
-                                        <p:tgtEl>
-                                          <p:spTgt spid="2">
-                                            <p:txEl>
-                                              <p:pRg st="5" end="5"/>
-                                            </p:txEl>
-                                          </p:spTgt>
-                                        </p:tgtEl>
-                                        <p:attrNameLst>
-                                          <p:attrName>style.visibility</p:attrName>
-                                        </p:attrNameLst>
-                                      </p:cBhvr>
-                                      <p:to>
-                                        <p:strVal val="visible"/>
-                                      </p:to>
-                                    </p:set>
-                                    <p:animEffect transition="in" filter="fade">
-                                      <p:cBhvr>
-                                        <p:cTn id="32" dur="500"/>
-                                        <p:tgtEl>
-                                          <p:spTgt spid="2">
-                                            <p:txEl>
-                                              <p:pRg st="5" end="5"/>
-                                            </p:txEl>
-                                          </p:spTgt>
-                                        </p:tgtEl>
-                                      </p:cBhvr>
-                                    </p:animEffect>
-                                  </p:childTnLst>
-                                </p:cTn>
-                              </p:par>
-                            </p:childTnLst>
-                          </p:cTn>
-                        </p:par>
-                      </p:childTnLst>
-                    </p:cTn>
-                  </p:par>
-                  <p:par>
-                    <p:cTn id="33" fill="hold">
-                      <p:stCondLst>
-                        <p:cond delay="indefinite"/>
-                      </p:stCondLst>
-                      <p:childTnLst>
-                        <p:par>
-                          <p:cTn id="34" fill="hold">
-                            <p:stCondLst>
-                              <p:cond delay="0"/>
-                            </p:stCondLst>
-                            <p:childTnLst>
-                              <p:par>
-                                <p:cTn id="35" presetID="10" presetClass="entr" presetSubtype="0" fill="hold" grpId="0" nodeType="clickEffect">
-                                  <p:stCondLst>
-                                    <p:cond delay="0"/>
-                                  </p:stCondLst>
-                                  <p:childTnLst>
-                                    <p:set>
-                                      <p:cBhvr>
-                                        <p:cTn id="36" dur="1" fill="hold">
-                                          <p:stCondLst>
-                                            <p:cond delay="0"/>
-                                          </p:stCondLst>
-                                        </p:cTn>
-                                        <p:tgtEl>
-                                          <p:spTgt spid="2">
-                                            <p:txEl>
-                                              <p:pRg st="6" end="6"/>
-                                            </p:txEl>
-                                          </p:spTgt>
-                                        </p:tgtEl>
-                                        <p:attrNameLst>
-                                          <p:attrName>style.visibility</p:attrName>
-                                        </p:attrNameLst>
-                                      </p:cBhvr>
-                                      <p:to>
-                                        <p:strVal val="visible"/>
-                                      </p:to>
-                                    </p:set>
-                                    <p:animEffect transition="in" filter="fade">
-                                      <p:cBhvr>
-                                        <p:cTn id="37" dur="500"/>
-                                        <p:tgtEl>
-                                          <p:spTgt spid="2">
-                                            <p:txEl>
-                                              <p:pRg st="6" end="6"/>
-                                            </p:txEl>
-                                          </p:spTgt>
-                                        </p:tgtEl>
-                                      </p:cBhvr>
-                                    </p:animEffect>
-                                  </p:childTnLst>
-                                </p:cTn>
-                              </p:par>
-                            </p:childTnLst>
-                          </p:cTn>
-                        </p:par>
-                      </p:childTnLst>
-                    </p:cTn>
-                  </p:par>
-                  <p:par>
-                    <p:cTn id="38" fill="hold">
-                      <p:stCondLst>
-                        <p:cond delay="indefinite"/>
-                      </p:stCondLst>
-                      <p:childTnLst>
-                        <p:par>
-                          <p:cTn id="39" fill="hold">
-                            <p:stCondLst>
-                              <p:cond delay="0"/>
-                            </p:stCondLst>
-                            <p:childTnLst>
-                              <p:par>
-                                <p:cTn id="40" presetID="10" presetClass="entr" presetSubtype="0" fill="hold" grpId="0" nodeType="clickEffect">
-                                  <p:stCondLst>
-                                    <p:cond delay="0"/>
-                                  </p:stCondLst>
-                                  <p:childTnLst>
-                                    <p:set>
-                                      <p:cBhvr>
-                                        <p:cTn id="41" dur="1" fill="hold">
-                                          <p:stCondLst>
-                                            <p:cond delay="0"/>
-                                          </p:stCondLst>
-                                        </p:cTn>
-                                        <p:tgtEl>
-                                          <p:spTgt spid="2">
-                                            <p:txEl>
-                                              <p:pRg st="7" end="7"/>
-                                            </p:txEl>
-                                          </p:spTgt>
-                                        </p:tgtEl>
-                                        <p:attrNameLst>
-                                          <p:attrName>style.visibility</p:attrName>
-                                        </p:attrNameLst>
-                                      </p:cBhvr>
-                                      <p:to>
-                                        <p:strVal val="visible"/>
-                                      </p:to>
-                                    </p:set>
-                                    <p:animEffect transition="in" filter="fade">
-                                      <p:cBhvr>
-                                        <p:cTn id="42" dur="500"/>
-                                        <p:tgtEl>
-                                          <p:spTgt spid="2">
-                                            <p:txEl>
-                                              <p:pRg st="7" end="7"/>
-                                            </p:txEl>
-                                          </p:spTgt>
-                                        </p:tgtEl>
-                                      </p:cBhvr>
-                                    </p:animEffect>
-                                  </p:childTnLst>
-                                </p:cTn>
-                              </p:par>
-                            </p:childTnLst>
-                          </p:cTn>
-                        </p:par>
-                      </p:childTnLst>
-                    </p:cTn>
-                  </p:par>
-                  <p:par>
-                    <p:cTn id="43" fill="hold">
-                      <p:stCondLst>
-                        <p:cond delay="indefinite"/>
-                      </p:stCondLst>
-                      <p:childTnLst>
-                        <p:par>
-                          <p:cTn id="44" fill="hold">
-                            <p:stCondLst>
-                              <p:cond delay="0"/>
-                            </p:stCondLst>
-                            <p:childTnLst>
-                              <p:par>
-                                <p:cTn id="45" presetID="10" presetClass="entr" presetSubtype="0" fill="hold" grpId="0" nodeType="clickEffect">
-                                  <p:stCondLst>
-                                    <p:cond delay="0"/>
-                                  </p:stCondLst>
-                                  <p:childTnLst>
-                                    <p:set>
-                                      <p:cBhvr>
-                                        <p:cTn id="46" dur="1" fill="hold">
-                                          <p:stCondLst>
-                                            <p:cond delay="0"/>
-                                          </p:stCondLst>
-                                        </p:cTn>
-                                        <p:tgtEl>
-                                          <p:spTgt spid="2">
-                                            <p:txEl>
-                                              <p:pRg st="8" end="8"/>
-                                            </p:txEl>
-                                          </p:spTgt>
-                                        </p:tgtEl>
-                                        <p:attrNameLst>
-                                          <p:attrName>style.visibility</p:attrName>
-                                        </p:attrNameLst>
-                                      </p:cBhvr>
-                                      <p:to>
-                                        <p:strVal val="visible"/>
-                                      </p:to>
-                                    </p:set>
-                                    <p:animEffect transition="in" filter="fade">
-                                      <p:cBhvr>
-                                        <p:cTn id="47" dur="500"/>
-                                        <p:tgtEl>
-                                          <p:spTgt spid="2">
-                                            <p:txEl>
-                                              <p:pRg st="8" end="8"/>
-                                            </p:txEl>
-                                          </p:spTgt>
-                                        </p:tgtEl>
-                                      </p:cBhvr>
-                                    </p:animEffect>
-                                  </p:childTnLst>
-                                </p:cTn>
-                              </p:par>
-                            </p:childTnLst>
-                          </p:cTn>
-                        </p:par>
-                      </p:childTnLst>
-                    </p:cTn>
-                  </p:par>
-                  <p:par>
-                    <p:cTn id="48" fill="hold">
-                      <p:stCondLst>
-                        <p:cond delay="indefinite"/>
-                      </p:stCondLst>
-                      <p:childTnLst>
-                        <p:par>
-                          <p:cTn id="49" fill="hold">
-                            <p:stCondLst>
-                              <p:cond delay="0"/>
-                            </p:stCondLst>
-                            <p:childTnLst>
-                              <p:par>
-                                <p:cTn id="50" presetID="10" presetClass="entr" presetSubtype="0" fill="hold" grpId="0" nodeType="clickEffect">
-                                  <p:stCondLst>
-                                    <p:cond delay="0"/>
-                                  </p:stCondLst>
-                                  <p:childTnLst>
-                                    <p:set>
-                                      <p:cBhvr>
-                                        <p:cTn id="51" dur="1" fill="hold">
-                                          <p:stCondLst>
-                                            <p:cond delay="0"/>
-                                          </p:stCondLst>
-                                        </p:cTn>
-                                        <p:tgtEl>
-                                          <p:spTgt spid="2">
-                                            <p:txEl>
-                                              <p:pRg st="9" end="9"/>
-                                            </p:txEl>
-                                          </p:spTgt>
-                                        </p:tgtEl>
-                                        <p:attrNameLst>
-                                          <p:attrName>style.visibility</p:attrName>
-                                        </p:attrNameLst>
-                                      </p:cBhvr>
-                                      <p:to>
-                                        <p:strVal val="visible"/>
-                                      </p:to>
-                                    </p:set>
-                                    <p:animEffect transition="in" filter="fade">
-                                      <p:cBhvr>
-                                        <p:cTn id="52" dur="500"/>
-                                        <p:tgtEl>
-                                          <p:spTgt spid="2">
-                                            <p:txEl>
-                                              <p:pRg st="9" end="9"/>
-                                            </p:txEl>
-                                          </p:spTgt>
-                                        </p:tgtEl>
-                                      </p:cBhvr>
-                                    </p:animEffect>
-                                  </p:childTnLst>
-                                </p:cTn>
-                              </p:par>
-                            </p:childTnLst>
-                          </p:cTn>
-                        </p:par>
-                      </p:childTnLst>
-                    </p:cTn>
-                  </p:par>
-                  <p:par>
-                    <p:cTn id="53" fill="hold">
-                      <p:stCondLst>
-                        <p:cond delay="indefinite"/>
-                      </p:stCondLst>
-                      <p:childTnLst>
-                        <p:par>
-                          <p:cTn id="54" fill="hold">
-                            <p:stCondLst>
-                              <p:cond delay="0"/>
-                            </p:stCondLst>
-                            <p:childTnLst>
-                              <p:par>
-                                <p:cTn id="55" presetID="10" presetClass="entr" presetSubtype="0" fill="hold" grpId="0" nodeType="clickEffect">
-                                  <p:stCondLst>
-                                    <p:cond delay="0"/>
-                                  </p:stCondLst>
-                                  <p:childTnLst>
-                                    <p:set>
-                                      <p:cBhvr>
-                                        <p:cTn id="56" dur="1" fill="hold">
-                                          <p:stCondLst>
-                                            <p:cond delay="0"/>
-                                          </p:stCondLst>
-                                        </p:cTn>
-                                        <p:tgtEl>
-                                          <p:spTgt spid="2">
-                                            <p:txEl>
-                                              <p:pRg st="10" end="10"/>
-                                            </p:txEl>
-                                          </p:spTgt>
-                                        </p:tgtEl>
-                                        <p:attrNameLst>
-                                          <p:attrName>style.visibility</p:attrName>
-                                        </p:attrNameLst>
-                                      </p:cBhvr>
-                                      <p:to>
-                                        <p:strVal val="visible"/>
-                                      </p:to>
-                                    </p:set>
-                                    <p:animEffect transition="in" filter="fade">
-                                      <p:cBhvr>
-                                        <p:cTn id="57" dur="500"/>
-                                        <p:tgtEl>
-                                          <p:spTgt spid="2">
-                                            <p:txEl>
-                                              <p:pRg st="10" end="10"/>
-                                            </p:txEl>
-                                          </p:spTgt>
-                                        </p:tgtEl>
-                                      </p:cBhvr>
-                                    </p:animEffect>
-                                  </p:childTnLst>
-                                </p:cTn>
-                              </p:par>
-                            </p:childTnLst>
-                          </p:cTn>
-                        </p:par>
-                      </p:childTnLst>
-                    </p:cTn>
-                  </p:par>
-                  <p:par>
-                    <p:cTn id="58" fill="hold">
-                      <p:stCondLst>
-                        <p:cond delay="indefinite"/>
-                      </p:stCondLst>
-                      <p:childTnLst>
-                        <p:par>
-                          <p:cTn id="59" fill="hold">
-                            <p:stCondLst>
-                              <p:cond delay="0"/>
-                            </p:stCondLst>
-                            <p:childTnLst>
-                              <p:par>
-                                <p:cTn id="60" presetID="10" presetClass="entr" presetSubtype="0" fill="hold" grpId="0" nodeType="clickEffect">
-                                  <p:stCondLst>
-                                    <p:cond delay="0"/>
-                                  </p:stCondLst>
-                                  <p:childTnLst>
-                                    <p:set>
-                                      <p:cBhvr>
-                                        <p:cTn id="61" dur="1" fill="hold">
-                                          <p:stCondLst>
-                                            <p:cond delay="0"/>
-                                          </p:stCondLst>
-                                        </p:cTn>
-                                        <p:tgtEl>
-                                          <p:spTgt spid="2">
-                                            <p:txEl>
-                                              <p:pRg st="11" end="11"/>
-                                            </p:txEl>
-                                          </p:spTgt>
-                                        </p:tgtEl>
-                                        <p:attrNameLst>
-                                          <p:attrName>style.visibility</p:attrName>
-                                        </p:attrNameLst>
-                                      </p:cBhvr>
-                                      <p:to>
-                                        <p:strVal val="visible"/>
-                                      </p:to>
-                                    </p:set>
-                                    <p:animEffect transition="in" filter="fade">
-                                      <p:cBhvr>
-                                        <p:cTn id="62" dur="500"/>
-                                        <p:tgtEl>
-                                          <p:spTgt spid="2">
-                                            <p:txEl>
-                                              <p:pRg st="11" end="11"/>
-                                            </p:txEl>
-                                          </p:spTgt>
-                                        </p:tgtEl>
-                                      </p:cBhvr>
-                                    </p:animEffect>
-                                  </p:childTnLst>
-                                </p:cTn>
-                              </p:par>
-                            </p:childTnLst>
-                          </p:cTn>
-                        </p:par>
-                      </p:childTnLst>
-                    </p:cTn>
-                  </p:par>
-                </p:childTnLst>
-              </p:cTn>
-              <p:prevCondLst>
-                <p:cond evt="onPrev" delay="0">
-                  <p:tgtEl>
-                    <p:sldTgt/>
-                  </p:tgtEl>
-                </p:cond>
-              </p:prevCondLst>
-              <p:nextCondLst>
-                <p:cond evt="onNext" delay="0">
-                  <p:tgtEl>
-                    <p:sldTgt/>
-                  </p:tgtEl>
-                </p:cond>
-              </p:nextCondLst>
-            </p:seq>
-          </p:childTnLst>
-        </p:cTn>
-      </p:par>
-    </p:tnLst>
-    <p:bldLst>
-      <p:bldP spid="2" grpId="0" uiExpand="1" build="p"/>
-    </p:bldLst>
-  </p:timing>
-</p:sld>
-</file>
-
 <file path=ppt/slides/slide34.xml><?xml version="1.0" encoding="utf-8"?>
 <p:sld xmlns:a="http://schemas.openxmlformats.org/drawingml/2006/main" xmlns:r="http://schemas.openxmlformats.org/officeDocument/2006/relationships" xmlns:p="http://schemas.openxmlformats.org/presentationml/2006/main">
   <p:cSld>
@@ -19252,8 +18726,18 @@
               <a:rPr lang="en-US" sz="2400" dirty="0">
                 <a:ea typeface="+mn-ea"/>
               </a:rPr>
-              <a:t>Select “Show Me” from the top right</a:t>
-            </a:r>
+              <a:t>Open </a:t>
+            </a:r>
+            <a:r>
+              <a:rPr lang="en-US" sz="2400" dirty="0">
+                <a:ea typeface="+mn-ea"/>
+                <a:hlinkClick r:id="rId3"/>
+              </a:rPr>
+              <a:t>Template/Germ Theory of Disease</a:t>
+            </a:r>
+            <a:endParaRPr lang="en-US" sz="2400" dirty="0">
+              <a:ea typeface="+mn-ea"/>
+            </a:endParaRPr>
           </a:p>
           <a:p>
             <a:pPr marL="457200" indent="-457200" defTabSz="1306221" fontAlgn="auto">
@@ -19265,7 +18749,7 @@
               <a:rPr lang="en-US" sz="2400" dirty="0">
                 <a:ea typeface="+mn-ea"/>
               </a:rPr>
-              <a:t>Select “area chart”</a:t>
+              <a:t>Right click the empty area in “Measures” &gt; “Create Calculated Field…”</a:t>
             </a:r>
           </a:p>
           <a:p>
@@ -19278,7 +18762,7 @@
               <a:rPr lang="en-US" sz="2400" dirty="0">
                 <a:ea typeface="+mn-ea"/>
               </a:rPr>
-              <a:t>(notice the date was automatically switched to “YEAR(Date)”)</a:t>
+              <a:t>Name the Calculated Field “Mortality Rate (%)”</a:t>
             </a:r>
           </a:p>
           <a:p>
@@ -19291,7 +18775,7 @@
               <a:rPr lang="en-US" sz="2400" dirty="0">
                 <a:ea typeface="+mn-ea"/>
               </a:rPr>
-              <a:t>Click the “+” on the left side of the “YEAR(Date)” pill twice to get it to “MONTH(Date)” again</a:t>
+              <a:t>Type “[Deaths] / [Births] * 100” as the contents of the Calculated Field</a:t>
             </a:r>
           </a:p>
           <a:p>
@@ -19304,7 +18788,17 @@
               <a:rPr lang="en-US" sz="2400" dirty="0">
                 <a:ea typeface="+mn-ea"/>
               </a:rPr>
-              <a:t>(NOTE: alternatively instead of steps 1-4 we could change the mark type to “Area”)</a:t>
+              <a:t>Double click your new Calculated Field “</a:t>
+            </a:r>
+            <a:r>
+              <a:rPr lang="en-US" sz="2400" dirty="0"/>
+              <a:t>Mortality Rate (%)</a:t>
+            </a:r>
+            <a:r>
+              <a:rPr lang="en-US" sz="2400" dirty="0">
+                <a:ea typeface="+mn-ea"/>
+              </a:rPr>
+              <a:t>”</a:t>
             </a:r>
           </a:p>
           <a:p>
@@ -19317,7 +18811,7 @@
               <a:rPr lang="en-US" sz="2400" dirty="0">
                 <a:ea typeface="+mn-ea"/>
               </a:rPr>
-              <a:t>Double click the sheet tab (“Sheet 1”) and rename to “Mortality Rate over Time”</a:t>
+              <a:t>Right click “SUM(Rate (%))” &gt; “Measure” &gt; “Average”</a:t>
             </a:r>
           </a:p>
           <a:p>
@@ -19330,7 +18824,7 @@
               <a:rPr lang="en-US" sz="2400" dirty="0">
                 <a:ea typeface="+mn-ea"/>
               </a:rPr>
-              <a:t>Right click “Mortality Rate over Time” and select “Duplicate”</a:t>
+              <a:t>Double click “Date”</a:t>
             </a:r>
           </a:p>
           <a:p>
@@ -19343,7 +18837,7 @@
               <a:rPr lang="en-US" sz="2400" dirty="0">
                 <a:ea typeface="+mn-ea"/>
               </a:rPr>
-              <a:t>Right click “MONTH(Date)” and select “Month”</a:t>
+              <a:t>Switch view to “Entire View”</a:t>
             </a:r>
           </a:p>
           <a:p>
@@ -19356,7 +18850,7 @@
               <a:rPr lang="en-US" sz="2400" dirty="0">
                 <a:ea typeface="+mn-ea"/>
               </a:rPr>
-              <a:t>Go to the “Analytics” pane</a:t>
+              <a:t>Right click “YEAR(Date)”</a:t>
             </a:r>
           </a:p>
           <a:p>
@@ -19369,7 +18863,7 @@
               <a:rPr lang="en-US" sz="2400" dirty="0">
                 <a:ea typeface="+mn-ea"/>
               </a:rPr>
-              <a:t>Drag out a “Trend Line” onto “Polynomial”</a:t>
+              <a:t>Select “Exact Date”</a:t>
             </a:r>
           </a:p>
           <a:p>
@@ -19382,7 +18876,7 @@
               <a:rPr lang="en-US" sz="2400" dirty="0">
                 <a:ea typeface="+mn-ea"/>
               </a:rPr>
-              <a:t>Drag “Date” to “Color”</a:t>
+              <a:t>(notice there is a null row for December 1841)</a:t>
             </a:r>
           </a:p>
           <a:p>
@@ -19395,7 +18889,7 @@
               <a:rPr lang="en-US" sz="2400" dirty="0">
                 <a:ea typeface="+mn-ea"/>
               </a:rPr>
-              <a:t>Rename the sheet</a:t>
+              <a:t>Click “1 null” &gt; “Filter data” from the bottom right</a:t>
             </a:r>
           </a:p>
           <a:p>
@@ -19438,7 +18932,7 @@
               <a:rPr lang="en-US" b="1" dirty="0">
                 <a:latin typeface="BentonSans Book" charset="0"/>
               </a:rPr>
-              <a:t>Germ Theory of Disease – Simple Viz</a:t>
+              <a:t>Germ Theory of Disease – Basic Viz</a:t>
             </a:r>
           </a:p>
         </p:txBody>
@@ -19446,7 +18940,7 @@
     </p:spTree>
     <p:extLst>
       <p:ext uri="{BB962C8B-B14F-4D97-AF65-F5344CB8AC3E}">
-        <p14:creationId xmlns:p14="http://schemas.microsoft.com/office/powerpoint/2010/main" val="1829227786"/>
+        <p14:creationId xmlns:p14="http://schemas.microsoft.com/office/powerpoint/2010/main" val="1256773149"/>
       </p:ext>
     </p:extLst>
   </p:cSld>
@@ -20254,6 +19748,1024 @@
         <p:spPr>
           <a:xfrm>
             <a:off x="704476" y="1893515"/>
+            <a:ext cx="13273820" cy="5724644"/>
+          </a:xfrm>
+        </p:spPr>
+        <p:txBody>
+          <a:bodyPr/>
+          <a:lstStyle/>
+          <a:p>
+            <a:pPr marL="457200" indent="-457200" defTabSz="1306221" fontAlgn="auto">
+              <a:buFont typeface="+mj-lt"/>
+              <a:buAutoNum type="arabicPeriod"/>
+              <a:defRPr/>
+            </a:pPr>
+            <a:r>
+              <a:rPr lang="en-US" sz="2400" dirty="0">
+                <a:ea typeface="+mn-ea"/>
+              </a:rPr>
+              <a:t>Select “Show Me” from the top right</a:t>
+            </a:r>
+          </a:p>
+          <a:p>
+            <a:pPr marL="457200" indent="-457200" defTabSz="1306221" fontAlgn="auto">
+              <a:buFont typeface="+mj-lt"/>
+              <a:buAutoNum type="arabicPeriod"/>
+              <a:defRPr/>
+            </a:pPr>
+            <a:r>
+              <a:rPr lang="en-US" sz="2400" dirty="0">
+                <a:ea typeface="+mn-ea"/>
+              </a:rPr>
+              <a:t>Select “area chart”</a:t>
+            </a:r>
+          </a:p>
+          <a:p>
+            <a:pPr marL="457200" indent="-457200" defTabSz="1306221" fontAlgn="auto">
+              <a:buFont typeface="+mj-lt"/>
+              <a:buAutoNum type="arabicPeriod"/>
+              <a:defRPr/>
+            </a:pPr>
+            <a:r>
+              <a:rPr lang="en-US" sz="2400" dirty="0">
+                <a:ea typeface="+mn-ea"/>
+              </a:rPr>
+              <a:t>(notice the date was automatically switched to “YEAR(Date)”)</a:t>
+            </a:r>
+          </a:p>
+          <a:p>
+            <a:pPr marL="457200" indent="-457200" defTabSz="1306221" fontAlgn="auto">
+              <a:buFont typeface="+mj-lt"/>
+              <a:buAutoNum type="arabicPeriod"/>
+              <a:defRPr/>
+            </a:pPr>
+            <a:r>
+              <a:rPr lang="en-US" sz="2400" dirty="0">
+                <a:ea typeface="+mn-ea"/>
+              </a:rPr>
+              <a:t>Click the “+” on the left side of the “YEAR(Date)” pill twice to get it to “MONTH(Date)” again</a:t>
+            </a:r>
+          </a:p>
+          <a:p>
+            <a:pPr marL="457200" indent="-457200" defTabSz="1306221" fontAlgn="auto">
+              <a:buFont typeface="+mj-lt"/>
+              <a:buAutoNum type="arabicPeriod"/>
+              <a:defRPr/>
+            </a:pPr>
+            <a:r>
+              <a:rPr lang="en-US" sz="2400" dirty="0">
+                <a:ea typeface="+mn-ea"/>
+              </a:rPr>
+              <a:t>(NOTE: alternatively instead of steps 1-4 we could change the mark type to “Area”)</a:t>
+            </a:r>
+          </a:p>
+          <a:p>
+            <a:pPr marL="457200" indent="-457200" defTabSz="1306221" fontAlgn="auto">
+              <a:buFont typeface="+mj-lt"/>
+              <a:buAutoNum type="arabicPeriod"/>
+              <a:defRPr/>
+            </a:pPr>
+            <a:r>
+              <a:rPr lang="en-US" sz="2400" dirty="0">
+                <a:ea typeface="+mn-ea"/>
+              </a:rPr>
+              <a:t>Double click the sheet tab (“Sheet 1”) and rename to “Mortality Rate over Time”</a:t>
+            </a:r>
+          </a:p>
+          <a:p>
+            <a:pPr marL="457200" indent="-457200" defTabSz="1306221" fontAlgn="auto">
+              <a:buFont typeface="+mj-lt"/>
+              <a:buAutoNum type="arabicPeriod"/>
+              <a:defRPr/>
+            </a:pPr>
+            <a:r>
+              <a:rPr lang="en-US" sz="2400" dirty="0">
+                <a:ea typeface="+mn-ea"/>
+              </a:rPr>
+              <a:t>Right click “Mortality Rate over Time” and select “Duplicate”</a:t>
+            </a:r>
+          </a:p>
+          <a:p>
+            <a:pPr marL="457200" indent="-457200" defTabSz="1306221" fontAlgn="auto">
+              <a:buFont typeface="+mj-lt"/>
+              <a:buAutoNum type="arabicPeriod"/>
+              <a:defRPr/>
+            </a:pPr>
+            <a:r>
+              <a:rPr lang="en-US" sz="2400" dirty="0">
+                <a:ea typeface="+mn-ea"/>
+              </a:rPr>
+              <a:t>Right click “MONTH(Date)” and select “Month”</a:t>
+            </a:r>
+          </a:p>
+          <a:p>
+            <a:pPr marL="457200" indent="-457200" defTabSz="1306221" fontAlgn="auto">
+              <a:buFont typeface="+mj-lt"/>
+              <a:buAutoNum type="arabicPeriod"/>
+              <a:defRPr/>
+            </a:pPr>
+            <a:r>
+              <a:rPr lang="en-US" sz="2400" dirty="0">
+                <a:ea typeface="+mn-ea"/>
+              </a:rPr>
+              <a:t>Go to the “Analytics” pane</a:t>
+            </a:r>
+          </a:p>
+          <a:p>
+            <a:pPr marL="457200" indent="-457200" defTabSz="1306221" fontAlgn="auto">
+              <a:buFont typeface="+mj-lt"/>
+              <a:buAutoNum type="arabicPeriod"/>
+              <a:defRPr/>
+            </a:pPr>
+            <a:r>
+              <a:rPr lang="en-US" sz="2400" dirty="0">
+                <a:ea typeface="+mn-ea"/>
+              </a:rPr>
+              <a:t>Drag out a “Trend Line” onto “Polynomial”</a:t>
+            </a:r>
+          </a:p>
+          <a:p>
+            <a:pPr marL="457200" indent="-457200" defTabSz="1306221" fontAlgn="auto">
+              <a:buFont typeface="+mj-lt"/>
+              <a:buAutoNum type="arabicPeriod"/>
+              <a:defRPr/>
+            </a:pPr>
+            <a:r>
+              <a:rPr lang="en-US" sz="2400" dirty="0">
+                <a:ea typeface="+mn-ea"/>
+              </a:rPr>
+              <a:t>Drag “Date” to “Color”</a:t>
+            </a:r>
+          </a:p>
+          <a:p>
+            <a:pPr marL="457200" indent="-457200" defTabSz="1306221" fontAlgn="auto">
+              <a:buFont typeface="+mj-lt"/>
+              <a:buAutoNum type="arabicPeriod"/>
+              <a:defRPr/>
+            </a:pPr>
+            <a:r>
+              <a:rPr lang="en-US" sz="2400" dirty="0">
+                <a:ea typeface="+mn-ea"/>
+              </a:rPr>
+              <a:t>Rename the sheet</a:t>
+            </a:r>
+          </a:p>
+          <a:p>
+            <a:pPr marL="457200" indent="-457200" defTabSz="1306221" fontAlgn="auto">
+              <a:buFont typeface="+mj-lt"/>
+              <a:buAutoNum type="arabicPeriod"/>
+              <a:defRPr/>
+            </a:pPr>
+            <a:endParaRPr lang="en-US" sz="2400" dirty="0">
+              <a:ea typeface="+mn-ea"/>
+            </a:endParaRPr>
+          </a:p>
+        </p:txBody>
+      </p:sp>
+      <p:sp>
+        <p:nvSpPr>
+          <p:cNvPr id="3" name="Text Placeholder 2"/>
+          <p:cNvSpPr>
+            <a:spLocks noGrp="1"/>
+          </p:cNvSpPr>
+          <p:nvPr>
+            <p:ph type="body" sz="quarter" idx="12"/>
+          </p:nvPr>
+        </p:nvSpPr>
+        <p:spPr>
+          <a:prstGeom prst="rect">
+            <a:avLst/>
+          </a:prstGeom>
+        </p:spPr>
+        <p:txBody>
+          <a:bodyPr/>
+          <a:lstStyle/>
+          <a:p>
+            <a:pPr>
+              <a:spcBef>
+                <a:spcPct val="0"/>
+              </a:spcBef>
+            </a:pPr>
+            <a:r>
+              <a:rPr lang="en-US" b="1" dirty="0">
+                <a:latin typeface="BentonSans Book" charset="0"/>
+              </a:rPr>
+              <a:t>Germ Theory of Disease – Simple Viz</a:t>
+            </a:r>
+          </a:p>
+        </p:txBody>
+      </p:sp>
+    </p:spTree>
+    <p:extLst>
+      <p:ext uri="{BB962C8B-B14F-4D97-AF65-F5344CB8AC3E}">
+        <p14:creationId xmlns:p14="http://schemas.microsoft.com/office/powerpoint/2010/main" val="1829227786"/>
+      </p:ext>
+    </p:extLst>
+  </p:cSld>
+  <p:clrMapOvr>
+    <a:masterClrMapping/>
+  </p:clrMapOvr>
+  <p:transition spd="slow">
+    <p:cover/>
+  </p:transition>
+  <p:timing>
+    <p:tnLst>
+      <p:par>
+        <p:cTn id="1" dur="indefinite" restart="never" nodeType="tmRoot">
+          <p:childTnLst>
+            <p:seq concurrent="1" nextAc="seek">
+              <p:cTn id="2" dur="indefinite" nodeType="mainSeq">
+                <p:childTnLst>
+                  <p:par>
+                    <p:cTn id="3" fill="hold">
+                      <p:stCondLst>
+                        <p:cond delay="indefinite"/>
+                      </p:stCondLst>
+                      <p:childTnLst>
+                        <p:par>
+                          <p:cTn id="4" fill="hold">
+                            <p:stCondLst>
+                              <p:cond delay="0"/>
+                            </p:stCondLst>
+                            <p:childTnLst>
+                              <p:par>
+                                <p:cTn id="5" presetID="10" presetClass="entr" presetSubtype="0" fill="hold" grpId="0" nodeType="clickEffect">
+                                  <p:stCondLst>
+                                    <p:cond delay="0"/>
+                                  </p:stCondLst>
+                                  <p:childTnLst>
+                                    <p:set>
+                                      <p:cBhvr>
+                                        <p:cTn id="6" dur="1" fill="hold">
+                                          <p:stCondLst>
+                                            <p:cond delay="0"/>
+                                          </p:stCondLst>
+                                        </p:cTn>
+                                        <p:tgtEl>
+                                          <p:spTgt spid="2">
+                                            <p:txEl>
+                                              <p:pRg st="0" end="0"/>
+                                            </p:txEl>
+                                          </p:spTgt>
+                                        </p:tgtEl>
+                                        <p:attrNameLst>
+                                          <p:attrName>style.visibility</p:attrName>
+                                        </p:attrNameLst>
+                                      </p:cBhvr>
+                                      <p:to>
+                                        <p:strVal val="visible"/>
+                                      </p:to>
+                                    </p:set>
+                                    <p:animEffect transition="in" filter="fade">
+                                      <p:cBhvr>
+                                        <p:cTn id="7" dur="500"/>
+                                        <p:tgtEl>
+                                          <p:spTgt spid="2">
+                                            <p:txEl>
+                                              <p:pRg st="0" end="0"/>
+                                            </p:txEl>
+                                          </p:spTgt>
+                                        </p:tgtEl>
+                                      </p:cBhvr>
+                                    </p:animEffect>
+                                  </p:childTnLst>
+                                </p:cTn>
+                              </p:par>
+                            </p:childTnLst>
+                          </p:cTn>
+                        </p:par>
+                      </p:childTnLst>
+                    </p:cTn>
+                  </p:par>
+                  <p:par>
+                    <p:cTn id="8" fill="hold">
+                      <p:stCondLst>
+                        <p:cond delay="indefinite"/>
+                      </p:stCondLst>
+                      <p:childTnLst>
+                        <p:par>
+                          <p:cTn id="9" fill="hold">
+                            <p:stCondLst>
+                              <p:cond delay="0"/>
+                            </p:stCondLst>
+                            <p:childTnLst>
+                              <p:par>
+                                <p:cTn id="10" presetID="10" presetClass="entr" presetSubtype="0" fill="hold" grpId="0" nodeType="clickEffect">
+                                  <p:stCondLst>
+                                    <p:cond delay="0"/>
+                                  </p:stCondLst>
+                                  <p:childTnLst>
+                                    <p:set>
+                                      <p:cBhvr>
+                                        <p:cTn id="11" dur="1" fill="hold">
+                                          <p:stCondLst>
+                                            <p:cond delay="0"/>
+                                          </p:stCondLst>
+                                        </p:cTn>
+                                        <p:tgtEl>
+                                          <p:spTgt spid="2">
+                                            <p:txEl>
+                                              <p:pRg st="1" end="1"/>
+                                            </p:txEl>
+                                          </p:spTgt>
+                                        </p:tgtEl>
+                                        <p:attrNameLst>
+                                          <p:attrName>style.visibility</p:attrName>
+                                        </p:attrNameLst>
+                                      </p:cBhvr>
+                                      <p:to>
+                                        <p:strVal val="visible"/>
+                                      </p:to>
+                                    </p:set>
+                                    <p:animEffect transition="in" filter="fade">
+                                      <p:cBhvr>
+                                        <p:cTn id="12" dur="500"/>
+                                        <p:tgtEl>
+                                          <p:spTgt spid="2">
+                                            <p:txEl>
+                                              <p:pRg st="1" end="1"/>
+                                            </p:txEl>
+                                          </p:spTgt>
+                                        </p:tgtEl>
+                                      </p:cBhvr>
+                                    </p:animEffect>
+                                  </p:childTnLst>
+                                </p:cTn>
+                              </p:par>
+                            </p:childTnLst>
+                          </p:cTn>
+                        </p:par>
+                      </p:childTnLst>
+                    </p:cTn>
+                  </p:par>
+                  <p:par>
+                    <p:cTn id="13" fill="hold">
+                      <p:stCondLst>
+                        <p:cond delay="indefinite"/>
+                      </p:stCondLst>
+                      <p:childTnLst>
+                        <p:par>
+                          <p:cTn id="14" fill="hold">
+                            <p:stCondLst>
+                              <p:cond delay="0"/>
+                            </p:stCondLst>
+                            <p:childTnLst>
+                              <p:par>
+                                <p:cTn id="15" presetID="10" presetClass="entr" presetSubtype="0" fill="hold" grpId="0" nodeType="clickEffect">
+                                  <p:stCondLst>
+                                    <p:cond delay="0"/>
+                                  </p:stCondLst>
+                                  <p:childTnLst>
+                                    <p:set>
+                                      <p:cBhvr>
+                                        <p:cTn id="16" dur="1" fill="hold">
+                                          <p:stCondLst>
+                                            <p:cond delay="0"/>
+                                          </p:stCondLst>
+                                        </p:cTn>
+                                        <p:tgtEl>
+                                          <p:spTgt spid="2">
+                                            <p:txEl>
+                                              <p:pRg st="2" end="2"/>
+                                            </p:txEl>
+                                          </p:spTgt>
+                                        </p:tgtEl>
+                                        <p:attrNameLst>
+                                          <p:attrName>style.visibility</p:attrName>
+                                        </p:attrNameLst>
+                                      </p:cBhvr>
+                                      <p:to>
+                                        <p:strVal val="visible"/>
+                                      </p:to>
+                                    </p:set>
+                                    <p:animEffect transition="in" filter="fade">
+                                      <p:cBhvr>
+                                        <p:cTn id="17" dur="500"/>
+                                        <p:tgtEl>
+                                          <p:spTgt spid="2">
+                                            <p:txEl>
+                                              <p:pRg st="2" end="2"/>
+                                            </p:txEl>
+                                          </p:spTgt>
+                                        </p:tgtEl>
+                                      </p:cBhvr>
+                                    </p:animEffect>
+                                  </p:childTnLst>
+                                </p:cTn>
+                              </p:par>
+                            </p:childTnLst>
+                          </p:cTn>
+                        </p:par>
+                      </p:childTnLst>
+                    </p:cTn>
+                  </p:par>
+                  <p:par>
+                    <p:cTn id="18" fill="hold">
+                      <p:stCondLst>
+                        <p:cond delay="indefinite"/>
+                      </p:stCondLst>
+                      <p:childTnLst>
+                        <p:par>
+                          <p:cTn id="19" fill="hold">
+                            <p:stCondLst>
+                              <p:cond delay="0"/>
+                            </p:stCondLst>
+                            <p:childTnLst>
+                              <p:par>
+                                <p:cTn id="20" presetID="10" presetClass="entr" presetSubtype="0" fill="hold" grpId="0" nodeType="clickEffect">
+                                  <p:stCondLst>
+                                    <p:cond delay="0"/>
+                                  </p:stCondLst>
+                                  <p:childTnLst>
+                                    <p:set>
+                                      <p:cBhvr>
+                                        <p:cTn id="21" dur="1" fill="hold">
+                                          <p:stCondLst>
+                                            <p:cond delay="0"/>
+                                          </p:stCondLst>
+                                        </p:cTn>
+                                        <p:tgtEl>
+                                          <p:spTgt spid="2">
+                                            <p:txEl>
+                                              <p:pRg st="3" end="3"/>
+                                            </p:txEl>
+                                          </p:spTgt>
+                                        </p:tgtEl>
+                                        <p:attrNameLst>
+                                          <p:attrName>style.visibility</p:attrName>
+                                        </p:attrNameLst>
+                                      </p:cBhvr>
+                                      <p:to>
+                                        <p:strVal val="visible"/>
+                                      </p:to>
+                                    </p:set>
+                                    <p:animEffect transition="in" filter="fade">
+                                      <p:cBhvr>
+                                        <p:cTn id="22" dur="500"/>
+                                        <p:tgtEl>
+                                          <p:spTgt spid="2">
+                                            <p:txEl>
+                                              <p:pRg st="3" end="3"/>
+                                            </p:txEl>
+                                          </p:spTgt>
+                                        </p:tgtEl>
+                                      </p:cBhvr>
+                                    </p:animEffect>
+                                  </p:childTnLst>
+                                </p:cTn>
+                              </p:par>
+                            </p:childTnLst>
+                          </p:cTn>
+                        </p:par>
+                      </p:childTnLst>
+                    </p:cTn>
+                  </p:par>
+                  <p:par>
+                    <p:cTn id="23" fill="hold">
+                      <p:stCondLst>
+                        <p:cond delay="indefinite"/>
+                      </p:stCondLst>
+                      <p:childTnLst>
+                        <p:par>
+                          <p:cTn id="24" fill="hold">
+                            <p:stCondLst>
+                              <p:cond delay="0"/>
+                            </p:stCondLst>
+                            <p:childTnLst>
+                              <p:par>
+                                <p:cTn id="25" presetID="10" presetClass="entr" presetSubtype="0" fill="hold" grpId="0" nodeType="clickEffect">
+                                  <p:stCondLst>
+                                    <p:cond delay="0"/>
+                                  </p:stCondLst>
+                                  <p:childTnLst>
+                                    <p:set>
+                                      <p:cBhvr>
+                                        <p:cTn id="26" dur="1" fill="hold">
+                                          <p:stCondLst>
+                                            <p:cond delay="0"/>
+                                          </p:stCondLst>
+                                        </p:cTn>
+                                        <p:tgtEl>
+                                          <p:spTgt spid="2">
+                                            <p:txEl>
+                                              <p:pRg st="4" end="4"/>
+                                            </p:txEl>
+                                          </p:spTgt>
+                                        </p:tgtEl>
+                                        <p:attrNameLst>
+                                          <p:attrName>style.visibility</p:attrName>
+                                        </p:attrNameLst>
+                                      </p:cBhvr>
+                                      <p:to>
+                                        <p:strVal val="visible"/>
+                                      </p:to>
+                                    </p:set>
+                                    <p:animEffect transition="in" filter="fade">
+                                      <p:cBhvr>
+                                        <p:cTn id="27" dur="500"/>
+                                        <p:tgtEl>
+                                          <p:spTgt spid="2">
+                                            <p:txEl>
+                                              <p:pRg st="4" end="4"/>
+                                            </p:txEl>
+                                          </p:spTgt>
+                                        </p:tgtEl>
+                                      </p:cBhvr>
+                                    </p:animEffect>
+                                  </p:childTnLst>
+                                </p:cTn>
+                              </p:par>
+                            </p:childTnLst>
+                          </p:cTn>
+                        </p:par>
+                      </p:childTnLst>
+                    </p:cTn>
+                  </p:par>
+                  <p:par>
+                    <p:cTn id="28" fill="hold">
+                      <p:stCondLst>
+                        <p:cond delay="indefinite"/>
+                      </p:stCondLst>
+                      <p:childTnLst>
+                        <p:par>
+                          <p:cTn id="29" fill="hold">
+                            <p:stCondLst>
+                              <p:cond delay="0"/>
+                            </p:stCondLst>
+                            <p:childTnLst>
+                              <p:par>
+                                <p:cTn id="30" presetID="10" presetClass="entr" presetSubtype="0" fill="hold" grpId="0" nodeType="clickEffect">
+                                  <p:stCondLst>
+                                    <p:cond delay="0"/>
+                                  </p:stCondLst>
+                                  <p:childTnLst>
+                                    <p:set>
+                                      <p:cBhvr>
+                                        <p:cTn id="31" dur="1" fill="hold">
+                                          <p:stCondLst>
+                                            <p:cond delay="0"/>
+                                          </p:stCondLst>
+                                        </p:cTn>
+                                        <p:tgtEl>
+                                          <p:spTgt spid="2">
+                                            <p:txEl>
+                                              <p:pRg st="5" end="5"/>
+                                            </p:txEl>
+                                          </p:spTgt>
+                                        </p:tgtEl>
+                                        <p:attrNameLst>
+                                          <p:attrName>style.visibility</p:attrName>
+                                        </p:attrNameLst>
+                                      </p:cBhvr>
+                                      <p:to>
+                                        <p:strVal val="visible"/>
+                                      </p:to>
+                                    </p:set>
+                                    <p:animEffect transition="in" filter="fade">
+                                      <p:cBhvr>
+                                        <p:cTn id="32" dur="500"/>
+                                        <p:tgtEl>
+                                          <p:spTgt spid="2">
+                                            <p:txEl>
+                                              <p:pRg st="5" end="5"/>
+                                            </p:txEl>
+                                          </p:spTgt>
+                                        </p:tgtEl>
+                                      </p:cBhvr>
+                                    </p:animEffect>
+                                  </p:childTnLst>
+                                </p:cTn>
+                              </p:par>
+                            </p:childTnLst>
+                          </p:cTn>
+                        </p:par>
+                      </p:childTnLst>
+                    </p:cTn>
+                  </p:par>
+                  <p:par>
+                    <p:cTn id="33" fill="hold">
+                      <p:stCondLst>
+                        <p:cond delay="indefinite"/>
+                      </p:stCondLst>
+                      <p:childTnLst>
+                        <p:par>
+                          <p:cTn id="34" fill="hold">
+                            <p:stCondLst>
+                              <p:cond delay="0"/>
+                            </p:stCondLst>
+                            <p:childTnLst>
+                              <p:par>
+                                <p:cTn id="35" presetID="10" presetClass="entr" presetSubtype="0" fill="hold" grpId="0" nodeType="clickEffect">
+                                  <p:stCondLst>
+                                    <p:cond delay="0"/>
+                                  </p:stCondLst>
+                                  <p:childTnLst>
+                                    <p:set>
+                                      <p:cBhvr>
+                                        <p:cTn id="36" dur="1" fill="hold">
+                                          <p:stCondLst>
+                                            <p:cond delay="0"/>
+                                          </p:stCondLst>
+                                        </p:cTn>
+                                        <p:tgtEl>
+                                          <p:spTgt spid="2">
+                                            <p:txEl>
+                                              <p:pRg st="6" end="6"/>
+                                            </p:txEl>
+                                          </p:spTgt>
+                                        </p:tgtEl>
+                                        <p:attrNameLst>
+                                          <p:attrName>style.visibility</p:attrName>
+                                        </p:attrNameLst>
+                                      </p:cBhvr>
+                                      <p:to>
+                                        <p:strVal val="visible"/>
+                                      </p:to>
+                                    </p:set>
+                                    <p:animEffect transition="in" filter="fade">
+                                      <p:cBhvr>
+                                        <p:cTn id="37" dur="500"/>
+                                        <p:tgtEl>
+                                          <p:spTgt spid="2">
+                                            <p:txEl>
+                                              <p:pRg st="6" end="6"/>
+                                            </p:txEl>
+                                          </p:spTgt>
+                                        </p:tgtEl>
+                                      </p:cBhvr>
+                                    </p:animEffect>
+                                  </p:childTnLst>
+                                </p:cTn>
+                              </p:par>
+                            </p:childTnLst>
+                          </p:cTn>
+                        </p:par>
+                      </p:childTnLst>
+                    </p:cTn>
+                  </p:par>
+                  <p:par>
+                    <p:cTn id="38" fill="hold">
+                      <p:stCondLst>
+                        <p:cond delay="indefinite"/>
+                      </p:stCondLst>
+                      <p:childTnLst>
+                        <p:par>
+                          <p:cTn id="39" fill="hold">
+                            <p:stCondLst>
+                              <p:cond delay="0"/>
+                            </p:stCondLst>
+                            <p:childTnLst>
+                              <p:par>
+                                <p:cTn id="40" presetID="10" presetClass="entr" presetSubtype="0" fill="hold" grpId="0" nodeType="clickEffect">
+                                  <p:stCondLst>
+                                    <p:cond delay="0"/>
+                                  </p:stCondLst>
+                                  <p:childTnLst>
+                                    <p:set>
+                                      <p:cBhvr>
+                                        <p:cTn id="41" dur="1" fill="hold">
+                                          <p:stCondLst>
+                                            <p:cond delay="0"/>
+                                          </p:stCondLst>
+                                        </p:cTn>
+                                        <p:tgtEl>
+                                          <p:spTgt spid="2">
+                                            <p:txEl>
+                                              <p:pRg st="7" end="7"/>
+                                            </p:txEl>
+                                          </p:spTgt>
+                                        </p:tgtEl>
+                                        <p:attrNameLst>
+                                          <p:attrName>style.visibility</p:attrName>
+                                        </p:attrNameLst>
+                                      </p:cBhvr>
+                                      <p:to>
+                                        <p:strVal val="visible"/>
+                                      </p:to>
+                                    </p:set>
+                                    <p:animEffect transition="in" filter="fade">
+                                      <p:cBhvr>
+                                        <p:cTn id="42" dur="500"/>
+                                        <p:tgtEl>
+                                          <p:spTgt spid="2">
+                                            <p:txEl>
+                                              <p:pRg st="7" end="7"/>
+                                            </p:txEl>
+                                          </p:spTgt>
+                                        </p:tgtEl>
+                                      </p:cBhvr>
+                                    </p:animEffect>
+                                  </p:childTnLst>
+                                </p:cTn>
+                              </p:par>
+                            </p:childTnLst>
+                          </p:cTn>
+                        </p:par>
+                      </p:childTnLst>
+                    </p:cTn>
+                  </p:par>
+                  <p:par>
+                    <p:cTn id="43" fill="hold">
+                      <p:stCondLst>
+                        <p:cond delay="indefinite"/>
+                      </p:stCondLst>
+                      <p:childTnLst>
+                        <p:par>
+                          <p:cTn id="44" fill="hold">
+                            <p:stCondLst>
+                              <p:cond delay="0"/>
+                            </p:stCondLst>
+                            <p:childTnLst>
+                              <p:par>
+                                <p:cTn id="45" presetID="10" presetClass="entr" presetSubtype="0" fill="hold" grpId="0" nodeType="clickEffect">
+                                  <p:stCondLst>
+                                    <p:cond delay="0"/>
+                                  </p:stCondLst>
+                                  <p:childTnLst>
+                                    <p:set>
+                                      <p:cBhvr>
+                                        <p:cTn id="46" dur="1" fill="hold">
+                                          <p:stCondLst>
+                                            <p:cond delay="0"/>
+                                          </p:stCondLst>
+                                        </p:cTn>
+                                        <p:tgtEl>
+                                          <p:spTgt spid="2">
+                                            <p:txEl>
+                                              <p:pRg st="8" end="8"/>
+                                            </p:txEl>
+                                          </p:spTgt>
+                                        </p:tgtEl>
+                                        <p:attrNameLst>
+                                          <p:attrName>style.visibility</p:attrName>
+                                        </p:attrNameLst>
+                                      </p:cBhvr>
+                                      <p:to>
+                                        <p:strVal val="visible"/>
+                                      </p:to>
+                                    </p:set>
+                                    <p:animEffect transition="in" filter="fade">
+                                      <p:cBhvr>
+                                        <p:cTn id="47" dur="500"/>
+                                        <p:tgtEl>
+                                          <p:spTgt spid="2">
+                                            <p:txEl>
+                                              <p:pRg st="8" end="8"/>
+                                            </p:txEl>
+                                          </p:spTgt>
+                                        </p:tgtEl>
+                                      </p:cBhvr>
+                                    </p:animEffect>
+                                  </p:childTnLst>
+                                </p:cTn>
+                              </p:par>
+                            </p:childTnLst>
+                          </p:cTn>
+                        </p:par>
+                      </p:childTnLst>
+                    </p:cTn>
+                  </p:par>
+                  <p:par>
+                    <p:cTn id="48" fill="hold">
+                      <p:stCondLst>
+                        <p:cond delay="indefinite"/>
+                      </p:stCondLst>
+                      <p:childTnLst>
+                        <p:par>
+                          <p:cTn id="49" fill="hold">
+                            <p:stCondLst>
+                              <p:cond delay="0"/>
+                            </p:stCondLst>
+                            <p:childTnLst>
+                              <p:par>
+                                <p:cTn id="50" presetID="10" presetClass="entr" presetSubtype="0" fill="hold" grpId="0" nodeType="clickEffect">
+                                  <p:stCondLst>
+                                    <p:cond delay="0"/>
+                                  </p:stCondLst>
+                                  <p:childTnLst>
+                                    <p:set>
+                                      <p:cBhvr>
+                                        <p:cTn id="51" dur="1" fill="hold">
+                                          <p:stCondLst>
+                                            <p:cond delay="0"/>
+                                          </p:stCondLst>
+                                        </p:cTn>
+                                        <p:tgtEl>
+                                          <p:spTgt spid="2">
+                                            <p:txEl>
+                                              <p:pRg st="9" end="9"/>
+                                            </p:txEl>
+                                          </p:spTgt>
+                                        </p:tgtEl>
+                                        <p:attrNameLst>
+                                          <p:attrName>style.visibility</p:attrName>
+                                        </p:attrNameLst>
+                                      </p:cBhvr>
+                                      <p:to>
+                                        <p:strVal val="visible"/>
+                                      </p:to>
+                                    </p:set>
+                                    <p:animEffect transition="in" filter="fade">
+                                      <p:cBhvr>
+                                        <p:cTn id="52" dur="500"/>
+                                        <p:tgtEl>
+                                          <p:spTgt spid="2">
+                                            <p:txEl>
+                                              <p:pRg st="9" end="9"/>
+                                            </p:txEl>
+                                          </p:spTgt>
+                                        </p:tgtEl>
+                                      </p:cBhvr>
+                                    </p:animEffect>
+                                  </p:childTnLst>
+                                </p:cTn>
+                              </p:par>
+                            </p:childTnLst>
+                          </p:cTn>
+                        </p:par>
+                      </p:childTnLst>
+                    </p:cTn>
+                  </p:par>
+                  <p:par>
+                    <p:cTn id="53" fill="hold">
+                      <p:stCondLst>
+                        <p:cond delay="indefinite"/>
+                      </p:stCondLst>
+                      <p:childTnLst>
+                        <p:par>
+                          <p:cTn id="54" fill="hold">
+                            <p:stCondLst>
+                              <p:cond delay="0"/>
+                            </p:stCondLst>
+                            <p:childTnLst>
+                              <p:par>
+                                <p:cTn id="55" presetID="10" presetClass="entr" presetSubtype="0" fill="hold" grpId="0" nodeType="clickEffect">
+                                  <p:stCondLst>
+                                    <p:cond delay="0"/>
+                                  </p:stCondLst>
+                                  <p:childTnLst>
+                                    <p:set>
+                                      <p:cBhvr>
+                                        <p:cTn id="56" dur="1" fill="hold">
+                                          <p:stCondLst>
+                                            <p:cond delay="0"/>
+                                          </p:stCondLst>
+                                        </p:cTn>
+                                        <p:tgtEl>
+                                          <p:spTgt spid="2">
+                                            <p:txEl>
+                                              <p:pRg st="10" end="10"/>
+                                            </p:txEl>
+                                          </p:spTgt>
+                                        </p:tgtEl>
+                                        <p:attrNameLst>
+                                          <p:attrName>style.visibility</p:attrName>
+                                        </p:attrNameLst>
+                                      </p:cBhvr>
+                                      <p:to>
+                                        <p:strVal val="visible"/>
+                                      </p:to>
+                                    </p:set>
+                                    <p:animEffect transition="in" filter="fade">
+                                      <p:cBhvr>
+                                        <p:cTn id="57" dur="500"/>
+                                        <p:tgtEl>
+                                          <p:spTgt spid="2">
+                                            <p:txEl>
+                                              <p:pRg st="10" end="10"/>
+                                            </p:txEl>
+                                          </p:spTgt>
+                                        </p:tgtEl>
+                                      </p:cBhvr>
+                                    </p:animEffect>
+                                  </p:childTnLst>
+                                </p:cTn>
+                              </p:par>
+                            </p:childTnLst>
+                          </p:cTn>
+                        </p:par>
+                      </p:childTnLst>
+                    </p:cTn>
+                  </p:par>
+                  <p:par>
+                    <p:cTn id="58" fill="hold">
+                      <p:stCondLst>
+                        <p:cond delay="indefinite"/>
+                      </p:stCondLst>
+                      <p:childTnLst>
+                        <p:par>
+                          <p:cTn id="59" fill="hold">
+                            <p:stCondLst>
+                              <p:cond delay="0"/>
+                            </p:stCondLst>
+                            <p:childTnLst>
+                              <p:par>
+                                <p:cTn id="60" presetID="10" presetClass="entr" presetSubtype="0" fill="hold" grpId="0" nodeType="clickEffect">
+                                  <p:stCondLst>
+                                    <p:cond delay="0"/>
+                                  </p:stCondLst>
+                                  <p:childTnLst>
+                                    <p:set>
+                                      <p:cBhvr>
+                                        <p:cTn id="61" dur="1" fill="hold">
+                                          <p:stCondLst>
+                                            <p:cond delay="0"/>
+                                          </p:stCondLst>
+                                        </p:cTn>
+                                        <p:tgtEl>
+                                          <p:spTgt spid="2">
+                                            <p:txEl>
+                                              <p:pRg st="11" end="11"/>
+                                            </p:txEl>
+                                          </p:spTgt>
+                                        </p:tgtEl>
+                                        <p:attrNameLst>
+                                          <p:attrName>style.visibility</p:attrName>
+                                        </p:attrNameLst>
+                                      </p:cBhvr>
+                                      <p:to>
+                                        <p:strVal val="visible"/>
+                                      </p:to>
+                                    </p:set>
+                                    <p:animEffect transition="in" filter="fade">
+                                      <p:cBhvr>
+                                        <p:cTn id="62" dur="500"/>
+                                        <p:tgtEl>
+                                          <p:spTgt spid="2">
+                                            <p:txEl>
+                                              <p:pRg st="11" end="11"/>
+                                            </p:txEl>
+                                          </p:spTgt>
+                                        </p:tgtEl>
+                                      </p:cBhvr>
+                                    </p:animEffect>
+                                  </p:childTnLst>
+                                </p:cTn>
+                              </p:par>
+                            </p:childTnLst>
+                          </p:cTn>
+                        </p:par>
+                      </p:childTnLst>
+                    </p:cTn>
+                  </p:par>
+                </p:childTnLst>
+              </p:cTn>
+              <p:prevCondLst>
+                <p:cond evt="onPrev" delay="0">
+                  <p:tgtEl>
+                    <p:sldTgt/>
+                  </p:tgtEl>
+                </p:cond>
+              </p:prevCondLst>
+              <p:nextCondLst>
+                <p:cond evt="onNext" delay="0">
+                  <p:tgtEl>
+                    <p:sldTgt/>
+                  </p:tgtEl>
+                </p:cond>
+              </p:nextCondLst>
+            </p:seq>
+          </p:childTnLst>
+        </p:cTn>
+      </p:par>
+    </p:tnLst>
+    <p:bldLst>
+      <p:bldP spid="2" grpId="0" uiExpand="1" build="p"/>
+    </p:bldLst>
+  </p:timing>
+</p:sld>
+</file>
+
+<file path=ppt/slides/slide36.xml><?xml version="1.0" encoding="utf-8"?>
+<p:sld xmlns:a="http://schemas.openxmlformats.org/drawingml/2006/main" xmlns:r="http://schemas.openxmlformats.org/officeDocument/2006/relationships" xmlns:p="http://schemas.openxmlformats.org/presentationml/2006/main">
+  <p:cSld>
+    <p:spTree>
+      <p:nvGrpSpPr>
+        <p:cNvPr id="1" name=""/>
+        <p:cNvGrpSpPr/>
+        <p:nvPr/>
+      </p:nvGrpSpPr>
+      <p:grpSpPr>
+        <a:xfrm>
+          <a:off x="0" y="0"/>
+          <a:ext cx="0" cy="0"/>
+          <a:chOff x="0" y="0"/>
+          <a:chExt cx="0" cy="0"/>
+        </a:xfrm>
+      </p:grpSpPr>
+      <p:sp>
+        <p:nvSpPr>
+          <p:cNvPr id="2" name="Content Placeholder 1"/>
+          <p:cNvSpPr>
+            <a:spLocks noGrp="1"/>
+          </p:cNvSpPr>
+          <p:nvPr>
+            <p:ph idx="14"/>
+          </p:nvPr>
+        </p:nvSpPr>
+        <p:spPr>
+          <a:xfrm>
+            <a:off x="704476" y="1893515"/>
             <a:ext cx="13273820" cy="5601533"/>
           </a:xfrm>
         </p:spPr>
@@ -21160,7 +21672,7 @@
 </p:sld>
 </file>
 
-<file path=ppt/slides/slide36.xml><?xml version="1.0" encoding="utf-8"?>
+<file path=ppt/slides/slide37.xml><?xml version="1.0" encoding="utf-8"?>
 <p:sld xmlns:a="http://schemas.openxmlformats.org/drawingml/2006/main" xmlns:r="http://schemas.openxmlformats.org/officeDocument/2006/relationships" xmlns:p="http://schemas.openxmlformats.org/presentationml/2006/main">
   <p:cSld>
     <p:spTree>
@@ -21340,7 +21852,7 @@
 </p:sld>
 </file>
 
-<file path=ppt/slides/slide37.xml><?xml version="1.0" encoding="utf-8"?>
+<file path=ppt/slides/slide38.xml><?xml version="1.0" encoding="utf-8"?>
 <p:sld xmlns:a="http://schemas.openxmlformats.org/drawingml/2006/main" xmlns:r="http://schemas.openxmlformats.org/officeDocument/2006/relationships" xmlns:p="http://schemas.openxmlformats.org/presentationml/2006/main">
   <p:cSld>
     <p:spTree>
@@ -21550,7 +22062,263 @@
 </p:sld>
 </file>
 
-<file path=ppt/slides/slide38.xml><?xml version="1.0" encoding="utf-8"?>
+<file path=ppt/slides/slide39.xml><?xml version="1.0" encoding="utf-8"?>
+<p:sld xmlns:a="http://schemas.openxmlformats.org/drawingml/2006/main" xmlns:r="http://schemas.openxmlformats.org/officeDocument/2006/relationships" xmlns:p="http://schemas.openxmlformats.org/presentationml/2006/main">
+  <p:cSld>
+    <p:spTree>
+      <p:nvGrpSpPr>
+        <p:cNvPr id="1" name=""/>
+        <p:cNvGrpSpPr/>
+        <p:nvPr/>
+      </p:nvGrpSpPr>
+      <p:grpSpPr>
+        <a:xfrm>
+          <a:off x="0" y="0"/>
+          <a:ext cx="0" cy="0"/>
+          <a:chOff x="0" y="0"/>
+          <a:chExt cx="0" cy="0"/>
+        </a:xfrm>
+      </p:grpSpPr>
+      <p:sp>
+        <p:nvSpPr>
+          <p:cNvPr id="7169" name="Title 1"/>
+          <p:cNvSpPr>
+            <a:spLocks noGrp="1"/>
+          </p:cNvSpPr>
+          <p:nvPr>
+            <p:ph type="title" idx="4294967295"/>
+          </p:nvPr>
+        </p:nvSpPr>
+        <p:spPr>
+          <a:xfrm>
+            <a:off x="704850" y="1811338"/>
+            <a:ext cx="13274675" cy="605679"/>
+          </a:xfrm>
+        </p:spPr>
+        <p:txBody>
+          <a:bodyPr/>
+          <a:lstStyle/>
+          <a:p>
+            <a:pPr marL="457200" indent="-457200" defTabSz="1306221" fontAlgn="auto">
+              <a:defRPr/>
+            </a:pPr>
+            <a:r>
+              <a:rPr lang="en-US" sz="4800" dirty="0">
+                <a:hlinkClick r:id="rId3"/>
+              </a:rPr>
+              <a:t>Featured Tableau Public </a:t>
+            </a:r>
+            <a:r>
+              <a:rPr lang="en-US" sz="4800" dirty="0" err="1">
+                <a:hlinkClick r:id="rId3"/>
+              </a:rPr>
+              <a:t>Vizzes</a:t>
+            </a:r>
+            <a:endParaRPr lang="en-US" sz="4800" dirty="0"/>
+          </a:p>
+        </p:txBody>
+      </p:sp>
+    </p:spTree>
+    <p:extLst>
+      <p:ext uri="{BB962C8B-B14F-4D97-AF65-F5344CB8AC3E}">
+        <p14:creationId xmlns:p14="http://schemas.microsoft.com/office/powerpoint/2010/main" val="2832426001"/>
+      </p:ext>
+    </p:extLst>
+  </p:cSld>
+  <p:clrMapOvr>
+    <a:masterClrMapping/>
+  </p:clrMapOvr>
+  <p:transition spd="slow">
+    <p:push dir="u"/>
+  </p:transition>
+</p:sld>
+</file>
+
+<file path=ppt/slides/slide4.xml><?xml version="1.0" encoding="utf-8"?>
+<p:sld xmlns:a="http://schemas.openxmlformats.org/drawingml/2006/main" xmlns:r="http://schemas.openxmlformats.org/officeDocument/2006/relationships" xmlns:p="http://schemas.openxmlformats.org/presentationml/2006/main">
+  <p:cSld>
+    <p:spTree>
+      <p:nvGrpSpPr>
+        <p:cNvPr id="1" name=""/>
+        <p:cNvGrpSpPr/>
+        <p:nvPr/>
+      </p:nvGrpSpPr>
+      <p:grpSpPr>
+        <a:xfrm>
+          <a:off x="0" y="0"/>
+          <a:ext cx="0" cy="0"/>
+          <a:chOff x="0" y="0"/>
+          <a:chExt cx="0" cy="0"/>
+        </a:xfrm>
+      </p:grpSpPr>
+      <p:pic>
+        <p:nvPicPr>
+          <p:cNvPr id="6" name="Picture Placeholder 5">
+            <a:extLst>
+              <a:ext uri="{FF2B5EF4-FFF2-40B4-BE49-F238E27FC236}">
+                <a16:creationId xmlns:a16="http://schemas.microsoft.com/office/drawing/2014/main" id="{F7F89766-138E-4143-9B57-976D4CA07254}"/>
+              </a:ext>
+            </a:extLst>
+          </p:cNvPr>
+          <p:cNvPicPr>
+            <a:picLocks noGrp="1" noChangeAspect="1"/>
+          </p:cNvPicPr>
+          <p:nvPr>
+            <p:ph type="pic" sz="quarter" idx="10"/>
+          </p:nvPr>
+        </p:nvPicPr>
+        <p:blipFill>
+          <a:blip r:embed="rId2" cstate="email">
+            <a:extLst>
+              <a:ext uri="{28A0092B-C50C-407E-A947-70E740481C1C}">
+                <a14:useLocalDpi xmlns:a14="http://schemas.microsoft.com/office/drawing/2010/main" val="0"/>
+              </a:ext>
+            </a:extLst>
+          </a:blip>
+          <a:srcRect t="7813" b="7813"/>
+          <a:stretch>
+            <a:fillRect/>
+          </a:stretch>
+        </p:blipFill>
+        <p:spPr/>
+      </p:pic>
+    </p:spTree>
+    <p:extLst>
+      <p:ext uri="{BB962C8B-B14F-4D97-AF65-F5344CB8AC3E}">
+        <p14:creationId xmlns:p14="http://schemas.microsoft.com/office/powerpoint/2010/main" val="732574801"/>
+      </p:ext>
+    </p:extLst>
+  </p:cSld>
+  <p:clrMapOvr>
+    <a:masterClrMapping/>
+  </p:clrMapOvr>
+  <p:transition spd="slow">
+    <p:cover/>
+  </p:transition>
+</p:sld>
+</file>
+
+<file path=ppt/slides/slide40.xml><?xml version="1.0" encoding="utf-8"?>
+<p:sld xmlns:a="http://schemas.openxmlformats.org/drawingml/2006/main" xmlns:r="http://schemas.openxmlformats.org/officeDocument/2006/relationships" xmlns:p="http://schemas.openxmlformats.org/presentationml/2006/main">
+  <p:cSld>
+    <p:spTree>
+      <p:nvGrpSpPr>
+        <p:cNvPr id="1" name=""/>
+        <p:cNvGrpSpPr/>
+        <p:nvPr/>
+      </p:nvGrpSpPr>
+      <p:grpSpPr>
+        <a:xfrm>
+          <a:off x="0" y="0"/>
+          <a:ext cx="0" cy="0"/>
+          <a:chOff x="0" y="0"/>
+          <a:chExt cx="0" cy="0"/>
+        </a:xfrm>
+      </p:grpSpPr>
+      <p:sp>
+        <p:nvSpPr>
+          <p:cNvPr id="7169" name="Title 1"/>
+          <p:cNvSpPr>
+            <a:spLocks noGrp="1"/>
+          </p:cNvSpPr>
+          <p:nvPr>
+            <p:ph type="title" idx="4294967295"/>
+          </p:nvPr>
+        </p:nvSpPr>
+        <p:spPr>
+          <a:xfrm>
+            <a:off x="704850" y="2009049"/>
+            <a:ext cx="13274675" cy="907300"/>
+          </a:xfrm>
+        </p:spPr>
+        <p:txBody>
+          <a:bodyPr/>
+          <a:lstStyle/>
+          <a:p>
+            <a:r>
+              <a:rPr lang="en-US" dirty="0">
+                <a:solidFill>
+                  <a:srgbClr val="4C4C4C"/>
+                </a:solidFill>
+                <a:latin typeface="BentonSans Book" charset="0"/>
+              </a:rPr>
+              <a:t>Make your own viz!</a:t>
+            </a:r>
+            <a:br>
+              <a:rPr lang="en-US" dirty="0">
+                <a:solidFill>
+                  <a:srgbClr val="4C4C4C"/>
+                </a:solidFill>
+                <a:latin typeface="BentonSans Book" charset="0"/>
+              </a:rPr>
+            </a:br>
+            <a:r>
+              <a:rPr lang="en-US" sz="2800" dirty="0">
+                <a:solidFill>
+                  <a:srgbClr val="4C4C4C"/>
+                </a:solidFill>
+                <a:latin typeface="BentonSans Book" charset="0"/>
+              </a:rPr>
+              <a:t>(use any data, here’s an </a:t>
+            </a:r>
+            <a:r>
+              <a:rPr lang="en-US" sz="2800" dirty="0">
+                <a:solidFill>
+                  <a:srgbClr val="4C4C4C"/>
+                </a:solidFill>
+                <a:latin typeface="BentonSans Book" charset="0"/>
+                <a:hlinkClick r:id="rId3"/>
+              </a:rPr>
+              <a:t>anime template </a:t>
+            </a:r>
+            <a:r>
+              <a:rPr lang="en-US" sz="2800" dirty="0">
+                <a:solidFill>
+                  <a:srgbClr val="4C4C4C"/>
+                </a:solidFill>
+                <a:latin typeface="BentonSans Book" charset="0"/>
+              </a:rPr>
+              <a:t>and </a:t>
+            </a:r>
+            <a:r>
+              <a:rPr lang="en-US" sz="2800" dirty="0">
+                <a:solidFill>
+                  <a:srgbClr val="4C4C4C"/>
+                </a:solidFill>
+                <a:latin typeface="BentonSans Book" charset="0"/>
+                <a:hlinkClick r:id="rId4"/>
+              </a:rPr>
+              <a:t>complete anime workbook on Tableau Public</a:t>
+            </a:r>
+            <a:r>
+              <a:rPr lang="en-US" sz="2800" dirty="0">
+                <a:solidFill>
+                  <a:srgbClr val="4C4C4C"/>
+                </a:solidFill>
+                <a:latin typeface="BentonSans Book" charset="0"/>
+              </a:rPr>
+              <a:t>)</a:t>
+            </a:r>
+          </a:p>
+        </p:txBody>
+      </p:sp>
+    </p:spTree>
+    <p:extLst>
+      <p:ext uri="{BB962C8B-B14F-4D97-AF65-F5344CB8AC3E}">
+        <p14:creationId xmlns:p14="http://schemas.microsoft.com/office/powerpoint/2010/main" val="3056533445"/>
+      </p:ext>
+    </p:extLst>
+  </p:cSld>
+  <p:clrMapOvr>
+    <a:masterClrMapping/>
+  </p:clrMapOvr>
+  <p:transition spd="slow">
+    <p:push dir="u"/>
+  </p:transition>
+</p:sld>
+</file>
+
+<file path=ppt/slides/slide41.xml><?xml version="1.0" encoding="utf-8"?>
 <p:sld xmlns:a="http://schemas.openxmlformats.org/drawingml/2006/main" xmlns:r="http://schemas.openxmlformats.org/officeDocument/2006/relationships" xmlns:p="http://schemas.openxmlformats.org/presentationml/2006/main">
   <p:cSld>
     <p:spTree>
@@ -22389,7 +23157,7 @@
 </p:sld>
 </file>
 
-<file path=ppt/slides/slide39.xml><?xml version="1.0" encoding="utf-8"?>
+<file path=ppt/slides/slide42.xml><?xml version="1.0" encoding="utf-8"?>
 <p:sld xmlns:a="http://schemas.openxmlformats.org/drawingml/2006/main" xmlns:r="http://schemas.openxmlformats.org/officeDocument/2006/relationships" xmlns:p="http://schemas.openxmlformats.org/presentationml/2006/main">
   <p:cSld>
     <p:spTree>
@@ -22512,70 +23280,6 @@
       </p:transition>
     </mc:Fallback>
   </mc:AlternateContent>
-</p:sld>
-</file>
-
-<file path=ppt/slides/slide4.xml><?xml version="1.0" encoding="utf-8"?>
-<p:sld xmlns:a="http://schemas.openxmlformats.org/drawingml/2006/main" xmlns:r="http://schemas.openxmlformats.org/officeDocument/2006/relationships" xmlns:p="http://schemas.openxmlformats.org/presentationml/2006/main">
-  <p:cSld>
-    <p:spTree>
-      <p:nvGrpSpPr>
-        <p:cNvPr id="1" name=""/>
-        <p:cNvGrpSpPr/>
-        <p:nvPr/>
-      </p:nvGrpSpPr>
-      <p:grpSpPr>
-        <a:xfrm>
-          <a:off x="0" y="0"/>
-          <a:ext cx="0" cy="0"/>
-          <a:chOff x="0" y="0"/>
-          <a:chExt cx="0" cy="0"/>
-        </a:xfrm>
-      </p:grpSpPr>
-      <p:pic>
-        <p:nvPicPr>
-          <p:cNvPr id="6" name="Picture Placeholder 5">
-            <a:extLst>
-              <a:ext uri="{FF2B5EF4-FFF2-40B4-BE49-F238E27FC236}">
-                <a16:creationId xmlns:a16="http://schemas.microsoft.com/office/drawing/2014/main" id="{F7F89766-138E-4143-9B57-976D4CA07254}"/>
-              </a:ext>
-            </a:extLst>
-          </p:cNvPr>
-          <p:cNvPicPr>
-            <a:picLocks noGrp="1" noChangeAspect="1"/>
-          </p:cNvPicPr>
-          <p:nvPr>
-            <p:ph type="pic" sz="quarter" idx="10"/>
-          </p:nvPr>
-        </p:nvPicPr>
-        <p:blipFill>
-          <a:blip r:embed="rId2" cstate="email">
-            <a:extLst>
-              <a:ext uri="{28A0092B-C50C-407E-A947-70E740481C1C}">
-                <a14:useLocalDpi xmlns:a14="http://schemas.microsoft.com/office/drawing/2010/main" val="0"/>
-              </a:ext>
-            </a:extLst>
-          </a:blip>
-          <a:srcRect t="7813" b="7813"/>
-          <a:stretch>
-            <a:fillRect/>
-          </a:stretch>
-        </p:blipFill>
-        <p:spPr/>
-      </p:pic>
-    </p:spTree>
-    <p:extLst>
-      <p:ext uri="{BB962C8B-B14F-4D97-AF65-F5344CB8AC3E}">
-        <p14:creationId xmlns:p14="http://schemas.microsoft.com/office/powerpoint/2010/main" val="732574801"/>
-      </p:ext>
-    </p:extLst>
-  </p:cSld>
-  <p:clrMapOvr>
-    <a:masterClrMapping/>
-  </p:clrMapOvr>
-  <p:transition spd="slow">
-    <p:cover/>
-  </p:transition>
 </p:sld>
 </file>
 
@@ -22919,10 +23623,10 @@
               <a:defRPr/>
             </a:pPr>
             <a:r>
-              <a:rPr lang="en-US"/>
+              <a:rPr lang="en-US" dirty="0"/>
               <a:t>Career Opportunities</a:t>
             </a:r>
-            <a:endParaRPr lang="en-US">
+            <a:endParaRPr lang="en-US" dirty="0">
               <a:ea typeface="+mn-ea"/>
             </a:endParaRPr>
           </a:p>

</xml_diff>

<commit_message>
added publishing instructions and filter actions
</commit_message>
<xml_diff>
--- a/lecture.pptx
+++ b/lecture.pptx
@@ -5,10 +5,10 @@
     <p:sldMasterId id="2147483875" r:id="rId1"/>
   </p:sldMasterIdLst>
   <p:notesMasterIdLst>
-    <p:notesMasterId r:id="rId44"/>
+    <p:notesMasterId r:id="rId45"/>
   </p:notesMasterIdLst>
   <p:handoutMasterIdLst>
-    <p:handoutMasterId r:id="rId45"/>
+    <p:handoutMasterId r:id="rId46"/>
   </p:handoutMasterIdLst>
   <p:sldIdLst>
     <p:sldId id="256" r:id="rId2"/>
@@ -49,10 +49,11 @@
     <p:sldId id="572" r:id="rId37"/>
     <p:sldId id="574" r:id="rId38"/>
     <p:sldId id="573" r:id="rId39"/>
-    <p:sldId id="578" r:id="rId40"/>
-    <p:sldId id="576" r:id="rId41"/>
-    <p:sldId id="567" r:id="rId42"/>
-    <p:sldId id="566" r:id="rId43"/>
+    <p:sldId id="579" r:id="rId40"/>
+    <p:sldId id="578" r:id="rId41"/>
+    <p:sldId id="576" r:id="rId42"/>
+    <p:sldId id="567" r:id="rId43"/>
+    <p:sldId id="566" r:id="rId44"/>
   </p:sldIdLst>
   <p:sldSz cx="14630400" cy="8229600"/>
   <p:notesSz cx="6858000" cy="9144000"/>
@@ -4767,7 +4768,7 @@
       </p:grpSpPr>
       <p:sp>
         <p:nvSpPr>
-          <p:cNvPr id="38913" name="Slide Image Placeholder 1"/>
+          <p:cNvPr id="2" name="Slide Image Placeholder 1"/>
           <p:cNvSpPr>
             <a:spLocks noGrp="1" noRot="1" noChangeAspect="1"/>
           </p:cNvSpPr>
@@ -4775,33 +4776,11 @@
             <p:ph type="sldImg"/>
           </p:nvPr>
         </p:nvSpPr>
-        <p:spPr bwMode="auto">
-          <a:noFill/>
-          <a:ln>
-            <a:solidFill>
-              <a:srgbClr val="000000"/>
-            </a:solidFill>
-            <a:miter lim="800000"/>
-            <a:headEnd/>
-            <a:tailEnd/>
-          </a:ln>
-          <a:extLst>
-            <a:ext uri="{909E8E84-426E-40dd-AFC4-6F175D3DCCD1}">
-              <a14:hiddenFill xmlns:a14="http://schemas.microsoft.com/office/drawing/2010/main" xmlns="">
-                <a:solidFill>
-                  <a:srgbClr val="FFFFFF"/>
-                </a:solidFill>
-              </a14:hiddenFill>
-            </a:ext>
-            <a:ext uri="{FAA26D3D-D897-4be2-8F04-BA451C77F1D7}">
-              <ma14:placeholderFlag xmlns:ma14="http://schemas.microsoft.com/office/mac/drawingml/2011/main" xmlns="" val="1"/>
-            </a:ext>
-          </a:extLst>
-        </p:spPr>
+        <p:spPr/>
       </p:sp>
       <p:sp>
         <p:nvSpPr>
-          <p:cNvPr id="38914" name="Notes Placeholder 2"/>
+          <p:cNvPr id="3" name="Notes Placeholder 2"/>
           <p:cNvSpPr>
             <a:spLocks noGrp="1"/>
           </p:cNvSpPr>
@@ -4809,73 +4788,19 @@
             <p:ph type="body" idx="1"/>
           </p:nvPr>
         </p:nvSpPr>
-        <p:spPr bwMode="auto">
-          <a:noFill/>
-          <a:extLst>
-            <a:ext uri="{909E8E84-426E-40dd-AFC4-6F175D3DCCD1}">
-              <a14:hiddenFill xmlns:a14="http://schemas.microsoft.com/office/drawing/2010/main" xmlns="">
-                <a:solidFill>
-                  <a:srgbClr val="FFFFFF"/>
-                </a:solidFill>
-              </a14:hiddenFill>
-            </a:ext>
-            <a:ext uri="{91240B29-F687-4f45-9708-019B960494DF}">
-              <a14:hiddenLine xmlns:a14="http://schemas.microsoft.com/office/drawing/2010/main" xmlns="" w="9525">
-                <a:solidFill>
-                  <a:srgbClr val="000000"/>
-                </a:solidFill>
-                <a:miter lim="800000"/>
-                <a:headEnd/>
-                <a:tailEnd/>
-              </a14:hiddenLine>
-            </a:ext>
-          </a:extLst>
-        </p:spPr>
+        <p:spPr/>
         <p:txBody>
-          <a:bodyPr wrap="square" numCol="1" anchor="t" anchorCtr="0" compatLnSpc="1">
-            <a:prstTxWarp prst="textNoShape">
-              <a:avLst/>
-            </a:prstTxWarp>
-          </a:bodyPr>
+          <a:bodyPr/>
           <a:lstStyle/>
           <a:p>
-            <a:pPr>
-              <a:spcBef>
-                <a:spcPct val="0"/>
-              </a:spcBef>
-            </a:pPr>
-            <a:r>
-              <a:rPr lang="en-US" dirty="0">
-                <a:hlinkClick r:id="rId3"/>
-              </a:rPr>
-              <a:t>https://public.tableau.com/en-us/s/gallery</a:t>
-            </a:r>
-            <a:endParaRPr lang="en-US" dirty="0">
-              <a:hlinkClick r:id="rId4"/>
-            </a:endParaRPr>
-          </a:p>
-          <a:p>
-            <a:pPr>
-              <a:spcBef>
-                <a:spcPct val="0"/>
-              </a:spcBef>
-            </a:pPr>
-            <a:r>
-              <a:rPr lang="en-US" dirty="0">
-                <a:hlinkClick r:id="rId4"/>
-              </a:rPr>
-              <a:t>https://public.tableau.com/profile/spencer.shadley#!/vizhome/Anime/UndiscoveredAnime</a:t>
-            </a:r>
-            <a:endParaRPr lang="en-US" dirty="0">
-              <a:latin typeface="BentonSans Book" charset="0"/>
-            </a:endParaRPr>
+            <a:endParaRPr lang="en-US" dirty="0"/>
           </a:p>
         </p:txBody>
       </p:sp>
     </p:spTree>
     <p:extLst>
       <p:ext uri="{BB962C8B-B14F-4D97-AF65-F5344CB8AC3E}">
-        <p14:creationId xmlns:p14="http://schemas.microsoft.com/office/powerpoint/2010/main" val="1289791595"/>
+        <p14:creationId xmlns:p14="http://schemas.microsoft.com/office/powerpoint/2010/main" val="1518370499"/>
       </p:ext>
     </p:extLst>
   </p:cSld>
@@ -4985,9 +4910,11 @@
               <a:rPr lang="en-US" dirty="0">
                 <a:hlinkClick r:id="rId3"/>
               </a:rPr>
-              <a:t>Tableau Public Anime Viz: https://public.tableau.com/profile/spencer.shadley#!/vizhome/Anime/UndiscoveredAnime</a:t>
-            </a:r>
-            <a:endParaRPr lang="en-US" dirty="0"/>
+              <a:t>https://public.tableau.com/en-us/s/gallery</a:t>
+            </a:r>
+            <a:endParaRPr lang="en-US" dirty="0">
+              <a:hlinkClick r:id="rId4"/>
+            </a:endParaRPr>
           </a:p>
           <a:p>
             <a:pPr>
@@ -4997,42 +4924,20 @@
             </a:pPr>
             <a:r>
               <a:rPr lang="en-US" dirty="0">
-                <a:latin typeface="BentonSans Book" charset="0"/>
-              </a:rPr>
-              <a:t>Anime Template </a:t>
-            </a:r>
-            <a:r>
-              <a:rPr lang="en-US" dirty="0" err="1">
-                <a:latin typeface="BentonSans Book" charset="0"/>
-              </a:rPr>
-              <a:t>twb</a:t>
-            </a:r>
-            <a:r>
-              <a:rPr lang="en-US" dirty="0">
-                <a:latin typeface="BentonSans Book" charset="0"/>
-              </a:rPr>
-              <a:t>: https://github.com/spencer-shadley/data-lecture/blob/master/workbooks%20and%20datasources/Template%20Workbooks/Anime.twbx</a:t>
-            </a:r>
-          </a:p>
-          <a:p>
-            <a:pPr>
-              <a:spcBef>
-                <a:spcPct val="0"/>
-              </a:spcBef>
-            </a:pPr>
-            <a:r>
-              <a:rPr lang="en-US" dirty="0">
-                <a:latin typeface="BentonSans Book" charset="0"/>
-              </a:rPr>
-              <a:t>Anime Complete Workbook (same as on public): https://github.com/spencer-shadley/data-lecture/blob/master/workbooks%20and%20datasources/Completed%20Workbooks/Anime.twbx</a:t>
-            </a:r>
+                <a:hlinkClick r:id="rId4"/>
+              </a:rPr>
+              <a:t>https://public.tableau.com/profile/spencer.shadley#!/vizhome/Anime/UndiscoveredAnime</a:t>
+            </a:r>
+            <a:endParaRPr lang="en-US" dirty="0">
+              <a:latin typeface="BentonSans Book" charset="0"/>
+            </a:endParaRPr>
           </a:p>
         </p:txBody>
       </p:sp>
     </p:spTree>
     <p:extLst>
       <p:ext uri="{BB962C8B-B14F-4D97-AF65-F5344CB8AC3E}">
-        <p14:creationId xmlns:p14="http://schemas.microsoft.com/office/powerpoint/2010/main" val="1151791318"/>
+        <p14:creationId xmlns:p14="http://schemas.microsoft.com/office/powerpoint/2010/main" val="1289791595"/>
       </p:ext>
     </p:extLst>
   </p:cSld>
@@ -5061,7 +4966,7 @@
       </p:grpSpPr>
       <p:sp>
         <p:nvSpPr>
-          <p:cNvPr id="2" name="Slide Image Placeholder 1"/>
+          <p:cNvPr id="38913" name="Slide Image Placeholder 1"/>
           <p:cNvSpPr>
             <a:spLocks noGrp="1" noRot="1" noChangeAspect="1"/>
           </p:cNvSpPr>
@@ -5069,11 +4974,33 @@
             <p:ph type="sldImg"/>
           </p:nvPr>
         </p:nvSpPr>
-        <p:spPr/>
+        <p:spPr bwMode="auto">
+          <a:noFill/>
+          <a:ln>
+            <a:solidFill>
+              <a:srgbClr val="000000"/>
+            </a:solidFill>
+            <a:miter lim="800000"/>
+            <a:headEnd/>
+            <a:tailEnd/>
+          </a:ln>
+          <a:extLst>
+            <a:ext uri="{909E8E84-426E-40dd-AFC4-6F175D3DCCD1}">
+              <a14:hiddenFill xmlns:a14="http://schemas.microsoft.com/office/drawing/2010/main" xmlns="">
+                <a:solidFill>
+                  <a:srgbClr val="FFFFFF"/>
+                </a:solidFill>
+              </a14:hiddenFill>
+            </a:ext>
+            <a:ext uri="{FAA26D3D-D897-4be2-8F04-BA451C77F1D7}">
+              <ma14:placeholderFlag xmlns:ma14="http://schemas.microsoft.com/office/mac/drawingml/2011/main" xmlns="" val="1"/>
+            </a:ext>
+          </a:extLst>
+        </p:spPr>
       </p:sp>
       <p:sp>
         <p:nvSpPr>
-          <p:cNvPr id="3" name="Notes Placeholder 2"/>
+          <p:cNvPr id="38914" name="Notes Placeholder 2"/>
           <p:cNvSpPr>
             <a:spLocks noGrp="1"/>
           </p:cNvSpPr>
@@ -5081,19 +5008,93 @@
             <p:ph type="body" idx="1"/>
           </p:nvPr>
         </p:nvSpPr>
-        <p:spPr/>
+        <p:spPr bwMode="auto">
+          <a:noFill/>
+          <a:extLst>
+            <a:ext uri="{909E8E84-426E-40dd-AFC4-6F175D3DCCD1}">
+              <a14:hiddenFill xmlns:a14="http://schemas.microsoft.com/office/drawing/2010/main" xmlns="">
+                <a:solidFill>
+                  <a:srgbClr val="FFFFFF"/>
+                </a:solidFill>
+              </a14:hiddenFill>
+            </a:ext>
+            <a:ext uri="{91240B29-F687-4f45-9708-019B960494DF}">
+              <a14:hiddenLine xmlns:a14="http://schemas.microsoft.com/office/drawing/2010/main" xmlns="" w="9525">
+                <a:solidFill>
+                  <a:srgbClr val="000000"/>
+                </a:solidFill>
+                <a:miter lim="800000"/>
+                <a:headEnd/>
+                <a:tailEnd/>
+              </a14:hiddenLine>
+            </a:ext>
+          </a:extLst>
+        </p:spPr>
         <p:txBody>
-          <a:bodyPr/>
+          <a:bodyPr wrap="square" numCol="1" anchor="t" anchorCtr="0" compatLnSpc="1">
+            <a:prstTxWarp prst="textNoShape">
+              <a:avLst/>
+            </a:prstTxWarp>
+          </a:bodyPr>
           <a:lstStyle/>
           <a:p>
+            <a:pPr>
+              <a:spcBef>
+                <a:spcPct val="0"/>
+              </a:spcBef>
+            </a:pPr>
+            <a:r>
+              <a:rPr lang="en-US" dirty="0">
+                <a:hlinkClick r:id="rId3"/>
+              </a:rPr>
+              <a:t>Tableau Public Anime Viz: https://public.tableau.com/profile/spencer.shadley#!/vizhome/Anime/UndiscoveredAnime</a:t>
+            </a:r>
             <a:endParaRPr lang="en-US" dirty="0"/>
+          </a:p>
+          <a:p>
+            <a:pPr>
+              <a:spcBef>
+                <a:spcPct val="0"/>
+              </a:spcBef>
+            </a:pPr>
+            <a:r>
+              <a:rPr lang="en-US" dirty="0">
+                <a:latin typeface="BentonSans Book" charset="0"/>
+              </a:rPr>
+              <a:t>Anime Template </a:t>
+            </a:r>
+            <a:r>
+              <a:rPr lang="en-US" dirty="0" err="1">
+                <a:latin typeface="BentonSans Book" charset="0"/>
+              </a:rPr>
+              <a:t>twb</a:t>
+            </a:r>
+            <a:r>
+              <a:rPr lang="en-US" dirty="0">
+                <a:latin typeface="BentonSans Book" charset="0"/>
+              </a:rPr>
+              <a:t>: https://github.com/spencer-shadley/data-lecture/blob/master/workbooks%20and%20datasources/Template%20Workbooks/Anime.twbx</a:t>
+            </a:r>
+          </a:p>
+          <a:p>
+            <a:pPr>
+              <a:spcBef>
+                <a:spcPct val="0"/>
+              </a:spcBef>
+            </a:pPr>
+            <a:r>
+              <a:rPr lang="en-US" dirty="0">
+                <a:latin typeface="BentonSans Book" charset="0"/>
+              </a:rPr>
+              <a:t>Anime Complete Workbook (same as on public): https://github.com/spencer-shadley/data-lecture/blob/master/workbooks%20and%20datasources/Completed%20Workbooks/Anime.twbx</a:t>
+            </a:r>
           </a:p>
         </p:txBody>
       </p:sp>
     </p:spTree>
     <p:extLst>
       <p:ext uri="{BB962C8B-B14F-4D97-AF65-F5344CB8AC3E}">
-        <p14:creationId xmlns:p14="http://schemas.microsoft.com/office/powerpoint/2010/main" val="3559071881"/>
+        <p14:creationId xmlns:p14="http://schemas.microsoft.com/office/powerpoint/2010/main" val="1151791318"/>
       </p:ext>
     </p:extLst>
   </p:cSld>
@@ -5219,6 +5220,67 @@
 </file>
 
 <file path=ppt/notesSlides/notesSlide40.xml><?xml version="1.0" encoding="utf-8"?>
+<p:notes xmlns:a="http://schemas.openxmlformats.org/drawingml/2006/main" xmlns:r="http://schemas.openxmlformats.org/officeDocument/2006/relationships" xmlns:p="http://schemas.openxmlformats.org/presentationml/2006/main">
+  <p:cSld>
+    <p:spTree>
+      <p:nvGrpSpPr>
+        <p:cNvPr id="1" name=""/>
+        <p:cNvGrpSpPr/>
+        <p:nvPr/>
+      </p:nvGrpSpPr>
+      <p:grpSpPr>
+        <a:xfrm>
+          <a:off x="0" y="0"/>
+          <a:ext cx="0" cy="0"/>
+          <a:chOff x="0" y="0"/>
+          <a:chExt cx="0" cy="0"/>
+        </a:xfrm>
+      </p:grpSpPr>
+      <p:sp>
+        <p:nvSpPr>
+          <p:cNvPr id="2" name="Slide Image Placeholder 1"/>
+          <p:cNvSpPr>
+            <a:spLocks noGrp="1" noRot="1" noChangeAspect="1"/>
+          </p:cNvSpPr>
+          <p:nvPr>
+            <p:ph type="sldImg"/>
+          </p:nvPr>
+        </p:nvSpPr>
+        <p:spPr/>
+      </p:sp>
+      <p:sp>
+        <p:nvSpPr>
+          <p:cNvPr id="3" name="Notes Placeholder 2"/>
+          <p:cNvSpPr>
+            <a:spLocks noGrp="1"/>
+          </p:cNvSpPr>
+          <p:nvPr>
+            <p:ph type="body" idx="1"/>
+          </p:nvPr>
+        </p:nvSpPr>
+        <p:spPr/>
+        <p:txBody>
+          <a:bodyPr/>
+          <a:lstStyle/>
+          <a:p>
+            <a:endParaRPr lang="en-US" dirty="0"/>
+          </a:p>
+        </p:txBody>
+      </p:sp>
+    </p:spTree>
+    <p:extLst>
+      <p:ext uri="{BB962C8B-B14F-4D97-AF65-F5344CB8AC3E}">
+        <p14:creationId xmlns:p14="http://schemas.microsoft.com/office/powerpoint/2010/main" val="3559071881"/>
+      </p:ext>
+    </p:extLst>
+  </p:cSld>
+  <p:clrMapOvr>
+    <a:masterClrMapping/>
+  </p:clrMapOvr>
+</p:notes>
+</file>
+
+<file path=ppt/notesSlides/notesSlide41.xml><?xml version="1.0" encoding="utf-8"?>
 <p:notes xmlns:a="http://schemas.openxmlformats.org/drawingml/2006/main" xmlns:r="http://schemas.openxmlformats.org/officeDocument/2006/relationships" xmlns:p="http://schemas.openxmlformats.org/presentationml/2006/main">
   <p:cSld>
     <p:spTree>
@@ -21702,7 +21764,7 @@
         <p:spPr>
           <a:xfrm>
             <a:off x="704476" y="1893515"/>
-            <a:ext cx="13273820" cy="3939540"/>
+            <a:ext cx="13273820" cy="5278368"/>
           </a:xfrm>
         </p:spPr>
         <p:txBody>
@@ -21773,6 +21835,40 @@
               <a:rPr lang="en-US" sz="2400" dirty="0"/>
               <a:t>Try clicking a mark in the “Mortality By Month” sheet</a:t>
             </a:r>
+          </a:p>
+          <a:p>
+            <a:pPr marL="457200" indent="-457200" defTabSz="1306221" fontAlgn="auto">
+              <a:buFont typeface="+mj-lt"/>
+              <a:buAutoNum type="arabicPeriod"/>
+              <a:defRPr/>
+            </a:pPr>
+            <a:r>
+              <a:rPr lang="en-US" sz="2400" dirty="0"/>
+              <a:t>Click “Dashboard” in the top level menu &gt; “Actions…”</a:t>
+            </a:r>
+          </a:p>
+          <a:p>
+            <a:pPr marL="457200" indent="-457200" defTabSz="1306221" fontAlgn="auto">
+              <a:buFont typeface="+mj-lt"/>
+              <a:buAutoNum type="arabicPeriod"/>
+              <a:defRPr/>
+            </a:pPr>
+            <a:r>
+              <a:rPr lang="en-US" sz="2400" dirty="0"/>
+              <a:t>Click your filter &gt; “Edit…”</a:t>
+            </a:r>
+          </a:p>
+          <a:p>
+            <a:pPr marL="457200" indent="-457200" defTabSz="1306221" fontAlgn="auto">
+              <a:buFont typeface="+mj-lt"/>
+              <a:buAutoNum type="arabicPeriod"/>
+              <a:defRPr/>
+            </a:pPr>
+            <a:r>
+              <a:rPr lang="en-US" sz="2400"/>
+              <a:t>Select “Hover” &gt; “OK” &gt; “OK”</a:t>
+            </a:r>
+            <a:endParaRPr lang="en-US" sz="2400" dirty="0"/>
           </a:p>
           <a:p>
             <a:pPr marL="457200" indent="-457200" defTabSz="1306221" fontAlgn="auto">
@@ -22081,18 +22177,18 @@
       </p:grpSpPr>
       <p:sp>
         <p:nvSpPr>
-          <p:cNvPr id="7169" name="Title 1"/>
+          <p:cNvPr id="2" name="Content Placeholder 1"/>
           <p:cNvSpPr>
             <a:spLocks noGrp="1"/>
           </p:cNvSpPr>
           <p:nvPr>
-            <p:ph type="title" idx="4294967295"/>
+            <p:ph idx="14"/>
           </p:nvPr>
         </p:nvSpPr>
         <p:spPr>
           <a:xfrm>
-            <a:off x="704850" y="1811338"/>
-            <a:ext cx="13274675" cy="605679"/>
+            <a:off x="704476" y="1893515"/>
+            <a:ext cx="13273820" cy="6109365"/>
           </a:xfrm>
         </p:spPr>
         <p:txBody>
@@ -22100,28 +22196,201 @@
           <a:lstStyle/>
           <a:p>
             <a:pPr marL="457200" indent="-457200" defTabSz="1306221" fontAlgn="auto">
+              <a:buFont typeface="+mj-lt"/>
+              <a:buAutoNum type="arabicPeriod"/>
               <a:defRPr/>
             </a:pPr>
             <a:r>
-              <a:rPr lang="en-US" sz="4800" dirty="0">
+              <a:rPr lang="en-US" sz="2400" dirty="0"/>
+              <a:t>Click the “Server” top level menu</a:t>
+            </a:r>
+          </a:p>
+          <a:p>
+            <a:pPr marL="457200" indent="-457200" defTabSz="1306221" fontAlgn="auto">
+              <a:buFont typeface="+mj-lt"/>
+              <a:buAutoNum type="arabicPeriod"/>
+              <a:defRPr/>
+            </a:pPr>
+            <a:r>
+              <a:rPr lang="en-US" sz="2400" dirty="0"/>
+              <a:t>Click “Sign In…”</a:t>
+            </a:r>
+          </a:p>
+          <a:p>
+            <a:pPr marL="457200" indent="-457200" defTabSz="1306221" fontAlgn="auto">
+              <a:buFont typeface="+mj-lt"/>
+              <a:buAutoNum type="arabicPeriod"/>
+              <a:defRPr/>
+            </a:pPr>
+            <a:r>
+              <a:rPr lang="en-US" sz="2400" dirty="0"/>
+              <a:t>Use “https://public.tableau.com” as the URL</a:t>
+            </a:r>
+          </a:p>
+          <a:p>
+            <a:pPr marL="457200" indent="-457200" defTabSz="1306221" fontAlgn="auto">
+              <a:buFont typeface="+mj-lt"/>
+              <a:buAutoNum type="arabicPeriod"/>
+              <a:defRPr/>
+            </a:pPr>
+            <a:r>
+              <a:rPr lang="en-US" sz="2400" dirty="0"/>
+              <a:t>Click “Connect”</a:t>
+            </a:r>
+          </a:p>
+          <a:p>
+            <a:pPr marL="457200" indent="-457200" defTabSz="1306221" fontAlgn="auto">
+              <a:buFont typeface="+mj-lt"/>
+              <a:buAutoNum type="arabicPeriod"/>
+              <a:defRPr/>
+            </a:pPr>
+            <a:r>
+              <a:rPr lang="en-US" sz="2400" dirty="0"/>
+              <a:t>Sign in with your Tableau Public account (or make one if you haven’t already)</a:t>
+            </a:r>
+          </a:p>
+          <a:p>
+            <a:pPr marL="457200" indent="-457200" defTabSz="1306221" fontAlgn="auto">
+              <a:buFont typeface="+mj-lt"/>
+              <a:buAutoNum type="arabicPeriod"/>
+              <a:defRPr/>
+            </a:pPr>
+            <a:r>
+              <a:rPr lang="en-US" sz="2400" dirty="0"/>
+              <a:t>Click the “Server” top level menu</a:t>
+            </a:r>
+          </a:p>
+          <a:p>
+            <a:pPr marL="457200" indent="-457200" defTabSz="1306221" fontAlgn="auto">
+              <a:buFont typeface="+mj-lt"/>
+              <a:buAutoNum type="arabicPeriod"/>
+              <a:defRPr/>
+            </a:pPr>
+            <a:r>
+              <a:rPr lang="en-US" sz="2400" dirty="0"/>
+              <a:t>Click “Publish Workbook…”</a:t>
+            </a:r>
+          </a:p>
+          <a:p>
+            <a:pPr marL="739775" lvl="1" indent="-457200" defTabSz="1306221" fontAlgn="auto">
+              <a:buFont typeface="+mj-lt"/>
+              <a:buAutoNum type="arabicPeriod"/>
+              <a:defRPr/>
+            </a:pPr>
+            <a:r>
+              <a:rPr lang="en-US" sz="2000" dirty="0"/>
+              <a:t>Note: You might need to switch the datasource to be an extract in the “Data Source” tab if it’s set to “Live”</a:t>
+            </a:r>
+          </a:p>
+          <a:p>
+            <a:pPr marL="457200" indent="-457200" defTabSz="1306221" fontAlgn="auto">
+              <a:buFont typeface="+mj-lt"/>
+              <a:buAutoNum type="arabicPeriod"/>
+              <a:defRPr/>
+            </a:pPr>
+            <a:r>
+              <a:rPr lang="en-US" sz="2400" dirty="0"/>
+              <a:t>Change the title to something unique</a:t>
+            </a:r>
+          </a:p>
+          <a:p>
+            <a:pPr marL="457200" indent="-457200" defTabSz="1306221" fontAlgn="auto">
+              <a:buFont typeface="+mj-lt"/>
+              <a:buAutoNum type="arabicPeriod"/>
+              <a:defRPr/>
+            </a:pPr>
+            <a:r>
+              <a:rPr lang="en-US" sz="2400" dirty="0"/>
+              <a:t>Click “Save”</a:t>
+            </a:r>
+          </a:p>
+          <a:p>
+            <a:pPr marL="457200" indent="-457200" defTabSz="1306221" fontAlgn="auto">
+              <a:buFont typeface="+mj-lt"/>
+              <a:buAutoNum type="arabicPeriod"/>
+              <a:defRPr/>
+            </a:pPr>
+            <a:r>
+              <a:rPr lang="en-US" sz="2400" dirty="0"/>
+              <a:t>It’s </a:t>
+            </a:r>
+            <a:r>
+              <a:rPr lang="en-US" sz="2400" dirty="0">
                 <a:hlinkClick r:id="rId3"/>
               </a:rPr>
-              <a:t>Featured Tableau Public </a:t>
-            </a:r>
-            <a:r>
-              <a:rPr lang="en-US" sz="4800" dirty="0" err="1">
-                <a:hlinkClick r:id="rId3"/>
-              </a:rPr>
-              <a:t>Vizzes</a:t>
-            </a:r>
-            <a:endParaRPr lang="en-US" sz="4800" dirty="0"/>
+              <a:t>published</a:t>
+            </a:r>
+            <a:r>
+              <a:rPr lang="en-US" sz="2400" dirty="0"/>
+              <a:t>!</a:t>
+            </a:r>
+          </a:p>
+          <a:p>
+            <a:pPr marL="457200" indent="-457200" defTabSz="1306221" fontAlgn="auto">
+              <a:buFont typeface="+mj-lt"/>
+              <a:buAutoNum type="arabicPeriod"/>
+              <a:defRPr/>
+            </a:pPr>
+            <a:r>
+              <a:rPr lang="en-US" sz="2400" dirty="0"/>
+              <a:t>Note: to show all sheets you need to “Edit Details” &gt; check “Show workbook sheets as tabs” &gt; “Save”</a:t>
+            </a:r>
+          </a:p>
+          <a:p>
+            <a:pPr marL="457200" indent="-457200" defTabSz="1306221" fontAlgn="auto">
+              <a:buFont typeface="+mj-lt"/>
+              <a:buAutoNum type="arabicPeriod"/>
+              <a:defRPr/>
+            </a:pPr>
+            <a:endParaRPr lang="en-US" sz="2400" dirty="0"/>
+          </a:p>
+          <a:p>
+            <a:pPr marL="457200" indent="-457200" defTabSz="1306221" fontAlgn="auto">
+              <a:buFont typeface="+mj-lt"/>
+              <a:buAutoNum type="arabicPeriod"/>
+              <a:defRPr/>
+            </a:pPr>
+            <a:endParaRPr lang="en-US" sz="2400" dirty="0"/>
+          </a:p>
+        </p:txBody>
+      </p:sp>
+      <p:sp>
+        <p:nvSpPr>
+          <p:cNvPr id="3" name="Text Placeholder 2"/>
+          <p:cNvSpPr>
+            <a:spLocks noGrp="1"/>
+          </p:cNvSpPr>
+          <p:nvPr>
+            <p:ph type="body" sz="quarter" idx="12"/>
+          </p:nvPr>
+        </p:nvSpPr>
+        <p:spPr>
+          <a:prstGeom prst="rect">
+            <a:avLst/>
+          </a:prstGeom>
+        </p:spPr>
+        <p:txBody>
+          <a:bodyPr/>
+          <a:lstStyle/>
+          <a:p>
+            <a:pPr>
+              <a:spcBef>
+                <a:spcPct val="0"/>
+              </a:spcBef>
+            </a:pPr>
+            <a:r>
+              <a:rPr lang="en-US" b="1" dirty="0">
+                <a:latin typeface="BentonSans Book" charset="0"/>
+              </a:rPr>
+              <a:t>Germ Theory of Disease – Make it Public!</a:t>
+            </a:r>
           </a:p>
         </p:txBody>
       </p:sp>
     </p:spTree>
     <p:extLst>
       <p:ext uri="{BB962C8B-B14F-4D97-AF65-F5344CB8AC3E}">
-        <p14:creationId xmlns:p14="http://schemas.microsoft.com/office/powerpoint/2010/main" val="2832426001"/>
+        <p14:creationId xmlns:p14="http://schemas.microsoft.com/office/powerpoint/2010/main" val="1179025872"/>
       </p:ext>
     </p:extLst>
   </p:cSld>
@@ -22129,7 +22398,7 @@
     <a:masterClrMapping/>
   </p:clrMapOvr>
   <p:transition spd="slow">
-    <p:push dir="u"/>
+    <p:cover/>
   </p:transition>
 </p:sld>
 </file>
@@ -22227,6 +22496,78 @@
         </p:nvSpPr>
         <p:spPr>
           <a:xfrm>
+            <a:off x="704850" y="1811338"/>
+            <a:ext cx="13274675" cy="605679"/>
+          </a:xfrm>
+        </p:spPr>
+        <p:txBody>
+          <a:bodyPr/>
+          <a:lstStyle/>
+          <a:p>
+            <a:pPr marL="457200" indent="-457200" defTabSz="1306221" fontAlgn="auto">
+              <a:defRPr/>
+            </a:pPr>
+            <a:r>
+              <a:rPr lang="en-US" sz="4800" dirty="0">
+                <a:hlinkClick r:id="rId3"/>
+              </a:rPr>
+              <a:t>Featured Tableau Public </a:t>
+            </a:r>
+            <a:r>
+              <a:rPr lang="en-US" sz="4800" dirty="0" err="1">
+                <a:hlinkClick r:id="rId3"/>
+              </a:rPr>
+              <a:t>Vizzes</a:t>
+            </a:r>
+            <a:endParaRPr lang="en-US" sz="4800" dirty="0"/>
+          </a:p>
+        </p:txBody>
+      </p:sp>
+    </p:spTree>
+    <p:extLst>
+      <p:ext uri="{BB962C8B-B14F-4D97-AF65-F5344CB8AC3E}">
+        <p14:creationId xmlns:p14="http://schemas.microsoft.com/office/powerpoint/2010/main" val="2832426001"/>
+      </p:ext>
+    </p:extLst>
+  </p:cSld>
+  <p:clrMapOvr>
+    <a:masterClrMapping/>
+  </p:clrMapOvr>
+  <p:transition spd="slow">
+    <p:push dir="u"/>
+  </p:transition>
+</p:sld>
+</file>
+
+<file path=ppt/slides/slide41.xml><?xml version="1.0" encoding="utf-8"?>
+<p:sld xmlns:a="http://schemas.openxmlformats.org/drawingml/2006/main" xmlns:r="http://schemas.openxmlformats.org/officeDocument/2006/relationships" xmlns:p="http://schemas.openxmlformats.org/presentationml/2006/main">
+  <p:cSld>
+    <p:spTree>
+      <p:nvGrpSpPr>
+        <p:cNvPr id="1" name=""/>
+        <p:cNvGrpSpPr/>
+        <p:nvPr/>
+      </p:nvGrpSpPr>
+      <p:grpSpPr>
+        <a:xfrm>
+          <a:off x="0" y="0"/>
+          <a:ext cx="0" cy="0"/>
+          <a:chOff x="0" y="0"/>
+          <a:chExt cx="0" cy="0"/>
+        </a:xfrm>
+      </p:grpSpPr>
+      <p:sp>
+        <p:nvSpPr>
+          <p:cNvPr id="7169" name="Title 1"/>
+          <p:cNvSpPr>
+            <a:spLocks noGrp="1"/>
+          </p:cNvSpPr>
+          <p:nvPr>
+            <p:ph type="title" idx="4294967295"/>
+          </p:nvPr>
+        </p:nvSpPr>
+        <p:spPr>
+          <a:xfrm>
             <a:off x="704850" y="2009049"/>
             <a:ext cx="13274675" cy="907300"/>
           </a:xfrm>
@@ -22318,7 +22659,7 @@
 </p:sld>
 </file>
 
-<file path=ppt/slides/slide41.xml><?xml version="1.0" encoding="utf-8"?>
+<file path=ppt/slides/slide42.xml><?xml version="1.0" encoding="utf-8"?>
 <p:sld xmlns:a="http://schemas.openxmlformats.org/drawingml/2006/main" xmlns:r="http://schemas.openxmlformats.org/officeDocument/2006/relationships" xmlns:p="http://schemas.openxmlformats.org/presentationml/2006/main">
   <p:cSld>
     <p:spTree>
@@ -23157,7 +23498,7 @@
 </p:sld>
 </file>
 
-<file path=ppt/slides/slide42.xml><?xml version="1.0" encoding="utf-8"?>
+<file path=ppt/slides/slide43.xml><?xml version="1.0" encoding="utf-8"?>
 <p:sld xmlns:a="http://schemas.openxmlformats.org/drawingml/2006/main" xmlns:r="http://schemas.openxmlformats.org/officeDocument/2006/relationships" xmlns:p="http://schemas.openxmlformats.org/presentationml/2006/main">
   <p:cSld>
     <p:spTree>

</xml_diff>

<commit_message>
minor updates to tech over time workbook
</commit_message>
<xml_diff>
--- a/lecture.pptx
+++ b/lecture.pptx
@@ -21953,6 +21953,710 @@
   <p:transition spd="slow">
     <p:cover/>
   </p:transition>
+  <p:timing>
+    <p:tnLst>
+      <p:par>
+        <p:cTn id="1" dur="indefinite" restart="never" nodeType="tmRoot">
+          <p:childTnLst>
+            <p:seq concurrent="1" nextAc="seek">
+              <p:cTn id="2" dur="indefinite" nodeType="mainSeq">
+                <p:childTnLst>
+                  <p:par>
+                    <p:cTn id="3" fill="hold">
+                      <p:stCondLst>
+                        <p:cond delay="indefinite"/>
+                      </p:stCondLst>
+                      <p:childTnLst>
+                        <p:par>
+                          <p:cTn id="4" fill="hold">
+                            <p:stCondLst>
+                              <p:cond delay="0"/>
+                            </p:stCondLst>
+                            <p:childTnLst>
+                              <p:par>
+                                <p:cTn id="5" presetID="10" presetClass="entr" presetSubtype="0" fill="hold" grpId="0" nodeType="clickEffect">
+                                  <p:stCondLst>
+                                    <p:cond delay="0"/>
+                                  </p:stCondLst>
+                                  <p:childTnLst>
+                                    <p:set>
+                                      <p:cBhvr>
+                                        <p:cTn id="6" dur="1" fill="hold">
+                                          <p:stCondLst>
+                                            <p:cond delay="0"/>
+                                          </p:stCondLst>
+                                        </p:cTn>
+                                        <p:tgtEl>
+                                          <p:spTgt spid="2">
+                                            <p:txEl>
+                                              <p:pRg st="0" end="0"/>
+                                            </p:txEl>
+                                          </p:spTgt>
+                                        </p:tgtEl>
+                                        <p:attrNameLst>
+                                          <p:attrName>style.visibility</p:attrName>
+                                        </p:attrNameLst>
+                                      </p:cBhvr>
+                                      <p:to>
+                                        <p:strVal val="visible"/>
+                                      </p:to>
+                                    </p:set>
+                                    <p:animEffect transition="in" filter="fade">
+                                      <p:cBhvr>
+                                        <p:cTn id="7" dur="500"/>
+                                        <p:tgtEl>
+                                          <p:spTgt spid="2">
+                                            <p:txEl>
+                                              <p:pRg st="0" end="0"/>
+                                            </p:txEl>
+                                          </p:spTgt>
+                                        </p:tgtEl>
+                                      </p:cBhvr>
+                                    </p:animEffect>
+                                  </p:childTnLst>
+                                </p:cTn>
+                              </p:par>
+                            </p:childTnLst>
+                          </p:cTn>
+                        </p:par>
+                      </p:childTnLst>
+                    </p:cTn>
+                  </p:par>
+                  <p:par>
+                    <p:cTn id="8" fill="hold">
+                      <p:stCondLst>
+                        <p:cond delay="indefinite"/>
+                      </p:stCondLst>
+                      <p:childTnLst>
+                        <p:par>
+                          <p:cTn id="9" fill="hold">
+                            <p:stCondLst>
+                              <p:cond delay="0"/>
+                            </p:stCondLst>
+                            <p:childTnLst>
+                              <p:par>
+                                <p:cTn id="10" presetID="10" presetClass="entr" presetSubtype="0" fill="hold" grpId="0" nodeType="clickEffect">
+                                  <p:stCondLst>
+                                    <p:cond delay="0"/>
+                                  </p:stCondLst>
+                                  <p:childTnLst>
+                                    <p:set>
+                                      <p:cBhvr>
+                                        <p:cTn id="11" dur="1" fill="hold">
+                                          <p:stCondLst>
+                                            <p:cond delay="0"/>
+                                          </p:stCondLst>
+                                        </p:cTn>
+                                        <p:tgtEl>
+                                          <p:spTgt spid="2">
+                                            <p:txEl>
+                                              <p:pRg st="1" end="1"/>
+                                            </p:txEl>
+                                          </p:spTgt>
+                                        </p:tgtEl>
+                                        <p:attrNameLst>
+                                          <p:attrName>style.visibility</p:attrName>
+                                        </p:attrNameLst>
+                                      </p:cBhvr>
+                                      <p:to>
+                                        <p:strVal val="visible"/>
+                                      </p:to>
+                                    </p:set>
+                                    <p:animEffect transition="in" filter="fade">
+                                      <p:cBhvr>
+                                        <p:cTn id="12" dur="500"/>
+                                        <p:tgtEl>
+                                          <p:spTgt spid="2">
+                                            <p:txEl>
+                                              <p:pRg st="1" end="1"/>
+                                            </p:txEl>
+                                          </p:spTgt>
+                                        </p:tgtEl>
+                                      </p:cBhvr>
+                                    </p:animEffect>
+                                  </p:childTnLst>
+                                </p:cTn>
+                              </p:par>
+                            </p:childTnLst>
+                          </p:cTn>
+                        </p:par>
+                      </p:childTnLst>
+                    </p:cTn>
+                  </p:par>
+                  <p:par>
+                    <p:cTn id="13" fill="hold">
+                      <p:stCondLst>
+                        <p:cond delay="indefinite"/>
+                      </p:stCondLst>
+                      <p:childTnLst>
+                        <p:par>
+                          <p:cTn id="14" fill="hold">
+                            <p:stCondLst>
+                              <p:cond delay="0"/>
+                            </p:stCondLst>
+                            <p:childTnLst>
+                              <p:par>
+                                <p:cTn id="15" presetID="10" presetClass="entr" presetSubtype="0" fill="hold" grpId="0" nodeType="clickEffect">
+                                  <p:stCondLst>
+                                    <p:cond delay="0"/>
+                                  </p:stCondLst>
+                                  <p:childTnLst>
+                                    <p:set>
+                                      <p:cBhvr>
+                                        <p:cTn id="16" dur="1" fill="hold">
+                                          <p:stCondLst>
+                                            <p:cond delay="0"/>
+                                          </p:stCondLst>
+                                        </p:cTn>
+                                        <p:tgtEl>
+                                          <p:spTgt spid="2">
+                                            <p:txEl>
+                                              <p:pRg st="2" end="2"/>
+                                            </p:txEl>
+                                          </p:spTgt>
+                                        </p:tgtEl>
+                                        <p:attrNameLst>
+                                          <p:attrName>style.visibility</p:attrName>
+                                        </p:attrNameLst>
+                                      </p:cBhvr>
+                                      <p:to>
+                                        <p:strVal val="visible"/>
+                                      </p:to>
+                                    </p:set>
+                                    <p:animEffect transition="in" filter="fade">
+                                      <p:cBhvr>
+                                        <p:cTn id="17" dur="500"/>
+                                        <p:tgtEl>
+                                          <p:spTgt spid="2">
+                                            <p:txEl>
+                                              <p:pRg st="2" end="2"/>
+                                            </p:txEl>
+                                          </p:spTgt>
+                                        </p:tgtEl>
+                                      </p:cBhvr>
+                                    </p:animEffect>
+                                  </p:childTnLst>
+                                </p:cTn>
+                              </p:par>
+                            </p:childTnLst>
+                          </p:cTn>
+                        </p:par>
+                      </p:childTnLst>
+                    </p:cTn>
+                  </p:par>
+                  <p:par>
+                    <p:cTn id="18" fill="hold">
+                      <p:stCondLst>
+                        <p:cond delay="indefinite"/>
+                      </p:stCondLst>
+                      <p:childTnLst>
+                        <p:par>
+                          <p:cTn id="19" fill="hold">
+                            <p:stCondLst>
+                              <p:cond delay="0"/>
+                            </p:stCondLst>
+                            <p:childTnLst>
+                              <p:par>
+                                <p:cTn id="20" presetID="10" presetClass="entr" presetSubtype="0" fill="hold" grpId="0" nodeType="clickEffect">
+                                  <p:stCondLst>
+                                    <p:cond delay="0"/>
+                                  </p:stCondLst>
+                                  <p:childTnLst>
+                                    <p:set>
+                                      <p:cBhvr>
+                                        <p:cTn id="21" dur="1" fill="hold">
+                                          <p:stCondLst>
+                                            <p:cond delay="0"/>
+                                          </p:stCondLst>
+                                        </p:cTn>
+                                        <p:tgtEl>
+                                          <p:spTgt spid="2">
+                                            <p:txEl>
+                                              <p:pRg st="3" end="3"/>
+                                            </p:txEl>
+                                          </p:spTgt>
+                                        </p:tgtEl>
+                                        <p:attrNameLst>
+                                          <p:attrName>style.visibility</p:attrName>
+                                        </p:attrNameLst>
+                                      </p:cBhvr>
+                                      <p:to>
+                                        <p:strVal val="visible"/>
+                                      </p:to>
+                                    </p:set>
+                                    <p:animEffect transition="in" filter="fade">
+                                      <p:cBhvr>
+                                        <p:cTn id="22" dur="500"/>
+                                        <p:tgtEl>
+                                          <p:spTgt spid="2">
+                                            <p:txEl>
+                                              <p:pRg st="3" end="3"/>
+                                            </p:txEl>
+                                          </p:spTgt>
+                                        </p:tgtEl>
+                                      </p:cBhvr>
+                                    </p:animEffect>
+                                  </p:childTnLst>
+                                </p:cTn>
+                              </p:par>
+                            </p:childTnLst>
+                          </p:cTn>
+                        </p:par>
+                      </p:childTnLst>
+                    </p:cTn>
+                  </p:par>
+                  <p:par>
+                    <p:cTn id="23" fill="hold">
+                      <p:stCondLst>
+                        <p:cond delay="indefinite"/>
+                      </p:stCondLst>
+                      <p:childTnLst>
+                        <p:par>
+                          <p:cTn id="24" fill="hold">
+                            <p:stCondLst>
+                              <p:cond delay="0"/>
+                            </p:stCondLst>
+                            <p:childTnLst>
+                              <p:par>
+                                <p:cTn id="25" presetID="10" presetClass="entr" presetSubtype="0" fill="hold" grpId="0" nodeType="clickEffect">
+                                  <p:stCondLst>
+                                    <p:cond delay="0"/>
+                                  </p:stCondLst>
+                                  <p:childTnLst>
+                                    <p:set>
+                                      <p:cBhvr>
+                                        <p:cTn id="26" dur="1" fill="hold">
+                                          <p:stCondLst>
+                                            <p:cond delay="0"/>
+                                          </p:stCondLst>
+                                        </p:cTn>
+                                        <p:tgtEl>
+                                          <p:spTgt spid="2">
+                                            <p:txEl>
+                                              <p:pRg st="4" end="4"/>
+                                            </p:txEl>
+                                          </p:spTgt>
+                                        </p:tgtEl>
+                                        <p:attrNameLst>
+                                          <p:attrName>style.visibility</p:attrName>
+                                        </p:attrNameLst>
+                                      </p:cBhvr>
+                                      <p:to>
+                                        <p:strVal val="visible"/>
+                                      </p:to>
+                                    </p:set>
+                                    <p:animEffect transition="in" filter="fade">
+                                      <p:cBhvr>
+                                        <p:cTn id="27" dur="500"/>
+                                        <p:tgtEl>
+                                          <p:spTgt spid="2">
+                                            <p:txEl>
+                                              <p:pRg st="4" end="4"/>
+                                            </p:txEl>
+                                          </p:spTgt>
+                                        </p:tgtEl>
+                                      </p:cBhvr>
+                                    </p:animEffect>
+                                  </p:childTnLst>
+                                </p:cTn>
+                              </p:par>
+                            </p:childTnLst>
+                          </p:cTn>
+                        </p:par>
+                      </p:childTnLst>
+                    </p:cTn>
+                  </p:par>
+                  <p:par>
+                    <p:cTn id="28" fill="hold">
+                      <p:stCondLst>
+                        <p:cond delay="indefinite"/>
+                      </p:stCondLst>
+                      <p:childTnLst>
+                        <p:par>
+                          <p:cTn id="29" fill="hold">
+                            <p:stCondLst>
+                              <p:cond delay="0"/>
+                            </p:stCondLst>
+                            <p:childTnLst>
+                              <p:par>
+                                <p:cTn id="30" presetID="10" presetClass="entr" presetSubtype="0" fill="hold" grpId="0" nodeType="clickEffect">
+                                  <p:stCondLst>
+                                    <p:cond delay="0"/>
+                                  </p:stCondLst>
+                                  <p:childTnLst>
+                                    <p:set>
+                                      <p:cBhvr>
+                                        <p:cTn id="31" dur="1" fill="hold">
+                                          <p:stCondLst>
+                                            <p:cond delay="0"/>
+                                          </p:stCondLst>
+                                        </p:cTn>
+                                        <p:tgtEl>
+                                          <p:spTgt spid="2">
+                                            <p:txEl>
+                                              <p:pRg st="5" end="5"/>
+                                            </p:txEl>
+                                          </p:spTgt>
+                                        </p:tgtEl>
+                                        <p:attrNameLst>
+                                          <p:attrName>style.visibility</p:attrName>
+                                        </p:attrNameLst>
+                                      </p:cBhvr>
+                                      <p:to>
+                                        <p:strVal val="visible"/>
+                                      </p:to>
+                                    </p:set>
+                                    <p:animEffect transition="in" filter="fade">
+                                      <p:cBhvr>
+                                        <p:cTn id="32" dur="500"/>
+                                        <p:tgtEl>
+                                          <p:spTgt spid="2">
+                                            <p:txEl>
+                                              <p:pRg st="5" end="5"/>
+                                            </p:txEl>
+                                          </p:spTgt>
+                                        </p:tgtEl>
+                                      </p:cBhvr>
+                                    </p:animEffect>
+                                  </p:childTnLst>
+                                </p:cTn>
+                              </p:par>
+                            </p:childTnLst>
+                          </p:cTn>
+                        </p:par>
+                      </p:childTnLst>
+                    </p:cTn>
+                  </p:par>
+                  <p:par>
+                    <p:cTn id="33" fill="hold">
+                      <p:stCondLst>
+                        <p:cond delay="indefinite"/>
+                      </p:stCondLst>
+                      <p:childTnLst>
+                        <p:par>
+                          <p:cTn id="34" fill="hold">
+                            <p:stCondLst>
+                              <p:cond delay="0"/>
+                            </p:stCondLst>
+                            <p:childTnLst>
+                              <p:par>
+                                <p:cTn id="35" presetID="10" presetClass="entr" presetSubtype="0" fill="hold" grpId="0" nodeType="clickEffect">
+                                  <p:stCondLst>
+                                    <p:cond delay="0"/>
+                                  </p:stCondLst>
+                                  <p:childTnLst>
+                                    <p:set>
+                                      <p:cBhvr>
+                                        <p:cTn id="36" dur="1" fill="hold">
+                                          <p:stCondLst>
+                                            <p:cond delay="0"/>
+                                          </p:stCondLst>
+                                        </p:cTn>
+                                        <p:tgtEl>
+                                          <p:spTgt spid="2">
+                                            <p:txEl>
+                                              <p:pRg st="6" end="6"/>
+                                            </p:txEl>
+                                          </p:spTgt>
+                                        </p:tgtEl>
+                                        <p:attrNameLst>
+                                          <p:attrName>style.visibility</p:attrName>
+                                        </p:attrNameLst>
+                                      </p:cBhvr>
+                                      <p:to>
+                                        <p:strVal val="visible"/>
+                                      </p:to>
+                                    </p:set>
+                                    <p:animEffect transition="in" filter="fade">
+                                      <p:cBhvr>
+                                        <p:cTn id="37" dur="500"/>
+                                        <p:tgtEl>
+                                          <p:spTgt spid="2">
+                                            <p:txEl>
+                                              <p:pRg st="6" end="6"/>
+                                            </p:txEl>
+                                          </p:spTgt>
+                                        </p:tgtEl>
+                                      </p:cBhvr>
+                                    </p:animEffect>
+                                  </p:childTnLst>
+                                </p:cTn>
+                              </p:par>
+                            </p:childTnLst>
+                          </p:cTn>
+                        </p:par>
+                      </p:childTnLst>
+                    </p:cTn>
+                  </p:par>
+                  <p:par>
+                    <p:cTn id="38" fill="hold">
+                      <p:stCondLst>
+                        <p:cond delay="indefinite"/>
+                      </p:stCondLst>
+                      <p:childTnLst>
+                        <p:par>
+                          <p:cTn id="39" fill="hold">
+                            <p:stCondLst>
+                              <p:cond delay="0"/>
+                            </p:stCondLst>
+                            <p:childTnLst>
+                              <p:par>
+                                <p:cTn id="40" presetID="10" presetClass="entr" presetSubtype="0" fill="hold" grpId="0" nodeType="clickEffect">
+                                  <p:stCondLst>
+                                    <p:cond delay="0"/>
+                                  </p:stCondLst>
+                                  <p:childTnLst>
+                                    <p:set>
+                                      <p:cBhvr>
+                                        <p:cTn id="41" dur="1" fill="hold">
+                                          <p:stCondLst>
+                                            <p:cond delay="0"/>
+                                          </p:stCondLst>
+                                        </p:cTn>
+                                        <p:tgtEl>
+                                          <p:spTgt spid="2">
+                                            <p:txEl>
+                                              <p:pRg st="7" end="7"/>
+                                            </p:txEl>
+                                          </p:spTgt>
+                                        </p:tgtEl>
+                                        <p:attrNameLst>
+                                          <p:attrName>style.visibility</p:attrName>
+                                        </p:attrNameLst>
+                                      </p:cBhvr>
+                                      <p:to>
+                                        <p:strVal val="visible"/>
+                                      </p:to>
+                                    </p:set>
+                                    <p:animEffect transition="in" filter="fade">
+                                      <p:cBhvr>
+                                        <p:cTn id="42" dur="500"/>
+                                        <p:tgtEl>
+                                          <p:spTgt spid="2">
+                                            <p:txEl>
+                                              <p:pRg st="7" end="7"/>
+                                            </p:txEl>
+                                          </p:spTgt>
+                                        </p:tgtEl>
+                                      </p:cBhvr>
+                                    </p:animEffect>
+                                  </p:childTnLst>
+                                </p:cTn>
+                              </p:par>
+                            </p:childTnLst>
+                          </p:cTn>
+                        </p:par>
+                      </p:childTnLst>
+                    </p:cTn>
+                  </p:par>
+                  <p:par>
+                    <p:cTn id="43" fill="hold">
+                      <p:stCondLst>
+                        <p:cond delay="indefinite"/>
+                      </p:stCondLst>
+                      <p:childTnLst>
+                        <p:par>
+                          <p:cTn id="44" fill="hold">
+                            <p:stCondLst>
+                              <p:cond delay="0"/>
+                            </p:stCondLst>
+                            <p:childTnLst>
+                              <p:par>
+                                <p:cTn id="45" presetID="10" presetClass="entr" presetSubtype="0" fill="hold" grpId="0" nodeType="clickEffect">
+                                  <p:stCondLst>
+                                    <p:cond delay="0"/>
+                                  </p:stCondLst>
+                                  <p:childTnLst>
+                                    <p:set>
+                                      <p:cBhvr>
+                                        <p:cTn id="46" dur="1" fill="hold">
+                                          <p:stCondLst>
+                                            <p:cond delay="0"/>
+                                          </p:stCondLst>
+                                        </p:cTn>
+                                        <p:tgtEl>
+                                          <p:spTgt spid="2">
+                                            <p:txEl>
+                                              <p:pRg st="8" end="8"/>
+                                            </p:txEl>
+                                          </p:spTgt>
+                                        </p:tgtEl>
+                                        <p:attrNameLst>
+                                          <p:attrName>style.visibility</p:attrName>
+                                        </p:attrNameLst>
+                                      </p:cBhvr>
+                                      <p:to>
+                                        <p:strVal val="visible"/>
+                                      </p:to>
+                                    </p:set>
+                                    <p:animEffect transition="in" filter="fade">
+                                      <p:cBhvr>
+                                        <p:cTn id="47" dur="500"/>
+                                        <p:tgtEl>
+                                          <p:spTgt spid="2">
+                                            <p:txEl>
+                                              <p:pRg st="8" end="8"/>
+                                            </p:txEl>
+                                          </p:spTgt>
+                                        </p:tgtEl>
+                                      </p:cBhvr>
+                                    </p:animEffect>
+                                  </p:childTnLst>
+                                </p:cTn>
+                              </p:par>
+                            </p:childTnLst>
+                          </p:cTn>
+                        </p:par>
+                      </p:childTnLst>
+                    </p:cTn>
+                  </p:par>
+                  <p:par>
+                    <p:cTn id="48" fill="hold">
+                      <p:stCondLst>
+                        <p:cond delay="indefinite"/>
+                      </p:stCondLst>
+                      <p:childTnLst>
+                        <p:par>
+                          <p:cTn id="49" fill="hold">
+                            <p:stCondLst>
+                              <p:cond delay="0"/>
+                            </p:stCondLst>
+                            <p:childTnLst>
+                              <p:par>
+                                <p:cTn id="50" presetID="10" presetClass="entr" presetSubtype="0" fill="hold" grpId="0" nodeType="clickEffect">
+                                  <p:stCondLst>
+                                    <p:cond delay="0"/>
+                                  </p:stCondLst>
+                                  <p:childTnLst>
+                                    <p:set>
+                                      <p:cBhvr>
+                                        <p:cTn id="51" dur="1" fill="hold">
+                                          <p:stCondLst>
+                                            <p:cond delay="0"/>
+                                          </p:stCondLst>
+                                        </p:cTn>
+                                        <p:tgtEl>
+                                          <p:spTgt spid="2">
+                                            <p:txEl>
+                                              <p:pRg st="9" end="9"/>
+                                            </p:txEl>
+                                          </p:spTgt>
+                                        </p:tgtEl>
+                                        <p:attrNameLst>
+                                          <p:attrName>style.visibility</p:attrName>
+                                        </p:attrNameLst>
+                                      </p:cBhvr>
+                                      <p:to>
+                                        <p:strVal val="visible"/>
+                                      </p:to>
+                                    </p:set>
+                                    <p:animEffect transition="in" filter="fade">
+                                      <p:cBhvr>
+                                        <p:cTn id="52" dur="500"/>
+                                        <p:tgtEl>
+                                          <p:spTgt spid="2">
+                                            <p:txEl>
+                                              <p:pRg st="9" end="9"/>
+                                            </p:txEl>
+                                          </p:spTgt>
+                                        </p:tgtEl>
+                                      </p:cBhvr>
+                                    </p:animEffect>
+                                  </p:childTnLst>
+                                </p:cTn>
+                              </p:par>
+                            </p:childTnLst>
+                          </p:cTn>
+                        </p:par>
+                      </p:childTnLst>
+                    </p:cTn>
+                  </p:par>
+                  <p:par>
+                    <p:cTn id="53" fill="hold">
+                      <p:stCondLst>
+                        <p:cond delay="indefinite"/>
+                      </p:stCondLst>
+                      <p:childTnLst>
+                        <p:par>
+                          <p:cTn id="54" fill="hold">
+                            <p:stCondLst>
+                              <p:cond delay="0"/>
+                            </p:stCondLst>
+                            <p:childTnLst>
+                              <p:par>
+                                <p:cTn id="55" presetID="10" presetClass="entr" presetSubtype="0" fill="hold" grpId="0" nodeType="clickEffect">
+                                  <p:stCondLst>
+                                    <p:cond delay="0"/>
+                                  </p:stCondLst>
+                                  <p:childTnLst>
+                                    <p:set>
+                                      <p:cBhvr>
+                                        <p:cTn id="56" dur="1" fill="hold">
+                                          <p:stCondLst>
+                                            <p:cond delay="0"/>
+                                          </p:stCondLst>
+                                        </p:cTn>
+                                        <p:tgtEl>
+                                          <p:spTgt spid="2">
+                                            <p:txEl>
+                                              <p:pRg st="10" end="10"/>
+                                            </p:txEl>
+                                          </p:spTgt>
+                                        </p:tgtEl>
+                                        <p:attrNameLst>
+                                          <p:attrName>style.visibility</p:attrName>
+                                        </p:attrNameLst>
+                                      </p:cBhvr>
+                                      <p:to>
+                                        <p:strVal val="visible"/>
+                                      </p:to>
+                                    </p:set>
+                                    <p:animEffect transition="in" filter="fade">
+                                      <p:cBhvr>
+                                        <p:cTn id="57" dur="500"/>
+                                        <p:tgtEl>
+                                          <p:spTgt spid="2">
+                                            <p:txEl>
+                                              <p:pRg st="10" end="10"/>
+                                            </p:txEl>
+                                          </p:spTgt>
+                                        </p:tgtEl>
+                                      </p:cBhvr>
+                                    </p:animEffect>
+                                  </p:childTnLst>
+                                </p:cTn>
+                              </p:par>
+                            </p:childTnLst>
+                          </p:cTn>
+                        </p:par>
+                      </p:childTnLst>
+                    </p:cTn>
+                  </p:par>
+                </p:childTnLst>
+              </p:cTn>
+              <p:prevCondLst>
+                <p:cond evt="onPrev" delay="0">
+                  <p:tgtEl>
+                    <p:sldTgt/>
+                  </p:tgtEl>
+                </p:cond>
+              </p:prevCondLst>
+              <p:nextCondLst>
+                <p:cond evt="onNext" delay="0">
+                  <p:tgtEl>
+                    <p:sldTgt/>
+                  </p:tgtEl>
+                </p:cond>
+              </p:nextCondLst>
+            </p:seq>
+          </p:childTnLst>
+        </p:cTn>
+      </p:par>
+    </p:tnLst>
+    <p:bldLst>
+      <p:bldP spid="2" grpId="0" build="p"/>
+    </p:bldLst>
+  </p:timing>
 </p:sld>
 </file>
 
@@ -22163,6 +22867,588 @@
   <p:transition spd="slow">
     <p:cover/>
   </p:transition>
+  <p:timing>
+    <p:tnLst>
+      <p:par>
+        <p:cTn id="1" dur="indefinite" restart="never" nodeType="tmRoot">
+          <p:childTnLst>
+            <p:seq concurrent="1" nextAc="seek">
+              <p:cTn id="2" dur="indefinite" nodeType="mainSeq">
+                <p:childTnLst>
+                  <p:par>
+                    <p:cTn id="3" fill="hold">
+                      <p:stCondLst>
+                        <p:cond delay="indefinite"/>
+                      </p:stCondLst>
+                      <p:childTnLst>
+                        <p:par>
+                          <p:cTn id="4" fill="hold">
+                            <p:stCondLst>
+                              <p:cond delay="0"/>
+                            </p:stCondLst>
+                            <p:childTnLst>
+                              <p:par>
+                                <p:cTn id="5" presetID="10" presetClass="entr" presetSubtype="0" fill="hold" grpId="0" nodeType="clickEffect">
+                                  <p:stCondLst>
+                                    <p:cond delay="0"/>
+                                  </p:stCondLst>
+                                  <p:childTnLst>
+                                    <p:set>
+                                      <p:cBhvr>
+                                        <p:cTn id="6" dur="1" fill="hold">
+                                          <p:stCondLst>
+                                            <p:cond delay="0"/>
+                                          </p:stCondLst>
+                                        </p:cTn>
+                                        <p:tgtEl>
+                                          <p:spTgt spid="2">
+                                            <p:txEl>
+                                              <p:pRg st="0" end="0"/>
+                                            </p:txEl>
+                                          </p:spTgt>
+                                        </p:tgtEl>
+                                        <p:attrNameLst>
+                                          <p:attrName>style.visibility</p:attrName>
+                                        </p:attrNameLst>
+                                      </p:cBhvr>
+                                      <p:to>
+                                        <p:strVal val="visible"/>
+                                      </p:to>
+                                    </p:set>
+                                    <p:animEffect transition="in" filter="fade">
+                                      <p:cBhvr>
+                                        <p:cTn id="7" dur="500"/>
+                                        <p:tgtEl>
+                                          <p:spTgt spid="2">
+                                            <p:txEl>
+                                              <p:pRg st="0" end="0"/>
+                                            </p:txEl>
+                                          </p:spTgt>
+                                        </p:tgtEl>
+                                      </p:cBhvr>
+                                    </p:animEffect>
+                                  </p:childTnLst>
+                                </p:cTn>
+                              </p:par>
+                            </p:childTnLst>
+                          </p:cTn>
+                        </p:par>
+                      </p:childTnLst>
+                    </p:cTn>
+                  </p:par>
+                  <p:par>
+                    <p:cTn id="8" fill="hold">
+                      <p:stCondLst>
+                        <p:cond delay="indefinite"/>
+                      </p:stCondLst>
+                      <p:childTnLst>
+                        <p:par>
+                          <p:cTn id="9" fill="hold">
+                            <p:stCondLst>
+                              <p:cond delay="0"/>
+                            </p:stCondLst>
+                            <p:childTnLst>
+                              <p:par>
+                                <p:cTn id="10" presetID="10" presetClass="entr" presetSubtype="0" fill="hold" grpId="0" nodeType="clickEffect">
+                                  <p:stCondLst>
+                                    <p:cond delay="0"/>
+                                  </p:stCondLst>
+                                  <p:childTnLst>
+                                    <p:set>
+                                      <p:cBhvr>
+                                        <p:cTn id="11" dur="1" fill="hold">
+                                          <p:stCondLst>
+                                            <p:cond delay="0"/>
+                                          </p:stCondLst>
+                                        </p:cTn>
+                                        <p:tgtEl>
+                                          <p:spTgt spid="2">
+                                            <p:txEl>
+                                              <p:pRg st="1" end="1"/>
+                                            </p:txEl>
+                                          </p:spTgt>
+                                        </p:tgtEl>
+                                        <p:attrNameLst>
+                                          <p:attrName>style.visibility</p:attrName>
+                                        </p:attrNameLst>
+                                      </p:cBhvr>
+                                      <p:to>
+                                        <p:strVal val="visible"/>
+                                      </p:to>
+                                    </p:set>
+                                    <p:animEffect transition="in" filter="fade">
+                                      <p:cBhvr>
+                                        <p:cTn id="12" dur="500"/>
+                                        <p:tgtEl>
+                                          <p:spTgt spid="2">
+                                            <p:txEl>
+                                              <p:pRg st="1" end="1"/>
+                                            </p:txEl>
+                                          </p:spTgt>
+                                        </p:tgtEl>
+                                      </p:cBhvr>
+                                    </p:animEffect>
+                                  </p:childTnLst>
+                                </p:cTn>
+                              </p:par>
+                            </p:childTnLst>
+                          </p:cTn>
+                        </p:par>
+                      </p:childTnLst>
+                    </p:cTn>
+                  </p:par>
+                  <p:par>
+                    <p:cTn id="13" fill="hold">
+                      <p:stCondLst>
+                        <p:cond delay="indefinite"/>
+                      </p:stCondLst>
+                      <p:childTnLst>
+                        <p:par>
+                          <p:cTn id="14" fill="hold">
+                            <p:stCondLst>
+                              <p:cond delay="0"/>
+                            </p:stCondLst>
+                            <p:childTnLst>
+                              <p:par>
+                                <p:cTn id="15" presetID="10" presetClass="entr" presetSubtype="0" fill="hold" grpId="0" nodeType="clickEffect">
+                                  <p:stCondLst>
+                                    <p:cond delay="0"/>
+                                  </p:stCondLst>
+                                  <p:childTnLst>
+                                    <p:set>
+                                      <p:cBhvr>
+                                        <p:cTn id="16" dur="1" fill="hold">
+                                          <p:stCondLst>
+                                            <p:cond delay="0"/>
+                                          </p:stCondLst>
+                                        </p:cTn>
+                                        <p:tgtEl>
+                                          <p:spTgt spid="2">
+                                            <p:txEl>
+                                              <p:pRg st="2" end="2"/>
+                                            </p:txEl>
+                                          </p:spTgt>
+                                        </p:tgtEl>
+                                        <p:attrNameLst>
+                                          <p:attrName>style.visibility</p:attrName>
+                                        </p:attrNameLst>
+                                      </p:cBhvr>
+                                      <p:to>
+                                        <p:strVal val="visible"/>
+                                      </p:to>
+                                    </p:set>
+                                    <p:animEffect transition="in" filter="fade">
+                                      <p:cBhvr>
+                                        <p:cTn id="17" dur="500"/>
+                                        <p:tgtEl>
+                                          <p:spTgt spid="2">
+                                            <p:txEl>
+                                              <p:pRg st="2" end="2"/>
+                                            </p:txEl>
+                                          </p:spTgt>
+                                        </p:tgtEl>
+                                      </p:cBhvr>
+                                    </p:animEffect>
+                                  </p:childTnLst>
+                                </p:cTn>
+                              </p:par>
+                            </p:childTnLst>
+                          </p:cTn>
+                        </p:par>
+                      </p:childTnLst>
+                    </p:cTn>
+                  </p:par>
+                  <p:par>
+                    <p:cTn id="18" fill="hold">
+                      <p:stCondLst>
+                        <p:cond delay="indefinite"/>
+                      </p:stCondLst>
+                      <p:childTnLst>
+                        <p:par>
+                          <p:cTn id="19" fill="hold">
+                            <p:stCondLst>
+                              <p:cond delay="0"/>
+                            </p:stCondLst>
+                            <p:childTnLst>
+                              <p:par>
+                                <p:cTn id="20" presetID="10" presetClass="entr" presetSubtype="0" fill="hold" grpId="0" nodeType="clickEffect">
+                                  <p:stCondLst>
+                                    <p:cond delay="0"/>
+                                  </p:stCondLst>
+                                  <p:childTnLst>
+                                    <p:set>
+                                      <p:cBhvr>
+                                        <p:cTn id="21" dur="1" fill="hold">
+                                          <p:stCondLst>
+                                            <p:cond delay="0"/>
+                                          </p:stCondLst>
+                                        </p:cTn>
+                                        <p:tgtEl>
+                                          <p:spTgt spid="2">
+                                            <p:txEl>
+                                              <p:pRg st="3" end="3"/>
+                                            </p:txEl>
+                                          </p:spTgt>
+                                        </p:tgtEl>
+                                        <p:attrNameLst>
+                                          <p:attrName>style.visibility</p:attrName>
+                                        </p:attrNameLst>
+                                      </p:cBhvr>
+                                      <p:to>
+                                        <p:strVal val="visible"/>
+                                      </p:to>
+                                    </p:set>
+                                    <p:animEffect transition="in" filter="fade">
+                                      <p:cBhvr>
+                                        <p:cTn id="22" dur="500"/>
+                                        <p:tgtEl>
+                                          <p:spTgt spid="2">
+                                            <p:txEl>
+                                              <p:pRg st="3" end="3"/>
+                                            </p:txEl>
+                                          </p:spTgt>
+                                        </p:tgtEl>
+                                      </p:cBhvr>
+                                    </p:animEffect>
+                                  </p:childTnLst>
+                                </p:cTn>
+                              </p:par>
+                            </p:childTnLst>
+                          </p:cTn>
+                        </p:par>
+                      </p:childTnLst>
+                    </p:cTn>
+                  </p:par>
+                  <p:par>
+                    <p:cTn id="23" fill="hold">
+                      <p:stCondLst>
+                        <p:cond delay="indefinite"/>
+                      </p:stCondLst>
+                      <p:childTnLst>
+                        <p:par>
+                          <p:cTn id="24" fill="hold">
+                            <p:stCondLst>
+                              <p:cond delay="0"/>
+                            </p:stCondLst>
+                            <p:childTnLst>
+                              <p:par>
+                                <p:cTn id="25" presetID="10" presetClass="entr" presetSubtype="0" fill="hold" grpId="0" nodeType="clickEffect">
+                                  <p:stCondLst>
+                                    <p:cond delay="0"/>
+                                  </p:stCondLst>
+                                  <p:childTnLst>
+                                    <p:set>
+                                      <p:cBhvr>
+                                        <p:cTn id="26" dur="1" fill="hold">
+                                          <p:stCondLst>
+                                            <p:cond delay="0"/>
+                                          </p:stCondLst>
+                                        </p:cTn>
+                                        <p:tgtEl>
+                                          <p:spTgt spid="2">
+                                            <p:txEl>
+                                              <p:pRg st="4" end="4"/>
+                                            </p:txEl>
+                                          </p:spTgt>
+                                        </p:tgtEl>
+                                        <p:attrNameLst>
+                                          <p:attrName>style.visibility</p:attrName>
+                                        </p:attrNameLst>
+                                      </p:cBhvr>
+                                      <p:to>
+                                        <p:strVal val="visible"/>
+                                      </p:to>
+                                    </p:set>
+                                    <p:animEffect transition="in" filter="fade">
+                                      <p:cBhvr>
+                                        <p:cTn id="27" dur="500"/>
+                                        <p:tgtEl>
+                                          <p:spTgt spid="2">
+                                            <p:txEl>
+                                              <p:pRg st="4" end="4"/>
+                                            </p:txEl>
+                                          </p:spTgt>
+                                        </p:tgtEl>
+                                      </p:cBhvr>
+                                    </p:animEffect>
+                                  </p:childTnLst>
+                                </p:cTn>
+                              </p:par>
+                            </p:childTnLst>
+                          </p:cTn>
+                        </p:par>
+                      </p:childTnLst>
+                    </p:cTn>
+                  </p:par>
+                  <p:par>
+                    <p:cTn id="28" fill="hold">
+                      <p:stCondLst>
+                        <p:cond delay="indefinite"/>
+                      </p:stCondLst>
+                      <p:childTnLst>
+                        <p:par>
+                          <p:cTn id="29" fill="hold">
+                            <p:stCondLst>
+                              <p:cond delay="0"/>
+                            </p:stCondLst>
+                            <p:childTnLst>
+                              <p:par>
+                                <p:cTn id="30" presetID="10" presetClass="entr" presetSubtype="0" fill="hold" grpId="0" nodeType="clickEffect">
+                                  <p:stCondLst>
+                                    <p:cond delay="0"/>
+                                  </p:stCondLst>
+                                  <p:childTnLst>
+                                    <p:set>
+                                      <p:cBhvr>
+                                        <p:cTn id="31" dur="1" fill="hold">
+                                          <p:stCondLst>
+                                            <p:cond delay="0"/>
+                                          </p:stCondLst>
+                                        </p:cTn>
+                                        <p:tgtEl>
+                                          <p:spTgt spid="2">
+                                            <p:txEl>
+                                              <p:pRg st="5" end="5"/>
+                                            </p:txEl>
+                                          </p:spTgt>
+                                        </p:tgtEl>
+                                        <p:attrNameLst>
+                                          <p:attrName>style.visibility</p:attrName>
+                                        </p:attrNameLst>
+                                      </p:cBhvr>
+                                      <p:to>
+                                        <p:strVal val="visible"/>
+                                      </p:to>
+                                    </p:set>
+                                    <p:animEffect transition="in" filter="fade">
+                                      <p:cBhvr>
+                                        <p:cTn id="32" dur="500"/>
+                                        <p:tgtEl>
+                                          <p:spTgt spid="2">
+                                            <p:txEl>
+                                              <p:pRg st="5" end="5"/>
+                                            </p:txEl>
+                                          </p:spTgt>
+                                        </p:tgtEl>
+                                      </p:cBhvr>
+                                    </p:animEffect>
+                                  </p:childTnLst>
+                                </p:cTn>
+                              </p:par>
+                            </p:childTnLst>
+                          </p:cTn>
+                        </p:par>
+                      </p:childTnLst>
+                    </p:cTn>
+                  </p:par>
+                  <p:par>
+                    <p:cTn id="33" fill="hold">
+                      <p:stCondLst>
+                        <p:cond delay="indefinite"/>
+                      </p:stCondLst>
+                      <p:childTnLst>
+                        <p:par>
+                          <p:cTn id="34" fill="hold">
+                            <p:stCondLst>
+                              <p:cond delay="0"/>
+                            </p:stCondLst>
+                            <p:childTnLst>
+                              <p:par>
+                                <p:cTn id="35" presetID="10" presetClass="entr" presetSubtype="0" fill="hold" grpId="0" nodeType="clickEffect">
+                                  <p:stCondLst>
+                                    <p:cond delay="0"/>
+                                  </p:stCondLst>
+                                  <p:childTnLst>
+                                    <p:set>
+                                      <p:cBhvr>
+                                        <p:cTn id="36" dur="1" fill="hold">
+                                          <p:stCondLst>
+                                            <p:cond delay="0"/>
+                                          </p:stCondLst>
+                                        </p:cTn>
+                                        <p:tgtEl>
+                                          <p:spTgt spid="2">
+                                            <p:txEl>
+                                              <p:pRg st="6" end="6"/>
+                                            </p:txEl>
+                                          </p:spTgt>
+                                        </p:tgtEl>
+                                        <p:attrNameLst>
+                                          <p:attrName>style.visibility</p:attrName>
+                                        </p:attrNameLst>
+                                      </p:cBhvr>
+                                      <p:to>
+                                        <p:strVal val="visible"/>
+                                      </p:to>
+                                    </p:set>
+                                    <p:animEffect transition="in" filter="fade">
+                                      <p:cBhvr>
+                                        <p:cTn id="37" dur="500"/>
+                                        <p:tgtEl>
+                                          <p:spTgt spid="2">
+                                            <p:txEl>
+                                              <p:pRg st="6" end="6"/>
+                                            </p:txEl>
+                                          </p:spTgt>
+                                        </p:tgtEl>
+                                      </p:cBhvr>
+                                    </p:animEffect>
+                                  </p:childTnLst>
+                                </p:cTn>
+                              </p:par>
+                            </p:childTnLst>
+                          </p:cTn>
+                        </p:par>
+                      </p:childTnLst>
+                    </p:cTn>
+                  </p:par>
+                  <p:par>
+                    <p:cTn id="38" fill="hold">
+                      <p:stCondLst>
+                        <p:cond delay="indefinite"/>
+                      </p:stCondLst>
+                      <p:childTnLst>
+                        <p:par>
+                          <p:cTn id="39" fill="hold">
+                            <p:stCondLst>
+                              <p:cond delay="0"/>
+                            </p:stCondLst>
+                            <p:childTnLst>
+                              <p:par>
+                                <p:cTn id="40" presetID="10" presetClass="entr" presetSubtype="0" fill="hold" grpId="0" nodeType="clickEffect">
+                                  <p:stCondLst>
+                                    <p:cond delay="0"/>
+                                  </p:stCondLst>
+                                  <p:childTnLst>
+                                    <p:set>
+                                      <p:cBhvr>
+                                        <p:cTn id="41" dur="1" fill="hold">
+                                          <p:stCondLst>
+                                            <p:cond delay="0"/>
+                                          </p:stCondLst>
+                                        </p:cTn>
+                                        <p:tgtEl>
+                                          <p:spTgt spid="2">
+                                            <p:txEl>
+                                              <p:pRg st="7" end="7"/>
+                                            </p:txEl>
+                                          </p:spTgt>
+                                        </p:tgtEl>
+                                        <p:attrNameLst>
+                                          <p:attrName>style.visibility</p:attrName>
+                                        </p:attrNameLst>
+                                      </p:cBhvr>
+                                      <p:to>
+                                        <p:strVal val="visible"/>
+                                      </p:to>
+                                    </p:set>
+                                    <p:animEffect transition="in" filter="fade">
+                                      <p:cBhvr>
+                                        <p:cTn id="42" dur="500"/>
+                                        <p:tgtEl>
+                                          <p:spTgt spid="2">
+                                            <p:txEl>
+                                              <p:pRg st="7" end="7"/>
+                                            </p:txEl>
+                                          </p:spTgt>
+                                        </p:tgtEl>
+                                      </p:cBhvr>
+                                    </p:animEffect>
+                                  </p:childTnLst>
+                                </p:cTn>
+                              </p:par>
+                            </p:childTnLst>
+                          </p:cTn>
+                        </p:par>
+                      </p:childTnLst>
+                    </p:cTn>
+                  </p:par>
+                  <p:par>
+                    <p:cTn id="43" fill="hold">
+                      <p:stCondLst>
+                        <p:cond delay="indefinite"/>
+                      </p:stCondLst>
+                      <p:childTnLst>
+                        <p:par>
+                          <p:cTn id="44" fill="hold">
+                            <p:stCondLst>
+                              <p:cond delay="0"/>
+                            </p:stCondLst>
+                            <p:childTnLst>
+                              <p:par>
+                                <p:cTn id="45" presetID="10" presetClass="entr" presetSubtype="0" fill="hold" grpId="0" nodeType="clickEffect">
+                                  <p:stCondLst>
+                                    <p:cond delay="0"/>
+                                  </p:stCondLst>
+                                  <p:childTnLst>
+                                    <p:set>
+                                      <p:cBhvr>
+                                        <p:cTn id="46" dur="1" fill="hold">
+                                          <p:stCondLst>
+                                            <p:cond delay="0"/>
+                                          </p:stCondLst>
+                                        </p:cTn>
+                                        <p:tgtEl>
+                                          <p:spTgt spid="2">
+                                            <p:txEl>
+                                              <p:pRg st="8" end="8"/>
+                                            </p:txEl>
+                                          </p:spTgt>
+                                        </p:tgtEl>
+                                        <p:attrNameLst>
+                                          <p:attrName>style.visibility</p:attrName>
+                                        </p:attrNameLst>
+                                      </p:cBhvr>
+                                      <p:to>
+                                        <p:strVal val="visible"/>
+                                      </p:to>
+                                    </p:set>
+                                    <p:animEffect transition="in" filter="fade">
+                                      <p:cBhvr>
+                                        <p:cTn id="47" dur="500"/>
+                                        <p:tgtEl>
+                                          <p:spTgt spid="2">
+                                            <p:txEl>
+                                              <p:pRg st="8" end="8"/>
+                                            </p:txEl>
+                                          </p:spTgt>
+                                        </p:tgtEl>
+                                      </p:cBhvr>
+                                    </p:animEffect>
+                                  </p:childTnLst>
+                                </p:cTn>
+                              </p:par>
+                            </p:childTnLst>
+                          </p:cTn>
+                        </p:par>
+                      </p:childTnLst>
+                    </p:cTn>
+                  </p:par>
+                </p:childTnLst>
+              </p:cTn>
+              <p:prevCondLst>
+                <p:cond evt="onPrev" delay="0">
+                  <p:tgtEl>
+                    <p:sldTgt/>
+                  </p:tgtEl>
+                </p:cond>
+              </p:prevCondLst>
+              <p:nextCondLst>
+                <p:cond evt="onNext" delay="0">
+                  <p:tgtEl>
+                    <p:sldTgt/>
+                  </p:tgtEl>
+                </p:cond>
+              </p:nextCondLst>
+            </p:seq>
+          </p:childTnLst>
+        </p:cTn>
+      </p:par>
+    </p:tnLst>
+    <p:bldLst>
+      <p:bldP spid="2" grpId="0" build="p"/>
+    </p:bldLst>
+  </p:timing>
 </p:sld>
 </file>
 
@@ -22406,6 +23692,753 @@
   <p:transition spd="slow">
     <p:cover/>
   </p:transition>
+  <p:timing>
+    <p:tnLst>
+      <p:par>
+        <p:cTn id="1" dur="indefinite" restart="never" nodeType="tmRoot">
+          <p:childTnLst>
+            <p:seq concurrent="1" nextAc="seek">
+              <p:cTn id="2" dur="indefinite" nodeType="mainSeq">
+                <p:childTnLst>
+                  <p:par>
+                    <p:cTn id="3" fill="hold">
+                      <p:stCondLst>
+                        <p:cond delay="indefinite"/>
+                      </p:stCondLst>
+                      <p:childTnLst>
+                        <p:par>
+                          <p:cTn id="4" fill="hold">
+                            <p:stCondLst>
+                              <p:cond delay="0"/>
+                            </p:stCondLst>
+                            <p:childTnLst>
+                              <p:par>
+                                <p:cTn id="5" presetID="10" presetClass="entr" presetSubtype="0" fill="hold" grpId="0" nodeType="clickEffect">
+                                  <p:stCondLst>
+                                    <p:cond delay="0"/>
+                                  </p:stCondLst>
+                                  <p:childTnLst>
+                                    <p:set>
+                                      <p:cBhvr>
+                                        <p:cTn id="6" dur="1" fill="hold">
+                                          <p:stCondLst>
+                                            <p:cond delay="0"/>
+                                          </p:stCondLst>
+                                        </p:cTn>
+                                        <p:tgtEl>
+                                          <p:spTgt spid="2">
+                                            <p:txEl>
+                                              <p:pRg st="0" end="0"/>
+                                            </p:txEl>
+                                          </p:spTgt>
+                                        </p:tgtEl>
+                                        <p:attrNameLst>
+                                          <p:attrName>style.visibility</p:attrName>
+                                        </p:attrNameLst>
+                                      </p:cBhvr>
+                                      <p:to>
+                                        <p:strVal val="visible"/>
+                                      </p:to>
+                                    </p:set>
+                                    <p:animEffect transition="in" filter="fade">
+                                      <p:cBhvr>
+                                        <p:cTn id="7" dur="500"/>
+                                        <p:tgtEl>
+                                          <p:spTgt spid="2">
+                                            <p:txEl>
+                                              <p:pRg st="0" end="0"/>
+                                            </p:txEl>
+                                          </p:spTgt>
+                                        </p:tgtEl>
+                                      </p:cBhvr>
+                                    </p:animEffect>
+                                  </p:childTnLst>
+                                </p:cTn>
+                              </p:par>
+                            </p:childTnLst>
+                          </p:cTn>
+                        </p:par>
+                      </p:childTnLst>
+                    </p:cTn>
+                  </p:par>
+                  <p:par>
+                    <p:cTn id="8" fill="hold">
+                      <p:stCondLst>
+                        <p:cond delay="indefinite"/>
+                      </p:stCondLst>
+                      <p:childTnLst>
+                        <p:par>
+                          <p:cTn id="9" fill="hold">
+                            <p:stCondLst>
+                              <p:cond delay="0"/>
+                            </p:stCondLst>
+                            <p:childTnLst>
+                              <p:par>
+                                <p:cTn id="10" presetID="10" presetClass="entr" presetSubtype="0" fill="hold" grpId="0" nodeType="clickEffect">
+                                  <p:stCondLst>
+                                    <p:cond delay="0"/>
+                                  </p:stCondLst>
+                                  <p:childTnLst>
+                                    <p:set>
+                                      <p:cBhvr>
+                                        <p:cTn id="11" dur="1" fill="hold">
+                                          <p:stCondLst>
+                                            <p:cond delay="0"/>
+                                          </p:stCondLst>
+                                        </p:cTn>
+                                        <p:tgtEl>
+                                          <p:spTgt spid="2">
+                                            <p:txEl>
+                                              <p:pRg st="1" end="1"/>
+                                            </p:txEl>
+                                          </p:spTgt>
+                                        </p:tgtEl>
+                                        <p:attrNameLst>
+                                          <p:attrName>style.visibility</p:attrName>
+                                        </p:attrNameLst>
+                                      </p:cBhvr>
+                                      <p:to>
+                                        <p:strVal val="visible"/>
+                                      </p:to>
+                                    </p:set>
+                                    <p:animEffect transition="in" filter="fade">
+                                      <p:cBhvr>
+                                        <p:cTn id="12" dur="500"/>
+                                        <p:tgtEl>
+                                          <p:spTgt spid="2">
+                                            <p:txEl>
+                                              <p:pRg st="1" end="1"/>
+                                            </p:txEl>
+                                          </p:spTgt>
+                                        </p:tgtEl>
+                                      </p:cBhvr>
+                                    </p:animEffect>
+                                  </p:childTnLst>
+                                </p:cTn>
+                              </p:par>
+                            </p:childTnLst>
+                          </p:cTn>
+                        </p:par>
+                      </p:childTnLst>
+                    </p:cTn>
+                  </p:par>
+                  <p:par>
+                    <p:cTn id="13" fill="hold">
+                      <p:stCondLst>
+                        <p:cond delay="indefinite"/>
+                      </p:stCondLst>
+                      <p:childTnLst>
+                        <p:par>
+                          <p:cTn id="14" fill="hold">
+                            <p:stCondLst>
+                              <p:cond delay="0"/>
+                            </p:stCondLst>
+                            <p:childTnLst>
+                              <p:par>
+                                <p:cTn id="15" presetID="10" presetClass="entr" presetSubtype="0" fill="hold" grpId="0" nodeType="clickEffect">
+                                  <p:stCondLst>
+                                    <p:cond delay="0"/>
+                                  </p:stCondLst>
+                                  <p:childTnLst>
+                                    <p:set>
+                                      <p:cBhvr>
+                                        <p:cTn id="16" dur="1" fill="hold">
+                                          <p:stCondLst>
+                                            <p:cond delay="0"/>
+                                          </p:stCondLst>
+                                        </p:cTn>
+                                        <p:tgtEl>
+                                          <p:spTgt spid="2">
+                                            <p:txEl>
+                                              <p:pRg st="2" end="2"/>
+                                            </p:txEl>
+                                          </p:spTgt>
+                                        </p:tgtEl>
+                                        <p:attrNameLst>
+                                          <p:attrName>style.visibility</p:attrName>
+                                        </p:attrNameLst>
+                                      </p:cBhvr>
+                                      <p:to>
+                                        <p:strVal val="visible"/>
+                                      </p:to>
+                                    </p:set>
+                                    <p:animEffect transition="in" filter="fade">
+                                      <p:cBhvr>
+                                        <p:cTn id="17" dur="500"/>
+                                        <p:tgtEl>
+                                          <p:spTgt spid="2">
+                                            <p:txEl>
+                                              <p:pRg st="2" end="2"/>
+                                            </p:txEl>
+                                          </p:spTgt>
+                                        </p:tgtEl>
+                                      </p:cBhvr>
+                                    </p:animEffect>
+                                  </p:childTnLst>
+                                </p:cTn>
+                              </p:par>
+                            </p:childTnLst>
+                          </p:cTn>
+                        </p:par>
+                      </p:childTnLst>
+                    </p:cTn>
+                  </p:par>
+                  <p:par>
+                    <p:cTn id="18" fill="hold">
+                      <p:stCondLst>
+                        <p:cond delay="indefinite"/>
+                      </p:stCondLst>
+                      <p:childTnLst>
+                        <p:par>
+                          <p:cTn id="19" fill="hold">
+                            <p:stCondLst>
+                              <p:cond delay="0"/>
+                            </p:stCondLst>
+                            <p:childTnLst>
+                              <p:par>
+                                <p:cTn id="20" presetID="10" presetClass="entr" presetSubtype="0" fill="hold" grpId="0" nodeType="clickEffect">
+                                  <p:stCondLst>
+                                    <p:cond delay="0"/>
+                                  </p:stCondLst>
+                                  <p:childTnLst>
+                                    <p:set>
+                                      <p:cBhvr>
+                                        <p:cTn id="21" dur="1" fill="hold">
+                                          <p:stCondLst>
+                                            <p:cond delay="0"/>
+                                          </p:stCondLst>
+                                        </p:cTn>
+                                        <p:tgtEl>
+                                          <p:spTgt spid="2">
+                                            <p:txEl>
+                                              <p:pRg st="3" end="3"/>
+                                            </p:txEl>
+                                          </p:spTgt>
+                                        </p:tgtEl>
+                                        <p:attrNameLst>
+                                          <p:attrName>style.visibility</p:attrName>
+                                        </p:attrNameLst>
+                                      </p:cBhvr>
+                                      <p:to>
+                                        <p:strVal val="visible"/>
+                                      </p:to>
+                                    </p:set>
+                                    <p:animEffect transition="in" filter="fade">
+                                      <p:cBhvr>
+                                        <p:cTn id="22" dur="500"/>
+                                        <p:tgtEl>
+                                          <p:spTgt spid="2">
+                                            <p:txEl>
+                                              <p:pRg st="3" end="3"/>
+                                            </p:txEl>
+                                          </p:spTgt>
+                                        </p:tgtEl>
+                                      </p:cBhvr>
+                                    </p:animEffect>
+                                  </p:childTnLst>
+                                </p:cTn>
+                              </p:par>
+                            </p:childTnLst>
+                          </p:cTn>
+                        </p:par>
+                      </p:childTnLst>
+                    </p:cTn>
+                  </p:par>
+                  <p:par>
+                    <p:cTn id="23" fill="hold">
+                      <p:stCondLst>
+                        <p:cond delay="indefinite"/>
+                      </p:stCondLst>
+                      <p:childTnLst>
+                        <p:par>
+                          <p:cTn id="24" fill="hold">
+                            <p:stCondLst>
+                              <p:cond delay="0"/>
+                            </p:stCondLst>
+                            <p:childTnLst>
+                              <p:par>
+                                <p:cTn id="25" presetID="10" presetClass="entr" presetSubtype="0" fill="hold" grpId="0" nodeType="clickEffect">
+                                  <p:stCondLst>
+                                    <p:cond delay="0"/>
+                                  </p:stCondLst>
+                                  <p:childTnLst>
+                                    <p:set>
+                                      <p:cBhvr>
+                                        <p:cTn id="26" dur="1" fill="hold">
+                                          <p:stCondLst>
+                                            <p:cond delay="0"/>
+                                          </p:stCondLst>
+                                        </p:cTn>
+                                        <p:tgtEl>
+                                          <p:spTgt spid="2">
+                                            <p:txEl>
+                                              <p:pRg st="4" end="4"/>
+                                            </p:txEl>
+                                          </p:spTgt>
+                                        </p:tgtEl>
+                                        <p:attrNameLst>
+                                          <p:attrName>style.visibility</p:attrName>
+                                        </p:attrNameLst>
+                                      </p:cBhvr>
+                                      <p:to>
+                                        <p:strVal val="visible"/>
+                                      </p:to>
+                                    </p:set>
+                                    <p:animEffect transition="in" filter="fade">
+                                      <p:cBhvr>
+                                        <p:cTn id="27" dur="500"/>
+                                        <p:tgtEl>
+                                          <p:spTgt spid="2">
+                                            <p:txEl>
+                                              <p:pRg st="4" end="4"/>
+                                            </p:txEl>
+                                          </p:spTgt>
+                                        </p:tgtEl>
+                                      </p:cBhvr>
+                                    </p:animEffect>
+                                  </p:childTnLst>
+                                </p:cTn>
+                              </p:par>
+                            </p:childTnLst>
+                          </p:cTn>
+                        </p:par>
+                      </p:childTnLst>
+                    </p:cTn>
+                  </p:par>
+                  <p:par>
+                    <p:cTn id="28" fill="hold">
+                      <p:stCondLst>
+                        <p:cond delay="indefinite"/>
+                      </p:stCondLst>
+                      <p:childTnLst>
+                        <p:par>
+                          <p:cTn id="29" fill="hold">
+                            <p:stCondLst>
+                              <p:cond delay="0"/>
+                            </p:stCondLst>
+                            <p:childTnLst>
+                              <p:par>
+                                <p:cTn id="30" presetID="10" presetClass="entr" presetSubtype="0" fill="hold" grpId="0" nodeType="clickEffect">
+                                  <p:stCondLst>
+                                    <p:cond delay="0"/>
+                                  </p:stCondLst>
+                                  <p:childTnLst>
+                                    <p:set>
+                                      <p:cBhvr>
+                                        <p:cTn id="31" dur="1" fill="hold">
+                                          <p:stCondLst>
+                                            <p:cond delay="0"/>
+                                          </p:stCondLst>
+                                        </p:cTn>
+                                        <p:tgtEl>
+                                          <p:spTgt spid="2">
+                                            <p:txEl>
+                                              <p:pRg st="5" end="5"/>
+                                            </p:txEl>
+                                          </p:spTgt>
+                                        </p:tgtEl>
+                                        <p:attrNameLst>
+                                          <p:attrName>style.visibility</p:attrName>
+                                        </p:attrNameLst>
+                                      </p:cBhvr>
+                                      <p:to>
+                                        <p:strVal val="visible"/>
+                                      </p:to>
+                                    </p:set>
+                                    <p:animEffect transition="in" filter="fade">
+                                      <p:cBhvr>
+                                        <p:cTn id="32" dur="500"/>
+                                        <p:tgtEl>
+                                          <p:spTgt spid="2">
+                                            <p:txEl>
+                                              <p:pRg st="5" end="5"/>
+                                            </p:txEl>
+                                          </p:spTgt>
+                                        </p:tgtEl>
+                                      </p:cBhvr>
+                                    </p:animEffect>
+                                  </p:childTnLst>
+                                </p:cTn>
+                              </p:par>
+                            </p:childTnLst>
+                          </p:cTn>
+                        </p:par>
+                      </p:childTnLst>
+                    </p:cTn>
+                  </p:par>
+                  <p:par>
+                    <p:cTn id="33" fill="hold">
+                      <p:stCondLst>
+                        <p:cond delay="indefinite"/>
+                      </p:stCondLst>
+                      <p:childTnLst>
+                        <p:par>
+                          <p:cTn id="34" fill="hold">
+                            <p:stCondLst>
+                              <p:cond delay="0"/>
+                            </p:stCondLst>
+                            <p:childTnLst>
+                              <p:par>
+                                <p:cTn id="35" presetID="10" presetClass="entr" presetSubtype="0" fill="hold" grpId="0" nodeType="clickEffect">
+                                  <p:stCondLst>
+                                    <p:cond delay="0"/>
+                                  </p:stCondLst>
+                                  <p:childTnLst>
+                                    <p:set>
+                                      <p:cBhvr>
+                                        <p:cTn id="36" dur="1" fill="hold">
+                                          <p:stCondLst>
+                                            <p:cond delay="0"/>
+                                          </p:stCondLst>
+                                        </p:cTn>
+                                        <p:tgtEl>
+                                          <p:spTgt spid="2">
+                                            <p:txEl>
+                                              <p:pRg st="6" end="6"/>
+                                            </p:txEl>
+                                          </p:spTgt>
+                                        </p:tgtEl>
+                                        <p:attrNameLst>
+                                          <p:attrName>style.visibility</p:attrName>
+                                        </p:attrNameLst>
+                                      </p:cBhvr>
+                                      <p:to>
+                                        <p:strVal val="visible"/>
+                                      </p:to>
+                                    </p:set>
+                                    <p:animEffect transition="in" filter="fade">
+                                      <p:cBhvr>
+                                        <p:cTn id="37" dur="500"/>
+                                        <p:tgtEl>
+                                          <p:spTgt spid="2">
+                                            <p:txEl>
+                                              <p:pRg st="6" end="6"/>
+                                            </p:txEl>
+                                          </p:spTgt>
+                                        </p:tgtEl>
+                                      </p:cBhvr>
+                                    </p:animEffect>
+                                  </p:childTnLst>
+                                </p:cTn>
+                              </p:par>
+                              <p:par>
+                                <p:cTn id="38" presetID="10" presetClass="entr" presetSubtype="0" fill="hold" grpId="0" nodeType="withEffect">
+                                  <p:stCondLst>
+                                    <p:cond delay="0"/>
+                                  </p:stCondLst>
+                                  <p:childTnLst>
+                                    <p:set>
+                                      <p:cBhvr>
+                                        <p:cTn id="39" dur="1" fill="hold">
+                                          <p:stCondLst>
+                                            <p:cond delay="0"/>
+                                          </p:stCondLst>
+                                        </p:cTn>
+                                        <p:tgtEl>
+                                          <p:spTgt spid="2">
+                                            <p:txEl>
+                                              <p:pRg st="7" end="7"/>
+                                            </p:txEl>
+                                          </p:spTgt>
+                                        </p:tgtEl>
+                                        <p:attrNameLst>
+                                          <p:attrName>style.visibility</p:attrName>
+                                        </p:attrNameLst>
+                                      </p:cBhvr>
+                                      <p:to>
+                                        <p:strVal val="visible"/>
+                                      </p:to>
+                                    </p:set>
+                                    <p:animEffect transition="in" filter="fade">
+                                      <p:cBhvr>
+                                        <p:cTn id="40" dur="500"/>
+                                        <p:tgtEl>
+                                          <p:spTgt spid="2">
+                                            <p:txEl>
+                                              <p:pRg st="7" end="7"/>
+                                            </p:txEl>
+                                          </p:spTgt>
+                                        </p:tgtEl>
+                                      </p:cBhvr>
+                                    </p:animEffect>
+                                  </p:childTnLst>
+                                </p:cTn>
+                              </p:par>
+                            </p:childTnLst>
+                          </p:cTn>
+                        </p:par>
+                      </p:childTnLst>
+                    </p:cTn>
+                  </p:par>
+                  <p:par>
+                    <p:cTn id="41" fill="hold">
+                      <p:stCondLst>
+                        <p:cond delay="indefinite"/>
+                      </p:stCondLst>
+                      <p:childTnLst>
+                        <p:par>
+                          <p:cTn id="42" fill="hold">
+                            <p:stCondLst>
+                              <p:cond delay="0"/>
+                            </p:stCondLst>
+                            <p:childTnLst>
+                              <p:par>
+                                <p:cTn id="43" presetID="10" presetClass="entr" presetSubtype="0" fill="hold" grpId="0" nodeType="clickEffect">
+                                  <p:stCondLst>
+                                    <p:cond delay="0"/>
+                                  </p:stCondLst>
+                                  <p:childTnLst>
+                                    <p:set>
+                                      <p:cBhvr>
+                                        <p:cTn id="44" dur="1" fill="hold">
+                                          <p:stCondLst>
+                                            <p:cond delay="0"/>
+                                          </p:stCondLst>
+                                        </p:cTn>
+                                        <p:tgtEl>
+                                          <p:spTgt spid="2">
+                                            <p:txEl>
+                                              <p:pRg st="8" end="8"/>
+                                            </p:txEl>
+                                          </p:spTgt>
+                                        </p:tgtEl>
+                                        <p:attrNameLst>
+                                          <p:attrName>style.visibility</p:attrName>
+                                        </p:attrNameLst>
+                                      </p:cBhvr>
+                                      <p:to>
+                                        <p:strVal val="visible"/>
+                                      </p:to>
+                                    </p:set>
+                                    <p:animEffect transition="in" filter="fade">
+                                      <p:cBhvr>
+                                        <p:cTn id="45" dur="500"/>
+                                        <p:tgtEl>
+                                          <p:spTgt spid="2">
+                                            <p:txEl>
+                                              <p:pRg st="8" end="8"/>
+                                            </p:txEl>
+                                          </p:spTgt>
+                                        </p:tgtEl>
+                                      </p:cBhvr>
+                                    </p:animEffect>
+                                  </p:childTnLst>
+                                </p:cTn>
+                              </p:par>
+                            </p:childTnLst>
+                          </p:cTn>
+                        </p:par>
+                      </p:childTnLst>
+                    </p:cTn>
+                  </p:par>
+                  <p:par>
+                    <p:cTn id="46" fill="hold">
+                      <p:stCondLst>
+                        <p:cond delay="indefinite"/>
+                      </p:stCondLst>
+                      <p:childTnLst>
+                        <p:par>
+                          <p:cTn id="47" fill="hold">
+                            <p:stCondLst>
+                              <p:cond delay="0"/>
+                            </p:stCondLst>
+                            <p:childTnLst>
+                              <p:par>
+                                <p:cTn id="48" presetID="10" presetClass="entr" presetSubtype="0" fill="hold" grpId="0" nodeType="clickEffect">
+                                  <p:stCondLst>
+                                    <p:cond delay="0"/>
+                                  </p:stCondLst>
+                                  <p:childTnLst>
+                                    <p:set>
+                                      <p:cBhvr>
+                                        <p:cTn id="49" dur="1" fill="hold">
+                                          <p:stCondLst>
+                                            <p:cond delay="0"/>
+                                          </p:stCondLst>
+                                        </p:cTn>
+                                        <p:tgtEl>
+                                          <p:spTgt spid="2">
+                                            <p:txEl>
+                                              <p:pRg st="9" end="9"/>
+                                            </p:txEl>
+                                          </p:spTgt>
+                                        </p:tgtEl>
+                                        <p:attrNameLst>
+                                          <p:attrName>style.visibility</p:attrName>
+                                        </p:attrNameLst>
+                                      </p:cBhvr>
+                                      <p:to>
+                                        <p:strVal val="visible"/>
+                                      </p:to>
+                                    </p:set>
+                                    <p:animEffect transition="in" filter="fade">
+                                      <p:cBhvr>
+                                        <p:cTn id="50" dur="500"/>
+                                        <p:tgtEl>
+                                          <p:spTgt spid="2">
+                                            <p:txEl>
+                                              <p:pRg st="9" end="9"/>
+                                            </p:txEl>
+                                          </p:spTgt>
+                                        </p:tgtEl>
+                                      </p:cBhvr>
+                                    </p:animEffect>
+                                  </p:childTnLst>
+                                </p:cTn>
+                              </p:par>
+                            </p:childTnLst>
+                          </p:cTn>
+                        </p:par>
+                      </p:childTnLst>
+                    </p:cTn>
+                  </p:par>
+                  <p:par>
+                    <p:cTn id="51" fill="hold">
+                      <p:stCondLst>
+                        <p:cond delay="indefinite"/>
+                      </p:stCondLst>
+                      <p:childTnLst>
+                        <p:par>
+                          <p:cTn id="52" fill="hold">
+                            <p:stCondLst>
+                              <p:cond delay="0"/>
+                            </p:stCondLst>
+                            <p:childTnLst>
+                              <p:par>
+                                <p:cTn id="53" presetID="10" presetClass="entr" presetSubtype="0" fill="hold" grpId="0" nodeType="clickEffect">
+                                  <p:stCondLst>
+                                    <p:cond delay="0"/>
+                                  </p:stCondLst>
+                                  <p:childTnLst>
+                                    <p:set>
+                                      <p:cBhvr>
+                                        <p:cTn id="54" dur="1" fill="hold">
+                                          <p:stCondLst>
+                                            <p:cond delay="0"/>
+                                          </p:stCondLst>
+                                        </p:cTn>
+                                        <p:tgtEl>
+                                          <p:spTgt spid="2">
+                                            <p:txEl>
+                                              <p:pRg st="10" end="10"/>
+                                            </p:txEl>
+                                          </p:spTgt>
+                                        </p:tgtEl>
+                                        <p:attrNameLst>
+                                          <p:attrName>style.visibility</p:attrName>
+                                        </p:attrNameLst>
+                                      </p:cBhvr>
+                                      <p:to>
+                                        <p:strVal val="visible"/>
+                                      </p:to>
+                                    </p:set>
+                                    <p:animEffect transition="in" filter="fade">
+                                      <p:cBhvr>
+                                        <p:cTn id="55" dur="500"/>
+                                        <p:tgtEl>
+                                          <p:spTgt spid="2">
+                                            <p:txEl>
+                                              <p:pRg st="10" end="10"/>
+                                            </p:txEl>
+                                          </p:spTgt>
+                                        </p:tgtEl>
+                                      </p:cBhvr>
+                                    </p:animEffect>
+                                  </p:childTnLst>
+                                </p:cTn>
+                              </p:par>
+                            </p:childTnLst>
+                          </p:cTn>
+                        </p:par>
+                      </p:childTnLst>
+                    </p:cTn>
+                  </p:par>
+                  <p:par>
+                    <p:cTn id="56" fill="hold">
+                      <p:stCondLst>
+                        <p:cond delay="indefinite"/>
+                      </p:stCondLst>
+                      <p:childTnLst>
+                        <p:par>
+                          <p:cTn id="57" fill="hold">
+                            <p:stCondLst>
+                              <p:cond delay="0"/>
+                            </p:stCondLst>
+                            <p:childTnLst>
+                              <p:par>
+                                <p:cTn id="58" presetID="10" presetClass="entr" presetSubtype="0" fill="hold" grpId="0" nodeType="clickEffect">
+                                  <p:stCondLst>
+                                    <p:cond delay="0"/>
+                                  </p:stCondLst>
+                                  <p:childTnLst>
+                                    <p:set>
+                                      <p:cBhvr>
+                                        <p:cTn id="59" dur="1" fill="hold">
+                                          <p:stCondLst>
+                                            <p:cond delay="0"/>
+                                          </p:stCondLst>
+                                        </p:cTn>
+                                        <p:tgtEl>
+                                          <p:spTgt spid="2">
+                                            <p:txEl>
+                                              <p:pRg st="11" end="11"/>
+                                            </p:txEl>
+                                          </p:spTgt>
+                                        </p:tgtEl>
+                                        <p:attrNameLst>
+                                          <p:attrName>style.visibility</p:attrName>
+                                        </p:attrNameLst>
+                                      </p:cBhvr>
+                                      <p:to>
+                                        <p:strVal val="visible"/>
+                                      </p:to>
+                                    </p:set>
+                                    <p:animEffect transition="in" filter="fade">
+                                      <p:cBhvr>
+                                        <p:cTn id="60" dur="500"/>
+                                        <p:tgtEl>
+                                          <p:spTgt spid="2">
+                                            <p:txEl>
+                                              <p:pRg st="11" end="11"/>
+                                            </p:txEl>
+                                          </p:spTgt>
+                                        </p:tgtEl>
+                                      </p:cBhvr>
+                                    </p:animEffect>
+                                  </p:childTnLst>
+                                </p:cTn>
+                              </p:par>
+                            </p:childTnLst>
+                          </p:cTn>
+                        </p:par>
+                      </p:childTnLst>
+                    </p:cTn>
+                  </p:par>
+                </p:childTnLst>
+              </p:cTn>
+              <p:prevCondLst>
+                <p:cond evt="onPrev" delay="0">
+                  <p:tgtEl>
+                    <p:sldTgt/>
+                  </p:tgtEl>
+                </p:cond>
+              </p:prevCondLst>
+              <p:nextCondLst>
+                <p:cond evt="onNext" delay="0">
+                  <p:tgtEl>
+                    <p:sldTgt/>
+                  </p:tgtEl>
+                </p:cond>
+              </p:nextCondLst>
+            </p:seq>
+          </p:childTnLst>
+        </p:cTn>
+      </p:par>
+    </p:tnLst>
+    <p:bldLst>
+      <p:bldP spid="2" grpId="0" build="p"/>
+    </p:bldLst>
+  </p:timing>
 </p:sld>
 </file>
 
@@ -22917,7 +24950,7 @@
     <a:masterClrMapping/>
   </p:clrMapOvr>
   <p:transition spd="slow">
-    <p:cover/>
+    <p:push dir="u"/>
   </p:transition>
   <p:timing>
     <p:tnLst>

</xml_diff>

<commit_message>
reordered a few slides
</commit_message>
<xml_diff>
--- a/lecture.pptx
+++ b/lecture.pptx
@@ -51,8 +51,8 @@
     <p:sldId id="573" r:id="rId39"/>
     <p:sldId id="579" r:id="rId40"/>
     <p:sldId id="578" r:id="rId41"/>
-    <p:sldId id="576" r:id="rId42"/>
-    <p:sldId id="567" r:id="rId43"/>
+    <p:sldId id="567" r:id="rId42"/>
+    <p:sldId id="576" r:id="rId43"/>
     <p:sldId id="566" r:id="rId44"/>
   </p:sldIdLst>
   <p:sldSz cx="14630400" cy="8229600"/>
@@ -320,7 +320,7 @@
               <a:pPr>
                 <a:defRPr/>
               </a:pPr>
-              <a:t>5/28/2019</a:t>
+              <a:t>5/29/2019</a:t>
             </a:fld>
             <a:endParaRPr lang="en-US" dirty="0"/>
           </a:p>
@@ -544,7 +544,7 @@
               <a:pPr>
                 <a:defRPr/>
               </a:pPr>
-              <a:t>5/28/2019</a:t>
+              <a:t>5/29/2019</a:t>
             </a:fld>
             <a:endParaRPr lang="en-US" dirty="0"/>
           </a:p>
@@ -911,14 +911,14 @@
           </a:ln>
           <a:extLst>
             <a:ext uri="{909E8E84-426E-40dd-AFC4-6F175D3DCCD1}">
-              <a14:hiddenFill xmlns:a14="http://schemas.microsoft.com/office/drawing/2010/main" xmlns="">
+              <a14:hiddenFill xmlns="" xmlns:a14="http://schemas.microsoft.com/office/drawing/2010/main">
                 <a:solidFill>
                   <a:srgbClr val="FFFFFF"/>
                 </a:solidFill>
               </a14:hiddenFill>
             </a:ext>
             <a:ext uri="{FAA26D3D-D897-4be2-8F04-BA451C77F1D7}">
-              <ma14:placeholderFlag xmlns:ma14="http://schemas.microsoft.com/office/mac/drawingml/2011/main" xmlns="" val="1"/>
+              <ma14:placeholderFlag xmlns="" xmlns:ma14="http://schemas.microsoft.com/office/mac/drawingml/2011/main" val="1"/>
             </a:ext>
           </a:extLst>
         </p:spPr>
@@ -937,14 +937,14 @@
           <a:noFill/>
           <a:extLst>
             <a:ext uri="{909E8E84-426E-40dd-AFC4-6F175D3DCCD1}">
-              <a14:hiddenFill xmlns:a14="http://schemas.microsoft.com/office/drawing/2010/main" xmlns="">
+              <a14:hiddenFill xmlns="" xmlns:a14="http://schemas.microsoft.com/office/drawing/2010/main">
                 <a:solidFill>
                   <a:srgbClr val="FFFFFF"/>
                 </a:solidFill>
               </a14:hiddenFill>
             </a:ext>
             <a:ext uri="{91240B29-F687-4f45-9708-019B960494DF}">
-              <a14:hiddenLine xmlns:a14="http://schemas.microsoft.com/office/drawing/2010/main" xmlns="" w="9525">
+              <a14:hiddenLine xmlns="" xmlns:a14="http://schemas.microsoft.com/office/drawing/2010/main" w="9525">
                 <a:solidFill>
                   <a:srgbClr val="000000"/>
                 </a:solidFill>
@@ -1024,14 +1024,14 @@
           </a:ln>
           <a:extLst>
             <a:ext uri="{909E8E84-426E-40dd-AFC4-6F175D3DCCD1}">
-              <a14:hiddenFill xmlns:a14="http://schemas.microsoft.com/office/drawing/2010/main" xmlns="">
+              <a14:hiddenFill xmlns="" xmlns:a14="http://schemas.microsoft.com/office/drawing/2010/main">
                 <a:solidFill>
                   <a:srgbClr val="FFFFFF"/>
                 </a:solidFill>
               </a14:hiddenFill>
             </a:ext>
             <a:ext uri="{FAA26D3D-D897-4be2-8F04-BA451C77F1D7}">
-              <ma14:placeholderFlag xmlns:ma14="http://schemas.microsoft.com/office/mac/drawingml/2011/main" xmlns="" val="1"/>
+              <ma14:placeholderFlag xmlns="" xmlns:ma14="http://schemas.microsoft.com/office/mac/drawingml/2011/main" val="1"/>
             </a:ext>
           </a:extLst>
         </p:spPr>
@@ -1050,14 +1050,14 @@
           <a:noFill/>
           <a:extLst>
             <a:ext uri="{909E8E84-426E-40dd-AFC4-6F175D3DCCD1}">
-              <a14:hiddenFill xmlns:a14="http://schemas.microsoft.com/office/drawing/2010/main" xmlns="">
+              <a14:hiddenFill xmlns="" xmlns:a14="http://schemas.microsoft.com/office/drawing/2010/main">
                 <a:solidFill>
                   <a:srgbClr val="FFFFFF"/>
                 </a:solidFill>
               </a14:hiddenFill>
             </a:ext>
             <a:ext uri="{91240B29-F687-4f45-9708-019B960494DF}">
-              <a14:hiddenLine xmlns:a14="http://schemas.microsoft.com/office/drawing/2010/main" xmlns="" w="9525">
+              <a14:hiddenLine xmlns="" xmlns:a14="http://schemas.microsoft.com/office/drawing/2010/main" w="9525">
                 <a:solidFill>
                   <a:srgbClr val="000000"/>
                 </a:solidFill>
@@ -1145,14 +1145,14 @@
           </a:ln>
           <a:extLst>
             <a:ext uri="{909E8E84-426E-40dd-AFC4-6F175D3DCCD1}">
-              <a14:hiddenFill xmlns:a14="http://schemas.microsoft.com/office/drawing/2010/main" xmlns="">
+              <a14:hiddenFill xmlns="" xmlns:a14="http://schemas.microsoft.com/office/drawing/2010/main">
                 <a:solidFill>
                   <a:srgbClr val="FFFFFF"/>
                 </a:solidFill>
               </a14:hiddenFill>
             </a:ext>
             <a:ext uri="{FAA26D3D-D897-4be2-8F04-BA451C77F1D7}">
-              <ma14:placeholderFlag xmlns:ma14="http://schemas.microsoft.com/office/mac/drawingml/2011/main" xmlns="" val="1"/>
+              <ma14:placeholderFlag xmlns="" xmlns:ma14="http://schemas.microsoft.com/office/mac/drawingml/2011/main" val="1"/>
             </a:ext>
           </a:extLst>
         </p:spPr>
@@ -1171,14 +1171,14 @@
           <a:noFill/>
           <a:extLst>
             <a:ext uri="{909E8E84-426E-40dd-AFC4-6F175D3DCCD1}">
-              <a14:hiddenFill xmlns:a14="http://schemas.microsoft.com/office/drawing/2010/main" xmlns="">
+              <a14:hiddenFill xmlns="" xmlns:a14="http://schemas.microsoft.com/office/drawing/2010/main">
                 <a:solidFill>
                   <a:srgbClr val="FFFFFF"/>
                 </a:solidFill>
               </a14:hiddenFill>
             </a:ext>
             <a:ext uri="{91240B29-F687-4f45-9708-019B960494DF}">
-              <a14:hiddenLine xmlns:a14="http://schemas.microsoft.com/office/drawing/2010/main" xmlns="" w="9525">
+              <a14:hiddenLine xmlns="" xmlns:a14="http://schemas.microsoft.com/office/drawing/2010/main" w="9525">
                 <a:solidFill>
                   <a:srgbClr val="000000"/>
                 </a:solidFill>
@@ -1266,14 +1266,14 @@
           </a:ln>
           <a:extLst>
             <a:ext uri="{909E8E84-426E-40dd-AFC4-6F175D3DCCD1}">
-              <a14:hiddenFill xmlns:a14="http://schemas.microsoft.com/office/drawing/2010/main" xmlns="">
+              <a14:hiddenFill xmlns="" xmlns:a14="http://schemas.microsoft.com/office/drawing/2010/main">
                 <a:solidFill>
                   <a:srgbClr val="FFFFFF"/>
                 </a:solidFill>
               </a14:hiddenFill>
             </a:ext>
             <a:ext uri="{FAA26D3D-D897-4be2-8F04-BA451C77F1D7}">
-              <ma14:placeholderFlag xmlns:ma14="http://schemas.microsoft.com/office/mac/drawingml/2011/main" xmlns="" val="1"/>
+              <ma14:placeholderFlag xmlns="" xmlns:ma14="http://schemas.microsoft.com/office/mac/drawingml/2011/main" val="1"/>
             </a:ext>
           </a:extLst>
         </p:spPr>
@@ -1292,14 +1292,14 @@
           <a:noFill/>
           <a:extLst>
             <a:ext uri="{909E8E84-426E-40dd-AFC4-6F175D3DCCD1}">
-              <a14:hiddenFill xmlns:a14="http://schemas.microsoft.com/office/drawing/2010/main" xmlns="">
+              <a14:hiddenFill xmlns="" xmlns:a14="http://schemas.microsoft.com/office/drawing/2010/main">
                 <a:solidFill>
                   <a:srgbClr val="FFFFFF"/>
                 </a:solidFill>
               </a14:hiddenFill>
             </a:ext>
             <a:ext uri="{91240B29-F687-4f45-9708-019B960494DF}">
-              <a14:hiddenLine xmlns:a14="http://schemas.microsoft.com/office/drawing/2010/main" xmlns="" w="9525">
+              <a14:hiddenLine xmlns="" xmlns:a14="http://schemas.microsoft.com/office/drawing/2010/main" w="9525">
                 <a:solidFill>
                   <a:srgbClr val="000000"/>
                 </a:solidFill>
@@ -1387,14 +1387,14 @@
           </a:ln>
           <a:extLst>
             <a:ext uri="{909E8E84-426E-40dd-AFC4-6F175D3DCCD1}">
-              <a14:hiddenFill xmlns:a14="http://schemas.microsoft.com/office/drawing/2010/main" xmlns="">
+              <a14:hiddenFill xmlns="" xmlns:a14="http://schemas.microsoft.com/office/drawing/2010/main">
                 <a:solidFill>
                   <a:srgbClr val="FFFFFF"/>
                 </a:solidFill>
               </a14:hiddenFill>
             </a:ext>
             <a:ext uri="{FAA26D3D-D897-4be2-8F04-BA451C77F1D7}">
-              <ma14:placeholderFlag xmlns:ma14="http://schemas.microsoft.com/office/mac/drawingml/2011/main" xmlns="" val="1"/>
+              <ma14:placeholderFlag xmlns="" xmlns:ma14="http://schemas.microsoft.com/office/mac/drawingml/2011/main" val="1"/>
             </a:ext>
           </a:extLst>
         </p:spPr>
@@ -1413,14 +1413,14 @@
           <a:noFill/>
           <a:extLst>
             <a:ext uri="{909E8E84-426E-40dd-AFC4-6F175D3DCCD1}">
-              <a14:hiddenFill xmlns:a14="http://schemas.microsoft.com/office/drawing/2010/main" xmlns="">
+              <a14:hiddenFill xmlns="" xmlns:a14="http://schemas.microsoft.com/office/drawing/2010/main">
                 <a:solidFill>
                   <a:srgbClr val="FFFFFF"/>
                 </a:solidFill>
               </a14:hiddenFill>
             </a:ext>
             <a:ext uri="{91240B29-F687-4f45-9708-019B960494DF}">
-              <a14:hiddenLine xmlns:a14="http://schemas.microsoft.com/office/drawing/2010/main" xmlns="" w="9525">
+              <a14:hiddenLine xmlns="" xmlns:a14="http://schemas.microsoft.com/office/drawing/2010/main" w="9525">
                 <a:solidFill>
                   <a:srgbClr val="000000"/>
                 </a:solidFill>
@@ -1508,14 +1508,14 @@
           </a:ln>
           <a:extLst>
             <a:ext uri="{909E8E84-426E-40dd-AFC4-6F175D3DCCD1}">
-              <a14:hiddenFill xmlns:a14="http://schemas.microsoft.com/office/drawing/2010/main" xmlns="">
+              <a14:hiddenFill xmlns="" xmlns:a14="http://schemas.microsoft.com/office/drawing/2010/main">
                 <a:solidFill>
                   <a:srgbClr val="FFFFFF"/>
                 </a:solidFill>
               </a14:hiddenFill>
             </a:ext>
             <a:ext uri="{FAA26D3D-D897-4be2-8F04-BA451C77F1D7}">
-              <ma14:placeholderFlag xmlns:ma14="http://schemas.microsoft.com/office/mac/drawingml/2011/main" xmlns="" val="1"/>
+              <ma14:placeholderFlag xmlns="" xmlns:ma14="http://schemas.microsoft.com/office/mac/drawingml/2011/main" val="1"/>
             </a:ext>
           </a:extLst>
         </p:spPr>
@@ -1534,14 +1534,14 @@
           <a:noFill/>
           <a:extLst>
             <a:ext uri="{909E8E84-426E-40dd-AFC4-6F175D3DCCD1}">
-              <a14:hiddenFill xmlns:a14="http://schemas.microsoft.com/office/drawing/2010/main" xmlns="">
+              <a14:hiddenFill xmlns="" xmlns:a14="http://schemas.microsoft.com/office/drawing/2010/main">
                 <a:solidFill>
                   <a:srgbClr val="FFFFFF"/>
                 </a:solidFill>
               </a14:hiddenFill>
             </a:ext>
             <a:ext uri="{91240B29-F687-4f45-9708-019B960494DF}">
-              <a14:hiddenLine xmlns:a14="http://schemas.microsoft.com/office/drawing/2010/main" xmlns="" w="9525">
+              <a14:hiddenLine xmlns="" xmlns:a14="http://schemas.microsoft.com/office/drawing/2010/main" w="9525">
                 <a:solidFill>
                   <a:srgbClr val="000000"/>
                 </a:solidFill>
@@ -1771,14 +1771,14 @@
           </a:ln>
           <a:extLst>
             <a:ext uri="{909E8E84-426E-40dd-AFC4-6F175D3DCCD1}">
-              <a14:hiddenFill xmlns:a14="http://schemas.microsoft.com/office/drawing/2010/main" xmlns="">
+              <a14:hiddenFill xmlns="" xmlns:a14="http://schemas.microsoft.com/office/drawing/2010/main">
                 <a:solidFill>
                   <a:srgbClr val="FFFFFF"/>
                 </a:solidFill>
               </a14:hiddenFill>
             </a:ext>
             <a:ext uri="{FAA26D3D-D897-4be2-8F04-BA451C77F1D7}">
-              <ma14:placeholderFlag xmlns:ma14="http://schemas.microsoft.com/office/mac/drawingml/2011/main" xmlns="" val="1"/>
+              <ma14:placeholderFlag xmlns="" xmlns:ma14="http://schemas.microsoft.com/office/mac/drawingml/2011/main" val="1"/>
             </a:ext>
           </a:extLst>
         </p:spPr>
@@ -1797,14 +1797,14 @@
           <a:noFill/>
           <a:extLst>
             <a:ext uri="{909E8E84-426E-40dd-AFC4-6F175D3DCCD1}">
-              <a14:hiddenFill xmlns:a14="http://schemas.microsoft.com/office/drawing/2010/main" xmlns="">
+              <a14:hiddenFill xmlns="" xmlns:a14="http://schemas.microsoft.com/office/drawing/2010/main">
                 <a:solidFill>
                   <a:srgbClr val="FFFFFF"/>
                 </a:solidFill>
               </a14:hiddenFill>
             </a:ext>
             <a:ext uri="{91240B29-F687-4f45-9708-019B960494DF}">
-              <a14:hiddenLine xmlns:a14="http://schemas.microsoft.com/office/drawing/2010/main" xmlns="" w="9525">
+              <a14:hiddenLine xmlns="" xmlns:a14="http://schemas.microsoft.com/office/drawing/2010/main" w="9525">
                 <a:solidFill>
                   <a:srgbClr val="000000"/>
                 </a:solidFill>
@@ -1884,14 +1884,14 @@
           </a:ln>
           <a:extLst>
             <a:ext uri="{909E8E84-426E-40dd-AFC4-6F175D3DCCD1}">
-              <a14:hiddenFill xmlns:a14="http://schemas.microsoft.com/office/drawing/2010/main" xmlns="">
+              <a14:hiddenFill xmlns="" xmlns:a14="http://schemas.microsoft.com/office/drawing/2010/main">
                 <a:solidFill>
                   <a:srgbClr val="FFFFFF"/>
                 </a:solidFill>
               </a14:hiddenFill>
             </a:ext>
             <a:ext uri="{FAA26D3D-D897-4be2-8F04-BA451C77F1D7}">
-              <ma14:placeholderFlag xmlns:ma14="http://schemas.microsoft.com/office/mac/drawingml/2011/main" xmlns="" val="1"/>
+              <ma14:placeholderFlag xmlns="" xmlns:ma14="http://schemas.microsoft.com/office/mac/drawingml/2011/main" val="1"/>
             </a:ext>
           </a:extLst>
         </p:spPr>
@@ -1910,14 +1910,14 @@
           <a:noFill/>
           <a:extLst>
             <a:ext uri="{909E8E84-426E-40dd-AFC4-6F175D3DCCD1}">
-              <a14:hiddenFill xmlns:a14="http://schemas.microsoft.com/office/drawing/2010/main" xmlns="">
+              <a14:hiddenFill xmlns="" xmlns:a14="http://schemas.microsoft.com/office/drawing/2010/main">
                 <a:solidFill>
                   <a:srgbClr val="FFFFFF"/>
                 </a:solidFill>
               </a14:hiddenFill>
             </a:ext>
             <a:ext uri="{91240B29-F687-4f45-9708-019B960494DF}">
-              <a14:hiddenLine xmlns:a14="http://schemas.microsoft.com/office/drawing/2010/main" xmlns="" w="9525">
+              <a14:hiddenLine xmlns="" xmlns:a14="http://schemas.microsoft.com/office/drawing/2010/main" w="9525">
                 <a:solidFill>
                   <a:srgbClr val="000000"/>
                 </a:solidFill>
@@ -2316,14 +2316,14 @@
           </a:ln>
           <a:extLst>
             <a:ext uri="{909E8E84-426E-40dd-AFC4-6F175D3DCCD1}">
-              <a14:hiddenFill xmlns:a14="http://schemas.microsoft.com/office/drawing/2010/main" xmlns="">
+              <a14:hiddenFill xmlns="" xmlns:a14="http://schemas.microsoft.com/office/drawing/2010/main">
                 <a:solidFill>
                   <a:srgbClr val="FFFFFF"/>
                 </a:solidFill>
               </a14:hiddenFill>
             </a:ext>
             <a:ext uri="{FAA26D3D-D897-4be2-8F04-BA451C77F1D7}">
-              <ma14:placeholderFlag xmlns:ma14="http://schemas.microsoft.com/office/mac/drawingml/2011/main" xmlns="" val="1"/>
+              <ma14:placeholderFlag xmlns="" xmlns:ma14="http://schemas.microsoft.com/office/mac/drawingml/2011/main" val="1"/>
             </a:ext>
           </a:extLst>
         </p:spPr>
@@ -2342,14 +2342,14 @@
           <a:noFill/>
           <a:extLst>
             <a:ext uri="{909E8E84-426E-40dd-AFC4-6F175D3DCCD1}">
-              <a14:hiddenFill xmlns:a14="http://schemas.microsoft.com/office/drawing/2010/main" xmlns="">
+              <a14:hiddenFill xmlns="" xmlns:a14="http://schemas.microsoft.com/office/drawing/2010/main">
                 <a:solidFill>
                   <a:srgbClr val="FFFFFF"/>
                 </a:solidFill>
               </a14:hiddenFill>
             </a:ext>
             <a:ext uri="{91240B29-F687-4f45-9708-019B960494DF}">
-              <a14:hiddenLine xmlns:a14="http://schemas.microsoft.com/office/drawing/2010/main" xmlns="" w="9525">
+              <a14:hiddenLine xmlns="" xmlns:a14="http://schemas.microsoft.com/office/drawing/2010/main" w="9525">
                 <a:solidFill>
                   <a:srgbClr val="000000"/>
                 </a:solidFill>
@@ -2660,14 +2660,14 @@
           </a:ln>
           <a:extLst>
             <a:ext uri="{909E8E84-426E-40dd-AFC4-6F175D3DCCD1}">
-              <a14:hiddenFill xmlns:a14="http://schemas.microsoft.com/office/drawing/2010/main" xmlns="">
+              <a14:hiddenFill xmlns="" xmlns:a14="http://schemas.microsoft.com/office/drawing/2010/main">
                 <a:solidFill>
                   <a:srgbClr val="FFFFFF"/>
                 </a:solidFill>
               </a14:hiddenFill>
             </a:ext>
             <a:ext uri="{FAA26D3D-D897-4be2-8F04-BA451C77F1D7}">
-              <ma14:placeholderFlag xmlns:ma14="http://schemas.microsoft.com/office/mac/drawingml/2011/main" xmlns="" val="1"/>
+              <ma14:placeholderFlag xmlns="" xmlns:ma14="http://schemas.microsoft.com/office/mac/drawingml/2011/main" val="1"/>
             </a:ext>
           </a:extLst>
         </p:spPr>
@@ -2686,14 +2686,14 @@
           <a:noFill/>
           <a:extLst>
             <a:ext uri="{909E8E84-426E-40dd-AFC4-6F175D3DCCD1}">
-              <a14:hiddenFill xmlns:a14="http://schemas.microsoft.com/office/drawing/2010/main" xmlns="">
+              <a14:hiddenFill xmlns="" xmlns:a14="http://schemas.microsoft.com/office/drawing/2010/main">
                 <a:solidFill>
                   <a:srgbClr val="FFFFFF"/>
                 </a:solidFill>
               </a14:hiddenFill>
             </a:ext>
             <a:ext uri="{91240B29-F687-4f45-9708-019B960494DF}">
-              <a14:hiddenLine xmlns:a14="http://schemas.microsoft.com/office/drawing/2010/main" xmlns="" w="9525">
+              <a14:hiddenLine xmlns="" xmlns:a14="http://schemas.microsoft.com/office/drawing/2010/main" w="9525">
                 <a:solidFill>
                   <a:srgbClr val="000000"/>
                 </a:solidFill>
@@ -2781,14 +2781,14 @@
           </a:ln>
           <a:extLst>
             <a:ext uri="{909E8E84-426E-40dd-AFC4-6F175D3DCCD1}">
-              <a14:hiddenFill xmlns:a14="http://schemas.microsoft.com/office/drawing/2010/main" xmlns="">
+              <a14:hiddenFill xmlns="" xmlns:a14="http://schemas.microsoft.com/office/drawing/2010/main">
                 <a:solidFill>
                   <a:srgbClr val="FFFFFF"/>
                 </a:solidFill>
               </a14:hiddenFill>
             </a:ext>
             <a:ext uri="{FAA26D3D-D897-4be2-8F04-BA451C77F1D7}">
-              <ma14:placeholderFlag xmlns:ma14="http://schemas.microsoft.com/office/mac/drawingml/2011/main" xmlns="" val="1"/>
+              <ma14:placeholderFlag xmlns="" xmlns:ma14="http://schemas.microsoft.com/office/mac/drawingml/2011/main" val="1"/>
             </a:ext>
           </a:extLst>
         </p:spPr>
@@ -2807,14 +2807,14 @@
           <a:noFill/>
           <a:extLst>
             <a:ext uri="{909E8E84-426E-40dd-AFC4-6F175D3DCCD1}">
-              <a14:hiddenFill xmlns:a14="http://schemas.microsoft.com/office/drawing/2010/main" xmlns="">
+              <a14:hiddenFill xmlns="" xmlns:a14="http://schemas.microsoft.com/office/drawing/2010/main">
                 <a:solidFill>
                   <a:srgbClr val="FFFFFF"/>
                 </a:solidFill>
               </a14:hiddenFill>
             </a:ext>
             <a:ext uri="{91240B29-F687-4f45-9708-019B960494DF}">
-              <a14:hiddenLine xmlns:a14="http://schemas.microsoft.com/office/drawing/2010/main" xmlns="" w="9525">
+              <a14:hiddenLine xmlns="" xmlns:a14="http://schemas.microsoft.com/office/drawing/2010/main" w="9525">
                 <a:solidFill>
                   <a:srgbClr val="000000"/>
                 </a:solidFill>
@@ -2971,14 +2971,14 @@
           </a:ln>
           <a:extLst>
             <a:ext uri="{909E8E84-426E-40dd-AFC4-6F175D3DCCD1}">
-              <a14:hiddenFill xmlns:a14="http://schemas.microsoft.com/office/drawing/2010/main" xmlns="">
+              <a14:hiddenFill xmlns="" xmlns:a14="http://schemas.microsoft.com/office/drawing/2010/main">
                 <a:solidFill>
                   <a:srgbClr val="FFFFFF"/>
                 </a:solidFill>
               </a14:hiddenFill>
             </a:ext>
             <a:ext uri="{FAA26D3D-D897-4be2-8F04-BA451C77F1D7}">
-              <ma14:placeholderFlag xmlns:ma14="http://schemas.microsoft.com/office/mac/drawingml/2011/main" xmlns="" val="1"/>
+              <ma14:placeholderFlag xmlns="" xmlns:ma14="http://schemas.microsoft.com/office/mac/drawingml/2011/main" val="1"/>
             </a:ext>
           </a:extLst>
         </p:spPr>
@@ -2997,14 +2997,14 @@
           <a:noFill/>
           <a:extLst>
             <a:ext uri="{909E8E84-426E-40dd-AFC4-6F175D3DCCD1}">
-              <a14:hiddenFill xmlns:a14="http://schemas.microsoft.com/office/drawing/2010/main" xmlns="">
+              <a14:hiddenFill xmlns="" xmlns:a14="http://schemas.microsoft.com/office/drawing/2010/main">
                 <a:solidFill>
                   <a:srgbClr val="FFFFFF"/>
                 </a:solidFill>
               </a14:hiddenFill>
             </a:ext>
             <a:ext uri="{91240B29-F687-4f45-9708-019B960494DF}">
-              <a14:hiddenLine xmlns:a14="http://schemas.microsoft.com/office/drawing/2010/main" xmlns="" w="9525">
+              <a14:hiddenLine xmlns="" xmlns:a14="http://schemas.microsoft.com/office/drawing/2010/main" w="9525">
                 <a:solidFill>
                   <a:srgbClr val="000000"/>
                 </a:solidFill>
@@ -3089,14 +3089,14 @@
           </a:ln>
           <a:extLst>
             <a:ext uri="{909E8E84-426E-40dd-AFC4-6F175D3DCCD1}">
-              <a14:hiddenFill xmlns:a14="http://schemas.microsoft.com/office/drawing/2010/main" xmlns="">
+              <a14:hiddenFill xmlns="" xmlns:a14="http://schemas.microsoft.com/office/drawing/2010/main">
                 <a:solidFill>
                   <a:srgbClr val="FFFFFF"/>
                 </a:solidFill>
               </a14:hiddenFill>
             </a:ext>
             <a:ext uri="{FAA26D3D-D897-4be2-8F04-BA451C77F1D7}">
-              <ma14:placeholderFlag xmlns:ma14="http://schemas.microsoft.com/office/mac/drawingml/2011/main" xmlns="" val="1"/>
+              <ma14:placeholderFlag xmlns="" xmlns:ma14="http://schemas.microsoft.com/office/mac/drawingml/2011/main" val="1"/>
             </a:ext>
           </a:extLst>
         </p:spPr>
@@ -3115,14 +3115,14 @@
           <a:noFill/>
           <a:extLst>
             <a:ext uri="{909E8E84-426E-40dd-AFC4-6F175D3DCCD1}">
-              <a14:hiddenFill xmlns:a14="http://schemas.microsoft.com/office/drawing/2010/main" xmlns="">
+              <a14:hiddenFill xmlns="" xmlns:a14="http://schemas.microsoft.com/office/drawing/2010/main">
                 <a:solidFill>
                   <a:srgbClr val="FFFFFF"/>
                 </a:solidFill>
               </a14:hiddenFill>
             </a:ext>
             <a:ext uri="{91240B29-F687-4f45-9708-019B960494DF}">
-              <a14:hiddenLine xmlns:a14="http://schemas.microsoft.com/office/drawing/2010/main" xmlns="" w="9525">
+              <a14:hiddenLine xmlns="" xmlns:a14="http://schemas.microsoft.com/office/drawing/2010/main" w="9525">
                 <a:solidFill>
                   <a:srgbClr val="000000"/>
                 </a:solidFill>
@@ -3210,14 +3210,14 @@
           </a:ln>
           <a:extLst>
             <a:ext uri="{909E8E84-426E-40dd-AFC4-6F175D3DCCD1}">
-              <a14:hiddenFill xmlns:a14="http://schemas.microsoft.com/office/drawing/2010/main" xmlns="">
+              <a14:hiddenFill xmlns="" xmlns:a14="http://schemas.microsoft.com/office/drawing/2010/main">
                 <a:solidFill>
                   <a:srgbClr val="FFFFFF"/>
                 </a:solidFill>
               </a14:hiddenFill>
             </a:ext>
             <a:ext uri="{FAA26D3D-D897-4be2-8F04-BA451C77F1D7}">
-              <ma14:placeholderFlag xmlns:ma14="http://schemas.microsoft.com/office/mac/drawingml/2011/main" xmlns="" val="1"/>
+              <ma14:placeholderFlag xmlns="" xmlns:ma14="http://schemas.microsoft.com/office/mac/drawingml/2011/main" val="1"/>
             </a:ext>
           </a:extLst>
         </p:spPr>
@@ -3236,14 +3236,14 @@
           <a:noFill/>
           <a:extLst>
             <a:ext uri="{909E8E84-426E-40dd-AFC4-6F175D3DCCD1}">
-              <a14:hiddenFill xmlns:a14="http://schemas.microsoft.com/office/drawing/2010/main" xmlns="">
+              <a14:hiddenFill xmlns="" xmlns:a14="http://schemas.microsoft.com/office/drawing/2010/main">
                 <a:solidFill>
                   <a:srgbClr val="FFFFFF"/>
                 </a:solidFill>
               </a14:hiddenFill>
             </a:ext>
             <a:ext uri="{91240B29-F687-4f45-9708-019B960494DF}">
-              <a14:hiddenLine xmlns:a14="http://schemas.microsoft.com/office/drawing/2010/main" xmlns="" w="9525">
+              <a14:hiddenLine xmlns="" xmlns:a14="http://schemas.microsoft.com/office/drawing/2010/main" w="9525">
                 <a:solidFill>
                   <a:srgbClr val="000000"/>
                 </a:solidFill>
@@ -3331,14 +3331,14 @@
           </a:ln>
           <a:extLst>
             <a:ext uri="{909E8E84-426E-40dd-AFC4-6F175D3DCCD1}">
-              <a14:hiddenFill xmlns:a14="http://schemas.microsoft.com/office/drawing/2010/main" xmlns="">
+              <a14:hiddenFill xmlns="" xmlns:a14="http://schemas.microsoft.com/office/drawing/2010/main">
                 <a:solidFill>
                   <a:srgbClr val="FFFFFF"/>
                 </a:solidFill>
               </a14:hiddenFill>
             </a:ext>
             <a:ext uri="{FAA26D3D-D897-4be2-8F04-BA451C77F1D7}">
-              <ma14:placeholderFlag xmlns:ma14="http://schemas.microsoft.com/office/mac/drawingml/2011/main" xmlns="" val="1"/>
+              <ma14:placeholderFlag xmlns="" xmlns:ma14="http://schemas.microsoft.com/office/mac/drawingml/2011/main" val="1"/>
             </a:ext>
           </a:extLst>
         </p:spPr>
@@ -3357,14 +3357,14 @@
           <a:noFill/>
           <a:extLst>
             <a:ext uri="{909E8E84-426E-40dd-AFC4-6F175D3DCCD1}">
-              <a14:hiddenFill xmlns:a14="http://schemas.microsoft.com/office/drawing/2010/main" xmlns="">
+              <a14:hiddenFill xmlns="" xmlns:a14="http://schemas.microsoft.com/office/drawing/2010/main">
                 <a:solidFill>
                   <a:srgbClr val="FFFFFF"/>
                 </a:solidFill>
               </a14:hiddenFill>
             </a:ext>
             <a:ext uri="{91240B29-F687-4f45-9708-019B960494DF}">
-              <a14:hiddenLine xmlns:a14="http://schemas.microsoft.com/office/drawing/2010/main" xmlns="" w="9525">
+              <a14:hiddenLine xmlns="" xmlns:a14="http://schemas.microsoft.com/office/drawing/2010/main" w="9525">
                 <a:solidFill>
                   <a:srgbClr val="000000"/>
                 </a:solidFill>
@@ -3452,14 +3452,14 @@
           </a:ln>
           <a:extLst>
             <a:ext uri="{909E8E84-426E-40dd-AFC4-6F175D3DCCD1}">
-              <a14:hiddenFill xmlns:a14="http://schemas.microsoft.com/office/drawing/2010/main" xmlns="">
+              <a14:hiddenFill xmlns="" xmlns:a14="http://schemas.microsoft.com/office/drawing/2010/main">
                 <a:solidFill>
                   <a:srgbClr val="FFFFFF"/>
                 </a:solidFill>
               </a14:hiddenFill>
             </a:ext>
             <a:ext uri="{FAA26D3D-D897-4be2-8F04-BA451C77F1D7}">
-              <ma14:placeholderFlag xmlns:ma14="http://schemas.microsoft.com/office/mac/drawingml/2011/main" xmlns="" val="1"/>
+              <ma14:placeholderFlag xmlns="" xmlns:ma14="http://schemas.microsoft.com/office/mac/drawingml/2011/main" val="1"/>
             </a:ext>
           </a:extLst>
         </p:spPr>
@@ -3478,14 +3478,14 @@
           <a:noFill/>
           <a:extLst>
             <a:ext uri="{909E8E84-426E-40dd-AFC4-6F175D3DCCD1}">
-              <a14:hiddenFill xmlns:a14="http://schemas.microsoft.com/office/drawing/2010/main" xmlns="">
+              <a14:hiddenFill xmlns="" xmlns:a14="http://schemas.microsoft.com/office/drawing/2010/main">
                 <a:solidFill>
                   <a:srgbClr val="FFFFFF"/>
                 </a:solidFill>
               </a14:hiddenFill>
             </a:ext>
             <a:ext uri="{91240B29-F687-4f45-9708-019B960494DF}">
-              <a14:hiddenLine xmlns:a14="http://schemas.microsoft.com/office/drawing/2010/main" xmlns="" w="9525">
+              <a14:hiddenLine xmlns="" xmlns:a14="http://schemas.microsoft.com/office/drawing/2010/main" w="9525">
                 <a:solidFill>
                   <a:srgbClr val="000000"/>
                 </a:solidFill>
@@ -3573,14 +3573,14 @@
           </a:ln>
           <a:extLst>
             <a:ext uri="{909E8E84-426E-40dd-AFC4-6F175D3DCCD1}">
-              <a14:hiddenFill xmlns:a14="http://schemas.microsoft.com/office/drawing/2010/main" xmlns="">
+              <a14:hiddenFill xmlns="" xmlns:a14="http://schemas.microsoft.com/office/drawing/2010/main">
                 <a:solidFill>
                   <a:srgbClr val="FFFFFF"/>
                 </a:solidFill>
               </a14:hiddenFill>
             </a:ext>
             <a:ext uri="{FAA26D3D-D897-4be2-8F04-BA451C77F1D7}">
-              <ma14:placeholderFlag xmlns:ma14="http://schemas.microsoft.com/office/mac/drawingml/2011/main" xmlns="" val="1"/>
+              <ma14:placeholderFlag xmlns="" xmlns:ma14="http://schemas.microsoft.com/office/mac/drawingml/2011/main" val="1"/>
             </a:ext>
           </a:extLst>
         </p:spPr>
@@ -3599,14 +3599,14 @@
           <a:noFill/>
           <a:extLst>
             <a:ext uri="{909E8E84-426E-40dd-AFC4-6F175D3DCCD1}">
-              <a14:hiddenFill xmlns:a14="http://schemas.microsoft.com/office/drawing/2010/main" xmlns="">
+              <a14:hiddenFill xmlns="" xmlns:a14="http://schemas.microsoft.com/office/drawing/2010/main">
                 <a:solidFill>
                   <a:srgbClr val="FFFFFF"/>
                 </a:solidFill>
               </a14:hiddenFill>
             </a:ext>
             <a:ext uri="{91240B29-F687-4f45-9708-019B960494DF}">
-              <a14:hiddenLine xmlns:a14="http://schemas.microsoft.com/office/drawing/2010/main" xmlns="" w="9525">
+              <a14:hiddenLine xmlns="" xmlns:a14="http://schemas.microsoft.com/office/drawing/2010/main" w="9525">
                 <a:solidFill>
                   <a:srgbClr val="000000"/>
                 </a:solidFill>
@@ -3803,14 +3803,14 @@
           </a:ln>
           <a:extLst>
             <a:ext uri="{909E8E84-426E-40dd-AFC4-6F175D3DCCD1}">
-              <a14:hiddenFill xmlns:a14="http://schemas.microsoft.com/office/drawing/2010/main" xmlns="">
+              <a14:hiddenFill xmlns="" xmlns:a14="http://schemas.microsoft.com/office/drawing/2010/main">
                 <a:solidFill>
                   <a:srgbClr val="FFFFFF"/>
                 </a:solidFill>
               </a14:hiddenFill>
             </a:ext>
             <a:ext uri="{FAA26D3D-D897-4be2-8F04-BA451C77F1D7}">
-              <ma14:placeholderFlag xmlns:ma14="http://schemas.microsoft.com/office/mac/drawingml/2011/main" xmlns="" val="1"/>
+              <ma14:placeholderFlag xmlns="" xmlns:ma14="http://schemas.microsoft.com/office/mac/drawingml/2011/main" val="1"/>
             </a:ext>
           </a:extLst>
         </p:spPr>
@@ -3829,14 +3829,14 @@
           <a:noFill/>
           <a:extLst>
             <a:ext uri="{909E8E84-426E-40dd-AFC4-6F175D3DCCD1}">
-              <a14:hiddenFill xmlns:a14="http://schemas.microsoft.com/office/drawing/2010/main" xmlns="">
+              <a14:hiddenFill xmlns="" xmlns:a14="http://schemas.microsoft.com/office/drawing/2010/main">
                 <a:solidFill>
                   <a:srgbClr val="FFFFFF"/>
                 </a:solidFill>
               </a14:hiddenFill>
             </a:ext>
             <a:ext uri="{91240B29-F687-4f45-9708-019B960494DF}">
-              <a14:hiddenLine xmlns:a14="http://schemas.microsoft.com/office/drawing/2010/main" xmlns="" w="9525">
+              <a14:hiddenLine xmlns="" xmlns:a14="http://schemas.microsoft.com/office/drawing/2010/main" w="9525">
                 <a:solidFill>
                   <a:srgbClr val="000000"/>
                 </a:solidFill>
@@ -3982,14 +3982,14 @@
           </a:ln>
           <a:extLst>
             <a:ext uri="{909E8E84-426E-40dd-AFC4-6F175D3DCCD1}">
-              <a14:hiddenFill xmlns:a14="http://schemas.microsoft.com/office/drawing/2010/main" xmlns="">
+              <a14:hiddenFill xmlns="" xmlns:a14="http://schemas.microsoft.com/office/drawing/2010/main">
                 <a:solidFill>
                   <a:srgbClr val="FFFFFF"/>
                 </a:solidFill>
               </a14:hiddenFill>
             </a:ext>
             <a:ext uri="{FAA26D3D-D897-4be2-8F04-BA451C77F1D7}">
-              <ma14:placeholderFlag xmlns:ma14="http://schemas.microsoft.com/office/mac/drawingml/2011/main" xmlns="" val="1"/>
+              <ma14:placeholderFlag xmlns="" xmlns:ma14="http://schemas.microsoft.com/office/mac/drawingml/2011/main" val="1"/>
             </a:ext>
           </a:extLst>
         </p:spPr>
@@ -4008,14 +4008,14 @@
           <a:noFill/>
           <a:extLst>
             <a:ext uri="{909E8E84-426E-40dd-AFC4-6F175D3DCCD1}">
-              <a14:hiddenFill xmlns:a14="http://schemas.microsoft.com/office/drawing/2010/main" xmlns="">
+              <a14:hiddenFill xmlns="" xmlns:a14="http://schemas.microsoft.com/office/drawing/2010/main">
                 <a:solidFill>
                   <a:srgbClr val="FFFFFF"/>
                 </a:solidFill>
               </a14:hiddenFill>
             </a:ext>
             <a:ext uri="{91240B29-F687-4f45-9708-019B960494DF}">
-              <a14:hiddenLine xmlns:a14="http://schemas.microsoft.com/office/drawing/2010/main" xmlns="" w="9525">
+              <a14:hiddenLine xmlns="" xmlns:a14="http://schemas.microsoft.com/office/drawing/2010/main" w="9525">
                 <a:solidFill>
                   <a:srgbClr val="000000"/>
                 </a:solidFill>
@@ -4177,14 +4177,14 @@
           </a:ln>
           <a:extLst>
             <a:ext uri="{909E8E84-426E-40dd-AFC4-6F175D3DCCD1}">
-              <a14:hiddenFill xmlns:a14="http://schemas.microsoft.com/office/drawing/2010/main" xmlns="">
+              <a14:hiddenFill xmlns="" xmlns:a14="http://schemas.microsoft.com/office/drawing/2010/main">
                 <a:solidFill>
                   <a:srgbClr val="FFFFFF"/>
                 </a:solidFill>
               </a14:hiddenFill>
             </a:ext>
             <a:ext uri="{FAA26D3D-D897-4be2-8F04-BA451C77F1D7}">
-              <ma14:placeholderFlag xmlns:ma14="http://schemas.microsoft.com/office/mac/drawingml/2011/main" xmlns="" val="1"/>
+              <ma14:placeholderFlag xmlns="" xmlns:ma14="http://schemas.microsoft.com/office/mac/drawingml/2011/main" val="1"/>
             </a:ext>
           </a:extLst>
         </p:spPr>
@@ -4203,14 +4203,14 @@
           <a:noFill/>
           <a:extLst>
             <a:ext uri="{909E8E84-426E-40dd-AFC4-6F175D3DCCD1}">
-              <a14:hiddenFill xmlns:a14="http://schemas.microsoft.com/office/drawing/2010/main" xmlns="">
+              <a14:hiddenFill xmlns="" xmlns:a14="http://schemas.microsoft.com/office/drawing/2010/main">
                 <a:solidFill>
                   <a:srgbClr val="FFFFFF"/>
                 </a:solidFill>
               </a14:hiddenFill>
             </a:ext>
             <a:ext uri="{91240B29-F687-4f45-9708-019B960494DF}">
-              <a14:hiddenLine xmlns:a14="http://schemas.microsoft.com/office/drawing/2010/main" xmlns="" w="9525">
+              <a14:hiddenLine xmlns="" xmlns:a14="http://schemas.microsoft.com/office/drawing/2010/main" w="9525">
                 <a:solidFill>
                   <a:srgbClr val="000000"/>
                 </a:solidFill>
@@ -4298,14 +4298,14 @@
           </a:ln>
           <a:extLst>
             <a:ext uri="{909E8E84-426E-40dd-AFC4-6F175D3DCCD1}">
-              <a14:hiddenFill xmlns:a14="http://schemas.microsoft.com/office/drawing/2010/main" xmlns="">
+              <a14:hiddenFill xmlns="" xmlns:a14="http://schemas.microsoft.com/office/drawing/2010/main">
                 <a:solidFill>
                   <a:srgbClr val="FFFFFF"/>
                 </a:solidFill>
               </a14:hiddenFill>
             </a:ext>
             <a:ext uri="{FAA26D3D-D897-4be2-8F04-BA451C77F1D7}">
-              <ma14:placeholderFlag xmlns:ma14="http://schemas.microsoft.com/office/mac/drawingml/2011/main" xmlns="" val="1"/>
+              <ma14:placeholderFlag xmlns="" xmlns:ma14="http://schemas.microsoft.com/office/mac/drawingml/2011/main" val="1"/>
             </a:ext>
           </a:extLst>
         </p:spPr>
@@ -4324,14 +4324,14 @@
           <a:noFill/>
           <a:extLst>
             <a:ext uri="{909E8E84-426E-40dd-AFC4-6F175D3DCCD1}">
-              <a14:hiddenFill xmlns:a14="http://schemas.microsoft.com/office/drawing/2010/main" xmlns="">
+              <a14:hiddenFill xmlns="" xmlns:a14="http://schemas.microsoft.com/office/drawing/2010/main">
                 <a:solidFill>
                   <a:srgbClr val="FFFFFF"/>
                 </a:solidFill>
               </a14:hiddenFill>
             </a:ext>
             <a:ext uri="{91240B29-F687-4f45-9708-019B960494DF}">
-              <a14:hiddenLine xmlns:a14="http://schemas.microsoft.com/office/drawing/2010/main" xmlns="" w="9525">
+              <a14:hiddenLine xmlns="" xmlns:a14="http://schemas.microsoft.com/office/drawing/2010/main" w="9525">
                 <a:solidFill>
                   <a:srgbClr val="000000"/>
                 </a:solidFill>
@@ -4849,14 +4849,14 @@
           </a:ln>
           <a:extLst>
             <a:ext uri="{909E8E84-426E-40dd-AFC4-6F175D3DCCD1}">
-              <a14:hiddenFill xmlns:a14="http://schemas.microsoft.com/office/drawing/2010/main" xmlns="">
+              <a14:hiddenFill xmlns="" xmlns:a14="http://schemas.microsoft.com/office/drawing/2010/main">
                 <a:solidFill>
                   <a:srgbClr val="FFFFFF"/>
                 </a:solidFill>
               </a14:hiddenFill>
             </a:ext>
             <a:ext uri="{FAA26D3D-D897-4be2-8F04-BA451C77F1D7}">
-              <ma14:placeholderFlag xmlns:ma14="http://schemas.microsoft.com/office/mac/drawingml/2011/main" xmlns="" val="1"/>
+              <ma14:placeholderFlag xmlns="" xmlns:ma14="http://schemas.microsoft.com/office/mac/drawingml/2011/main" val="1"/>
             </a:ext>
           </a:extLst>
         </p:spPr>
@@ -4875,14 +4875,14 @@
           <a:noFill/>
           <a:extLst>
             <a:ext uri="{909E8E84-426E-40dd-AFC4-6F175D3DCCD1}">
-              <a14:hiddenFill xmlns:a14="http://schemas.microsoft.com/office/drawing/2010/main" xmlns="">
+              <a14:hiddenFill xmlns="" xmlns:a14="http://schemas.microsoft.com/office/drawing/2010/main">
                 <a:solidFill>
                   <a:srgbClr val="FFFFFF"/>
                 </a:solidFill>
               </a14:hiddenFill>
             </a:ext>
             <a:ext uri="{91240B29-F687-4f45-9708-019B960494DF}">
-              <a14:hiddenLine xmlns:a14="http://schemas.microsoft.com/office/drawing/2010/main" xmlns="" w="9525">
+              <a14:hiddenLine xmlns="" xmlns:a14="http://schemas.microsoft.com/office/drawing/2010/main" w="9525">
                 <a:solidFill>
                   <a:srgbClr val="000000"/>
                 </a:solidFill>
@@ -4966,7 +4966,7 @@
       </p:grpSpPr>
       <p:sp>
         <p:nvSpPr>
-          <p:cNvPr id="38913" name="Slide Image Placeholder 1"/>
+          <p:cNvPr id="2" name="Slide Image Placeholder 1"/>
           <p:cNvSpPr>
             <a:spLocks noGrp="1" noRot="1" noChangeAspect="1"/>
           </p:cNvSpPr>
@@ -4974,33 +4974,11 @@
             <p:ph type="sldImg"/>
           </p:nvPr>
         </p:nvSpPr>
-        <p:spPr bwMode="auto">
-          <a:noFill/>
-          <a:ln>
-            <a:solidFill>
-              <a:srgbClr val="000000"/>
-            </a:solidFill>
-            <a:miter lim="800000"/>
-            <a:headEnd/>
-            <a:tailEnd/>
-          </a:ln>
-          <a:extLst>
-            <a:ext uri="{909E8E84-426E-40dd-AFC4-6F175D3DCCD1}">
-              <a14:hiddenFill xmlns:a14="http://schemas.microsoft.com/office/drawing/2010/main" xmlns="">
-                <a:solidFill>
-                  <a:srgbClr val="FFFFFF"/>
-                </a:solidFill>
-              </a14:hiddenFill>
-            </a:ext>
-            <a:ext uri="{FAA26D3D-D897-4be2-8F04-BA451C77F1D7}">
-              <ma14:placeholderFlag xmlns:ma14="http://schemas.microsoft.com/office/mac/drawingml/2011/main" xmlns="" val="1"/>
-            </a:ext>
-          </a:extLst>
-        </p:spPr>
+        <p:spPr/>
       </p:sp>
       <p:sp>
         <p:nvSpPr>
-          <p:cNvPr id="38914" name="Notes Placeholder 2"/>
+          <p:cNvPr id="3" name="Notes Placeholder 2"/>
           <p:cNvSpPr>
             <a:spLocks noGrp="1"/>
           </p:cNvSpPr>
@@ -5008,93 +4986,19 @@
             <p:ph type="body" idx="1"/>
           </p:nvPr>
         </p:nvSpPr>
-        <p:spPr bwMode="auto">
-          <a:noFill/>
-          <a:extLst>
-            <a:ext uri="{909E8E84-426E-40dd-AFC4-6F175D3DCCD1}">
-              <a14:hiddenFill xmlns:a14="http://schemas.microsoft.com/office/drawing/2010/main" xmlns="">
-                <a:solidFill>
-                  <a:srgbClr val="FFFFFF"/>
-                </a:solidFill>
-              </a14:hiddenFill>
-            </a:ext>
-            <a:ext uri="{91240B29-F687-4f45-9708-019B960494DF}">
-              <a14:hiddenLine xmlns:a14="http://schemas.microsoft.com/office/drawing/2010/main" xmlns="" w="9525">
-                <a:solidFill>
-                  <a:srgbClr val="000000"/>
-                </a:solidFill>
-                <a:miter lim="800000"/>
-                <a:headEnd/>
-                <a:tailEnd/>
-              </a14:hiddenLine>
-            </a:ext>
-          </a:extLst>
-        </p:spPr>
+        <p:spPr/>
         <p:txBody>
-          <a:bodyPr wrap="square" numCol="1" anchor="t" anchorCtr="0" compatLnSpc="1">
-            <a:prstTxWarp prst="textNoShape">
-              <a:avLst/>
-            </a:prstTxWarp>
-          </a:bodyPr>
+          <a:bodyPr/>
           <a:lstStyle/>
           <a:p>
-            <a:pPr>
-              <a:spcBef>
-                <a:spcPct val="0"/>
-              </a:spcBef>
-            </a:pPr>
-            <a:r>
-              <a:rPr lang="en-US" dirty="0">
-                <a:hlinkClick r:id="rId3"/>
-              </a:rPr>
-              <a:t>Tableau Public Anime Viz: https://public.tableau.com/profile/spencer.shadley#!/vizhome/Anime/UndiscoveredAnime</a:t>
-            </a:r>
             <a:endParaRPr lang="en-US" dirty="0"/>
-          </a:p>
-          <a:p>
-            <a:pPr>
-              <a:spcBef>
-                <a:spcPct val="0"/>
-              </a:spcBef>
-            </a:pPr>
-            <a:r>
-              <a:rPr lang="en-US" dirty="0">
-                <a:latin typeface="BentonSans Book" charset="0"/>
-              </a:rPr>
-              <a:t>Anime Template </a:t>
-            </a:r>
-            <a:r>
-              <a:rPr lang="en-US" dirty="0" err="1">
-                <a:latin typeface="BentonSans Book" charset="0"/>
-              </a:rPr>
-              <a:t>twb</a:t>
-            </a:r>
-            <a:r>
-              <a:rPr lang="en-US" dirty="0">
-                <a:latin typeface="BentonSans Book" charset="0"/>
-              </a:rPr>
-              <a:t>: https://github.com/spencer-shadley/data-lecture/blob/master/workbooks%20and%20datasources/Template%20Workbooks/Anime.twbx</a:t>
-            </a:r>
-          </a:p>
-          <a:p>
-            <a:pPr>
-              <a:spcBef>
-                <a:spcPct val="0"/>
-              </a:spcBef>
-            </a:pPr>
-            <a:r>
-              <a:rPr lang="en-US" dirty="0">
-                <a:latin typeface="BentonSans Book" charset="0"/>
-              </a:rPr>
-              <a:t>Anime Complete Workbook (same as on public): https://github.com/spencer-shadley/data-lecture/blob/master/workbooks%20and%20datasources/Completed%20Workbooks/Anime.twbx</a:t>
-            </a:r>
           </a:p>
         </p:txBody>
       </p:sp>
     </p:spTree>
     <p:extLst>
       <p:ext uri="{BB962C8B-B14F-4D97-AF65-F5344CB8AC3E}">
-        <p14:creationId xmlns:p14="http://schemas.microsoft.com/office/powerpoint/2010/main" val="1151791318"/>
+        <p14:creationId xmlns:p14="http://schemas.microsoft.com/office/powerpoint/2010/main" val="3559071881"/>
       </p:ext>
     </p:extLst>
   </p:cSld>
@@ -5143,14 +5047,14 @@
           </a:ln>
           <a:extLst>
             <a:ext uri="{909E8E84-426E-40dd-AFC4-6F175D3DCCD1}">
-              <a14:hiddenFill xmlns:a14="http://schemas.microsoft.com/office/drawing/2010/main" xmlns="">
+              <a14:hiddenFill xmlns="" xmlns:a14="http://schemas.microsoft.com/office/drawing/2010/main">
                 <a:solidFill>
                   <a:srgbClr val="FFFFFF"/>
                 </a:solidFill>
               </a14:hiddenFill>
             </a:ext>
             <a:ext uri="{FAA26D3D-D897-4be2-8F04-BA451C77F1D7}">
-              <ma14:placeholderFlag xmlns:ma14="http://schemas.microsoft.com/office/mac/drawingml/2011/main" xmlns="" val="1"/>
+              <ma14:placeholderFlag xmlns="" xmlns:ma14="http://schemas.microsoft.com/office/mac/drawingml/2011/main" val="1"/>
             </a:ext>
           </a:extLst>
         </p:spPr>
@@ -5169,14 +5073,14 @@
           <a:noFill/>
           <a:extLst>
             <a:ext uri="{909E8E84-426E-40dd-AFC4-6F175D3DCCD1}">
-              <a14:hiddenFill xmlns:a14="http://schemas.microsoft.com/office/drawing/2010/main" xmlns="">
+              <a14:hiddenFill xmlns="" xmlns:a14="http://schemas.microsoft.com/office/drawing/2010/main">
                 <a:solidFill>
                   <a:srgbClr val="FFFFFF"/>
                 </a:solidFill>
               </a14:hiddenFill>
             </a:ext>
             <a:ext uri="{91240B29-F687-4f45-9708-019B960494DF}">
-              <a14:hiddenLine xmlns:a14="http://schemas.microsoft.com/office/drawing/2010/main" xmlns="" w="9525">
+              <a14:hiddenLine xmlns="" xmlns:a14="http://schemas.microsoft.com/office/drawing/2010/main" w="9525">
                 <a:solidFill>
                   <a:srgbClr val="000000"/>
                 </a:solidFill>
@@ -5238,7 +5142,7 @@
       </p:grpSpPr>
       <p:sp>
         <p:nvSpPr>
-          <p:cNvPr id="2" name="Slide Image Placeholder 1"/>
+          <p:cNvPr id="38913" name="Slide Image Placeholder 1"/>
           <p:cNvSpPr>
             <a:spLocks noGrp="1" noRot="1" noChangeAspect="1"/>
           </p:cNvSpPr>
@@ -5246,11 +5150,33 @@
             <p:ph type="sldImg"/>
           </p:nvPr>
         </p:nvSpPr>
-        <p:spPr/>
+        <p:spPr bwMode="auto">
+          <a:noFill/>
+          <a:ln>
+            <a:solidFill>
+              <a:srgbClr val="000000"/>
+            </a:solidFill>
+            <a:miter lim="800000"/>
+            <a:headEnd/>
+            <a:tailEnd/>
+          </a:ln>
+          <a:extLst>
+            <a:ext uri="{909E8E84-426E-40dd-AFC4-6F175D3DCCD1}">
+              <a14:hiddenFill xmlns="" xmlns:a14="http://schemas.microsoft.com/office/drawing/2010/main">
+                <a:solidFill>
+                  <a:srgbClr val="FFFFFF"/>
+                </a:solidFill>
+              </a14:hiddenFill>
+            </a:ext>
+            <a:ext uri="{FAA26D3D-D897-4be2-8F04-BA451C77F1D7}">
+              <ma14:placeholderFlag xmlns="" xmlns:ma14="http://schemas.microsoft.com/office/mac/drawingml/2011/main" val="1"/>
+            </a:ext>
+          </a:extLst>
+        </p:spPr>
       </p:sp>
       <p:sp>
         <p:nvSpPr>
-          <p:cNvPr id="3" name="Notes Placeholder 2"/>
+          <p:cNvPr id="38914" name="Notes Placeholder 2"/>
           <p:cNvSpPr>
             <a:spLocks noGrp="1"/>
           </p:cNvSpPr>
@@ -5258,19 +5184,93 @@
             <p:ph type="body" idx="1"/>
           </p:nvPr>
         </p:nvSpPr>
-        <p:spPr/>
+        <p:spPr bwMode="auto">
+          <a:noFill/>
+          <a:extLst>
+            <a:ext uri="{909E8E84-426E-40dd-AFC4-6F175D3DCCD1}">
+              <a14:hiddenFill xmlns="" xmlns:a14="http://schemas.microsoft.com/office/drawing/2010/main">
+                <a:solidFill>
+                  <a:srgbClr val="FFFFFF"/>
+                </a:solidFill>
+              </a14:hiddenFill>
+            </a:ext>
+            <a:ext uri="{91240B29-F687-4f45-9708-019B960494DF}">
+              <a14:hiddenLine xmlns="" xmlns:a14="http://schemas.microsoft.com/office/drawing/2010/main" w="9525">
+                <a:solidFill>
+                  <a:srgbClr val="000000"/>
+                </a:solidFill>
+                <a:miter lim="800000"/>
+                <a:headEnd/>
+                <a:tailEnd/>
+              </a14:hiddenLine>
+            </a:ext>
+          </a:extLst>
+        </p:spPr>
         <p:txBody>
-          <a:bodyPr/>
+          <a:bodyPr wrap="square" numCol="1" anchor="t" anchorCtr="0" compatLnSpc="1">
+            <a:prstTxWarp prst="textNoShape">
+              <a:avLst/>
+            </a:prstTxWarp>
+          </a:bodyPr>
           <a:lstStyle/>
           <a:p>
+            <a:pPr>
+              <a:spcBef>
+                <a:spcPct val="0"/>
+              </a:spcBef>
+            </a:pPr>
+            <a:r>
+              <a:rPr lang="en-US" dirty="0">
+                <a:hlinkClick r:id="rId3"/>
+              </a:rPr>
+              <a:t>Tableau Public Anime Viz: https://public.tableau.com/profile/spencer.shadley#!/vizhome/Anime/UndiscoveredAnime</a:t>
+            </a:r>
             <a:endParaRPr lang="en-US" dirty="0"/>
+          </a:p>
+          <a:p>
+            <a:pPr>
+              <a:spcBef>
+                <a:spcPct val="0"/>
+              </a:spcBef>
+            </a:pPr>
+            <a:r>
+              <a:rPr lang="en-US" dirty="0">
+                <a:latin typeface="BentonSans Book" charset="0"/>
+              </a:rPr>
+              <a:t>Anime Template </a:t>
+            </a:r>
+            <a:r>
+              <a:rPr lang="en-US" dirty="0" err="1">
+                <a:latin typeface="BentonSans Book" charset="0"/>
+              </a:rPr>
+              <a:t>twb</a:t>
+            </a:r>
+            <a:r>
+              <a:rPr lang="en-US" dirty="0">
+                <a:latin typeface="BentonSans Book" charset="0"/>
+              </a:rPr>
+              <a:t>: https://github.com/spencer-shadley/data-lecture/blob/master/workbooks%20and%20datasources/Template%20Workbooks/Anime.twbx</a:t>
+            </a:r>
+          </a:p>
+          <a:p>
+            <a:pPr>
+              <a:spcBef>
+                <a:spcPct val="0"/>
+              </a:spcBef>
+            </a:pPr>
+            <a:r>
+              <a:rPr lang="en-US" dirty="0">
+                <a:latin typeface="BentonSans Book" charset="0"/>
+              </a:rPr>
+              <a:t>Anime Complete Workbook (same as on public): https://github.com/spencer-shadley/data-lecture/blob/master/workbooks%20and%20datasources/Completed%20Workbooks/Anime.twbx</a:t>
+            </a:r>
           </a:p>
         </p:txBody>
       </p:sp>
     </p:spTree>
     <p:extLst>
       <p:ext uri="{BB962C8B-B14F-4D97-AF65-F5344CB8AC3E}">
-        <p14:creationId xmlns:p14="http://schemas.microsoft.com/office/powerpoint/2010/main" val="3559071881"/>
+        <p14:creationId xmlns:p14="http://schemas.microsoft.com/office/powerpoint/2010/main" val="1151791318"/>
       </p:ext>
     </p:extLst>
   </p:cSld>
@@ -5319,14 +5319,14 @@
           </a:ln>
           <a:extLst>
             <a:ext uri="{909E8E84-426E-40dd-AFC4-6F175D3DCCD1}">
-              <a14:hiddenFill xmlns:a14="http://schemas.microsoft.com/office/drawing/2010/main" xmlns="">
+              <a14:hiddenFill xmlns="" xmlns:a14="http://schemas.microsoft.com/office/drawing/2010/main">
                 <a:solidFill>
                   <a:srgbClr val="FFFFFF"/>
                 </a:solidFill>
               </a14:hiddenFill>
             </a:ext>
             <a:ext uri="{FAA26D3D-D897-4be2-8F04-BA451C77F1D7}">
-              <ma14:placeholderFlag xmlns:ma14="http://schemas.microsoft.com/office/mac/drawingml/2011/main" xmlns="" val="1"/>
+              <ma14:placeholderFlag xmlns="" xmlns:ma14="http://schemas.microsoft.com/office/mac/drawingml/2011/main" val="1"/>
             </a:ext>
           </a:extLst>
         </p:spPr>
@@ -5345,14 +5345,14 @@
           <a:noFill/>
           <a:extLst>
             <a:ext uri="{909E8E84-426E-40dd-AFC4-6F175D3DCCD1}">
-              <a14:hiddenFill xmlns:a14="http://schemas.microsoft.com/office/drawing/2010/main" xmlns="">
+              <a14:hiddenFill xmlns="" xmlns:a14="http://schemas.microsoft.com/office/drawing/2010/main">
                 <a:solidFill>
                   <a:srgbClr val="FFFFFF"/>
                 </a:solidFill>
               </a14:hiddenFill>
             </a:ext>
             <a:ext uri="{91240B29-F687-4f45-9708-019B960494DF}">
-              <a14:hiddenLine xmlns:a14="http://schemas.microsoft.com/office/drawing/2010/main" xmlns="" w="9525">
+              <a14:hiddenLine xmlns="" xmlns:a14="http://schemas.microsoft.com/office/drawing/2010/main" w="9525">
                 <a:solidFill>
                   <a:srgbClr val="000000"/>
                 </a:solidFill>
@@ -5437,14 +5437,14 @@
           </a:ln>
           <a:extLst>
             <a:ext uri="{909E8E84-426E-40dd-AFC4-6F175D3DCCD1}">
-              <a14:hiddenFill xmlns:a14="http://schemas.microsoft.com/office/drawing/2010/main" xmlns="">
+              <a14:hiddenFill xmlns="" xmlns:a14="http://schemas.microsoft.com/office/drawing/2010/main">
                 <a:solidFill>
                   <a:srgbClr val="FFFFFF"/>
                 </a:solidFill>
               </a14:hiddenFill>
             </a:ext>
             <a:ext uri="{FAA26D3D-D897-4be2-8F04-BA451C77F1D7}">
-              <ma14:placeholderFlag xmlns:ma14="http://schemas.microsoft.com/office/mac/drawingml/2011/main" xmlns="" val="1"/>
+              <ma14:placeholderFlag xmlns="" xmlns:ma14="http://schemas.microsoft.com/office/mac/drawingml/2011/main" val="1"/>
             </a:ext>
           </a:extLst>
         </p:spPr>
@@ -5463,14 +5463,14 @@
           <a:noFill/>
           <a:extLst>
             <a:ext uri="{909E8E84-426E-40dd-AFC4-6F175D3DCCD1}">
-              <a14:hiddenFill xmlns:a14="http://schemas.microsoft.com/office/drawing/2010/main" xmlns="">
+              <a14:hiddenFill xmlns="" xmlns:a14="http://schemas.microsoft.com/office/drawing/2010/main">
                 <a:solidFill>
                   <a:srgbClr val="FFFFFF"/>
                 </a:solidFill>
               </a14:hiddenFill>
             </a:ext>
             <a:ext uri="{91240B29-F687-4f45-9708-019B960494DF}">
-              <a14:hiddenLine xmlns:a14="http://schemas.microsoft.com/office/drawing/2010/main" xmlns="" w="9525">
+              <a14:hiddenLine xmlns="" xmlns:a14="http://schemas.microsoft.com/office/drawing/2010/main" w="9525">
                 <a:solidFill>
                   <a:srgbClr val="000000"/>
                 </a:solidFill>
@@ -5550,14 +5550,14 @@
           </a:ln>
           <a:extLst>
             <a:ext uri="{909E8E84-426E-40dd-AFC4-6F175D3DCCD1}">
-              <a14:hiddenFill xmlns:a14="http://schemas.microsoft.com/office/drawing/2010/main" xmlns="">
+              <a14:hiddenFill xmlns="" xmlns:a14="http://schemas.microsoft.com/office/drawing/2010/main">
                 <a:solidFill>
                   <a:srgbClr val="FFFFFF"/>
                 </a:solidFill>
               </a14:hiddenFill>
             </a:ext>
             <a:ext uri="{FAA26D3D-D897-4be2-8F04-BA451C77F1D7}">
-              <ma14:placeholderFlag xmlns:ma14="http://schemas.microsoft.com/office/mac/drawingml/2011/main" xmlns="" val="1"/>
+              <ma14:placeholderFlag xmlns="" xmlns:ma14="http://schemas.microsoft.com/office/mac/drawingml/2011/main" val="1"/>
             </a:ext>
           </a:extLst>
         </p:spPr>
@@ -5576,14 +5576,14 @@
           <a:noFill/>
           <a:extLst>
             <a:ext uri="{909E8E84-426E-40dd-AFC4-6F175D3DCCD1}">
-              <a14:hiddenFill xmlns:a14="http://schemas.microsoft.com/office/drawing/2010/main" xmlns="">
+              <a14:hiddenFill xmlns="" xmlns:a14="http://schemas.microsoft.com/office/drawing/2010/main">
                 <a:solidFill>
                   <a:srgbClr val="FFFFFF"/>
                 </a:solidFill>
               </a14:hiddenFill>
             </a:ext>
             <a:ext uri="{91240B29-F687-4f45-9708-019B960494DF}">
-              <a14:hiddenLine xmlns:a14="http://schemas.microsoft.com/office/drawing/2010/main" xmlns="" w="9525">
+              <a14:hiddenLine xmlns="" xmlns:a14="http://schemas.microsoft.com/office/drawing/2010/main" w="9525">
                 <a:solidFill>
                   <a:srgbClr val="000000"/>
                 </a:solidFill>
@@ -5663,14 +5663,14 @@
           </a:ln>
           <a:extLst>
             <a:ext uri="{909E8E84-426E-40dd-AFC4-6F175D3DCCD1}">
-              <a14:hiddenFill xmlns:a14="http://schemas.microsoft.com/office/drawing/2010/main" xmlns="">
+              <a14:hiddenFill xmlns="" xmlns:a14="http://schemas.microsoft.com/office/drawing/2010/main">
                 <a:solidFill>
                   <a:srgbClr val="FFFFFF"/>
                 </a:solidFill>
               </a14:hiddenFill>
             </a:ext>
             <a:ext uri="{FAA26D3D-D897-4be2-8F04-BA451C77F1D7}">
-              <ma14:placeholderFlag xmlns:ma14="http://schemas.microsoft.com/office/mac/drawingml/2011/main" xmlns="" val="1"/>
+              <ma14:placeholderFlag xmlns="" xmlns:ma14="http://schemas.microsoft.com/office/mac/drawingml/2011/main" val="1"/>
             </a:ext>
           </a:extLst>
         </p:spPr>
@@ -5689,14 +5689,14 @@
           <a:noFill/>
           <a:extLst>
             <a:ext uri="{909E8E84-426E-40dd-AFC4-6F175D3DCCD1}">
-              <a14:hiddenFill xmlns:a14="http://schemas.microsoft.com/office/drawing/2010/main" xmlns="">
+              <a14:hiddenFill xmlns="" xmlns:a14="http://schemas.microsoft.com/office/drawing/2010/main">
                 <a:solidFill>
                   <a:srgbClr val="FFFFFF"/>
                 </a:solidFill>
               </a14:hiddenFill>
             </a:ext>
             <a:ext uri="{91240B29-F687-4f45-9708-019B960494DF}">
-              <a14:hiddenLine xmlns:a14="http://schemas.microsoft.com/office/drawing/2010/main" xmlns="" w="9525">
+              <a14:hiddenLine xmlns="" xmlns:a14="http://schemas.microsoft.com/office/drawing/2010/main" w="9525">
                 <a:solidFill>
                   <a:srgbClr val="000000"/>
                 </a:solidFill>
@@ -5776,14 +5776,14 @@
           </a:ln>
           <a:extLst>
             <a:ext uri="{909E8E84-426E-40dd-AFC4-6F175D3DCCD1}">
-              <a14:hiddenFill xmlns:a14="http://schemas.microsoft.com/office/drawing/2010/main" xmlns="">
+              <a14:hiddenFill xmlns="" xmlns:a14="http://schemas.microsoft.com/office/drawing/2010/main">
                 <a:solidFill>
                   <a:srgbClr val="FFFFFF"/>
                 </a:solidFill>
               </a14:hiddenFill>
             </a:ext>
             <a:ext uri="{FAA26D3D-D897-4be2-8F04-BA451C77F1D7}">
-              <ma14:placeholderFlag xmlns:ma14="http://schemas.microsoft.com/office/mac/drawingml/2011/main" xmlns="" val="1"/>
+              <ma14:placeholderFlag xmlns="" xmlns:ma14="http://schemas.microsoft.com/office/mac/drawingml/2011/main" val="1"/>
             </a:ext>
           </a:extLst>
         </p:spPr>
@@ -5802,14 +5802,14 @@
           <a:noFill/>
           <a:extLst>
             <a:ext uri="{909E8E84-426E-40dd-AFC4-6F175D3DCCD1}">
-              <a14:hiddenFill xmlns:a14="http://schemas.microsoft.com/office/drawing/2010/main" xmlns="">
+              <a14:hiddenFill xmlns="" xmlns:a14="http://schemas.microsoft.com/office/drawing/2010/main">
                 <a:solidFill>
                   <a:srgbClr val="FFFFFF"/>
                 </a:solidFill>
               </a14:hiddenFill>
             </a:ext>
             <a:ext uri="{91240B29-F687-4f45-9708-019B960494DF}">
-              <a14:hiddenLine xmlns:a14="http://schemas.microsoft.com/office/drawing/2010/main" xmlns="" w="9525">
+              <a14:hiddenLine xmlns="" xmlns:a14="http://schemas.microsoft.com/office/drawing/2010/main" w="9525">
                 <a:solidFill>
                   <a:srgbClr val="000000"/>
                 </a:solidFill>
@@ -5889,14 +5889,14 @@
           </a:ln>
           <a:extLst>
             <a:ext uri="{909E8E84-426E-40dd-AFC4-6F175D3DCCD1}">
-              <a14:hiddenFill xmlns:a14="http://schemas.microsoft.com/office/drawing/2010/main" xmlns="">
+              <a14:hiddenFill xmlns="" xmlns:a14="http://schemas.microsoft.com/office/drawing/2010/main">
                 <a:solidFill>
                   <a:srgbClr val="FFFFFF"/>
                 </a:solidFill>
               </a14:hiddenFill>
             </a:ext>
             <a:ext uri="{FAA26D3D-D897-4be2-8F04-BA451C77F1D7}">
-              <ma14:placeholderFlag xmlns:ma14="http://schemas.microsoft.com/office/mac/drawingml/2011/main" xmlns="" val="1"/>
+              <ma14:placeholderFlag xmlns="" xmlns:ma14="http://schemas.microsoft.com/office/mac/drawingml/2011/main" val="1"/>
             </a:ext>
           </a:extLst>
         </p:spPr>
@@ -5915,14 +5915,14 @@
           <a:noFill/>
           <a:extLst>
             <a:ext uri="{909E8E84-426E-40dd-AFC4-6F175D3DCCD1}">
-              <a14:hiddenFill xmlns:a14="http://schemas.microsoft.com/office/drawing/2010/main" xmlns="">
+              <a14:hiddenFill xmlns="" xmlns:a14="http://schemas.microsoft.com/office/drawing/2010/main">
                 <a:solidFill>
                   <a:srgbClr val="FFFFFF"/>
                 </a:solidFill>
               </a14:hiddenFill>
             </a:ext>
             <a:ext uri="{91240B29-F687-4f45-9708-019B960494DF}">
-              <a14:hiddenLine xmlns:a14="http://schemas.microsoft.com/office/drawing/2010/main" xmlns="" w="9525">
+              <a14:hiddenLine xmlns="" xmlns:a14="http://schemas.microsoft.com/office/drawing/2010/main" w="9525">
                 <a:solidFill>
                   <a:srgbClr val="000000"/>
                 </a:solidFill>
@@ -6079,14 +6079,14 @@
           </a:ln>
           <a:extLst>
             <a:ext uri="{909E8E84-426E-40dd-AFC4-6F175D3DCCD1}">
-              <a14:hiddenFill xmlns:a14="http://schemas.microsoft.com/office/drawing/2010/main" xmlns="">
+              <a14:hiddenFill xmlns="" xmlns:a14="http://schemas.microsoft.com/office/drawing/2010/main">
                 <a:solidFill>
                   <a:srgbClr val="FFFFFF"/>
                 </a:solidFill>
               </a14:hiddenFill>
             </a:ext>
             <a:ext uri="{91240B29-F687-4f45-9708-019B960494DF}">
-              <a14:hiddenLine xmlns:a14="http://schemas.microsoft.com/office/drawing/2010/main" xmlns="" w="9525">
+              <a14:hiddenLine xmlns="" xmlns:a14="http://schemas.microsoft.com/office/drawing/2010/main" w="9525">
                 <a:solidFill>
                   <a:srgbClr val="000000"/>
                 </a:solidFill>
@@ -6837,14 +6837,14 @@
           </a:ln>
           <a:extLst>
             <a:ext uri="{909E8E84-426E-40dd-AFC4-6F175D3DCCD1}">
-              <a14:hiddenFill xmlns:a14="http://schemas.microsoft.com/office/drawing/2010/main" xmlns="">
+              <a14:hiddenFill xmlns="" xmlns:a14="http://schemas.microsoft.com/office/drawing/2010/main">
                 <a:solidFill>
                   <a:srgbClr val="FFFFFF"/>
                 </a:solidFill>
               </a14:hiddenFill>
             </a:ext>
             <a:ext uri="{91240B29-F687-4f45-9708-019B960494DF}">
-              <a14:hiddenLine xmlns:a14="http://schemas.microsoft.com/office/drawing/2010/main" xmlns="" w="9525">
+              <a14:hiddenLine xmlns="" xmlns:a14="http://schemas.microsoft.com/office/drawing/2010/main" w="9525">
                 <a:solidFill>
                   <a:srgbClr val="000000"/>
                 </a:solidFill>
@@ -8627,14 +8627,14 @@
           </a:ln>
           <a:extLst>
             <a:ext uri="{909E8E84-426E-40dd-AFC4-6F175D3DCCD1}">
-              <a14:hiddenFill xmlns:a14="http://schemas.microsoft.com/office/drawing/2010/main" xmlns="">
+              <a14:hiddenFill xmlns="" xmlns:a14="http://schemas.microsoft.com/office/drawing/2010/main">
                 <a:solidFill>
                   <a:srgbClr val="FFFFFF"/>
                 </a:solidFill>
               </a14:hiddenFill>
             </a:ext>
             <a:ext uri="{91240B29-F687-4f45-9708-019B960494DF}">
-              <a14:hiddenLine xmlns:a14="http://schemas.microsoft.com/office/drawing/2010/main" xmlns="" w="9525">
+              <a14:hiddenLine xmlns="" xmlns:a14="http://schemas.microsoft.com/office/drawing/2010/main" w="9525">
                 <a:solidFill>
                   <a:srgbClr val="000000"/>
                 </a:solidFill>
@@ -8644,7 +8644,7 @@
               </a14:hiddenLine>
             </a:ext>
             <a:ext uri="{FAA26D3D-D897-4be2-8F04-BA451C77F1D7}">
-              <ma14:placeholderFlag xmlns:ma14="http://schemas.microsoft.com/office/mac/drawingml/2011/main" xmlns="" val="1"/>
+              <ma14:placeholderFlag xmlns="" xmlns:ma14="http://schemas.microsoft.com/office/mac/drawingml/2011/main" val="1"/>
             </a:ext>
           </a:extLst>
         </p:spPr>
@@ -24597,126 +24597,6 @@
       </p:grpSpPr>
       <p:sp>
         <p:nvSpPr>
-          <p:cNvPr id="7169" name="Title 1"/>
-          <p:cNvSpPr>
-            <a:spLocks noGrp="1"/>
-          </p:cNvSpPr>
-          <p:nvPr>
-            <p:ph type="title" idx="4294967295"/>
-          </p:nvPr>
-        </p:nvSpPr>
-        <p:spPr>
-          <a:xfrm>
-            <a:off x="704850" y="2009049"/>
-            <a:ext cx="13274675" cy="907300"/>
-          </a:xfrm>
-        </p:spPr>
-        <p:txBody>
-          <a:bodyPr/>
-          <a:lstStyle/>
-          <a:p>
-            <a:r>
-              <a:rPr lang="en-US" dirty="0">
-                <a:solidFill>
-                  <a:srgbClr val="4C4C4C"/>
-                </a:solidFill>
-                <a:latin typeface="BentonSans Book" charset="0"/>
-              </a:rPr>
-              <a:t>Make your own viz!</a:t>
-            </a:r>
-            <a:br>
-              <a:rPr lang="en-US" dirty="0">
-                <a:solidFill>
-                  <a:srgbClr val="4C4C4C"/>
-                </a:solidFill>
-                <a:latin typeface="BentonSans Book" charset="0"/>
-              </a:rPr>
-            </a:br>
-            <a:r>
-              <a:rPr lang="en-US" sz="2800" dirty="0">
-                <a:solidFill>
-                  <a:srgbClr val="4C4C4C"/>
-                </a:solidFill>
-                <a:latin typeface="BentonSans Book" charset="0"/>
-              </a:rPr>
-              <a:t>(use any data, here’s an </a:t>
-            </a:r>
-            <a:r>
-              <a:rPr lang="en-US" sz="2800" dirty="0">
-                <a:solidFill>
-                  <a:srgbClr val="4C4C4C"/>
-                </a:solidFill>
-                <a:latin typeface="BentonSans Book" charset="0"/>
-                <a:hlinkClick r:id="rId3"/>
-              </a:rPr>
-              <a:t>anime template </a:t>
-            </a:r>
-            <a:r>
-              <a:rPr lang="en-US" sz="2800" dirty="0">
-                <a:solidFill>
-                  <a:srgbClr val="4C4C4C"/>
-                </a:solidFill>
-                <a:latin typeface="BentonSans Book" charset="0"/>
-              </a:rPr>
-              <a:t>and </a:t>
-            </a:r>
-            <a:r>
-              <a:rPr lang="en-US" sz="2800" dirty="0">
-                <a:solidFill>
-                  <a:srgbClr val="4C4C4C"/>
-                </a:solidFill>
-                <a:latin typeface="BentonSans Book" charset="0"/>
-                <a:hlinkClick r:id="rId4"/>
-              </a:rPr>
-              <a:t>complete anime workbook on Tableau Public</a:t>
-            </a:r>
-            <a:r>
-              <a:rPr lang="en-US" sz="2800" dirty="0">
-                <a:solidFill>
-                  <a:srgbClr val="4C4C4C"/>
-                </a:solidFill>
-                <a:latin typeface="BentonSans Book" charset="0"/>
-              </a:rPr>
-              <a:t>)</a:t>
-            </a:r>
-          </a:p>
-        </p:txBody>
-      </p:sp>
-    </p:spTree>
-    <p:extLst>
-      <p:ext uri="{BB962C8B-B14F-4D97-AF65-F5344CB8AC3E}">
-        <p14:creationId xmlns:p14="http://schemas.microsoft.com/office/powerpoint/2010/main" val="3056533445"/>
-      </p:ext>
-    </p:extLst>
-  </p:cSld>
-  <p:clrMapOvr>
-    <a:masterClrMapping/>
-  </p:clrMapOvr>
-  <p:transition spd="slow">
-    <p:push dir="u"/>
-  </p:transition>
-</p:sld>
-</file>
-
-<file path=ppt/slides/slide42.xml><?xml version="1.0" encoding="utf-8"?>
-<p:sld xmlns:a="http://schemas.openxmlformats.org/drawingml/2006/main" xmlns:r="http://schemas.openxmlformats.org/officeDocument/2006/relationships" xmlns:p="http://schemas.openxmlformats.org/presentationml/2006/main">
-  <p:cSld>
-    <p:spTree>
-      <p:nvGrpSpPr>
-        <p:cNvPr id="1" name=""/>
-        <p:cNvGrpSpPr/>
-        <p:nvPr/>
-      </p:nvGrpSpPr>
-      <p:grpSpPr>
-        <a:xfrm>
-          <a:off x="0" y="0"/>
-          <a:ext cx="0" cy="0"/>
-          <a:chOff x="0" y="0"/>
-          <a:chExt cx="0" cy="0"/>
-        </a:xfrm>
-      </p:grpSpPr>
-      <p:sp>
-        <p:nvSpPr>
           <p:cNvPr id="2" name="Content Placeholder 1"/>
           <p:cNvSpPr>
             <a:spLocks noGrp="1"/>
@@ -24728,7 +24608,7 @@
         <p:spPr>
           <a:xfrm>
             <a:off x="704476" y="1893515"/>
-            <a:ext cx="13273820" cy="4385816"/>
+            <a:ext cx="13273820" cy="4832092"/>
           </a:xfrm>
         </p:spPr>
         <p:txBody>
@@ -24890,6 +24770,26 @@
                 <a:hlinkClick r:id="rId12"/>
               </a:rPr>
               <a:t>Vizzes</a:t>
+            </a:r>
+            <a:endParaRPr lang="en-US" sz="2400" dirty="0">
+              <a:ea typeface="+mn-ea"/>
+            </a:endParaRPr>
+          </a:p>
+          <a:p>
+            <a:pPr marL="457200" indent="-457200" defTabSz="1306221" fontAlgn="auto">
+              <a:defRPr/>
+            </a:pPr>
+            <a:r>
+              <a:rPr lang="en-US" sz="2400" dirty="0">
+                <a:ea typeface="+mn-ea"/>
+              </a:rPr>
+              <a:t>I’ll be on Piazza and will try to </a:t>
+            </a:r>
+            <a:r>
+              <a:rPr lang="en-US" sz="2400">
+                <a:ea typeface="+mn-ea"/>
+              </a:rPr>
+              <a:t>answer questions within a day or two</a:t>
             </a:r>
             <a:endParaRPr lang="en-US" sz="2400" dirty="0">
               <a:ea typeface="+mn-ea"/>
@@ -25509,6 +25409,67 @@
                       </p:childTnLst>
                     </p:cTn>
                   </p:par>
+                  <p:par>
+                    <p:cTn id="48" fill="hold">
+                      <p:stCondLst>
+                        <p:cond delay="indefinite"/>
+                      </p:stCondLst>
+                      <p:childTnLst>
+                        <p:par>
+                          <p:cTn id="49" fill="hold">
+                            <p:stCondLst>
+                              <p:cond delay="0"/>
+                            </p:stCondLst>
+                            <p:childTnLst>
+                              <p:par>
+                                <p:cTn id="50" presetID="10" presetClass="entr" presetSubtype="0" fill="hold" grpId="0" nodeType="clickEffect">
+                                  <p:stCondLst>
+                                    <p:cond delay="0"/>
+                                  </p:stCondLst>
+                                  <p:childTnLst>
+                                    <p:set>
+                                      <p:cBhvr>
+                                        <p:cTn id="51" dur="1" fill="hold">
+                                          <p:stCondLst>
+                                            <p:cond delay="0"/>
+                                          </p:stCondLst>
+                                        </p:cTn>
+                                        <p:tgtEl>
+                                          <p:spTgt spid="2">
+                                            <p:txEl>
+                                              <p:pRg st="9" end="9"/>
+                                            </p:txEl>
+                                          </p:spTgt>
+                                        </p:tgtEl>
+                                        <p:attrNameLst>
+                                          <p:attrName>style.visibility</p:attrName>
+                                        </p:attrNameLst>
+                                      </p:cBhvr>
+                                      <p:to>
+                                        <p:strVal val="visible"/>
+                                      </p:to>
+                                    </p:set>
+                                    <p:animEffect transition="in" filter="fade">
+                                      <p:cBhvr>
+                                        <p:cTn id="52" dur="500"/>
+                                        <p:tgtEl>
+                                          <p:spTgt spid="2">
+                                            <p:txEl>
+                                              <p:pRg st="9" end="9"/>
+                                            </p:txEl>
+                                          </p:spTgt>
+                                        </p:tgtEl>
+                                      </p:cBhvr>
+                                    </p:animEffect>
+                                  </p:childTnLst>
+                                </p:cTn>
+                              </p:par>
+                            </p:childTnLst>
+                          </p:cTn>
+                        </p:par>
+                      </p:childTnLst>
+                    </p:cTn>
+                  </p:par>
                 </p:childTnLst>
               </p:cTn>
               <p:prevCondLst>
@@ -25534,6 +25495,126 @@
       <p:bldP spid="2" grpId="0" build="p"/>
     </p:bldLst>
   </p:timing>
+</p:sld>
+</file>
+
+<file path=ppt/slides/slide42.xml><?xml version="1.0" encoding="utf-8"?>
+<p:sld xmlns:a="http://schemas.openxmlformats.org/drawingml/2006/main" xmlns:r="http://schemas.openxmlformats.org/officeDocument/2006/relationships" xmlns:p="http://schemas.openxmlformats.org/presentationml/2006/main">
+  <p:cSld>
+    <p:spTree>
+      <p:nvGrpSpPr>
+        <p:cNvPr id="1" name=""/>
+        <p:cNvGrpSpPr/>
+        <p:nvPr/>
+      </p:nvGrpSpPr>
+      <p:grpSpPr>
+        <a:xfrm>
+          <a:off x="0" y="0"/>
+          <a:ext cx="0" cy="0"/>
+          <a:chOff x="0" y="0"/>
+          <a:chExt cx="0" cy="0"/>
+        </a:xfrm>
+      </p:grpSpPr>
+      <p:sp>
+        <p:nvSpPr>
+          <p:cNvPr id="7169" name="Title 1"/>
+          <p:cNvSpPr>
+            <a:spLocks noGrp="1"/>
+          </p:cNvSpPr>
+          <p:nvPr>
+            <p:ph type="title" idx="4294967295"/>
+          </p:nvPr>
+        </p:nvSpPr>
+        <p:spPr>
+          <a:xfrm>
+            <a:off x="704850" y="2009049"/>
+            <a:ext cx="13274675" cy="907300"/>
+          </a:xfrm>
+        </p:spPr>
+        <p:txBody>
+          <a:bodyPr/>
+          <a:lstStyle/>
+          <a:p>
+            <a:r>
+              <a:rPr lang="en-US" dirty="0">
+                <a:solidFill>
+                  <a:srgbClr val="4C4C4C"/>
+                </a:solidFill>
+                <a:latin typeface="BentonSans Book" charset="0"/>
+              </a:rPr>
+              <a:t>Make your own viz!</a:t>
+            </a:r>
+            <a:br>
+              <a:rPr lang="en-US" dirty="0">
+                <a:solidFill>
+                  <a:srgbClr val="4C4C4C"/>
+                </a:solidFill>
+                <a:latin typeface="BentonSans Book" charset="0"/>
+              </a:rPr>
+            </a:br>
+            <a:r>
+              <a:rPr lang="en-US" sz="2800" dirty="0">
+                <a:solidFill>
+                  <a:srgbClr val="4C4C4C"/>
+                </a:solidFill>
+                <a:latin typeface="BentonSans Book" charset="0"/>
+              </a:rPr>
+              <a:t>(use any data, here’s an </a:t>
+            </a:r>
+            <a:r>
+              <a:rPr lang="en-US" sz="2800" dirty="0">
+                <a:solidFill>
+                  <a:srgbClr val="4C4C4C"/>
+                </a:solidFill>
+                <a:latin typeface="BentonSans Book" charset="0"/>
+                <a:hlinkClick r:id="rId3"/>
+              </a:rPr>
+              <a:t>anime template </a:t>
+            </a:r>
+            <a:r>
+              <a:rPr lang="en-US" sz="2800" dirty="0">
+                <a:solidFill>
+                  <a:srgbClr val="4C4C4C"/>
+                </a:solidFill>
+                <a:latin typeface="BentonSans Book" charset="0"/>
+              </a:rPr>
+              <a:t>and </a:t>
+            </a:r>
+            <a:r>
+              <a:rPr lang="en-US" sz="2800" dirty="0">
+                <a:solidFill>
+                  <a:srgbClr val="4C4C4C"/>
+                </a:solidFill>
+                <a:latin typeface="BentonSans Book" charset="0"/>
+                <a:hlinkClick r:id="rId4"/>
+              </a:rPr>
+              <a:t>complete anime workbook on Tableau Public</a:t>
+            </a:r>
+            <a:r>
+              <a:rPr lang="en-US" sz="2800" dirty="0">
+                <a:solidFill>
+                  <a:srgbClr val="4C4C4C"/>
+                </a:solidFill>
+                <a:latin typeface="BentonSans Book" charset="0"/>
+              </a:rPr>
+              <a:t>)</a:t>
+            </a:r>
+          </a:p>
+        </p:txBody>
+      </p:sp>
+    </p:spTree>
+    <p:extLst>
+      <p:ext uri="{BB962C8B-B14F-4D97-AF65-F5344CB8AC3E}">
+        <p14:creationId xmlns:p14="http://schemas.microsoft.com/office/powerpoint/2010/main" val="3056533445"/>
+      </p:ext>
+    </p:extLst>
+  </p:cSld>
+  <p:clrMapOvr>
+    <a:masterClrMapping/>
+  </p:clrMapOvr>
+  <p:transition spd="slow">
+    <p:push dir="u"/>
+  </p:transition>
 </p:sld>
 </file>
 
@@ -25961,7 +26042,7 @@
         <p:spPr>
           <a:xfrm>
             <a:off x="725488" y="1812925"/>
-            <a:ext cx="5337175" cy="2518510"/>
+            <a:ext cx="5337175" cy="3811172"/>
           </a:xfrm>
         </p:spPr>
         <p:txBody>
@@ -26023,6 +26104,31 @@
               </a:rPr>
               <a:t>Interactive Tableau Tutorial</a:t>
             </a:r>
+          </a:p>
+          <a:p>
+            <a:pPr defTabSz="1306221" fontAlgn="auto">
+              <a:spcAft>
+                <a:spcPts val="0"/>
+              </a:spcAft>
+              <a:defRPr/>
+            </a:pPr>
+            <a:r>
+              <a:rPr lang="en-US" dirty="0">
+                <a:ea typeface="+mn-ea"/>
+              </a:rPr>
+              <a:t>Tableau Resources</a:t>
+            </a:r>
+          </a:p>
+          <a:p>
+            <a:pPr defTabSz="1306221" fontAlgn="auto">
+              <a:spcAft>
+                <a:spcPts val="0"/>
+              </a:spcAft>
+              <a:defRPr/>
+            </a:pPr>
+            <a:endParaRPr lang="en-US" dirty="0">
+              <a:ea typeface="+mn-ea"/>
+            </a:endParaRPr>
           </a:p>
         </p:txBody>
       </p:sp>
@@ -26336,6 +26442,67 @@
                                           <p:spTgt spid="8">
                                             <p:txEl>
                                               <p:pRg st="3" end="3"/>
+                                            </p:txEl>
+                                          </p:spTgt>
+                                        </p:tgtEl>
+                                      </p:cBhvr>
+                                    </p:animEffect>
+                                  </p:childTnLst>
+                                </p:cTn>
+                              </p:par>
+                            </p:childTnLst>
+                          </p:cTn>
+                        </p:par>
+                      </p:childTnLst>
+                    </p:cTn>
+                  </p:par>
+                  <p:par>
+                    <p:cTn id="23" fill="hold">
+                      <p:stCondLst>
+                        <p:cond delay="indefinite"/>
+                      </p:stCondLst>
+                      <p:childTnLst>
+                        <p:par>
+                          <p:cTn id="24" fill="hold">
+                            <p:stCondLst>
+                              <p:cond delay="0"/>
+                            </p:stCondLst>
+                            <p:childTnLst>
+                              <p:par>
+                                <p:cTn id="25" presetID="10" presetClass="entr" presetSubtype="0" fill="hold" grpId="0" nodeType="clickEffect">
+                                  <p:stCondLst>
+                                    <p:cond delay="0"/>
+                                  </p:stCondLst>
+                                  <p:childTnLst>
+                                    <p:set>
+                                      <p:cBhvr>
+                                        <p:cTn id="26" dur="1" fill="hold">
+                                          <p:stCondLst>
+                                            <p:cond delay="0"/>
+                                          </p:stCondLst>
+                                        </p:cTn>
+                                        <p:tgtEl>
+                                          <p:spTgt spid="8">
+                                            <p:txEl>
+                                              <p:pRg st="4" end="4"/>
+                                            </p:txEl>
+                                          </p:spTgt>
+                                        </p:tgtEl>
+                                        <p:attrNameLst>
+                                          <p:attrName>style.visibility</p:attrName>
+                                        </p:attrNameLst>
+                                      </p:cBhvr>
+                                      <p:to>
+                                        <p:strVal val="visible"/>
+                                      </p:to>
+                                    </p:set>
+                                    <p:animEffect transition="in" filter="fade">
+                                      <p:cBhvr>
+                                        <p:cTn id="27" dur="500"/>
+                                        <p:tgtEl>
+                                          <p:spTgt spid="8">
+                                            <p:txEl>
+                                              <p:pRg st="4" end="4"/>
                                             </p:txEl>
                                           </p:spTgt>
                                         </p:tgtEl>

</xml_diff>